<commit_message>
Design implicit and equation systems evaluation
</commit_message>
<xml_diff>
--- a/doc/illustrations.pptx
+++ b/doc/illustrations.pptx
@@ -6,6 +6,7 @@
   </p:sldMasterIdLst>
   <p:sldIdLst>
     <p:sldId id="256" r:id="rId2"/>
+    <p:sldId id="257" r:id="rId3"/>
   </p:sldIdLst>
   <p:sldSz cx="12192000" cy="6858000"/>
   <p:notesSz cx="6858000" cy="9144000"/>
@@ -3592,10 +3593,10 @@
       </p:sp>
       <p:grpSp>
         <p:nvGrpSpPr>
-          <p:cNvPr id="26" name="组合 25">
+          <p:cNvPr id="29" name="组合 28">
             <a:extLst>
               <a:ext uri="{FF2B5EF4-FFF2-40B4-BE49-F238E27FC236}">
-                <a16:creationId xmlns:a16="http://schemas.microsoft.com/office/drawing/2014/main" id="{24C15752-3495-424E-A898-2F116C68CB07}"/>
+                <a16:creationId xmlns:a16="http://schemas.microsoft.com/office/drawing/2014/main" id="{85AB0B28-40EA-4EFF-A89A-8B4FCEFEDDE9}"/>
               </a:ext>
             </a:extLst>
           </p:cNvPr>
@@ -3606,7 +3607,7 @@
           <a:xfrm>
             <a:off x="3253873" y="1126905"/>
             <a:ext cx="3197233" cy="3161568"/>
-            <a:chOff x="3505512" y="1131074"/>
+            <a:chOff x="3253873" y="1126905"/>
             <a:chExt cx="3197233" cy="3161568"/>
           </a:xfrm>
         </p:grpSpPr>
@@ -3626,7 +3627,7 @@
               </p:nvSpPr>
               <p:spPr>
                 <a:xfrm>
-                  <a:off x="4478646" y="1198485"/>
+                  <a:off x="4227007" y="1194316"/>
                   <a:ext cx="1035312" cy="532661"/>
                 </a:xfrm>
                 <a:prstGeom prst="roundRect">
@@ -3704,7 +3705,7 @@
               </p:nvSpPr>
               <p:spPr>
                 <a:xfrm>
-                  <a:off x="4478646" y="1198485"/>
+                  <a:off x="4227007" y="1194316"/>
                   <a:ext cx="1035312" cy="532661"/>
                 </a:xfrm>
                 <a:prstGeom prst="roundRect">
@@ -3749,7 +3750,7 @@
               </p:nvSpPr>
               <p:spPr>
                 <a:xfrm>
-                  <a:off x="5445179" y="2902997"/>
+                  <a:off x="5193540" y="2898828"/>
                   <a:ext cx="1035312" cy="532661"/>
                 </a:xfrm>
                 <a:prstGeom prst="roundRect">
@@ -3827,7 +3828,7 @@
               </p:nvSpPr>
               <p:spPr>
                 <a:xfrm>
-                  <a:off x="5445179" y="2902997"/>
+                  <a:off x="5193540" y="2898828"/>
                   <a:ext cx="1035312" cy="532661"/>
                 </a:xfrm>
                 <a:prstGeom prst="roundRect">
@@ -3872,7 +3873,7 @@
               </p:nvSpPr>
               <p:spPr>
                 <a:xfrm>
-                  <a:off x="3505512" y="2547890"/>
+                  <a:off x="3253873" y="2543721"/>
                   <a:ext cx="1035312" cy="532661"/>
                 </a:xfrm>
                 <a:prstGeom prst="roundRect">
@@ -3950,7 +3951,7 @@
               </p:nvSpPr>
               <p:spPr>
                 <a:xfrm>
-                  <a:off x="3505512" y="2547890"/>
+                  <a:off x="3253873" y="2543721"/>
                   <a:ext cx="1035312" cy="532661"/>
                 </a:xfrm>
                 <a:prstGeom prst="roundRect">
@@ -3993,7 +3994,7 @@
           </p:nvSpPr>
           <p:spPr>
             <a:xfrm rot="818956">
-              <a:off x="4360785" y="1664246"/>
+              <a:off x="4109146" y="1660077"/>
               <a:ext cx="1635173" cy="1767289"/>
             </a:xfrm>
             <a:prstGeom prst="arc">
@@ -4044,7 +4045,7 @@
           </p:nvSpPr>
           <p:spPr>
             <a:xfrm rot="11752901">
-              <a:off x="5222924" y="1131074"/>
+              <a:off x="4971285" y="1126905"/>
               <a:ext cx="1479821" cy="1765685"/>
             </a:xfrm>
             <a:prstGeom prst="arc">
@@ -4095,7 +4096,7 @@
           </p:nvSpPr>
           <p:spPr>
             <a:xfrm rot="19458716">
-              <a:off x="4303977" y="2668029"/>
+              <a:off x="4052338" y="2663860"/>
               <a:ext cx="1282582" cy="1624613"/>
             </a:xfrm>
             <a:prstGeom prst="arc">
@@ -4146,7 +4147,7 @@
           </p:nvSpPr>
           <p:spPr>
             <a:xfrm rot="8678542">
-              <a:off x="4242101" y="2001914"/>
+              <a:off x="3990462" y="1997745"/>
               <a:ext cx="1282582" cy="1624613"/>
             </a:xfrm>
             <a:prstGeom prst="arc">
@@ -4196,7 +4197,7 @@
           </p:nvCxnSpPr>
           <p:spPr>
             <a:xfrm flipH="1">
-              <a:off x="4023168" y="1780637"/>
+              <a:off x="3771529" y="1776468"/>
               <a:ext cx="517656" cy="683579"/>
             </a:xfrm>
             <a:prstGeom prst="straightConnector1">
@@ -4232,13 +4233,15 @@
               </a:ext>
             </a:extLst>
           </p:cNvPr>
-          <p:cNvCxnSpPr/>
+          <p:cNvCxnSpPr>
+            <a:cxnSpLocks/>
+          </p:cNvCxnSpPr>
           <p:nvPr/>
         </p:nvCxnSpPr>
         <p:spPr>
           <a:xfrm>
-            <a:off x="2521258" y="612559"/>
-            <a:ext cx="0" cy="4261282"/>
+            <a:off x="2521258" y="825623"/>
+            <a:ext cx="0" cy="3284738"/>
           </a:xfrm>
           <a:prstGeom prst="line">
             <a:avLst/>
@@ -4263,6 +4266,3287 @@
     <p:extLst>
       <p:ext uri="{BB962C8B-B14F-4D97-AF65-F5344CB8AC3E}">
         <p14:creationId xmlns:p14="http://schemas.microsoft.com/office/powerpoint/2010/main" val="697250598"/>
+      </p:ext>
+    </p:extLst>
+  </p:cSld>
+  <p:clrMapOvr>
+    <a:masterClrMapping/>
+  </p:clrMapOvr>
+</p:sld>
+</file>
+
+<file path=ppt/slides/slide2.xml><?xml version="1.0" encoding="utf-8"?>
+<p:sld xmlns:a="http://schemas.openxmlformats.org/drawingml/2006/main" xmlns:r="http://schemas.openxmlformats.org/officeDocument/2006/relationships" xmlns:p="http://schemas.openxmlformats.org/presentationml/2006/main">
+  <p:cSld>
+    <p:spTree>
+      <p:nvGrpSpPr>
+        <p:cNvPr id="1" name=""/>
+        <p:cNvGrpSpPr/>
+        <p:nvPr/>
+      </p:nvGrpSpPr>
+      <p:grpSpPr>
+        <a:xfrm>
+          <a:off x="0" y="0"/>
+          <a:ext cx="0" cy="0"/>
+          <a:chOff x="0" y="0"/>
+          <a:chExt cx="0" cy="0"/>
+        </a:xfrm>
+      </p:grpSpPr>
+      <mc:AlternateContent xmlns:mc="http://schemas.openxmlformats.org/markup-compatibility/2006">
+        <mc:Choice xmlns:a14="http://schemas.microsoft.com/office/drawing/2010/main" Requires="a14">
+          <p:sp>
+            <p:nvSpPr>
+              <p:cNvPr id="3" name="文本框 2">
+                <a:extLst>
+                  <a:ext uri="{FF2B5EF4-FFF2-40B4-BE49-F238E27FC236}">
+                    <a16:creationId xmlns:a16="http://schemas.microsoft.com/office/drawing/2014/main" id="{2DE6FC31-F7BE-412D-A2F2-670F486DB4B2}"/>
+                  </a:ext>
+                </a:extLst>
+              </p:cNvPr>
+              <p:cNvSpPr txBox="1"/>
+              <p:nvPr/>
+            </p:nvSpPr>
+            <p:spPr>
+              <a:xfrm>
+                <a:off x="2647765" y="401059"/>
+                <a:ext cx="6094520" cy="5448286"/>
+              </a:xfrm>
+              <a:prstGeom prst="rect">
+                <a:avLst/>
+              </a:prstGeom>
+              <a:noFill/>
+            </p:spPr>
+            <p:txBody>
+              <a:bodyPr wrap="square">
+                <a:spAutoFit/>
+              </a:bodyPr>
+              <a:lstStyle/>
+              <a:p>
+                <a:pPr>
+                  <a:lnSpc>
+                    <a:spcPct val="107000"/>
+                  </a:lnSpc>
+                  <a:spcAft>
+                    <a:spcPts val="800"/>
+                  </a:spcAft>
+                </a:pPr>
+                <a14:m>
+                  <m:oMath xmlns:m="http://schemas.openxmlformats.org/officeDocument/2006/math">
+                    <m:d>
+                      <m:dPr>
+                        <m:begChr m:val="{"/>
+                        <m:endChr m:val=""/>
+                        <m:ctrlPr>
+                          <a:rPr lang="en-US" sz="1100" i="1" smtClean="0">
+                            <a:effectLst/>
+                            <a:latin typeface="Cambria Math" panose="02040503050406030204" pitchFamily="18" charset="0"/>
+                            <a:ea typeface="DengXian" panose="02010600030101010101" pitchFamily="2" charset="-122"/>
+                            <a:cs typeface="Times New Roman" panose="02020603050405020304" pitchFamily="18" charset="0"/>
+                          </a:rPr>
+                        </m:ctrlPr>
+                      </m:dPr>
+                      <m:e>
+                        <m:eqArr>
+                          <m:eqArrPr>
+                            <m:ctrlPr>
+                              <a:rPr lang="en-US" sz="1100" i="1">
+                                <a:effectLst/>
+                                <a:latin typeface="Cambria Math" panose="02040503050406030204" pitchFamily="18" charset="0"/>
+                                <a:ea typeface="DengXian" panose="02010600030101010101" pitchFamily="2" charset="-122"/>
+                                <a:cs typeface="Times New Roman" panose="02020603050405020304" pitchFamily="18" charset="0"/>
+                              </a:rPr>
+                            </m:ctrlPr>
+                          </m:eqArrPr>
+                          <m:e>
+                            <m:sSub>
+                              <m:sSubPr>
+                                <m:ctrlPr>
+                                  <a:rPr lang="en-US" sz="1100" i="1">
+                                    <a:effectLst/>
+                                    <a:latin typeface="Cambria Math" panose="02040503050406030204" pitchFamily="18" charset="0"/>
+                                    <a:ea typeface="DengXian" panose="02010600030101010101" pitchFamily="2" charset="-122"/>
+                                    <a:cs typeface="Times New Roman" panose="02020603050405020304" pitchFamily="18" charset="0"/>
+                                  </a:rPr>
+                                </m:ctrlPr>
+                              </m:sSubPr>
+                              <m:e>
+                                <m:r>
+                                  <a:rPr lang="en-US" sz="1100" i="1">
+                                    <a:effectLst/>
+                                    <a:latin typeface="Cambria Math" panose="02040503050406030204" pitchFamily="18" charset="0"/>
+                                    <a:ea typeface="DengXian" panose="02010600030101010101" pitchFamily="2" charset="-122"/>
+                                    <a:cs typeface="Times New Roman" panose="02020603050405020304" pitchFamily="18" charset="0"/>
+                                  </a:rPr>
+                                  <m:t>𝐸</m:t>
+                                </m:r>
+                              </m:e>
+                              <m:sub>
+                                <m:r>
+                                  <a:rPr lang="en-US" sz="1100" i="1">
+                                    <a:effectLst/>
+                                    <a:latin typeface="Cambria Math" panose="02040503050406030204" pitchFamily="18" charset="0"/>
+                                    <a:ea typeface="DengXian" panose="02010600030101010101" pitchFamily="2" charset="-122"/>
+                                    <a:cs typeface="Times New Roman" panose="02020603050405020304" pitchFamily="18" charset="0"/>
+                                  </a:rPr>
+                                  <m:t>1</m:t>
+                                </m:r>
+                              </m:sub>
+                            </m:sSub>
+                            <m:r>
+                              <a:rPr lang="en-US" sz="1100" i="1">
+                                <a:effectLst/>
+                                <a:latin typeface="Cambria Math" panose="02040503050406030204" pitchFamily="18" charset="0"/>
+                                <a:ea typeface="DengXian" panose="02010600030101010101" pitchFamily="2" charset="-122"/>
+                                <a:cs typeface="Times New Roman" panose="02020603050405020304" pitchFamily="18" charset="0"/>
+                              </a:rPr>
+                              <m:t>=</m:t>
+                            </m:r>
+                            <m:r>
+                              <a:rPr lang="en-US" sz="1100" i="1">
+                                <a:effectLst/>
+                                <a:latin typeface="Cambria Math" panose="02040503050406030204" pitchFamily="18" charset="0"/>
+                                <a:ea typeface="DengXian" panose="02010600030101010101" pitchFamily="2" charset="-122"/>
+                                <a:cs typeface="Times New Roman" panose="02020603050405020304" pitchFamily="18" charset="0"/>
+                              </a:rPr>
+                              <m:t>𝑏</m:t>
+                            </m:r>
+                            <m:r>
+                              <a:rPr lang="en-US" sz="1100" i="1">
+                                <a:effectLst/>
+                                <a:latin typeface="Cambria Math" panose="02040503050406030204" pitchFamily="18" charset="0"/>
+                                <a:ea typeface="DengXian" panose="02010600030101010101" pitchFamily="2" charset="-122"/>
+                                <a:cs typeface="Times New Roman" panose="02020603050405020304" pitchFamily="18" charset="0"/>
+                              </a:rPr>
+                              <m:t>+</m:t>
+                            </m:r>
+                            <m:r>
+                              <a:rPr lang="en-US" sz="1100" i="1">
+                                <a:effectLst/>
+                                <a:latin typeface="Cambria Math" panose="02040503050406030204" pitchFamily="18" charset="0"/>
+                                <a:ea typeface="DengXian" panose="02010600030101010101" pitchFamily="2" charset="-122"/>
+                                <a:cs typeface="Times New Roman" panose="02020603050405020304" pitchFamily="18" charset="0"/>
+                              </a:rPr>
+                              <m:t>𝑐</m:t>
+                            </m:r>
+                            <m:r>
+                              <a:rPr lang="en-US" sz="1100" i="1">
+                                <a:effectLst/>
+                                <a:latin typeface="Cambria Math" panose="02040503050406030204" pitchFamily="18" charset="0"/>
+                                <a:ea typeface="DengXian" panose="02010600030101010101" pitchFamily="2" charset="-122"/>
+                                <a:cs typeface="Times New Roman" panose="02020603050405020304" pitchFamily="18" charset="0"/>
+                              </a:rPr>
+                              <m:t>−</m:t>
+                            </m:r>
+                            <m:r>
+                              <a:rPr lang="en-US" sz="1100" i="1">
+                                <a:effectLst/>
+                                <a:latin typeface="Cambria Math" panose="02040503050406030204" pitchFamily="18" charset="0"/>
+                                <a:ea typeface="DengXian" panose="02010600030101010101" pitchFamily="2" charset="-122"/>
+                                <a:cs typeface="Times New Roman" panose="02020603050405020304" pitchFamily="18" charset="0"/>
+                              </a:rPr>
+                              <m:t>𝑎</m:t>
+                            </m:r>
+                          </m:e>
+                          <m:e>
+                            <m:sSub>
+                              <m:sSubPr>
+                                <m:ctrlPr>
+                                  <a:rPr lang="en-US" sz="1100" i="1">
+                                    <a:effectLst/>
+                                    <a:latin typeface="Cambria Math" panose="02040503050406030204" pitchFamily="18" charset="0"/>
+                                    <a:ea typeface="DengXian" panose="02010600030101010101" pitchFamily="2" charset="-122"/>
+                                    <a:cs typeface="Times New Roman" panose="02020603050405020304" pitchFamily="18" charset="0"/>
+                                  </a:rPr>
+                                </m:ctrlPr>
+                              </m:sSubPr>
+                              <m:e>
+                                <m:r>
+                                  <a:rPr lang="en-US" sz="1100" i="1">
+                                    <a:effectLst/>
+                                    <a:latin typeface="Cambria Math" panose="02040503050406030204" pitchFamily="18" charset="0"/>
+                                    <a:ea typeface="DengXian" panose="02010600030101010101" pitchFamily="2" charset="-122"/>
+                                    <a:cs typeface="Times New Roman" panose="02020603050405020304" pitchFamily="18" charset="0"/>
+                                  </a:rPr>
+                                  <m:t>𝐸</m:t>
+                                </m:r>
+                              </m:e>
+                              <m:sub>
+                                <m:r>
+                                  <a:rPr lang="en-US" sz="1100" i="1">
+                                    <a:effectLst/>
+                                    <a:latin typeface="Cambria Math" panose="02040503050406030204" pitchFamily="18" charset="0"/>
+                                    <a:ea typeface="DengXian" panose="02010600030101010101" pitchFamily="2" charset="-122"/>
+                                    <a:cs typeface="Times New Roman" panose="02020603050405020304" pitchFamily="18" charset="0"/>
+                                  </a:rPr>
+                                  <m:t>2</m:t>
+                                </m:r>
+                              </m:sub>
+                            </m:sSub>
+                            <m:r>
+                              <a:rPr lang="en-US" sz="1100" i="1">
+                                <a:effectLst/>
+                                <a:latin typeface="Cambria Math" panose="02040503050406030204" pitchFamily="18" charset="0"/>
+                                <a:ea typeface="DengXian" panose="02010600030101010101" pitchFamily="2" charset="-122"/>
+                                <a:cs typeface="Times New Roman" panose="02020603050405020304" pitchFamily="18" charset="0"/>
+                              </a:rPr>
+                              <m:t>=</m:t>
+                            </m:r>
+                            <m:r>
+                              <a:rPr lang="en-US" sz="1100" i="1">
+                                <a:effectLst/>
+                                <a:latin typeface="Cambria Math" panose="02040503050406030204" pitchFamily="18" charset="0"/>
+                                <a:ea typeface="DengXian" panose="02010600030101010101" pitchFamily="2" charset="-122"/>
+                                <a:cs typeface="Times New Roman" panose="02020603050405020304" pitchFamily="18" charset="0"/>
+                              </a:rPr>
+                              <m:t>𝑐</m:t>
+                            </m:r>
+                            <m:r>
+                              <a:rPr lang="en-US" sz="1100" i="1">
+                                <a:effectLst/>
+                                <a:latin typeface="Cambria Math" panose="02040503050406030204" pitchFamily="18" charset="0"/>
+                                <a:ea typeface="DengXian" panose="02010600030101010101" pitchFamily="2" charset="-122"/>
+                                <a:cs typeface="Times New Roman" panose="02020603050405020304" pitchFamily="18" charset="0"/>
+                              </a:rPr>
+                              <m:t>−</m:t>
+                            </m:r>
+                            <m:r>
+                              <a:rPr lang="en-US" sz="1100" i="1">
+                                <a:effectLst/>
+                                <a:latin typeface="Cambria Math" panose="02040503050406030204" pitchFamily="18" charset="0"/>
+                                <a:ea typeface="DengXian" panose="02010600030101010101" pitchFamily="2" charset="-122"/>
+                                <a:cs typeface="Times New Roman" panose="02020603050405020304" pitchFamily="18" charset="0"/>
+                              </a:rPr>
+                              <m:t>𝑏</m:t>
+                            </m:r>
+                            <m:r>
+                              <a:rPr lang="en-US" sz="1100" i="1">
+                                <a:effectLst/>
+                                <a:latin typeface="Cambria Math" panose="02040503050406030204" pitchFamily="18" charset="0"/>
+                                <a:ea typeface="DengXian" panose="02010600030101010101" pitchFamily="2" charset="-122"/>
+                                <a:cs typeface="Times New Roman" panose="02020603050405020304" pitchFamily="18" charset="0"/>
+                              </a:rPr>
+                              <m:t>        </m:t>
+                            </m:r>
+                          </m:e>
+                          <m:e>
+                            <m:sSub>
+                              <m:sSubPr>
+                                <m:ctrlPr>
+                                  <a:rPr lang="en-US" sz="1100" i="1">
+                                    <a:effectLst/>
+                                    <a:latin typeface="Cambria Math" panose="02040503050406030204" pitchFamily="18" charset="0"/>
+                                    <a:ea typeface="DengXian" panose="02010600030101010101" pitchFamily="2" charset="-122"/>
+                                    <a:cs typeface="Times New Roman" panose="02020603050405020304" pitchFamily="18" charset="0"/>
+                                  </a:rPr>
+                                </m:ctrlPr>
+                              </m:sSubPr>
+                              <m:e>
+                                <m:r>
+                                  <a:rPr lang="en-US" sz="1100" i="1">
+                                    <a:effectLst/>
+                                    <a:latin typeface="Cambria Math" panose="02040503050406030204" pitchFamily="18" charset="0"/>
+                                    <a:ea typeface="DengXian" panose="02010600030101010101" pitchFamily="2" charset="-122"/>
+                                    <a:cs typeface="Times New Roman" panose="02020603050405020304" pitchFamily="18" charset="0"/>
+                                  </a:rPr>
+                                  <m:t>𝐸</m:t>
+                                </m:r>
+                              </m:e>
+                              <m:sub>
+                                <m:r>
+                                  <a:rPr lang="en-US" sz="1100" i="1">
+                                    <a:effectLst/>
+                                    <a:latin typeface="Cambria Math" panose="02040503050406030204" pitchFamily="18" charset="0"/>
+                                    <a:ea typeface="DengXian" panose="02010600030101010101" pitchFamily="2" charset="-122"/>
+                                    <a:cs typeface="Times New Roman" panose="02020603050405020304" pitchFamily="18" charset="0"/>
+                                  </a:rPr>
+                                  <m:t>3</m:t>
+                                </m:r>
+                              </m:sub>
+                            </m:sSub>
+                            <m:r>
+                              <a:rPr lang="en-US" sz="1100" i="1">
+                                <a:effectLst/>
+                                <a:latin typeface="Cambria Math" panose="02040503050406030204" pitchFamily="18" charset="0"/>
+                                <a:ea typeface="DengXian" panose="02010600030101010101" pitchFamily="2" charset="-122"/>
+                                <a:cs typeface="Times New Roman" panose="02020603050405020304" pitchFamily="18" charset="0"/>
+                              </a:rPr>
+                              <m:t>=</m:t>
+                            </m:r>
+                            <m:r>
+                              <a:rPr lang="en-US" sz="1100" i="1">
+                                <a:effectLst/>
+                                <a:latin typeface="Cambria Math" panose="02040503050406030204" pitchFamily="18" charset="0"/>
+                                <a:ea typeface="DengXian" panose="02010600030101010101" pitchFamily="2" charset="-122"/>
+                                <a:cs typeface="Times New Roman" panose="02020603050405020304" pitchFamily="18" charset="0"/>
+                              </a:rPr>
+                              <m:t>𝑏</m:t>
+                            </m:r>
+                            <m:r>
+                              <a:rPr lang="en-US" sz="1100" i="1">
+                                <a:effectLst/>
+                                <a:latin typeface="Cambria Math" panose="02040503050406030204" pitchFamily="18" charset="0"/>
+                                <a:ea typeface="DengXian" panose="02010600030101010101" pitchFamily="2" charset="-122"/>
+                                <a:cs typeface="Times New Roman" panose="02020603050405020304" pitchFamily="18" charset="0"/>
+                              </a:rPr>
+                              <m:t>−</m:t>
+                            </m:r>
+                            <m:r>
+                              <a:rPr lang="en-US" sz="1100" i="1">
+                                <a:effectLst/>
+                                <a:latin typeface="Cambria Math" panose="02040503050406030204" pitchFamily="18" charset="0"/>
+                                <a:ea typeface="DengXian" panose="02010600030101010101" pitchFamily="2" charset="-122"/>
+                                <a:cs typeface="Times New Roman" panose="02020603050405020304" pitchFamily="18" charset="0"/>
+                              </a:rPr>
+                              <m:t>𝑎</m:t>
+                            </m:r>
+                            <m:r>
+                              <a:rPr lang="en-US" sz="1100" i="1">
+                                <a:effectLst/>
+                                <a:latin typeface="Cambria Math" panose="02040503050406030204" pitchFamily="18" charset="0"/>
+                                <a:ea typeface="DengXian" panose="02010600030101010101" pitchFamily="2" charset="-122"/>
+                                <a:cs typeface="Times New Roman" panose="02020603050405020304" pitchFamily="18" charset="0"/>
+                              </a:rPr>
+                              <m:t>−</m:t>
+                            </m:r>
+                            <m:r>
+                              <a:rPr lang="en-US" sz="1100" i="1">
+                                <a:effectLst/>
+                                <a:latin typeface="Cambria Math" panose="02040503050406030204" pitchFamily="18" charset="0"/>
+                                <a:ea typeface="DengXian" panose="02010600030101010101" pitchFamily="2" charset="-122"/>
+                                <a:cs typeface="Times New Roman" panose="02020603050405020304" pitchFamily="18" charset="0"/>
+                              </a:rPr>
+                              <m:t>𝑐</m:t>
+                            </m:r>
+                          </m:e>
+                        </m:eqArr>
+                      </m:e>
+                    </m:d>
+                  </m:oMath>
+                </a14:m>
+                <a:r>
+                  <a:rPr lang="en-US" sz="1100" dirty="0">
+                    <a:effectLst/>
+                    <a:latin typeface="Calibri" panose="020F0502020204030204" pitchFamily="34" charset="0"/>
+                    <a:ea typeface="DengXian" panose="02010600030101010101" pitchFamily="2" charset="-122"/>
+                    <a:cs typeface="Times New Roman" panose="02020603050405020304" pitchFamily="18" charset="0"/>
+                  </a:rPr>
+                  <a:t>  or equivalently    </a:t>
+                </a:r>
+                <a14:m>
+                  <m:oMath xmlns:m="http://schemas.openxmlformats.org/officeDocument/2006/math">
+                    <m:acc>
+                      <m:accPr>
+                        <m:chr m:val="⃗"/>
+                        <m:ctrlPr>
+                          <a:rPr lang="en-US" sz="1100" i="1">
+                            <a:effectLst/>
+                            <a:latin typeface="Cambria Math" panose="02040503050406030204" pitchFamily="18" charset="0"/>
+                            <a:ea typeface="DengXian" panose="02010600030101010101" pitchFamily="2" charset="-122"/>
+                            <a:cs typeface="Times New Roman" panose="02020603050405020304" pitchFamily="18" charset="0"/>
+                          </a:rPr>
+                        </m:ctrlPr>
+                      </m:accPr>
+                      <m:e>
+                        <m:r>
+                          <a:rPr lang="en-US" sz="1100" i="1">
+                            <a:effectLst/>
+                            <a:latin typeface="Cambria Math" panose="02040503050406030204" pitchFamily="18" charset="0"/>
+                            <a:ea typeface="DengXian" panose="02010600030101010101" pitchFamily="2" charset="-122"/>
+                            <a:cs typeface="Times New Roman" panose="02020603050405020304" pitchFamily="18" charset="0"/>
+                          </a:rPr>
+                          <m:t>𝐸</m:t>
+                        </m:r>
+                      </m:e>
+                    </m:acc>
+                    <m:r>
+                      <a:rPr lang="en-US" sz="1100" i="1">
+                        <a:effectLst/>
+                        <a:latin typeface="Cambria Math" panose="02040503050406030204" pitchFamily="18" charset="0"/>
+                        <a:ea typeface="DengXian" panose="02010600030101010101" pitchFamily="2" charset="-122"/>
+                        <a:cs typeface="Times New Roman" panose="02020603050405020304" pitchFamily="18" charset="0"/>
+                      </a:rPr>
+                      <m:t>=</m:t>
+                    </m:r>
+                    <m:r>
+                      <a:rPr lang="en-US" sz="1100" i="1">
+                        <a:effectLst/>
+                        <a:latin typeface="Cambria Math" panose="02040503050406030204" pitchFamily="18" charset="0"/>
+                        <a:ea typeface="DengXian" panose="02010600030101010101" pitchFamily="2" charset="-122"/>
+                        <a:cs typeface="Times New Roman" panose="02020603050405020304" pitchFamily="18" charset="0"/>
+                      </a:rPr>
+                      <m:t>𝑓</m:t>
+                    </m:r>
+                    <m:d>
+                      <m:dPr>
+                        <m:ctrlPr>
+                          <a:rPr lang="en-US" sz="1100" i="1">
+                            <a:effectLst/>
+                            <a:latin typeface="Cambria Math" panose="02040503050406030204" pitchFamily="18" charset="0"/>
+                            <a:ea typeface="DengXian" panose="02010600030101010101" pitchFamily="2" charset="-122"/>
+                            <a:cs typeface="Times New Roman" panose="02020603050405020304" pitchFamily="18" charset="0"/>
+                          </a:rPr>
+                        </m:ctrlPr>
+                      </m:dPr>
+                      <m:e>
+                        <m:r>
+                          <a:rPr lang="en-US" sz="1100" i="1">
+                            <a:effectLst/>
+                            <a:latin typeface="Cambria Math" panose="02040503050406030204" pitchFamily="18" charset="0"/>
+                            <a:ea typeface="DengXian" panose="02010600030101010101" pitchFamily="2" charset="-122"/>
+                            <a:cs typeface="Times New Roman" panose="02020603050405020304" pitchFamily="18" charset="0"/>
+                          </a:rPr>
+                          <m:t>𝑎</m:t>
+                        </m:r>
+                        <m:r>
+                          <a:rPr lang="en-US" sz="1100" i="1">
+                            <a:effectLst/>
+                            <a:latin typeface="Cambria Math" panose="02040503050406030204" pitchFamily="18" charset="0"/>
+                            <a:ea typeface="DengXian" panose="02010600030101010101" pitchFamily="2" charset="-122"/>
+                            <a:cs typeface="Times New Roman" panose="02020603050405020304" pitchFamily="18" charset="0"/>
+                          </a:rPr>
+                          <m:t>, </m:t>
+                        </m:r>
+                        <m:r>
+                          <a:rPr lang="en-US" sz="1100" i="1">
+                            <a:effectLst/>
+                            <a:latin typeface="Cambria Math" panose="02040503050406030204" pitchFamily="18" charset="0"/>
+                            <a:ea typeface="DengXian" panose="02010600030101010101" pitchFamily="2" charset="-122"/>
+                            <a:cs typeface="Times New Roman" panose="02020603050405020304" pitchFamily="18" charset="0"/>
+                          </a:rPr>
+                          <m:t>𝑏</m:t>
+                        </m:r>
+                        <m:r>
+                          <a:rPr lang="en-US" sz="1100" i="1">
+                            <a:effectLst/>
+                            <a:latin typeface="Cambria Math" panose="02040503050406030204" pitchFamily="18" charset="0"/>
+                            <a:ea typeface="DengXian" panose="02010600030101010101" pitchFamily="2" charset="-122"/>
+                            <a:cs typeface="Times New Roman" panose="02020603050405020304" pitchFamily="18" charset="0"/>
+                          </a:rPr>
+                          <m:t>, </m:t>
+                        </m:r>
+                        <m:r>
+                          <a:rPr lang="en-US" sz="1100" i="1">
+                            <a:effectLst/>
+                            <a:latin typeface="Cambria Math" panose="02040503050406030204" pitchFamily="18" charset="0"/>
+                            <a:ea typeface="DengXian" panose="02010600030101010101" pitchFamily="2" charset="-122"/>
+                            <a:cs typeface="Times New Roman" panose="02020603050405020304" pitchFamily="18" charset="0"/>
+                          </a:rPr>
+                          <m:t>𝑐</m:t>
+                        </m:r>
+                      </m:e>
+                    </m:d>
+                  </m:oMath>
+                </a14:m>
+                <a:r>
+                  <a:rPr lang="en-US" sz="1100" dirty="0">
+                    <a:effectLst/>
+                    <a:latin typeface="Calibri" panose="020F0502020204030204" pitchFamily="34" charset="0"/>
+                    <a:ea typeface="DengXian" panose="02010600030101010101" pitchFamily="2" charset="-122"/>
+                    <a:cs typeface="Times New Roman" panose="02020603050405020304" pitchFamily="18" charset="0"/>
+                  </a:rPr>
+                  <a:t>.</a:t>
+                </a:r>
+              </a:p>
+              <a:p>
+                <a:pPr>
+                  <a:lnSpc>
+                    <a:spcPct val="107000"/>
+                  </a:lnSpc>
+                  <a:spcAft>
+                    <a:spcPts val="800"/>
+                  </a:spcAft>
+                </a:pPr>
+                <a:r>
+                  <a:rPr lang="en-US" sz="1100" dirty="0">
+                    <a:effectLst/>
+                    <a:latin typeface="Calibri" panose="020F0502020204030204" pitchFamily="34" charset="0"/>
+                    <a:ea typeface="DengXian" panose="02010600030101010101" pitchFamily="2" charset="-122"/>
+                    <a:cs typeface="Times New Roman" panose="02020603050405020304" pitchFamily="18" charset="0"/>
+                  </a:rPr>
+                  <a:t>To solve for this system of equations, we simply need to make </a:t>
+                </a:r>
+                <a14:m>
+                  <m:oMath xmlns:m="http://schemas.openxmlformats.org/officeDocument/2006/math">
+                    <m:acc>
+                      <m:accPr>
+                        <m:chr m:val="⃗"/>
+                        <m:ctrlPr>
+                          <a:rPr lang="en-US" sz="1100" i="1">
+                            <a:effectLst/>
+                            <a:latin typeface="Cambria Math" panose="02040503050406030204" pitchFamily="18" charset="0"/>
+                            <a:ea typeface="DengXian" panose="02010600030101010101" pitchFamily="2" charset="-122"/>
+                            <a:cs typeface="Times New Roman" panose="02020603050405020304" pitchFamily="18" charset="0"/>
+                          </a:rPr>
+                        </m:ctrlPr>
+                      </m:accPr>
+                      <m:e>
+                        <m:r>
+                          <a:rPr lang="en-US" sz="1100" i="1">
+                            <a:effectLst/>
+                            <a:latin typeface="Cambria Math" panose="02040503050406030204" pitchFamily="18" charset="0"/>
+                            <a:ea typeface="DengXian" panose="02010600030101010101" pitchFamily="2" charset="-122"/>
+                            <a:cs typeface="Times New Roman" panose="02020603050405020304" pitchFamily="18" charset="0"/>
+                          </a:rPr>
+                          <m:t>𝐸</m:t>
+                        </m:r>
+                      </m:e>
+                    </m:acc>
+                  </m:oMath>
+                </a14:m>
+                <a:r>
+                  <a:rPr lang="en-US" sz="1100" dirty="0">
+                    <a:effectLst/>
+                    <a:latin typeface="Calibri" panose="020F0502020204030204" pitchFamily="34" charset="0"/>
+                    <a:ea typeface="DengXian" panose="02010600030101010101" pitchFamily="2" charset="-122"/>
+                    <a:cs typeface="Times New Roman" panose="02020603050405020304" pitchFamily="18" charset="0"/>
+                  </a:rPr>
+                  <a:t> go to zero. So, we take</a:t>
+                </a:r>
+              </a:p>
+              <a:p>
+                <a:pPr>
+                  <a:lnSpc>
+                    <a:spcPct val="107000"/>
+                  </a:lnSpc>
+                  <a:spcAft>
+                    <a:spcPts val="800"/>
+                  </a:spcAft>
+                </a:pPr>
+                <a14:m>
+                  <m:oMathPara xmlns:m="http://schemas.openxmlformats.org/officeDocument/2006/math">
+                    <m:oMathParaPr>
+                      <m:jc m:val="centerGroup"/>
+                    </m:oMathParaPr>
+                    <m:oMath xmlns:m="http://schemas.openxmlformats.org/officeDocument/2006/math">
+                      <m:r>
+                        <m:rPr>
+                          <m:sty m:val="p"/>
+                        </m:rPr>
+                        <a:rPr lang="en-US" sz="1100">
+                          <a:effectLst/>
+                          <a:latin typeface="Cambria Math" panose="02040503050406030204" pitchFamily="18" charset="0"/>
+                          <a:ea typeface="DengXian" panose="02010600030101010101" pitchFamily="2" charset="-122"/>
+                          <a:cs typeface="Times New Roman" panose="02020603050405020304" pitchFamily="18" charset="0"/>
+                        </a:rPr>
+                        <m:t>∇</m:t>
+                      </m:r>
+                      <m:r>
+                        <a:rPr lang="en-US" sz="1100" i="1">
+                          <a:effectLst/>
+                          <a:latin typeface="Cambria Math" panose="02040503050406030204" pitchFamily="18" charset="0"/>
+                          <a:ea typeface="DengXian" panose="02010600030101010101" pitchFamily="2" charset="-122"/>
+                          <a:cs typeface="Times New Roman" panose="02020603050405020304" pitchFamily="18" charset="0"/>
+                        </a:rPr>
+                        <m:t>𝑓</m:t>
+                      </m:r>
+                      <m:r>
+                        <a:rPr lang="en-US" sz="1100" i="1">
+                          <a:effectLst/>
+                          <a:latin typeface="Cambria Math" panose="02040503050406030204" pitchFamily="18" charset="0"/>
+                          <a:ea typeface="DengXian" panose="02010600030101010101" pitchFamily="2" charset="-122"/>
+                          <a:cs typeface="Times New Roman" panose="02020603050405020304" pitchFamily="18" charset="0"/>
+                        </a:rPr>
+                        <m:t>=</m:t>
+                      </m:r>
+                      <m:d>
+                        <m:dPr>
+                          <m:ctrlPr>
+                            <a:rPr lang="en-US" sz="1100" i="1">
+                              <a:effectLst/>
+                              <a:latin typeface="Cambria Math" panose="02040503050406030204" pitchFamily="18" charset="0"/>
+                              <a:ea typeface="DengXian" panose="02010600030101010101" pitchFamily="2" charset="-122"/>
+                              <a:cs typeface="Times New Roman" panose="02020603050405020304" pitchFamily="18" charset="0"/>
+                            </a:rPr>
+                          </m:ctrlPr>
+                        </m:dPr>
+                        <m:e>
+                          <m:m>
+                            <m:mPr>
+                              <m:mcs>
+                                <m:mc>
+                                  <m:mcPr>
+                                    <m:count m:val="3"/>
+                                    <m:mcJc m:val="center"/>
+                                  </m:mcPr>
+                                </m:mc>
+                              </m:mcs>
+                              <m:ctrlPr>
+                                <a:rPr lang="en-US" sz="1100" i="1">
+                                  <a:effectLst/>
+                                  <a:latin typeface="Cambria Math" panose="02040503050406030204" pitchFamily="18" charset="0"/>
+                                  <a:ea typeface="DengXian" panose="02010600030101010101" pitchFamily="2" charset="-122"/>
+                                  <a:cs typeface="Times New Roman" panose="02020603050405020304" pitchFamily="18" charset="0"/>
+                                </a:rPr>
+                              </m:ctrlPr>
+                            </m:mPr>
+                            <m:mr>
+                              <m:e>
+                                <m:f>
+                                  <m:fPr>
+                                    <m:ctrlPr>
+                                      <a:rPr lang="en-US" sz="1100" i="1">
+                                        <a:effectLst/>
+                                        <a:latin typeface="Cambria Math" panose="02040503050406030204" pitchFamily="18" charset="0"/>
+                                        <a:ea typeface="DengXian" panose="02010600030101010101" pitchFamily="2" charset="-122"/>
+                                        <a:cs typeface="Times New Roman" panose="02020603050405020304" pitchFamily="18" charset="0"/>
+                                      </a:rPr>
+                                    </m:ctrlPr>
+                                  </m:fPr>
+                                  <m:num>
+                                    <m:r>
+                                      <a:rPr lang="en-US" sz="1100" i="1">
+                                        <a:effectLst/>
+                                        <a:latin typeface="Cambria Math" panose="02040503050406030204" pitchFamily="18" charset="0"/>
+                                        <a:ea typeface="DengXian" panose="02010600030101010101" pitchFamily="2" charset="-122"/>
+                                        <a:cs typeface="Times New Roman" panose="02020603050405020304" pitchFamily="18" charset="0"/>
+                                      </a:rPr>
+                                      <m:t>𝜕</m:t>
+                                    </m:r>
+                                    <m:sSub>
+                                      <m:sSubPr>
+                                        <m:ctrlPr>
+                                          <a:rPr lang="en-US" sz="1100" i="1">
+                                            <a:effectLst/>
+                                            <a:latin typeface="Cambria Math" panose="02040503050406030204" pitchFamily="18" charset="0"/>
+                                            <a:ea typeface="DengXian" panose="02010600030101010101" pitchFamily="2" charset="-122"/>
+                                            <a:cs typeface="Times New Roman" panose="02020603050405020304" pitchFamily="18" charset="0"/>
+                                          </a:rPr>
+                                        </m:ctrlPr>
+                                      </m:sSubPr>
+                                      <m:e>
+                                        <m:r>
+                                          <a:rPr lang="en-US" sz="1100" i="1">
+                                            <a:effectLst/>
+                                            <a:latin typeface="Cambria Math" panose="02040503050406030204" pitchFamily="18" charset="0"/>
+                                            <a:ea typeface="DengXian" panose="02010600030101010101" pitchFamily="2" charset="-122"/>
+                                            <a:cs typeface="Times New Roman" panose="02020603050405020304" pitchFamily="18" charset="0"/>
+                                          </a:rPr>
+                                          <m:t>𝐸</m:t>
+                                        </m:r>
+                                      </m:e>
+                                      <m:sub>
+                                        <m:r>
+                                          <a:rPr lang="en-US" sz="1100" i="1">
+                                            <a:effectLst/>
+                                            <a:latin typeface="Cambria Math" panose="02040503050406030204" pitchFamily="18" charset="0"/>
+                                            <a:ea typeface="DengXian" panose="02010600030101010101" pitchFamily="2" charset="-122"/>
+                                            <a:cs typeface="Times New Roman" panose="02020603050405020304" pitchFamily="18" charset="0"/>
+                                          </a:rPr>
+                                          <m:t>1</m:t>
+                                        </m:r>
+                                      </m:sub>
+                                    </m:sSub>
+                                  </m:num>
+                                  <m:den>
+                                    <m:r>
+                                      <a:rPr lang="en-US" sz="1100" i="1">
+                                        <a:effectLst/>
+                                        <a:latin typeface="Cambria Math" panose="02040503050406030204" pitchFamily="18" charset="0"/>
+                                        <a:ea typeface="DengXian" panose="02010600030101010101" pitchFamily="2" charset="-122"/>
+                                        <a:cs typeface="Times New Roman" panose="02020603050405020304" pitchFamily="18" charset="0"/>
+                                      </a:rPr>
+                                      <m:t>𝜕</m:t>
+                                    </m:r>
+                                    <m:r>
+                                      <a:rPr lang="en-US" sz="1100" i="1">
+                                        <a:effectLst/>
+                                        <a:latin typeface="Cambria Math" panose="02040503050406030204" pitchFamily="18" charset="0"/>
+                                        <a:ea typeface="DengXian" panose="02010600030101010101" pitchFamily="2" charset="-122"/>
+                                        <a:cs typeface="Times New Roman" panose="02020603050405020304" pitchFamily="18" charset="0"/>
+                                      </a:rPr>
+                                      <m:t>𝑎</m:t>
+                                    </m:r>
+                                  </m:den>
+                                </m:f>
+                              </m:e>
+                              <m:e>
+                                <m:f>
+                                  <m:fPr>
+                                    <m:ctrlPr>
+                                      <a:rPr lang="en-US" sz="1100" i="1">
+                                        <a:effectLst/>
+                                        <a:latin typeface="Cambria Math" panose="02040503050406030204" pitchFamily="18" charset="0"/>
+                                        <a:ea typeface="DengXian" panose="02010600030101010101" pitchFamily="2" charset="-122"/>
+                                        <a:cs typeface="Times New Roman" panose="02020603050405020304" pitchFamily="18" charset="0"/>
+                                      </a:rPr>
+                                    </m:ctrlPr>
+                                  </m:fPr>
+                                  <m:num>
+                                    <m:r>
+                                      <a:rPr lang="en-US" sz="1100" i="1">
+                                        <a:effectLst/>
+                                        <a:latin typeface="Cambria Math" panose="02040503050406030204" pitchFamily="18" charset="0"/>
+                                        <a:ea typeface="DengXian" panose="02010600030101010101" pitchFamily="2" charset="-122"/>
+                                        <a:cs typeface="Times New Roman" panose="02020603050405020304" pitchFamily="18" charset="0"/>
+                                      </a:rPr>
+                                      <m:t>𝜕</m:t>
+                                    </m:r>
+                                    <m:sSub>
+                                      <m:sSubPr>
+                                        <m:ctrlPr>
+                                          <a:rPr lang="en-US" sz="1100" i="1">
+                                            <a:effectLst/>
+                                            <a:latin typeface="Cambria Math" panose="02040503050406030204" pitchFamily="18" charset="0"/>
+                                            <a:ea typeface="DengXian" panose="02010600030101010101" pitchFamily="2" charset="-122"/>
+                                            <a:cs typeface="Times New Roman" panose="02020603050405020304" pitchFamily="18" charset="0"/>
+                                          </a:rPr>
+                                        </m:ctrlPr>
+                                      </m:sSubPr>
+                                      <m:e>
+                                        <m:r>
+                                          <a:rPr lang="en-US" sz="1100" i="1">
+                                            <a:effectLst/>
+                                            <a:latin typeface="Cambria Math" panose="02040503050406030204" pitchFamily="18" charset="0"/>
+                                            <a:ea typeface="DengXian" panose="02010600030101010101" pitchFamily="2" charset="-122"/>
+                                            <a:cs typeface="Times New Roman" panose="02020603050405020304" pitchFamily="18" charset="0"/>
+                                          </a:rPr>
+                                          <m:t>𝐸</m:t>
+                                        </m:r>
+                                      </m:e>
+                                      <m:sub>
+                                        <m:r>
+                                          <a:rPr lang="en-US" sz="1100" i="1">
+                                            <a:effectLst/>
+                                            <a:latin typeface="Cambria Math" panose="02040503050406030204" pitchFamily="18" charset="0"/>
+                                            <a:ea typeface="DengXian" panose="02010600030101010101" pitchFamily="2" charset="-122"/>
+                                            <a:cs typeface="Times New Roman" panose="02020603050405020304" pitchFamily="18" charset="0"/>
+                                          </a:rPr>
+                                          <m:t>2</m:t>
+                                        </m:r>
+                                      </m:sub>
+                                    </m:sSub>
+                                  </m:num>
+                                  <m:den>
+                                    <m:r>
+                                      <a:rPr lang="en-US" sz="1100" i="1">
+                                        <a:effectLst/>
+                                        <a:latin typeface="Cambria Math" panose="02040503050406030204" pitchFamily="18" charset="0"/>
+                                        <a:ea typeface="DengXian" panose="02010600030101010101" pitchFamily="2" charset="-122"/>
+                                        <a:cs typeface="Times New Roman" panose="02020603050405020304" pitchFamily="18" charset="0"/>
+                                      </a:rPr>
+                                      <m:t>𝜕</m:t>
+                                    </m:r>
+                                    <m:r>
+                                      <a:rPr lang="en-US" sz="1100" i="1">
+                                        <a:effectLst/>
+                                        <a:latin typeface="Cambria Math" panose="02040503050406030204" pitchFamily="18" charset="0"/>
+                                        <a:ea typeface="DengXian" panose="02010600030101010101" pitchFamily="2" charset="-122"/>
+                                        <a:cs typeface="Times New Roman" panose="02020603050405020304" pitchFamily="18" charset="0"/>
+                                      </a:rPr>
+                                      <m:t>𝑎</m:t>
+                                    </m:r>
+                                  </m:den>
+                                </m:f>
+                              </m:e>
+                              <m:e>
+                                <m:f>
+                                  <m:fPr>
+                                    <m:ctrlPr>
+                                      <a:rPr lang="en-US" sz="1100" i="1">
+                                        <a:effectLst/>
+                                        <a:latin typeface="Cambria Math" panose="02040503050406030204" pitchFamily="18" charset="0"/>
+                                        <a:ea typeface="DengXian" panose="02010600030101010101" pitchFamily="2" charset="-122"/>
+                                        <a:cs typeface="Times New Roman" panose="02020603050405020304" pitchFamily="18" charset="0"/>
+                                      </a:rPr>
+                                    </m:ctrlPr>
+                                  </m:fPr>
+                                  <m:num>
+                                    <m:r>
+                                      <a:rPr lang="en-US" sz="1100" i="1">
+                                        <a:effectLst/>
+                                        <a:latin typeface="Cambria Math" panose="02040503050406030204" pitchFamily="18" charset="0"/>
+                                        <a:ea typeface="DengXian" panose="02010600030101010101" pitchFamily="2" charset="-122"/>
+                                        <a:cs typeface="Times New Roman" panose="02020603050405020304" pitchFamily="18" charset="0"/>
+                                      </a:rPr>
+                                      <m:t>𝜕</m:t>
+                                    </m:r>
+                                    <m:sSub>
+                                      <m:sSubPr>
+                                        <m:ctrlPr>
+                                          <a:rPr lang="en-US" sz="1100" i="1">
+                                            <a:effectLst/>
+                                            <a:latin typeface="Cambria Math" panose="02040503050406030204" pitchFamily="18" charset="0"/>
+                                            <a:ea typeface="DengXian" panose="02010600030101010101" pitchFamily="2" charset="-122"/>
+                                            <a:cs typeface="Times New Roman" panose="02020603050405020304" pitchFamily="18" charset="0"/>
+                                          </a:rPr>
+                                        </m:ctrlPr>
+                                      </m:sSubPr>
+                                      <m:e>
+                                        <m:r>
+                                          <a:rPr lang="en-US" sz="1100" i="1">
+                                            <a:effectLst/>
+                                            <a:latin typeface="Cambria Math" panose="02040503050406030204" pitchFamily="18" charset="0"/>
+                                            <a:ea typeface="DengXian" panose="02010600030101010101" pitchFamily="2" charset="-122"/>
+                                            <a:cs typeface="Times New Roman" panose="02020603050405020304" pitchFamily="18" charset="0"/>
+                                          </a:rPr>
+                                          <m:t>𝐸</m:t>
+                                        </m:r>
+                                      </m:e>
+                                      <m:sub>
+                                        <m:r>
+                                          <a:rPr lang="en-US" sz="1100" i="1">
+                                            <a:effectLst/>
+                                            <a:latin typeface="Cambria Math" panose="02040503050406030204" pitchFamily="18" charset="0"/>
+                                            <a:ea typeface="DengXian" panose="02010600030101010101" pitchFamily="2" charset="-122"/>
+                                            <a:cs typeface="Times New Roman" panose="02020603050405020304" pitchFamily="18" charset="0"/>
+                                          </a:rPr>
+                                          <m:t>3</m:t>
+                                        </m:r>
+                                      </m:sub>
+                                    </m:sSub>
+                                  </m:num>
+                                  <m:den>
+                                    <m:r>
+                                      <a:rPr lang="en-US" sz="1100" i="1">
+                                        <a:effectLst/>
+                                        <a:latin typeface="Cambria Math" panose="02040503050406030204" pitchFamily="18" charset="0"/>
+                                        <a:ea typeface="DengXian" panose="02010600030101010101" pitchFamily="2" charset="-122"/>
+                                        <a:cs typeface="Times New Roman" panose="02020603050405020304" pitchFamily="18" charset="0"/>
+                                      </a:rPr>
+                                      <m:t>𝜕</m:t>
+                                    </m:r>
+                                    <m:r>
+                                      <a:rPr lang="en-US" sz="1100" i="1">
+                                        <a:effectLst/>
+                                        <a:latin typeface="Cambria Math" panose="02040503050406030204" pitchFamily="18" charset="0"/>
+                                        <a:ea typeface="DengXian" panose="02010600030101010101" pitchFamily="2" charset="-122"/>
+                                        <a:cs typeface="Times New Roman" panose="02020603050405020304" pitchFamily="18" charset="0"/>
+                                      </a:rPr>
+                                      <m:t>𝑎</m:t>
+                                    </m:r>
+                                  </m:den>
+                                </m:f>
+                              </m:e>
+                            </m:mr>
+                            <m:mr>
+                              <m:e>
+                                <m:f>
+                                  <m:fPr>
+                                    <m:ctrlPr>
+                                      <a:rPr lang="en-US" sz="1100" i="1">
+                                        <a:effectLst/>
+                                        <a:latin typeface="Cambria Math" panose="02040503050406030204" pitchFamily="18" charset="0"/>
+                                        <a:ea typeface="DengXian" panose="02010600030101010101" pitchFamily="2" charset="-122"/>
+                                        <a:cs typeface="Times New Roman" panose="02020603050405020304" pitchFamily="18" charset="0"/>
+                                      </a:rPr>
+                                    </m:ctrlPr>
+                                  </m:fPr>
+                                  <m:num>
+                                    <m:r>
+                                      <a:rPr lang="en-US" sz="1100" i="1">
+                                        <a:effectLst/>
+                                        <a:latin typeface="Cambria Math" panose="02040503050406030204" pitchFamily="18" charset="0"/>
+                                        <a:ea typeface="DengXian" panose="02010600030101010101" pitchFamily="2" charset="-122"/>
+                                        <a:cs typeface="Times New Roman" panose="02020603050405020304" pitchFamily="18" charset="0"/>
+                                      </a:rPr>
+                                      <m:t>𝜕</m:t>
+                                    </m:r>
+                                    <m:sSub>
+                                      <m:sSubPr>
+                                        <m:ctrlPr>
+                                          <a:rPr lang="en-US" sz="1100" i="1">
+                                            <a:effectLst/>
+                                            <a:latin typeface="Cambria Math" panose="02040503050406030204" pitchFamily="18" charset="0"/>
+                                            <a:ea typeface="DengXian" panose="02010600030101010101" pitchFamily="2" charset="-122"/>
+                                            <a:cs typeface="Times New Roman" panose="02020603050405020304" pitchFamily="18" charset="0"/>
+                                          </a:rPr>
+                                        </m:ctrlPr>
+                                      </m:sSubPr>
+                                      <m:e>
+                                        <m:r>
+                                          <a:rPr lang="en-US" sz="1100" i="1">
+                                            <a:effectLst/>
+                                            <a:latin typeface="Cambria Math" panose="02040503050406030204" pitchFamily="18" charset="0"/>
+                                            <a:ea typeface="DengXian" panose="02010600030101010101" pitchFamily="2" charset="-122"/>
+                                            <a:cs typeface="Times New Roman" panose="02020603050405020304" pitchFamily="18" charset="0"/>
+                                          </a:rPr>
+                                          <m:t>𝐸</m:t>
+                                        </m:r>
+                                      </m:e>
+                                      <m:sub>
+                                        <m:r>
+                                          <a:rPr lang="en-US" sz="1100" i="1">
+                                            <a:effectLst/>
+                                            <a:latin typeface="Cambria Math" panose="02040503050406030204" pitchFamily="18" charset="0"/>
+                                            <a:ea typeface="DengXian" panose="02010600030101010101" pitchFamily="2" charset="-122"/>
+                                            <a:cs typeface="Times New Roman" panose="02020603050405020304" pitchFamily="18" charset="0"/>
+                                          </a:rPr>
+                                          <m:t>1</m:t>
+                                        </m:r>
+                                      </m:sub>
+                                    </m:sSub>
+                                  </m:num>
+                                  <m:den>
+                                    <m:r>
+                                      <a:rPr lang="en-US" sz="1100" i="1">
+                                        <a:effectLst/>
+                                        <a:latin typeface="Cambria Math" panose="02040503050406030204" pitchFamily="18" charset="0"/>
+                                        <a:ea typeface="DengXian" panose="02010600030101010101" pitchFamily="2" charset="-122"/>
+                                        <a:cs typeface="Times New Roman" panose="02020603050405020304" pitchFamily="18" charset="0"/>
+                                      </a:rPr>
+                                      <m:t>𝜕</m:t>
+                                    </m:r>
+                                    <m:r>
+                                      <a:rPr lang="en-US" sz="1100" i="1">
+                                        <a:effectLst/>
+                                        <a:latin typeface="Cambria Math" panose="02040503050406030204" pitchFamily="18" charset="0"/>
+                                        <a:ea typeface="DengXian" panose="02010600030101010101" pitchFamily="2" charset="-122"/>
+                                        <a:cs typeface="Times New Roman" panose="02020603050405020304" pitchFamily="18" charset="0"/>
+                                      </a:rPr>
+                                      <m:t>𝑏</m:t>
+                                    </m:r>
+                                  </m:den>
+                                </m:f>
+                              </m:e>
+                              <m:e>
+                                <m:f>
+                                  <m:fPr>
+                                    <m:ctrlPr>
+                                      <a:rPr lang="en-US" sz="1100" i="1">
+                                        <a:effectLst/>
+                                        <a:latin typeface="Cambria Math" panose="02040503050406030204" pitchFamily="18" charset="0"/>
+                                        <a:ea typeface="DengXian" panose="02010600030101010101" pitchFamily="2" charset="-122"/>
+                                        <a:cs typeface="Times New Roman" panose="02020603050405020304" pitchFamily="18" charset="0"/>
+                                      </a:rPr>
+                                    </m:ctrlPr>
+                                  </m:fPr>
+                                  <m:num>
+                                    <m:r>
+                                      <a:rPr lang="en-US" sz="1100" i="1">
+                                        <a:effectLst/>
+                                        <a:latin typeface="Cambria Math" panose="02040503050406030204" pitchFamily="18" charset="0"/>
+                                        <a:ea typeface="DengXian" panose="02010600030101010101" pitchFamily="2" charset="-122"/>
+                                        <a:cs typeface="Times New Roman" panose="02020603050405020304" pitchFamily="18" charset="0"/>
+                                      </a:rPr>
+                                      <m:t>𝜕</m:t>
+                                    </m:r>
+                                    <m:sSub>
+                                      <m:sSubPr>
+                                        <m:ctrlPr>
+                                          <a:rPr lang="en-US" sz="1100" i="1">
+                                            <a:effectLst/>
+                                            <a:latin typeface="Cambria Math" panose="02040503050406030204" pitchFamily="18" charset="0"/>
+                                            <a:ea typeface="DengXian" panose="02010600030101010101" pitchFamily="2" charset="-122"/>
+                                            <a:cs typeface="Times New Roman" panose="02020603050405020304" pitchFamily="18" charset="0"/>
+                                          </a:rPr>
+                                        </m:ctrlPr>
+                                      </m:sSubPr>
+                                      <m:e>
+                                        <m:r>
+                                          <a:rPr lang="en-US" sz="1100" i="1">
+                                            <a:effectLst/>
+                                            <a:latin typeface="Cambria Math" panose="02040503050406030204" pitchFamily="18" charset="0"/>
+                                            <a:ea typeface="DengXian" panose="02010600030101010101" pitchFamily="2" charset="-122"/>
+                                            <a:cs typeface="Times New Roman" panose="02020603050405020304" pitchFamily="18" charset="0"/>
+                                          </a:rPr>
+                                          <m:t>𝐸</m:t>
+                                        </m:r>
+                                      </m:e>
+                                      <m:sub>
+                                        <m:r>
+                                          <a:rPr lang="en-US" sz="1100" i="1">
+                                            <a:effectLst/>
+                                            <a:latin typeface="Cambria Math" panose="02040503050406030204" pitchFamily="18" charset="0"/>
+                                            <a:ea typeface="DengXian" panose="02010600030101010101" pitchFamily="2" charset="-122"/>
+                                            <a:cs typeface="Times New Roman" panose="02020603050405020304" pitchFamily="18" charset="0"/>
+                                          </a:rPr>
+                                          <m:t>2</m:t>
+                                        </m:r>
+                                      </m:sub>
+                                    </m:sSub>
+                                  </m:num>
+                                  <m:den>
+                                    <m:r>
+                                      <a:rPr lang="en-US" sz="1100" i="1">
+                                        <a:effectLst/>
+                                        <a:latin typeface="Cambria Math" panose="02040503050406030204" pitchFamily="18" charset="0"/>
+                                        <a:ea typeface="DengXian" panose="02010600030101010101" pitchFamily="2" charset="-122"/>
+                                        <a:cs typeface="Times New Roman" panose="02020603050405020304" pitchFamily="18" charset="0"/>
+                                      </a:rPr>
+                                      <m:t>𝜕</m:t>
+                                    </m:r>
+                                    <m:r>
+                                      <a:rPr lang="en-US" sz="1100" i="1">
+                                        <a:effectLst/>
+                                        <a:latin typeface="Cambria Math" panose="02040503050406030204" pitchFamily="18" charset="0"/>
+                                        <a:ea typeface="DengXian" panose="02010600030101010101" pitchFamily="2" charset="-122"/>
+                                        <a:cs typeface="Times New Roman" panose="02020603050405020304" pitchFamily="18" charset="0"/>
+                                      </a:rPr>
+                                      <m:t>𝑏</m:t>
+                                    </m:r>
+                                  </m:den>
+                                </m:f>
+                              </m:e>
+                              <m:e>
+                                <m:f>
+                                  <m:fPr>
+                                    <m:ctrlPr>
+                                      <a:rPr lang="en-US" sz="1100" i="1">
+                                        <a:effectLst/>
+                                        <a:latin typeface="Cambria Math" panose="02040503050406030204" pitchFamily="18" charset="0"/>
+                                        <a:ea typeface="DengXian" panose="02010600030101010101" pitchFamily="2" charset="-122"/>
+                                        <a:cs typeface="Times New Roman" panose="02020603050405020304" pitchFamily="18" charset="0"/>
+                                      </a:rPr>
+                                    </m:ctrlPr>
+                                  </m:fPr>
+                                  <m:num>
+                                    <m:r>
+                                      <a:rPr lang="en-US" sz="1100" i="1">
+                                        <a:effectLst/>
+                                        <a:latin typeface="Cambria Math" panose="02040503050406030204" pitchFamily="18" charset="0"/>
+                                        <a:ea typeface="DengXian" panose="02010600030101010101" pitchFamily="2" charset="-122"/>
+                                        <a:cs typeface="Times New Roman" panose="02020603050405020304" pitchFamily="18" charset="0"/>
+                                      </a:rPr>
+                                      <m:t>𝜕</m:t>
+                                    </m:r>
+                                    <m:sSub>
+                                      <m:sSubPr>
+                                        <m:ctrlPr>
+                                          <a:rPr lang="en-US" sz="1100" i="1">
+                                            <a:effectLst/>
+                                            <a:latin typeface="Cambria Math" panose="02040503050406030204" pitchFamily="18" charset="0"/>
+                                            <a:ea typeface="DengXian" panose="02010600030101010101" pitchFamily="2" charset="-122"/>
+                                            <a:cs typeface="Times New Roman" panose="02020603050405020304" pitchFamily="18" charset="0"/>
+                                          </a:rPr>
+                                        </m:ctrlPr>
+                                      </m:sSubPr>
+                                      <m:e>
+                                        <m:r>
+                                          <a:rPr lang="en-US" sz="1100" i="1">
+                                            <a:effectLst/>
+                                            <a:latin typeface="Cambria Math" panose="02040503050406030204" pitchFamily="18" charset="0"/>
+                                            <a:ea typeface="DengXian" panose="02010600030101010101" pitchFamily="2" charset="-122"/>
+                                            <a:cs typeface="Times New Roman" panose="02020603050405020304" pitchFamily="18" charset="0"/>
+                                          </a:rPr>
+                                          <m:t>𝐸</m:t>
+                                        </m:r>
+                                      </m:e>
+                                      <m:sub>
+                                        <m:r>
+                                          <a:rPr lang="en-US" sz="1100" i="1">
+                                            <a:effectLst/>
+                                            <a:latin typeface="Cambria Math" panose="02040503050406030204" pitchFamily="18" charset="0"/>
+                                            <a:ea typeface="DengXian" panose="02010600030101010101" pitchFamily="2" charset="-122"/>
+                                            <a:cs typeface="Times New Roman" panose="02020603050405020304" pitchFamily="18" charset="0"/>
+                                          </a:rPr>
+                                          <m:t>3</m:t>
+                                        </m:r>
+                                      </m:sub>
+                                    </m:sSub>
+                                  </m:num>
+                                  <m:den>
+                                    <m:r>
+                                      <a:rPr lang="en-US" sz="1100" i="1">
+                                        <a:effectLst/>
+                                        <a:latin typeface="Cambria Math" panose="02040503050406030204" pitchFamily="18" charset="0"/>
+                                        <a:ea typeface="DengXian" panose="02010600030101010101" pitchFamily="2" charset="-122"/>
+                                        <a:cs typeface="Times New Roman" panose="02020603050405020304" pitchFamily="18" charset="0"/>
+                                      </a:rPr>
+                                      <m:t>𝜕</m:t>
+                                    </m:r>
+                                    <m:r>
+                                      <a:rPr lang="en-US" sz="1100" i="1">
+                                        <a:effectLst/>
+                                        <a:latin typeface="Cambria Math" panose="02040503050406030204" pitchFamily="18" charset="0"/>
+                                        <a:ea typeface="DengXian" panose="02010600030101010101" pitchFamily="2" charset="-122"/>
+                                        <a:cs typeface="Times New Roman" panose="02020603050405020304" pitchFamily="18" charset="0"/>
+                                      </a:rPr>
+                                      <m:t>𝑏</m:t>
+                                    </m:r>
+                                  </m:den>
+                                </m:f>
+                              </m:e>
+                            </m:mr>
+                            <m:mr>
+                              <m:e>
+                                <m:f>
+                                  <m:fPr>
+                                    <m:ctrlPr>
+                                      <a:rPr lang="en-US" sz="1100" i="1">
+                                        <a:effectLst/>
+                                        <a:latin typeface="Cambria Math" panose="02040503050406030204" pitchFamily="18" charset="0"/>
+                                        <a:ea typeface="DengXian" panose="02010600030101010101" pitchFamily="2" charset="-122"/>
+                                        <a:cs typeface="Times New Roman" panose="02020603050405020304" pitchFamily="18" charset="0"/>
+                                      </a:rPr>
+                                    </m:ctrlPr>
+                                  </m:fPr>
+                                  <m:num>
+                                    <m:r>
+                                      <a:rPr lang="en-US" sz="1100" i="1">
+                                        <a:effectLst/>
+                                        <a:latin typeface="Cambria Math" panose="02040503050406030204" pitchFamily="18" charset="0"/>
+                                        <a:ea typeface="DengXian" panose="02010600030101010101" pitchFamily="2" charset="-122"/>
+                                        <a:cs typeface="Times New Roman" panose="02020603050405020304" pitchFamily="18" charset="0"/>
+                                      </a:rPr>
+                                      <m:t>𝜕</m:t>
+                                    </m:r>
+                                    <m:sSub>
+                                      <m:sSubPr>
+                                        <m:ctrlPr>
+                                          <a:rPr lang="en-US" sz="1100" i="1">
+                                            <a:effectLst/>
+                                            <a:latin typeface="Cambria Math" panose="02040503050406030204" pitchFamily="18" charset="0"/>
+                                            <a:ea typeface="DengXian" panose="02010600030101010101" pitchFamily="2" charset="-122"/>
+                                            <a:cs typeface="Times New Roman" panose="02020603050405020304" pitchFamily="18" charset="0"/>
+                                          </a:rPr>
+                                        </m:ctrlPr>
+                                      </m:sSubPr>
+                                      <m:e>
+                                        <m:r>
+                                          <a:rPr lang="en-US" sz="1100" i="1">
+                                            <a:effectLst/>
+                                            <a:latin typeface="Cambria Math" panose="02040503050406030204" pitchFamily="18" charset="0"/>
+                                            <a:ea typeface="DengXian" panose="02010600030101010101" pitchFamily="2" charset="-122"/>
+                                            <a:cs typeface="Times New Roman" panose="02020603050405020304" pitchFamily="18" charset="0"/>
+                                          </a:rPr>
+                                          <m:t>𝐸</m:t>
+                                        </m:r>
+                                      </m:e>
+                                      <m:sub>
+                                        <m:r>
+                                          <a:rPr lang="en-US" sz="1100" i="1">
+                                            <a:effectLst/>
+                                            <a:latin typeface="Cambria Math" panose="02040503050406030204" pitchFamily="18" charset="0"/>
+                                            <a:ea typeface="DengXian" panose="02010600030101010101" pitchFamily="2" charset="-122"/>
+                                            <a:cs typeface="Times New Roman" panose="02020603050405020304" pitchFamily="18" charset="0"/>
+                                          </a:rPr>
+                                          <m:t>1</m:t>
+                                        </m:r>
+                                      </m:sub>
+                                    </m:sSub>
+                                  </m:num>
+                                  <m:den>
+                                    <m:r>
+                                      <a:rPr lang="en-US" sz="1100" i="1">
+                                        <a:effectLst/>
+                                        <a:latin typeface="Cambria Math" panose="02040503050406030204" pitchFamily="18" charset="0"/>
+                                        <a:ea typeface="DengXian" panose="02010600030101010101" pitchFamily="2" charset="-122"/>
+                                        <a:cs typeface="Times New Roman" panose="02020603050405020304" pitchFamily="18" charset="0"/>
+                                      </a:rPr>
+                                      <m:t>𝜕</m:t>
+                                    </m:r>
+                                    <m:r>
+                                      <a:rPr lang="en-US" sz="1100" i="1">
+                                        <a:effectLst/>
+                                        <a:latin typeface="Cambria Math" panose="02040503050406030204" pitchFamily="18" charset="0"/>
+                                        <a:ea typeface="DengXian" panose="02010600030101010101" pitchFamily="2" charset="-122"/>
+                                        <a:cs typeface="Times New Roman" panose="02020603050405020304" pitchFamily="18" charset="0"/>
+                                      </a:rPr>
+                                      <m:t>𝑐</m:t>
+                                    </m:r>
+                                  </m:den>
+                                </m:f>
+                              </m:e>
+                              <m:e>
+                                <m:f>
+                                  <m:fPr>
+                                    <m:ctrlPr>
+                                      <a:rPr lang="en-US" sz="1100" i="1">
+                                        <a:effectLst/>
+                                        <a:latin typeface="Cambria Math" panose="02040503050406030204" pitchFamily="18" charset="0"/>
+                                        <a:ea typeface="DengXian" panose="02010600030101010101" pitchFamily="2" charset="-122"/>
+                                        <a:cs typeface="Times New Roman" panose="02020603050405020304" pitchFamily="18" charset="0"/>
+                                      </a:rPr>
+                                    </m:ctrlPr>
+                                  </m:fPr>
+                                  <m:num>
+                                    <m:r>
+                                      <a:rPr lang="en-US" sz="1100" i="1">
+                                        <a:effectLst/>
+                                        <a:latin typeface="Cambria Math" panose="02040503050406030204" pitchFamily="18" charset="0"/>
+                                        <a:ea typeface="DengXian" panose="02010600030101010101" pitchFamily="2" charset="-122"/>
+                                        <a:cs typeface="Times New Roman" panose="02020603050405020304" pitchFamily="18" charset="0"/>
+                                      </a:rPr>
+                                      <m:t>𝜕</m:t>
+                                    </m:r>
+                                    <m:sSub>
+                                      <m:sSubPr>
+                                        <m:ctrlPr>
+                                          <a:rPr lang="en-US" sz="1100" i="1">
+                                            <a:effectLst/>
+                                            <a:latin typeface="Cambria Math" panose="02040503050406030204" pitchFamily="18" charset="0"/>
+                                            <a:ea typeface="DengXian" panose="02010600030101010101" pitchFamily="2" charset="-122"/>
+                                            <a:cs typeface="Times New Roman" panose="02020603050405020304" pitchFamily="18" charset="0"/>
+                                          </a:rPr>
+                                        </m:ctrlPr>
+                                      </m:sSubPr>
+                                      <m:e>
+                                        <m:r>
+                                          <a:rPr lang="en-US" sz="1100" i="1">
+                                            <a:effectLst/>
+                                            <a:latin typeface="Cambria Math" panose="02040503050406030204" pitchFamily="18" charset="0"/>
+                                            <a:ea typeface="DengXian" panose="02010600030101010101" pitchFamily="2" charset="-122"/>
+                                            <a:cs typeface="Times New Roman" panose="02020603050405020304" pitchFamily="18" charset="0"/>
+                                          </a:rPr>
+                                          <m:t>𝐸</m:t>
+                                        </m:r>
+                                      </m:e>
+                                      <m:sub>
+                                        <m:r>
+                                          <a:rPr lang="en-US" sz="1100" i="1">
+                                            <a:effectLst/>
+                                            <a:latin typeface="Cambria Math" panose="02040503050406030204" pitchFamily="18" charset="0"/>
+                                            <a:ea typeface="DengXian" panose="02010600030101010101" pitchFamily="2" charset="-122"/>
+                                            <a:cs typeface="Times New Roman" panose="02020603050405020304" pitchFamily="18" charset="0"/>
+                                          </a:rPr>
+                                          <m:t>2</m:t>
+                                        </m:r>
+                                      </m:sub>
+                                    </m:sSub>
+                                  </m:num>
+                                  <m:den>
+                                    <m:r>
+                                      <a:rPr lang="en-US" sz="1100" i="1">
+                                        <a:effectLst/>
+                                        <a:latin typeface="Cambria Math" panose="02040503050406030204" pitchFamily="18" charset="0"/>
+                                        <a:ea typeface="DengXian" panose="02010600030101010101" pitchFamily="2" charset="-122"/>
+                                        <a:cs typeface="Times New Roman" panose="02020603050405020304" pitchFamily="18" charset="0"/>
+                                      </a:rPr>
+                                      <m:t>𝜕</m:t>
+                                    </m:r>
+                                    <m:r>
+                                      <a:rPr lang="en-US" sz="1100" i="1">
+                                        <a:effectLst/>
+                                        <a:latin typeface="Cambria Math" panose="02040503050406030204" pitchFamily="18" charset="0"/>
+                                        <a:ea typeface="DengXian" panose="02010600030101010101" pitchFamily="2" charset="-122"/>
+                                        <a:cs typeface="Times New Roman" panose="02020603050405020304" pitchFamily="18" charset="0"/>
+                                      </a:rPr>
+                                      <m:t>𝑐</m:t>
+                                    </m:r>
+                                  </m:den>
+                                </m:f>
+                              </m:e>
+                              <m:e>
+                                <m:f>
+                                  <m:fPr>
+                                    <m:ctrlPr>
+                                      <a:rPr lang="en-US" sz="1100" i="1">
+                                        <a:effectLst/>
+                                        <a:latin typeface="Cambria Math" panose="02040503050406030204" pitchFamily="18" charset="0"/>
+                                        <a:ea typeface="DengXian" panose="02010600030101010101" pitchFamily="2" charset="-122"/>
+                                        <a:cs typeface="Times New Roman" panose="02020603050405020304" pitchFamily="18" charset="0"/>
+                                      </a:rPr>
+                                    </m:ctrlPr>
+                                  </m:fPr>
+                                  <m:num>
+                                    <m:r>
+                                      <a:rPr lang="en-US" sz="1100" i="1">
+                                        <a:effectLst/>
+                                        <a:latin typeface="Cambria Math" panose="02040503050406030204" pitchFamily="18" charset="0"/>
+                                        <a:ea typeface="DengXian" panose="02010600030101010101" pitchFamily="2" charset="-122"/>
+                                        <a:cs typeface="Times New Roman" panose="02020603050405020304" pitchFamily="18" charset="0"/>
+                                      </a:rPr>
+                                      <m:t>𝜕</m:t>
+                                    </m:r>
+                                    <m:sSub>
+                                      <m:sSubPr>
+                                        <m:ctrlPr>
+                                          <a:rPr lang="en-US" sz="1100" i="1">
+                                            <a:effectLst/>
+                                            <a:latin typeface="Cambria Math" panose="02040503050406030204" pitchFamily="18" charset="0"/>
+                                            <a:ea typeface="DengXian" panose="02010600030101010101" pitchFamily="2" charset="-122"/>
+                                            <a:cs typeface="Times New Roman" panose="02020603050405020304" pitchFamily="18" charset="0"/>
+                                          </a:rPr>
+                                        </m:ctrlPr>
+                                      </m:sSubPr>
+                                      <m:e>
+                                        <m:r>
+                                          <a:rPr lang="en-US" sz="1100" i="1">
+                                            <a:effectLst/>
+                                            <a:latin typeface="Cambria Math" panose="02040503050406030204" pitchFamily="18" charset="0"/>
+                                            <a:ea typeface="DengXian" panose="02010600030101010101" pitchFamily="2" charset="-122"/>
+                                            <a:cs typeface="Times New Roman" panose="02020603050405020304" pitchFamily="18" charset="0"/>
+                                          </a:rPr>
+                                          <m:t>𝐸</m:t>
+                                        </m:r>
+                                      </m:e>
+                                      <m:sub>
+                                        <m:r>
+                                          <a:rPr lang="en-US" sz="1100" i="1">
+                                            <a:effectLst/>
+                                            <a:latin typeface="Cambria Math" panose="02040503050406030204" pitchFamily="18" charset="0"/>
+                                            <a:ea typeface="DengXian" panose="02010600030101010101" pitchFamily="2" charset="-122"/>
+                                            <a:cs typeface="Times New Roman" panose="02020603050405020304" pitchFamily="18" charset="0"/>
+                                          </a:rPr>
+                                          <m:t>3</m:t>
+                                        </m:r>
+                                      </m:sub>
+                                    </m:sSub>
+                                  </m:num>
+                                  <m:den>
+                                    <m:r>
+                                      <a:rPr lang="en-US" sz="1100" i="1">
+                                        <a:effectLst/>
+                                        <a:latin typeface="Cambria Math" panose="02040503050406030204" pitchFamily="18" charset="0"/>
+                                        <a:ea typeface="DengXian" panose="02010600030101010101" pitchFamily="2" charset="-122"/>
+                                        <a:cs typeface="Times New Roman" panose="02020603050405020304" pitchFamily="18" charset="0"/>
+                                      </a:rPr>
+                                      <m:t>𝜕</m:t>
+                                    </m:r>
+                                    <m:r>
+                                      <a:rPr lang="en-US" sz="1100" i="1">
+                                        <a:effectLst/>
+                                        <a:latin typeface="Cambria Math" panose="02040503050406030204" pitchFamily="18" charset="0"/>
+                                        <a:ea typeface="DengXian" panose="02010600030101010101" pitchFamily="2" charset="-122"/>
+                                        <a:cs typeface="Times New Roman" panose="02020603050405020304" pitchFamily="18" charset="0"/>
+                                      </a:rPr>
+                                      <m:t>𝑐</m:t>
+                                    </m:r>
+                                  </m:den>
+                                </m:f>
+                              </m:e>
+                            </m:mr>
+                          </m:m>
+                        </m:e>
+                      </m:d>
+                    </m:oMath>
+                  </m:oMathPara>
+                </a14:m>
+                <a:endParaRPr lang="en-US" sz="1100" dirty="0">
+                  <a:effectLst/>
+                  <a:latin typeface="Calibri" panose="020F0502020204030204" pitchFamily="34" charset="0"/>
+                  <a:ea typeface="DengXian" panose="02010600030101010101" pitchFamily="2" charset="-122"/>
+                  <a:cs typeface="Times New Roman" panose="02020603050405020304" pitchFamily="18" charset="0"/>
+                </a:endParaRPr>
+              </a:p>
+              <a:p>
+                <a:pPr>
+                  <a:lnSpc>
+                    <a:spcPct val="107000"/>
+                  </a:lnSpc>
+                  <a:spcAft>
+                    <a:spcPts val="800"/>
+                  </a:spcAft>
+                </a:pPr>
+                <a:r>
+                  <a:rPr lang="en-US" sz="1100" dirty="0">
+                    <a:effectLst/>
+                    <a:latin typeface="Calibri" panose="020F0502020204030204" pitchFamily="34" charset="0"/>
+                    <a:ea typeface="DengXian" panose="02010600030101010101" pitchFamily="2" charset="-122"/>
+                    <a:cs typeface="Times New Roman" panose="02020603050405020304" pitchFamily="18" charset="0"/>
+                  </a:rPr>
+                  <a:t>and we want </a:t>
+                </a:r>
+                <a14:m>
+                  <m:oMath xmlns:m="http://schemas.openxmlformats.org/officeDocument/2006/math">
+                    <m:r>
+                      <a:rPr lang="en-US" sz="1100" i="1">
+                        <a:effectLst/>
+                        <a:latin typeface="Cambria Math" panose="02040503050406030204" pitchFamily="18" charset="0"/>
+                        <a:ea typeface="DengXian" panose="02010600030101010101" pitchFamily="2" charset="-122"/>
+                        <a:cs typeface="Times New Roman" panose="02020603050405020304" pitchFamily="18" charset="0"/>
+                      </a:rPr>
+                      <m:t>∆=</m:t>
+                    </m:r>
+                    <m:d>
+                      <m:dPr>
+                        <m:ctrlPr>
+                          <a:rPr lang="en-US" sz="1100" i="1">
+                            <a:effectLst/>
+                            <a:latin typeface="Cambria Math" panose="02040503050406030204" pitchFamily="18" charset="0"/>
+                            <a:ea typeface="DengXian" panose="02010600030101010101" pitchFamily="2" charset="-122"/>
+                            <a:cs typeface="Times New Roman" panose="02020603050405020304" pitchFamily="18" charset="0"/>
+                          </a:rPr>
+                        </m:ctrlPr>
+                      </m:dPr>
+                      <m:e>
+                        <m:r>
+                          <m:rPr>
+                            <m:sty m:val="p"/>
+                          </m:rPr>
+                          <a:rPr lang="en-US" sz="1100">
+                            <a:effectLst/>
+                            <a:latin typeface="Cambria Math" panose="02040503050406030204" pitchFamily="18" charset="0"/>
+                            <a:ea typeface="DengXian" panose="02010600030101010101" pitchFamily="2" charset="-122"/>
+                            <a:cs typeface="Times New Roman" panose="02020603050405020304" pitchFamily="18" charset="0"/>
+                          </a:rPr>
+                          <m:t>Δ</m:t>
+                        </m:r>
+                        <m:r>
+                          <a:rPr lang="en-US" sz="1100" i="1">
+                            <a:effectLst/>
+                            <a:latin typeface="Cambria Math" panose="02040503050406030204" pitchFamily="18" charset="0"/>
+                            <a:ea typeface="DengXian" panose="02010600030101010101" pitchFamily="2" charset="-122"/>
+                            <a:cs typeface="Times New Roman" panose="02020603050405020304" pitchFamily="18" charset="0"/>
+                          </a:rPr>
+                          <m:t>𝑎</m:t>
+                        </m:r>
+                        <m:r>
+                          <a:rPr lang="en-US" sz="1100" i="1">
+                            <a:effectLst/>
+                            <a:latin typeface="Cambria Math" panose="02040503050406030204" pitchFamily="18" charset="0"/>
+                            <a:ea typeface="DengXian" panose="02010600030101010101" pitchFamily="2" charset="-122"/>
+                            <a:cs typeface="Times New Roman" panose="02020603050405020304" pitchFamily="18" charset="0"/>
+                          </a:rPr>
+                          <m:t>, </m:t>
+                        </m:r>
+                        <m:r>
+                          <m:rPr>
+                            <m:sty m:val="p"/>
+                          </m:rPr>
+                          <a:rPr lang="en-US" sz="1100">
+                            <a:effectLst/>
+                            <a:latin typeface="Cambria Math" panose="02040503050406030204" pitchFamily="18" charset="0"/>
+                            <a:ea typeface="DengXian" panose="02010600030101010101" pitchFamily="2" charset="-122"/>
+                            <a:cs typeface="Times New Roman" panose="02020603050405020304" pitchFamily="18" charset="0"/>
+                          </a:rPr>
+                          <m:t>Δ</m:t>
+                        </m:r>
+                        <m:r>
+                          <a:rPr lang="en-US" sz="1100" i="1">
+                            <a:effectLst/>
+                            <a:latin typeface="Cambria Math" panose="02040503050406030204" pitchFamily="18" charset="0"/>
+                            <a:ea typeface="DengXian" panose="02010600030101010101" pitchFamily="2" charset="-122"/>
+                            <a:cs typeface="Times New Roman" panose="02020603050405020304" pitchFamily="18" charset="0"/>
+                          </a:rPr>
+                          <m:t>𝑏</m:t>
+                        </m:r>
+                        <m:r>
+                          <a:rPr lang="en-US" sz="1100" i="1">
+                            <a:effectLst/>
+                            <a:latin typeface="Cambria Math" panose="02040503050406030204" pitchFamily="18" charset="0"/>
+                            <a:ea typeface="DengXian" panose="02010600030101010101" pitchFamily="2" charset="-122"/>
+                            <a:cs typeface="Times New Roman" panose="02020603050405020304" pitchFamily="18" charset="0"/>
+                          </a:rPr>
+                          <m:t>, </m:t>
+                        </m:r>
+                        <m:r>
+                          <m:rPr>
+                            <m:sty m:val="p"/>
+                          </m:rPr>
+                          <a:rPr lang="en-US" sz="1100">
+                            <a:effectLst/>
+                            <a:latin typeface="Cambria Math" panose="02040503050406030204" pitchFamily="18" charset="0"/>
+                            <a:ea typeface="DengXian" panose="02010600030101010101" pitchFamily="2" charset="-122"/>
+                            <a:cs typeface="Times New Roman" panose="02020603050405020304" pitchFamily="18" charset="0"/>
+                          </a:rPr>
+                          <m:t>Δ</m:t>
+                        </m:r>
+                        <m:r>
+                          <a:rPr lang="en-US" sz="1100" i="1">
+                            <a:effectLst/>
+                            <a:latin typeface="Cambria Math" panose="02040503050406030204" pitchFamily="18" charset="0"/>
+                            <a:ea typeface="DengXian" panose="02010600030101010101" pitchFamily="2" charset="-122"/>
+                            <a:cs typeface="Times New Roman" panose="02020603050405020304" pitchFamily="18" charset="0"/>
+                          </a:rPr>
+                          <m:t>𝑐</m:t>
+                        </m:r>
+                      </m:e>
+                    </m:d>
+                  </m:oMath>
+                </a14:m>
+                <a:r>
+                  <a:rPr lang="en-US" sz="1100" dirty="0">
+                    <a:effectLst/>
+                    <a:latin typeface="Calibri" panose="020F0502020204030204" pitchFamily="34" charset="0"/>
+                    <a:ea typeface="DengXian" panose="02010600030101010101" pitchFamily="2" charset="-122"/>
+                    <a:cs typeface="Times New Roman" panose="02020603050405020304" pitchFamily="18" charset="0"/>
+                  </a:rPr>
+                  <a:t> such that </a:t>
+                </a:r>
+                <a14:m>
+                  <m:oMath xmlns:m="http://schemas.openxmlformats.org/officeDocument/2006/math">
+                    <m:r>
+                      <m:rPr>
+                        <m:sty m:val="p"/>
+                      </m:rPr>
+                      <a:rPr lang="en-US" sz="1100">
+                        <a:effectLst/>
+                        <a:latin typeface="Cambria Math" panose="02040503050406030204" pitchFamily="18" charset="0"/>
+                        <a:ea typeface="DengXian" panose="02010600030101010101" pitchFamily="2" charset="-122"/>
+                        <a:cs typeface="Times New Roman" panose="02020603050405020304" pitchFamily="18" charset="0"/>
+                      </a:rPr>
+                      <m:t>∇</m:t>
+                    </m:r>
+                    <m:r>
+                      <a:rPr lang="en-US" sz="1100" i="1">
+                        <a:effectLst/>
+                        <a:latin typeface="Cambria Math" panose="02040503050406030204" pitchFamily="18" charset="0"/>
+                        <a:ea typeface="DengXian" panose="02010600030101010101" pitchFamily="2" charset="-122"/>
+                        <a:cs typeface="Times New Roman" panose="02020603050405020304" pitchFamily="18" charset="0"/>
+                      </a:rPr>
+                      <m:t>𝑓</m:t>
+                    </m:r>
+                    <m:r>
+                      <a:rPr lang="en-US" sz="1100" i="1">
+                        <a:effectLst/>
+                        <a:latin typeface="Cambria Math" panose="02040503050406030204" pitchFamily="18" charset="0"/>
+                        <a:ea typeface="DengXian" panose="02010600030101010101" pitchFamily="2" charset="-122"/>
+                        <a:cs typeface="Times New Roman" panose="02020603050405020304" pitchFamily="18" charset="0"/>
+                      </a:rPr>
+                      <m:t>⋅</m:t>
+                    </m:r>
+                    <m:r>
+                      <m:rPr>
+                        <m:sty m:val="p"/>
+                      </m:rPr>
+                      <a:rPr lang="en-US" sz="1100">
+                        <a:effectLst/>
+                        <a:latin typeface="Cambria Math" panose="02040503050406030204" pitchFamily="18" charset="0"/>
+                        <a:ea typeface="DengXian" panose="02010600030101010101" pitchFamily="2" charset="-122"/>
+                        <a:cs typeface="Times New Roman" panose="02020603050405020304" pitchFamily="18" charset="0"/>
+                      </a:rPr>
+                      <m:t>Δ</m:t>
+                    </m:r>
+                    <m:r>
+                      <a:rPr lang="en-US" sz="1100">
+                        <a:effectLst/>
+                        <a:latin typeface="Cambria Math" panose="02040503050406030204" pitchFamily="18" charset="0"/>
+                        <a:ea typeface="DengXian" panose="02010600030101010101" pitchFamily="2" charset="-122"/>
+                        <a:cs typeface="Times New Roman" panose="02020603050405020304" pitchFamily="18" charset="0"/>
+                      </a:rPr>
+                      <m:t>=</m:t>
+                    </m:r>
+                    <m:r>
+                      <m:rPr>
+                        <m:sty m:val="p"/>
+                      </m:rPr>
+                      <a:rPr lang="en-US" sz="1100">
+                        <a:effectLst/>
+                        <a:latin typeface="Cambria Math" panose="02040503050406030204" pitchFamily="18" charset="0"/>
+                        <a:ea typeface="DengXian" panose="02010600030101010101" pitchFamily="2" charset="-122"/>
+                        <a:cs typeface="Times New Roman" panose="02020603050405020304" pitchFamily="18" charset="0"/>
+                      </a:rPr>
+                      <m:t>∇</m:t>
+                    </m:r>
+                    <m:r>
+                      <a:rPr lang="en-US" sz="1100" i="1">
+                        <a:effectLst/>
+                        <a:latin typeface="Cambria Math" panose="02040503050406030204" pitchFamily="18" charset="0"/>
+                        <a:ea typeface="DengXian" panose="02010600030101010101" pitchFamily="2" charset="-122"/>
+                        <a:cs typeface="Times New Roman" panose="02020603050405020304" pitchFamily="18" charset="0"/>
+                      </a:rPr>
+                      <m:t>𝑓</m:t>
+                    </m:r>
+                    <m:r>
+                      <a:rPr lang="en-US" sz="1100" i="1">
+                        <a:effectLst/>
+                        <a:latin typeface="Cambria Math" panose="02040503050406030204" pitchFamily="18" charset="0"/>
+                        <a:ea typeface="DengXian" panose="02010600030101010101" pitchFamily="2" charset="-122"/>
+                        <a:cs typeface="Times New Roman" panose="02020603050405020304" pitchFamily="18" charset="0"/>
+                      </a:rPr>
+                      <m:t>⋅</m:t>
+                    </m:r>
+                    <m:d>
+                      <m:dPr>
+                        <m:ctrlPr>
+                          <a:rPr lang="en-US" sz="1100" i="1">
+                            <a:effectLst/>
+                            <a:latin typeface="Cambria Math" panose="02040503050406030204" pitchFamily="18" charset="0"/>
+                            <a:ea typeface="DengXian" panose="02010600030101010101" pitchFamily="2" charset="-122"/>
+                            <a:cs typeface="Times New Roman" panose="02020603050405020304" pitchFamily="18" charset="0"/>
+                          </a:rPr>
+                        </m:ctrlPr>
+                      </m:dPr>
+                      <m:e>
+                        <m:m>
+                          <m:mPr>
+                            <m:mcs>
+                              <m:mc>
+                                <m:mcPr>
+                                  <m:count m:val="1"/>
+                                  <m:mcJc m:val="center"/>
+                                </m:mcPr>
+                              </m:mc>
+                            </m:mcs>
+                            <m:ctrlPr>
+                              <a:rPr lang="en-US" sz="1100" i="1">
+                                <a:effectLst/>
+                                <a:latin typeface="Cambria Math" panose="02040503050406030204" pitchFamily="18" charset="0"/>
+                                <a:ea typeface="DengXian" panose="02010600030101010101" pitchFamily="2" charset="-122"/>
+                                <a:cs typeface="Times New Roman" panose="02020603050405020304" pitchFamily="18" charset="0"/>
+                              </a:rPr>
+                            </m:ctrlPr>
+                          </m:mPr>
+                          <m:mr>
+                            <m:e>
+                              <m:r>
+                                <m:rPr>
+                                  <m:sty m:val="p"/>
+                                </m:rPr>
+                                <a:rPr lang="en-US" sz="1100">
+                                  <a:effectLst/>
+                                  <a:latin typeface="Cambria Math" panose="02040503050406030204" pitchFamily="18" charset="0"/>
+                                  <a:ea typeface="DengXian" panose="02010600030101010101" pitchFamily="2" charset="-122"/>
+                                  <a:cs typeface="Times New Roman" panose="02020603050405020304" pitchFamily="18" charset="0"/>
+                                </a:rPr>
+                                <m:t>Δ</m:t>
+                              </m:r>
+                              <m:r>
+                                <a:rPr lang="en-US" sz="1100" i="1">
+                                  <a:effectLst/>
+                                  <a:latin typeface="Cambria Math" panose="02040503050406030204" pitchFamily="18" charset="0"/>
+                                  <a:ea typeface="DengXian" panose="02010600030101010101" pitchFamily="2" charset="-122"/>
+                                  <a:cs typeface="Times New Roman" panose="02020603050405020304" pitchFamily="18" charset="0"/>
+                                </a:rPr>
+                                <m:t>𝑎</m:t>
+                              </m:r>
+                            </m:e>
+                          </m:mr>
+                          <m:mr>
+                            <m:e>
+                              <m:r>
+                                <m:rPr>
+                                  <m:sty m:val="p"/>
+                                </m:rPr>
+                                <a:rPr lang="en-US" sz="1100">
+                                  <a:effectLst/>
+                                  <a:latin typeface="Cambria Math" panose="02040503050406030204" pitchFamily="18" charset="0"/>
+                                  <a:ea typeface="DengXian" panose="02010600030101010101" pitchFamily="2" charset="-122"/>
+                                  <a:cs typeface="Times New Roman" panose="02020603050405020304" pitchFamily="18" charset="0"/>
+                                </a:rPr>
+                                <m:t>Δ</m:t>
+                              </m:r>
+                              <m:r>
+                                <a:rPr lang="en-US" sz="1100" i="1">
+                                  <a:effectLst/>
+                                  <a:latin typeface="Cambria Math" panose="02040503050406030204" pitchFamily="18" charset="0"/>
+                                  <a:ea typeface="DengXian" panose="02010600030101010101" pitchFamily="2" charset="-122"/>
+                                  <a:cs typeface="Times New Roman" panose="02020603050405020304" pitchFamily="18" charset="0"/>
+                                </a:rPr>
+                                <m:t>𝑏</m:t>
+                              </m:r>
+                            </m:e>
+                          </m:mr>
+                          <m:mr>
+                            <m:e>
+                              <m:r>
+                                <m:rPr>
+                                  <m:sty m:val="p"/>
+                                </m:rPr>
+                                <a:rPr lang="en-US" sz="1100">
+                                  <a:effectLst/>
+                                  <a:latin typeface="Cambria Math" panose="02040503050406030204" pitchFamily="18" charset="0"/>
+                                  <a:ea typeface="DengXian" panose="02010600030101010101" pitchFamily="2" charset="-122"/>
+                                  <a:cs typeface="Times New Roman" panose="02020603050405020304" pitchFamily="18" charset="0"/>
+                                </a:rPr>
+                                <m:t>Δ</m:t>
+                              </m:r>
+                              <m:r>
+                                <a:rPr lang="en-US" sz="1100" i="1">
+                                  <a:effectLst/>
+                                  <a:latin typeface="Cambria Math" panose="02040503050406030204" pitchFamily="18" charset="0"/>
+                                  <a:ea typeface="DengXian" panose="02010600030101010101" pitchFamily="2" charset="-122"/>
+                                  <a:cs typeface="Times New Roman" panose="02020603050405020304" pitchFamily="18" charset="0"/>
+                                </a:rPr>
+                                <m:t>𝑐</m:t>
+                              </m:r>
+                            </m:e>
+                          </m:mr>
+                        </m:m>
+                      </m:e>
+                    </m:d>
+                    <m:r>
+                      <a:rPr lang="en-US" sz="1100" i="1">
+                        <a:effectLst/>
+                        <a:latin typeface="Cambria Math" panose="02040503050406030204" pitchFamily="18" charset="0"/>
+                        <a:ea typeface="DengXian" panose="02010600030101010101" pitchFamily="2" charset="-122"/>
+                        <a:cs typeface="Times New Roman" panose="02020603050405020304" pitchFamily="18" charset="0"/>
+                      </a:rPr>
+                      <m:t>=</m:t>
+                    </m:r>
+                    <m:d>
+                      <m:dPr>
+                        <m:ctrlPr>
+                          <a:rPr lang="en-US" sz="1100" i="1">
+                            <a:effectLst/>
+                            <a:latin typeface="Cambria Math" panose="02040503050406030204" pitchFamily="18" charset="0"/>
+                            <a:ea typeface="DengXian" panose="02010600030101010101" pitchFamily="2" charset="-122"/>
+                            <a:cs typeface="Times New Roman" panose="02020603050405020304" pitchFamily="18" charset="0"/>
+                          </a:rPr>
+                        </m:ctrlPr>
+                      </m:dPr>
+                      <m:e>
+                        <m:m>
+                          <m:mPr>
+                            <m:mcs>
+                              <m:mc>
+                                <m:mcPr>
+                                  <m:count m:val="1"/>
+                                  <m:mcJc m:val="center"/>
+                                </m:mcPr>
+                              </m:mc>
+                            </m:mcs>
+                            <m:ctrlPr>
+                              <a:rPr lang="en-US" sz="1100" i="1">
+                                <a:effectLst/>
+                                <a:latin typeface="Cambria Math" panose="02040503050406030204" pitchFamily="18" charset="0"/>
+                                <a:ea typeface="DengXian" panose="02010600030101010101" pitchFamily="2" charset="-122"/>
+                                <a:cs typeface="Times New Roman" panose="02020603050405020304" pitchFamily="18" charset="0"/>
+                              </a:rPr>
+                            </m:ctrlPr>
+                          </m:mPr>
+                          <m:mr>
+                            <m:e>
+                              <m:sSub>
+                                <m:sSubPr>
+                                  <m:ctrlPr>
+                                    <a:rPr lang="en-US" sz="1100" i="1">
+                                      <a:effectLst/>
+                                      <a:latin typeface="Cambria Math" panose="02040503050406030204" pitchFamily="18" charset="0"/>
+                                      <a:ea typeface="DengXian" panose="02010600030101010101" pitchFamily="2" charset="-122"/>
+                                      <a:cs typeface="Times New Roman" panose="02020603050405020304" pitchFamily="18" charset="0"/>
+                                    </a:rPr>
+                                  </m:ctrlPr>
+                                </m:sSubPr>
+                                <m:e>
+                                  <m:r>
+                                    <m:rPr>
+                                      <m:sty m:val="p"/>
+                                    </m:rPr>
+                                    <a:rPr lang="en-US" sz="1100">
+                                      <a:effectLst/>
+                                      <a:latin typeface="Cambria Math" panose="02040503050406030204" pitchFamily="18" charset="0"/>
+                                      <a:ea typeface="DengXian" panose="02010600030101010101" pitchFamily="2" charset="-122"/>
+                                      <a:cs typeface="Times New Roman" panose="02020603050405020304" pitchFamily="18" charset="0"/>
+                                    </a:rPr>
+                                    <m:t>E</m:t>
+                                  </m:r>
+                                </m:e>
+                                <m:sub>
+                                  <m:r>
+                                    <a:rPr lang="en-US" sz="1100">
+                                      <a:effectLst/>
+                                      <a:latin typeface="Cambria Math" panose="02040503050406030204" pitchFamily="18" charset="0"/>
+                                      <a:ea typeface="DengXian" panose="02010600030101010101" pitchFamily="2" charset="-122"/>
+                                      <a:cs typeface="Times New Roman" panose="02020603050405020304" pitchFamily="18" charset="0"/>
+                                    </a:rPr>
+                                    <m:t>1</m:t>
+                                  </m:r>
+                                </m:sub>
+                              </m:sSub>
+                            </m:e>
+                          </m:mr>
+                          <m:mr>
+                            <m:e>
+                              <m:sSub>
+                                <m:sSubPr>
+                                  <m:ctrlPr>
+                                    <a:rPr lang="en-US" sz="1100" i="1">
+                                      <a:effectLst/>
+                                      <a:latin typeface="Cambria Math" panose="02040503050406030204" pitchFamily="18" charset="0"/>
+                                      <a:ea typeface="DengXian" panose="02010600030101010101" pitchFamily="2" charset="-122"/>
+                                      <a:cs typeface="Times New Roman" panose="02020603050405020304" pitchFamily="18" charset="0"/>
+                                    </a:rPr>
+                                  </m:ctrlPr>
+                                </m:sSubPr>
+                                <m:e>
+                                  <m:r>
+                                    <m:rPr>
+                                      <m:sty m:val="p"/>
+                                    </m:rPr>
+                                    <a:rPr lang="en-US" sz="1100">
+                                      <a:effectLst/>
+                                      <a:latin typeface="Cambria Math" panose="02040503050406030204" pitchFamily="18" charset="0"/>
+                                      <a:ea typeface="DengXian" panose="02010600030101010101" pitchFamily="2" charset="-122"/>
+                                      <a:cs typeface="Times New Roman" panose="02020603050405020304" pitchFamily="18" charset="0"/>
+                                    </a:rPr>
+                                    <m:t>E</m:t>
+                                  </m:r>
+                                </m:e>
+                                <m:sub>
+                                  <m:r>
+                                    <a:rPr lang="en-US" sz="1100">
+                                      <a:effectLst/>
+                                      <a:latin typeface="Cambria Math" panose="02040503050406030204" pitchFamily="18" charset="0"/>
+                                      <a:ea typeface="DengXian" panose="02010600030101010101" pitchFamily="2" charset="-122"/>
+                                      <a:cs typeface="Times New Roman" panose="02020603050405020304" pitchFamily="18" charset="0"/>
+                                    </a:rPr>
+                                    <m:t>2</m:t>
+                                  </m:r>
+                                </m:sub>
+                              </m:sSub>
+                            </m:e>
+                          </m:mr>
+                          <m:mr>
+                            <m:e>
+                              <m:sSub>
+                                <m:sSubPr>
+                                  <m:ctrlPr>
+                                    <a:rPr lang="en-US" sz="1100" i="1">
+                                      <a:effectLst/>
+                                      <a:latin typeface="Cambria Math" panose="02040503050406030204" pitchFamily="18" charset="0"/>
+                                      <a:ea typeface="DengXian" panose="02010600030101010101" pitchFamily="2" charset="-122"/>
+                                      <a:cs typeface="Times New Roman" panose="02020603050405020304" pitchFamily="18" charset="0"/>
+                                    </a:rPr>
+                                  </m:ctrlPr>
+                                </m:sSubPr>
+                                <m:e>
+                                  <m:r>
+                                    <m:rPr>
+                                      <m:sty m:val="p"/>
+                                    </m:rPr>
+                                    <a:rPr lang="en-US" sz="1100">
+                                      <a:effectLst/>
+                                      <a:latin typeface="Cambria Math" panose="02040503050406030204" pitchFamily="18" charset="0"/>
+                                      <a:ea typeface="DengXian" panose="02010600030101010101" pitchFamily="2" charset="-122"/>
+                                      <a:cs typeface="Times New Roman" panose="02020603050405020304" pitchFamily="18" charset="0"/>
+                                    </a:rPr>
+                                    <m:t>E</m:t>
+                                  </m:r>
+                                </m:e>
+                                <m:sub>
+                                  <m:r>
+                                    <a:rPr lang="en-US" sz="1100">
+                                      <a:effectLst/>
+                                      <a:latin typeface="Cambria Math" panose="02040503050406030204" pitchFamily="18" charset="0"/>
+                                      <a:ea typeface="DengXian" panose="02010600030101010101" pitchFamily="2" charset="-122"/>
+                                      <a:cs typeface="Times New Roman" panose="02020603050405020304" pitchFamily="18" charset="0"/>
+                                    </a:rPr>
+                                    <m:t>3</m:t>
+                                  </m:r>
+                                </m:sub>
+                              </m:sSub>
+                            </m:e>
+                          </m:mr>
+                        </m:m>
+                      </m:e>
+                    </m:d>
+                  </m:oMath>
+                </a14:m>
+                <a:r>
+                  <a:rPr lang="en-US" sz="1100" dirty="0">
+                    <a:effectLst/>
+                    <a:latin typeface="Calibri" panose="020F0502020204030204" pitchFamily="34" charset="0"/>
+                    <a:ea typeface="DengXian" panose="02010600030101010101" pitchFamily="2" charset="-122"/>
+                    <a:cs typeface="Times New Roman" panose="02020603050405020304" pitchFamily="18" charset="0"/>
+                  </a:rPr>
+                  <a:t>. This </a:t>
+                </a:r>
+                <a14:m>
+                  <m:oMath xmlns:m="http://schemas.openxmlformats.org/officeDocument/2006/math">
+                    <m:r>
+                      <m:rPr>
+                        <m:sty m:val="p"/>
+                      </m:rPr>
+                      <a:rPr lang="en-US" sz="1100">
+                        <a:effectLst/>
+                        <a:latin typeface="Cambria Math" panose="02040503050406030204" pitchFamily="18" charset="0"/>
+                        <a:ea typeface="DengXian" panose="02010600030101010101" pitchFamily="2" charset="-122"/>
+                        <a:cs typeface="Times New Roman" panose="02020603050405020304" pitchFamily="18" charset="0"/>
+                      </a:rPr>
+                      <m:t>Δ</m:t>
+                    </m:r>
+                  </m:oMath>
+                </a14:m>
+                <a:r>
+                  <a:rPr lang="en-US" sz="1100" dirty="0">
+                    <a:effectLst/>
+                    <a:latin typeface="Calibri" panose="020F0502020204030204" pitchFamily="34" charset="0"/>
+                    <a:ea typeface="DengXian" panose="02010600030101010101" pitchFamily="2" charset="-122"/>
+                    <a:cs typeface="Times New Roman" panose="02020603050405020304" pitchFamily="18" charset="0"/>
+                  </a:rPr>
+                  <a:t> gives the distances needed for the variables to change by, before </a:t>
+                </a:r>
+                <a14:m>
+                  <m:oMath xmlns:m="http://schemas.openxmlformats.org/officeDocument/2006/math">
+                    <m:r>
+                      <a:rPr lang="en-US" sz="1100" i="1">
+                        <a:effectLst/>
+                        <a:latin typeface="Cambria Math" panose="02040503050406030204" pitchFamily="18" charset="0"/>
+                        <a:ea typeface="DengXian" panose="02010600030101010101" pitchFamily="2" charset="-122"/>
+                        <a:cs typeface="Times New Roman" panose="02020603050405020304" pitchFamily="18" charset="0"/>
+                      </a:rPr>
+                      <m:t>𝑓</m:t>
+                    </m:r>
+                  </m:oMath>
+                </a14:m>
+                <a:r>
+                  <a:rPr lang="en-US" sz="1100" dirty="0">
+                    <a:effectLst/>
+                    <a:latin typeface="Calibri" panose="020F0502020204030204" pitchFamily="34" charset="0"/>
+                    <a:ea typeface="DengXian" panose="02010600030101010101" pitchFamily="2" charset="-122"/>
+                    <a:cs typeface="Times New Roman" panose="02020603050405020304" pitchFamily="18" charset="0"/>
+                  </a:rPr>
+                  <a:t> gets increased or decreased by  </a:t>
+                </a:r>
+                <a14:m>
+                  <m:oMath xmlns:m="http://schemas.openxmlformats.org/officeDocument/2006/math">
+                    <m:acc>
+                      <m:accPr>
+                        <m:chr m:val="⃗"/>
+                        <m:ctrlPr>
+                          <a:rPr lang="en-US" sz="1100" i="1">
+                            <a:effectLst/>
+                            <a:latin typeface="Cambria Math" panose="02040503050406030204" pitchFamily="18" charset="0"/>
+                            <a:ea typeface="DengXian" panose="02010600030101010101" pitchFamily="2" charset="-122"/>
+                            <a:cs typeface="Times New Roman" panose="02020603050405020304" pitchFamily="18" charset="0"/>
+                          </a:rPr>
+                        </m:ctrlPr>
+                      </m:accPr>
+                      <m:e>
+                        <m:r>
+                          <a:rPr lang="en-US" sz="1100" i="1">
+                            <a:effectLst/>
+                            <a:latin typeface="Cambria Math" panose="02040503050406030204" pitchFamily="18" charset="0"/>
+                            <a:ea typeface="DengXian" panose="02010600030101010101" pitchFamily="2" charset="-122"/>
+                            <a:cs typeface="Times New Roman" panose="02020603050405020304" pitchFamily="18" charset="0"/>
+                          </a:rPr>
+                          <m:t>𝐸</m:t>
+                        </m:r>
+                      </m:e>
+                    </m:acc>
+                  </m:oMath>
+                </a14:m>
+                <a:r>
+                  <a:rPr lang="en-US" sz="1100" dirty="0">
+                    <a:effectLst/>
+                    <a:latin typeface="Calibri" panose="020F0502020204030204" pitchFamily="34" charset="0"/>
+                    <a:ea typeface="DengXian" panose="02010600030101010101" pitchFamily="2" charset="-122"/>
+                    <a:cs typeface="Times New Roman" panose="02020603050405020304" pitchFamily="18" charset="0"/>
+                  </a:rPr>
+                  <a:t>. Solving for </a:t>
+                </a:r>
+                <a14:m>
+                  <m:oMath xmlns:m="http://schemas.openxmlformats.org/officeDocument/2006/math">
+                    <m:r>
+                      <m:rPr>
+                        <m:sty m:val="p"/>
+                      </m:rPr>
+                      <a:rPr lang="en-US" sz="1100">
+                        <a:effectLst/>
+                        <a:latin typeface="Cambria Math" panose="02040503050406030204" pitchFamily="18" charset="0"/>
+                        <a:ea typeface="DengXian" panose="02010600030101010101" pitchFamily="2" charset="-122"/>
+                        <a:cs typeface="Times New Roman" panose="02020603050405020304" pitchFamily="18" charset="0"/>
+                      </a:rPr>
+                      <m:t>Δ</m:t>
+                    </m:r>
+                  </m:oMath>
+                </a14:m>
+                <a:r>
+                  <a:rPr lang="en-US" sz="1100" dirty="0">
+                    <a:effectLst/>
+                    <a:latin typeface="Calibri" panose="020F0502020204030204" pitchFamily="34" charset="0"/>
+                    <a:ea typeface="DengXian" panose="02010600030101010101" pitchFamily="2" charset="-122"/>
+                    <a:cs typeface="Times New Roman" panose="02020603050405020304" pitchFamily="18" charset="0"/>
+                  </a:rPr>
+                  <a:t> gives</a:t>
+                </a:r>
+              </a:p>
+              <a:p>
+                <a:pPr algn="ctr">
+                  <a:lnSpc>
+                    <a:spcPct val="107000"/>
+                  </a:lnSpc>
+                  <a:spcAft>
+                    <a:spcPts val="800"/>
+                  </a:spcAft>
+                </a:pPr>
+                <a14:m>
+                  <m:oMathPara xmlns:m="http://schemas.openxmlformats.org/officeDocument/2006/math">
+                    <m:oMathParaPr>
+                      <m:jc m:val="centerGroup"/>
+                    </m:oMathParaPr>
+                    <m:oMath xmlns:m="http://schemas.openxmlformats.org/officeDocument/2006/math">
+                      <m:d>
+                        <m:dPr>
+                          <m:ctrlPr>
+                            <a:rPr lang="en-US" sz="1100" i="1">
+                              <a:effectLst/>
+                              <a:latin typeface="Cambria Math" panose="02040503050406030204" pitchFamily="18" charset="0"/>
+                              <a:ea typeface="DengXian" panose="02010600030101010101" pitchFamily="2" charset="-122"/>
+                              <a:cs typeface="Times New Roman" panose="02020603050405020304" pitchFamily="18" charset="0"/>
+                            </a:rPr>
+                          </m:ctrlPr>
+                        </m:dPr>
+                        <m:e>
+                          <m:m>
+                            <m:mPr>
+                              <m:mcs>
+                                <m:mc>
+                                  <m:mcPr>
+                                    <m:count m:val="1"/>
+                                    <m:mcJc m:val="center"/>
+                                  </m:mcPr>
+                                </m:mc>
+                              </m:mcs>
+                              <m:ctrlPr>
+                                <a:rPr lang="en-US" sz="1100" i="1">
+                                  <a:effectLst/>
+                                  <a:latin typeface="Cambria Math" panose="02040503050406030204" pitchFamily="18" charset="0"/>
+                                  <a:ea typeface="DengXian" panose="02010600030101010101" pitchFamily="2" charset="-122"/>
+                                  <a:cs typeface="Times New Roman" panose="02020603050405020304" pitchFamily="18" charset="0"/>
+                                </a:rPr>
+                              </m:ctrlPr>
+                            </m:mPr>
+                            <m:mr>
+                              <m:e>
+                                <m:r>
+                                  <m:rPr>
+                                    <m:sty m:val="p"/>
+                                  </m:rPr>
+                                  <a:rPr lang="en-US" sz="1100">
+                                    <a:effectLst/>
+                                    <a:latin typeface="Cambria Math" panose="02040503050406030204" pitchFamily="18" charset="0"/>
+                                    <a:ea typeface="DengXian" panose="02010600030101010101" pitchFamily="2" charset="-122"/>
+                                    <a:cs typeface="Times New Roman" panose="02020603050405020304" pitchFamily="18" charset="0"/>
+                                  </a:rPr>
+                                  <m:t>Δ</m:t>
+                                </m:r>
+                                <m:r>
+                                  <a:rPr lang="en-US" sz="1100" i="1">
+                                    <a:effectLst/>
+                                    <a:latin typeface="Cambria Math" panose="02040503050406030204" pitchFamily="18" charset="0"/>
+                                    <a:ea typeface="DengXian" panose="02010600030101010101" pitchFamily="2" charset="-122"/>
+                                    <a:cs typeface="Times New Roman" panose="02020603050405020304" pitchFamily="18" charset="0"/>
+                                  </a:rPr>
+                                  <m:t>𝑎</m:t>
+                                </m:r>
+                              </m:e>
+                            </m:mr>
+                            <m:mr>
+                              <m:e>
+                                <m:r>
+                                  <m:rPr>
+                                    <m:sty m:val="p"/>
+                                  </m:rPr>
+                                  <a:rPr lang="en-US" sz="1100">
+                                    <a:effectLst/>
+                                    <a:latin typeface="Cambria Math" panose="02040503050406030204" pitchFamily="18" charset="0"/>
+                                    <a:ea typeface="DengXian" panose="02010600030101010101" pitchFamily="2" charset="-122"/>
+                                    <a:cs typeface="Times New Roman" panose="02020603050405020304" pitchFamily="18" charset="0"/>
+                                  </a:rPr>
+                                  <m:t>Δ</m:t>
+                                </m:r>
+                                <m:r>
+                                  <a:rPr lang="en-US" sz="1100" i="1">
+                                    <a:effectLst/>
+                                    <a:latin typeface="Cambria Math" panose="02040503050406030204" pitchFamily="18" charset="0"/>
+                                    <a:ea typeface="DengXian" panose="02010600030101010101" pitchFamily="2" charset="-122"/>
+                                    <a:cs typeface="Times New Roman" panose="02020603050405020304" pitchFamily="18" charset="0"/>
+                                  </a:rPr>
+                                  <m:t>𝑏</m:t>
+                                </m:r>
+                              </m:e>
+                            </m:mr>
+                            <m:mr>
+                              <m:e>
+                                <m:r>
+                                  <m:rPr>
+                                    <m:sty m:val="p"/>
+                                  </m:rPr>
+                                  <a:rPr lang="en-US" sz="1100">
+                                    <a:effectLst/>
+                                    <a:latin typeface="Cambria Math" panose="02040503050406030204" pitchFamily="18" charset="0"/>
+                                    <a:ea typeface="DengXian" panose="02010600030101010101" pitchFamily="2" charset="-122"/>
+                                    <a:cs typeface="Times New Roman" panose="02020603050405020304" pitchFamily="18" charset="0"/>
+                                  </a:rPr>
+                                  <m:t>Δ</m:t>
+                                </m:r>
+                                <m:r>
+                                  <a:rPr lang="en-US" sz="1100" i="1">
+                                    <a:effectLst/>
+                                    <a:latin typeface="Cambria Math" panose="02040503050406030204" pitchFamily="18" charset="0"/>
+                                    <a:ea typeface="DengXian" panose="02010600030101010101" pitchFamily="2" charset="-122"/>
+                                    <a:cs typeface="Times New Roman" panose="02020603050405020304" pitchFamily="18" charset="0"/>
+                                  </a:rPr>
+                                  <m:t>𝑐</m:t>
+                                </m:r>
+                              </m:e>
+                            </m:mr>
+                          </m:m>
+                        </m:e>
+                      </m:d>
+                      <m:r>
+                        <a:rPr lang="en-US" sz="1100" i="1">
+                          <a:effectLst/>
+                          <a:latin typeface="Cambria Math" panose="02040503050406030204" pitchFamily="18" charset="0"/>
+                          <a:ea typeface="DengXian" panose="02010600030101010101" pitchFamily="2" charset="-122"/>
+                          <a:cs typeface="Times New Roman" panose="02020603050405020304" pitchFamily="18" charset="0"/>
+                        </a:rPr>
+                        <m:t>=</m:t>
+                      </m:r>
+                      <m:r>
+                        <m:rPr>
+                          <m:sty m:val="p"/>
+                        </m:rPr>
+                        <a:rPr lang="en-US" sz="1100">
+                          <a:effectLst/>
+                          <a:latin typeface="Cambria Math" panose="02040503050406030204" pitchFamily="18" charset="0"/>
+                          <a:ea typeface="DengXian" panose="02010600030101010101" pitchFamily="2" charset="-122"/>
+                          <a:cs typeface="Times New Roman" panose="02020603050405020304" pitchFamily="18" charset="0"/>
+                        </a:rPr>
+                        <m:t>∇</m:t>
+                      </m:r>
+                      <m:sSup>
+                        <m:sSupPr>
+                          <m:ctrlPr>
+                            <a:rPr lang="en-US" sz="1100" i="1">
+                              <a:effectLst/>
+                              <a:latin typeface="Cambria Math" panose="02040503050406030204" pitchFamily="18" charset="0"/>
+                              <a:ea typeface="DengXian" panose="02010600030101010101" pitchFamily="2" charset="-122"/>
+                              <a:cs typeface="Times New Roman" panose="02020603050405020304" pitchFamily="18" charset="0"/>
+                            </a:rPr>
+                          </m:ctrlPr>
+                        </m:sSupPr>
+                        <m:e>
+                          <m:r>
+                            <a:rPr lang="en-US" sz="1100" i="1">
+                              <a:effectLst/>
+                              <a:latin typeface="Cambria Math" panose="02040503050406030204" pitchFamily="18" charset="0"/>
+                              <a:ea typeface="DengXian" panose="02010600030101010101" pitchFamily="2" charset="-122"/>
+                              <a:cs typeface="Times New Roman" panose="02020603050405020304" pitchFamily="18" charset="0"/>
+                            </a:rPr>
+                            <m:t>𝑓</m:t>
+                          </m:r>
+                        </m:e>
+                        <m:sup>
+                          <m:r>
+                            <a:rPr lang="en-US" sz="1100" i="1">
+                              <a:effectLst/>
+                              <a:latin typeface="Cambria Math" panose="02040503050406030204" pitchFamily="18" charset="0"/>
+                              <a:ea typeface="DengXian" panose="02010600030101010101" pitchFamily="2" charset="-122"/>
+                              <a:cs typeface="Times New Roman" panose="02020603050405020304" pitchFamily="18" charset="0"/>
+                            </a:rPr>
+                            <m:t>−1</m:t>
+                          </m:r>
+                        </m:sup>
+                      </m:sSup>
+                      <m:r>
+                        <a:rPr lang="en-US" sz="1100" i="1">
+                          <a:effectLst/>
+                          <a:latin typeface="Cambria Math" panose="02040503050406030204" pitchFamily="18" charset="0"/>
+                          <a:ea typeface="DengXian" panose="02010600030101010101" pitchFamily="2" charset="-122"/>
+                          <a:cs typeface="Times New Roman" panose="02020603050405020304" pitchFamily="18" charset="0"/>
+                        </a:rPr>
+                        <m:t>⋅</m:t>
+                      </m:r>
+                      <m:d>
+                        <m:dPr>
+                          <m:ctrlPr>
+                            <a:rPr lang="en-US" sz="1100" i="1">
+                              <a:effectLst/>
+                              <a:latin typeface="Cambria Math" panose="02040503050406030204" pitchFamily="18" charset="0"/>
+                              <a:ea typeface="DengXian" panose="02010600030101010101" pitchFamily="2" charset="-122"/>
+                              <a:cs typeface="Times New Roman" panose="02020603050405020304" pitchFamily="18" charset="0"/>
+                            </a:rPr>
+                          </m:ctrlPr>
+                        </m:dPr>
+                        <m:e>
+                          <m:m>
+                            <m:mPr>
+                              <m:mcs>
+                                <m:mc>
+                                  <m:mcPr>
+                                    <m:count m:val="1"/>
+                                    <m:mcJc m:val="center"/>
+                                  </m:mcPr>
+                                </m:mc>
+                              </m:mcs>
+                              <m:ctrlPr>
+                                <a:rPr lang="en-US" sz="1100" i="1">
+                                  <a:effectLst/>
+                                  <a:latin typeface="Cambria Math" panose="02040503050406030204" pitchFamily="18" charset="0"/>
+                                  <a:ea typeface="DengXian" panose="02010600030101010101" pitchFamily="2" charset="-122"/>
+                                  <a:cs typeface="Times New Roman" panose="02020603050405020304" pitchFamily="18" charset="0"/>
+                                </a:rPr>
+                              </m:ctrlPr>
+                            </m:mPr>
+                            <m:mr>
+                              <m:e>
+                                <m:sSub>
+                                  <m:sSubPr>
+                                    <m:ctrlPr>
+                                      <a:rPr lang="en-US" sz="1100" i="1">
+                                        <a:effectLst/>
+                                        <a:latin typeface="Cambria Math" panose="02040503050406030204" pitchFamily="18" charset="0"/>
+                                        <a:ea typeface="DengXian" panose="02010600030101010101" pitchFamily="2" charset="-122"/>
+                                        <a:cs typeface="Times New Roman" panose="02020603050405020304" pitchFamily="18" charset="0"/>
+                                      </a:rPr>
+                                    </m:ctrlPr>
+                                  </m:sSubPr>
+                                  <m:e>
+                                    <m:r>
+                                      <m:rPr>
+                                        <m:sty m:val="p"/>
+                                      </m:rPr>
+                                      <a:rPr lang="en-US" sz="1100">
+                                        <a:effectLst/>
+                                        <a:latin typeface="Cambria Math" panose="02040503050406030204" pitchFamily="18" charset="0"/>
+                                        <a:ea typeface="DengXian" panose="02010600030101010101" pitchFamily="2" charset="-122"/>
+                                        <a:cs typeface="Times New Roman" panose="02020603050405020304" pitchFamily="18" charset="0"/>
+                                      </a:rPr>
+                                      <m:t>E</m:t>
+                                    </m:r>
+                                  </m:e>
+                                  <m:sub>
+                                    <m:r>
+                                      <a:rPr lang="en-US" sz="1100">
+                                        <a:effectLst/>
+                                        <a:latin typeface="Cambria Math" panose="02040503050406030204" pitchFamily="18" charset="0"/>
+                                        <a:ea typeface="DengXian" panose="02010600030101010101" pitchFamily="2" charset="-122"/>
+                                        <a:cs typeface="Times New Roman" panose="02020603050405020304" pitchFamily="18" charset="0"/>
+                                      </a:rPr>
+                                      <m:t>1</m:t>
+                                    </m:r>
+                                  </m:sub>
+                                </m:sSub>
+                              </m:e>
+                            </m:mr>
+                            <m:mr>
+                              <m:e>
+                                <m:sSub>
+                                  <m:sSubPr>
+                                    <m:ctrlPr>
+                                      <a:rPr lang="en-US" sz="1100" i="1">
+                                        <a:effectLst/>
+                                        <a:latin typeface="Cambria Math" panose="02040503050406030204" pitchFamily="18" charset="0"/>
+                                        <a:ea typeface="DengXian" panose="02010600030101010101" pitchFamily="2" charset="-122"/>
+                                        <a:cs typeface="Times New Roman" panose="02020603050405020304" pitchFamily="18" charset="0"/>
+                                      </a:rPr>
+                                    </m:ctrlPr>
+                                  </m:sSubPr>
+                                  <m:e>
+                                    <m:r>
+                                      <m:rPr>
+                                        <m:sty m:val="p"/>
+                                      </m:rPr>
+                                      <a:rPr lang="en-US" sz="1100">
+                                        <a:effectLst/>
+                                        <a:latin typeface="Cambria Math" panose="02040503050406030204" pitchFamily="18" charset="0"/>
+                                        <a:ea typeface="DengXian" panose="02010600030101010101" pitchFamily="2" charset="-122"/>
+                                        <a:cs typeface="Times New Roman" panose="02020603050405020304" pitchFamily="18" charset="0"/>
+                                      </a:rPr>
+                                      <m:t>E</m:t>
+                                    </m:r>
+                                  </m:e>
+                                  <m:sub>
+                                    <m:r>
+                                      <a:rPr lang="en-US" sz="1100">
+                                        <a:effectLst/>
+                                        <a:latin typeface="Cambria Math" panose="02040503050406030204" pitchFamily="18" charset="0"/>
+                                        <a:ea typeface="DengXian" panose="02010600030101010101" pitchFamily="2" charset="-122"/>
+                                        <a:cs typeface="Times New Roman" panose="02020603050405020304" pitchFamily="18" charset="0"/>
+                                      </a:rPr>
+                                      <m:t>2</m:t>
+                                    </m:r>
+                                  </m:sub>
+                                </m:sSub>
+                              </m:e>
+                            </m:mr>
+                            <m:mr>
+                              <m:e>
+                                <m:sSub>
+                                  <m:sSubPr>
+                                    <m:ctrlPr>
+                                      <a:rPr lang="en-US" sz="1100" i="1">
+                                        <a:effectLst/>
+                                        <a:latin typeface="Cambria Math" panose="02040503050406030204" pitchFamily="18" charset="0"/>
+                                        <a:ea typeface="DengXian" panose="02010600030101010101" pitchFamily="2" charset="-122"/>
+                                        <a:cs typeface="Times New Roman" panose="02020603050405020304" pitchFamily="18" charset="0"/>
+                                      </a:rPr>
+                                    </m:ctrlPr>
+                                  </m:sSubPr>
+                                  <m:e>
+                                    <m:r>
+                                      <m:rPr>
+                                        <m:sty m:val="p"/>
+                                      </m:rPr>
+                                      <a:rPr lang="en-US" sz="1100">
+                                        <a:effectLst/>
+                                        <a:latin typeface="Cambria Math" panose="02040503050406030204" pitchFamily="18" charset="0"/>
+                                        <a:ea typeface="DengXian" panose="02010600030101010101" pitchFamily="2" charset="-122"/>
+                                        <a:cs typeface="Times New Roman" panose="02020603050405020304" pitchFamily="18" charset="0"/>
+                                      </a:rPr>
+                                      <m:t>E</m:t>
+                                    </m:r>
+                                  </m:e>
+                                  <m:sub>
+                                    <m:r>
+                                      <a:rPr lang="en-US" sz="1100">
+                                        <a:effectLst/>
+                                        <a:latin typeface="Cambria Math" panose="02040503050406030204" pitchFamily="18" charset="0"/>
+                                        <a:ea typeface="DengXian" panose="02010600030101010101" pitchFamily="2" charset="-122"/>
+                                        <a:cs typeface="Times New Roman" panose="02020603050405020304" pitchFamily="18" charset="0"/>
+                                      </a:rPr>
+                                      <m:t>3</m:t>
+                                    </m:r>
+                                  </m:sub>
+                                </m:sSub>
+                              </m:e>
+                            </m:mr>
+                          </m:m>
+                        </m:e>
+                      </m:d>
+                      <m:r>
+                        <a:rPr lang="en-US" sz="1100" i="1">
+                          <a:effectLst/>
+                          <a:latin typeface="Cambria Math" panose="02040503050406030204" pitchFamily="18" charset="0"/>
+                          <a:ea typeface="DengXian" panose="02010600030101010101" pitchFamily="2" charset="-122"/>
+                          <a:cs typeface="Times New Roman" panose="02020603050405020304" pitchFamily="18" charset="0"/>
+                        </a:rPr>
+                        <m:t>.</m:t>
+                      </m:r>
+                    </m:oMath>
+                  </m:oMathPara>
+                </a14:m>
+                <a:endParaRPr lang="en-US" sz="1100" dirty="0">
+                  <a:effectLst/>
+                  <a:latin typeface="Calibri" panose="020F0502020204030204" pitchFamily="34" charset="0"/>
+                  <a:ea typeface="DengXian" panose="02010600030101010101" pitchFamily="2" charset="-122"/>
+                  <a:cs typeface="Times New Roman" panose="02020603050405020304" pitchFamily="18" charset="0"/>
+                </a:endParaRPr>
+              </a:p>
+              <a:p>
+                <a:pPr>
+                  <a:lnSpc>
+                    <a:spcPct val="107000"/>
+                  </a:lnSpc>
+                  <a:spcAft>
+                    <a:spcPts val="800"/>
+                  </a:spcAft>
+                </a:pPr>
+                <a:r>
+                  <a:rPr lang="en-US" sz="1100" dirty="0">
+                    <a:effectLst/>
+                    <a:latin typeface="Calibri" panose="020F0502020204030204" pitchFamily="34" charset="0"/>
+                    <a:ea typeface="DengXian" panose="02010600030101010101" pitchFamily="2" charset="-122"/>
+                    <a:cs typeface="Times New Roman" panose="02020603050405020304" pitchFamily="18" charset="0"/>
+                  </a:rPr>
+                  <a:t>When non-invertibility occurs, take a random submatrix of the size </a:t>
+                </a:r>
+                <a14:m>
+                  <m:oMath xmlns:m="http://schemas.openxmlformats.org/officeDocument/2006/math">
+                    <m:r>
+                      <a:rPr lang="en-US" sz="1100" i="1">
+                        <a:effectLst/>
+                        <a:latin typeface="Cambria Math" panose="02040503050406030204" pitchFamily="18" charset="0"/>
+                        <a:ea typeface="DengXian" panose="02010600030101010101" pitchFamily="2" charset="-122"/>
+                        <a:cs typeface="Times New Roman" panose="02020603050405020304" pitchFamily="18" charset="0"/>
+                      </a:rPr>
+                      <m:t>𝑛</m:t>
+                    </m:r>
+                    <m:r>
+                      <a:rPr lang="en-US" sz="1100" i="1">
+                        <a:effectLst/>
+                        <a:latin typeface="Cambria Math" panose="02040503050406030204" pitchFamily="18" charset="0"/>
+                        <a:ea typeface="DengXian" panose="02010600030101010101" pitchFamily="2" charset="-122"/>
+                        <a:cs typeface="Times New Roman" panose="02020603050405020304" pitchFamily="18" charset="0"/>
+                      </a:rPr>
+                      <m:t>−1</m:t>
+                    </m:r>
+                  </m:oMath>
+                </a14:m>
+                <a:r>
+                  <a:rPr lang="en-US" sz="1100" dirty="0">
+                    <a:effectLst/>
+                    <a:latin typeface="Calibri" panose="020F0502020204030204" pitchFamily="34" charset="0"/>
+                    <a:ea typeface="DengXian" panose="02010600030101010101" pitchFamily="2" charset="-122"/>
+                    <a:cs typeface="Times New Roman" panose="02020603050405020304" pitchFamily="18" charset="0"/>
+                  </a:rPr>
+                  <a:t> to do the inversion, apply a partial descent on these two of the variables.</a:t>
+                </a:r>
+              </a:p>
+              <a:p>
+                <a:pPr>
+                  <a:lnSpc>
+                    <a:spcPct val="107000"/>
+                  </a:lnSpc>
+                  <a:spcAft>
+                    <a:spcPts val="800"/>
+                  </a:spcAft>
+                </a:pPr>
+                <a:r>
+                  <a:rPr lang="en-US" sz="1100" dirty="0">
+                    <a:effectLst/>
+                    <a:latin typeface="Calibri" panose="020F0502020204030204" pitchFamily="34" charset="0"/>
+                    <a:ea typeface="DengXian" panose="02010600030101010101" pitchFamily="2" charset="-122"/>
+                    <a:cs typeface="Times New Roman" panose="02020603050405020304" pitchFamily="18" charset="0"/>
+                  </a:rPr>
+                  <a:t>Next, we have:</a:t>
+                </a:r>
+              </a:p>
+              <a:p>
+                <a:pPr algn="ctr">
+                  <a:lnSpc>
+                    <a:spcPct val="107000"/>
+                  </a:lnSpc>
+                  <a:spcAft>
+                    <a:spcPts val="800"/>
+                  </a:spcAft>
+                </a:pPr>
+                <a14:m>
+                  <m:oMath xmlns:m="http://schemas.openxmlformats.org/officeDocument/2006/math">
+                    <m:d>
+                      <m:dPr>
+                        <m:ctrlPr>
+                          <a:rPr lang="en-US" sz="1100" i="1">
+                            <a:effectLst/>
+                            <a:latin typeface="Cambria Math" panose="02040503050406030204" pitchFamily="18" charset="0"/>
+                            <a:ea typeface="DengXian" panose="02010600030101010101" pitchFamily="2" charset="-122"/>
+                            <a:cs typeface="Times New Roman" panose="02020603050405020304" pitchFamily="18" charset="0"/>
+                          </a:rPr>
+                        </m:ctrlPr>
+                      </m:dPr>
+                      <m:e>
+                        <m:m>
+                          <m:mPr>
+                            <m:mcs>
+                              <m:mc>
+                                <m:mcPr>
+                                  <m:count m:val="1"/>
+                                  <m:mcJc m:val="center"/>
+                                </m:mcPr>
+                              </m:mc>
+                            </m:mcs>
+                            <m:ctrlPr>
+                              <a:rPr lang="en-US" sz="1100" i="1">
+                                <a:effectLst/>
+                                <a:latin typeface="Cambria Math" panose="02040503050406030204" pitchFamily="18" charset="0"/>
+                                <a:ea typeface="DengXian" panose="02010600030101010101" pitchFamily="2" charset="-122"/>
+                                <a:cs typeface="Times New Roman" panose="02020603050405020304" pitchFamily="18" charset="0"/>
+                              </a:rPr>
+                            </m:ctrlPr>
+                          </m:mPr>
+                          <m:mr>
+                            <m:e>
+                              <m:r>
+                                <a:rPr lang="en-US" sz="1100" i="1">
+                                  <a:effectLst/>
+                                  <a:latin typeface="Cambria Math" panose="02040503050406030204" pitchFamily="18" charset="0"/>
+                                  <a:ea typeface="DengXian" panose="02010600030101010101" pitchFamily="2" charset="-122"/>
+                                  <a:cs typeface="Times New Roman" panose="02020603050405020304" pitchFamily="18" charset="0"/>
+                                </a:rPr>
+                                <m:t>𝑎</m:t>
+                              </m:r>
+                            </m:e>
+                          </m:mr>
+                          <m:mr>
+                            <m:e>
+                              <m:r>
+                                <a:rPr lang="en-US" sz="1100" i="1">
+                                  <a:effectLst/>
+                                  <a:latin typeface="Cambria Math" panose="02040503050406030204" pitchFamily="18" charset="0"/>
+                                  <a:ea typeface="DengXian" panose="02010600030101010101" pitchFamily="2" charset="-122"/>
+                                  <a:cs typeface="Times New Roman" panose="02020603050405020304" pitchFamily="18" charset="0"/>
+                                </a:rPr>
+                                <m:t>𝑏</m:t>
+                              </m:r>
+                            </m:e>
+                          </m:mr>
+                          <m:mr>
+                            <m:e>
+                              <m:r>
+                                <a:rPr lang="en-US" sz="1100" i="1">
+                                  <a:effectLst/>
+                                  <a:latin typeface="Cambria Math" panose="02040503050406030204" pitchFamily="18" charset="0"/>
+                                  <a:ea typeface="DengXian" panose="02010600030101010101" pitchFamily="2" charset="-122"/>
+                                  <a:cs typeface="Times New Roman" panose="02020603050405020304" pitchFamily="18" charset="0"/>
+                                </a:rPr>
+                                <m:t>𝑐</m:t>
+                              </m:r>
+                            </m:e>
+                          </m:mr>
+                        </m:m>
+                      </m:e>
+                    </m:d>
+                    <m:r>
+                      <a:rPr lang="en-US" sz="1100" i="1">
+                        <a:effectLst/>
+                        <a:latin typeface="Cambria Math" panose="02040503050406030204" pitchFamily="18" charset="0"/>
+                        <a:ea typeface="DengXian" panose="02010600030101010101" pitchFamily="2" charset="-122"/>
+                        <a:cs typeface="Times New Roman" panose="02020603050405020304" pitchFamily="18" charset="0"/>
+                      </a:rPr>
+                      <m:t>=</m:t>
+                    </m:r>
+                    <m:d>
+                      <m:dPr>
+                        <m:ctrlPr>
+                          <a:rPr lang="en-US" sz="1100" i="1">
+                            <a:effectLst/>
+                            <a:latin typeface="Cambria Math" panose="02040503050406030204" pitchFamily="18" charset="0"/>
+                            <a:ea typeface="DengXian" panose="02010600030101010101" pitchFamily="2" charset="-122"/>
+                            <a:cs typeface="Times New Roman" panose="02020603050405020304" pitchFamily="18" charset="0"/>
+                          </a:rPr>
+                        </m:ctrlPr>
+                      </m:dPr>
+                      <m:e>
+                        <m:m>
+                          <m:mPr>
+                            <m:mcs>
+                              <m:mc>
+                                <m:mcPr>
+                                  <m:count m:val="1"/>
+                                  <m:mcJc m:val="center"/>
+                                </m:mcPr>
+                              </m:mc>
+                            </m:mcs>
+                            <m:ctrlPr>
+                              <a:rPr lang="en-US" sz="1100" i="1">
+                                <a:effectLst/>
+                                <a:latin typeface="Cambria Math" panose="02040503050406030204" pitchFamily="18" charset="0"/>
+                                <a:ea typeface="DengXian" panose="02010600030101010101" pitchFamily="2" charset="-122"/>
+                                <a:cs typeface="Times New Roman" panose="02020603050405020304" pitchFamily="18" charset="0"/>
+                              </a:rPr>
+                            </m:ctrlPr>
+                          </m:mPr>
+                          <m:mr>
+                            <m:e>
+                              <m:sSub>
+                                <m:sSubPr>
+                                  <m:ctrlPr>
+                                    <a:rPr lang="en-US" sz="1100" i="1">
+                                      <a:effectLst/>
+                                      <a:latin typeface="Cambria Math" panose="02040503050406030204" pitchFamily="18" charset="0"/>
+                                      <a:ea typeface="DengXian" panose="02010600030101010101" pitchFamily="2" charset="-122"/>
+                                      <a:cs typeface="Times New Roman" panose="02020603050405020304" pitchFamily="18" charset="0"/>
+                                    </a:rPr>
+                                  </m:ctrlPr>
+                                </m:sSubPr>
+                                <m:e>
+                                  <m:r>
+                                    <a:rPr lang="en-US" sz="1100" i="1">
+                                      <a:effectLst/>
+                                      <a:latin typeface="Cambria Math" panose="02040503050406030204" pitchFamily="18" charset="0"/>
+                                      <a:ea typeface="DengXian" panose="02010600030101010101" pitchFamily="2" charset="-122"/>
+                                      <a:cs typeface="Times New Roman" panose="02020603050405020304" pitchFamily="18" charset="0"/>
+                                    </a:rPr>
+                                    <m:t>𝑎</m:t>
+                                  </m:r>
+                                </m:e>
+                                <m:sub>
+                                  <m:r>
+                                    <a:rPr lang="en-US" sz="1100">
+                                      <a:effectLst/>
+                                      <a:latin typeface="Cambria Math" panose="02040503050406030204" pitchFamily="18" charset="0"/>
+                                      <a:ea typeface="DengXian" panose="02010600030101010101" pitchFamily="2" charset="-122"/>
+                                      <a:cs typeface="Times New Roman" panose="02020603050405020304" pitchFamily="18" charset="0"/>
+                                    </a:rPr>
+                                    <m:t>0</m:t>
+                                  </m:r>
+                                </m:sub>
+                              </m:sSub>
+                            </m:e>
+                          </m:mr>
+                          <m:mr>
+                            <m:e>
+                              <m:sSub>
+                                <m:sSubPr>
+                                  <m:ctrlPr>
+                                    <a:rPr lang="en-US" sz="1100" i="1">
+                                      <a:effectLst/>
+                                      <a:latin typeface="Cambria Math" panose="02040503050406030204" pitchFamily="18" charset="0"/>
+                                      <a:ea typeface="DengXian" panose="02010600030101010101" pitchFamily="2" charset="-122"/>
+                                      <a:cs typeface="Times New Roman" panose="02020603050405020304" pitchFamily="18" charset="0"/>
+                                    </a:rPr>
+                                  </m:ctrlPr>
+                                </m:sSubPr>
+                                <m:e>
+                                  <m:r>
+                                    <a:rPr lang="en-US" sz="1100" i="1">
+                                      <a:effectLst/>
+                                      <a:latin typeface="Cambria Math" panose="02040503050406030204" pitchFamily="18" charset="0"/>
+                                      <a:ea typeface="DengXian" panose="02010600030101010101" pitchFamily="2" charset="-122"/>
+                                      <a:cs typeface="Times New Roman" panose="02020603050405020304" pitchFamily="18" charset="0"/>
+                                    </a:rPr>
+                                    <m:t>𝑏</m:t>
+                                  </m:r>
+                                </m:e>
+                                <m:sub>
+                                  <m:r>
+                                    <a:rPr lang="en-US" sz="1100" i="1">
+                                      <a:effectLst/>
+                                      <a:latin typeface="Cambria Math" panose="02040503050406030204" pitchFamily="18" charset="0"/>
+                                      <a:ea typeface="DengXian" panose="02010600030101010101" pitchFamily="2" charset="-122"/>
+                                      <a:cs typeface="Times New Roman" panose="02020603050405020304" pitchFamily="18" charset="0"/>
+                                    </a:rPr>
+                                    <m:t>0</m:t>
+                                  </m:r>
+                                </m:sub>
+                              </m:sSub>
+                            </m:e>
+                          </m:mr>
+                          <m:mr>
+                            <m:e>
+                              <m:sSub>
+                                <m:sSubPr>
+                                  <m:ctrlPr>
+                                    <a:rPr lang="en-US" sz="1100" i="1">
+                                      <a:effectLst/>
+                                      <a:latin typeface="Cambria Math" panose="02040503050406030204" pitchFamily="18" charset="0"/>
+                                      <a:ea typeface="DengXian" panose="02010600030101010101" pitchFamily="2" charset="-122"/>
+                                      <a:cs typeface="Times New Roman" panose="02020603050405020304" pitchFamily="18" charset="0"/>
+                                    </a:rPr>
+                                  </m:ctrlPr>
+                                </m:sSubPr>
+                                <m:e>
+                                  <m:r>
+                                    <a:rPr lang="en-US" sz="1100" i="1">
+                                      <a:effectLst/>
+                                      <a:latin typeface="Cambria Math" panose="02040503050406030204" pitchFamily="18" charset="0"/>
+                                      <a:ea typeface="DengXian" panose="02010600030101010101" pitchFamily="2" charset="-122"/>
+                                      <a:cs typeface="Times New Roman" panose="02020603050405020304" pitchFamily="18" charset="0"/>
+                                    </a:rPr>
+                                    <m:t>𝑐</m:t>
+                                  </m:r>
+                                </m:e>
+                                <m:sub>
+                                  <m:r>
+                                    <a:rPr lang="en-US" sz="1100" i="1">
+                                      <a:effectLst/>
+                                      <a:latin typeface="Cambria Math" panose="02040503050406030204" pitchFamily="18" charset="0"/>
+                                      <a:ea typeface="DengXian" panose="02010600030101010101" pitchFamily="2" charset="-122"/>
+                                      <a:cs typeface="Times New Roman" panose="02020603050405020304" pitchFamily="18" charset="0"/>
+                                    </a:rPr>
+                                    <m:t>0</m:t>
+                                  </m:r>
+                                </m:sub>
+                              </m:sSub>
+                            </m:e>
+                          </m:mr>
+                        </m:m>
+                      </m:e>
+                    </m:d>
+                    <m:r>
+                      <a:rPr lang="en-US" sz="1100" i="1">
+                        <a:effectLst/>
+                        <a:latin typeface="Cambria Math" panose="02040503050406030204" pitchFamily="18" charset="0"/>
+                        <a:ea typeface="DengXian" panose="02010600030101010101" pitchFamily="2" charset="-122"/>
+                        <a:cs typeface="Times New Roman" panose="02020603050405020304" pitchFamily="18" charset="0"/>
+                      </a:rPr>
+                      <m:t>−</m:t>
+                    </m:r>
+                    <m:d>
+                      <m:dPr>
+                        <m:ctrlPr>
+                          <a:rPr lang="en-US" sz="1100" i="1">
+                            <a:effectLst/>
+                            <a:latin typeface="Cambria Math" panose="02040503050406030204" pitchFamily="18" charset="0"/>
+                            <a:ea typeface="DengXian" panose="02010600030101010101" pitchFamily="2" charset="-122"/>
+                            <a:cs typeface="Times New Roman" panose="02020603050405020304" pitchFamily="18" charset="0"/>
+                          </a:rPr>
+                        </m:ctrlPr>
+                      </m:dPr>
+                      <m:e>
+                        <m:m>
+                          <m:mPr>
+                            <m:mcs>
+                              <m:mc>
+                                <m:mcPr>
+                                  <m:count m:val="1"/>
+                                  <m:mcJc m:val="center"/>
+                                </m:mcPr>
+                              </m:mc>
+                            </m:mcs>
+                            <m:ctrlPr>
+                              <a:rPr lang="en-US" sz="1100" i="1">
+                                <a:effectLst/>
+                                <a:latin typeface="Cambria Math" panose="02040503050406030204" pitchFamily="18" charset="0"/>
+                                <a:ea typeface="DengXian" panose="02010600030101010101" pitchFamily="2" charset="-122"/>
+                                <a:cs typeface="Times New Roman" panose="02020603050405020304" pitchFamily="18" charset="0"/>
+                              </a:rPr>
+                            </m:ctrlPr>
+                          </m:mPr>
+                          <m:mr>
+                            <m:e>
+                              <m:r>
+                                <m:rPr>
+                                  <m:sty m:val="p"/>
+                                </m:rPr>
+                                <a:rPr lang="en-US" sz="1100">
+                                  <a:effectLst/>
+                                  <a:latin typeface="Cambria Math" panose="02040503050406030204" pitchFamily="18" charset="0"/>
+                                  <a:ea typeface="DengXian" panose="02010600030101010101" pitchFamily="2" charset="-122"/>
+                                  <a:cs typeface="Times New Roman" panose="02020603050405020304" pitchFamily="18" charset="0"/>
+                                </a:rPr>
+                                <m:t>Δ</m:t>
+                              </m:r>
+                              <m:r>
+                                <a:rPr lang="en-US" sz="1100" i="1">
+                                  <a:effectLst/>
+                                  <a:latin typeface="Cambria Math" panose="02040503050406030204" pitchFamily="18" charset="0"/>
+                                  <a:ea typeface="DengXian" panose="02010600030101010101" pitchFamily="2" charset="-122"/>
+                                  <a:cs typeface="Times New Roman" panose="02020603050405020304" pitchFamily="18" charset="0"/>
+                                </a:rPr>
+                                <m:t>𝑎</m:t>
+                              </m:r>
+                            </m:e>
+                          </m:mr>
+                          <m:mr>
+                            <m:e>
+                              <m:r>
+                                <m:rPr>
+                                  <m:sty m:val="p"/>
+                                </m:rPr>
+                                <a:rPr lang="en-US" sz="1100">
+                                  <a:effectLst/>
+                                  <a:latin typeface="Cambria Math" panose="02040503050406030204" pitchFamily="18" charset="0"/>
+                                  <a:ea typeface="DengXian" panose="02010600030101010101" pitchFamily="2" charset="-122"/>
+                                  <a:cs typeface="Times New Roman" panose="02020603050405020304" pitchFamily="18" charset="0"/>
+                                </a:rPr>
+                                <m:t>Δ</m:t>
+                              </m:r>
+                              <m:r>
+                                <a:rPr lang="en-US" sz="1100" i="1">
+                                  <a:effectLst/>
+                                  <a:latin typeface="Cambria Math" panose="02040503050406030204" pitchFamily="18" charset="0"/>
+                                  <a:ea typeface="DengXian" panose="02010600030101010101" pitchFamily="2" charset="-122"/>
+                                  <a:cs typeface="Times New Roman" panose="02020603050405020304" pitchFamily="18" charset="0"/>
+                                </a:rPr>
+                                <m:t>𝑏</m:t>
+                              </m:r>
+                            </m:e>
+                          </m:mr>
+                          <m:mr>
+                            <m:e>
+                              <m:r>
+                                <m:rPr>
+                                  <m:sty m:val="p"/>
+                                </m:rPr>
+                                <a:rPr lang="en-US" sz="1100">
+                                  <a:effectLst/>
+                                  <a:latin typeface="Cambria Math" panose="02040503050406030204" pitchFamily="18" charset="0"/>
+                                  <a:ea typeface="DengXian" panose="02010600030101010101" pitchFamily="2" charset="-122"/>
+                                  <a:cs typeface="Times New Roman" panose="02020603050405020304" pitchFamily="18" charset="0"/>
+                                </a:rPr>
+                                <m:t>Δ</m:t>
+                              </m:r>
+                              <m:r>
+                                <a:rPr lang="en-US" sz="1100" i="1">
+                                  <a:effectLst/>
+                                  <a:latin typeface="Cambria Math" panose="02040503050406030204" pitchFamily="18" charset="0"/>
+                                  <a:ea typeface="DengXian" panose="02010600030101010101" pitchFamily="2" charset="-122"/>
+                                  <a:cs typeface="Times New Roman" panose="02020603050405020304" pitchFamily="18" charset="0"/>
+                                </a:rPr>
+                                <m:t>𝑐</m:t>
+                              </m:r>
+                            </m:e>
+                          </m:mr>
+                        </m:m>
+                      </m:e>
+                    </m:d>
+                    <m:r>
+                      <a:rPr lang="en-US" sz="1100" i="1">
+                        <a:effectLst/>
+                        <a:latin typeface="Cambria Math" panose="02040503050406030204" pitchFamily="18" charset="0"/>
+                        <a:ea typeface="DengXian" panose="02010600030101010101" pitchFamily="2" charset="-122"/>
+                        <a:cs typeface="Times New Roman" panose="02020603050405020304" pitchFamily="18" charset="0"/>
+                      </a:rPr>
+                      <m:t>=</m:t>
+                    </m:r>
+                    <m:d>
+                      <m:dPr>
+                        <m:ctrlPr>
+                          <a:rPr lang="en-US" sz="1100" i="1">
+                            <a:effectLst/>
+                            <a:latin typeface="Cambria Math" panose="02040503050406030204" pitchFamily="18" charset="0"/>
+                            <a:ea typeface="DengXian" panose="02010600030101010101" pitchFamily="2" charset="-122"/>
+                            <a:cs typeface="Times New Roman" panose="02020603050405020304" pitchFamily="18" charset="0"/>
+                          </a:rPr>
+                        </m:ctrlPr>
+                      </m:dPr>
+                      <m:e>
+                        <m:m>
+                          <m:mPr>
+                            <m:mcs>
+                              <m:mc>
+                                <m:mcPr>
+                                  <m:count m:val="1"/>
+                                  <m:mcJc m:val="center"/>
+                                </m:mcPr>
+                              </m:mc>
+                            </m:mcs>
+                            <m:ctrlPr>
+                              <a:rPr lang="en-US" sz="1100" i="1">
+                                <a:effectLst/>
+                                <a:latin typeface="Cambria Math" panose="02040503050406030204" pitchFamily="18" charset="0"/>
+                                <a:ea typeface="DengXian" panose="02010600030101010101" pitchFamily="2" charset="-122"/>
+                                <a:cs typeface="Times New Roman" panose="02020603050405020304" pitchFamily="18" charset="0"/>
+                              </a:rPr>
+                            </m:ctrlPr>
+                          </m:mPr>
+                          <m:mr>
+                            <m:e>
+                              <m:sSub>
+                                <m:sSubPr>
+                                  <m:ctrlPr>
+                                    <a:rPr lang="en-US" sz="1100" i="1">
+                                      <a:effectLst/>
+                                      <a:latin typeface="Cambria Math" panose="02040503050406030204" pitchFamily="18" charset="0"/>
+                                      <a:ea typeface="DengXian" panose="02010600030101010101" pitchFamily="2" charset="-122"/>
+                                      <a:cs typeface="Times New Roman" panose="02020603050405020304" pitchFamily="18" charset="0"/>
+                                    </a:rPr>
+                                  </m:ctrlPr>
+                                </m:sSubPr>
+                                <m:e>
+                                  <m:r>
+                                    <a:rPr lang="en-US" sz="1100" i="1">
+                                      <a:effectLst/>
+                                      <a:latin typeface="Cambria Math" panose="02040503050406030204" pitchFamily="18" charset="0"/>
+                                      <a:ea typeface="DengXian" panose="02010600030101010101" pitchFamily="2" charset="-122"/>
+                                      <a:cs typeface="Times New Roman" panose="02020603050405020304" pitchFamily="18" charset="0"/>
+                                    </a:rPr>
+                                    <m:t>𝑎</m:t>
+                                  </m:r>
+                                </m:e>
+                                <m:sub>
+                                  <m:r>
+                                    <a:rPr lang="en-US" sz="1100">
+                                      <a:effectLst/>
+                                      <a:latin typeface="Cambria Math" panose="02040503050406030204" pitchFamily="18" charset="0"/>
+                                      <a:ea typeface="DengXian" panose="02010600030101010101" pitchFamily="2" charset="-122"/>
+                                      <a:cs typeface="Times New Roman" panose="02020603050405020304" pitchFamily="18" charset="0"/>
+                                    </a:rPr>
+                                    <m:t>0</m:t>
+                                  </m:r>
+                                </m:sub>
+                              </m:sSub>
+                            </m:e>
+                          </m:mr>
+                          <m:mr>
+                            <m:e>
+                              <m:sSub>
+                                <m:sSubPr>
+                                  <m:ctrlPr>
+                                    <a:rPr lang="en-US" sz="1100" i="1">
+                                      <a:effectLst/>
+                                      <a:latin typeface="Cambria Math" panose="02040503050406030204" pitchFamily="18" charset="0"/>
+                                      <a:ea typeface="DengXian" panose="02010600030101010101" pitchFamily="2" charset="-122"/>
+                                      <a:cs typeface="Times New Roman" panose="02020603050405020304" pitchFamily="18" charset="0"/>
+                                    </a:rPr>
+                                  </m:ctrlPr>
+                                </m:sSubPr>
+                                <m:e>
+                                  <m:r>
+                                    <a:rPr lang="en-US" sz="1100" i="1">
+                                      <a:effectLst/>
+                                      <a:latin typeface="Cambria Math" panose="02040503050406030204" pitchFamily="18" charset="0"/>
+                                      <a:ea typeface="DengXian" panose="02010600030101010101" pitchFamily="2" charset="-122"/>
+                                      <a:cs typeface="Times New Roman" panose="02020603050405020304" pitchFamily="18" charset="0"/>
+                                    </a:rPr>
+                                    <m:t>𝑏</m:t>
+                                  </m:r>
+                                </m:e>
+                                <m:sub>
+                                  <m:r>
+                                    <a:rPr lang="en-US" sz="1100" i="1">
+                                      <a:effectLst/>
+                                      <a:latin typeface="Cambria Math" panose="02040503050406030204" pitchFamily="18" charset="0"/>
+                                      <a:ea typeface="DengXian" panose="02010600030101010101" pitchFamily="2" charset="-122"/>
+                                      <a:cs typeface="Times New Roman" panose="02020603050405020304" pitchFamily="18" charset="0"/>
+                                    </a:rPr>
+                                    <m:t>0</m:t>
+                                  </m:r>
+                                </m:sub>
+                              </m:sSub>
+                            </m:e>
+                          </m:mr>
+                          <m:mr>
+                            <m:e>
+                              <m:sSub>
+                                <m:sSubPr>
+                                  <m:ctrlPr>
+                                    <a:rPr lang="en-US" sz="1100" i="1">
+                                      <a:effectLst/>
+                                      <a:latin typeface="Cambria Math" panose="02040503050406030204" pitchFamily="18" charset="0"/>
+                                      <a:ea typeface="DengXian" panose="02010600030101010101" pitchFamily="2" charset="-122"/>
+                                      <a:cs typeface="Times New Roman" panose="02020603050405020304" pitchFamily="18" charset="0"/>
+                                    </a:rPr>
+                                  </m:ctrlPr>
+                                </m:sSubPr>
+                                <m:e>
+                                  <m:r>
+                                    <a:rPr lang="en-US" sz="1100" i="1">
+                                      <a:effectLst/>
+                                      <a:latin typeface="Cambria Math" panose="02040503050406030204" pitchFamily="18" charset="0"/>
+                                      <a:ea typeface="DengXian" panose="02010600030101010101" pitchFamily="2" charset="-122"/>
+                                      <a:cs typeface="Times New Roman" panose="02020603050405020304" pitchFamily="18" charset="0"/>
+                                    </a:rPr>
+                                    <m:t>𝑐</m:t>
+                                  </m:r>
+                                </m:e>
+                                <m:sub>
+                                  <m:r>
+                                    <a:rPr lang="en-US" sz="1100" i="1">
+                                      <a:effectLst/>
+                                      <a:latin typeface="Cambria Math" panose="02040503050406030204" pitchFamily="18" charset="0"/>
+                                      <a:ea typeface="DengXian" panose="02010600030101010101" pitchFamily="2" charset="-122"/>
+                                      <a:cs typeface="Times New Roman" panose="02020603050405020304" pitchFamily="18" charset="0"/>
+                                    </a:rPr>
+                                    <m:t>0</m:t>
+                                  </m:r>
+                                </m:sub>
+                              </m:sSub>
+                            </m:e>
+                          </m:mr>
+                        </m:m>
+                      </m:e>
+                    </m:d>
+                    <m:r>
+                      <a:rPr lang="en-US" sz="1100" i="1">
+                        <a:effectLst/>
+                        <a:latin typeface="Cambria Math" panose="02040503050406030204" pitchFamily="18" charset="0"/>
+                        <a:ea typeface="DengXian" panose="02010600030101010101" pitchFamily="2" charset="-122"/>
+                        <a:cs typeface="Times New Roman" panose="02020603050405020304" pitchFamily="18" charset="0"/>
+                      </a:rPr>
+                      <m:t>−</m:t>
+                    </m:r>
+                    <m:r>
+                      <m:rPr>
+                        <m:sty m:val="p"/>
+                      </m:rPr>
+                      <a:rPr lang="en-US" sz="1100">
+                        <a:effectLst/>
+                        <a:latin typeface="Cambria Math" panose="02040503050406030204" pitchFamily="18" charset="0"/>
+                        <a:ea typeface="DengXian" panose="02010600030101010101" pitchFamily="2" charset="-122"/>
+                        <a:cs typeface="Times New Roman" panose="02020603050405020304" pitchFamily="18" charset="0"/>
+                      </a:rPr>
+                      <m:t>∇</m:t>
+                    </m:r>
+                    <m:sSup>
+                      <m:sSupPr>
+                        <m:ctrlPr>
+                          <a:rPr lang="en-US" sz="1100" i="1">
+                            <a:effectLst/>
+                            <a:latin typeface="Cambria Math" panose="02040503050406030204" pitchFamily="18" charset="0"/>
+                            <a:ea typeface="DengXian" panose="02010600030101010101" pitchFamily="2" charset="-122"/>
+                            <a:cs typeface="Times New Roman" panose="02020603050405020304" pitchFamily="18" charset="0"/>
+                          </a:rPr>
+                        </m:ctrlPr>
+                      </m:sSupPr>
+                      <m:e>
+                        <m:r>
+                          <a:rPr lang="en-US" sz="1100" i="1">
+                            <a:effectLst/>
+                            <a:latin typeface="Cambria Math" panose="02040503050406030204" pitchFamily="18" charset="0"/>
+                            <a:ea typeface="DengXian" panose="02010600030101010101" pitchFamily="2" charset="-122"/>
+                            <a:cs typeface="Times New Roman" panose="02020603050405020304" pitchFamily="18" charset="0"/>
+                          </a:rPr>
+                          <m:t>𝑓</m:t>
+                        </m:r>
+                      </m:e>
+                      <m:sup>
+                        <m:r>
+                          <a:rPr lang="en-US" sz="1100" i="1">
+                            <a:effectLst/>
+                            <a:latin typeface="Cambria Math" panose="02040503050406030204" pitchFamily="18" charset="0"/>
+                            <a:ea typeface="DengXian" panose="02010600030101010101" pitchFamily="2" charset="-122"/>
+                            <a:cs typeface="Times New Roman" panose="02020603050405020304" pitchFamily="18" charset="0"/>
+                          </a:rPr>
+                          <m:t>−1</m:t>
+                        </m:r>
+                      </m:sup>
+                    </m:sSup>
+                    <m:r>
+                      <a:rPr lang="en-US" sz="1100" i="1">
+                        <a:effectLst/>
+                        <a:latin typeface="Cambria Math" panose="02040503050406030204" pitchFamily="18" charset="0"/>
+                        <a:ea typeface="DengXian" panose="02010600030101010101" pitchFamily="2" charset="-122"/>
+                        <a:cs typeface="Times New Roman" panose="02020603050405020304" pitchFamily="18" charset="0"/>
+                      </a:rPr>
+                      <m:t>⋅</m:t>
+                    </m:r>
+                    <m:d>
+                      <m:dPr>
+                        <m:ctrlPr>
+                          <a:rPr lang="en-US" sz="1100" i="1">
+                            <a:effectLst/>
+                            <a:latin typeface="Cambria Math" panose="02040503050406030204" pitchFamily="18" charset="0"/>
+                            <a:ea typeface="DengXian" panose="02010600030101010101" pitchFamily="2" charset="-122"/>
+                            <a:cs typeface="Times New Roman" panose="02020603050405020304" pitchFamily="18" charset="0"/>
+                          </a:rPr>
+                        </m:ctrlPr>
+                      </m:dPr>
+                      <m:e>
+                        <m:m>
+                          <m:mPr>
+                            <m:mcs>
+                              <m:mc>
+                                <m:mcPr>
+                                  <m:count m:val="1"/>
+                                  <m:mcJc m:val="center"/>
+                                </m:mcPr>
+                              </m:mc>
+                            </m:mcs>
+                            <m:ctrlPr>
+                              <a:rPr lang="en-US" sz="1100" i="1">
+                                <a:effectLst/>
+                                <a:latin typeface="Cambria Math" panose="02040503050406030204" pitchFamily="18" charset="0"/>
+                                <a:ea typeface="DengXian" panose="02010600030101010101" pitchFamily="2" charset="-122"/>
+                                <a:cs typeface="Times New Roman" panose="02020603050405020304" pitchFamily="18" charset="0"/>
+                              </a:rPr>
+                            </m:ctrlPr>
+                          </m:mPr>
+                          <m:mr>
+                            <m:e>
+                              <m:sSub>
+                                <m:sSubPr>
+                                  <m:ctrlPr>
+                                    <a:rPr lang="en-US" sz="1100" i="1">
+                                      <a:effectLst/>
+                                      <a:latin typeface="Cambria Math" panose="02040503050406030204" pitchFamily="18" charset="0"/>
+                                      <a:ea typeface="DengXian" panose="02010600030101010101" pitchFamily="2" charset="-122"/>
+                                      <a:cs typeface="Times New Roman" panose="02020603050405020304" pitchFamily="18" charset="0"/>
+                                    </a:rPr>
+                                  </m:ctrlPr>
+                                </m:sSubPr>
+                                <m:e>
+                                  <m:r>
+                                    <m:rPr>
+                                      <m:sty m:val="p"/>
+                                    </m:rPr>
+                                    <a:rPr lang="en-US" sz="1100">
+                                      <a:effectLst/>
+                                      <a:latin typeface="Cambria Math" panose="02040503050406030204" pitchFamily="18" charset="0"/>
+                                      <a:ea typeface="DengXian" panose="02010600030101010101" pitchFamily="2" charset="-122"/>
+                                      <a:cs typeface="Times New Roman" panose="02020603050405020304" pitchFamily="18" charset="0"/>
+                                    </a:rPr>
+                                    <m:t>E</m:t>
+                                  </m:r>
+                                </m:e>
+                                <m:sub>
+                                  <m:r>
+                                    <a:rPr lang="en-US" sz="1100">
+                                      <a:effectLst/>
+                                      <a:latin typeface="Cambria Math" panose="02040503050406030204" pitchFamily="18" charset="0"/>
+                                      <a:ea typeface="DengXian" panose="02010600030101010101" pitchFamily="2" charset="-122"/>
+                                      <a:cs typeface="Times New Roman" panose="02020603050405020304" pitchFamily="18" charset="0"/>
+                                    </a:rPr>
+                                    <m:t>1</m:t>
+                                  </m:r>
+                                </m:sub>
+                              </m:sSub>
+                            </m:e>
+                          </m:mr>
+                          <m:mr>
+                            <m:e>
+                              <m:sSub>
+                                <m:sSubPr>
+                                  <m:ctrlPr>
+                                    <a:rPr lang="en-US" sz="1100" i="1">
+                                      <a:effectLst/>
+                                      <a:latin typeface="Cambria Math" panose="02040503050406030204" pitchFamily="18" charset="0"/>
+                                      <a:ea typeface="DengXian" panose="02010600030101010101" pitchFamily="2" charset="-122"/>
+                                      <a:cs typeface="Times New Roman" panose="02020603050405020304" pitchFamily="18" charset="0"/>
+                                    </a:rPr>
+                                  </m:ctrlPr>
+                                </m:sSubPr>
+                                <m:e>
+                                  <m:r>
+                                    <m:rPr>
+                                      <m:sty m:val="p"/>
+                                    </m:rPr>
+                                    <a:rPr lang="en-US" sz="1100">
+                                      <a:effectLst/>
+                                      <a:latin typeface="Cambria Math" panose="02040503050406030204" pitchFamily="18" charset="0"/>
+                                      <a:ea typeface="DengXian" panose="02010600030101010101" pitchFamily="2" charset="-122"/>
+                                      <a:cs typeface="Times New Roman" panose="02020603050405020304" pitchFamily="18" charset="0"/>
+                                    </a:rPr>
+                                    <m:t>E</m:t>
+                                  </m:r>
+                                </m:e>
+                                <m:sub>
+                                  <m:r>
+                                    <a:rPr lang="en-US" sz="1100">
+                                      <a:effectLst/>
+                                      <a:latin typeface="Cambria Math" panose="02040503050406030204" pitchFamily="18" charset="0"/>
+                                      <a:ea typeface="DengXian" panose="02010600030101010101" pitchFamily="2" charset="-122"/>
+                                      <a:cs typeface="Times New Roman" panose="02020603050405020304" pitchFamily="18" charset="0"/>
+                                    </a:rPr>
+                                    <m:t>2</m:t>
+                                  </m:r>
+                                </m:sub>
+                              </m:sSub>
+                            </m:e>
+                          </m:mr>
+                          <m:mr>
+                            <m:e>
+                              <m:sSub>
+                                <m:sSubPr>
+                                  <m:ctrlPr>
+                                    <a:rPr lang="en-US" sz="1100" i="1">
+                                      <a:effectLst/>
+                                      <a:latin typeface="Cambria Math" panose="02040503050406030204" pitchFamily="18" charset="0"/>
+                                      <a:ea typeface="DengXian" panose="02010600030101010101" pitchFamily="2" charset="-122"/>
+                                      <a:cs typeface="Times New Roman" panose="02020603050405020304" pitchFamily="18" charset="0"/>
+                                    </a:rPr>
+                                  </m:ctrlPr>
+                                </m:sSubPr>
+                                <m:e>
+                                  <m:r>
+                                    <m:rPr>
+                                      <m:sty m:val="p"/>
+                                    </m:rPr>
+                                    <a:rPr lang="en-US" sz="1100">
+                                      <a:effectLst/>
+                                      <a:latin typeface="Cambria Math" panose="02040503050406030204" pitchFamily="18" charset="0"/>
+                                      <a:ea typeface="DengXian" panose="02010600030101010101" pitchFamily="2" charset="-122"/>
+                                      <a:cs typeface="Times New Roman" panose="02020603050405020304" pitchFamily="18" charset="0"/>
+                                    </a:rPr>
+                                    <m:t>E</m:t>
+                                  </m:r>
+                                </m:e>
+                                <m:sub>
+                                  <m:r>
+                                    <a:rPr lang="en-US" sz="1100">
+                                      <a:effectLst/>
+                                      <a:latin typeface="Cambria Math" panose="02040503050406030204" pitchFamily="18" charset="0"/>
+                                      <a:ea typeface="DengXian" panose="02010600030101010101" pitchFamily="2" charset="-122"/>
+                                      <a:cs typeface="Times New Roman" panose="02020603050405020304" pitchFamily="18" charset="0"/>
+                                    </a:rPr>
+                                    <m:t>3</m:t>
+                                  </m:r>
+                                </m:sub>
+                              </m:sSub>
+                            </m:e>
+                          </m:mr>
+                        </m:m>
+                      </m:e>
+                    </m:d>
+                  </m:oMath>
+                </a14:m>
+                <a:r>
+                  <a:rPr lang="en-US" sz="1100" dirty="0">
+                    <a:effectLst/>
+                    <a:latin typeface="Calibri" panose="020F0502020204030204" pitchFamily="34" charset="0"/>
+                    <a:ea typeface="DengXian" panose="02010600030101010101" pitchFamily="2" charset="-122"/>
+                    <a:cs typeface="Times New Roman" panose="02020603050405020304" pitchFamily="18" charset="0"/>
+                  </a:rPr>
+                  <a:t>.</a:t>
+                </a:r>
+              </a:p>
+              <a:p>
+                <a:pPr>
+                  <a:lnSpc>
+                    <a:spcPct val="107000"/>
+                  </a:lnSpc>
+                  <a:spcAft>
+                    <a:spcPts val="800"/>
+                  </a:spcAft>
+                </a:pPr>
+                <a:r>
+                  <a:rPr lang="en-US" sz="1100" dirty="0">
+                    <a:effectLst/>
+                    <a:latin typeface="Calibri" panose="020F0502020204030204" pitchFamily="34" charset="0"/>
+                    <a:ea typeface="DengXian" panose="02010600030101010101" pitchFamily="2" charset="-122"/>
+                    <a:cs typeface="Times New Roman" panose="02020603050405020304" pitchFamily="18" charset="0"/>
+                  </a:rPr>
+                  <a:t>By iterating this process, we conclude values for </a:t>
+                </a:r>
+                <a14:m>
+                  <m:oMath xmlns:m="http://schemas.openxmlformats.org/officeDocument/2006/math">
+                    <m:r>
+                      <a:rPr lang="en-US" sz="1100" i="1">
+                        <a:effectLst/>
+                        <a:latin typeface="Cambria Math" panose="02040503050406030204" pitchFamily="18" charset="0"/>
+                        <a:ea typeface="DengXian" panose="02010600030101010101" pitchFamily="2" charset="-122"/>
+                        <a:cs typeface="Times New Roman" panose="02020603050405020304" pitchFamily="18" charset="0"/>
+                      </a:rPr>
+                      <m:t>𝑎</m:t>
+                    </m:r>
+                    <m:r>
+                      <a:rPr lang="en-US" sz="1100" i="1">
+                        <a:effectLst/>
+                        <a:latin typeface="Cambria Math" panose="02040503050406030204" pitchFamily="18" charset="0"/>
+                        <a:ea typeface="DengXian" panose="02010600030101010101" pitchFamily="2" charset="-122"/>
+                        <a:cs typeface="Times New Roman" panose="02020603050405020304" pitchFamily="18" charset="0"/>
+                      </a:rPr>
+                      <m:t>, </m:t>
+                    </m:r>
+                    <m:r>
+                      <a:rPr lang="en-US" sz="1100" i="1">
+                        <a:effectLst/>
+                        <a:latin typeface="Cambria Math" panose="02040503050406030204" pitchFamily="18" charset="0"/>
+                        <a:ea typeface="DengXian" panose="02010600030101010101" pitchFamily="2" charset="-122"/>
+                        <a:cs typeface="Times New Roman" panose="02020603050405020304" pitchFamily="18" charset="0"/>
+                      </a:rPr>
+                      <m:t>𝑏</m:t>
+                    </m:r>
+                    <m:r>
+                      <a:rPr lang="en-US" sz="1100" i="1">
+                        <a:effectLst/>
+                        <a:latin typeface="Cambria Math" panose="02040503050406030204" pitchFamily="18" charset="0"/>
+                        <a:ea typeface="DengXian" panose="02010600030101010101" pitchFamily="2" charset="-122"/>
+                        <a:cs typeface="Times New Roman" panose="02020603050405020304" pitchFamily="18" charset="0"/>
+                      </a:rPr>
+                      <m:t>, </m:t>
+                    </m:r>
+                  </m:oMath>
+                </a14:m>
+                <a:r>
+                  <a:rPr lang="en-US" sz="1100" dirty="0">
+                    <a:effectLst/>
+                    <a:latin typeface="Calibri" panose="020F0502020204030204" pitchFamily="34" charset="0"/>
+                    <a:ea typeface="DengXian" panose="02010600030101010101" pitchFamily="2" charset="-122"/>
+                    <a:cs typeface="Times New Roman" panose="02020603050405020304" pitchFamily="18" charset="0"/>
+                  </a:rPr>
+                  <a:t>and </a:t>
+                </a:r>
+                <a14:m>
+                  <m:oMath xmlns:m="http://schemas.openxmlformats.org/officeDocument/2006/math">
+                    <m:r>
+                      <a:rPr lang="en-US" sz="1100" i="1">
+                        <a:effectLst/>
+                        <a:latin typeface="Cambria Math" panose="02040503050406030204" pitchFamily="18" charset="0"/>
+                        <a:ea typeface="DengXian" panose="02010600030101010101" pitchFamily="2" charset="-122"/>
+                        <a:cs typeface="Times New Roman" panose="02020603050405020304" pitchFamily="18" charset="0"/>
+                      </a:rPr>
+                      <m:t>𝑐</m:t>
+                    </m:r>
+                  </m:oMath>
+                </a14:m>
+                <a:r>
+                  <a:rPr lang="en-US" sz="1100" dirty="0">
+                    <a:effectLst/>
+                    <a:latin typeface="Calibri" panose="020F0502020204030204" pitchFamily="34" charset="0"/>
+                    <a:ea typeface="DengXian" panose="02010600030101010101" pitchFamily="2" charset="-122"/>
+                    <a:cs typeface="Times New Roman" panose="02020603050405020304" pitchFamily="18" charset="0"/>
+                  </a:rPr>
+                  <a:t> when E1, E2, and E3 are sufficiently small.</a:t>
+                </a:r>
+              </a:p>
+            </p:txBody>
+          </p:sp>
+        </mc:Choice>
+        <mc:Fallback>
+          <p:sp>
+            <p:nvSpPr>
+              <p:cNvPr id="3" name="文本框 2">
+                <a:extLst>
+                  <a:ext uri="{FF2B5EF4-FFF2-40B4-BE49-F238E27FC236}">
+                    <a16:creationId xmlns:a16="http://schemas.microsoft.com/office/drawing/2014/main" id="{2DE6FC31-F7BE-412D-A2F2-670F486DB4B2}"/>
+                  </a:ext>
+                </a:extLst>
+              </p:cNvPr>
+              <p:cNvSpPr txBox="1">
+                <a:spLocks noRot="1" noChangeAspect="1" noMove="1" noResize="1" noEditPoints="1" noAdjustHandles="1" noChangeArrowheads="1" noChangeShapeType="1" noTextEdit="1"/>
+              </p:cNvSpPr>
+              <p:nvPr/>
+            </p:nvSpPr>
+            <p:spPr>
+              <a:xfrm>
+                <a:off x="2647765" y="401059"/>
+                <a:ext cx="6094520" cy="5448286"/>
+              </a:xfrm>
+              <a:prstGeom prst="rect">
+                <a:avLst/>
+              </a:prstGeom>
+              <a:blipFill>
+                <a:blip r:embed="rId2"/>
+                <a:stretch>
+                  <a:fillRect/>
+                </a:stretch>
+              </a:blipFill>
+            </p:spPr>
+            <p:txBody>
+              <a:bodyPr/>
+              <a:lstStyle/>
+              <a:p>
+                <a:r>
+                  <a:rPr lang="en-US">
+                    <a:noFill/>
+                  </a:rPr>
+                  <a:t> </a:t>
+                </a:r>
+              </a:p>
+            </p:txBody>
+          </p:sp>
+        </mc:Fallback>
+      </mc:AlternateContent>
+    </p:spTree>
+    <p:extLst>
+      <p:ext uri="{BB962C8B-B14F-4D97-AF65-F5344CB8AC3E}">
+        <p14:creationId xmlns:p14="http://schemas.microsoft.com/office/powerpoint/2010/main" val="949738995"/>
       </p:ext>
     </p:extLst>
   </p:cSld>

</xml_diff>

<commit_message>
Specify DE solvers and syntax, adjust page style
</commit_message>
<xml_diff>
--- a/doc/illustrations.pptx
+++ b/doc/illustrations.pptx
@@ -7,6 +7,7 @@
   <p:sldIdLst>
     <p:sldId id="256" r:id="rId2"/>
     <p:sldId id="257" r:id="rId3"/>
+    <p:sldId id="258" r:id="rId4"/>
   </p:sldIdLst>
   <p:sldSz cx="12192000" cy="6858000"/>
   <p:notesSz cx="6858000" cy="9144000"/>
@@ -105,6 +106,11 @@
       </a:defRPr>
     </a:lvl9pPr>
   </p:defaultTextStyle>
+  <p:extLst>
+    <p:ext uri="{EFAFB233-063F-42B5-8137-9DF3F51BA10A}">
+      <p15:sldGuideLst xmlns:p15="http://schemas.microsoft.com/office/powerpoint/2012/main"/>
+    </p:ext>
+  </p:extLst>
 </p:presentation>
 </file>
 
@@ -257,7 +263,7 @@
           <a:p>
             <a:fld id="{82BB0895-06E8-4B53-88C8-0F0562CFD945}" type="datetimeFigureOut">
               <a:rPr lang="en-US" smtClean="0"/>
-              <a:t>7/12/2021</a:t>
+              <a:t>7/13/2021</a:t>
             </a:fld>
             <a:endParaRPr lang="en-US"/>
           </a:p>
@@ -457,7 +463,7 @@
           <a:p>
             <a:fld id="{82BB0895-06E8-4B53-88C8-0F0562CFD945}" type="datetimeFigureOut">
               <a:rPr lang="en-US" smtClean="0"/>
-              <a:t>7/12/2021</a:t>
+              <a:t>7/13/2021</a:t>
             </a:fld>
             <a:endParaRPr lang="en-US"/>
           </a:p>
@@ -667,7 +673,7 @@
           <a:p>
             <a:fld id="{82BB0895-06E8-4B53-88C8-0F0562CFD945}" type="datetimeFigureOut">
               <a:rPr lang="en-US" smtClean="0"/>
-              <a:t>7/12/2021</a:t>
+              <a:t>7/13/2021</a:t>
             </a:fld>
             <a:endParaRPr lang="en-US"/>
           </a:p>
@@ -867,7 +873,7 @@
           <a:p>
             <a:fld id="{82BB0895-06E8-4B53-88C8-0F0562CFD945}" type="datetimeFigureOut">
               <a:rPr lang="en-US" smtClean="0"/>
-              <a:t>7/12/2021</a:t>
+              <a:t>7/13/2021</a:t>
             </a:fld>
             <a:endParaRPr lang="en-US"/>
           </a:p>
@@ -1143,7 +1149,7 @@
           <a:p>
             <a:fld id="{82BB0895-06E8-4B53-88C8-0F0562CFD945}" type="datetimeFigureOut">
               <a:rPr lang="en-US" smtClean="0"/>
-              <a:t>7/12/2021</a:t>
+              <a:t>7/13/2021</a:t>
             </a:fld>
             <a:endParaRPr lang="en-US"/>
           </a:p>
@@ -1411,7 +1417,7 @@
           <a:p>
             <a:fld id="{82BB0895-06E8-4B53-88C8-0F0562CFD945}" type="datetimeFigureOut">
               <a:rPr lang="en-US" smtClean="0"/>
-              <a:t>7/12/2021</a:t>
+              <a:t>7/13/2021</a:t>
             </a:fld>
             <a:endParaRPr lang="en-US"/>
           </a:p>
@@ -1826,7 +1832,7 @@
           <a:p>
             <a:fld id="{82BB0895-06E8-4B53-88C8-0F0562CFD945}" type="datetimeFigureOut">
               <a:rPr lang="en-US" smtClean="0"/>
-              <a:t>7/12/2021</a:t>
+              <a:t>7/13/2021</a:t>
             </a:fld>
             <a:endParaRPr lang="en-US"/>
           </a:p>
@@ -1968,7 +1974,7 @@
           <a:p>
             <a:fld id="{82BB0895-06E8-4B53-88C8-0F0562CFD945}" type="datetimeFigureOut">
               <a:rPr lang="en-US" smtClean="0"/>
-              <a:t>7/12/2021</a:t>
+              <a:t>7/13/2021</a:t>
             </a:fld>
             <a:endParaRPr lang="en-US"/>
           </a:p>
@@ -2081,7 +2087,7 @@
           <a:p>
             <a:fld id="{82BB0895-06E8-4B53-88C8-0F0562CFD945}" type="datetimeFigureOut">
               <a:rPr lang="en-US" smtClean="0"/>
-              <a:t>7/12/2021</a:t>
+              <a:t>7/13/2021</a:t>
             </a:fld>
             <a:endParaRPr lang="en-US"/>
           </a:p>
@@ -2394,7 +2400,7 @@
           <a:p>
             <a:fld id="{82BB0895-06E8-4B53-88C8-0F0562CFD945}" type="datetimeFigureOut">
               <a:rPr lang="en-US" smtClean="0"/>
-              <a:t>7/12/2021</a:t>
+              <a:t>7/13/2021</a:t>
             </a:fld>
             <a:endParaRPr lang="en-US"/>
           </a:p>
@@ -2683,7 +2689,7 @@
           <a:p>
             <a:fld id="{82BB0895-06E8-4B53-88C8-0F0562CFD945}" type="datetimeFigureOut">
               <a:rPr lang="en-US" smtClean="0"/>
-              <a:t>7/12/2021</a:t>
+              <a:t>7/13/2021</a:t>
             </a:fld>
             <a:endParaRPr lang="en-US"/>
           </a:p>
@@ -2926,7 +2932,7 @@
           <a:p>
             <a:fld id="{82BB0895-06E8-4B53-88C8-0F0562CFD945}" type="datetimeFigureOut">
               <a:rPr lang="en-US" smtClean="0"/>
-              <a:t>7/12/2021</a:t>
+              <a:t>7/13/2021</a:t>
             </a:fld>
             <a:endParaRPr lang="en-US"/>
           </a:p>
@@ -3343,8 +3349,8 @@
           <a:chExt cx="0" cy="0"/>
         </a:xfrm>
       </p:grpSpPr>
-      <mc:AlternateContent xmlns:mc="http://schemas.openxmlformats.org/markup-compatibility/2006">
-        <mc:Choice xmlns:a14="http://schemas.microsoft.com/office/drawing/2010/main" Requires="a14">
+      <mc:AlternateContent xmlns:mc="http://schemas.openxmlformats.org/markup-compatibility/2006" xmlns:a14="http://schemas.microsoft.com/office/drawing/2010/main">
+        <mc:Choice Requires="a14">
           <p:sp>
             <p:nvSpPr>
               <p:cNvPr id="6" name="文本占位符 5">
@@ -3414,7 +3420,6 @@
                 <a:endParaRPr lang="en-US" dirty="0"/>
               </a:p>
               <a:p>
-                <a:pPr/>
                 <a:endParaRPr lang="en-US" b="0" i="1" dirty="0">
                   <a:latin typeface="Cambria Math" panose="02040503050406030204" pitchFamily="18" charset="0"/>
                 </a:endParaRPr>
@@ -3451,7 +3456,6 @@
                 <a:endParaRPr lang="en-US" dirty="0"/>
               </a:p>
               <a:p>
-                <a:pPr/>
                 <a:endParaRPr lang="en-US" dirty="0"/>
               </a:p>
               <a:p>
@@ -3500,7 +3504,7 @@
             </p:txBody>
           </p:sp>
         </mc:Choice>
-        <mc:Fallback>
+        <mc:Fallback xmlns="">
           <p:sp>
             <p:nvSpPr>
               <p:cNvPr id="6" name="文本占位符 5">
@@ -3611,8 +3615,8 @@
             <a:chExt cx="3197233" cy="3161568"/>
           </a:xfrm>
         </p:grpSpPr>
-        <mc:AlternateContent xmlns:mc="http://schemas.openxmlformats.org/markup-compatibility/2006">
-          <mc:Choice xmlns:a14="http://schemas.microsoft.com/office/drawing/2010/main" Requires="a14">
+        <mc:AlternateContent xmlns:mc="http://schemas.openxmlformats.org/markup-compatibility/2006" xmlns:a14="http://schemas.microsoft.com/office/drawing/2010/main">
+          <mc:Choice Requires="a14">
             <p:sp>
               <p:nvSpPr>
                 <p:cNvPr id="13" name="矩形: 圆角 12">
@@ -3688,7 +3692,7 @@
               </p:txBody>
             </p:sp>
           </mc:Choice>
-          <mc:Fallback>
+          <mc:Fallback xmlns="">
             <p:sp>
               <p:nvSpPr>
                 <p:cNvPr id="13" name="矩形: 圆角 12">
@@ -3734,8 +3738,8 @@
             </p:sp>
           </mc:Fallback>
         </mc:AlternateContent>
-        <mc:AlternateContent xmlns:mc="http://schemas.openxmlformats.org/markup-compatibility/2006">
-          <mc:Choice xmlns:a14="http://schemas.microsoft.com/office/drawing/2010/main" Requires="a14">
+        <mc:AlternateContent xmlns:mc="http://schemas.openxmlformats.org/markup-compatibility/2006" xmlns:a14="http://schemas.microsoft.com/office/drawing/2010/main">
+          <mc:Choice Requires="a14">
             <p:sp>
               <p:nvSpPr>
                 <p:cNvPr id="14" name="矩形: 圆角 13">
@@ -3811,7 +3815,7 @@
               </p:txBody>
             </p:sp>
           </mc:Choice>
-          <mc:Fallback>
+          <mc:Fallback xmlns="">
             <p:sp>
               <p:nvSpPr>
                 <p:cNvPr id="14" name="矩形: 圆角 13">
@@ -3857,8 +3861,8 @@
             </p:sp>
           </mc:Fallback>
         </mc:AlternateContent>
-        <mc:AlternateContent xmlns:mc="http://schemas.openxmlformats.org/markup-compatibility/2006">
-          <mc:Choice xmlns:a14="http://schemas.microsoft.com/office/drawing/2010/main" Requires="a14">
+        <mc:AlternateContent xmlns:mc="http://schemas.openxmlformats.org/markup-compatibility/2006" xmlns:a14="http://schemas.microsoft.com/office/drawing/2010/main">
+          <mc:Choice Requires="a14">
             <p:sp>
               <p:nvSpPr>
                 <p:cNvPr id="15" name="矩形: 圆角 14">
@@ -3934,7 +3938,7 @@
               </p:txBody>
             </p:sp>
           </mc:Choice>
-          <mc:Fallback>
+          <mc:Fallback xmlns="">
             <p:sp>
               <p:nvSpPr>
                 <p:cNvPr id="15" name="矩形: 圆角 14">
@@ -4292,8 +4296,8 @@
           <a:chExt cx="0" cy="0"/>
         </a:xfrm>
       </p:grpSpPr>
-      <mc:AlternateContent xmlns:mc="http://schemas.openxmlformats.org/markup-compatibility/2006">
-        <mc:Choice xmlns:a14="http://schemas.microsoft.com/office/drawing/2010/main" Requires="a14">
+      <mc:AlternateContent xmlns:mc="http://schemas.openxmlformats.org/markup-compatibility/2006" xmlns:a14="http://schemas.microsoft.com/office/drawing/2010/main">
+        <mc:Choice Requires="a14">
           <p:sp>
             <p:nvSpPr>
               <p:cNvPr id="3" name="文本框 2">
@@ -7498,7 +7502,7 @@
             </p:txBody>
           </p:sp>
         </mc:Choice>
-        <mc:Fallback>
+        <mc:Fallback xmlns="">
           <p:sp>
             <p:nvSpPr>
               <p:cNvPr id="3" name="文本框 2">
@@ -7547,6 +7551,878 @@
     <p:extLst>
       <p:ext uri="{BB962C8B-B14F-4D97-AF65-F5344CB8AC3E}">
         <p14:creationId xmlns:p14="http://schemas.microsoft.com/office/powerpoint/2010/main" val="949738995"/>
+      </p:ext>
+    </p:extLst>
+  </p:cSld>
+  <p:clrMapOvr>
+    <a:masterClrMapping/>
+  </p:clrMapOvr>
+</p:sld>
+</file>
+
+<file path=ppt/slides/slide3.xml><?xml version="1.0" encoding="utf-8"?>
+<p:sld xmlns:a="http://schemas.openxmlformats.org/drawingml/2006/main" xmlns:r="http://schemas.openxmlformats.org/officeDocument/2006/relationships" xmlns:p="http://schemas.openxmlformats.org/presentationml/2006/main">
+  <p:cSld>
+    <p:spTree>
+      <p:nvGrpSpPr>
+        <p:cNvPr id="1" name=""/>
+        <p:cNvGrpSpPr/>
+        <p:nvPr/>
+      </p:nvGrpSpPr>
+      <p:grpSpPr>
+        <a:xfrm>
+          <a:off x="0" y="0"/>
+          <a:ext cx="0" cy="0"/>
+          <a:chOff x="0" y="0"/>
+          <a:chExt cx="0" cy="0"/>
+        </a:xfrm>
+      </p:grpSpPr>
+      <mc:AlternateContent xmlns:mc="http://schemas.openxmlformats.org/markup-compatibility/2006">
+        <mc:Choice xmlns:a14="http://schemas.microsoft.com/office/drawing/2010/main" Requires="a14">
+          <p:sp>
+            <p:nvSpPr>
+              <p:cNvPr id="2" name="文本框 1">
+                <a:extLst>
+                  <a:ext uri="{FF2B5EF4-FFF2-40B4-BE49-F238E27FC236}">
+                    <a16:creationId xmlns:a16="http://schemas.microsoft.com/office/drawing/2014/main" id="{ECD253FA-614A-4753-8F28-478203EA42D9}"/>
+                  </a:ext>
+                </a:extLst>
+              </p:cNvPr>
+              <p:cNvSpPr txBox="1"/>
+              <p:nvPr/>
+            </p:nvSpPr>
+            <p:spPr>
+              <a:xfrm>
+                <a:off x="4110362" y="2201661"/>
+                <a:ext cx="2068496" cy="384529"/>
+              </a:xfrm>
+              <a:prstGeom prst="rect">
+                <a:avLst/>
+              </a:prstGeom>
+              <a:solidFill>
+                <a:schemeClr val="accent6">
+                  <a:lumMod val="60000"/>
+                  <a:lumOff val="40000"/>
+                </a:schemeClr>
+              </a:solidFill>
+            </p:spPr>
+            <p:txBody>
+              <a:bodyPr wrap="square" rtlCol="0">
+                <a:spAutoFit/>
+              </a:bodyPr>
+              <a:lstStyle/>
+              <a:p>
+                <a:pPr/>
+                <a14:m>
+                  <m:oMathPara xmlns:m="http://schemas.openxmlformats.org/officeDocument/2006/math">
+                    <m:oMathParaPr>
+                      <m:jc m:val="left"/>
+                    </m:oMathParaPr>
+                    <m:oMath xmlns:m="http://schemas.openxmlformats.org/officeDocument/2006/math">
+                      <m:f>
+                        <m:fPr>
+                          <m:ctrlPr>
+                            <a:rPr lang="en-US" sz="1000" b="0" i="1" smtClean="0">
+                              <a:latin typeface="Cambria Math" panose="02040503050406030204" pitchFamily="18" charset="0"/>
+                            </a:rPr>
+                          </m:ctrlPr>
+                        </m:fPr>
+                        <m:num>
+                          <m:r>
+                            <a:rPr lang="en-US" sz="1000" b="0" i="1" smtClean="0">
+                              <a:latin typeface="Cambria Math" panose="02040503050406030204" pitchFamily="18" charset="0"/>
+                            </a:rPr>
+                            <m:t>𝑑𝑦</m:t>
+                          </m:r>
+                        </m:num>
+                        <m:den>
+                          <m:r>
+                            <a:rPr lang="en-US" sz="1000" b="0" i="1" smtClean="0">
+                              <a:latin typeface="Cambria Math" panose="02040503050406030204" pitchFamily="18" charset="0"/>
+                            </a:rPr>
+                            <m:t>𝑑𝑥</m:t>
+                          </m:r>
+                        </m:den>
+                      </m:f>
+                      <m:r>
+                        <a:rPr lang="en-US" sz="1000" b="0" i="1" smtClean="0">
+                          <a:latin typeface="Cambria Math" panose="02040503050406030204" pitchFamily="18" charset="0"/>
+                        </a:rPr>
+                        <m:t>=</m:t>
+                      </m:r>
+                      <m:r>
+                        <a:rPr lang="en-US" sz="1000" b="0" i="1" smtClean="0">
+                          <a:latin typeface="Cambria Math" panose="02040503050406030204" pitchFamily="18" charset="0"/>
+                        </a:rPr>
+                        <m:t>𝑦</m:t>
+                      </m:r>
+                      <m:r>
+                        <a:rPr lang="en-US" sz="1000" b="0" i="1" smtClean="0">
+                          <a:latin typeface="Cambria Math" panose="02040503050406030204" pitchFamily="18" charset="0"/>
+                        </a:rPr>
+                        <m:t>+</m:t>
+                      </m:r>
+                      <m:r>
+                        <a:rPr lang="en-US" sz="1000" b="0" i="1" smtClean="0">
+                          <a:latin typeface="Cambria Math" panose="02040503050406030204" pitchFamily="18" charset="0"/>
+                        </a:rPr>
+                        <m:t>𝑥</m:t>
+                      </m:r>
+                      <m:r>
+                        <a:rPr lang="en-US" sz="1000" b="0" i="1" smtClean="0">
+                          <a:latin typeface="Cambria Math" panose="02040503050406030204" pitchFamily="18" charset="0"/>
+                        </a:rPr>
+                        <m:t> </m:t>
+                      </m:r>
+                      <m:r>
+                        <m:rPr>
+                          <m:sty m:val="p"/>
+                        </m:rPr>
+                        <a:rPr lang="en-US" sz="1000" b="0" i="1" smtClean="0">
+                          <a:latin typeface="Cambria Math" panose="02040503050406030204" pitchFamily="18" charset="0"/>
+                        </a:rPr>
+                        <m:t>cos</m:t>
+                      </m:r>
+                      <m:d>
+                        <m:dPr>
+                          <m:ctrlPr>
+                            <a:rPr lang="en-US" sz="1000" b="0" i="1" smtClean="0">
+                              <a:latin typeface="Cambria Math" panose="02040503050406030204" pitchFamily="18" charset="0"/>
+                            </a:rPr>
+                          </m:ctrlPr>
+                        </m:dPr>
+                        <m:e>
+                          <m:r>
+                            <a:rPr lang="en-US" sz="1000" b="0" i="1" smtClean="0">
+                              <a:latin typeface="Cambria Math" panose="02040503050406030204" pitchFamily="18" charset="0"/>
+                            </a:rPr>
+                            <m:t>𝑦</m:t>
+                          </m:r>
+                        </m:e>
+                      </m:d>
+                      <m:r>
+                        <a:rPr lang="en-US" sz="1000" b="0" i="1" smtClean="0">
+                          <a:latin typeface="Cambria Math" panose="02040503050406030204" pitchFamily="18" charset="0"/>
+                        </a:rPr>
+                        <m:t>−</m:t>
+                      </m:r>
+                      <m:sSup>
+                        <m:sSupPr>
+                          <m:ctrlPr>
+                            <a:rPr lang="en-US" sz="1000" b="0" i="1" smtClean="0">
+                              <a:latin typeface="Cambria Math" panose="02040503050406030204" pitchFamily="18" charset="0"/>
+                            </a:rPr>
+                          </m:ctrlPr>
+                        </m:sSupPr>
+                        <m:e>
+                          <m:r>
+                            <a:rPr lang="en-US" sz="1000" b="0" i="1" smtClean="0">
+                              <a:latin typeface="Cambria Math" panose="02040503050406030204" pitchFamily="18" charset="0"/>
+                            </a:rPr>
+                            <m:t>𝑒</m:t>
+                          </m:r>
+                        </m:e>
+                        <m:sup>
+                          <m:r>
+                            <a:rPr lang="en-US" sz="1000" b="0" i="1" smtClean="0">
+                              <a:latin typeface="Cambria Math" panose="02040503050406030204" pitchFamily="18" charset="0"/>
+                            </a:rPr>
+                            <m:t>𝑦</m:t>
+                          </m:r>
+                        </m:sup>
+                      </m:sSup>
+                    </m:oMath>
+                  </m:oMathPara>
+                </a14:m>
+                <a:endParaRPr lang="en-US" sz="1000" dirty="0"/>
+              </a:p>
+            </p:txBody>
+          </p:sp>
+        </mc:Choice>
+        <mc:Fallback>
+          <p:sp>
+            <p:nvSpPr>
+              <p:cNvPr id="2" name="文本框 1">
+                <a:extLst>
+                  <a:ext uri="{FF2B5EF4-FFF2-40B4-BE49-F238E27FC236}">
+                    <a16:creationId xmlns:a16="http://schemas.microsoft.com/office/drawing/2014/main" id="{ECD253FA-614A-4753-8F28-478203EA42D9}"/>
+                  </a:ext>
+                </a:extLst>
+              </p:cNvPr>
+              <p:cNvSpPr txBox="1">
+                <a:spLocks noRot="1" noChangeAspect="1" noMove="1" noResize="1" noEditPoints="1" noAdjustHandles="1" noChangeArrowheads="1" noChangeShapeType="1" noTextEdit="1"/>
+              </p:cNvSpPr>
+              <p:nvPr/>
+            </p:nvSpPr>
+            <p:spPr>
+              <a:xfrm>
+                <a:off x="4110362" y="2201661"/>
+                <a:ext cx="2068496" cy="384529"/>
+              </a:xfrm>
+              <a:prstGeom prst="rect">
+                <a:avLst/>
+              </a:prstGeom>
+              <a:blipFill>
+                <a:blip r:embed="rId2"/>
+                <a:stretch>
+                  <a:fillRect/>
+                </a:stretch>
+              </a:blipFill>
+            </p:spPr>
+            <p:txBody>
+              <a:bodyPr/>
+              <a:lstStyle/>
+              <a:p>
+                <a:r>
+                  <a:rPr lang="en-US">
+                    <a:noFill/>
+                  </a:rPr>
+                  <a:t> </a:t>
+                </a:r>
+              </a:p>
+            </p:txBody>
+          </p:sp>
+        </mc:Fallback>
+      </mc:AlternateContent>
+      <mc:AlternateContent xmlns:mc="http://schemas.openxmlformats.org/markup-compatibility/2006">
+        <mc:Choice xmlns:a14="http://schemas.microsoft.com/office/drawing/2010/main" Requires="a14">
+          <p:sp>
+            <p:nvSpPr>
+              <p:cNvPr id="3" name="文本框 2">
+                <a:extLst>
+                  <a:ext uri="{FF2B5EF4-FFF2-40B4-BE49-F238E27FC236}">
+                    <a16:creationId xmlns:a16="http://schemas.microsoft.com/office/drawing/2014/main" id="{A2D5E775-5D19-433B-A403-8239F10A5EC1}"/>
+                  </a:ext>
+                </a:extLst>
+              </p:cNvPr>
+              <p:cNvSpPr txBox="1"/>
+              <p:nvPr/>
+            </p:nvSpPr>
+            <p:spPr>
+              <a:xfrm>
+                <a:off x="4110361" y="3328300"/>
+                <a:ext cx="2068497" cy="468526"/>
+              </a:xfrm>
+              <a:prstGeom prst="rect">
+                <a:avLst/>
+              </a:prstGeom>
+              <a:solidFill>
+                <a:schemeClr val="accent4">
+                  <a:lumMod val="60000"/>
+                  <a:lumOff val="40000"/>
+                </a:schemeClr>
+              </a:solidFill>
+            </p:spPr>
+            <p:txBody>
+              <a:bodyPr wrap="square" rtlCol="0">
+                <a:spAutoFit/>
+              </a:bodyPr>
+              <a:lstStyle/>
+              <a:p>
+                <a:pPr/>
+                <a14:m>
+                  <m:oMathPara xmlns:m="http://schemas.openxmlformats.org/officeDocument/2006/math">
+                    <m:oMathParaPr>
+                      <m:jc m:val="left"/>
+                    </m:oMathParaPr>
+                    <m:oMath xmlns:m="http://schemas.openxmlformats.org/officeDocument/2006/math">
+                      <m:r>
+                        <a:rPr lang="en-US" sz="1000" b="0" i="1" smtClean="0">
+                          <a:latin typeface="Cambria Math" panose="02040503050406030204" pitchFamily="18" charset="0"/>
+                        </a:rPr>
+                        <m:t>𝑥</m:t>
+                      </m:r>
+                      <m:sSup>
+                        <m:sSupPr>
+                          <m:ctrlPr>
+                            <a:rPr lang="en-US" sz="1000" b="0" i="1" smtClean="0">
+                              <a:latin typeface="Cambria Math" panose="02040503050406030204" pitchFamily="18" charset="0"/>
+                            </a:rPr>
+                          </m:ctrlPr>
+                        </m:sSupPr>
+                        <m:e>
+                          <m:d>
+                            <m:dPr>
+                              <m:ctrlPr>
+                                <a:rPr lang="en-US" sz="1000" b="0" i="1" smtClean="0">
+                                  <a:latin typeface="Cambria Math" panose="02040503050406030204" pitchFamily="18" charset="0"/>
+                                </a:rPr>
+                              </m:ctrlPr>
+                            </m:dPr>
+                            <m:e>
+                              <m:f>
+                                <m:fPr>
+                                  <m:ctrlPr>
+                                    <a:rPr lang="en-US" sz="1000" b="0" i="1" smtClean="0">
+                                      <a:latin typeface="Cambria Math" panose="02040503050406030204" pitchFamily="18" charset="0"/>
+                                    </a:rPr>
+                                  </m:ctrlPr>
+                                </m:fPr>
+                                <m:num>
+                                  <m:r>
+                                    <a:rPr lang="en-US" sz="1000" b="0" i="1" smtClean="0">
+                                      <a:latin typeface="Cambria Math" panose="02040503050406030204" pitchFamily="18" charset="0"/>
+                                    </a:rPr>
+                                    <m:t>𝑑𝑦</m:t>
+                                  </m:r>
+                                </m:num>
+                                <m:den>
+                                  <m:r>
+                                    <a:rPr lang="en-US" sz="1000" b="0" i="1" smtClean="0">
+                                      <a:latin typeface="Cambria Math" panose="02040503050406030204" pitchFamily="18" charset="0"/>
+                                    </a:rPr>
+                                    <m:t>𝑑𝑥</m:t>
+                                  </m:r>
+                                </m:den>
+                              </m:f>
+                            </m:e>
+                          </m:d>
+                        </m:e>
+                        <m:sup>
+                          <m:r>
+                            <a:rPr lang="en-US" sz="1000" b="0" i="1" smtClean="0">
+                              <a:latin typeface="Cambria Math" panose="02040503050406030204" pitchFamily="18" charset="0"/>
+                            </a:rPr>
+                            <m:t>3</m:t>
+                          </m:r>
+                        </m:sup>
+                      </m:sSup>
+                      <m:r>
+                        <a:rPr lang="en-US" sz="1000" b="0" i="1" smtClean="0">
+                          <a:latin typeface="Cambria Math" panose="02040503050406030204" pitchFamily="18" charset="0"/>
+                        </a:rPr>
+                        <m:t>−</m:t>
+                      </m:r>
+                      <m:func>
+                        <m:funcPr>
+                          <m:ctrlPr>
+                            <a:rPr lang="en-US" sz="1000" b="0" i="1" smtClean="0">
+                              <a:latin typeface="Cambria Math" panose="02040503050406030204" pitchFamily="18" charset="0"/>
+                            </a:rPr>
+                          </m:ctrlPr>
+                        </m:funcPr>
+                        <m:fName>
+                          <m:r>
+                            <m:rPr>
+                              <m:sty m:val="p"/>
+                            </m:rPr>
+                            <a:rPr lang="en-US" sz="1000" b="0" i="0" smtClean="0">
+                              <a:latin typeface="Cambria Math" panose="02040503050406030204" pitchFamily="18" charset="0"/>
+                            </a:rPr>
+                            <m:t>sin</m:t>
+                          </m:r>
+                        </m:fName>
+                        <m:e>
+                          <m:d>
+                            <m:dPr>
+                              <m:ctrlPr>
+                                <a:rPr lang="en-US" sz="1000" b="0" i="1" smtClean="0">
+                                  <a:latin typeface="Cambria Math" panose="02040503050406030204" pitchFamily="18" charset="0"/>
+                                </a:rPr>
+                              </m:ctrlPr>
+                            </m:dPr>
+                            <m:e>
+                              <m:f>
+                                <m:fPr>
+                                  <m:ctrlPr>
+                                    <a:rPr lang="en-US" sz="1000" b="0" i="1" smtClean="0">
+                                      <a:latin typeface="Cambria Math" panose="02040503050406030204" pitchFamily="18" charset="0"/>
+                                    </a:rPr>
+                                  </m:ctrlPr>
+                                </m:fPr>
+                                <m:num>
+                                  <m:r>
+                                    <a:rPr lang="en-US" sz="1000" b="0" i="1" smtClean="0">
+                                      <a:latin typeface="Cambria Math" panose="02040503050406030204" pitchFamily="18" charset="0"/>
+                                    </a:rPr>
+                                    <m:t>𝑑𝑦</m:t>
+                                  </m:r>
+                                </m:num>
+                                <m:den>
+                                  <m:r>
+                                    <a:rPr lang="en-US" sz="1000" b="0" i="1" smtClean="0">
+                                      <a:latin typeface="Cambria Math" panose="02040503050406030204" pitchFamily="18" charset="0"/>
+                                    </a:rPr>
+                                    <m:t>𝑑𝑥</m:t>
+                                  </m:r>
+                                </m:den>
+                              </m:f>
+                            </m:e>
+                          </m:d>
+                        </m:e>
+                      </m:func>
+                      <m:r>
+                        <a:rPr lang="en-US" sz="1000" b="0" i="1" smtClean="0">
+                          <a:latin typeface="Cambria Math" panose="02040503050406030204" pitchFamily="18" charset="0"/>
+                        </a:rPr>
+                        <m:t>=</m:t>
+                      </m:r>
+                      <m:sSup>
+                        <m:sSupPr>
+                          <m:ctrlPr>
+                            <a:rPr lang="en-US" sz="1000" b="0" i="1" smtClean="0">
+                              <a:latin typeface="Cambria Math" panose="02040503050406030204" pitchFamily="18" charset="0"/>
+                            </a:rPr>
+                          </m:ctrlPr>
+                        </m:sSupPr>
+                        <m:e>
+                          <m:r>
+                            <a:rPr lang="en-US" sz="1000" b="0" i="1" smtClean="0">
+                              <a:latin typeface="Cambria Math" panose="02040503050406030204" pitchFamily="18" charset="0"/>
+                            </a:rPr>
+                            <m:t>𝑦</m:t>
+                          </m:r>
+                        </m:e>
+                        <m:sup>
+                          <m:r>
+                            <a:rPr lang="en-US" sz="1000" b="0" i="1" smtClean="0">
+                              <a:latin typeface="Cambria Math" panose="02040503050406030204" pitchFamily="18" charset="0"/>
+                            </a:rPr>
+                            <m:t>2</m:t>
+                          </m:r>
+                        </m:sup>
+                      </m:sSup>
+                      <m:r>
+                        <a:rPr lang="en-US" sz="1000" b="0" i="1" smtClean="0">
+                          <a:latin typeface="Cambria Math" panose="02040503050406030204" pitchFamily="18" charset="0"/>
+                        </a:rPr>
+                        <m:t>+</m:t>
+                      </m:r>
+                      <m:func>
+                        <m:funcPr>
+                          <m:ctrlPr>
+                            <a:rPr lang="en-US" sz="1000" b="0" i="1" smtClean="0">
+                              <a:latin typeface="Cambria Math" panose="02040503050406030204" pitchFamily="18" charset="0"/>
+                            </a:rPr>
+                          </m:ctrlPr>
+                        </m:funcPr>
+                        <m:fName>
+                          <m:r>
+                            <m:rPr>
+                              <m:sty m:val="p"/>
+                            </m:rPr>
+                            <a:rPr lang="en-US" sz="1000" b="0" i="0" smtClean="0">
+                              <a:latin typeface="Cambria Math" panose="02040503050406030204" pitchFamily="18" charset="0"/>
+                            </a:rPr>
+                            <m:t>cos</m:t>
+                          </m:r>
+                        </m:fName>
+                        <m:e>
+                          <m:d>
+                            <m:dPr>
+                              <m:ctrlPr>
+                                <a:rPr lang="en-US" sz="1000" b="0" i="1" smtClean="0">
+                                  <a:latin typeface="Cambria Math" panose="02040503050406030204" pitchFamily="18" charset="0"/>
+                                </a:rPr>
+                              </m:ctrlPr>
+                            </m:dPr>
+                            <m:e>
+                              <m:r>
+                                <a:rPr lang="en-US" sz="1000" b="0" i="1" smtClean="0">
+                                  <a:latin typeface="Cambria Math" panose="02040503050406030204" pitchFamily="18" charset="0"/>
+                                </a:rPr>
+                                <m:t>𝑥</m:t>
+                              </m:r>
+                            </m:e>
+                          </m:d>
+                        </m:e>
+                      </m:func>
+                    </m:oMath>
+                  </m:oMathPara>
+                </a14:m>
+                <a:endParaRPr lang="en-US" sz="1000" dirty="0"/>
+              </a:p>
+            </p:txBody>
+          </p:sp>
+        </mc:Choice>
+        <mc:Fallback>
+          <p:sp>
+            <p:nvSpPr>
+              <p:cNvPr id="3" name="文本框 2">
+                <a:extLst>
+                  <a:ext uri="{FF2B5EF4-FFF2-40B4-BE49-F238E27FC236}">
+                    <a16:creationId xmlns:a16="http://schemas.microsoft.com/office/drawing/2014/main" id="{A2D5E775-5D19-433B-A403-8239F10A5EC1}"/>
+                  </a:ext>
+                </a:extLst>
+              </p:cNvPr>
+              <p:cNvSpPr txBox="1">
+                <a:spLocks noRot="1" noChangeAspect="1" noMove="1" noResize="1" noEditPoints="1" noAdjustHandles="1" noChangeArrowheads="1" noChangeShapeType="1" noTextEdit="1"/>
+              </p:cNvSpPr>
+              <p:nvPr/>
+            </p:nvSpPr>
+            <p:spPr>
+              <a:xfrm>
+                <a:off x="4110361" y="3328300"/>
+                <a:ext cx="2068497" cy="468526"/>
+              </a:xfrm>
+              <a:prstGeom prst="rect">
+                <a:avLst/>
+              </a:prstGeom>
+              <a:blipFill>
+                <a:blip r:embed="rId3"/>
+                <a:stretch>
+                  <a:fillRect/>
+                </a:stretch>
+              </a:blipFill>
+            </p:spPr>
+            <p:txBody>
+              <a:bodyPr/>
+              <a:lstStyle/>
+              <a:p>
+                <a:r>
+                  <a:rPr lang="en-US">
+                    <a:noFill/>
+                  </a:rPr>
+                  <a:t> </a:t>
+                </a:r>
+              </a:p>
+            </p:txBody>
+          </p:sp>
+        </mc:Fallback>
+      </mc:AlternateContent>
+      <mc:AlternateContent xmlns:mc="http://schemas.openxmlformats.org/markup-compatibility/2006">
+        <mc:Choice xmlns:a14="http://schemas.microsoft.com/office/drawing/2010/main" Requires="a14">
+          <p:sp>
+            <p:nvSpPr>
+              <p:cNvPr id="4" name="文本框 3">
+                <a:extLst>
+                  <a:ext uri="{FF2B5EF4-FFF2-40B4-BE49-F238E27FC236}">
+                    <a16:creationId xmlns:a16="http://schemas.microsoft.com/office/drawing/2014/main" id="{088A02B9-15FB-4BBE-A90E-3090844FAD13}"/>
+                  </a:ext>
+                </a:extLst>
+              </p:cNvPr>
+              <p:cNvSpPr txBox="1"/>
+              <p:nvPr/>
+            </p:nvSpPr>
+            <p:spPr>
+              <a:xfrm>
+                <a:off x="4110361" y="2691980"/>
+                <a:ext cx="2068497" cy="530530"/>
+              </a:xfrm>
+              <a:prstGeom prst="rect">
+                <a:avLst/>
+              </a:prstGeom>
+              <a:solidFill>
+                <a:schemeClr val="accent2">
+                  <a:lumMod val="60000"/>
+                  <a:lumOff val="40000"/>
+                </a:schemeClr>
+              </a:solidFill>
+            </p:spPr>
+            <p:txBody>
+              <a:bodyPr wrap="square" rtlCol="0">
+                <a:spAutoFit/>
+              </a:bodyPr>
+              <a:lstStyle/>
+              <a:p>
+                <a:pPr/>
+                <a14:m>
+                  <m:oMathPara xmlns:m="http://schemas.openxmlformats.org/officeDocument/2006/math">
+                    <m:oMathParaPr>
+                      <m:jc m:val="left"/>
+                    </m:oMathParaPr>
+                    <m:oMath xmlns:m="http://schemas.openxmlformats.org/officeDocument/2006/math">
+                      <m:f>
+                        <m:fPr>
+                          <m:ctrlPr>
+                            <a:rPr lang="en-US" sz="1000" b="0" i="1" smtClean="0">
+                              <a:latin typeface="Cambria Math" panose="02040503050406030204" pitchFamily="18" charset="0"/>
+                            </a:rPr>
+                          </m:ctrlPr>
+                        </m:fPr>
+                        <m:num>
+                          <m:sSup>
+                            <m:sSupPr>
+                              <m:ctrlPr>
+                                <a:rPr lang="en-US" sz="1000" b="0" i="1" smtClean="0">
+                                  <a:latin typeface="Cambria Math" panose="02040503050406030204" pitchFamily="18" charset="0"/>
+                                </a:rPr>
+                              </m:ctrlPr>
+                            </m:sSupPr>
+                            <m:e>
+                              <m:r>
+                                <a:rPr lang="en-US" sz="1000" b="0" i="1" smtClean="0">
+                                  <a:latin typeface="Cambria Math" panose="02040503050406030204" pitchFamily="18" charset="0"/>
+                                </a:rPr>
+                                <m:t>𝑥</m:t>
+                              </m:r>
+                            </m:e>
+                            <m:sup>
+                              <m:r>
+                                <a:rPr lang="en-US" sz="1000" b="0" i="1" smtClean="0">
+                                  <a:latin typeface="Cambria Math" panose="02040503050406030204" pitchFamily="18" charset="0"/>
+                                </a:rPr>
+                                <m:t>2</m:t>
+                              </m:r>
+                            </m:sup>
+                          </m:sSup>
+                        </m:num>
+                        <m:den>
+                          <m:f>
+                            <m:fPr>
+                              <m:ctrlPr>
+                                <a:rPr lang="en-US" sz="1000" b="0" i="1" smtClean="0">
+                                  <a:latin typeface="Cambria Math" panose="02040503050406030204" pitchFamily="18" charset="0"/>
+                                </a:rPr>
+                              </m:ctrlPr>
+                            </m:fPr>
+                            <m:num>
+                              <m:r>
+                                <a:rPr lang="en-US" sz="1000" b="0" i="1" smtClean="0">
+                                  <a:latin typeface="Cambria Math" panose="02040503050406030204" pitchFamily="18" charset="0"/>
+                                </a:rPr>
+                                <m:t>𝑑𝑦</m:t>
+                              </m:r>
+                            </m:num>
+                            <m:den>
+                              <m:r>
+                                <a:rPr lang="en-US" sz="1000" b="0" i="1" smtClean="0">
+                                  <a:latin typeface="Cambria Math" panose="02040503050406030204" pitchFamily="18" charset="0"/>
+                                </a:rPr>
+                                <m:t>𝑑𝑥</m:t>
+                              </m:r>
+                            </m:den>
+                          </m:f>
+                        </m:den>
+                      </m:f>
+                      <m:r>
+                        <a:rPr lang="en-US" sz="1000" b="0" i="1" smtClean="0">
+                          <a:latin typeface="Cambria Math" panose="02040503050406030204" pitchFamily="18" charset="0"/>
+                        </a:rPr>
+                        <m:t>+12</m:t>
+                      </m:r>
+                      <m:sSup>
+                        <m:sSupPr>
+                          <m:ctrlPr>
+                            <a:rPr lang="en-US" sz="1000" b="0" i="1" smtClean="0">
+                              <a:latin typeface="Cambria Math" panose="02040503050406030204" pitchFamily="18" charset="0"/>
+                            </a:rPr>
+                          </m:ctrlPr>
+                        </m:sSupPr>
+                        <m:e>
+                          <m:r>
+                            <a:rPr lang="en-US" sz="1000" b="0" i="1" smtClean="0">
+                              <a:latin typeface="Cambria Math" panose="02040503050406030204" pitchFamily="18" charset="0"/>
+                            </a:rPr>
+                            <m:t>𝑦</m:t>
+                          </m:r>
+                        </m:e>
+                        <m:sup>
+                          <m:r>
+                            <a:rPr lang="en-US" sz="1000" b="0" i="1" smtClean="0">
+                              <a:latin typeface="Cambria Math" panose="02040503050406030204" pitchFamily="18" charset="0"/>
+                            </a:rPr>
+                            <m:t>2</m:t>
+                          </m:r>
+                        </m:sup>
+                      </m:sSup>
+                      <m:r>
+                        <a:rPr lang="en-US" sz="1000" b="0" i="1" smtClean="0">
+                          <a:latin typeface="Cambria Math" panose="02040503050406030204" pitchFamily="18" charset="0"/>
+                        </a:rPr>
+                        <m:t>=</m:t>
+                      </m:r>
+                      <m:r>
+                        <m:rPr>
+                          <m:sty m:val="p"/>
+                        </m:rPr>
+                        <a:rPr lang="en-US" sz="1000" b="0" i="0" smtClean="0">
+                          <a:latin typeface="Cambria Math" panose="02040503050406030204" pitchFamily="18" charset="0"/>
+                        </a:rPr>
+                        <m:t>cos</m:t>
+                      </m:r>
+                      <m:r>
+                        <a:rPr lang="en-US" sz="1000" b="0" i="1" smtClean="0">
+                          <a:latin typeface="Cambria Math" panose="02040503050406030204" pitchFamily="18" charset="0"/>
+                        </a:rPr>
+                        <m:t>⁡(</m:t>
+                      </m:r>
+                      <m:r>
+                        <a:rPr lang="en-US" sz="1000" b="0" i="1" smtClean="0">
+                          <a:latin typeface="Cambria Math" panose="02040503050406030204" pitchFamily="18" charset="0"/>
+                        </a:rPr>
+                        <m:t>𝑥</m:t>
+                      </m:r>
+                      <m:r>
+                        <a:rPr lang="en-US" sz="1000" b="0" i="1" smtClean="0">
+                          <a:latin typeface="Cambria Math" panose="02040503050406030204" pitchFamily="18" charset="0"/>
+                        </a:rPr>
+                        <m:t>+</m:t>
+                      </m:r>
+                      <m:r>
+                        <a:rPr lang="en-US" sz="1000" b="0" i="1" smtClean="0">
+                          <a:latin typeface="Cambria Math" panose="02040503050406030204" pitchFamily="18" charset="0"/>
+                        </a:rPr>
+                        <m:t>𝑦</m:t>
+                      </m:r>
+                      <m:r>
+                        <a:rPr lang="en-US" sz="1000" b="0" i="1" smtClean="0">
+                          <a:latin typeface="Cambria Math" panose="02040503050406030204" pitchFamily="18" charset="0"/>
+                        </a:rPr>
+                        <m:t>)</m:t>
+                      </m:r>
+                    </m:oMath>
+                  </m:oMathPara>
+                </a14:m>
+                <a:endParaRPr lang="en-US" sz="1000" dirty="0"/>
+              </a:p>
+            </p:txBody>
+          </p:sp>
+        </mc:Choice>
+        <mc:Fallback>
+          <p:sp>
+            <p:nvSpPr>
+              <p:cNvPr id="4" name="文本框 3">
+                <a:extLst>
+                  <a:ext uri="{FF2B5EF4-FFF2-40B4-BE49-F238E27FC236}">
+                    <a16:creationId xmlns:a16="http://schemas.microsoft.com/office/drawing/2014/main" id="{088A02B9-15FB-4BBE-A90E-3090844FAD13}"/>
+                  </a:ext>
+                </a:extLst>
+              </p:cNvPr>
+              <p:cNvSpPr txBox="1">
+                <a:spLocks noRot="1" noChangeAspect="1" noMove="1" noResize="1" noEditPoints="1" noAdjustHandles="1" noChangeArrowheads="1" noChangeShapeType="1" noTextEdit="1"/>
+              </p:cNvSpPr>
+              <p:nvPr/>
+            </p:nvSpPr>
+            <p:spPr>
+              <a:xfrm>
+                <a:off x="4110361" y="2691980"/>
+                <a:ext cx="2068497" cy="530530"/>
+              </a:xfrm>
+              <a:prstGeom prst="rect">
+                <a:avLst/>
+              </a:prstGeom>
+              <a:blipFill>
+                <a:blip r:embed="rId4"/>
+                <a:stretch>
+                  <a:fillRect/>
+                </a:stretch>
+              </a:blipFill>
+            </p:spPr>
+            <p:txBody>
+              <a:bodyPr/>
+              <a:lstStyle/>
+              <a:p>
+                <a:r>
+                  <a:rPr lang="en-US">
+                    <a:noFill/>
+                  </a:rPr>
+                  <a:t> </a:t>
+                </a:r>
+              </a:p>
+            </p:txBody>
+          </p:sp>
+        </mc:Fallback>
+      </mc:AlternateContent>
+      <p:sp>
+        <p:nvSpPr>
+          <p:cNvPr id="5" name="文本框 4">
+            <a:extLst>
+              <a:ext uri="{FF2B5EF4-FFF2-40B4-BE49-F238E27FC236}">
+                <a16:creationId xmlns:a16="http://schemas.microsoft.com/office/drawing/2014/main" id="{4A8F9FD6-AC23-4187-AC12-0030FB10B228}"/>
+              </a:ext>
+            </a:extLst>
+          </p:cNvPr>
+          <p:cNvSpPr txBox="1"/>
+          <p:nvPr/>
+        </p:nvSpPr>
+        <p:spPr>
+          <a:xfrm>
+            <a:off x="6249880" y="2183220"/>
+            <a:ext cx="2192784" cy="430887"/>
+          </a:xfrm>
+          <a:prstGeom prst="rect">
+            <a:avLst/>
+          </a:prstGeom>
+          <a:noFill/>
+        </p:spPr>
+        <p:txBody>
+          <a:bodyPr wrap="square" rtlCol="0">
+            <a:spAutoFit/>
+          </a:bodyPr>
+          <a:lstStyle/>
+          <a:p>
+            <a:r>
+              <a:rPr lang="en-US" sz="1100" dirty="0"/>
+              <a:t>Recommended, low time complexity.</a:t>
+            </a:r>
+          </a:p>
+        </p:txBody>
+      </p:sp>
+      <p:sp>
+        <p:nvSpPr>
+          <p:cNvPr id="6" name="文本框 5">
+            <a:extLst>
+              <a:ext uri="{FF2B5EF4-FFF2-40B4-BE49-F238E27FC236}">
+                <a16:creationId xmlns:a16="http://schemas.microsoft.com/office/drawing/2014/main" id="{6B59C297-DC66-4B94-A343-E26CC337749D}"/>
+              </a:ext>
+            </a:extLst>
+          </p:cNvPr>
+          <p:cNvSpPr txBox="1"/>
+          <p:nvPr/>
+        </p:nvSpPr>
+        <p:spPr>
+          <a:xfrm>
+            <a:off x="6249879" y="2691980"/>
+            <a:ext cx="2290439" cy="600164"/>
+          </a:xfrm>
+          <a:prstGeom prst="rect">
+            <a:avLst/>
+          </a:prstGeom>
+          <a:noFill/>
+        </p:spPr>
+        <p:txBody>
+          <a:bodyPr wrap="square" rtlCol="0">
+            <a:spAutoFit/>
+          </a:bodyPr>
+          <a:lstStyle/>
+          <a:p>
+            <a:r>
+              <a:rPr lang="en-US" sz="1100" dirty="0"/>
+              <a:t>Unrecommended, high time complexity and unnecessarily implicit.</a:t>
+            </a:r>
+          </a:p>
+        </p:txBody>
+      </p:sp>
+      <p:sp>
+        <p:nvSpPr>
+          <p:cNvPr id="7" name="文本框 6">
+            <a:extLst>
+              <a:ext uri="{FF2B5EF4-FFF2-40B4-BE49-F238E27FC236}">
+                <a16:creationId xmlns:a16="http://schemas.microsoft.com/office/drawing/2014/main" id="{110B3978-06E0-435B-BD52-D743084CA937}"/>
+              </a:ext>
+            </a:extLst>
+          </p:cNvPr>
+          <p:cNvSpPr txBox="1"/>
+          <p:nvPr/>
+        </p:nvSpPr>
+        <p:spPr>
+          <a:xfrm>
+            <a:off x="6249881" y="3365939"/>
+            <a:ext cx="2068496" cy="430887"/>
+          </a:xfrm>
+          <a:prstGeom prst="rect">
+            <a:avLst/>
+          </a:prstGeom>
+          <a:noFill/>
+        </p:spPr>
+        <p:txBody>
+          <a:bodyPr wrap="square" rtlCol="0">
+            <a:spAutoFit/>
+          </a:bodyPr>
+          <a:lstStyle/>
+          <a:p>
+            <a:r>
+              <a:rPr lang="en-US" sz="1100" dirty="0"/>
+              <a:t>Acceptable, high time complexity but necessarily implicit.</a:t>
+            </a:r>
+          </a:p>
+        </p:txBody>
+      </p:sp>
+    </p:spTree>
+    <p:extLst>
+      <p:ext uri="{BB962C8B-B14F-4D97-AF65-F5344CB8AC3E}">
+        <p14:creationId xmlns:p14="http://schemas.microsoft.com/office/powerpoint/2010/main" val="1264165407"/>
       </p:ext>
     </p:extLst>
   </p:cSld>

</xml_diff>

<commit_message>
Make further specifications on shunting-yard parsing
</commit_message>
<xml_diff>
--- a/doc/illustrations.pptx
+++ b/doc/illustrations.pptx
@@ -17,6 +17,10 @@
     <p:sldId id="265" r:id="rId11"/>
     <p:sldId id="266" r:id="rId12"/>
     <p:sldId id="267" r:id="rId13"/>
+    <p:sldId id="268" r:id="rId14"/>
+    <p:sldId id="269" r:id="rId15"/>
+    <p:sldId id="270" r:id="rId16"/>
+    <p:sldId id="271" r:id="rId17"/>
   </p:sldIdLst>
   <p:sldSz cx="12192000" cy="6858000"/>
   <p:notesSz cx="6858000" cy="9144000"/>
@@ -6856,7 +6860,7 @@
           <a:p>
             <a:fld id="{82BB0895-06E8-4B53-88C8-0F0562CFD945}" type="datetimeFigureOut">
               <a:rPr lang="en-US" smtClean="0"/>
-              <a:t>7/22/2021</a:t>
+              <a:t>8/12/2021</a:t>
             </a:fld>
             <a:endParaRPr lang="en-US"/>
           </a:p>
@@ -7026,7 +7030,7 @@
           <a:p>
             <a:fld id="{82BB0895-06E8-4B53-88C8-0F0562CFD945}" type="datetimeFigureOut">
               <a:rPr lang="en-US" smtClean="0"/>
-              <a:t>7/22/2021</a:t>
+              <a:t>8/12/2021</a:t>
             </a:fld>
             <a:endParaRPr lang="en-US"/>
           </a:p>
@@ -7206,7 +7210,7 @@
           <a:p>
             <a:fld id="{82BB0895-06E8-4B53-88C8-0F0562CFD945}" type="datetimeFigureOut">
               <a:rPr lang="en-US" smtClean="0"/>
-              <a:t>7/22/2021</a:t>
+              <a:t>8/12/2021</a:t>
             </a:fld>
             <a:endParaRPr lang="en-US"/>
           </a:p>
@@ -7376,7 +7380,7 @@
           <a:p>
             <a:fld id="{82BB0895-06E8-4B53-88C8-0F0562CFD945}" type="datetimeFigureOut">
               <a:rPr lang="en-US" smtClean="0"/>
-              <a:t>7/22/2021</a:t>
+              <a:t>8/12/2021</a:t>
             </a:fld>
             <a:endParaRPr lang="en-US"/>
           </a:p>
@@ -7622,7 +7626,7 @@
           <a:p>
             <a:fld id="{82BB0895-06E8-4B53-88C8-0F0562CFD945}" type="datetimeFigureOut">
               <a:rPr lang="en-US" smtClean="0"/>
-              <a:t>7/22/2021</a:t>
+              <a:t>8/12/2021</a:t>
             </a:fld>
             <a:endParaRPr lang="en-US"/>
           </a:p>
@@ -7854,7 +7858,7 @@
           <a:p>
             <a:fld id="{82BB0895-06E8-4B53-88C8-0F0562CFD945}" type="datetimeFigureOut">
               <a:rPr lang="en-US" smtClean="0"/>
-              <a:t>7/22/2021</a:t>
+              <a:t>8/12/2021</a:t>
             </a:fld>
             <a:endParaRPr lang="en-US"/>
           </a:p>
@@ -8221,7 +8225,7 @@
           <a:p>
             <a:fld id="{82BB0895-06E8-4B53-88C8-0F0562CFD945}" type="datetimeFigureOut">
               <a:rPr lang="en-US" smtClean="0"/>
-              <a:t>7/22/2021</a:t>
+              <a:t>8/12/2021</a:t>
             </a:fld>
             <a:endParaRPr lang="en-US"/>
           </a:p>
@@ -8339,7 +8343,7 @@
           <a:p>
             <a:fld id="{82BB0895-06E8-4B53-88C8-0F0562CFD945}" type="datetimeFigureOut">
               <a:rPr lang="en-US" smtClean="0"/>
-              <a:t>7/22/2021</a:t>
+              <a:t>8/12/2021</a:t>
             </a:fld>
             <a:endParaRPr lang="en-US"/>
           </a:p>
@@ -8434,7 +8438,7 @@
           <a:p>
             <a:fld id="{82BB0895-06E8-4B53-88C8-0F0562CFD945}" type="datetimeFigureOut">
               <a:rPr lang="en-US" smtClean="0"/>
-              <a:t>7/22/2021</a:t>
+              <a:t>8/12/2021</a:t>
             </a:fld>
             <a:endParaRPr lang="en-US"/>
           </a:p>
@@ -8711,7 +8715,7 @@
           <a:p>
             <a:fld id="{82BB0895-06E8-4B53-88C8-0F0562CFD945}" type="datetimeFigureOut">
               <a:rPr lang="en-US" smtClean="0"/>
-              <a:t>7/22/2021</a:t>
+              <a:t>8/12/2021</a:t>
             </a:fld>
             <a:endParaRPr lang="en-US"/>
           </a:p>
@@ -8968,7 +8972,7 @@
           <a:p>
             <a:fld id="{82BB0895-06E8-4B53-88C8-0F0562CFD945}" type="datetimeFigureOut">
               <a:rPr lang="en-US" smtClean="0"/>
-              <a:t>7/22/2021</a:t>
+              <a:t>8/12/2021</a:t>
             </a:fld>
             <a:endParaRPr lang="en-US"/>
           </a:p>
@@ -9181,7 +9185,7 @@
           <a:p>
             <a:fld id="{82BB0895-06E8-4B53-88C8-0F0562CFD945}" type="datetimeFigureOut">
               <a:rPr lang="en-US" smtClean="0"/>
-              <a:t>7/22/2021</a:t>
+              <a:t>8/12/2021</a:t>
             </a:fld>
             <a:endParaRPr lang="en-US"/>
           </a:p>
@@ -10832,8 +10836,8 @@
           </p:txBody>
         </p:sp>
       </p:grpSp>
-      <mc:AlternateContent xmlns:mc="http://schemas.openxmlformats.org/markup-compatibility/2006">
-        <mc:Choice xmlns:a14="http://schemas.microsoft.com/office/drawing/2010/main" Requires="a14">
+      <mc:AlternateContent xmlns:mc="http://schemas.openxmlformats.org/markup-compatibility/2006" xmlns:a14="http://schemas.microsoft.com/office/drawing/2010/main">
+        <mc:Choice Requires="a14">
           <p:sp>
             <p:nvSpPr>
               <p:cNvPr id="13" name="文本框 12">
@@ -10862,6 +10866,7 @@
               </a:bodyPr>
               <a:lstStyle/>
               <a:p>
+                <a:pPr/>
                 <a14:m>
                   <m:oMathPara xmlns:m="http://schemas.openxmlformats.org/officeDocument/2006/math">
                     <m:oMathParaPr>
@@ -10995,13 +11000,7 @@
                                       <a:rPr lang="en-US" sz="1200" b="0" i="1" smtClean="0">
                                         <a:latin typeface="Cambria Math" panose="02040503050406030204" pitchFamily="18" charset="0"/>
                                       </a:rPr>
-                                      <m:t>−</m:t>
-                                    </m:r>
-                                    <m:r>
-                                      <a:rPr lang="en-US" sz="1200" b="0" i="1" smtClean="0">
-                                        <a:latin typeface="Cambria Math" panose="02040503050406030204" pitchFamily="18" charset="0"/>
-                                      </a:rPr>
-                                      <m:t>1</m:t>
+                                      <m:t>−1</m:t>
                                     </m:r>
                                   </m:e>
                                 </m:mr>
@@ -11175,7 +11174,7 @@
             </p:txBody>
           </p:sp>
         </mc:Choice>
-        <mc:Fallback>
+        <mc:Fallback xmlns="">
           <p:sp>
             <p:nvSpPr>
               <p:cNvPr id="13" name="文本框 12">
@@ -11438,6 +11437,2657 @@
     <p:extLst>
       <p:ext uri="{BB962C8B-B14F-4D97-AF65-F5344CB8AC3E}">
         <p14:creationId xmlns:p14="http://schemas.microsoft.com/office/powerpoint/2010/main" val="1779799667"/>
+      </p:ext>
+    </p:extLst>
+  </p:cSld>
+  <p:clrMapOvr>
+    <a:masterClrMapping/>
+  </p:clrMapOvr>
+</p:sld>
+</file>
+
+<file path=ppt/slides/slide13.xml><?xml version="1.0" encoding="utf-8"?>
+<p:sld xmlns:a="http://schemas.openxmlformats.org/drawingml/2006/main" xmlns:r="http://schemas.openxmlformats.org/officeDocument/2006/relationships" xmlns:p="http://schemas.openxmlformats.org/presentationml/2006/main">
+  <p:cSld>
+    <p:spTree>
+      <p:nvGrpSpPr>
+        <p:cNvPr id="1" name=""/>
+        <p:cNvGrpSpPr/>
+        <p:nvPr/>
+      </p:nvGrpSpPr>
+      <p:grpSpPr>
+        <a:xfrm>
+          <a:off x="0" y="0"/>
+          <a:ext cx="0" cy="0"/>
+          <a:chOff x="0" y="0"/>
+          <a:chExt cx="0" cy="0"/>
+        </a:xfrm>
+      </p:grpSpPr>
+      <p:grpSp>
+        <p:nvGrpSpPr>
+          <p:cNvPr id="34" name="组合 33">
+            <a:extLst>
+              <a:ext uri="{FF2B5EF4-FFF2-40B4-BE49-F238E27FC236}">
+                <a16:creationId xmlns:a16="http://schemas.microsoft.com/office/drawing/2014/main" id="{69A7F31F-CDBE-4D09-AF19-85FAE4D4E8CB}"/>
+              </a:ext>
+            </a:extLst>
+          </p:cNvPr>
+          <p:cNvGrpSpPr/>
+          <p:nvPr/>
+        </p:nvGrpSpPr>
+        <p:grpSpPr>
+          <a:xfrm>
+            <a:off x="2911877" y="2495071"/>
+            <a:ext cx="5996865" cy="3193296"/>
+            <a:chOff x="2867488" y="2495071"/>
+            <a:chExt cx="5996865" cy="3193296"/>
+          </a:xfrm>
+        </p:grpSpPr>
+        <p:cxnSp>
+          <p:nvCxnSpPr>
+            <p:cNvPr id="3" name="直接连接符 2">
+              <a:extLst>
+                <a:ext uri="{FF2B5EF4-FFF2-40B4-BE49-F238E27FC236}">
+                  <a16:creationId xmlns:a16="http://schemas.microsoft.com/office/drawing/2014/main" id="{41AC348F-6970-4150-BEAB-2F45C854E332}"/>
+                </a:ext>
+              </a:extLst>
+            </p:cNvPr>
+            <p:cNvCxnSpPr/>
+            <p:nvPr/>
+          </p:nvCxnSpPr>
+          <p:spPr>
+            <a:xfrm>
+              <a:off x="2867488" y="3604334"/>
+              <a:ext cx="2068497" cy="0"/>
+            </a:xfrm>
+            <a:prstGeom prst="line">
+              <a:avLst/>
+            </a:prstGeom>
+            <a:ln w="19050">
+              <a:solidFill>
+                <a:schemeClr val="tx1"/>
+              </a:solidFill>
+            </a:ln>
+          </p:spPr>
+          <p:style>
+            <a:lnRef idx="1">
+              <a:schemeClr val="accent1"/>
+            </a:lnRef>
+            <a:fillRef idx="0">
+              <a:schemeClr val="accent1"/>
+            </a:fillRef>
+            <a:effectRef idx="0">
+              <a:schemeClr val="accent1"/>
+            </a:effectRef>
+            <a:fontRef idx="minor">
+              <a:schemeClr val="tx1"/>
+            </a:fontRef>
+          </p:style>
+        </p:cxnSp>
+        <p:cxnSp>
+          <p:nvCxnSpPr>
+            <p:cNvPr id="4" name="直接连接符 3">
+              <a:extLst>
+                <a:ext uri="{FF2B5EF4-FFF2-40B4-BE49-F238E27FC236}">
+                  <a16:creationId xmlns:a16="http://schemas.microsoft.com/office/drawing/2014/main" id="{768E4576-E712-4F5D-A9D2-7C7ED210BD8F}"/>
+                </a:ext>
+              </a:extLst>
+            </p:cNvPr>
+            <p:cNvCxnSpPr/>
+            <p:nvPr/>
+          </p:nvCxnSpPr>
+          <p:spPr>
+            <a:xfrm>
+              <a:off x="6795856" y="3588058"/>
+              <a:ext cx="2068497" cy="0"/>
+            </a:xfrm>
+            <a:prstGeom prst="line">
+              <a:avLst/>
+            </a:prstGeom>
+            <a:ln w="19050">
+              <a:solidFill>
+                <a:schemeClr val="tx1"/>
+              </a:solidFill>
+            </a:ln>
+          </p:spPr>
+          <p:style>
+            <a:lnRef idx="1">
+              <a:schemeClr val="accent1"/>
+            </a:lnRef>
+            <a:fillRef idx="0">
+              <a:schemeClr val="accent1"/>
+            </a:fillRef>
+            <a:effectRef idx="0">
+              <a:schemeClr val="accent1"/>
+            </a:effectRef>
+            <a:fontRef idx="minor">
+              <a:schemeClr val="tx1"/>
+            </a:fontRef>
+          </p:style>
+        </p:cxnSp>
+        <p:cxnSp>
+          <p:nvCxnSpPr>
+            <p:cNvPr id="8" name="直接箭头连接符 7">
+              <a:extLst>
+                <a:ext uri="{FF2B5EF4-FFF2-40B4-BE49-F238E27FC236}">
+                  <a16:creationId xmlns:a16="http://schemas.microsoft.com/office/drawing/2014/main" id="{76797DB8-098D-4E6F-93EF-C58BC694FE66}"/>
+                </a:ext>
+              </a:extLst>
+            </p:cNvPr>
+            <p:cNvCxnSpPr>
+              <a:cxnSpLocks/>
+            </p:cNvCxnSpPr>
+            <p:nvPr/>
+          </p:nvCxnSpPr>
+          <p:spPr>
+            <a:xfrm flipV="1">
+              <a:off x="5530785" y="4352280"/>
+              <a:ext cx="0" cy="1336087"/>
+            </a:xfrm>
+            <a:prstGeom prst="straightConnector1">
+              <a:avLst/>
+            </a:prstGeom>
+            <a:ln>
+              <a:tailEnd type="triangle"/>
+            </a:ln>
+          </p:spPr>
+          <p:style>
+            <a:lnRef idx="1">
+              <a:schemeClr val="accent1"/>
+            </a:lnRef>
+            <a:fillRef idx="0">
+              <a:schemeClr val="accent1"/>
+            </a:fillRef>
+            <a:effectRef idx="0">
+              <a:schemeClr val="accent1"/>
+            </a:effectRef>
+            <a:fontRef idx="minor">
+              <a:schemeClr val="tx1"/>
+            </a:fontRef>
+          </p:style>
+        </p:cxnSp>
+        <mc:AlternateContent xmlns:mc="http://schemas.openxmlformats.org/markup-compatibility/2006">
+          <mc:Choice xmlns:a14="http://schemas.microsoft.com/office/drawing/2010/main" Requires="a14">
+            <p:sp>
+              <p:nvSpPr>
+                <p:cNvPr id="9" name="文本框 8">
+                  <a:extLst>
+                    <a:ext uri="{FF2B5EF4-FFF2-40B4-BE49-F238E27FC236}">
+                      <a16:creationId xmlns:a16="http://schemas.microsoft.com/office/drawing/2014/main" id="{F025C911-7B43-420D-8777-5CBE087F123A}"/>
+                    </a:ext>
+                  </a:extLst>
+                </p:cNvPr>
+                <p:cNvSpPr txBox="1"/>
+                <p:nvPr/>
+              </p:nvSpPr>
+              <p:spPr>
+                <a:xfrm>
+                  <a:off x="5530785" y="4280994"/>
+                  <a:ext cx="630314" cy="1407373"/>
+                </a:xfrm>
+                <a:prstGeom prst="rect">
+                  <a:avLst/>
+                </a:prstGeom>
+                <a:noFill/>
+              </p:spPr>
+              <p:txBody>
+                <a:bodyPr wrap="square" rtlCol="0">
+                  <a:spAutoFit/>
+                </a:bodyPr>
+                <a:lstStyle/>
+                <a:p>
+                  <a14:m>
+                    <m:oMathPara xmlns:m="http://schemas.openxmlformats.org/officeDocument/2006/math">
+                      <m:oMathParaPr>
+                        <m:jc m:val="centerGroup"/>
+                      </m:oMathParaPr>
+                      <m:oMath xmlns:m="http://schemas.openxmlformats.org/officeDocument/2006/math">
+                        <m:d>
+                          <m:dPr>
+                            <m:ctrlPr>
+                              <a:rPr lang="en-US" i="1" smtClean="0">
+                                <a:latin typeface="Cambria Math" panose="02040503050406030204" pitchFamily="18" charset="0"/>
+                              </a:rPr>
+                            </m:ctrlPr>
+                          </m:dPr>
+                          <m:e>
+                            <m:m>
+                              <m:mPr>
+                                <m:mcs>
+                                  <m:mc>
+                                    <m:mcPr>
+                                      <m:count m:val="1"/>
+                                      <m:mcJc m:val="center"/>
+                                    </m:mcPr>
+                                  </m:mc>
+                                </m:mcs>
+                                <m:ctrlPr>
+                                  <a:rPr lang="en-US" i="1">
+                                    <a:latin typeface="Cambria Math" panose="02040503050406030204" pitchFamily="18" charset="0"/>
+                                  </a:rPr>
+                                </m:ctrlPr>
+                              </m:mPr>
+                              <m:mr>
+                                <m:e>
+                                  <m:r>
+                                    <a:rPr lang="en-US" b="0" i="1" smtClean="0">
+                                      <a:latin typeface="Cambria Math" panose="02040503050406030204" pitchFamily="18" charset="0"/>
+                                    </a:rPr>
+                                    <m:t>^</m:t>
+                                  </m:r>
+                                </m:e>
+                              </m:mr>
+                              <m:mr>
+                                <m:e>
+                                  <m:r>
+                                    <a:rPr lang="en-US" b="0" i="1" smtClean="0">
+                                      <a:latin typeface="Cambria Math" panose="02040503050406030204" pitchFamily="18" charset="0"/>
+                                    </a:rPr>
+                                    <m:t>∗</m:t>
+                                  </m:r>
+                                </m:e>
+                              </m:mr>
+                              <m:mr>
+                                <m:e>
+                                  <m:eqArr>
+                                    <m:eqArrPr>
+                                      <m:ctrlPr>
+                                        <a:rPr lang="en-US" i="1">
+                                          <a:latin typeface="Cambria Math" panose="02040503050406030204" pitchFamily="18" charset="0"/>
+                                        </a:rPr>
+                                      </m:ctrlPr>
+                                    </m:eqArrPr>
+                                    <m:e>
+                                      <m:r>
+                                        <a:rPr lang="en-US" b="0" i="1" smtClean="0">
+                                          <a:latin typeface="Cambria Math" panose="02040503050406030204" pitchFamily="18" charset="0"/>
+                                        </a:rPr>
+                                        <m:t>⋮</m:t>
+                                      </m:r>
+                                    </m:e>
+                                    <m:e>
+                                      <m:r>
+                                        <a:rPr lang="en-US" b="0" i="1" smtClean="0">
+                                          <a:latin typeface="Cambria Math" panose="02040503050406030204" pitchFamily="18" charset="0"/>
+                                        </a:rPr>
+                                        <m:t>+</m:t>
+                                      </m:r>
+                                    </m:e>
+                                    <m:e>
+                                      <m:r>
+                                        <a:rPr lang="en-US" b="0" i="1" smtClean="0">
+                                          <a:latin typeface="Cambria Math" panose="02040503050406030204" pitchFamily="18" charset="0"/>
+                                        </a:rPr>
+                                        <m:t>+</m:t>
+                                      </m:r>
+                                    </m:e>
+                                  </m:eqArr>
+                                </m:e>
+                              </m:mr>
+                            </m:m>
+                          </m:e>
+                        </m:d>
+                      </m:oMath>
+                    </m:oMathPara>
+                  </a14:m>
+                  <a:endParaRPr lang="en-US" dirty="0"/>
+                </a:p>
+              </p:txBody>
+            </p:sp>
+          </mc:Choice>
+          <mc:Fallback>
+            <p:sp>
+              <p:nvSpPr>
+                <p:cNvPr id="9" name="文本框 8">
+                  <a:extLst>
+                    <a:ext uri="{FF2B5EF4-FFF2-40B4-BE49-F238E27FC236}">
+                      <a16:creationId xmlns:a16="http://schemas.microsoft.com/office/drawing/2014/main" id="{F025C911-7B43-420D-8777-5CBE087F123A}"/>
+                    </a:ext>
+                  </a:extLst>
+                </p:cNvPr>
+                <p:cNvSpPr txBox="1">
+                  <a:spLocks noRot="1" noChangeAspect="1" noMove="1" noResize="1" noEditPoints="1" noAdjustHandles="1" noChangeArrowheads="1" noChangeShapeType="1" noTextEdit="1"/>
+                </p:cNvSpPr>
+                <p:nvPr/>
+              </p:nvSpPr>
+              <p:spPr>
+                <a:xfrm>
+                  <a:off x="5530785" y="4280994"/>
+                  <a:ext cx="630314" cy="1407373"/>
+                </a:xfrm>
+                <a:prstGeom prst="rect">
+                  <a:avLst/>
+                </a:prstGeom>
+                <a:blipFill>
+                  <a:blip r:embed="rId2"/>
+                  <a:stretch>
+                    <a:fillRect/>
+                  </a:stretch>
+                </a:blipFill>
+              </p:spPr>
+              <p:txBody>
+                <a:bodyPr/>
+                <a:lstStyle/>
+                <a:p>
+                  <a:r>
+                    <a:rPr lang="en-US">
+                      <a:noFill/>
+                    </a:rPr>
+                    <a:t> </a:t>
+                  </a:r>
+                </a:p>
+              </p:txBody>
+            </p:sp>
+          </mc:Fallback>
+        </mc:AlternateContent>
+        <p:sp>
+          <p:nvSpPr>
+            <p:cNvPr id="12" name="文本框 11">
+              <a:extLst>
+                <a:ext uri="{FF2B5EF4-FFF2-40B4-BE49-F238E27FC236}">
+                  <a16:creationId xmlns:a16="http://schemas.microsoft.com/office/drawing/2014/main" id="{2A7499AF-E1DD-40E3-8E74-6AE9722C1E78}"/>
+                </a:ext>
+              </a:extLst>
+            </p:cNvPr>
+            <p:cNvSpPr txBox="1"/>
+            <p:nvPr/>
+          </p:nvSpPr>
+          <p:spPr>
+            <a:xfrm>
+              <a:off x="4119538" y="4842088"/>
+              <a:ext cx="1565695" cy="338554"/>
+            </a:xfrm>
+            <a:prstGeom prst="rect">
+              <a:avLst/>
+            </a:prstGeom>
+            <a:noFill/>
+          </p:spPr>
+          <p:txBody>
+            <a:bodyPr wrap="square" rtlCol="0">
+              <a:spAutoFit/>
+            </a:bodyPr>
+            <a:lstStyle/>
+            <a:p>
+              <a:r>
+                <a:rPr lang="en-US" sz="1600" dirty="0">
+                  <a:solidFill>
+                    <a:schemeClr val="accent1"/>
+                  </a:solidFill>
+                </a:rPr>
+                <a:t>Associativity up</a:t>
+              </a:r>
+            </a:p>
+          </p:txBody>
+        </p:sp>
+        <p:sp>
+          <p:nvSpPr>
+            <p:cNvPr id="13" name="文本框 12">
+              <a:extLst>
+                <a:ext uri="{FF2B5EF4-FFF2-40B4-BE49-F238E27FC236}">
+                  <a16:creationId xmlns:a16="http://schemas.microsoft.com/office/drawing/2014/main" id="{AB95F9FD-ED97-4B13-A474-5802D7975CC8}"/>
+                </a:ext>
+              </a:extLst>
+            </p:cNvPr>
+            <p:cNvSpPr txBox="1"/>
+            <p:nvPr/>
+          </p:nvSpPr>
+          <p:spPr>
+            <a:xfrm>
+              <a:off x="6276511" y="4808892"/>
+              <a:ext cx="1509204" cy="307777"/>
+            </a:xfrm>
+            <a:prstGeom prst="rect">
+              <a:avLst/>
+            </a:prstGeom>
+            <a:noFill/>
+          </p:spPr>
+          <p:txBody>
+            <a:bodyPr wrap="square" rtlCol="0">
+              <a:spAutoFit/>
+            </a:bodyPr>
+            <a:lstStyle/>
+            <a:p>
+              <a:r>
+                <a:rPr lang="en-US" sz="1400" dirty="0" err="1">
+                  <a:latin typeface="Courant" panose="02000509030000020004" pitchFamily="49" charset="0"/>
+                </a:rPr>
+                <a:t>shuntingYard</a:t>
+              </a:r>
+              <a:endParaRPr lang="en-US" sz="1400" dirty="0">
+                <a:latin typeface="Courant" panose="02000509030000020004" pitchFamily="49" charset="0"/>
+              </a:endParaRPr>
+            </a:p>
+          </p:txBody>
+        </p:sp>
+        <p:sp>
+          <p:nvSpPr>
+            <p:cNvPr id="14" name="文本框 13">
+              <a:extLst>
+                <a:ext uri="{FF2B5EF4-FFF2-40B4-BE49-F238E27FC236}">
+                  <a16:creationId xmlns:a16="http://schemas.microsoft.com/office/drawing/2014/main" id="{40560CE9-22A7-4021-9838-891AF92A039A}"/>
+                </a:ext>
+              </a:extLst>
+            </p:cNvPr>
+            <p:cNvSpPr txBox="1"/>
+            <p:nvPr/>
+          </p:nvSpPr>
+          <p:spPr>
+            <a:xfrm>
+              <a:off x="7240955" y="3567494"/>
+              <a:ext cx="1178309" cy="307777"/>
+            </a:xfrm>
+            <a:prstGeom prst="rect">
+              <a:avLst/>
+            </a:prstGeom>
+            <a:noFill/>
+          </p:spPr>
+          <p:txBody>
+            <a:bodyPr wrap="square" rtlCol="0">
+              <a:spAutoFit/>
+            </a:bodyPr>
+            <a:lstStyle/>
+            <a:p>
+              <a:r>
+                <a:rPr lang="en-US" sz="1400" dirty="0" err="1">
+                  <a:latin typeface="Courant" panose="02000509030000020004" pitchFamily="49" charset="0"/>
+                </a:rPr>
+                <a:t>tokenList</a:t>
+              </a:r>
+              <a:endParaRPr lang="en-US" sz="1400" dirty="0">
+                <a:latin typeface="Courant" panose="02000509030000020004" pitchFamily="49" charset="0"/>
+              </a:endParaRPr>
+            </a:p>
+          </p:txBody>
+        </p:sp>
+        <p:cxnSp>
+          <p:nvCxnSpPr>
+            <p:cNvPr id="18" name="直接箭头连接符 17">
+              <a:extLst>
+                <a:ext uri="{FF2B5EF4-FFF2-40B4-BE49-F238E27FC236}">
+                  <a16:creationId xmlns:a16="http://schemas.microsoft.com/office/drawing/2014/main" id="{33202777-6032-4CB0-BC65-080870FC203A}"/>
+                </a:ext>
+              </a:extLst>
+            </p:cNvPr>
+            <p:cNvCxnSpPr/>
+            <p:nvPr/>
+          </p:nvCxnSpPr>
+          <p:spPr>
+            <a:xfrm flipH="1">
+              <a:off x="5962831" y="4423304"/>
+              <a:ext cx="508986" cy="0"/>
+            </a:xfrm>
+            <a:prstGeom prst="straightConnector1">
+              <a:avLst/>
+            </a:prstGeom>
+            <a:ln w="28575">
+              <a:tailEnd type="triangle"/>
+            </a:ln>
+          </p:spPr>
+          <p:style>
+            <a:lnRef idx="1">
+              <a:schemeClr val="accent3"/>
+            </a:lnRef>
+            <a:fillRef idx="0">
+              <a:schemeClr val="accent3"/>
+            </a:fillRef>
+            <a:effectRef idx="0">
+              <a:schemeClr val="accent3"/>
+            </a:effectRef>
+            <a:fontRef idx="minor">
+              <a:schemeClr val="tx1"/>
+            </a:fontRef>
+          </p:style>
+        </p:cxnSp>
+        <p:sp>
+          <p:nvSpPr>
+            <p:cNvPr id="19" name="文本框 18">
+              <a:extLst>
+                <a:ext uri="{FF2B5EF4-FFF2-40B4-BE49-F238E27FC236}">
+                  <a16:creationId xmlns:a16="http://schemas.microsoft.com/office/drawing/2014/main" id="{E7D4A0D4-A0A3-45B3-AD08-1B2CFC512A53}"/>
+                </a:ext>
+              </a:extLst>
+            </p:cNvPr>
+            <p:cNvSpPr txBox="1"/>
+            <p:nvPr/>
+          </p:nvSpPr>
+          <p:spPr>
+            <a:xfrm>
+              <a:off x="6511767" y="4261168"/>
+              <a:ext cx="551897" cy="307777"/>
+            </a:xfrm>
+            <a:prstGeom prst="rect">
+              <a:avLst/>
+            </a:prstGeom>
+            <a:noFill/>
+          </p:spPr>
+          <p:txBody>
+            <a:bodyPr wrap="square" rtlCol="0">
+              <a:spAutoFit/>
+            </a:bodyPr>
+            <a:lstStyle/>
+            <a:p>
+              <a:r>
+                <a:rPr lang="en-US" sz="1400" dirty="0">
+                  <a:latin typeface="Courant" panose="02000509030000020004" pitchFamily="49" charset="0"/>
+                </a:rPr>
+                <a:t>top</a:t>
+              </a:r>
+            </a:p>
+          </p:txBody>
+        </p:sp>
+        <p:sp>
+          <p:nvSpPr>
+            <p:cNvPr id="20" name="文本框 19">
+              <a:extLst>
+                <a:ext uri="{FF2B5EF4-FFF2-40B4-BE49-F238E27FC236}">
+                  <a16:creationId xmlns:a16="http://schemas.microsoft.com/office/drawing/2014/main" id="{46A9F6DD-0F9A-4557-928A-A4CB994965D6}"/>
+                </a:ext>
+              </a:extLst>
+            </p:cNvPr>
+            <p:cNvSpPr txBox="1"/>
+            <p:nvPr/>
+          </p:nvSpPr>
+          <p:spPr>
+            <a:xfrm>
+              <a:off x="3365245" y="3567494"/>
+              <a:ext cx="1072981" cy="307777"/>
+            </a:xfrm>
+            <a:prstGeom prst="rect">
+              <a:avLst/>
+            </a:prstGeom>
+            <a:noFill/>
+          </p:spPr>
+          <p:txBody>
+            <a:bodyPr wrap="square" rtlCol="0">
+              <a:spAutoFit/>
+            </a:bodyPr>
+            <a:lstStyle/>
+            <a:p>
+              <a:r>
+                <a:rPr lang="en-US" sz="1400" dirty="0">
+                  <a:latin typeface="Courant" panose="02000509030000020004" pitchFamily="49" charset="0"/>
+                </a:rPr>
+                <a:t>RPN List</a:t>
+              </a:r>
+            </a:p>
+          </p:txBody>
+        </p:sp>
+        <p:sp>
+          <p:nvSpPr>
+            <p:cNvPr id="21" name="文本框 20">
+              <a:extLst>
+                <a:ext uri="{FF2B5EF4-FFF2-40B4-BE49-F238E27FC236}">
+                  <a16:creationId xmlns:a16="http://schemas.microsoft.com/office/drawing/2014/main" id="{31601112-FB5D-4668-B404-621AF582B9CF}"/>
+                </a:ext>
+              </a:extLst>
+            </p:cNvPr>
+            <p:cNvSpPr txBox="1"/>
+            <p:nvPr/>
+          </p:nvSpPr>
+          <p:spPr>
+            <a:xfrm>
+              <a:off x="3187691" y="3198162"/>
+              <a:ext cx="1801559" cy="369332"/>
+            </a:xfrm>
+            <a:prstGeom prst="rect">
+              <a:avLst/>
+            </a:prstGeom>
+            <a:noFill/>
+          </p:spPr>
+          <p:txBody>
+            <a:bodyPr wrap="square" rtlCol="0">
+              <a:spAutoFit/>
+            </a:bodyPr>
+            <a:lstStyle/>
+            <a:p>
+              <a:r>
+                <a:rPr lang="en-US" dirty="0">
+                  <a:latin typeface="Courant" panose="02000509030000020004" pitchFamily="49" charset="0"/>
+                </a:rPr>
+                <a:t>[#,…,$,#]</a:t>
+              </a:r>
+            </a:p>
+          </p:txBody>
+        </p:sp>
+        <p:sp>
+          <p:nvSpPr>
+            <p:cNvPr id="22" name="文本框 21">
+              <a:extLst>
+                <a:ext uri="{FF2B5EF4-FFF2-40B4-BE49-F238E27FC236}">
+                  <a16:creationId xmlns:a16="http://schemas.microsoft.com/office/drawing/2014/main" id="{2F061407-AA94-4F2F-BFCD-BD856A7945FB}"/>
+                </a:ext>
+              </a:extLst>
+            </p:cNvPr>
+            <p:cNvSpPr txBox="1"/>
+            <p:nvPr/>
+          </p:nvSpPr>
+          <p:spPr>
+            <a:xfrm>
+              <a:off x="6964230" y="3177667"/>
+              <a:ext cx="1731747" cy="369332"/>
+            </a:xfrm>
+            <a:prstGeom prst="rect">
+              <a:avLst/>
+            </a:prstGeom>
+            <a:noFill/>
+          </p:spPr>
+          <p:txBody>
+            <a:bodyPr wrap="square" rtlCol="0">
+              <a:spAutoFit/>
+            </a:bodyPr>
+            <a:lstStyle/>
+            <a:p>
+              <a:r>
+                <a:rPr lang="en-US" dirty="0">
+                  <a:latin typeface="Courant" panose="02000509030000020004" pitchFamily="49" charset="0"/>
+                </a:rPr>
+                <a:t>[-,#,…,^,#]</a:t>
+              </a:r>
+            </a:p>
+          </p:txBody>
+        </p:sp>
+        <p:cxnSp>
+          <p:nvCxnSpPr>
+            <p:cNvPr id="25" name="直接箭头连接符 24">
+              <a:extLst>
+                <a:ext uri="{FF2B5EF4-FFF2-40B4-BE49-F238E27FC236}">
+                  <a16:creationId xmlns:a16="http://schemas.microsoft.com/office/drawing/2014/main" id="{0317EEDC-369B-4A3B-9376-322E6E15C13F}"/>
+                </a:ext>
+              </a:extLst>
+            </p:cNvPr>
+            <p:cNvCxnSpPr>
+              <a:cxnSpLocks/>
+            </p:cNvCxnSpPr>
+            <p:nvPr/>
+          </p:nvCxnSpPr>
+          <p:spPr>
+            <a:xfrm>
+              <a:off x="7250099" y="2876365"/>
+              <a:ext cx="0" cy="387641"/>
+            </a:xfrm>
+            <a:prstGeom prst="straightConnector1">
+              <a:avLst/>
+            </a:prstGeom>
+            <a:ln w="28575">
+              <a:tailEnd type="triangle"/>
+            </a:ln>
+          </p:spPr>
+          <p:style>
+            <a:lnRef idx="1">
+              <a:schemeClr val="accent3"/>
+            </a:lnRef>
+            <a:fillRef idx="0">
+              <a:schemeClr val="accent3"/>
+            </a:fillRef>
+            <a:effectRef idx="0">
+              <a:schemeClr val="accent3"/>
+            </a:effectRef>
+            <a:fontRef idx="minor">
+              <a:schemeClr val="tx1"/>
+            </a:fontRef>
+          </p:style>
+        </p:cxnSp>
+        <p:sp>
+          <p:nvSpPr>
+            <p:cNvPr id="27" name="文本框 26">
+              <a:extLst>
+                <a:ext uri="{FF2B5EF4-FFF2-40B4-BE49-F238E27FC236}">
+                  <a16:creationId xmlns:a16="http://schemas.microsoft.com/office/drawing/2014/main" id="{52B51BE4-66FE-4A4E-8F89-3C034133E194}"/>
+                </a:ext>
+              </a:extLst>
+            </p:cNvPr>
+            <p:cNvSpPr txBox="1"/>
+            <p:nvPr/>
+          </p:nvSpPr>
+          <p:spPr>
+            <a:xfrm>
+              <a:off x="6878561" y="2495071"/>
+              <a:ext cx="743076" cy="307777"/>
+            </a:xfrm>
+            <a:prstGeom prst="rect">
+              <a:avLst/>
+            </a:prstGeom>
+            <a:noFill/>
+          </p:spPr>
+          <p:txBody>
+            <a:bodyPr wrap="square" rtlCol="0">
+              <a:spAutoFit/>
+            </a:bodyPr>
+            <a:lstStyle/>
+            <a:p>
+              <a:r>
+                <a:rPr lang="en-US" sz="1400" dirty="0">
+                  <a:latin typeface="Courant" panose="02000509030000020004" pitchFamily="49" charset="0"/>
+                </a:rPr>
+                <a:t>first</a:t>
+              </a:r>
+            </a:p>
+          </p:txBody>
+        </p:sp>
+        <p:sp>
+          <p:nvSpPr>
+            <p:cNvPr id="28" name="弧形 27">
+              <a:extLst>
+                <a:ext uri="{FF2B5EF4-FFF2-40B4-BE49-F238E27FC236}">
+                  <a16:creationId xmlns:a16="http://schemas.microsoft.com/office/drawing/2014/main" id="{9049C158-F58C-483E-9E44-7D67591BDF96}"/>
+                </a:ext>
+              </a:extLst>
+            </p:cNvPr>
+            <p:cNvSpPr/>
+            <p:nvPr/>
+          </p:nvSpPr>
+          <p:spPr>
+            <a:xfrm>
+              <a:off x="4470918" y="3678988"/>
+              <a:ext cx="958044" cy="886705"/>
+            </a:xfrm>
+            <a:prstGeom prst="arc">
+              <a:avLst/>
+            </a:prstGeom>
+          </p:spPr>
+          <p:style>
+            <a:lnRef idx="1">
+              <a:schemeClr val="dk1"/>
+            </a:lnRef>
+            <a:fillRef idx="0">
+              <a:schemeClr val="dk1"/>
+            </a:fillRef>
+            <a:effectRef idx="0">
+              <a:schemeClr val="dk1"/>
+            </a:effectRef>
+            <a:fontRef idx="minor">
+              <a:schemeClr val="tx1"/>
+            </a:fontRef>
+          </p:style>
+          <p:txBody>
+            <a:bodyPr rtlCol="0" anchor="ctr"/>
+            <a:lstStyle/>
+            <a:p>
+              <a:pPr algn="ctr"/>
+              <a:endParaRPr lang="en-US"/>
+            </a:p>
+          </p:txBody>
+        </p:sp>
+        <p:sp>
+          <p:nvSpPr>
+            <p:cNvPr id="29" name="弧形 28">
+              <a:extLst>
+                <a:ext uri="{FF2B5EF4-FFF2-40B4-BE49-F238E27FC236}">
+                  <a16:creationId xmlns:a16="http://schemas.microsoft.com/office/drawing/2014/main" id="{E9100D0D-4A95-4883-BDF0-95002BCE59C4}"/>
+                </a:ext>
+              </a:extLst>
+            </p:cNvPr>
+            <p:cNvSpPr/>
+            <p:nvPr/>
+          </p:nvSpPr>
+          <p:spPr>
+            <a:xfrm flipH="1">
+              <a:off x="6227410" y="3678987"/>
+              <a:ext cx="958044" cy="886705"/>
+            </a:xfrm>
+            <a:prstGeom prst="arc">
+              <a:avLst/>
+            </a:prstGeom>
+          </p:spPr>
+          <p:style>
+            <a:lnRef idx="1">
+              <a:schemeClr val="dk1"/>
+            </a:lnRef>
+            <a:fillRef idx="0">
+              <a:schemeClr val="dk1"/>
+            </a:fillRef>
+            <a:effectRef idx="0">
+              <a:schemeClr val="dk1"/>
+            </a:effectRef>
+            <a:fontRef idx="minor">
+              <a:schemeClr val="tx1"/>
+            </a:fontRef>
+          </p:style>
+          <p:txBody>
+            <a:bodyPr rtlCol="0" anchor="ctr"/>
+            <a:lstStyle/>
+            <a:p>
+              <a:pPr algn="ctr"/>
+              <a:endParaRPr lang="en-US"/>
+            </a:p>
+          </p:txBody>
+        </p:sp>
+        <p:cxnSp>
+          <p:nvCxnSpPr>
+            <p:cNvPr id="31" name="直接箭头连接符 30">
+              <a:extLst>
+                <a:ext uri="{FF2B5EF4-FFF2-40B4-BE49-F238E27FC236}">
+                  <a16:creationId xmlns:a16="http://schemas.microsoft.com/office/drawing/2014/main" id="{2913D574-905E-4DC9-906D-17D04826CA44}"/>
+                </a:ext>
+              </a:extLst>
+            </p:cNvPr>
+            <p:cNvCxnSpPr/>
+            <p:nvPr/>
+          </p:nvCxnSpPr>
+          <p:spPr>
+            <a:xfrm flipH="1">
+              <a:off x="5353235" y="3329126"/>
+              <a:ext cx="994297" cy="0"/>
+            </a:xfrm>
+            <a:prstGeom prst="straightConnector1">
+              <a:avLst/>
+            </a:prstGeom>
+            <a:ln>
+              <a:tailEnd type="triangle"/>
+            </a:ln>
+          </p:spPr>
+          <p:style>
+            <a:lnRef idx="1">
+              <a:schemeClr val="accent1"/>
+            </a:lnRef>
+            <a:fillRef idx="0">
+              <a:schemeClr val="accent1"/>
+            </a:fillRef>
+            <a:effectRef idx="0">
+              <a:schemeClr val="accent1"/>
+            </a:effectRef>
+            <a:fontRef idx="minor">
+              <a:schemeClr val="tx1"/>
+            </a:fontRef>
+          </p:style>
+        </p:cxnSp>
+        <p:sp>
+          <p:nvSpPr>
+            <p:cNvPr id="33" name="文本框 32">
+              <a:extLst>
+                <a:ext uri="{FF2B5EF4-FFF2-40B4-BE49-F238E27FC236}">
+                  <a16:creationId xmlns:a16="http://schemas.microsoft.com/office/drawing/2014/main" id="{1100A213-2C44-488D-A4DF-499160ED2E3D}"/>
+                </a:ext>
+              </a:extLst>
+            </p:cNvPr>
+            <p:cNvSpPr txBox="1"/>
+            <p:nvPr/>
+          </p:nvSpPr>
+          <p:spPr>
+            <a:xfrm>
+              <a:off x="5448871" y="2950194"/>
+              <a:ext cx="827640" cy="307777"/>
+            </a:xfrm>
+            <a:prstGeom prst="rect">
+              <a:avLst/>
+            </a:prstGeom>
+            <a:noFill/>
+          </p:spPr>
+          <p:txBody>
+            <a:bodyPr wrap="square" rtlCol="0">
+              <a:spAutoFit/>
+            </a:bodyPr>
+            <a:lstStyle/>
+            <a:p>
+              <a:r>
+                <a:rPr lang="en-US" sz="1400" dirty="0">
+                  <a:latin typeface="Courant" panose="02000509030000020004" pitchFamily="49" charset="0"/>
+                </a:rPr>
+                <a:t># or $</a:t>
+              </a:r>
+            </a:p>
+          </p:txBody>
+        </p:sp>
+      </p:grpSp>
+    </p:spTree>
+    <p:extLst>
+      <p:ext uri="{BB962C8B-B14F-4D97-AF65-F5344CB8AC3E}">
+        <p14:creationId xmlns:p14="http://schemas.microsoft.com/office/powerpoint/2010/main" val="1503348217"/>
+      </p:ext>
+    </p:extLst>
+  </p:cSld>
+  <p:clrMapOvr>
+    <a:masterClrMapping/>
+  </p:clrMapOvr>
+</p:sld>
+</file>
+
+<file path=ppt/slides/slide14.xml><?xml version="1.0" encoding="utf-8"?>
+<p:sld xmlns:a="http://schemas.openxmlformats.org/drawingml/2006/main" xmlns:r="http://schemas.openxmlformats.org/officeDocument/2006/relationships" xmlns:p="http://schemas.openxmlformats.org/presentationml/2006/main">
+  <p:cSld>
+    <p:spTree>
+      <p:nvGrpSpPr>
+        <p:cNvPr id="1" name=""/>
+        <p:cNvGrpSpPr/>
+        <p:nvPr/>
+      </p:nvGrpSpPr>
+      <p:grpSpPr>
+        <a:xfrm>
+          <a:off x="0" y="0"/>
+          <a:ext cx="0" cy="0"/>
+          <a:chOff x="0" y="0"/>
+          <a:chExt cx="0" cy="0"/>
+        </a:xfrm>
+      </p:grpSpPr>
+      <mc:AlternateContent xmlns:mc="http://schemas.openxmlformats.org/markup-compatibility/2006">
+        <mc:Choice xmlns:a14="http://schemas.microsoft.com/office/drawing/2010/main" Requires="a14">
+          <p:sp>
+            <p:nvSpPr>
+              <p:cNvPr id="2" name="文本框 1">
+                <a:extLst>
+                  <a:ext uri="{FF2B5EF4-FFF2-40B4-BE49-F238E27FC236}">
+                    <a16:creationId xmlns:a16="http://schemas.microsoft.com/office/drawing/2014/main" id="{6AA246CF-10F4-48C2-B3E0-A591F76240E7}"/>
+                  </a:ext>
+                </a:extLst>
+              </p:cNvPr>
+              <p:cNvSpPr txBox="1"/>
+              <p:nvPr/>
+            </p:nvSpPr>
+            <p:spPr>
+              <a:xfrm>
+                <a:off x="3604334" y="603682"/>
+                <a:ext cx="4385569" cy="957313"/>
+              </a:xfrm>
+              <a:prstGeom prst="rect">
+                <a:avLst/>
+              </a:prstGeom>
+              <a:noFill/>
+            </p:spPr>
+            <p:txBody>
+              <a:bodyPr wrap="square" rtlCol="0">
+                <a:spAutoFit/>
+              </a:bodyPr>
+              <a:lstStyle/>
+              <a:p>
+                <a14:m>
+                  <m:oMathPara xmlns:m="http://schemas.openxmlformats.org/officeDocument/2006/math">
+                    <m:oMathParaPr>
+                      <m:jc m:val="centerGroup"/>
+                    </m:oMathParaPr>
+                    <m:oMath xmlns:m="http://schemas.openxmlformats.org/officeDocument/2006/math">
+                      <m:r>
+                        <a:rPr lang="en-US" b="0" i="1" smtClean="0">
+                          <a:latin typeface="Cambria Math" panose="02040503050406030204" pitchFamily="18" charset="0"/>
+                        </a:rPr>
+                        <m:t>𝑦</m:t>
+                      </m:r>
+                      <m:r>
+                        <a:rPr lang="en-US" b="0" i="1" smtClean="0">
+                          <a:latin typeface="Cambria Math" panose="02040503050406030204" pitchFamily="18" charset="0"/>
+                        </a:rPr>
+                        <m:t>−</m:t>
+                      </m:r>
+                      <m:sSup>
+                        <m:sSupPr>
+                          <m:ctrlPr>
+                            <a:rPr lang="en-US" b="0" i="1" smtClean="0">
+                              <a:latin typeface="Cambria Math" panose="02040503050406030204" pitchFamily="18" charset="0"/>
+                            </a:rPr>
+                          </m:ctrlPr>
+                        </m:sSupPr>
+                        <m:e>
+                          <m:r>
+                            <a:rPr lang="en-US" b="0" i="1" smtClean="0">
+                              <a:latin typeface="Cambria Math" panose="02040503050406030204" pitchFamily="18" charset="0"/>
+                            </a:rPr>
+                            <m:t>𝑥</m:t>
+                          </m:r>
+                        </m:e>
+                        <m:sup>
+                          <m:r>
+                            <a:rPr lang="en-US" b="0" i="1" smtClean="0">
+                              <a:latin typeface="Cambria Math" panose="02040503050406030204" pitchFamily="18" charset="0"/>
+                            </a:rPr>
+                            <m:t>2</m:t>
+                          </m:r>
+                        </m:sup>
+                      </m:sSup>
+                      <m:r>
+                        <a:rPr lang="en-US" b="0" i="1" smtClean="0">
+                          <a:latin typeface="Cambria Math" panose="02040503050406030204" pitchFamily="18" charset="0"/>
+                        </a:rPr>
+                        <m:t>+</m:t>
+                      </m:r>
+                      <m:nary>
+                        <m:naryPr>
+                          <m:chr m:val="∑"/>
+                          <m:ctrlPr>
+                            <a:rPr lang="en-US" b="0" i="1" smtClean="0">
+                              <a:latin typeface="Cambria Math" panose="02040503050406030204" pitchFamily="18" charset="0"/>
+                            </a:rPr>
+                          </m:ctrlPr>
+                        </m:naryPr>
+                        <m:sub>
+                          <m:r>
+                            <m:rPr>
+                              <m:brk m:alnAt="23"/>
+                            </m:rPr>
+                            <a:rPr lang="en-US" b="0" i="1" smtClean="0">
+                              <a:latin typeface="Cambria Math" panose="02040503050406030204" pitchFamily="18" charset="0"/>
+                            </a:rPr>
+                            <m:t>𝑛</m:t>
+                          </m:r>
+                          <m:r>
+                            <a:rPr lang="en-US" b="0" i="1" smtClean="0">
+                              <a:latin typeface="Cambria Math" panose="02040503050406030204" pitchFamily="18" charset="0"/>
+                            </a:rPr>
+                            <m:t>=1</m:t>
+                          </m:r>
+                        </m:sub>
+                        <m:sup>
+                          <m:func>
+                            <m:funcPr>
+                              <m:ctrlPr>
+                                <a:rPr lang="en-US" b="0" i="1" smtClean="0">
+                                  <a:latin typeface="Cambria Math" panose="02040503050406030204" pitchFamily="18" charset="0"/>
+                                </a:rPr>
+                              </m:ctrlPr>
+                            </m:funcPr>
+                            <m:fName>
+                              <m:r>
+                                <m:rPr>
+                                  <m:sty m:val="p"/>
+                                </m:rPr>
+                                <a:rPr lang="en-US" b="0" i="0" smtClean="0">
+                                  <a:latin typeface="Cambria Math" panose="02040503050406030204" pitchFamily="18" charset="0"/>
+                                </a:rPr>
+                                <m:t>cos</m:t>
+                              </m:r>
+                            </m:fName>
+                            <m:e>
+                              <m:d>
+                                <m:dPr>
+                                  <m:ctrlPr>
+                                    <a:rPr lang="en-US" b="0" i="1" smtClean="0">
+                                      <a:latin typeface="Cambria Math" panose="02040503050406030204" pitchFamily="18" charset="0"/>
+                                    </a:rPr>
+                                  </m:ctrlPr>
+                                </m:dPr>
+                                <m:e>
+                                  <m:sSup>
+                                    <m:sSupPr>
+                                      <m:ctrlPr>
+                                        <a:rPr lang="en-US" b="0" i="1" smtClean="0">
+                                          <a:latin typeface="Cambria Math" panose="02040503050406030204" pitchFamily="18" charset="0"/>
+                                        </a:rPr>
+                                      </m:ctrlPr>
+                                    </m:sSupPr>
+                                    <m:e>
+                                      <m:r>
+                                        <a:rPr lang="en-US" b="0" i="1" smtClean="0">
+                                          <a:latin typeface="Cambria Math" panose="02040503050406030204" pitchFamily="18" charset="0"/>
+                                        </a:rPr>
+                                        <m:t>𝑥</m:t>
+                                      </m:r>
+                                    </m:e>
+                                    <m:sup>
+                                      <m:r>
+                                        <a:rPr lang="en-US" b="0" i="1" smtClean="0">
+                                          <a:latin typeface="Cambria Math" panose="02040503050406030204" pitchFamily="18" charset="0"/>
+                                        </a:rPr>
+                                        <m:t>2</m:t>
+                                      </m:r>
+                                    </m:sup>
+                                  </m:sSup>
+                                </m:e>
+                              </m:d>
+                            </m:e>
+                          </m:func>
+                        </m:sup>
+                        <m:e>
+                          <m:func>
+                            <m:funcPr>
+                              <m:ctrlPr>
+                                <a:rPr lang="en-US" b="0" i="1" smtClean="0">
+                                  <a:latin typeface="Cambria Math" panose="02040503050406030204" pitchFamily="18" charset="0"/>
+                                </a:rPr>
+                              </m:ctrlPr>
+                            </m:funcPr>
+                            <m:fName>
+                              <m:r>
+                                <m:rPr>
+                                  <m:sty m:val="p"/>
+                                </m:rPr>
+                                <a:rPr lang="en-US" b="0" i="0" smtClean="0">
+                                  <a:latin typeface="Cambria Math" panose="02040503050406030204" pitchFamily="18" charset="0"/>
+                                </a:rPr>
+                                <m:t>sin</m:t>
+                              </m:r>
+                            </m:fName>
+                            <m:e>
+                              <m:d>
+                                <m:dPr>
+                                  <m:ctrlPr>
+                                    <a:rPr lang="en-US" b="0" i="1" smtClean="0">
+                                      <a:latin typeface="Cambria Math" panose="02040503050406030204" pitchFamily="18" charset="0"/>
+                                    </a:rPr>
+                                  </m:ctrlPr>
+                                </m:dPr>
+                                <m:e>
+                                  <m:r>
+                                    <a:rPr lang="en-US" b="0" i="1" smtClean="0">
+                                      <a:latin typeface="Cambria Math" panose="02040503050406030204" pitchFamily="18" charset="0"/>
+                                    </a:rPr>
+                                    <m:t>𝑥</m:t>
+                                  </m:r>
+                                </m:e>
+                              </m:d>
+                            </m:e>
+                          </m:func>
+                        </m:e>
+                      </m:nary>
+                      <m:r>
+                        <a:rPr lang="en-US" b="0" i="1" smtClean="0">
+                          <a:latin typeface="Cambria Math" panose="02040503050406030204" pitchFamily="18" charset="0"/>
+                        </a:rPr>
+                        <m:t>=</m:t>
+                      </m:r>
+                      <m:r>
+                        <m:rPr>
+                          <m:sty m:val="p"/>
+                        </m:rPr>
+                        <a:rPr lang="en-US" b="0" i="0" smtClean="0">
+                          <a:latin typeface="Cambria Math" panose="02040503050406030204" pitchFamily="18" charset="0"/>
+                        </a:rPr>
+                        <m:t>cos</m:t>
+                      </m:r>
+                      <m:r>
+                        <a:rPr lang="en-US" b="0" i="1" smtClean="0">
+                          <a:latin typeface="Cambria Math" panose="02040503050406030204" pitchFamily="18" charset="0"/>
+                        </a:rPr>
+                        <m:t>⁡(</m:t>
+                      </m:r>
+                      <m:r>
+                        <a:rPr lang="en-US" b="0" i="1" smtClean="0">
+                          <a:latin typeface="Cambria Math" panose="02040503050406030204" pitchFamily="18" charset="0"/>
+                        </a:rPr>
+                        <m:t>𝑥</m:t>
+                      </m:r>
+                      <m:r>
+                        <a:rPr lang="en-US" b="0" i="1" smtClean="0">
+                          <a:latin typeface="Cambria Math" panose="02040503050406030204" pitchFamily="18" charset="0"/>
+                        </a:rPr>
+                        <m:t>)</m:t>
+                      </m:r>
+                    </m:oMath>
+                  </m:oMathPara>
+                </a14:m>
+                <a:endParaRPr lang="en-US" dirty="0"/>
+              </a:p>
+            </p:txBody>
+          </p:sp>
+        </mc:Choice>
+        <mc:Fallback>
+          <p:sp>
+            <p:nvSpPr>
+              <p:cNvPr id="2" name="文本框 1">
+                <a:extLst>
+                  <a:ext uri="{FF2B5EF4-FFF2-40B4-BE49-F238E27FC236}">
+                    <a16:creationId xmlns:a16="http://schemas.microsoft.com/office/drawing/2014/main" id="{6AA246CF-10F4-48C2-B3E0-A591F76240E7}"/>
+                  </a:ext>
+                </a:extLst>
+              </p:cNvPr>
+              <p:cNvSpPr txBox="1">
+                <a:spLocks noRot="1" noChangeAspect="1" noMove="1" noResize="1" noEditPoints="1" noAdjustHandles="1" noChangeArrowheads="1" noChangeShapeType="1" noTextEdit="1"/>
+              </p:cNvSpPr>
+              <p:nvPr/>
+            </p:nvSpPr>
+            <p:spPr>
+              <a:xfrm>
+                <a:off x="3604334" y="603682"/>
+                <a:ext cx="4385569" cy="957313"/>
+              </a:xfrm>
+              <a:prstGeom prst="rect">
+                <a:avLst/>
+              </a:prstGeom>
+              <a:blipFill>
+                <a:blip r:embed="rId2"/>
+                <a:stretch>
+                  <a:fillRect/>
+                </a:stretch>
+              </a:blipFill>
+            </p:spPr>
+            <p:txBody>
+              <a:bodyPr/>
+              <a:lstStyle/>
+              <a:p>
+                <a:r>
+                  <a:rPr lang="en-US">
+                    <a:noFill/>
+                  </a:rPr>
+                  <a:t> </a:t>
+                </a:r>
+              </a:p>
+            </p:txBody>
+          </p:sp>
+        </mc:Fallback>
+      </mc:AlternateContent>
+      <p:sp>
+        <p:nvSpPr>
+          <p:cNvPr id="3" name="文本框 2">
+            <a:extLst>
+              <a:ext uri="{FF2B5EF4-FFF2-40B4-BE49-F238E27FC236}">
+                <a16:creationId xmlns:a16="http://schemas.microsoft.com/office/drawing/2014/main" id="{50F39575-9FDE-4D0B-BE96-2F158B6AAFAD}"/>
+              </a:ext>
+            </a:extLst>
+          </p:cNvPr>
+          <p:cNvSpPr txBox="1"/>
+          <p:nvPr/>
+        </p:nvSpPr>
+        <p:spPr>
+          <a:xfrm>
+            <a:off x="3258105" y="2183906"/>
+            <a:ext cx="8238478" cy="369332"/>
+          </a:xfrm>
+          <a:prstGeom prst="rect">
+            <a:avLst/>
+          </a:prstGeom>
+          <a:noFill/>
+        </p:spPr>
+        <p:txBody>
+          <a:bodyPr wrap="square" rtlCol="0">
+            <a:spAutoFit/>
+          </a:bodyPr>
+          <a:lstStyle/>
+          <a:p>
+            <a:r>
+              <a:rPr lang="en-US" dirty="0">
+                <a:latin typeface="Courant" panose="02000509030000020004" pitchFamily="49" charset="0"/>
+              </a:rPr>
+              <a:t>y-x+\sin\left(x\right)</a:t>
+            </a:r>
+          </a:p>
+        </p:txBody>
+      </p:sp>
+      <p:sp>
+        <p:nvSpPr>
+          <p:cNvPr id="4" name="文本框 3">
+            <a:extLst>
+              <a:ext uri="{FF2B5EF4-FFF2-40B4-BE49-F238E27FC236}">
+                <a16:creationId xmlns:a16="http://schemas.microsoft.com/office/drawing/2014/main" id="{6AC76302-047B-44E0-9E84-453CD0930651}"/>
+              </a:ext>
+            </a:extLst>
+          </p:cNvPr>
+          <p:cNvSpPr txBox="1"/>
+          <p:nvPr/>
+        </p:nvSpPr>
+        <p:spPr>
+          <a:xfrm>
+            <a:off x="8211844" y="1012054"/>
+            <a:ext cx="1420427" cy="369332"/>
+          </a:xfrm>
+          <a:prstGeom prst="rect">
+            <a:avLst/>
+          </a:prstGeom>
+          <a:noFill/>
+        </p:spPr>
+        <p:txBody>
+          <a:bodyPr wrap="square" rtlCol="0">
+            <a:spAutoFit/>
+          </a:bodyPr>
+          <a:lstStyle/>
+          <a:p>
+            <a:r>
+              <a:rPr lang="en-US" dirty="0" err="1"/>
+              <a:t>parsestack</a:t>
+            </a:r>
+            <a:endParaRPr lang="en-US" dirty="0"/>
+          </a:p>
+        </p:txBody>
+      </p:sp>
+      <p:sp>
+        <p:nvSpPr>
+          <p:cNvPr id="5" name="文本框 4">
+            <a:extLst>
+              <a:ext uri="{FF2B5EF4-FFF2-40B4-BE49-F238E27FC236}">
+                <a16:creationId xmlns:a16="http://schemas.microsoft.com/office/drawing/2014/main" id="{4AE720DB-9ED2-4A3D-AE86-570DA069B889}"/>
+              </a:ext>
+            </a:extLst>
+          </p:cNvPr>
+          <p:cNvSpPr txBox="1"/>
+          <p:nvPr/>
+        </p:nvSpPr>
+        <p:spPr>
+          <a:xfrm>
+            <a:off x="3719743" y="3275860"/>
+            <a:ext cx="4980373" cy="2308324"/>
+          </a:xfrm>
+          <a:prstGeom prst="rect">
+            <a:avLst/>
+          </a:prstGeom>
+          <a:noFill/>
+        </p:spPr>
+        <p:txBody>
+          <a:bodyPr wrap="square" rtlCol="0">
+            <a:spAutoFit/>
+          </a:bodyPr>
+          <a:lstStyle/>
+          <a:p>
+            <a:r>
+              <a:rPr lang="en-US" dirty="0">
+                <a:latin typeface="Courant" panose="02000509030000020004" pitchFamily="49" charset="0"/>
+              </a:rPr>
+              <a:t>let </a:t>
+            </a:r>
+            <a:r>
+              <a:rPr lang="en-US" dirty="0" err="1">
+                <a:latin typeface="Courant" panose="02000509030000020004" pitchFamily="49" charset="0"/>
+              </a:rPr>
+              <a:t>i</a:t>
+            </a:r>
+            <a:r>
+              <a:rPr lang="en-US" dirty="0">
+                <a:latin typeface="Courant" panose="02000509030000020004" pitchFamily="49" charset="0"/>
+              </a:rPr>
+              <a:t>=0</a:t>
+            </a:r>
+          </a:p>
+          <a:p>
+            <a:r>
+              <a:rPr lang="en-US" dirty="0">
+                <a:latin typeface="Courant" panose="02000509030000020004" pitchFamily="49" charset="0"/>
+              </a:rPr>
+              <a:t>For:</a:t>
+            </a:r>
+          </a:p>
+          <a:p>
+            <a:pPr lvl="1"/>
+            <a:r>
+              <a:rPr lang="en-US" dirty="0">
+                <a:latin typeface="Courant" panose="02000509030000020004" pitchFamily="49" charset="0"/>
+              </a:rPr>
+              <a:t>let token = new Token()</a:t>
+            </a:r>
+          </a:p>
+          <a:p>
+            <a:pPr lvl="1"/>
+            <a:r>
+              <a:rPr lang="en-US" dirty="0" err="1">
+                <a:latin typeface="Courant" panose="02000509030000020004" pitchFamily="49" charset="0"/>
+              </a:rPr>
+              <a:t>token.readFrom</a:t>
+            </a:r>
+            <a:r>
+              <a:rPr lang="en-US" dirty="0">
+                <a:latin typeface="Courant" panose="02000509030000020004" pitchFamily="49" charset="0"/>
+              </a:rPr>
+              <a:t>(</a:t>
+            </a:r>
+            <a:r>
+              <a:rPr lang="en-US" dirty="0" err="1">
+                <a:latin typeface="Courant" panose="02000509030000020004" pitchFamily="49" charset="0"/>
+              </a:rPr>
+              <a:t>i</a:t>
+            </a:r>
+            <a:r>
+              <a:rPr lang="en-US" dirty="0">
+                <a:latin typeface="Courant" panose="02000509030000020004" pitchFamily="49" charset="0"/>
+              </a:rPr>
+              <a:t>):</a:t>
+            </a:r>
+          </a:p>
+          <a:p>
+            <a:pPr lvl="1"/>
+            <a:r>
+              <a:rPr lang="en-US" dirty="0">
+                <a:latin typeface="Courant" panose="02000509030000020004" pitchFamily="49" charset="0"/>
+              </a:rPr>
+              <a:t>	let char = </a:t>
+            </a:r>
+            <a:r>
+              <a:rPr lang="en-US" dirty="0" err="1">
+                <a:latin typeface="Courant" panose="02000509030000020004" pitchFamily="49" charset="0"/>
+              </a:rPr>
+              <a:t>tex</a:t>
+            </a:r>
+            <a:r>
+              <a:rPr lang="en-US" dirty="0">
+                <a:latin typeface="Courant" panose="02000509030000020004" pitchFamily="49" charset="0"/>
+              </a:rPr>
+              <a:t>[</a:t>
+            </a:r>
+            <a:r>
+              <a:rPr lang="en-US" dirty="0" err="1">
+                <a:latin typeface="Courant" panose="02000509030000020004" pitchFamily="49" charset="0"/>
+              </a:rPr>
+              <a:t>i</a:t>
+            </a:r>
+            <a:r>
+              <a:rPr lang="en-US" dirty="0">
+                <a:latin typeface="Courant" panose="02000509030000020004" pitchFamily="49" charset="0"/>
+              </a:rPr>
+              <a:t>] = y</a:t>
+            </a:r>
+          </a:p>
+          <a:p>
+            <a:pPr lvl="1"/>
+            <a:r>
+              <a:rPr lang="en-US" dirty="0">
+                <a:latin typeface="Courant" panose="02000509030000020004" pitchFamily="49" charset="0"/>
+              </a:rPr>
+              <a:t>	…</a:t>
+            </a:r>
+          </a:p>
+          <a:p>
+            <a:pPr lvl="1"/>
+            <a:r>
+              <a:rPr lang="en-US" dirty="0" err="1">
+                <a:latin typeface="Courant" panose="02000509030000020004" pitchFamily="49" charset="0"/>
+              </a:rPr>
+              <a:t>i</a:t>
+            </a:r>
+            <a:r>
+              <a:rPr lang="en-US" dirty="0">
+                <a:latin typeface="Courant" panose="02000509030000020004" pitchFamily="49" charset="0"/>
+              </a:rPr>
+              <a:t> = </a:t>
+            </a:r>
+            <a:r>
+              <a:rPr lang="en-US" dirty="0" err="1">
+                <a:latin typeface="Courant" panose="02000509030000020004" pitchFamily="49" charset="0"/>
+              </a:rPr>
+              <a:t>token.end</a:t>
+            </a:r>
+            <a:endParaRPr lang="en-US" dirty="0">
+              <a:latin typeface="Courant" panose="02000509030000020004" pitchFamily="49" charset="0"/>
+            </a:endParaRPr>
+          </a:p>
+          <a:p>
+            <a:endParaRPr lang="en-US" dirty="0">
+              <a:latin typeface="Courant" panose="02000509030000020004" pitchFamily="49" charset="0"/>
+            </a:endParaRPr>
+          </a:p>
+        </p:txBody>
+      </p:sp>
+    </p:spTree>
+    <p:extLst>
+      <p:ext uri="{BB962C8B-B14F-4D97-AF65-F5344CB8AC3E}">
+        <p14:creationId xmlns:p14="http://schemas.microsoft.com/office/powerpoint/2010/main" val="231899237"/>
+      </p:ext>
+    </p:extLst>
+  </p:cSld>
+  <p:clrMapOvr>
+    <a:masterClrMapping/>
+  </p:clrMapOvr>
+</p:sld>
+</file>
+
+<file path=ppt/slides/slide15.xml><?xml version="1.0" encoding="utf-8"?>
+<p:sld xmlns:a="http://schemas.openxmlformats.org/drawingml/2006/main" xmlns:r="http://schemas.openxmlformats.org/officeDocument/2006/relationships" xmlns:p="http://schemas.openxmlformats.org/presentationml/2006/main">
+  <p:cSld>
+    <p:spTree>
+      <p:nvGrpSpPr>
+        <p:cNvPr id="1" name=""/>
+        <p:cNvGrpSpPr/>
+        <p:nvPr/>
+      </p:nvGrpSpPr>
+      <p:grpSpPr>
+        <a:xfrm>
+          <a:off x="0" y="0"/>
+          <a:ext cx="0" cy="0"/>
+          <a:chOff x="0" y="0"/>
+          <a:chExt cx="0" cy="0"/>
+        </a:xfrm>
+      </p:grpSpPr>
+      <p:sp>
+        <p:nvSpPr>
+          <p:cNvPr id="2" name="文本框 1">
+            <a:extLst>
+              <a:ext uri="{FF2B5EF4-FFF2-40B4-BE49-F238E27FC236}">
+                <a16:creationId xmlns:a16="http://schemas.microsoft.com/office/drawing/2014/main" id="{EFC25C9A-A677-46E0-A814-10EAF0D6D70D}"/>
+              </a:ext>
+            </a:extLst>
+          </p:cNvPr>
+          <p:cNvSpPr txBox="1"/>
+          <p:nvPr/>
+        </p:nvSpPr>
+        <p:spPr>
+          <a:xfrm>
+            <a:off x="2681056" y="1438182"/>
+            <a:ext cx="8238478" cy="369332"/>
+          </a:xfrm>
+          <a:prstGeom prst="rect">
+            <a:avLst/>
+          </a:prstGeom>
+          <a:noFill/>
+        </p:spPr>
+        <p:txBody>
+          <a:bodyPr wrap="square" rtlCol="0">
+            <a:spAutoFit/>
+          </a:bodyPr>
+          <a:lstStyle/>
+          <a:p>
+            <a:r>
+              <a:rPr lang="en-US" dirty="0">
+                <a:latin typeface="Courant" panose="02000509030000020004" pitchFamily="49" charset="0"/>
+              </a:rPr>
+              <a:t>y-x+\sin\left(x\right)</a:t>
+            </a:r>
+          </a:p>
+        </p:txBody>
+      </p:sp>
+      <mc:AlternateContent xmlns:mc="http://schemas.openxmlformats.org/markup-compatibility/2006">
+        <mc:Choice xmlns:a14="http://schemas.microsoft.com/office/drawing/2010/main" Requires="a14">
+          <p:sp>
+            <p:nvSpPr>
+              <p:cNvPr id="3" name="文本框 2">
+                <a:extLst>
+                  <a:ext uri="{FF2B5EF4-FFF2-40B4-BE49-F238E27FC236}">
+                    <a16:creationId xmlns:a16="http://schemas.microsoft.com/office/drawing/2014/main" id="{08994119-C1B5-4C9F-B2F0-0BA77E171BDD}"/>
+                  </a:ext>
+                </a:extLst>
+              </p:cNvPr>
+              <p:cNvSpPr txBox="1"/>
+              <p:nvPr/>
+            </p:nvSpPr>
+            <p:spPr>
+              <a:xfrm>
+                <a:off x="2947386" y="541122"/>
+                <a:ext cx="8128987" cy="6740307"/>
+              </a:xfrm>
+              <a:prstGeom prst="rect">
+                <a:avLst/>
+              </a:prstGeom>
+              <a:noFill/>
+            </p:spPr>
+            <p:txBody>
+              <a:bodyPr wrap="square" rtlCol="0">
+                <a:spAutoFit/>
+              </a:bodyPr>
+              <a:lstStyle/>
+              <a:p>
+                <a:r>
+                  <a:rPr lang="en-US" dirty="0">
+                    <a:latin typeface="Courant" panose="02000509030000020004" pitchFamily="49" charset="0"/>
+                  </a:rPr>
+                  <a:t>Class Token{</a:t>
+                </a:r>
+              </a:p>
+              <a:p>
+                <a:r>
+                  <a:rPr lang="en-US" dirty="0">
+                    <a:latin typeface="Courant" panose="02000509030000020004" pitchFamily="49" charset="0"/>
+                  </a:rPr>
+                  <a:t>let state = ‘</a:t>
+                </a:r>
+                <a:r>
+                  <a:rPr lang="en-US" dirty="0" err="1">
+                    <a:latin typeface="Courant" panose="02000509030000020004" pitchFamily="49" charset="0"/>
+                  </a:rPr>
+                  <a:t>init</a:t>
+                </a:r>
+                <a:r>
+                  <a:rPr lang="en-US" dirty="0">
+                    <a:latin typeface="Courant" panose="02000509030000020004" pitchFamily="49" charset="0"/>
+                  </a:rPr>
+                  <a:t>’;</a:t>
+                </a:r>
+              </a:p>
+              <a:p>
+                <a:r>
+                  <a:rPr lang="en-US" dirty="0">
+                    <a:latin typeface="Courant" panose="02000509030000020004" pitchFamily="49" charset="0"/>
+                  </a:rPr>
+                  <a:t>…</a:t>
+                </a:r>
+              </a:p>
+              <a:p>
+                <a:r>
+                  <a:rPr lang="en-US" dirty="0">
+                    <a:latin typeface="Courant" panose="02000509030000020004" pitchFamily="49" charset="0"/>
+                  </a:rPr>
+                  <a:t>function </a:t>
+                </a:r>
+                <a:r>
+                  <a:rPr lang="en-US" dirty="0" err="1">
+                    <a:latin typeface="Courant" panose="02000509030000020004" pitchFamily="49" charset="0"/>
+                  </a:rPr>
+                  <a:t>readFrom</a:t>
+                </a:r>
+                <a:r>
+                  <a:rPr lang="en-US" dirty="0">
+                    <a:latin typeface="Courant" panose="02000509030000020004" pitchFamily="49" charset="0"/>
+                  </a:rPr>
+                  <a:t>(</a:t>
+                </a:r>
+                <a:r>
+                  <a:rPr lang="en-US" dirty="0" err="1">
+                    <a:latin typeface="Courant" panose="02000509030000020004" pitchFamily="49" charset="0"/>
+                  </a:rPr>
+                  <a:t>tex</a:t>
+                </a:r>
+                <a:r>
+                  <a:rPr lang="en-US" dirty="0">
+                    <a:latin typeface="Courant" panose="02000509030000020004" pitchFamily="49" charset="0"/>
+                  </a:rPr>
+                  <a:t>, start):</a:t>
+                </a:r>
+              </a:p>
+              <a:p>
+                <a:r>
+                  <a:rPr lang="en-US" dirty="0">
+                    <a:latin typeface="Courant" panose="02000509030000020004" pitchFamily="49" charset="0"/>
+                  </a:rPr>
+                  <a:t>	let </a:t>
+                </a:r>
+                <a:r>
+                  <a:rPr lang="en-US" dirty="0" err="1">
+                    <a:latin typeface="Courant" panose="02000509030000020004" pitchFamily="49" charset="0"/>
+                  </a:rPr>
+                  <a:t>i</a:t>
+                </a:r>
+                <a:r>
+                  <a:rPr lang="en-US" dirty="0">
+                    <a:latin typeface="Courant" panose="02000509030000020004" pitchFamily="49" charset="0"/>
+                  </a:rPr>
+                  <a:t> = start;</a:t>
+                </a:r>
+              </a:p>
+              <a:p>
+                <a:r>
+                  <a:rPr lang="en-US" dirty="0">
+                    <a:latin typeface="Courant" panose="02000509030000020004" pitchFamily="49" charset="0"/>
+                  </a:rPr>
+                  <a:t>	while(!terminating){</a:t>
+                </a:r>
+              </a:p>
+              <a:p>
+                <a:pPr lvl="1"/>
+                <a:r>
+                  <a:rPr lang="en-US" dirty="0">
+                    <a:latin typeface="Courant" panose="02000509030000020004" pitchFamily="49" charset="0"/>
+                  </a:rPr>
+                  <a:t>	let char = </a:t>
+                </a:r>
+                <a:r>
+                  <a:rPr lang="en-US" dirty="0" err="1">
+                    <a:latin typeface="Courant" panose="02000509030000020004" pitchFamily="49" charset="0"/>
+                  </a:rPr>
+                  <a:t>tex</a:t>
+                </a:r>
+                <a:r>
+                  <a:rPr lang="en-US" dirty="0">
+                    <a:latin typeface="Courant" panose="02000509030000020004" pitchFamily="49" charset="0"/>
+                  </a:rPr>
+                  <a:t>[</a:t>
+                </a:r>
+                <a:r>
+                  <a:rPr lang="en-US" dirty="0" err="1">
+                    <a:latin typeface="Courant" panose="02000509030000020004" pitchFamily="49" charset="0"/>
+                  </a:rPr>
+                  <a:t>i</a:t>
+                </a:r>
+                <a:r>
+                  <a:rPr lang="en-US" dirty="0">
+                    <a:latin typeface="Courant" panose="02000509030000020004" pitchFamily="49" charset="0"/>
+                  </a:rPr>
+                  <a:t>];</a:t>
+                </a:r>
+              </a:p>
+              <a:p>
+                <a:pPr lvl="1"/>
+                <a:r>
+                  <a:rPr lang="en-US" dirty="0">
+                    <a:latin typeface="Courant" panose="02000509030000020004" pitchFamily="49" charset="0"/>
+                  </a:rPr>
+                  <a:t>	char = ‘y’;</a:t>
+                </a:r>
+              </a:p>
+              <a:p>
+                <a:pPr lvl="1"/>
+                <a:r>
+                  <a:rPr lang="en-US" dirty="0">
+                    <a:latin typeface="Courant" panose="02000509030000020004" pitchFamily="49" charset="0"/>
+                  </a:rPr>
+                  <a:t>	if(state = </a:t>
+                </a:r>
+                <a:r>
+                  <a:rPr lang="en-US" dirty="0" err="1">
+                    <a:latin typeface="Courant" panose="02000509030000020004" pitchFamily="49" charset="0"/>
+                  </a:rPr>
+                  <a:t>init</a:t>
+                </a:r>
+                <a:r>
+                  <a:rPr lang="en-US" dirty="0">
+                    <a:latin typeface="Courant" panose="02000509030000020004" pitchFamily="49" charset="0"/>
+                  </a:rPr>
+                  <a:t>):</a:t>
+                </a:r>
+              </a:p>
+              <a:p>
+                <a:pPr lvl="1"/>
+                <a:r>
+                  <a:rPr lang="en-US" dirty="0">
+                    <a:latin typeface="Courant" panose="02000509030000020004" pitchFamily="49" charset="0"/>
+                  </a:rPr>
+                  <a:t>		</a:t>
+                </a:r>
+                <a:r>
+                  <a:rPr lang="en-US" dirty="0" err="1">
+                    <a:latin typeface="Courant" panose="02000509030000020004" pitchFamily="49" charset="0"/>
+                  </a:rPr>
+                  <a:t>chartype</a:t>
+                </a:r>
+                <a:r>
+                  <a:rPr lang="en-US" dirty="0">
+                    <a:latin typeface="Courant" panose="02000509030000020004" pitchFamily="49" charset="0"/>
+                  </a:rPr>
+                  <a:t> </a:t>
+                </a:r>
+                <a14:m>
+                  <m:oMath xmlns:m="http://schemas.openxmlformats.org/officeDocument/2006/math">
+                    <m:r>
+                      <a:rPr lang="en-US" b="0" i="1" smtClean="0">
+                        <a:latin typeface="Cambria Math" panose="02040503050406030204" pitchFamily="18" charset="0"/>
+                      </a:rPr>
+                      <m:t>∈[</m:t>
+                    </m:r>
+                    <m:r>
+                      <a:rPr lang="en-US" b="0" i="1" smtClean="0">
+                        <a:latin typeface="Cambria Math" panose="02040503050406030204" pitchFamily="18" charset="0"/>
+                      </a:rPr>
+                      <m:t>𝑑𝑖𝑔𝑖𝑡</m:t>
+                    </m:r>
+                    <m:r>
+                      <a:rPr lang="en-US" b="0" i="1" smtClean="0">
+                        <a:latin typeface="Cambria Math" panose="02040503050406030204" pitchFamily="18" charset="0"/>
+                      </a:rPr>
+                      <m:t>, </m:t>
+                    </m:r>
+                    <m:r>
+                      <a:rPr lang="en-US" b="0" i="1" smtClean="0">
+                        <a:latin typeface="Cambria Math" panose="02040503050406030204" pitchFamily="18" charset="0"/>
+                      </a:rPr>
+                      <m:t>𝑙𝑒𝑡𝑡𝑒𝑟</m:t>
+                    </m:r>
+                    <m:r>
+                      <a:rPr lang="en-US" b="0" i="1" smtClean="0">
+                        <a:latin typeface="Cambria Math" panose="02040503050406030204" pitchFamily="18" charset="0"/>
+                      </a:rPr>
+                      <m:t>, ., </m:t>
+                    </m:r>
+                    <m:r>
+                      <a:rPr lang="en-US" b="0" i="1" smtClean="0">
+                        <a:latin typeface="Cambria Math" panose="02040503050406030204" pitchFamily="18" charset="0"/>
+                      </a:rPr>
+                      <m:t>𝑠𝑦𝑚𝑏𝑜𝑙</m:t>
+                    </m:r>
+                    <m:r>
+                      <a:rPr lang="en-US" b="0" i="1" smtClean="0">
+                        <a:latin typeface="Cambria Math" panose="02040503050406030204" pitchFamily="18" charset="0"/>
+                      </a:rPr>
+                      <m:t>]</m:t>
+                    </m:r>
+                  </m:oMath>
+                </a14:m>
+                <a:endParaRPr lang="en-US" dirty="0">
+                  <a:latin typeface="Courant" panose="02000509030000020004" pitchFamily="49" charset="0"/>
+                </a:endParaRPr>
+              </a:p>
+              <a:p>
+                <a:pPr lvl="1"/>
+                <a:r>
+                  <a:rPr lang="en-US" dirty="0">
+                    <a:latin typeface="Courant" panose="02000509030000020004" pitchFamily="49" charset="0"/>
+                  </a:rPr>
+                  <a:t>		symbol </a:t>
+                </a:r>
+                <a14:m>
+                  <m:oMath xmlns:m="http://schemas.openxmlformats.org/officeDocument/2006/math">
+                    <m:r>
+                      <a:rPr lang="en-US" b="0" i="1" smtClean="0">
+                        <a:latin typeface="Cambria Math" panose="02040503050406030204" pitchFamily="18" charset="0"/>
+                      </a:rPr>
+                      <m:t>∈[\\, +, −, ∗…]</m:t>
+                    </m:r>
+                  </m:oMath>
+                </a14:m>
+                <a:endParaRPr lang="en-US" dirty="0">
+                  <a:latin typeface="Courant" panose="02000509030000020004" pitchFamily="49" charset="0"/>
+                </a:endParaRPr>
+              </a:p>
+              <a:p>
+                <a:pPr lvl="1"/>
+                <a:r>
+                  <a:rPr lang="en-US" dirty="0">
+                    <a:latin typeface="Courant" panose="02000509030000020004" pitchFamily="49" charset="0"/>
+                  </a:rPr>
+                  <a:t>		if(letter):</a:t>
+                </a:r>
+              </a:p>
+              <a:p>
+                <a:pPr lvl="1"/>
+                <a:r>
+                  <a:rPr lang="en-US" dirty="0">
+                    <a:latin typeface="Courant" panose="02000509030000020004" pitchFamily="49" charset="0"/>
+                  </a:rPr>
+                  <a:t>			type = ‘variable;</a:t>
+                </a:r>
+              </a:p>
+              <a:p>
+                <a:pPr lvl="1"/>
+                <a:r>
+                  <a:rPr lang="en-US" dirty="0">
+                    <a:latin typeface="Courant" panose="02000509030000020004" pitchFamily="49" charset="0"/>
+                  </a:rPr>
+                  <a:t>			state = ‘var;</a:t>
+                </a:r>
+              </a:p>
+              <a:p>
+                <a:pPr lvl="1"/>
+                <a:r>
+                  <a:rPr lang="en-US" dirty="0">
+                    <a:latin typeface="Courant" panose="02000509030000020004" pitchFamily="49" charset="0"/>
+                  </a:rPr>
+                  <a:t>			content += char;</a:t>
+                </a:r>
+              </a:p>
+              <a:p>
+                <a:pPr lvl="1"/>
+                <a:r>
+                  <a:rPr lang="en-US" dirty="0">
+                    <a:latin typeface="Courant" panose="02000509030000020004" pitchFamily="49" charset="0"/>
+                  </a:rPr>
+                  <a:t>		if(digit||.):</a:t>
+                </a:r>
+              </a:p>
+              <a:p>
+                <a:pPr lvl="1"/>
+                <a:r>
+                  <a:rPr lang="en-US" dirty="0">
+                    <a:latin typeface="Courant" panose="02000509030000020004" pitchFamily="49" charset="0"/>
+                  </a:rPr>
+                  <a:t>			type = ‘number;</a:t>
+                </a:r>
+              </a:p>
+              <a:p>
+                <a:pPr lvl="1"/>
+                <a:r>
+                  <a:rPr lang="en-US" dirty="0">
+                    <a:latin typeface="Courant" panose="02000509030000020004" pitchFamily="49" charset="0"/>
+                  </a:rPr>
+                  <a:t>			state = ‘number;</a:t>
+                </a:r>
+              </a:p>
+              <a:p>
+                <a:pPr lvl="1"/>
+                <a:r>
+                  <a:rPr lang="en-US" dirty="0">
+                    <a:latin typeface="Courant" panose="02000509030000020004" pitchFamily="49" charset="0"/>
+                  </a:rPr>
+                  <a:t>			content + char;</a:t>
+                </a:r>
+              </a:p>
+              <a:p>
+                <a:pPr lvl="1"/>
+                <a:r>
+                  <a:rPr lang="en-US" dirty="0">
+                    <a:latin typeface="Courant" panose="02000509030000020004" pitchFamily="49" charset="0"/>
+                  </a:rPr>
+                  <a:t>		if(\\):</a:t>
+                </a:r>
+              </a:p>
+              <a:p>
+                <a:pPr lvl="1"/>
+                <a:r>
+                  <a:rPr lang="en-US" dirty="0">
+                    <a:latin typeface="Courant" panose="02000509030000020004" pitchFamily="49" charset="0"/>
+                  </a:rPr>
+                  <a:t>			..</a:t>
+                </a:r>
+              </a:p>
+              <a:p>
+                <a:pPr lvl="1"/>
+                <a:r>
+                  <a:rPr lang="en-US" dirty="0">
+                    <a:latin typeface="Courant" panose="02000509030000020004" pitchFamily="49" charset="0"/>
+                  </a:rPr>
+                  <a:t>	}</a:t>
+                </a:r>
+              </a:p>
+              <a:p>
+                <a:pPr lvl="1"/>
+                <a:r>
+                  <a:rPr lang="en-US" dirty="0">
+                    <a:latin typeface="Courant" panose="02000509030000020004" pitchFamily="49" charset="0"/>
+                  </a:rPr>
+                  <a:t>	</a:t>
+                </a:r>
+                <a:r>
+                  <a:rPr lang="en-US" dirty="0" err="1">
+                    <a:latin typeface="Courant" panose="02000509030000020004" pitchFamily="49" charset="0"/>
+                  </a:rPr>
+                  <a:t>i</a:t>
+                </a:r>
+                <a:r>
+                  <a:rPr lang="en-US" dirty="0">
+                    <a:latin typeface="Courant" panose="02000509030000020004" pitchFamily="49" charset="0"/>
+                  </a:rPr>
+                  <a:t>++;</a:t>
+                </a:r>
+              </a:p>
+              <a:p>
+                <a:r>
+                  <a:rPr lang="en-US" dirty="0">
+                    <a:latin typeface="Courant" panose="02000509030000020004" pitchFamily="49" charset="0"/>
+                  </a:rPr>
+                  <a:t>}</a:t>
+                </a:r>
+              </a:p>
+            </p:txBody>
+          </p:sp>
+        </mc:Choice>
+        <mc:Fallback>
+          <p:sp>
+            <p:nvSpPr>
+              <p:cNvPr id="3" name="文本框 2">
+                <a:extLst>
+                  <a:ext uri="{FF2B5EF4-FFF2-40B4-BE49-F238E27FC236}">
+                    <a16:creationId xmlns:a16="http://schemas.microsoft.com/office/drawing/2014/main" id="{08994119-C1B5-4C9F-B2F0-0BA77E171BDD}"/>
+                  </a:ext>
+                </a:extLst>
+              </p:cNvPr>
+              <p:cNvSpPr txBox="1">
+                <a:spLocks noRot="1" noChangeAspect="1" noMove="1" noResize="1" noEditPoints="1" noAdjustHandles="1" noChangeArrowheads="1" noChangeShapeType="1" noTextEdit="1"/>
+              </p:cNvSpPr>
+              <p:nvPr/>
+            </p:nvSpPr>
+            <p:spPr>
+              <a:xfrm>
+                <a:off x="2947386" y="541122"/>
+                <a:ext cx="8128987" cy="6740307"/>
+              </a:xfrm>
+              <a:prstGeom prst="rect">
+                <a:avLst/>
+              </a:prstGeom>
+              <a:blipFill>
+                <a:blip r:embed="rId2"/>
+                <a:stretch>
+                  <a:fillRect l="-600" t="-543" b="-543"/>
+                </a:stretch>
+              </a:blipFill>
+            </p:spPr>
+            <p:txBody>
+              <a:bodyPr/>
+              <a:lstStyle/>
+              <a:p>
+                <a:r>
+                  <a:rPr lang="en-US">
+                    <a:noFill/>
+                  </a:rPr>
+                  <a:t> </a:t>
+                </a:r>
+              </a:p>
+            </p:txBody>
+          </p:sp>
+        </mc:Fallback>
+      </mc:AlternateContent>
+      <p:sp>
+        <p:nvSpPr>
+          <p:cNvPr id="4" name="文本框 3">
+            <a:extLst>
+              <a:ext uri="{FF2B5EF4-FFF2-40B4-BE49-F238E27FC236}">
+                <a16:creationId xmlns:a16="http://schemas.microsoft.com/office/drawing/2014/main" id="{64A08E10-75BB-4CA6-88F0-FFF6E8087027}"/>
+              </a:ext>
+            </a:extLst>
+          </p:cNvPr>
+          <p:cNvSpPr txBox="1"/>
+          <p:nvPr/>
+        </p:nvSpPr>
+        <p:spPr>
+          <a:xfrm>
+            <a:off x="4554245" y="563524"/>
+            <a:ext cx="1420427" cy="369332"/>
+          </a:xfrm>
+          <a:prstGeom prst="rect">
+            <a:avLst/>
+          </a:prstGeom>
+          <a:noFill/>
+        </p:spPr>
+        <p:txBody>
+          <a:bodyPr wrap="square" rtlCol="0">
+            <a:spAutoFit/>
+          </a:bodyPr>
+          <a:lstStyle/>
+          <a:p>
+            <a:r>
+              <a:rPr lang="en-US" dirty="0"/>
+              <a:t>.124</a:t>
+            </a:r>
+          </a:p>
+        </p:txBody>
+      </p:sp>
+    </p:spTree>
+    <p:extLst>
+      <p:ext uri="{BB962C8B-B14F-4D97-AF65-F5344CB8AC3E}">
+        <p14:creationId xmlns:p14="http://schemas.microsoft.com/office/powerpoint/2010/main" val="1966613961"/>
+      </p:ext>
+    </p:extLst>
+  </p:cSld>
+  <p:clrMapOvr>
+    <a:masterClrMapping/>
+  </p:clrMapOvr>
+</p:sld>
+</file>
+
+<file path=ppt/slides/slide16.xml><?xml version="1.0" encoding="utf-8"?>
+<p:sld xmlns:a="http://schemas.openxmlformats.org/drawingml/2006/main" xmlns:r="http://schemas.openxmlformats.org/officeDocument/2006/relationships" xmlns:p="http://schemas.openxmlformats.org/presentationml/2006/main">
+  <p:cSld>
+    <p:spTree>
+      <p:nvGrpSpPr>
+        <p:cNvPr id="1" name=""/>
+        <p:cNvGrpSpPr/>
+        <p:nvPr/>
+      </p:nvGrpSpPr>
+      <p:grpSpPr>
+        <a:xfrm>
+          <a:off x="0" y="0"/>
+          <a:ext cx="0" cy="0"/>
+          <a:chOff x="0" y="0"/>
+          <a:chExt cx="0" cy="0"/>
+        </a:xfrm>
+      </p:grpSpPr>
+      <mc:AlternateContent xmlns:mc="http://schemas.openxmlformats.org/markup-compatibility/2006">
+        <mc:Choice xmlns:a14="http://schemas.microsoft.com/office/drawing/2010/main" Requires="a14">
+          <p:sp>
+            <p:nvSpPr>
+              <p:cNvPr id="2" name="文本框 1">
+                <a:extLst>
+                  <a:ext uri="{FF2B5EF4-FFF2-40B4-BE49-F238E27FC236}">
+                    <a16:creationId xmlns:a16="http://schemas.microsoft.com/office/drawing/2014/main" id="{32716550-9724-47AA-9434-4F585CC5206B}"/>
+                  </a:ext>
+                </a:extLst>
+              </p:cNvPr>
+              <p:cNvSpPr txBox="1"/>
+              <p:nvPr/>
+            </p:nvSpPr>
+            <p:spPr>
+              <a:xfrm>
+                <a:off x="2254927" y="0"/>
+                <a:ext cx="8128987" cy="8063746"/>
+              </a:xfrm>
+              <a:prstGeom prst="rect">
+                <a:avLst/>
+              </a:prstGeom>
+              <a:noFill/>
+            </p:spPr>
+            <p:txBody>
+              <a:bodyPr wrap="square" rtlCol="0">
+                <a:spAutoFit/>
+              </a:bodyPr>
+              <a:lstStyle/>
+              <a:p>
+                <a:r>
+                  <a:rPr lang="en-US" sz="1400" dirty="0">
+                    <a:latin typeface="Courant" panose="02000509030000020004" pitchFamily="49" charset="0"/>
+                  </a:rPr>
+                  <a:t>Class Token{</a:t>
+                </a:r>
+              </a:p>
+              <a:p>
+                <a:r>
+                  <a:rPr lang="en-US" sz="1400" dirty="0">
+                    <a:latin typeface="Courant" panose="02000509030000020004" pitchFamily="49" charset="0"/>
+                  </a:rPr>
+                  <a:t>let state = ‘</a:t>
+                </a:r>
+                <a:r>
+                  <a:rPr lang="en-US" sz="1400" dirty="0" err="1">
+                    <a:latin typeface="Courant" panose="02000509030000020004" pitchFamily="49" charset="0"/>
+                  </a:rPr>
+                  <a:t>init</a:t>
+                </a:r>
+                <a:r>
+                  <a:rPr lang="en-US" sz="1400" dirty="0">
+                    <a:latin typeface="Courant" panose="02000509030000020004" pitchFamily="49" charset="0"/>
+                  </a:rPr>
+                  <a:t>’;</a:t>
+                </a:r>
+              </a:p>
+              <a:p>
+                <a:r>
+                  <a:rPr lang="en-US" sz="1400" dirty="0">
+                    <a:latin typeface="Courant" panose="02000509030000020004" pitchFamily="49" charset="0"/>
+                  </a:rPr>
+                  <a:t>let end = 0</a:t>
+                </a:r>
+              </a:p>
+              <a:p>
+                <a:r>
+                  <a:rPr lang="en-US" sz="1400" dirty="0">
+                    <a:latin typeface="Courant" panose="02000509030000020004" pitchFamily="49" charset="0"/>
+                  </a:rPr>
+                  <a:t>…</a:t>
+                </a:r>
+              </a:p>
+              <a:p>
+                <a:r>
+                  <a:rPr lang="en-US" sz="1400" dirty="0">
+                    <a:latin typeface="Courant" panose="02000509030000020004" pitchFamily="49" charset="0"/>
+                  </a:rPr>
+                  <a:t>function </a:t>
+                </a:r>
+                <a:r>
+                  <a:rPr lang="en-US" sz="1400" dirty="0" err="1">
+                    <a:latin typeface="Courant" panose="02000509030000020004" pitchFamily="49" charset="0"/>
+                  </a:rPr>
+                  <a:t>readFrom</a:t>
+                </a:r>
+                <a:r>
+                  <a:rPr lang="en-US" sz="1400" dirty="0">
+                    <a:latin typeface="Courant" panose="02000509030000020004" pitchFamily="49" charset="0"/>
+                  </a:rPr>
+                  <a:t>(</a:t>
+                </a:r>
+                <a:r>
+                  <a:rPr lang="en-US" sz="1400" dirty="0" err="1">
+                    <a:latin typeface="Courant" panose="02000509030000020004" pitchFamily="49" charset="0"/>
+                  </a:rPr>
+                  <a:t>tex</a:t>
+                </a:r>
+                <a:r>
+                  <a:rPr lang="en-US" sz="1400" dirty="0">
+                    <a:latin typeface="Courant" panose="02000509030000020004" pitchFamily="49" charset="0"/>
+                  </a:rPr>
+                  <a:t>, start):</a:t>
+                </a:r>
+              </a:p>
+              <a:p>
+                <a:r>
+                  <a:rPr lang="en-US" sz="1400" dirty="0">
+                    <a:latin typeface="Courant" panose="02000509030000020004" pitchFamily="49" charset="0"/>
+                  </a:rPr>
+                  <a:t>	let </a:t>
+                </a:r>
+                <a:r>
+                  <a:rPr lang="en-US" sz="1400" dirty="0" err="1">
+                    <a:latin typeface="Courant" panose="02000509030000020004" pitchFamily="49" charset="0"/>
+                  </a:rPr>
+                  <a:t>i</a:t>
+                </a:r>
+                <a:r>
+                  <a:rPr lang="en-US" sz="1400" dirty="0">
+                    <a:latin typeface="Courant" panose="02000509030000020004" pitchFamily="49" charset="0"/>
+                  </a:rPr>
+                  <a:t> = start; 	</a:t>
+                </a:r>
+              </a:p>
+              <a:p>
+                <a:r>
+                  <a:rPr lang="en-US" sz="1400" dirty="0">
+                    <a:latin typeface="Courant" panose="02000509030000020004" pitchFamily="49" charset="0"/>
+                  </a:rPr>
+                  <a:t>	while(!terminating){</a:t>
+                </a:r>
+              </a:p>
+              <a:p>
+                <a:r>
+                  <a:rPr lang="en-US" sz="1400" dirty="0">
+                    <a:latin typeface="Courant" panose="02000509030000020004" pitchFamily="49" charset="0"/>
+                  </a:rPr>
+                  <a:t>		</a:t>
+                </a:r>
+                <a:r>
+                  <a:rPr lang="en-US" sz="1400" dirty="0" err="1">
+                    <a:latin typeface="Courant" panose="02000509030000020004" pitchFamily="49" charset="0"/>
+                  </a:rPr>
+                  <a:t>this.end</a:t>
+                </a:r>
+                <a:r>
+                  <a:rPr lang="en-US" sz="1400" dirty="0">
+                    <a:latin typeface="Courant" panose="02000509030000020004" pitchFamily="49" charset="0"/>
+                  </a:rPr>
+                  <a:t> = i;</a:t>
+                </a:r>
+              </a:p>
+              <a:p>
+                <a:pPr lvl="1"/>
+                <a:r>
+                  <a:rPr lang="en-US" sz="1400" dirty="0">
+                    <a:latin typeface="Courant" panose="02000509030000020004" pitchFamily="49" charset="0"/>
+                  </a:rPr>
+                  <a:t>	let char = </a:t>
+                </a:r>
+                <a:r>
+                  <a:rPr lang="en-US" sz="1400" dirty="0" err="1">
+                    <a:latin typeface="Courant" panose="02000509030000020004" pitchFamily="49" charset="0"/>
+                  </a:rPr>
+                  <a:t>tex</a:t>
+                </a:r>
+                <a:r>
+                  <a:rPr lang="en-US" sz="1400" dirty="0">
+                    <a:latin typeface="Courant" panose="02000509030000020004" pitchFamily="49" charset="0"/>
+                  </a:rPr>
+                  <a:t>[</a:t>
+                </a:r>
+                <a:r>
+                  <a:rPr lang="en-US" sz="1400" dirty="0" err="1">
+                    <a:latin typeface="Courant" panose="02000509030000020004" pitchFamily="49" charset="0"/>
+                  </a:rPr>
+                  <a:t>i</a:t>
+                </a:r>
+                <a:r>
+                  <a:rPr lang="en-US" sz="1400" dirty="0">
+                    <a:latin typeface="Courant" panose="02000509030000020004" pitchFamily="49" charset="0"/>
+                  </a:rPr>
+                  <a:t>];</a:t>
+                </a:r>
+              </a:p>
+              <a:p>
+                <a:pPr lvl="1"/>
+                <a:r>
+                  <a:rPr lang="en-US" sz="1400" dirty="0">
+                    <a:latin typeface="Courant" panose="02000509030000020004" pitchFamily="49" charset="0"/>
+                  </a:rPr>
+                  <a:t>	char = ‘-’;</a:t>
+                </a:r>
+              </a:p>
+              <a:p>
+                <a:pPr lvl="1"/>
+                <a:r>
+                  <a:rPr lang="en-US" sz="1400" dirty="0">
+                    <a:latin typeface="Courant" panose="02000509030000020004" pitchFamily="49" charset="0"/>
+                  </a:rPr>
+                  <a:t>	if(state = </a:t>
+                </a:r>
+                <a:r>
+                  <a:rPr lang="en-US" sz="1400" dirty="0" err="1">
+                    <a:latin typeface="Courant" panose="02000509030000020004" pitchFamily="49" charset="0"/>
+                  </a:rPr>
+                  <a:t>init</a:t>
+                </a:r>
+                <a:r>
+                  <a:rPr lang="en-US" sz="1400" dirty="0">
+                    <a:latin typeface="Courant" panose="02000509030000020004" pitchFamily="49" charset="0"/>
+                  </a:rPr>
+                  <a:t>):</a:t>
+                </a:r>
+              </a:p>
+              <a:p>
+                <a:pPr lvl="1"/>
+                <a:r>
+                  <a:rPr lang="en-US" sz="1400" dirty="0">
+                    <a:latin typeface="Courant" panose="02000509030000020004" pitchFamily="49" charset="0"/>
+                  </a:rPr>
+                  <a:t>		</a:t>
+                </a:r>
+                <a:r>
+                  <a:rPr lang="en-US" sz="1400" dirty="0" err="1">
+                    <a:latin typeface="Courant" panose="02000509030000020004" pitchFamily="49" charset="0"/>
+                  </a:rPr>
+                  <a:t>chartype</a:t>
+                </a:r>
+                <a:r>
+                  <a:rPr lang="en-US" sz="1400" dirty="0">
+                    <a:latin typeface="Courant" panose="02000509030000020004" pitchFamily="49" charset="0"/>
+                  </a:rPr>
+                  <a:t> </a:t>
+                </a:r>
+                <a14:m>
+                  <m:oMath xmlns:m="http://schemas.openxmlformats.org/officeDocument/2006/math">
+                    <m:r>
+                      <a:rPr lang="en-US" sz="1400" b="0" i="1" smtClean="0">
+                        <a:latin typeface="Cambria Math" panose="02040503050406030204" pitchFamily="18" charset="0"/>
+                      </a:rPr>
+                      <m:t>∈[</m:t>
+                    </m:r>
+                    <m:r>
+                      <a:rPr lang="en-US" sz="1400" b="0" i="1" smtClean="0">
+                        <a:latin typeface="Cambria Math" panose="02040503050406030204" pitchFamily="18" charset="0"/>
+                      </a:rPr>
+                      <m:t>𝑑𝑖𝑔𝑖𝑡</m:t>
+                    </m:r>
+                    <m:r>
+                      <a:rPr lang="en-US" sz="1400" b="0" i="1" smtClean="0">
+                        <a:latin typeface="Cambria Math" panose="02040503050406030204" pitchFamily="18" charset="0"/>
+                      </a:rPr>
+                      <m:t>, </m:t>
+                    </m:r>
+                    <m:r>
+                      <a:rPr lang="en-US" sz="1400" b="0" i="1" smtClean="0">
+                        <a:latin typeface="Cambria Math" panose="02040503050406030204" pitchFamily="18" charset="0"/>
+                      </a:rPr>
+                      <m:t>𝑙𝑒𝑡𝑡𝑒𝑟</m:t>
+                    </m:r>
+                    <m:r>
+                      <a:rPr lang="en-US" sz="1400" b="0" i="1" smtClean="0">
+                        <a:latin typeface="Cambria Math" panose="02040503050406030204" pitchFamily="18" charset="0"/>
+                      </a:rPr>
+                      <m:t>, ., </m:t>
+                    </m:r>
+                    <m:r>
+                      <a:rPr lang="en-US" sz="1400" b="0" i="1" smtClean="0">
+                        <a:latin typeface="Cambria Math" panose="02040503050406030204" pitchFamily="18" charset="0"/>
+                      </a:rPr>
+                      <m:t>𝑠𝑦𝑚𝑏𝑜𝑙</m:t>
+                    </m:r>
+                    <m:r>
+                      <a:rPr lang="en-US" sz="1400" b="0" i="1" smtClean="0">
+                        <a:latin typeface="Cambria Math" panose="02040503050406030204" pitchFamily="18" charset="0"/>
+                      </a:rPr>
+                      <m:t>]</m:t>
+                    </m:r>
+                  </m:oMath>
+                </a14:m>
+                <a:endParaRPr lang="en-US" sz="1400" dirty="0">
+                  <a:latin typeface="Courant" panose="02000509030000020004" pitchFamily="49" charset="0"/>
+                </a:endParaRPr>
+              </a:p>
+              <a:p>
+                <a:pPr lvl="1"/>
+                <a:r>
+                  <a:rPr lang="en-US" sz="1400" dirty="0">
+                    <a:latin typeface="Courant" panose="02000509030000020004" pitchFamily="49" charset="0"/>
+                  </a:rPr>
+                  <a:t>		symbol </a:t>
+                </a:r>
+                <a14:m>
+                  <m:oMath xmlns:m="http://schemas.openxmlformats.org/officeDocument/2006/math">
+                    <m:r>
+                      <a:rPr lang="en-US" sz="1400" b="0" i="1" smtClean="0">
+                        <a:latin typeface="Cambria Math" panose="02040503050406030204" pitchFamily="18" charset="0"/>
+                      </a:rPr>
+                      <m:t>∈[\\, +, −, ∗…]</m:t>
+                    </m:r>
+                  </m:oMath>
+                </a14:m>
+                <a:endParaRPr lang="en-US" sz="1400" dirty="0">
+                  <a:latin typeface="Courant" panose="02000509030000020004" pitchFamily="49" charset="0"/>
+                </a:endParaRPr>
+              </a:p>
+              <a:p>
+                <a:pPr lvl="1"/>
+                <a:r>
+                  <a:rPr lang="en-US" sz="1400" dirty="0">
+                    <a:latin typeface="Courant" panose="02000509030000020004" pitchFamily="49" charset="0"/>
+                  </a:rPr>
+                  <a:t>		if(letter):</a:t>
+                </a:r>
+              </a:p>
+              <a:p>
+                <a:pPr lvl="1"/>
+                <a:r>
+                  <a:rPr lang="en-US" sz="1400" dirty="0">
+                    <a:latin typeface="Courant" panose="02000509030000020004" pitchFamily="49" charset="0"/>
+                  </a:rPr>
+                  <a:t>			type = ‘variable;</a:t>
+                </a:r>
+              </a:p>
+              <a:p>
+                <a:pPr lvl="1"/>
+                <a:r>
+                  <a:rPr lang="en-US" sz="1400" dirty="0">
+                    <a:latin typeface="Courant" panose="02000509030000020004" pitchFamily="49" charset="0"/>
+                  </a:rPr>
+                  <a:t>			state = ‘var;</a:t>
+                </a:r>
+              </a:p>
+              <a:p>
+                <a:pPr lvl="1"/>
+                <a:r>
+                  <a:rPr lang="en-US" sz="1400" dirty="0">
+                    <a:latin typeface="Courant" panose="02000509030000020004" pitchFamily="49" charset="0"/>
+                  </a:rPr>
+                  <a:t>			content += char;</a:t>
+                </a:r>
+              </a:p>
+              <a:p>
+                <a:pPr lvl="1"/>
+                <a:r>
+                  <a:rPr lang="en-US" sz="1400" dirty="0">
+                    <a:latin typeface="Courant" panose="02000509030000020004" pitchFamily="49" charset="0"/>
+                  </a:rPr>
+                  <a:t>		if(digit||.):</a:t>
+                </a:r>
+              </a:p>
+              <a:p>
+                <a:pPr lvl="1"/>
+                <a:r>
+                  <a:rPr lang="en-US" sz="1400" dirty="0">
+                    <a:latin typeface="Courant" panose="02000509030000020004" pitchFamily="49" charset="0"/>
+                  </a:rPr>
+                  <a:t>			type = ‘number;</a:t>
+                </a:r>
+              </a:p>
+              <a:p>
+                <a:pPr lvl="1"/>
+                <a:r>
+                  <a:rPr lang="en-US" sz="1400" dirty="0">
+                    <a:latin typeface="Courant" panose="02000509030000020004" pitchFamily="49" charset="0"/>
+                  </a:rPr>
+                  <a:t>			state = ‘number;</a:t>
+                </a:r>
+              </a:p>
+              <a:p>
+                <a:pPr lvl="1"/>
+                <a:r>
+                  <a:rPr lang="en-US" sz="1400" dirty="0">
+                    <a:latin typeface="Courant" panose="02000509030000020004" pitchFamily="49" charset="0"/>
+                  </a:rPr>
+                  <a:t>			content + char;</a:t>
+                </a:r>
+              </a:p>
+              <a:p>
+                <a:pPr lvl="1"/>
+                <a:r>
+                  <a:rPr lang="en-US" sz="1400" dirty="0">
+                    <a:latin typeface="Courant" panose="02000509030000020004" pitchFamily="49" charset="0"/>
+                  </a:rPr>
+                  <a:t>		if(symbol):</a:t>
+                </a:r>
+              </a:p>
+              <a:p>
+                <a:pPr lvl="1"/>
+                <a:r>
+                  <a:rPr lang="en-US" sz="1400" dirty="0">
+                    <a:latin typeface="Courant" panose="02000509030000020004" pitchFamily="49" charset="0"/>
+                  </a:rPr>
+                  <a:t>			..</a:t>
+                </a:r>
+              </a:p>
+              <a:p>
+                <a:pPr lvl="1"/>
+                <a:r>
+                  <a:rPr lang="en-US" sz="1400" dirty="0">
+                    <a:latin typeface="Courant" panose="02000509030000020004" pitchFamily="49" charset="0"/>
+                  </a:rPr>
+                  <a:t>	}</a:t>
+                </a:r>
+              </a:p>
+              <a:p>
+                <a:pPr lvl="1"/>
+                <a:r>
+                  <a:rPr lang="en-US" sz="1400" dirty="0">
+                    <a:latin typeface="Courant" panose="02000509030000020004" pitchFamily="49" charset="0"/>
+                  </a:rPr>
+                  <a:t>	if(state = ‘var’):</a:t>
+                </a:r>
+              </a:p>
+              <a:p>
+                <a:pPr lvl="1"/>
+                <a:r>
+                  <a:rPr lang="en-US" sz="1400" dirty="0">
+                    <a:latin typeface="Courant" panose="02000509030000020004" pitchFamily="49" charset="0"/>
+                  </a:rPr>
+                  <a:t>		if(</a:t>
+                </a:r>
+                <a:r>
+                  <a:rPr lang="en-US" sz="1400" dirty="0" err="1">
+                    <a:latin typeface="Courant" panose="02000509030000020004" pitchFamily="49" charset="0"/>
+                  </a:rPr>
+                  <a:t>chartype</a:t>
+                </a:r>
+                <a:r>
+                  <a:rPr lang="en-US" sz="1400" dirty="0">
+                    <a:latin typeface="Courant" panose="02000509030000020004" pitchFamily="49" charset="0"/>
+                  </a:rPr>
+                  <a:t> = symbol &amp;&amp; char!= ‘_’):</a:t>
+                </a:r>
+              </a:p>
+              <a:p>
+                <a:pPr lvl="1"/>
+                <a:r>
+                  <a:rPr lang="en-US" sz="1400" dirty="0">
+                    <a:latin typeface="Courant" panose="02000509030000020004" pitchFamily="49" charset="0"/>
+                  </a:rPr>
+                  <a:t>			terminating = true;</a:t>
+                </a:r>
+              </a:p>
+              <a:p>
+                <a:pPr lvl="1"/>
+                <a:r>
+                  <a:rPr lang="en-US" sz="1400" dirty="0">
+                    <a:latin typeface="Courant" panose="02000509030000020004" pitchFamily="49" charset="0"/>
+                  </a:rPr>
+                  <a:t>		if(char == ‘_’):</a:t>
+                </a:r>
+              </a:p>
+              <a:p>
+                <a:pPr lvl="1"/>
+                <a:r>
+                  <a:rPr lang="en-US" sz="1400" dirty="0">
+                    <a:latin typeface="Courant" panose="02000509030000020004" pitchFamily="49" charset="0"/>
+                  </a:rPr>
+                  <a:t>			state = ‘var_’;</a:t>
+                </a:r>
+              </a:p>
+              <a:p>
+                <a:pPr lvl="1"/>
+                <a:r>
+                  <a:rPr lang="en-US" sz="1400" dirty="0">
+                    <a:latin typeface="Courant" panose="02000509030000020004" pitchFamily="49" charset="0"/>
+                  </a:rPr>
+                  <a:t>		if(</a:t>
+                </a:r>
+                <a:r>
+                  <a:rPr lang="en-US" sz="1400" dirty="0" err="1">
+                    <a:latin typeface="Courant" panose="02000509030000020004" pitchFamily="49" charset="0"/>
+                  </a:rPr>
+                  <a:t>chartype</a:t>
+                </a:r>
+                <a:r>
+                  <a:rPr lang="en-US" sz="1400" dirty="0">
+                    <a:latin typeface="Courant" panose="02000509030000020004" pitchFamily="49" charset="0"/>
+                  </a:rPr>
+                  <a:t> = digit …)</a:t>
+                </a:r>
+              </a:p>
+              <a:p>
+                <a:pPr lvl="1"/>
+                <a:r>
+                  <a:rPr lang="en-US" sz="1400" dirty="0">
+                    <a:latin typeface="Courant" panose="02000509030000020004" pitchFamily="49" charset="0"/>
+                  </a:rPr>
+                  <a:t>			terminating = true;</a:t>
+                </a:r>
+              </a:p>
+              <a:p>
+                <a:pPr lvl="1"/>
+                <a:r>
+                  <a:rPr lang="en-US" sz="1400" dirty="0">
+                    <a:latin typeface="Courant" panose="02000509030000020004" pitchFamily="49" charset="0"/>
+                  </a:rPr>
+                  <a:t>	if(state = ‘var_’):</a:t>
+                </a:r>
+              </a:p>
+              <a:p>
+                <a:pPr lvl="1"/>
+                <a:r>
+                  <a:rPr lang="en-US" sz="1400" dirty="0">
+                    <a:latin typeface="Courant" panose="02000509030000020004" pitchFamily="49" charset="0"/>
+                  </a:rPr>
+                  <a:t>		</a:t>
+                </a:r>
+              </a:p>
+              <a:p>
+                <a:pPr lvl="1"/>
+                <a:r>
+                  <a:rPr lang="en-US" sz="1400" dirty="0">
+                    <a:latin typeface="Courant" panose="02000509030000020004" pitchFamily="49" charset="0"/>
+                  </a:rPr>
+                  <a:t>	</a:t>
+                </a:r>
+                <a:r>
+                  <a:rPr lang="en-US" sz="1400" dirty="0" err="1">
+                    <a:latin typeface="Courant" panose="02000509030000020004" pitchFamily="49" charset="0"/>
+                  </a:rPr>
+                  <a:t>i</a:t>
+                </a:r>
+                <a:r>
+                  <a:rPr lang="en-US" sz="1400" dirty="0">
+                    <a:latin typeface="Courant" panose="02000509030000020004" pitchFamily="49" charset="0"/>
+                  </a:rPr>
+                  <a:t>++;</a:t>
+                </a:r>
+              </a:p>
+              <a:p>
+                <a:pPr lvl="1"/>
+                <a:r>
+                  <a:rPr lang="en-US" sz="1400" dirty="0">
+                    <a:latin typeface="Courant" panose="02000509030000020004" pitchFamily="49" charset="0"/>
+                  </a:rPr>
+                  <a:t>}</a:t>
+                </a:r>
+              </a:p>
+              <a:p>
+                <a:pPr lvl="1"/>
+                <a:r>
+                  <a:rPr lang="en-US" sz="1400" dirty="0">
+                    <a:latin typeface="Courant" panose="02000509030000020004" pitchFamily="49" charset="0"/>
+                  </a:rPr>
+                  <a:t>Return 0;</a:t>
+                </a:r>
+              </a:p>
+              <a:p>
+                <a:r>
+                  <a:rPr lang="en-US" sz="1400" dirty="0">
+                    <a:latin typeface="Courant" panose="02000509030000020004" pitchFamily="49" charset="0"/>
+                  </a:rPr>
+                  <a:t>}</a:t>
+                </a:r>
+              </a:p>
+            </p:txBody>
+          </p:sp>
+        </mc:Choice>
+        <mc:Fallback>
+          <p:sp>
+            <p:nvSpPr>
+              <p:cNvPr id="2" name="文本框 1">
+                <a:extLst>
+                  <a:ext uri="{FF2B5EF4-FFF2-40B4-BE49-F238E27FC236}">
+                    <a16:creationId xmlns:a16="http://schemas.microsoft.com/office/drawing/2014/main" id="{32716550-9724-47AA-9434-4F585CC5206B}"/>
+                  </a:ext>
+                </a:extLst>
+              </p:cNvPr>
+              <p:cNvSpPr txBox="1">
+                <a:spLocks noRot="1" noChangeAspect="1" noMove="1" noResize="1" noEditPoints="1" noAdjustHandles="1" noChangeArrowheads="1" noChangeShapeType="1" noTextEdit="1"/>
+              </p:cNvSpPr>
+              <p:nvPr/>
+            </p:nvSpPr>
+            <p:spPr>
+              <a:xfrm>
+                <a:off x="2254927" y="0"/>
+                <a:ext cx="8128987" cy="8063746"/>
+              </a:xfrm>
+              <a:prstGeom prst="rect">
+                <a:avLst/>
+              </a:prstGeom>
+              <a:blipFill>
+                <a:blip r:embed="rId2"/>
+                <a:stretch>
+                  <a:fillRect l="-225" t="-151"/>
+                </a:stretch>
+              </a:blipFill>
+            </p:spPr>
+            <p:txBody>
+              <a:bodyPr/>
+              <a:lstStyle/>
+              <a:p>
+                <a:r>
+                  <a:rPr lang="en-US">
+                    <a:noFill/>
+                  </a:rPr>
+                  <a:t> </a:t>
+                </a:r>
+              </a:p>
+            </p:txBody>
+          </p:sp>
+        </mc:Fallback>
+      </mc:AlternateContent>
+    </p:spTree>
+    <p:extLst>
+      <p:ext uri="{BB962C8B-B14F-4D97-AF65-F5344CB8AC3E}">
+        <p14:creationId xmlns:p14="http://schemas.microsoft.com/office/powerpoint/2010/main" val="2867264365"/>
       </p:ext>
     </p:extLst>
   </p:cSld>
@@ -17531,8 +20181,8 @@
           </a:prstGeom>
         </p:spPr>
       </p:pic>
-      <mc:AlternateContent xmlns:mc="http://schemas.openxmlformats.org/markup-compatibility/2006">
-        <mc:Choice xmlns:a14="http://schemas.microsoft.com/office/drawing/2010/main" Requires="a14">
+      <mc:AlternateContent xmlns:mc="http://schemas.openxmlformats.org/markup-compatibility/2006" xmlns:a14="http://schemas.microsoft.com/office/drawing/2010/main">
+        <mc:Choice Requires="a14">
           <p:sp>
             <p:nvSpPr>
               <p:cNvPr id="4" name="文本框 3">
@@ -17561,6 +20211,7 @@
               </a:bodyPr>
               <a:lstStyle/>
               <a:p>
+                <a:pPr/>
                 <a14:m>
                   <m:oMathPara xmlns:m="http://schemas.openxmlformats.org/officeDocument/2006/math">
                     <m:oMathParaPr>
@@ -17757,7 +20408,7 @@
                       <m:d>
                         <m:dPr>
                           <m:ctrlPr>
-                            <a:rPr lang="en-US" sz="1100" b="0" i="0" smtClean="0">
+                            <a:rPr lang="en-US" sz="1100" b="0" i="1" smtClean="0">
                               <a:latin typeface="Cambria Math" panose="02040503050406030204" pitchFamily="18" charset="0"/>
                               <a:ea typeface="Cambria Math" panose="02040503050406030204" pitchFamily="18" charset="0"/>
                             </a:rPr>
@@ -17767,7 +20418,7 @@
                           <m:sSub>
                             <m:sSubPr>
                               <m:ctrlPr>
-                                <a:rPr lang="en-US" sz="1100" b="0" i="0" smtClean="0">
+                                <a:rPr lang="en-US" sz="1100" b="0" i="1" smtClean="0">
                                   <a:latin typeface="Cambria Math" panose="02040503050406030204" pitchFamily="18" charset="0"/>
                                   <a:ea typeface="Cambria Math" panose="02040503050406030204" pitchFamily="18" charset="0"/>
                                 </a:rPr>
@@ -17847,7 +20498,7 @@
             </p:txBody>
           </p:sp>
         </mc:Choice>
-        <mc:Fallback>
+        <mc:Fallback xmlns="">
           <p:sp>
             <p:nvSpPr>
               <p:cNvPr id="4" name="文本框 3">
@@ -17892,8 +20543,8 @@
           </p:sp>
         </mc:Fallback>
       </mc:AlternateContent>
-      <mc:AlternateContent xmlns:mc="http://schemas.openxmlformats.org/markup-compatibility/2006">
-        <mc:Choice xmlns:a14="http://schemas.microsoft.com/office/drawing/2010/main" Requires="a14">
+      <mc:AlternateContent xmlns:mc="http://schemas.openxmlformats.org/markup-compatibility/2006" xmlns:a14="http://schemas.microsoft.com/office/drawing/2010/main">
+        <mc:Choice Requires="a14">
           <p:sp>
             <p:nvSpPr>
               <p:cNvPr id="5" name="文本框 4">
@@ -17922,6 +20573,7 @@
               </a:bodyPr>
               <a:lstStyle/>
               <a:p>
+                <a:pPr/>
                 <a14:m>
                   <m:oMathPara xmlns:m="http://schemas.openxmlformats.org/officeDocument/2006/math">
                     <m:oMathParaPr>
@@ -18109,7 +20761,7 @@
             </p:txBody>
           </p:sp>
         </mc:Choice>
-        <mc:Fallback>
+        <mc:Fallback xmlns="">
           <p:sp>
             <p:nvSpPr>
               <p:cNvPr id="5" name="文本框 4">
@@ -18293,8 +20945,8 @@
             </a:fontRef>
           </p:style>
         </p:cxnSp>
-        <mc:AlternateContent xmlns:mc="http://schemas.openxmlformats.org/markup-compatibility/2006">
-          <mc:Choice xmlns:a14="http://schemas.microsoft.com/office/drawing/2010/main" Requires="a14">
+        <mc:AlternateContent xmlns:mc="http://schemas.openxmlformats.org/markup-compatibility/2006" xmlns:a14="http://schemas.microsoft.com/office/drawing/2010/main">
+          <mc:Choice Requires="a14">
             <p:sp>
               <p:nvSpPr>
                 <p:cNvPr id="3" name="文本框 2">
@@ -18323,6 +20975,7 @@
                 </a:bodyPr>
                 <a:lstStyle/>
                 <a:p>
+                  <a:pPr/>
                   <a14:m>
                     <m:oMathPara xmlns:m="http://schemas.openxmlformats.org/officeDocument/2006/math">
                       <m:oMathParaPr>
@@ -18343,7 +20996,7 @@
               </p:txBody>
             </p:sp>
           </mc:Choice>
-          <mc:Fallback>
+          <mc:Fallback xmlns="">
             <p:sp>
               <p:nvSpPr>
                 <p:cNvPr id="3" name="文本框 2">
@@ -18430,8 +21083,8 @@
             </a:fontRef>
           </p:style>
         </p:cxnSp>
-        <mc:AlternateContent xmlns:mc="http://schemas.openxmlformats.org/markup-compatibility/2006">
-          <mc:Choice xmlns:a14="http://schemas.microsoft.com/office/drawing/2010/main" Requires="a14">
+        <mc:AlternateContent xmlns:mc="http://schemas.openxmlformats.org/markup-compatibility/2006" xmlns:a14="http://schemas.microsoft.com/office/drawing/2010/main">
+          <mc:Choice Requires="a14">
             <p:sp>
               <p:nvSpPr>
                 <p:cNvPr id="14" name="文本框 13">
@@ -18460,6 +21113,7 @@
                 </a:bodyPr>
                 <a:lstStyle/>
                 <a:p>
+                  <a:pPr/>
                   <a14:m>
                     <m:oMathPara xmlns:m="http://schemas.openxmlformats.org/officeDocument/2006/math">
                       <m:oMathParaPr>
@@ -18480,7 +21134,7 @@
               </p:txBody>
             </p:sp>
           </mc:Choice>
-          <mc:Fallback>
+          <mc:Fallback xmlns="">
             <p:sp>
               <p:nvSpPr>
                 <p:cNvPr id="14" name="文本框 13">
@@ -18525,8 +21179,8 @@
             </p:sp>
           </mc:Fallback>
         </mc:AlternateContent>
-        <mc:AlternateContent xmlns:mc="http://schemas.openxmlformats.org/markup-compatibility/2006">
-          <mc:Choice xmlns:a14="http://schemas.microsoft.com/office/drawing/2010/main" Requires="a14">
+        <mc:AlternateContent xmlns:mc="http://schemas.openxmlformats.org/markup-compatibility/2006" xmlns:a14="http://schemas.microsoft.com/office/drawing/2010/main">
+          <mc:Choice Requires="a14">
             <p:sp>
               <p:nvSpPr>
                 <p:cNvPr id="15" name="文本框 14">
@@ -18555,6 +21209,7 @@
                 </a:bodyPr>
                 <a:lstStyle/>
                 <a:p>
+                  <a:pPr/>
                   <a14:m>
                     <m:oMathPara xmlns:m="http://schemas.openxmlformats.org/officeDocument/2006/math">
                       <m:oMathParaPr>
@@ -18575,7 +21230,7 @@
               </p:txBody>
             </p:sp>
           </mc:Choice>
-          <mc:Fallback>
+          <mc:Fallback xmlns="">
             <p:sp>
               <p:nvSpPr>
                 <p:cNvPr id="15" name="文本框 14">
@@ -18899,8 +21554,8 @@
             </a:fontRef>
           </p:style>
         </p:cxnSp>
-        <mc:AlternateContent xmlns:mc="http://schemas.openxmlformats.org/markup-compatibility/2006">
-          <mc:Choice xmlns:a14="http://schemas.microsoft.com/office/drawing/2010/main" Requires="a14">
+        <mc:AlternateContent xmlns:mc="http://schemas.openxmlformats.org/markup-compatibility/2006" xmlns:a14="http://schemas.microsoft.com/office/drawing/2010/main">
+          <mc:Choice Requires="a14">
             <p:sp>
               <p:nvSpPr>
                 <p:cNvPr id="52" name="文本框 51">
@@ -18929,6 +21584,7 @@
                 </a:bodyPr>
                 <a:lstStyle/>
                 <a:p>
+                  <a:pPr/>
                   <a14:m>
                     <m:oMathPara xmlns:m="http://schemas.openxmlformats.org/officeDocument/2006/math">
                       <m:oMathParaPr>
@@ -18949,7 +21605,7 @@
               </p:txBody>
             </p:sp>
           </mc:Choice>
-          <mc:Fallback>
+          <mc:Fallback xmlns="">
             <p:sp>
               <p:nvSpPr>
                 <p:cNvPr id="52" name="文本框 51">
@@ -19038,8 +21694,8 @@
             </a:fontRef>
           </p:style>
         </p:cxnSp>
-        <mc:AlternateContent xmlns:mc="http://schemas.openxmlformats.org/markup-compatibility/2006">
-          <mc:Choice xmlns:a14="http://schemas.microsoft.com/office/drawing/2010/main" Requires="a14">
+        <mc:AlternateContent xmlns:mc="http://schemas.openxmlformats.org/markup-compatibility/2006" xmlns:a14="http://schemas.microsoft.com/office/drawing/2010/main">
+          <mc:Choice Requires="a14">
             <p:sp>
               <p:nvSpPr>
                 <p:cNvPr id="55" name="文本框 54">
@@ -19068,6 +21724,7 @@
                 </a:bodyPr>
                 <a:lstStyle/>
                 <a:p>
+                  <a:pPr/>
                   <a14:m>
                     <m:oMathPara xmlns:m="http://schemas.openxmlformats.org/officeDocument/2006/math">
                       <m:oMathParaPr>
@@ -19088,7 +21745,7 @@
               </p:txBody>
             </p:sp>
           </mc:Choice>
-          <mc:Fallback>
+          <mc:Fallback xmlns="">
             <p:sp>
               <p:nvSpPr>
                 <p:cNvPr id="55" name="文本框 54">
@@ -19272,8 +21929,8 @@
           </p:txBody>
         </p:sp>
       </p:grpSp>
-      <mc:AlternateContent xmlns:mc="http://schemas.openxmlformats.org/markup-compatibility/2006">
-        <mc:Choice xmlns:a14="http://schemas.microsoft.com/office/drawing/2010/main" Requires="a14">
+      <mc:AlternateContent xmlns:mc="http://schemas.openxmlformats.org/markup-compatibility/2006" xmlns:a14="http://schemas.microsoft.com/office/drawing/2010/main">
+        <mc:Choice Requires="a14">
           <p:sp>
             <p:nvSpPr>
               <p:cNvPr id="69" name="文本框 68">
@@ -19302,6 +21959,7 @@
               </a:bodyPr>
               <a:lstStyle/>
               <a:p>
+                <a:pPr/>
                 <a14:m>
                   <m:oMathPara xmlns:m="http://schemas.openxmlformats.org/officeDocument/2006/math">
                     <m:oMathParaPr>
@@ -19335,7 +21993,7 @@
             </p:txBody>
           </p:sp>
         </mc:Choice>
-        <mc:Fallback>
+        <mc:Fallback xmlns="">
           <p:sp>
             <p:nvSpPr>
               <p:cNvPr id="69" name="文本框 68">
@@ -19380,8 +22038,8 @@
           </p:sp>
         </mc:Fallback>
       </mc:AlternateContent>
-      <mc:AlternateContent xmlns:mc="http://schemas.openxmlformats.org/markup-compatibility/2006">
-        <mc:Choice xmlns:a14="http://schemas.microsoft.com/office/drawing/2010/main" Requires="a14">
+      <mc:AlternateContent xmlns:mc="http://schemas.openxmlformats.org/markup-compatibility/2006" xmlns:a14="http://schemas.microsoft.com/office/drawing/2010/main">
+        <mc:Choice Requires="a14">
           <p:sp>
             <p:nvSpPr>
               <p:cNvPr id="70" name="文本框 69">
@@ -19410,6 +22068,7 @@
               </a:bodyPr>
               <a:lstStyle/>
               <a:p>
+                <a:pPr/>
                 <a14:m>
                   <m:oMathPara xmlns:m="http://schemas.openxmlformats.org/officeDocument/2006/math">
                     <m:oMathParaPr>
@@ -19455,7 +22114,7 @@
             </p:txBody>
           </p:sp>
         </mc:Choice>
-        <mc:Fallback>
+        <mc:Fallback xmlns="">
           <p:sp>
             <p:nvSpPr>
               <p:cNvPr id="70" name="文本框 69">
@@ -19775,8 +22434,8 @@
               </a:fontRef>
             </p:style>
           </p:cxnSp>
-          <mc:AlternateContent xmlns:mc="http://schemas.openxmlformats.org/markup-compatibility/2006">
-            <mc:Choice xmlns:a14="http://schemas.microsoft.com/office/drawing/2010/main" Requires="a14">
+          <mc:AlternateContent xmlns:mc="http://schemas.openxmlformats.org/markup-compatibility/2006" xmlns:a14="http://schemas.microsoft.com/office/drawing/2010/main">
+            <mc:Choice Requires="a14">
               <p:sp>
                 <p:nvSpPr>
                   <p:cNvPr id="16" name="文本框 15">
@@ -19805,6 +22464,7 @@
                   </a:bodyPr>
                   <a:lstStyle/>
                   <a:p>
+                    <a:pPr/>
                     <a14:m>
                       <m:oMathPara xmlns:m="http://schemas.openxmlformats.org/officeDocument/2006/math">
                         <m:oMathParaPr>
@@ -19825,7 +22485,7 @@
                 </p:txBody>
               </p:sp>
             </mc:Choice>
-            <mc:Fallback>
+            <mc:Fallback xmlns="">
               <p:sp>
                 <p:nvSpPr>
                   <p:cNvPr id="16" name="文本框 15">
@@ -19914,8 +22574,8 @@
               </a:fontRef>
             </p:style>
           </p:cxnSp>
-          <mc:AlternateContent xmlns:mc="http://schemas.openxmlformats.org/markup-compatibility/2006">
-            <mc:Choice xmlns:a14="http://schemas.microsoft.com/office/drawing/2010/main" Requires="a14">
+          <mc:AlternateContent xmlns:mc="http://schemas.openxmlformats.org/markup-compatibility/2006" xmlns:a14="http://schemas.microsoft.com/office/drawing/2010/main">
+            <mc:Choice Requires="a14">
               <p:sp>
                 <p:nvSpPr>
                   <p:cNvPr id="18" name="文本框 17">
@@ -19944,6 +22604,7 @@
                   </a:bodyPr>
                   <a:lstStyle/>
                   <a:p>
+                    <a:pPr/>
                     <a14:m>
                       <m:oMathPara xmlns:m="http://schemas.openxmlformats.org/officeDocument/2006/math">
                         <m:oMathParaPr>
@@ -19964,7 +22625,7 @@
                 </p:txBody>
               </p:sp>
             </mc:Choice>
-            <mc:Fallback>
+            <mc:Fallback xmlns="">
               <p:sp>
                 <p:nvSpPr>
                   <p:cNvPr id="18" name="文本框 17">
@@ -20119,8 +22780,8 @@
               </a:fontRef>
             </p:style>
           </p:cxnSp>
-          <mc:AlternateContent xmlns:mc="http://schemas.openxmlformats.org/markup-compatibility/2006">
-            <mc:Choice xmlns:a14="http://schemas.microsoft.com/office/drawing/2010/main" Requires="a14">
+          <mc:AlternateContent xmlns:mc="http://schemas.openxmlformats.org/markup-compatibility/2006" xmlns:a14="http://schemas.microsoft.com/office/drawing/2010/main">
+            <mc:Choice Requires="a14">
               <p:sp>
                 <p:nvSpPr>
                   <p:cNvPr id="5" name="文本框 4">
@@ -20149,6 +22810,7 @@
                   </a:bodyPr>
                   <a:lstStyle/>
                   <a:p>
+                    <a:pPr/>
                     <a14:m>
                       <m:oMathPara xmlns:m="http://schemas.openxmlformats.org/officeDocument/2006/math">
                         <m:oMathParaPr>
@@ -20169,7 +22831,7 @@
                 </p:txBody>
               </p:sp>
             </mc:Choice>
-            <mc:Fallback>
+            <mc:Fallback xmlns="">
               <p:sp>
                 <p:nvSpPr>
                   <p:cNvPr id="5" name="文本框 4">
@@ -20256,8 +22918,8 @@
               </a:fontRef>
             </p:style>
           </p:cxnSp>
-          <mc:AlternateContent xmlns:mc="http://schemas.openxmlformats.org/markup-compatibility/2006">
-            <mc:Choice xmlns:a14="http://schemas.microsoft.com/office/drawing/2010/main" Requires="a14">
+          <mc:AlternateContent xmlns:mc="http://schemas.openxmlformats.org/markup-compatibility/2006" xmlns:a14="http://schemas.microsoft.com/office/drawing/2010/main">
+            <mc:Choice Requires="a14">
               <p:sp>
                 <p:nvSpPr>
                   <p:cNvPr id="7" name="文本框 6">
@@ -20286,6 +22948,7 @@
                   </a:bodyPr>
                   <a:lstStyle/>
                   <a:p>
+                    <a:pPr/>
                     <a14:m>
                       <m:oMathPara xmlns:m="http://schemas.openxmlformats.org/officeDocument/2006/math">
                         <m:oMathParaPr>
@@ -20306,7 +22969,7 @@
                 </p:txBody>
               </p:sp>
             </mc:Choice>
-            <mc:Fallback>
+            <mc:Fallback xmlns="">
               <p:sp>
                 <p:nvSpPr>
                   <p:cNvPr id="7" name="文本框 6">
@@ -20351,8 +23014,8 @@
               </p:sp>
             </mc:Fallback>
           </mc:AlternateContent>
-          <mc:AlternateContent xmlns:mc="http://schemas.openxmlformats.org/markup-compatibility/2006">
-            <mc:Choice xmlns:a14="http://schemas.microsoft.com/office/drawing/2010/main" Requires="a14">
+          <mc:AlternateContent xmlns:mc="http://schemas.openxmlformats.org/markup-compatibility/2006" xmlns:a14="http://schemas.microsoft.com/office/drawing/2010/main">
+            <mc:Choice Requires="a14">
               <p:sp>
                 <p:nvSpPr>
                   <p:cNvPr id="8" name="文本框 7">
@@ -20381,6 +23044,7 @@
                   </a:bodyPr>
                   <a:lstStyle/>
                   <a:p>
+                    <a:pPr/>
                     <a14:m>
                       <m:oMathPara xmlns:m="http://schemas.openxmlformats.org/officeDocument/2006/math">
                         <m:oMathParaPr>
@@ -20401,7 +23065,7 @@
                 </p:txBody>
               </p:sp>
             </mc:Choice>
-            <mc:Fallback>
+            <mc:Fallback xmlns="">
               <p:sp>
                 <p:nvSpPr>
                   <p:cNvPr id="8" name="文本框 7">
@@ -20871,8 +23535,8 @@
             </a:fontRef>
           </p:style>
         </p:cxnSp>
-        <mc:AlternateContent xmlns:mc="http://schemas.openxmlformats.org/markup-compatibility/2006">
-          <mc:Choice xmlns:a14="http://schemas.microsoft.com/office/drawing/2010/main" Requires="a14">
+        <mc:AlternateContent xmlns:mc="http://schemas.openxmlformats.org/markup-compatibility/2006" xmlns:a14="http://schemas.microsoft.com/office/drawing/2010/main">
+          <mc:Choice Requires="a14">
             <p:sp>
               <p:nvSpPr>
                 <p:cNvPr id="20" name="文本框 19">
@@ -20901,6 +23565,7 @@
                 </a:bodyPr>
                 <a:lstStyle/>
                 <a:p>
+                  <a:pPr/>
                   <a14:m>
                     <m:oMathPara xmlns:m="http://schemas.openxmlformats.org/officeDocument/2006/math">
                       <m:oMathParaPr>
@@ -20921,7 +23586,7 @@
               </p:txBody>
             </p:sp>
           </mc:Choice>
-          <mc:Fallback>
+          <mc:Fallback xmlns="">
             <p:sp>
               <p:nvSpPr>
                 <p:cNvPr id="20" name="文本框 19">
@@ -21010,8 +23675,8 @@
             </a:fontRef>
           </p:style>
         </p:cxnSp>
-        <mc:AlternateContent xmlns:mc="http://schemas.openxmlformats.org/markup-compatibility/2006">
-          <mc:Choice xmlns:a14="http://schemas.microsoft.com/office/drawing/2010/main" Requires="a14">
+        <mc:AlternateContent xmlns:mc="http://schemas.openxmlformats.org/markup-compatibility/2006" xmlns:a14="http://schemas.microsoft.com/office/drawing/2010/main">
+          <mc:Choice Requires="a14">
             <p:sp>
               <p:nvSpPr>
                 <p:cNvPr id="22" name="文本框 21">
@@ -21040,6 +23705,7 @@
                 </a:bodyPr>
                 <a:lstStyle/>
                 <a:p>
+                  <a:pPr/>
                   <a14:m>
                     <m:oMathPara xmlns:m="http://schemas.openxmlformats.org/officeDocument/2006/math">
                       <m:oMathParaPr>
@@ -21060,7 +23726,7 @@
               </p:txBody>
             </p:sp>
           </mc:Choice>
-          <mc:Fallback>
+          <mc:Fallback xmlns="">
             <p:sp>
               <p:nvSpPr>
                 <p:cNvPr id="22" name="文本框 21">
@@ -21173,8 +23839,8 @@
             </a:p>
           </p:txBody>
         </p:sp>
-        <mc:AlternateContent xmlns:mc="http://schemas.openxmlformats.org/markup-compatibility/2006">
-          <mc:Choice xmlns:a14="http://schemas.microsoft.com/office/drawing/2010/main" Requires="a14">
+        <mc:AlternateContent xmlns:mc="http://schemas.openxmlformats.org/markup-compatibility/2006" xmlns:a14="http://schemas.microsoft.com/office/drawing/2010/main">
+          <mc:Choice Requires="a14">
             <p:sp>
               <p:nvSpPr>
                 <p:cNvPr id="7" name="文本框 6">
@@ -21203,6 +23869,7 @@
                 </a:bodyPr>
                 <a:lstStyle/>
                 <a:p>
+                  <a:pPr/>
                   <a14:m>
                     <m:oMathPara xmlns:m="http://schemas.openxmlformats.org/officeDocument/2006/math">
                       <m:oMathParaPr>
@@ -21223,7 +23890,7 @@
               </p:txBody>
             </p:sp>
           </mc:Choice>
-          <mc:Fallback>
+          <mc:Fallback xmlns="">
             <p:sp>
               <p:nvSpPr>
                 <p:cNvPr id="7" name="文本框 6">
@@ -21268,8 +23935,8 @@
             </p:sp>
           </mc:Fallback>
         </mc:AlternateContent>
-        <mc:AlternateContent xmlns:mc="http://schemas.openxmlformats.org/markup-compatibility/2006">
-          <mc:Choice xmlns:a14="http://schemas.microsoft.com/office/drawing/2010/main" Requires="a14">
+        <mc:AlternateContent xmlns:mc="http://schemas.openxmlformats.org/markup-compatibility/2006" xmlns:a14="http://schemas.microsoft.com/office/drawing/2010/main">
+          <mc:Choice Requires="a14">
             <p:sp>
               <p:nvSpPr>
                 <p:cNvPr id="9" name="文本框 8">
@@ -21298,6 +23965,7 @@
                 </a:bodyPr>
                 <a:lstStyle/>
                 <a:p>
+                  <a:pPr/>
                   <a14:m>
                     <m:oMathPara xmlns:m="http://schemas.openxmlformats.org/officeDocument/2006/math">
                       <m:oMathParaPr>
@@ -21318,7 +23986,7 @@
               </p:txBody>
             </p:sp>
           </mc:Choice>
-          <mc:Fallback>
+          <mc:Fallback xmlns="">
             <p:sp>
               <p:nvSpPr>
                 <p:cNvPr id="9" name="文本框 8">
@@ -21363,8 +24031,8 @@
             </p:sp>
           </mc:Fallback>
         </mc:AlternateContent>
-        <mc:AlternateContent xmlns:mc="http://schemas.openxmlformats.org/markup-compatibility/2006">
-          <mc:Choice xmlns:a14="http://schemas.microsoft.com/office/drawing/2010/main" Requires="a14">
+        <mc:AlternateContent xmlns:mc="http://schemas.openxmlformats.org/markup-compatibility/2006" xmlns:a14="http://schemas.microsoft.com/office/drawing/2010/main">
+          <mc:Choice Requires="a14">
             <p:sp>
               <p:nvSpPr>
                 <p:cNvPr id="10" name="文本框 9">
@@ -21393,6 +24061,7 @@
                 </a:bodyPr>
                 <a:lstStyle/>
                 <a:p>
+                  <a:pPr/>
                   <a14:m>
                     <m:oMathPara xmlns:m="http://schemas.openxmlformats.org/officeDocument/2006/math">
                       <m:oMathParaPr>
@@ -21413,7 +24082,7 @@
               </p:txBody>
             </p:sp>
           </mc:Choice>
-          <mc:Fallback>
+          <mc:Fallback xmlns="">
             <p:sp>
               <p:nvSpPr>
                 <p:cNvPr id="10" name="文本框 9">

</xml_diff>

<commit_message>
outline vector, array, complex number, processing, dynamic types
</commit_message>
<xml_diff>
--- a/doc/illustrations.pptx
+++ b/doc/illustrations.pptx
@@ -22,6 +22,9 @@
     <p:sldId id="270" r:id="rId16"/>
     <p:sldId id="271" r:id="rId17"/>
     <p:sldId id="272" r:id="rId18"/>
+    <p:sldId id="273" r:id="rId19"/>
+    <p:sldId id="274" r:id="rId20"/>
+    <p:sldId id="275" r:id="rId21"/>
   </p:sldIdLst>
   <p:sldSz cx="12192000" cy="6858000"/>
   <p:notesSz cx="6858000" cy="9144000"/>
@@ -6861,7 +6864,7 @@
           <a:p>
             <a:fld id="{82BB0895-06E8-4B53-88C8-0F0562CFD945}" type="datetimeFigureOut">
               <a:rPr lang="en-US" smtClean="0"/>
-              <a:t>8/19/2021</a:t>
+              <a:t>5/15/2022</a:t>
             </a:fld>
             <a:endParaRPr lang="en-US"/>
           </a:p>
@@ -7031,7 +7034,7 @@
           <a:p>
             <a:fld id="{82BB0895-06E8-4B53-88C8-0F0562CFD945}" type="datetimeFigureOut">
               <a:rPr lang="en-US" smtClean="0"/>
-              <a:t>8/19/2021</a:t>
+              <a:t>5/15/2022</a:t>
             </a:fld>
             <a:endParaRPr lang="en-US"/>
           </a:p>
@@ -7211,7 +7214,7 @@
           <a:p>
             <a:fld id="{82BB0895-06E8-4B53-88C8-0F0562CFD945}" type="datetimeFigureOut">
               <a:rPr lang="en-US" smtClean="0"/>
-              <a:t>8/19/2021</a:t>
+              <a:t>5/15/2022</a:t>
             </a:fld>
             <a:endParaRPr lang="en-US"/>
           </a:p>
@@ -7381,7 +7384,7 @@
           <a:p>
             <a:fld id="{82BB0895-06E8-4B53-88C8-0F0562CFD945}" type="datetimeFigureOut">
               <a:rPr lang="en-US" smtClean="0"/>
-              <a:t>8/19/2021</a:t>
+              <a:t>5/15/2022</a:t>
             </a:fld>
             <a:endParaRPr lang="en-US"/>
           </a:p>
@@ -7627,7 +7630,7 @@
           <a:p>
             <a:fld id="{82BB0895-06E8-4B53-88C8-0F0562CFD945}" type="datetimeFigureOut">
               <a:rPr lang="en-US" smtClean="0"/>
-              <a:t>8/19/2021</a:t>
+              <a:t>5/15/2022</a:t>
             </a:fld>
             <a:endParaRPr lang="en-US"/>
           </a:p>
@@ -7859,7 +7862,7 @@
           <a:p>
             <a:fld id="{82BB0895-06E8-4B53-88C8-0F0562CFD945}" type="datetimeFigureOut">
               <a:rPr lang="en-US" smtClean="0"/>
-              <a:t>8/19/2021</a:t>
+              <a:t>5/15/2022</a:t>
             </a:fld>
             <a:endParaRPr lang="en-US"/>
           </a:p>
@@ -8226,7 +8229,7 @@
           <a:p>
             <a:fld id="{82BB0895-06E8-4B53-88C8-0F0562CFD945}" type="datetimeFigureOut">
               <a:rPr lang="en-US" smtClean="0"/>
-              <a:t>8/19/2021</a:t>
+              <a:t>5/15/2022</a:t>
             </a:fld>
             <a:endParaRPr lang="en-US"/>
           </a:p>
@@ -8344,7 +8347,7 @@
           <a:p>
             <a:fld id="{82BB0895-06E8-4B53-88C8-0F0562CFD945}" type="datetimeFigureOut">
               <a:rPr lang="en-US" smtClean="0"/>
-              <a:t>8/19/2021</a:t>
+              <a:t>5/15/2022</a:t>
             </a:fld>
             <a:endParaRPr lang="en-US"/>
           </a:p>
@@ -8439,7 +8442,7 @@
           <a:p>
             <a:fld id="{82BB0895-06E8-4B53-88C8-0F0562CFD945}" type="datetimeFigureOut">
               <a:rPr lang="en-US" smtClean="0"/>
-              <a:t>8/19/2021</a:t>
+              <a:t>5/15/2022</a:t>
             </a:fld>
             <a:endParaRPr lang="en-US"/>
           </a:p>
@@ -8716,7 +8719,7 @@
           <a:p>
             <a:fld id="{82BB0895-06E8-4B53-88C8-0F0562CFD945}" type="datetimeFigureOut">
               <a:rPr lang="en-US" smtClean="0"/>
-              <a:t>8/19/2021</a:t>
+              <a:t>5/15/2022</a:t>
             </a:fld>
             <a:endParaRPr lang="en-US"/>
           </a:p>
@@ -8973,7 +8976,7 @@
           <a:p>
             <a:fld id="{82BB0895-06E8-4B53-88C8-0F0562CFD945}" type="datetimeFigureOut">
               <a:rPr lang="en-US" smtClean="0"/>
-              <a:t>8/19/2021</a:t>
+              <a:t>5/15/2022</a:t>
             </a:fld>
             <a:endParaRPr lang="en-US"/>
           </a:p>
@@ -9186,7 +9189,7 @@
           <a:p>
             <a:fld id="{82BB0895-06E8-4B53-88C8-0F0562CFD945}" type="datetimeFigureOut">
               <a:rPr lang="en-US" smtClean="0"/>
-              <a:t>8/19/2021</a:t>
+              <a:t>5/15/2022</a:t>
             </a:fld>
             <a:endParaRPr lang="en-US"/>
           </a:p>
@@ -9865,8 +9868,8 @@
             </a:schemeClr>
           </a:solidFill>
         </p:grpSpPr>
-        <mc:AlternateContent xmlns:mc="http://schemas.openxmlformats.org/markup-compatibility/2006">
-          <mc:Choice xmlns:a14="http://schemas.microsoft.com/office/drawing/2010/main" Requires="a14">
+        <mc:AlternateContent xmlns:mc="http://schemas.openxmlformats.org/markup-compatibility/2006" xmlns:a14="http://schemas.microsoft.com/office/drawing/2010/main">
+          <mc:Choice Requires="a14">
             <p:sp>
               <p:nvSpPr>
                 <p:cNvPr id="13" name="矩形: 圆角 12">
@@ -9942,7 +9945,7 @@
               </p:txBody>
             </p:sp>
           </mc:Choice>
-          <mc:Fallback>
+          <mc:Fallback xmlns="">
             <p:sp>
               <p:nvSpPr>
                 <p:cNvPr id="13" name="矩形: 圆角 12">
@@ -9992,8 +9995,8 @@
             </p:sp>
           </mc:Fallback>
         </mc:AlternateContent>
-        <mc:AlternateContent xmlns:mc="http://schemas.openxmlformats.org/markup-compatibility/2006">
-          <mc:Choice xmlns:a14="http://schemas.microsoft.com/office/drawing/2010/main" Requires="a14">
+        <mc:AlternateContent xmlns:mc="http://schemas.openxmlformats.org/markup-compatibility/2006" xmlns:a14="http://schemas.microsoft.com/office/drawing/2010/main">
+          <mc:Choice Requires="a14">
             <p:sp>
               <p:nvSpPr>
                 <p:cNvPr id="14" name="矩形: 圆角 13">
@@ -10069,7 +10072,7 @@
               </p:txBody>
             </p:sp>
           </mc:Choice>
-          <mc:Fallback>
+          <mc:Fallback xmlns="">
             <p:sp>
               <p:nvSpPr>
                 <p:cNvPr id="14" name="矩形: 圆角 13">
@@ -10119,8 +10122,8 @@
             </p:sp>
           </mc:Fallback>
         </mc:AlternateContent>
-        <mc:AlternateContent xmlns:mc="http://schemas.openxmlformats.org/markup-compatibility/2006">
-          <mc:Choice xmlns:a14="http://schemas.microsoft.com/office/drawing/2010/main" Requires="a14">
+        <mc:AlternateContent xmlns:mc="http://schemas.openxmlformats.org/markup-compatibility/2006" xmlns:a14="http://schemas.microsoft.com/office/drawing/2010/main">
+          <mc:Choice Requires="a14">
             <p:sp>
               <p:nvSpPr>
                 <p:cNvPr id="15" name="矩形: 圆角 14">
@@ -10196,7 +10199,7 @@
               </p:txBody>
             </p:sp>
           </mc:Choice>
-          <mc:Fallback>
+          <mc:Fallback xmlns="">
             <p:sp>
               <p:nvSpPr>
                 <p:cNvPr id="15" name="矩形: 圆角 14">
@@ -16911,6 +16914,1744 @@
 </p:sld>
 </file>
 
+<file path=ppt/slides/slide18.xml><?xml version="1.0" encoding="utf-8"?>
+<p:sld xmlns:a="http://schemas.openxmlformats.org/drawingml/2006/main" xmlns:r="http://schemas.openxmlformats.org/officeDocument/2006/relationships" xmlns:p="http://schemas.openxmlformats.org/presentationml/2006/main">
+  <p:cSld>
+    <p:spTree>
+      <p:nvGrpSpPr>
+        <p:cNvPr id="1" name=""/>
+        <p:cNvGrpSpPr/>
+        <p:nvPr/>
+      </p:nvGrpSpPr>
+      <p:grpSpPr>
+        <a:xfrm>
+          <a:off x="0" y="0"/>
+          <a:ext cx="0" cy="0"/>
+          <a:chOff x="0" y="0"/>
+          <a:chExt cx="0" cy="0"/>
+        </a:xfrm>
+      </p:grpSpPr>
+      <mc:AlternateContent xmlns:mc="http://schemas.openxmlformats.org/markup-compatibility/2006" xmlns:a14="http://schemas.microsoft.com/office/drawing/2010/main">
+        <mc:Choice Requires="a14">
+          <p:sp>
+            <p:nvSpPr>
+              <p:cNvPr id="2" name="TextBox 1">
+                <a:extLst>
+                  <a:ext uri="{FF2B5EF4-FFF2-40B4-BE49-F238E27FC236}">
+                    <a16:creationId xmlns:a16="http://schemas.microsoft.com/office/drawing/2014/main" id="{5AD1CE97-ADDC-00B1-344A-51AD917AAC14}"/>
+                  </a:ext>
+                </a:extLst>
+              </p:cNvPr>
+              <p:cNvSpPr txBox="1"/>
+              <p:nvPr/>
+            </p:nvSpPr>
+            <p:spPr>
+              <a:xfrm>
+                <a:off x="855901" y="709863"/>
+                <a:ext cx="7494815" cy="1060483"/>
+              </a:xfrm>
+              <a:prstGeom prst="rect">
+                <a:avLst/>
+              </a:prstGeom>
+              <a:noFill/>
+            </p:spPr>
+            <p:txBody>
+              <a:bodyPr wrap="square" rtlCol="0">
+                <a:spAutoFit/>
+              </a:bodyPr>
+              <a:lstStyle/>
+              <a:p>
+                <a:pPr/>
+                <a14:m>
+                  <m:oMathPara xmlns:m="http://schemas.openxmlformats.org/officeDocument/2006/math">
+                    <m:oMathParaPr>
+                      <m:jc m:val="left"/>
+                    </m:oMathParaPr>
+                    <m:oMath xmlns:m="http://schemas.openxmlformats.org/officeDocument/2006/math">
+                      <m:r>
+                        <a:rPr lang="en-US" sz="2800" b="0" i="1" smtClean="0">
+                          <a:latin typeface="Cambria Math" panose="02040503050406030204" pitchFamily="18" charset="0"/>
+                        </a:rPr>
+                        <m:t>𝑟</m:t>
+                      </m:r>
+                      <m:r>
+                        <a:rPr lang="en-US" sz="2800" b="0" i="1" smtClean="0">
+                          <a:latin typeface="Cambria Math" panose="02040503050406030204" pitchFamily="18" charset="0"/>
+                        </a:rPr>
+                        <m:t>=</m:t>
+                      </m:r>
+                      <m:d>
+                        <m:dPr>
+                          <m:begChr m:val="|"/>
+                          <m:endChr m:val="|"/>
+                          <m:ctrlPr>
+                            <a:rPr lang="en-US" sz="2800" b="0" i="1" smtClean="0">
+                              <a:latin typeface="Cambria Math" panose="02040503050406030204" pitchFamily="18" charset="0"/>
+                            </a:rPr>
+                          </m:ctrlPr>
+                        </m:dPr>
+                        <m:e>
+                          <m:acc>
+                            <m:accPr>
+                              <m:chr m:val="⃗"/>
+                              <m:ctrlPr>
+                                <a:rPr lang="en-US" sz="2800" b="0" i="1" smtClean="0">
+                                  <a:latin typeface="Cambria Math" panose="02040503050406030204" pitchFamily="18" charset="0"/>
+                                </a:rPr>
+                              </m:ctrlPr>
+                            </m:accPr>
+                            <m:e>
+                              <m:r>
+                                <a:rPr lang="en-US" sz="2800" b="0" i="1" smtClean="0">
+                                  <a:latin typeface="Cambria Math" panose="02040503050406030204" pitchFamily="18" charset="0"/>
+                                </a:rPr>
+                                <m:t>𝑟</m:t>
+                              </m:r>
+                            </m:e>
+                          </m:acc>
+                        </m:e>
+                      </m:d>
+                      <m:r>
+                        <a:rPr lang="en-US" sz="2800" b="0" i="1" smtClean="0">
+                          <a:latin typeface="Cambria Math" panose="02040503050406030204" pitchFamily="18" charset="0"/>
+                        </a:rPr>
+                        <m:t>, </m:t>
+                      </m:r>
+                      <m:r>
+                        <a:rPr lang="en-US" sz="2800" b="0" i="1" smtClean="0">
+                          <a:latin typeface="Cambria Math" panose="02040503050406030204" pitchFamily="18" charset="0"/>
+                        </a:rPr>
+                        <m:t>𝜃</m:t>
+                      </m:r>
+                      <m:r>
+                        <a:rPr lang="en-US" sz="2800" b="0" i="1" smtClean="0">
+                          <a:latin typeface="Cambria Math" panose="02040503050406030204" pitchFamily="18" charset="0"/>
+                        </a:rPr>
+                        <m:t>=</m:t>
+                      </m:r>
+                      <m:sSup>
+                        <m:sSupPr>
+                          <m:ctrlPr>
+                            <a:rPr lang="en-US" sz="2800" b="0" i="1" smtClean="0">
+                              <a:latin typeface="Cambria Math" panose="02040503050406030204" pitchFamily="18" charset="0"/>
+                            </a:rPr>
+                          </m:ctrlPr>
+                        </m:sSupPr>
+                        <m:e>
+                          <m:r>
+                            <m:rPr>
+                              <m:sty m:val="p"/>
+                            </m:rPr>
+                            <a:rPr lang="en-US" sz="2800" b="0" i="0" smtClean="0">
+                              <a:latin typeface="Cambria Math" panose="02040503050406030204" pitchFamily="18" charset="0"/>
+                            </a:rPr>
+                            <m:t>tan</m:t>
+                          </m:r>
+                        </m:e>
+                        <m:sup>
+                          <m:r>
+                            <a:rPr lang="en-US" sz="2800" b="0" i="1" smtClean="0">
+                              <a:latin typeface="Cambria Math" panose="02040503050406030204" pitchFamily="18" charset="0"/>
+                            </a:rPr>
+                            <m:t>−1</m:t>
+                          </m:r>
+                        </m:sup>
+                      </m:sSup>
+                      <m:d>
+                        <m:dPr>
+                          <m:ctrlPr>
+                            <a:rPr lang="en-US" sz="2800" b="0" i="1" smtClean="0">
+                              <a:latin typeface="Cambria Math" panose="02040503050406030204" pitchFamily="18" charset="0"/>
+                            </a:rPr>
+                          </m:ctrlPr>
+                        </m:dPr>
+                        <m:e>
+                          <m:f>
+                            <m:fPr>
+                              <m:ctrlPr>
+                                <a:rPr lang="en-US" sz="2800" b="0" i="1" smtClean="0">
+                                  <a:latin typeface="Cambria Math" panose="02040503050406030204" pitchFamily="18" charset="0"/>
+                                </a:rPr>
+                              </m:ctrlPr>
+                            </m:fPr>
+                            <m:num>
+                              <m:sSub>
+                                <m:sSubPr>
+                                  <m:ctrlPr>
+                                    <a:rPr lang="en-US" sz="2800" b="0" i="1" smtClean="0">
+                                      <a:latin typeface="Cambria Math" panose="02040503050406030204" pitchFamily="18" charset="0"/>
+                                    </a:rPr>
+                                  </m:ctrlPr>
+                                </m:sSubPr>
+                                <m:e>
+                                  <m:r>
+                                    <a:rPr lang="en-US" sz="2800" b="0" i="1" smtClean="0">
+                                      <a:latin typeface="Cambria Math" panose="02040503050406030204" pitchFamily="18" charset="0"/>
+                                    </a:rPr>
+                                    <m:t>𝑟</m:t>
+                                  </m:r>
+                                </m:e>
+                                <m:sub>
+                                  <m:r>
+                                    <a:rPr lang="en-US" sz="2800" b="0" i="1" smtClean="0">
+                                      <a:latin typeface="Cambria Math" panose="02040503050406030204" pitchFamily="18" charset="0"/>
+                                    </a:rPr>
+                                    <m:t>𝑦</m:t>
+                                  </m:r>
+                                </m:sub>
+                              </m:sSub>
+                            </m:num>
+                            <m:den>
+                              <m:sSub>
+                                <m:sSubPr>
+                                  <m:ctrlPr>
+                                    <a:rPr lang="en-US" sz="2800" b="0" i="1" smtClean="0">
+                                      <a:latin typeface="Cambria Math" panose="02040503050406030204" pitchFamily="18" charset="0"/>
+                                    </a:rPr>
+                                  </m:ctrlPr>
+                                </m:sSubPr>
+                                <m:e>
+                                  <m:r>
+                                    <a:rPr lang="en-US" sz="2800" b="0" i="1" smtClean="0">
+                                      <a:latin typeface="Cambria Math" panose="02040503050406030204" pitchFamily="18" charset="0"/>
+                                    </a:rPr>
+                                    <m:t>𝑟</m:t>
+                                  </m:r>
+                                </m:e>
+                                <m:sub>
+                                  <m:r>
+                                    <a:rPr lang="en-US" sz="2800" b="0" i="1" smtClean="0">
+                                      <a:latin typeface="Cambria Math" panose="02040503050406030204" pitchFamily="18" charset="0"/>
+                                    </a:rPr>
+                                    <m:t>𝑥</m:t>
+                                  </m:r>
+                                </m:sub>
+                              </m:sSub>
+                            </m:den>
+                          </m:f>
+                        </m:e>
+                      </m:d>
+                      <m:r>
+                        <a:rPr lang="en-US" sz="2800" b="0" i="1" smtClean="0">
+                          <a:latin typeface="Cambria Math" panose="02040503050406030204" pitchFamily="18" charset="0"/>
+                        </a:rPr>
+                        <m:t>, </m:t>
+                      </m:r>
+                      <m:r>
+                        <a:rPr lang="en-US" sz="2800" b="0" i="1" smtClean="0">
+                          <a:latin typeface="Cambria Math" panose="02040503050406030204" pitchFamily="18" charset="0"/>
+                        </a:rPr>
+                        <m:t>𝜙</m:t>
+                      </m:r>
+                      <m:r>
+                        <a:rPr lang="en-US" sz="2800" b="0" i="1" smtClean="0">
+                          <a:latin typeface="Cambria Math" panose="02040503050406030204" pitchFamily="18" charset="0"/>
+                        </a:rPr>
+                        <m:t>=</m:t>
+                      </m:r>
+                      <m:func>
+                        <m:funcPr>
+                          <m:ctrlPr>
+                            <a:rPr lang="en-US" sz="2800" b="0" i="1" smtClean="0">
+                              <a:latin typeface="Cambria Math" panose="02040503050406030204" pitchFamily="18" charset="0"/>
+                            </a:rPr>
+                          </m:ctrlPr>
+                        </m:funcPr>
+                        <m:fName>
+                          <m:sSup>
+                            <m:sSupPr>
+                              <m:ctrlPr>
+                                <a:rPr lang="en-US" sz="2800" b="0" i="1" smtClean="0">
+                                  <a:latin typeface="Cambria Math" panose="02040503050406030204" pitchFamily="18" charset="0"/>
+                                </a:rPr>
+                              </m:ctrlPr>
+                            </m:sSupPr>
+                            <m:e>
+                              <m:r>
+                                <m:rPr>
+                                  <m:sty m:val="p"/>
+                                </m:rPr>
+                                <a:rPr lang="en-US" sz="2800" b="0" i="0" smtClean="0">
+                                  <a:latin typeface="Cambria Math" panose="02040503050406030204" pitchFamily="18" charset="0"/>
+                                </a:rPr>
+                                <m:t>cos</m:t>
+                              </m:r>
+                            </m:e>
+                            <m:sup>
+                              <m:r>
+                                <a:rPr lang="en-US" sz="2800" b="0" i="1" smtClean="0">
+                                  <a:latin typeface="Cambria Math" panose="02040503050406030204" pitchFamily="18" charset="0"/>
+                                </a:rPr>
+                                <m:t>−1</m:t>
+                              </m:r>
+                            </m:sup>
+                          </m:sSup>
+                        </m:fName>
+                        <m:e>
+                          <m:f>
+                            <m:fPr>
+                              <m:ctrlPr>
+                                <a:rPr lang="en-US" sz="2800" b="0" i="1" smtClean="0">
+                                  <a:latin typeface="Cambria Math" panose="02040503050406030204" pitchFamily="18" charset="0"/>
+                                </a:rPr>
+                              </m:ctrlPr>
+                            </m:fPr>
+                            <m:num>
+                              <m:sSub>
+                                <m:sSubPr>
+                                  <m:ctrlPr>
+                                    <a:rPr lang="en-US" sz="2800" b="0" i="1" smtClean="0">
+                                      <a:latin typeface="Cambria Math" panose="02040503050406030204" pitchFamily="18" charset="0"/>
+                                    </a:rPr>
+                                  </m:ctrlPr>
+                                </m:sSubPr>
+                                <m:e>
+                                  <m:r>
+                                    <a:rPr lang="en-US" sz="2800" b="0" i="1" smtClean="0">
+                                      <a:latin typeface="Cambria Math" panose="02040503050406030204" pitchFamily="18" charset="0"/>
+                                    </a:rPr>
+                                    <m:t>𝑟</m:t>
+                                  </m:r>
+                                </m:e>
+                                <m:sub>
+                                  <m:r>
+                                    <a:rPr lang="en-US" sz="2800" b="0" i="1" smtClean="0">
+                                      <a:latin typeface="Cambria Math" panose="02040503050406030204" pitchFamily="18" charset="0"/>
+                                    </a:rPr>
+                                    <m:t>𝑧</m:t>
+                                  </m:r>
+                                </m:sub>
+                              </m:sSub>
+                            </m:num>
+                            <m:den>
+                              <m:r>
+                                <a:rPr lang="en-US" sz="2800" b="0" i="1" smtClean="0">
+                                  <a:latin typeface="Cambria Math" panose="02040503050406030204" pitchFamily="18" charset="0"/>
+                                </a:rPr>
+                                <m:t>𝑟</m:t>
+                              </m:r>
+                            </m:den>
+                          </m:f>
+                        </m:e>
+                      </m:func>
+                    </m:oMath>
+                  </m:oMathPara>
+                </a14:m>
+                <a:endParaRPr lang="en-US" sz="2800" b="0" dirty="0"/>
+              </a:p>
+            </p:txBody>
+          </p:sp>
+        </mc:Choice>
+        <mc:Fallback xmlns="">
+          <p:sp>
+            <p:nvSpPr>
+              <p:cNvPr id="2" name="TextBox 1">
+                <a:extLst>
+                  <a:ext uri="{FF2B5EF4-FFF2-40B4-BE49-F238E27FC236}">
+                    <a16:creationId xmlns:a16="http://schemas.microsoft.com/office/drawing/2014/main" id="{5AD1CE97-ADDC-00B1-344A-51AD917AAC14}"/>
+                  </a:ext>
+                </a:extLst>
+              </p:cNvPr>
+              <p:cNvSpPr txBox="1">
+                <a:spLocks noRot="1" noChangeAspect="1" noMove="1" noResize="1" noEditPoints="1" noAdjustHandles="1" noChangeArrowheads="1" noChangeShapeType="1" noTextEdit="1"/>
+              </p:cNvSpPr>
+              <p:nvPr/>
+            </p:nvSpPr>
+            <p:spPr>
+              <a:xfrm>
+                <a:off x="855901" y="709863"/>
+                <a:ext cx="7494815" cy="1060483"/>
+              </a:xfrm>
+              <a:prstGeom prst="rect">
+                <a:avLst/>
+              </a:prstGeom>
+              <a:blipFill>
+                <a:blip r:embed="rId2"/>
+                <a:stretch>
+                  <a:fillRect/>
+                </a:stretch>
+              </a:blipFill>
+            </p:spPr>
+            <p:txBody>
+              <a:bodyPr/>
+              <a:lstStyle/>
+              <a:p>
+                <a:r>
+                  <a:rPr lang="en-US">
+                    <a:noFill/>
+                  </a:rPr>
+                  <a:t> </a:t>
+                </a:r>
+              </a:p>
+            </p:txBody>
+          </p:sp>
+        </mc:Fallback>
+      </mc:AlternateContent>
+      <mc:AlternateContent xmlns:mc="http://schemas.openxmlformats.org/markup-compatibility/2006" xmlns:a14="http://schemas.microsoft.com/office/drawing/2010/main">
+        <mc:Choice Requires="a14">
+          <p:sp>
+            <p:nvSpPr>
+              <p:cNvPr id="3" name="TextBox 2">
+                <a:extLst>
+                  <a:ext uri="{FF2B5EF4-FFF2-40B4-BE49-F238E27FC236}">
+                    <a16:creationId xmlns:a16="http://schemas.microsoft.com/office/drawing/2014/main" id="{E9AC7E2A-F8D0-70A0-FC7E-375C3DC4B50B}"/>
+                  </a:ext>
+                </a:extLst>
+              </p:cNvPr>
+              <p:cNvSpPr txBox="1"/>
+              <p:nvPr/>
+            </p:nvSpPr>
+            <p:spPr>
+              <a:xfrm>
+                <a:off x="855900" y="1770346"/>
+                <a:ext cx="7494815" cy="1422954"/>
+              </a:xfrm>
+              <a:prstGeom prst="rect">
+                <a:avLst/>
+              </a:prstGeom>
+              <a:noFill/>
+            </p:spPr>
+            <p:txBody>
+              <a:bodyPr wrap="square" rtlCol="0">
+                <a:spAutoFit/>
+              </a:bodyPr>
+              <a:lstStyle/>
+              <a:p>
+                <a:pPr/>
+                <a14:m>
+                  <m:oMathPara xmlns:m="http://schemas.openxmlformats.org/officeDocument/2006/math">
+                    <m:oMathParaPr>
+                      <m:jc m:val="left"/>
+                    </m:oMathParaPr>
+                    <m:oMath xmlns:m="http://schemas.openxmlformats.org/officeDocument/2006/math">
+                      <m:acc>
+                        <m:accPr>
+                          <m:chr m:val="̂"/>
+                          <m:ctrlPr>
+                            <a:rPr lang="en-US" sz="2800" b="0" i="1" smtClean="0">
+                              <a:latin typeface="Cambria Math" panose="02040503050406030204" pitchFamily="18" charset="0"/>
+                            </a:rPr>
+                          </m:ctrlPr>
+                        </m:accPr>
+                        <m:e>
+                          <m:r>
+                            <a:rPr lang="en-US" sz="2800" b="0" i="1" smtClean="0">
+                              <a:latin typeface="Cambria Math" panose="02040503050406030204" pitchFamily="18" charset="0"/>
+                            </a:rPr>
+                            <m:t>𝑟</m:t>
+                          </m:r>
+                        </m:e>
+                      </m:acc>
+                      <m:r>
+                        <a:rPr lang="en-US" sz="2800" b="0" i="1" smtClean="0">
+                          <a:latin typeface="Cambria Math" panose="02040503050406030204" pitchFamily="18" charset="0"/>
+                        </a:rPr>
+                        <m:t>=</m:t>
+                      </m:r>
+                      <m:f>
+                        <m:fPr>
+                          <m:ctrlPr>
+                            <a:rPr lang="en-US" sz="2800" b="0" i="1" smtClean="0">
+                              <a:latin typeface="Cambria Math" panose="02040503050406030204" pitchFamily="18" charset="0"/>
+                            </a:rPr>
+                          </m:ctrlPr>
+                        </m:fPr>
+                        <m:num>
+                          <m:acc>
+                            <m:accPr>
+                              <m:chr m:val="⃗"/>
+                              <m:ctrlPr>
+                                <a:rPr lang="en-US" sz="2800" b="0" i="1" smtClean="0">
+                                  <a:latin typeface="Cambria Math" panose="02040503050406030204" pitchFamily="18" charset="0"/>
+                                </a:rPr>
+                              </m:ctrlPr>
+                            </m:accPr>
+                            <m:e>
+                              <m:r>
+                                <a:rPr lang="en-US" sz="2800" b="0" i="1" smtClean="0">
+                                  <a:latin typeface="Cambria Math" panose="02040503050406030204" pitchFamily="18" charset="0"/>
+                                </a:rPr>
+                                <m:t>𝑟</m:t>
+                              </m:r>
+                            </m:e>
+                          </m:acc>
+                        </m:num>
+                        <m:den>
+                          <m:r>
+                            <a:rPr lang="en-US" sz="2800" b="0" i="1" smtClean="0">
+                              <a:latin typeface="Cambria Math" panose="02040503050406030204" pitchFamily="18" charset="0"/>
+                            </a:rPr>
+                            <m:t>𝑟</m:t>
+                          </m:r>
+                        </m:den>
+                      </m:f>
+                      <m:r>
+                        <a:rPr lang="en-US" sz="2800" b="0" i="1" smtClean="0">
+                          <a:latin typeface="Cambria Math" panose="02040503050406030204" pitchFamily="18" charset="0"/>
+                        </a:rPr>
+                        <m:t>, </m:t>
+                      </m:r>
+                      <m:acc>
+                        <m:accPr>
+                          <m:chr m:val="̂"/>
+                          <m:ctrlPr>
+                            <a:rPr lang="en-US" sz="2800" b="0" i="1" smtClean="0">
+                              <a:latin typeface="Cambria Math" panose="02040503050406030204" pitchFamily="18" charset="0"/>
+                            </a:rPr>
+                          </m:ctrlPr>
+                        </m:accPr>
+                        <m:e>
+                          <m:r>
+                            <a:rPr lang="en-US" sz="2800" b="0" i="1" smtClean="0">
+                              <a:latin typeface="Cambria Math" panose="02040503050406030204" pitchFamily="18" charset="0"/>
+                            </a:rPr>
+                            <m:t>𝜃</m:t>
+                          </m:r>
+                        </m:e>
+                      </m:acc>
+                      <m:r>
+                        <a:rPr lang="en-US" sz="2800" b="0" i="1" smtClean="0">
+                          <a:latin typeface="Cambria Math" panose="02040503050406030204" pitchFamily="18" charset="0"/>
+                        </a:rPr>
+                        <m:t>=−</m:t>
+                      </m:r>
+                      <m:r>
+                        <m:rPr>
+                          <m:sty m:val="p"/>
+                        </m:rPr>
+                        <a:rPr lang="en-US" sz="2800" b="0" i="1" smtClean="0">
+                          <a:latin typeface="Cambria Math" panose="02040503050406030204" pitchFamily="18" charset="0"/>
+                        </a:rPr>
+                        <m:t>sin</m:t>
+                      </m:r>
+                      <m:r>
+                        <a:rPr lang="en-US" sz="2800" b="0" i="1" smtClean="0">
+                          <a:latin typeface="Cambria Math" panose="02040503050406030204" pitchFamily="18" charset="0"/>
+                        </a:rPr>
+                        <m:t>𝜃</m:t>
+                      </m:r>
+                      <m:acc>
+                        <m:accPr>
+                          <m:chr m:val="̂"/>
+                          <m:ctrlPr>
+                            <a:rPr lang="en-US" sz="2800" b="0" i="1" smtClean="0">
+                              <a:latin typeface="Cambria Math" panose="02040503050406030204" pitchFamily="18" charset="0"/>
+                            </a:rPr>
+                          </m:ctrlPr>
+                        </m:accPr>
+                        <m:e>
+                          <m:r>
+                            <a:rPr lang="en-US" sz="2800" b="0" i="1" smtClean="0">
+                              <a:latin typeface="Cambria Math" panose="02040503050406030204" pitchFamily="18" charset="0"/>
+                            </a:rPr>
+                            <m:t>𝑥</m:t>
+                          </m:r>
+                        </m:e>
+                      </m:acc>
+                      <m:r>
+                        <a:rPr lang="en-US" sz="2800" b="0" i="1" smtClean="0">
+                          <a:latin typeface="Cambria Math" panose="02040503050406030204" pitchFamily="18" charset="0"/>
+                        </a:rPr>
+                        <m:t>+</m:t>
+                      </m:r>
+                      <m:r>
+                        <m:rPr>
+                          <m:sty m:val="p"/>
+                        </m:rPr>
+                        <a:rPr lang="en-US" sz="2800" b="0" i="1" smtClean="0">
+                          <a:latin typeface="Cambria Math" panose="02040503050406030204" pitchFamily="18" charset="0"/>
+                        </a:rPr>
+                        <m:t>cos</m:t>
+                      </m:r>
+                      <m:r>
+                        <a:rPr lang="en-US" sz="2800" b="0" i="1" smtClean="0">
+                          <a:latin typeface="Cambria Math" panose="02040503050406030204" pitchFamily="18" charset="0"/>
+                        </a:rPr>
+                        <m:t>𝜃</m:t>
+                      </m:r>
+                      <m:acc>
+                        <m:accPr>
+                          <m:chr m:val="̂"/>
+                          <m:ctrlPr>
+                            <a:rPr lang="en-US" sz="2800" b="0" i="1" smtClean="0">
+                              <a:latin typeface="Cambria Math" panose="02040503050406030204" pitchFamily="18" charset="0"/>
+                            </a:rPr>
+                          </m:ctrlPr>
+                        </m:accPr>
+                        <m:e>
+                          <m:r>
+                            <a:rPr lang="en-US" sz="2800" b="0" i="1" smtClean="0">
+                              <a:latin typeface="Cambria Math" panose="02040503050406030204" pitchFamily="18" charset="0"/>
+                            </a:rPr>
+                            <m:t>𝑦</m:t>
+                          </m:r>
+                        </m:e>
+                      </m:acc>
+                      <m:r>
+                        <a:rPr lang="en-US" sz="2800" b="0" i="1" smtClean="0">
+                          <a:latin typeface="Cambria Math" panose="02040503050406030204" pitchFamily="18" charset="0"/>
+                        </a:rPr>
+                        <m:t>, </m:t>
+                      </m:r>
+                    </m:oMath>
+                  </m:oMathPara>
+                </a14:m>
+                <a:endParaRPr lang="en-US" sz="2800" b="0" i="1" dirty="0">
+                  <a:latin typeface="Cambria Math" panose="02040503050406030204" pitchFamily="18" charset="0"/>
+                </a:endParaRPr>
+              </a:p>
+              <a:p>
+                <a:pPr/>
+                <a14:m>
+                  <m:oMathPara xmlns:m="http://schemas.openxmlformats.org/officeDocument/2006/math">
+                    <m:oMathParaPr>
+                      <m:jc m:val="left"/>
+                    </m:oMathParaPr>
+                    <m:oMath xmlns:m="http://schemas.openxmlformats.org/officeDocument/2006/math">
+                      <m:acc>
+                        <m:accPr>
+                          <m:chr m:val="̂"/>
+                          <m:ctrlPr>
+                            <a:rPr lang="en-US" sz="2800" b="0" i="1" smtClean="0">
+                              <a:latin typeface="Cambria Math" panose="02040503050406030204" pitchFamily="18" charset="0"/>
+                            </a:rPr>
+                          </m:ctrlPr>
+                        </m:accPr>
+                        <m:e>
+                          <m:r>
+                            <a:rPr lang="en-US" sz="2800" b="0" i="1" smtClean="0">
+                              <a:latin typeface="Cambria Math" panose="02040503050406030204" pitchFamily="18" charset="0"/>
+                            </a:rPr>
+                            <m:t>𝜙</m:t>
+                          </m:r>
+                        </m:e>
+                      </m:acc>
+                      <m:r>
+                        <a:rPr lang="en-US" sz="2800" b="0" i="1" smtClean="0">
+                          <a:latin typeface="Cambria Math" panose="02040503050406030204" pitchFamily="18" charset="0"/>
+                        </a:rPr>
+                        <m:t>=</m:t>
+                      </m:r>
+                      <m:r>
+                        <m:rPr>
+                          <m:sty m:val="p"/>
+                        </m:rPr>
+                        <a:rPr lang="en-US" sz="2800" b="0" i="1" smtClean="0">
+                          <a:latin typeface="Cambria Math" panose="02040503050406030204" pitchFamily="18" charset="0"/>
+                        </a:rPr>
+                        <m:t>cos</m:t>
+                      </m:r>
+                      <m:r>
+                        <a:rPr lang="en-US" sz="2800" b="0" i="1" smtClean="0">
+                          <a:latin typeface="Cambria Math" panose="02040503050406030204" pitchFamily="18" charset="0"/>
+                        </a:rPr>
+                        <m:t> </m:t>
+                      </m:r>
+                      <m:r>
+                        <a:rPr lang="en-US" sz="2800" b="0" i="1" smtClean="0">
+                          <a:latin typeface="Cambria Math" panose="02040503050406030204" pitchFamily="18" charset="0"/>
+                        </a:rPr>
+                        <m:t>𝜙</m:t>
+                      </m:r>
+                      <m:d>
+                        <m:dPr>
+                          <m:ctrlPr>
+                            <a:rPr lang="en-US" sz="2800" b="0" i="1" smtClean="0">
+                              <a:latin typeface="Cambria Math" panose="02040503050406030204" pitchFamily="18" charset="0"/>
+                            </a:rPr>
+                          </m:ctrlPr>
+                        </m:dPr>
+                        <m:e>
+                          <m:r>
+                            <m:rPr>
+                              <m:sty m:val="p"/>
+                            </m:rPr>
+                            <a:rPr lang="en-US" sz="2800" b="0" i="1" smtClean="0">
+                              <a:latin typeface="Cambria Math" panose="02040503050406030204" pitchFamily="18" charset="0"/>
+                            </a:rPr>
+                            <m:t>cos</m:t>
+                          </m:r>
+                          <m:r>
+                            <a:rPr lang="en-US" sz="2800" b="0" i="1" smtClean="0">
+                              <a:latin typeface="Cambria Math" panose="02040503050406030204" pitchFamily="18" charset="0"/>
+                            </a:rPr>
+                            <m:t>𝜃</m:t>
+                          </m:r>
+                          <m:acc>
+                            <m:accPr>
+                              <m:chr m:val="̂"/>
+                              <m:ctrlPr>
+                                <a:rPr lang="en-US" sz="2800" b="0" i="1" smtClean="0">
+                                  <a:latin typeface="Cambria Math" panose="02040503050406030204" pitchFamily="18" charset="0"/>
+                                </a:rPr>
+                              </m:ctrlPr>
+                            </m:accPr>
+                            <m:e>
+                              <m:r>
+                                <a:rPr lang="en-US" sz="2800" b="0" i="1" smtClean="0">
+                                  <a:latin typeface="Cambria Math" panose="02040503050406030204" pitchFamily="18" charset="0"/>
+                                </a:rPr>
+                                <m:t>𝑥</m:t>
+                              </m:r>
+                            </m:e>
+                          </m:acc>
+                          <m:r>
+                            <m:rPr>
+                              <m:nor/>
+                            </m:rPr>
+                            <a:rPr lang="en-US" sz="2800" b="0" dirty="0"/>
+                            <m:t>+ </m:t>
+                          </m:r>
+                          <m:r>
+                            <m:rPr>
+                              <m:sty m:val="p"/>
+                            </m:rPr>
+                            <a:rPr lang="en-US" sz="2800" b="0" i="1" smtClean="0">
+                              <a:latin typeface="Cambria Math" panose="02040503050406030204" pitchFamily="18" charset="0"/>
+                            </a:rPr>
+                            <m:t>sin</m:t>
+                          </m:r>
+                          <m:r>
+                            <a:rPr lang="en-US" sz="2800" b="0" i="1" smtClean="0">
+                              <a:latin typeface="Cambria Math" panose="02040503050406030204" pitchFamily="18" charset="0"/>
+                            </a:rPr>
+                            <m:t>𝜃</m:t>
+                          </m:r>
+                          <m:acc>
+                            <m:accPr>
+                              <m:chr m:val="̂"/>
+                              <m:ctrlPr>
+                                <a:rPr lang="en-US" sz="2800" b="0" i="1" smtClean="0">
+                                  <a:latin typeface="Cambria Math" panose="02040503050406030204" pitchFamily="18" charset="0"/>
+                                </a:rPr>
+                              </m:ctrlPr>
+                            </m:accPr>
+                            <m:e>
+                              <m:r>
+                                <a:rPr lang="en-US" sz="2800" b="0" i="1" smtClean="0">
+                                  <a:latin typeface="Cambria Math" panose="02040503050406030204" pitchFamily="18" charset="0"/>
+                                </a:rPr>
+                                <m:t>𝑦</m:t>
+                              </m:r>
+                            </m:e>
+                          </m:acc>
+                        </m:e>
+                      </m:d>
+                      <m:r>
+                        <a:rPr lang="en-US" sz="2800" b="0" i="1" smtClean="0">
+                          <a:latin typeface="Cambria Math" panose="02040503050406030204" pitchFamily="18" charset="0"/>
+                        </a:rPr>
+                        <m:t>−</m:t>
+                      </m:r>
+                      <m:r>
+                        <m:rPr>
+                          <m:sty m:val="p"/>
+                        </m:rPr>
+                        <a:rPr lang="en-US" sz="2800" b="0" i="1" smtClean="0">
+                          <a:latin typeface="Cambria Math" panose="02040503050406030204" pitchFamily="18" charset="0"/>
+                        </a:rPr>
+                        <m:t>sin</m:t>
+                      </m:r>
+                      <m:r>
+                        <a:rPr lang="en-US" sz="2800" b="0" i="1" smtClean="0">
+                          <a:latin typeface="Cambria Math" panose="02040503050406030204" pitchFamily="18" charset="0"/>
+                        </a:rPr>
+                        <m:t> </m:t>
+                      </m:r>
+                      <m:r>
+                        <a:rPr lang="en-US" sz="2800" b="0" i="1" smtClean="0">
+                          <a:latin typeface="Cambria Math" panose="02040503050406030204" pitchFamily="18" charset="0"/>
+                        </a:rPr>
+                        <m:t>𝜙</m:t>
+                      </m:r>
+                      <m:r>
+                        <a:rPr lang="en-US" sz="2800" b="0" i="1" smtClean="0">
+                          <a:latin typeface="Cambria Math" panose="02040503050406030204" pitchFamily="18" charset="0"/>
+                        </a:rPr>
+                        <m:t> </m:t>
+                      </m:r>
+                      <m:acc>
+                        <m:accPr>
+                          <m:chr m:val="̂"/>
+                          <m:ctrlPr>
+                            <a:rPr lang="en-US" sz="2800" b="0" i="1" smtClean="0">
+                              <a:latin typeface="Cambria Math" panose="02040503050406030204" pitchFamily="18" charset="0"/>
+                            </a:rPr>
+                          </m:ctrlPr>
+                        </m:accPr>
+                        <m:e>
+                          <m:r>
+                            <a:rPr lang="en-US" sz="2800" b="0" i="1" smtClean="0">
+                              <a:latin typeface="Cambria Math" panose="02040503050406030204" pitchFamily="18" charset="0"/>
+                            </a:rPr>
+                            <m:t>𝑧</m:t>
+                          </m:r>
+                        </m:e>
+                      </m:acc>
+                    </m:oMath>
+                  </m:oMathPara>
+                </a14:m>
+                <a:endParaRPr lang="en-US" sz="2800" b="0" dirty="0"/>
+              </a:p>
+            </p:txBody>
+          </p:sp>
+        </mc:Choice>
+        <mc:Fallback xmlns="">
+          <p:sp>
+            <p:nvSpPr>
+              <p:cNvPr id="3" name="TextBox 2">
+                <a:extLst>
+                  <a:ext uri="{FF2B5EF4-FFF2-40B4-BE49-F238E27FC236}">
+                    <a16:creationId xmlns:a16="http://schemas.microsoft.com/office/drawing/2014/main" id="{E9AC7E2A-F8D0-70A0-FC7E-375C3DC4B50B}"/>
+                  </a:ext>
+                </a:extLst>
+              </p:cNvPr>
+              <p:cNvSpPr txBox="1">
+                <a:spLocks noRot="1" noChangeAspect="1" noMove="1" noResize="1" noEditPoints="1" noAdjustHandles="1" noChangeArrowheads="1" noChangeShapeType="1" noTextEdit="1"/>
+              </p:cNvSpPr>
+              <p:nvPr/>
+            </p:nvSpPr>
+            <p:spPr>
+              <a:xfrm>
+                <a:off x="855900" y="1770346"/>
+                <a:ext cx="7494815" cy="1422954"/>
+              </a:xfrm>
+              <a:prstGeom prst="rect">
+                <a:avLst/>
+              </a:prstGeom>
+              <a:blipFill>
+                <a:blip r:embed="rId3"/>
+                <a:stretch>
+                  <a:fillRect/>
+                </a:stretch>
+              </a:blipFill>
+            </p:spPr>
+            <p:txBody>
+              <a:bodyPr/>
+              <a:lstStyle/>
+              <a:p>
+                <a:r>
+                  <a:rPr lang="en-US">
+                    <a:noFill/>
+                  </a:rPr>
+                  <a:t> </a:t>
+                </a:r>
+              </a:p>
+            </p:txBody>
+          </p:sp>
+        </mc:Fallback>
+      </mc:AlternateContent>
+      <p:grpSp>
+        <p:nvGrpSpPr>
+          <p:cNvPr id="4" name="Group 3">
+            <a:extLst>
+              <a:ext uri="{FF2B5EF4-FFF2-40B4-BE49-F238E27FC236}">
+                <a16:creationId xmlns:a16="http://schemas.microsoft.com/office/drawing/2014/main" id="{474CE678-4D3E-F117-67EC-4AD72CA0BDD7}"/>
+              </a:ext>
+            </a:extLst>
+          </p:cNvPr>
+          <p:cNvGrpSpPr/>
+          <p:nvPr/>
+        </p:nvGrpSpPr>
+        <p:grpSpPr>
+          <a:xfrm>
+            <a:off x="7575079" y="844715"/>
+            <a:ext cx="1575344" cy="2040527"/>
+            <a:chOff x="9155225" y="1201103"/>
+            <a:chExt cx="1575344" cy="2040527"/>
+          </a:xfrm>
+        </p:grpSpPr>
+        <p:cxnSp>
+          <p:nvCxnSpPr>
+            <p:cNvPr id="5" name="Straight Arrow Connector 4">
+              <a:extLst>
+                <a:ext uri="{FF2B5EF4-FFF2-40B4-BE49-F238E27FC236}">
+                  <a16:creationId xmlns:a16="http://schemas.microsoft.com/office/drawing/2014/main" id="{6A224DAC-7903-8F6A-1943-9060D5ADC959}"/>
+                </a:ext>
+              </a:extLst>
+            </p:cNvPr>
+            <p:cNvCxnSpPr/>
+            <p:nvPr/>
+          </p:nvCxnSpPr>
+          <p:spPr>
+            <a:xfrm>
+              <a:off x="9221002" y="2709834"/>
+              <a:ext cx="1443790" cy="531796"/>
+            </a:xfrm>
+            <a:prstGeom prst="straightConnector1">
+              <a:avLst/>
+            </a:prstGeom>
+            <a:ln>
+              <a:tailEnd type="triangle"/>
+            </a:ln>
+          </p:spPr>
+          <p:style>
+            <a:lnRef idx="1">
+              <a:schemeClr val="accent1"/>
+            </a:lnRef>
+            <a:fillRef idx="0">
+              <a:schemeClr val="accent1"/>
+            </a:fillRef>
+            <a:effectRef idx="0">
+              <a:schemeClr val="accent1"/>
+            </a:effectRef>
+            <a:fontRef idx="minor">
+              <a:schemeClr val="tx1"/>
+            </a:fontRef>
+          </p:style>
+        </p:cxnSp>
+        <p:cxnSp>
+          <p:nvCxnSpPr>
+            <p:cNvPr id="6" name="Straight Arrow Connector 5">
+              <a:extLst>
+                <a:ext uri="{FF2B5EF4-FFF2-40B4-BE49-F238E27FC236}">
+                  <a16:creationId xmlns:a16="http://schemas.microsoft.com/office/drawing/2014/main" id="{EE80AED7-3E96-ADDD-BA90-2C0C24FB551B}"/>
+                </a:ext>
+              </a:extLst>
+            </p:cNvPr>
+            <p:cNvCxnSpPr>
+              <a:cxnSpLocks/>
+            </p:cNvCxnSpPr>
+            <p:nvPr/>
+          </p:nvCxnSpPr>
+          <p:spPr>
+            <a:xfrm flipV="1">
+              <a:off x="9221002" y="1757061"/>
+              <a:ext cx="1021882" cy="966057"/>
+            </a:xfrm>
+            <a:prstGeom prst="straightConnector1">
+              <a:avLst/>
+            </a:prstGeom>
+            <a:ln>
+              <a:tailEnd type="triangle"/>
+            </a:ln>
+          </p:spPr>
+          <p:style>
+            <a:lnRef idx="1">
+              <a:schemeClr val="accent1"/>
+            </a:lnRef>
+            <a:fillRef idx="0">
+              <a:schemeClr val="accent1"/>
+            </a:fillRef>
+            <a:effectRef idx="0">
+              <a:schemeClr val="accent1"/>
+            </a:effectRef>
+            <a:fontRef idx="minor">
+              <a:schemeClr val="tx1"/>
+            </a:fontRef>
+          </p:style>
+        </p:cxnSp>
+        <p:cxnSp>
+          <p:nvCxnSpPr>
+            <p:cNvPr id="7" name="Straight Arrow Connector 6">
+              <a:extLst>
+                <a:ext uri="{FF2B5EF4-FFF2-40B4-BE49-F238E27FC236}">
+                  <a16:creationId xmlns:a16="http://schemas.microsoft.com/office/drawing/2014/main" id="{771A9657-0995-7AF7-F7DB-FF3B83ED7635}"/>
+                </a:ext>
+              </a:extLst>
+            </p:cNvPr>
+            <p:cNvCxnSpPr>
+              <a:cxnSpLocks/>
+            </p:cNvCxnSpPr>
+            <p:nvPr/>
+          </p:nvCxnSpPr>
+          <p:spPr>
+            <a:xfrm flipV="1">
+              <a:off x="9221002" y="1201103"/>
+              <a:ext cx="0" cy="1508731"/>
+            </a:xfrm>
+            <a:prstGeom prst="straightConnector1">
+              <a:avLst/>
+            </a:prstGeom>
+            <a:ln>
+              <a:tailEnd type="triangle"/>
+            </a:ln>
+          </p:spPr>
+          <p:style>
+            <a:lnRef idx="1">
+              <a:schemeClr val="accent1"/>
+            </a:lnRef>
+            <a:fillRef idx="0">
+              <a:schemeClr val="accent1"/>
+            </a:fillRef>
+            <a:effectRef idx="0">
+              <a:schemeClr val="accent1"/>
+            </a:effectRef>
+            <a:fontRef idx="minor">
+              <a:schemeClr val="tx1"/>
+            </a:fontRef>
+          </p:style>
+        </p:cxnSp>
+        <p:cxnSp>
+          <p:nvCxnSpPr>
+            <p:cNvPr id="8" name="Straight Arrow Connector 7">
+              <a:extLst>
+                <a:ext uri="{FF2B5EF4-FFF2-40B4-BE49-F238E27FC236}">
+                  <a16:creationId xmlns:a16="http://schemas.microsoft.com/office/drawing/2014/main" id="{138060BF-5C0A-36E2-983A-46C81FD7256D}"/>
+                </a:ext>
+              </a:extLst>
+            </p:cNvPr>
+            <p:cNvCxnSpPr>
+              <a:cxnSpLocks/>
+            </p:cNvCxnSpPr>
+            <p:nvPr/>
+          </p:nvCxnSpPr>
+          <p:spPr>
+            <a:xfrm flipV="1">
+              <a:off x="9221002" y="1607419"/>
+              <a:ext cx="598371" cy="1115699"/>
+            </a:xfrm>
+            <a:prstGeom prst="straightConnector1">
+              <a:avLst/>
+            </a:prstGeom>
+            <a:ln>
+              <a:tailEnd type="triangle"/>
+            </a:ln>
+          </p:spPr>
+          <p:style>
+            <a:lnRef idx="1">
+              <a:schemeClr val="accent2"/>
+            </a:lnRef>
+            <a:fillRef idx="0">
+              <a:schemeClr val="accent2"/>
+            </a:fillRef>
+            <a:effectRef idx="0">
+              <a:schemeClr val="accent2"/>
+            </a:effectRef>
+            <a:fontRef idx="minor">
+              <a:schemeClr val="tx1"/>
+            </a:fontRef>
+          </p:style>
+        </p:cxnSp>
+        <p:cxnSp>
+          <p:nvCxnSpPr>
+            <p:cNvPr id="9" name="Straight Arrow Connector 8">
+              <a:extLst>
+                <a:ext uri="{FF2B5EF4-FFF2-40B4-BE49-F238E27FC236}">
+                  <a16:creationId xmlns:a16="http://schemas.microsoft.com/office/drawing/2014/main" id="{145CBAC4-B815-A563-8AD1-627BCC227585}"/>
+                </a:ext>
+              </a:extLst>
+            </p:cNvPr>
+            <p:cNvCxnSpPr>
+              <a:cxnSpLocks/>
+            </p:cNvCxnSpPr>
+            <p:nvPr/>
+          </p:nvCxnSpPr>
+          <p:spPr>
+            <a:xfrm flipV="1">
+              <a:off x="9221002" y="1607419"/>
+              <a:ext cx="598371" cy="77002"/>
+            </a:xfrm>
+            <a:prstGeom prst="straightConnector1">
+              <a:avLst/>
+            </a:prstGeom>
+            <a:ln>
+              <a:tailEnd type="triangle"/>
+            </a:ln>
+          </p:spPr>
+          <p:style>
+            <a:lnRef idx="1">
+              <a:schemeClr val="accent1"/>
+            </a:lnRef>
+            <a:fillRef idx="0">
+              <a:schemeClr val="accent1"/>
+            </a:fillRef>
+            <a:effectRef idx="0">
+              <a:schemeClr val="accent1"/>
+            </a:effectRef>
+            <a:fontRef idx="minor">
+              <a:schemeClr val="tx1"/>
+            </a:fontRef>
+          </p:style>
+        </p:cxnSp>
+        <mc:AlternateContent xmlns:mc="http://schemas.openxmlformats.org/markup-compatibility/2006" xmlns:a14="http://schemas.microsoft.com/office/drawing/2010/main">
+          <mc:Choice Requires="a14">
+            <p:sp>
+              <p:nvSpPr>
+                <p:cNvPr id="10" name="TextBox 9">
+                  <a:extLst>
+                    <a:ext uri="{FF2B5EF4-FFF2-40B4-BE49-F238E27FC236}">
+                      <a16:creationId xmlns:a16="http://schemas.microsoft.com/office/drawing/2014/main" id="{8FD8700A-1887-1D1B-D335-E1C53C06F9A4}"/>
+                    </a:ext>
+                  </a:extLst>
+                </p:cNvPr>
+                <p:cNvSpPr txBox="1"/>
+                <p:nvPr/>
+              </p:nvSpPr>
+              <p:spPr>
+                <a:xfrm flipH="1">
+                  <a:off x="9155225" y="1975790"/>
+                  <a:ext cx="442766" cy="378956"/>
+                </a:xfrm>
+                <a:prstGeom prst="rect">
+                  <a:avLst/>
+                </a:prstGeom>
+                <a:noFill/>
+              </p:spPr>
+              <p:txBody>
+                <a:bodyPr wrap="square" rtlCol="0">
+                  <a:spAutoFit/>
+                </a:bodyPr>
+                <a:lstStyle/>
+                <a:p>
+                  <a:pPr/>
+                  <a14:m>
+                    <m:oMathPara xmlns:m="http://schemas.openxmlformats.org/officeDocument/2006/math">
+                      <m:oMathParaPr>
+                        <m:jc m:val="centerGroup"/>
+                      </m:oMathParaPr>
+                      <m:oMath xmlns:m="http://schemas.openxmlformats.org/officeDocument/2006/math">
+                        <m:r>
+                          <a:rPr lang="en-US" b="0" i="1" smtClean="0">
+                            <a:latin typeface="Cambria Math" panose="02040503050406030204" pitchFamily="18" charset="0"/>
+                          </a:rPr>
+                          <m:t>𝜙</m:t>
+                        </m:r>
+                      </m:oMath>
+                    </m:oMathPara>
+                  </a14:m>
+                  <a:endParaRPr lang="en-US" dirty="0"/>
+                </a:p>
+              </p:txBody>
+            </p:sp>
+          </mc:Choice>
+          <mc:Fallback xmlns="">
+            <p:sp>
+              <p:nvSpPr>
+                <p:cNvPr id="10" name="TextBox 9">
+                  <a:extLst>
+                    <a:ext uri="{FF2B5EF4-FFF2-40B4-BE49-F238E27FC236}">
+                      <a16:creationId xmlns:a16="http://schemas.microsoft.com/office/drawing/2014/main" id="{8FD8700A-1887-1D1B-D335-E1C53C06F9A4}"/>
+                    </a:ext>
+                  </a:extLst>
+                </p:cNvPr>
+                <p:cNvSpPr txBox="1">
+                  <a:spLocks noRot="1" noChangeAspect="1" noMove="1" noResize="1" noEditPoints="1" noAdjustHandles="1" noChangeArrowheads="1" noChangeShapeType="1" noTextEdit="1"/>
+                </p:cNvSpPr>
+                <p:nvPr/>
+              </p:nvSpPr>
+              <p:spPr>
+                <a:xfrm flipH="1">
+                  <a:off x="9155225" y="1975790"/>
+                  <a:ext cx="442766" cy="378956"/>
+                </a:xfrm>
+                <a:prstGeom prst="rect">
+                  <a:avLst/>
+                </a:prstGeom>
+                <a:blipFill>
+                  <a:blip r:embed="rId4"/>
+                  <a:stretch>
+                    <a:fillRect b="-9677"/>
+                  </a:stretch>
+                </a:blipFill>
+              </p:spPr>
+              <p:txBody>
+                <a:bodyPr/>
+                <a:lstStyle/>
+                <a:p>
+                  <a:r>
+                    <a:rPr lang="en-US">
+                      <a:noFill/>
+                    </a:rPr>
+                    <a:t> </a:t>
+                  </a:r>
+                </a:p>
+              </p:txBody>
+            </p:sp>
+          </mc:Fallback>
+        </mc:AlternateContent>
+        <mc:AlternateContent xmlns:mc="http://schemas.openxmlformats.org/markup-compatibility/2006" xmlns:a14="http://schemas.microsoft.com/office/drawing/2010/main">
+          <mc:Choice Requires="a14">
+            <p:sp>
+              <p:nvSpPr>
+                <p:cNvPr id="11" name="TextBox 10">
+                  <a:extLst>
+                    <a:ext uri="{FF2B5EF4-FFF2-40B4-BE49-F238E27FC236}">
+                      <a16:creationId xmlns:a16="http://schemas.microsoft.com/office/drawing/2014/main" id="{0BA6EE28-443E-C85C-D253-1769971899B8}"/>
+                    </a:ext>
+                  </a:extLst>
+                </p:cNvPr>
+                <p:cNvSpPr txBox="1"/>
+                <p:nvPr/>
+              </p:nvSpPr>
+              <p:spPr>
+                <a:xfrm>
+                  <a:off x="9454418" y="1572395"/>
+                  <a:ext cx="405865" cy="369332"/>
+                </a:xfrm>
+                <a:prstGeom prst="rect">
+                  <a:avLst/>
+                </a:prstGeom>
+                <a:noFill/>
+              </p:spPr>
+              <p:txBody>
+                <a:bodyPr wrap="square" rtlCol="0">
+                  <a:spAutoFit/>
+                </a:bodyPr>
+                <a:lstStyle/>
+                <a:p>
+                  <a:pPr/>
+                  <a14:m>
+                    <m:oMathPara xmlns:m="http://schemas.openxmlformats.org/officeDocument/2006/math">
+                      <m:oMathParaPr>
+                        <m:jc m:val="centerGroup"/>
+                      </m:oMathParaPr>
+                      <m:oMath xmlns:m="http://schemas.openxmlformats.org/officeDocument/2006/math">
+                        <m:r>
+                          <a:rPr lang="en-US" b="0" i="1" smtClean="0">
+                            <a:latin typeface="Cambria Math" panose="02040503050406030204" pitchFamily="18" charset="0"/>
+                          </a:rPr>
+                          <m:t>𝜃</m:t>
+                        </m:r>
+                      </m:oMath>
+                    </m:oMathPara>
+                  </a14:m>
+                  <a:endParaRPr lang="en-US" dirty="0"/>
+                </a:p>
+              </p:txBody>
+            </p:sp>
+          </mc:Choice>
+          <mc:Fallback xmlns="">
+            <p:sp>
+              <p:nvSpPr>
+                <p:cNvPr id="11" name="TextBox 10">
+                  <a:extLst>
+                    <a:ext uri="{FF2B5EF4-FFF2-40B4-BE49-F238E27FC236}">
+                      <a16:creationId xmlns:a16="http://schemas.microsoft.com/office/drawing/2014/main" id="{0BA6EE28-443E-C85C-D253-1769971899B8}"/>
+                    </a:ext>
+                  </a:extLst>
+                </p:cNvPr>
+                <p:cNvSpPr txBox="1">
+                  <a:spLocks noRot="1" noChangeAspect="1" noMove="1" noResize="1" noEditPoints="1" noAdjustHandles="1" noChangeArrowheads="1" noChangeShapeType="1" noTextEdit="1"/>
+                </p:cNvSpPr>
+                <p:nvPr/>
+              </p:nvSpPr>
+              <p:spPr>
+                <a:xfrm>
+                  <a:off x="9454418" y="1572395"/>
+                  <a:ext cx="405865" cy="369332"/>
+                </a:xfrm>
+                <a:prstGeom prst="rect">
+                  <a:avLst/>
+                </a:prstGeom>
+                <a:blipFill>
+                  <a:blip r:embed="rId5"/>
+                  <a:stretch>
+                    <a:fillRect/>
+                  </a:stretch>
+                </a:blipFill>
+              </p:spPr>
+              <p:txBody>
+                <a:bodyPr/>
+                <a:lstStyle/>
+                <a:p>
+                  <a:r>
+                    <a:rPr lang="en-US">
+                      <a:noFill/>
+                    </a:rPr>
+                    <a:t> </a:t>
+                  </a:r>
+                </a:p>
+              </p:txBody>
+            </p:sp>
+          </mc:Fallback>
+        </mc:AlternateContent>
+        <p:cxnSp>
+          <p:nvCxnSpPr>
+            <p:cNvPr id="12" name="Straight Connector 11">
+              <a:extLst>
+                <a:ext uri="{FF2B5EF4-FFF2-40B4-BE49-F238E27FC236}">
+                  <a16:creationId xmlns:a16="http://schemas.microsoft.com/office/drawing/2014/main" id="{6C2F3F47-2CD0-37A7-3142-CF3E670C7A10}"/>
+                </a:ext>
+              </a:extLst>
+            </p:cNvPr>
+            <p:cNvCxnSpPr/>
+            <p:nvPr/>
+          </p:nvCxnSpPr>
+          <p:spPr>
+            <a:xfrm>
+              <a:off x="9221001" y="1718629"/>
+              <a:ext cx="1509568" cy="446639"/>
+            </a:xfrm>
+            <a:prstGeom prst="line">
+              <a:avLst/>
+            </a:prstGeom>
+          </p:spPr>
+          <p:style>
+            <a:lnRef idx="1">
+              <a:schemeClr val="accent1"/>
+            </a:lnRef>
+            <a:fillRef idx="0">
+              <a:schemeClr val="accent1"/>
+            </a:fillRef>
+            <a:effectRef idx="0">
+              <a:schemeClr val="accent1"/>
+            </a:effectRef>
+            <a:fontRef idx="minor">
+              <a:schemeClr val="tx1"/>
+            </a:fontRef>
+          </p:style>
+        </p:cxnSp>
+      </p:grpSp>
+      <p:grpSp>
+        <p:nvGrpSpPr>
+          <p:cNvPr id="13" name="Group 12">
+            <a:extLst>
+              <a:ext uri="{FF2B5EF4-FFF2-40B4-BE49-F238E27FC236}">
+                <a16:creationId xmlns:a16="http://schemas.microsoft.com/office/drawing/2014/main" id="{6BF7524A-F666-DD9F-765E-1A356B9C38CB}"/>
+              </a:ext>
+            </a:extLst>
+          </p:cNvPr>
+          <p:cNvGrpSpPr/>
+          <p:nvPr/>
+        </p:nvGrpSpPr>
+        <p:grpSpPr>
+          <a:xfrm>
+            <a:off x="9847455" y="748923"/>
+            <a:ext cx="2126374" cy="2462784"/>
+            <a:chOff x="1318661" y="3850105"/>
+            <a:chExt cx="2598821" cy="2633751"/>
+          </a:xfrm>
+        </p:grpSpPr>
+        <p:cxnSp>
+          <p:nvCxnSpPr>
+            <p:cNvPr id="14" name="Straight Arrow Connector 13">
+              <a:extLst>
+                <a:ext uri="{FF2B5EF4-FFF2-40B4-BE49-F238E27FC236}">
+                  <a16:creationId xmlns:a16="http://schemas.microsoft.com/office/drawing/2014/main" id="{A06E11EF-AC66-B204-289C-A533C97E7DC3}"/>
+                </a:ext>
+              </a:extLst>
+            </p:cNvPr>
+            <p:cNvCxnSpPr/>
+            <p:nvPr/>
+          </p:nvCxnSpPr>
+          <p:spPr>
+            <a:xfrm flipV="1">
+              <a:off x="1318661" y="3850105"/>
+              <a:ext cx="0" cy="2098308"/>
+            </a:xfrm>
+            <a:prstGeom prst="straightConnector1">
+              <a:avLst/>
+            </a:prstGeom>
+            <a:ln>
+              <a:tailEnd type="triangle"/>
+            </a:ln>
+          </p:spPr>
+          <p:style>
+            <a:lnRef idx="1">
+              <a:schemeClr val="accent1"/>
+            </a:lnRef>
+            <a:fillRef idx="0">
+              <a:schemeClr val="accent1"/>
+            </a:fillRef>
+            <a:effectRef idx="0">
+              <a:schemeClr val="accent1"/>
+            </a:effectRef>
+            <a:fontRef idx="minor">
+              <a:schemeClr val="tx1"/>
+            </a:fontRef>
+          </p:style>
+        </p:cxnSp>
+        <p:cxnSp>
+          <p:nvCxnSpPr>
+            <p:cNvPr id="15" name="Straight Arrow Connector 14">
+              <a:extLst>
+                <a:ext uri="{FF2B5EF4-FFF2-40B4-BE49-F238E27FC236}">
+                  <a16:creationId xmlns:a16="http://schemas.microsoft.com/office/drawing/2014/main" id="{589C8773-AF40-E8BF-9CBC-58F7817D0D5C}"/>
+                </a:ext>
+              </a:extLst>
+            </p:cNvPr>
+            <p:cNvCxnSpPr>
+              <a:cxnSpLocks/>
+            </p:cNvCxnSpPr>
+            <p:nvPr/>
+          </p:nvCxnSpPr>
+          <p:spPr>
+            <a:xfrm>
+              <a:off x="1318661" y="5948413"/>
+              <a:ext cx="2396691" cy="0"/>
+            </a:xfrm>
+            <a:prstGeom prst="straightConnector1">
+              <a:avLst/>
+            </a:prstGeom>
+            <a:ln>
+              <a:tailEnd type="triangle"/>
+            </a:ln>
+          </p:spPr>
+          <p:style>
+            <a:lnRef idx="1">
+              <a:schemeClr val="accent1"/>
+            </a:lnRef>
+            <a:fillRef idx="0">
+              <a:schemeClr val="accent1"/>
+            </a:fillRef>
+            <a:effectRef idx="0">
+              <a:schemeClr val="accent1"/>
+            </a:effectRef>
+            <a:fontRef idx="minor">
+              <a:schemeClr val="tx1"/>
+            </a:fontRef>
+          </p:style>
+        </p:cxnSp>
+        <p:cxnSp>
+          <p:nvCxnSpPr>
+            <p:cNvPr id="16" name="Straight Arrow Connector 15">
+              <a:extLst>
+                <a:ext uri="{FF2B5EF4-FFF2-40B4-BE49-F238E27FC236}">
+                  <a16:creationId xmlns:a16="http://schemas.microsoft.com/office/drawing/2014/main" id="{BE739CCF-DB8F-DD2F-9420-6A73209E84D6}"/>
+                </a:ext>
+              </a:extLst>
+            </p:cNvPr>
+            <p:cNvCxnSpPr>
+              <a:cxnSpLocks/>
+            </p:cNvCxnSpPr>
+            <p:nvPr/>
+          </p:nvCxnSpPr>
+          <p:spPr>
+            <a:xfrm flipV="1">
+              <a:off x="1330694" y="4899259"/>
+              <a:ext cx="676174" cy="1049154"/>
+            </a:xfrm>
+            <a:prstGeom prst="straightConnector1">
+              <a:avLst/>
+            </a:prstGeom>
+            <a:ln>
+              <a:tailEnd type="triangle"/>
+            </a:ln>
+          </p:spPr>
+          <p:style>
+            <a:lnRef idx="1">
+              <a:schemeClr val="accent1"/>
+            </a:lnRef>
+            <a:fillRef idx="0">
+              <a:schemeClr val="accent1"/>
+            </a:fillRef>
+            <a:effectRef idx="0">
+              <a:schemeClr val="accent1"/>
+            </a:effectRef>
+            <a:fontRef idx="minor">
+              <a:schemeClr val="tx1"/>
+            </a:fontRef>
+          </p:style>
+        </p:cxnSp>
+        <p:cxnSp>
+          <p:nvCxnSpPr>
+            <p:cNvPr id="17" name="Straight Arrow Connector 16">
+              <a:extLst>
+                <a:ext uri="{FF2B5EF4-FFF2-40B4-BE49-F238E27FC236}">
+                  <a16:creationId xmlns:a16="http://schemas.microsoft.com/office/drawing/2014/main" id="{0B54A651-776C-C80B-14F6-4505FD3228F5}"/>
+                </a:ext>
+              </a:extLst>
+            </p:cNvPr>
+            <p:cNvCxnSpPr>
+              <a:cxnSpLocks/>
+            </p:cNvCxnSpPr>
+            <p:nvPr/>
+          </p:nvCxnSpPr>
+          <p:spPr>
+            <a:xfrm>
+              <a:off x="1323473" y="5948413"/>
+              <a:ext cx="947651" cy="535443"/>
+            </a:xfrm>
+            <a:prstGeom prst="straightConnector1">
+              <a:avLst/>
+            </a:prstGeom>
+            <a:ln>
+              <a:tailEnd type="triangle"/>
+            </a:ln>
+          </p:spPr>
+          <p:style>
+            <a:lnRef idx="1">
+              <a:schemeClr val="accent1"/>
+            </a:lnRef>
+            <a:fillRef idx="0">
+              <a:schemeClr val="accent1"/>
+            </a:fillRef>
+            <a:effectRef idx="0">
+              <a:schemeClr val="accent1"/>
+            </a:effectRef>
+            <a:fontRef idx="minor">
+              <a:schemeClr val="tx1"/>
+            </a:fontRef>
+          </p:style>
+        </p:cxnSp>
+        <mc:AlternateContent xmlns:mc="http://schemas.openxmlformats.org/markup-compatibility/2006" xmlns:a14="http://schemas.microsoft.com/office/drawing/2010/main">
+          <mc:Choice Requires="a14">
+            <p:sp>
+              <p:nvSpPr>
+                <p:cNvPr id="18" name="TextBox 17">
+                  <a:extLst>
+                    <a:ext uri="{FF2B5EF4-FFF2-40B4-BE49-F238E27FC236}">
+                      <a16:creationId xmlns:a16="http://schemas.microsoft.com/office/drawing/2014/main" id="{CF3333BF-4DA8-513B-E2CB-75395D6757B9}"/>
+                    </a:ext>
+                  </a:extLst>
+                </p:cNvPr>
+                <p:cNvSpPr txBox="1"/>
+                <p:nvPr/>
+              </p:nvSpPr>
+              <p:spPr>
+                <a:xfrm>
+                  <a:off x="1330694" y="5043638"/>
+                  <a:ext cx="267097" cy="369332"/>
+                </a:xfrm>
+                <a:prstGeom prst="rect">
+                  <a:avLst/>
+                </a:prstGeom>
+                <a:noFill/>
+              </p:spPr>
+              <p:txBody>
+                <a:bodyPr wrap="square" rtlCol="0">
+                  <a:spAutoFit/>
+                </a:bodyPr>
+                <a:lstStyle/>
+                <a:p>
+                  <a:pPr/>
+                  <a14:m>
+                    <m:oMathPara xmlns:m="http://schemas.openxmlformats.org/officeDocument/2006/math">
+                      <m:oMathParaPr>
+                        <m:jc m:val="centerGroup"/>
+                      </m:oMathParaPr>
+                      <m:oMath xmlns:m="http://schemas.openxmlformats.org/officeDocument/2006/math">
+                        <m:r>
+                          <a:rPr lang="en-US" b="0" i="1" smtClean="0">
+                            <a:latin typeface="Cambria Math" panose="02040503050406030204" pitchFamily="18" charset="0"/>
+                          </a:rPr>
+                          <m:t>𝜙</m:t>
+                        </m:r>
+                      </m:oMath>
+                    </m:oMathPara>
+                  </a14:m>
+                  <a:endParaRPr lang="en-US" dirty="0"/>
+                </a:p>
+              </p:txBody>
+            </p:sp>
+          </mc:Choice>
+          <mc:Fallback xmlns="">
+            <p:sp>
+              <p:nvSpPr>
+                <p:cNvPr id="18" name="TextBox 17">
+                  <a:extLst>
+                    <a:ext uri="{FF2B5EF4-FFF2-40B4-BE49-F238E27FC236}">
+                      <a16:creationId xmlns:a16="http://schemas.microsoft.com/office/drawing/2014/main" id="{CF3333BF-4DA8-513B-E2CB-75395D6757B9}"/>
+                    </a:ext>
+                  </a:extLst>
+                </p:cNvPr>
+                <p:cNvSpPr txBox="1">
+                  <a:spLocks noRot="1" noChangeAspect="1" noMove="1" noResize="1" noEditPoints="1" noAdjustHandles="1" noChangeArrowheads="1" noChangeShapeType="1" noTextEdit="1"/>
+                </p:cNvSpPr>
+                <p:nvPr/>
+              </p:nvSpPr>
+              <p:spPr>
+                <a:xfrm>
+                  <a:off x="1330694" y="5043638"/>
+                  <a:ext cx="267097" cy="369332"/>
+                </a:xfrm>
+                <a:prstGeom prst="rect">
+                  <a:avLst/>
+                </a:prstGeom>
+                <a:blipFill>
+                  <a:blip r:embed="rId6"/>
+                  <a:stretch>
+                    <a:fillRect l="-5556" r="-63889" b="-19298"/>
+                  </a:stretch>
+                </a:blipFill>
+              </p:spPr>
+              <p:txBody>
+                <a:bodyPr/>
+                <a:lstStyle/>
+                <a:p>
+                  <a:r>
+                    <a:rPr lang="en-US">
+                      <a:noFill/>
+                    </a:rPr>
+                    <a:t> </a:t>
+                  </a:r>
+                </a:p>
+              </p:txBody>
+            </p:sp>
+          </mc:Fallback>
+        </mc:AlternateContent>
+        <mc:AlternateContent xmlns:mc="http://schemas.openxmlformats.org/markup-compatibility/2006" xmlns:a14="http://schemas.microsoft.com/office/drawing/2010/main">
+          <mc:Choice Requires="a14">
+            <p:sp>
+              <p:nvSpPr>
+                <p:cNvPr id="19" name="TextBox 18">
+                  <a:extLst>
+                    <a:ext uri="{FF2B5EF4-FFF2-40B4-BE49-F238E27FC236}">
+                      <a16:creationId xmlns:a16="http://schemas.microsoft.com/office/drawing/2014/main" id="{3D23C814-E423-2CD8-B9D0-A97BF856C003}"/>
+                    </a:ext>
+                  </a:extLst>
+                </p:cNvPr>
+                <p:cNvSpPr txBox="1"/>
+                <p:nvPr/>
+              </p:nvSpPr>
+              <p:spPr>
+                <a:xfrm>
+                  <a:off x="3407343" y="5601904"/>
+                  <a:ext cx="510139" cy="369332"/>
+                </a:xfrm>
+                <a:prstGeom prst="rect">
+                  <a:avLst/>
+                </a:prstGeom>
+                <a:noFill/>
+              </p:spPr>
+              <p:txBody>
+                <a:bodyPr wrap="square" rtlCol="0">
+                  <a:spAutoFit/>
+                </a:bodyPr>
+                <a:lstStyle/>
+                <a:p>
+                  <a:pPr/>
+                  <a14:m>
+                    <m:oMathPara xmlns:m="http://schemas.openxmlformats.org/officeDocument/2006/math">
+                      <m:oMathParaPr>
+                        <m:jc m:val="centerGroup"/>
+                      </m:oMathParaPr>
+                      <m:oMath xmlns:m="http://schemas.openxmlformats.org/officeDocument/2006/math">
+                        <m:acc>
+                          <m:accPr>
+                            <m:chr m:val="⃗"/>
+                            <m:ctrlPr>
+                              <a:rPr lang="en-US" b="0" i="1" smtClean="0">
+                                <a:latin typeface="Cambria Math" panose="02040503050406030204" pitchFamily="18" charset="0"/>
+                              </a:rPr>
+                            </m:ctrlPr>
+                          </m:accPr>
+                          <m:e>
+                            <m:r>
+                              <a:rPr lang="en-US" b="0" i="1" smtClean="0">
+                                <a:latin typeface="Cambria Math" panose="02040503050406030204" pitchFamily="18" charset="0"/>
+                              </a:rPr>
+                              <m:t>𝜌</m:t>
+                            </m:r>
+                          </m:e>
+                        </m:acc>
+                      </m:oMath>
+                    </m:oMathPara>
+                  </a14:m>
+                  <a:endParaRPr lang="en-US" dirty="0"/>
+                </a:p>
+              </p:txBody>
+            </p:sp>
+          </mc:Choice>
+          <mc:Fallback xmlns="">
+            <p:sp>
+              <p:nvSpPr>
+                <p:cNvPr id="19" name="TextBox 18">
+                  <a:extLst>
+                    <a:ext uri="{FF2B5EF4-FFF2-40B4-BE49-F238E27FC236}">
+                      <a16:creationId xmlns:a16="http://schemas.microsoft.com/office/drawing/2014/main" id="{3D23C814-E423-2CD8-B9D0-A97BF856C003}"/>
+                    </a:ext>
+                  </a:extLst>
+                </p:cNvPr>
+                <p:cNvSpPr txBox="1">
+                  <a:spLocks noRot="1" noChangeAspect="1" noMove="1" noResize="1" noEditPoints="1" noAdjustHandles="1" noChangeArrowheads="1" noChangeShapeType="1" noTextEdit="1"/>
+                </p:cNvSpPr>
+                <p:nvPr/>
+              </p:nvSpPr>
+              <p:spPr>
+                <a:xfrm>
+                  <a:off x="3407343" y="5601904"/>
+                  <a:ext cx="510139" cy="369332"/>
+                </a:xfrm>
+                <a:prstGeom prst="rect">
+                  <a:avLst/>
+                </a:prstGeom>
+                <a:blipFill>
+                  <a:blip r:embed="rId7"/>
+                  <a:stretch>
+                    <a:fillRect t="-25000" r="-29412" b="-14286"/>
+                  </a:stretch>
+                </a:blipFill>
+              </p:spPr>
+              <p:txBody>
+                <a:bodyPr/>
+                <a:lstStyle/>
+                <a:p>
+                  <a:r>
+                    <a:rPr lang="en-US">
+                      <a:noFill/>
+                    </a:rPr>
+                    <a:t> </a:t>
+                  </a:r>
+                </a:p>
+              </p:txBody>
+            </p:sp>
+          </mc:Fallback>
+        </mc:AlternateContent>
+      </p:grpSp>
+    </p:spTree>
+    <p:extLst>
+      <p:ext uri="{BB962C8B-B14F-4D97-AF65-F5344CB8AC3E}">
+        <p14:creationId xmlns:p14="http://schemas.microsoft.com/office/powerpoint/2010/main" val="3794435592"/>
+      </p:ext>
+    </p:extLst>
+  </p:cSld>
+  <p:clrMapOvr>
+    <a:masterClrMapping/>
+  </p:clrMapOvr>
+</p:sld>
+</file>
+
+<file path=ppt/slides/slide19.xml><?xml version="1.0" encoding="utf-8"?>
+<p:sld xmlns:a="http://schemas.openxmlformats.org/drawingml/2006/main" xmlns:r="http://schemas.openxmlformats.org/officeDocument/2006/relationships" xmlns:p="http://schemas.openxmlformats.org/presentationml/2006/main">
+  <p:cSld>
+    <p:spTree>
+      <p:nvGrpSpPr>
+        <p:cNvPr id="1" name=""/>
+        <p:cNvGrpSpPr/>
+        <p:nvPr/>
+      </p:nvGrpSpPr>
+      <p:grpSpPr>
+        <a:xfrm>
+          <a:off x="0" y="0"/>
+          <a:ext cx="0" cy="0"/>
+          <a:chOff x="0" y="0"/>
+          <a:chExt cx="0" cy="0"/>
+        </a:xfrm>
+      </p:grpSpPr>
+      <p:pic>
+        <p:nvPicPr>
+          <p:cNvPr id="4" name="Picture 3">
+            <a:extLst>
+              <a:ext uri="{FF2B5EF4-FFF2-40B4-BE49-F238E27FC236}">
+                <a16:creationId xmlns:a16="http://schemas.microsoft.com/office/drawing/2014/main" id="{66483EAB-A0D6-B1EE-28EB-DD6A46A2C6B5}"/>
+              </a:ext>
+            </a:extLst>
+          </p:cNvPr>
+          <p:cNvPicPr>
+            <a:picLocks noChangeAspect="1"/>
+          </p:cNvPicPr>
+          <p:nvPr/>
+        </p:nvPicPr>
+        <p:blipFill rotWithShape="1">
+          <a:blip r:embed="rId2"/>
+          <a:srcRect b="48070"/>
+          <a:stretch/>
+        </p:blipFill>
+        <p:spPr>
+          <a:xfrm>
+            <a:off x="0" y="0"/>
+            <a:ext cx="12192000" cy="3561347"/>
+          </a:xfrm>
+          <a:prstGeom prst="rect">
+            <a:avLst/>
+          </a:prstGeom>
+        </p:spPr>
+      </p:pic>
+    </p:spTree>
+    <p:extLst>
+      <p:ext uri="{BB962C8B-B14F-4D97-AF65-F5344CB8AC3E}">
+        <p14:creationId xmlns:p14="http://schemas.microsoft.com/office/powerpoint/2010/main" val="3767409495"/>
+      </p:ext>
+    </p:extLst>
+  </p:cSld>
+  <p:clrMapOvr>
+    <a:masterClrMapping/>
+  </p:clrMapOvr>
+</p:sld>
+</file>
+
 <file path=ppt/slides/slide2.xml><?xml version="1.0" encoding="utf-8"?>
 <p:sld xmlns:a="http://schemas.openxmlformats.org/drawingml/2006/main" xmlns:r="http://schemas.openxmlformats.org/officeDocument/2006/relationships" xmlns:p="http://schemas.openxmlformats.org/presentationml/2006/main">
   <p:cSld>
@@ -20183,6 +21924,2127 @@
     <p:extLst>
       <p:ext uri="{BB962C8B-B14F-4D97-AF65-F5344CB8AC3E}">
         <p14:creationId xmlns:p14="http://schemas.microsoft.com/office/powerpoint/2010/main" val="949738995"/>
+      </p:ext>
+    </p:extLst>
+  </p:cSld>
+  <p:clrMapOvr>
+    <a:masterClrMapping/>
+  </p:clrMapOvr>
+</p:sld>
+</file>
+
+<file path=ppt/slides/slide20.xml><?xml version="1.0" encoding="utf-8"?>
+<p:sld xmlns:a="http://schemas.openxmlformats.org/drawingml/2006/main" xmlns:r="http://schemas.openxmlformats.org/officeDocument/2006/relationships" xmlns:p="http://schemas.openxmlformats.org/presentationml/2006/main">
+  <p:cSld>
+    <p:spTree>
+      <p:nvGrpSpPr>
+        <p:cNvPr id="1" name=""/>
+        <p:cNvGrpSpPr/>
+        <p:nvPr/>
+      </p:nvGrpSpPr>
+      <p:grpSpPr>
+        <a:xfrm>
+          <a:off x="0" y="0"/>
+          <a:ext cx="0" cy="0"/>
+          <a:chOff x="0" y="0"/>
+          <a:chExt cx="0" cy="0"/>
+        </a:xfrm>
+      </p:grpSpPr>
+      <p:grpSp>
+        <p:nvGrpSpPr>
+          <p:cNvPr id="13" name="Group 12">
+            <a:extLst>
+              <a:ext uri="{FF2B5EF4-FFF2-40B4-BE49-F238E27FC236}">
+                <a16:creationId xmlns:a16="http://schemas.microsoft.com/office/drawing/2014/main" id="{5D0FACB6-D722-D837-8A28-84F4DD919152}"/>
+              </a:ext>
+            </a:extLst>
+          </p:cNvPr>
+          <p:cNvGrpSpPr/>
+          <p:nvPr/>
+        </p:nvGrpSpPr>
+        <p:grpSpPr>
+          <a:xfrm>
+            <a:off x="1491914" y="1292663"/>
+            <a:ext cx="8941871" cy="4127056"/>
+            <a:chOff x="1491914" y="1292663"/>
+            <a:chExt cx="8941871" cy="4127056"/>
+          </a:xfrm>
+        </p:grpSpPr>
+        <mc:AlternateContent xmlns:mc="http://schemas.openxmlformats.org/markup-compatibility/2006" xmlns:a14="http://schemas.microsoft.com/office/drawing/2010/main">
+          <mc:Choice Requires="a14">
+            <p:sp>
+              <p:nvSpPr>
+                <p:cNvPr id="2" name="TextBox 1">
+                  <a:extLst>
+                    <a:ext uri="{FF2B5EF4-FFF2-40B4-BE49-F238E27FC236}">
+                      <a16:creationId xmlns:a16="http://schemas.microsoft.com/office/drawing/2014/main" id="{34A7CA5A-7A35-068D-7251-62B614A2AD7D}"/>
+                    </a:ext>
+                  </a:extLst>
+                </p:cNvPr>
+                <p:cNvSpPr txBox="1"/>
+                <p:nvPr/>
+              </p:nvSpPr>
+              <p:spPr>
+                <a:xfrm>
+                  <a:off x="1491914" y="1809550"/>
+                  <a:ext cx="6718435" cy="2585323"/>
+                </a:xfrm>
+                <a:prstGeom prst="rect">
+                  <a:avLst/>
+                </a:prstGeom>
+                <a:noFill/>
+              </p:spPr>
+              <p:txBody>
+                <a:bodyPr wrap="square" rtlCol="0">
+                  <a:spAutoFit/>
+                </a:bodyPr>
+                <a:lstStyle/>
+                <a:p>
+                  <a:r>
+                    <a:rPr lang="en-US" dirty="0"/>
+                    <a:t>Bottom disk: </a:t>
+                  </a:r>
+                  <a14:m>
+                    <m:oMath xmlns:m="http://schemas.openxmlformats.org/officeDocument/2006/math">
+                      <m:acc>
+                        <m:accPr>
+                          <m:chr m:val="⃗"/>
+                          <m:ctrlPr>
+                            <a:rPr lang="en-US" b="0" i="1" smtClean="0">
+                              <a:latin typeface="Cambria Math" panose="02040503050406030204" pitchFamily="18" charset="0"/>
+                            </a:rPr>
+                          </m:ctrlPr>
+                        </m:accPr>
+                        <m:e>
+                          <m:r>
+                            <m:rPr>
+                              <m:sty m:val="p"/>
+                            </m:rPr>
+                            <a:rPr lang="en-US" b="0" i="0" smtClean="0">
+                              <a:latin typeface="Cambria Math" panose="02040503050406030204" pitchFamily="18" charset="0"/>
+                            </a:rPr>
+                            <m:t>o</m:t>
+                          </m:r>
+                        </m:e>
+                      </m:acc>
+                      <m:r>
+                        <a:rPr lang="en-US" b="0" i="1" smtClean="0">
+                          <a:latin typeface="Cambria Math" panose="02040503050406030204" pitchFamily="18" charset="0"/>
+                        </a:rPr>
+                        <m:t>+</m:t>
+                      </m:r>
+                      <m:sSub>
+                        <m:sSubPr>
+                          <m:ctrlPr>
+                            <a:rPr lang="en-US" i="1">
+                              <a:latin typeface="Cambria Math" panose="02040503050406030204" pitchFamily="18" charset="0"/>
+                            </a:rPr>
+                          </m:ctrlPr>
+                        </m:sSubPr>
+                        <m:e>
+                          <m:r>
+                            <a:rPr lang="en-US" i="1">
+                              <a:latin typeface="Cambria Math" panose="02040503050406030204" pitchFamily="18" charset="0"/>
+                            </a:rPr>
+                            <m:t>𝑅</m:t>
+                          </m:r>
+                        </m:e>
+                        <m:sub>
+                          <m:r>
+                            <a:rPr lang="en-US">
+                              <a:latin typeface="Cambria Math" panose="02040503050406030204" pitchFamily="18" charset="0"/>
+                            </a:rPr>
+                            <m:t>0</m:t>
+                          </m:r>
+                        </m:sub>
+                      </m:sSub>
+                      <m:r>
+                        <m:rPr>
+                          <m:sty m:val="p"/>
+                        </m:rPr>
+                        <a:rPr lang="en-US" b="0" i="0" smtClean="0">
+                          <a:latin typeface="Cambria Math" panose="02040503050406030204" pitchFamily="18" charset="0"/>
+                        </a:rPr>
+                        <m:t>cos</m:t>
+                      </m:r>
+                      <m:d>
+                        <m:dPr>
+                          <m:ctrlPr>
+                            <a:rPr lang="en-US" b="0" i="1" smtClean="0">
+                              <a:latin typeface="Cambria Math" panose="02040503050406030204" pitchFamily="18" charset="0"/>
+                            </a:rPr>
+                          </m:ctrlPr>
+                        </m:dPr>
+                        <m:e>
+                          <m:r>
+                            <a:rPr lang="en-US" b="0" i="1" smtClean="0">
+                              <a:latin typeface="Cambria Math" panose="02040503050406030204" pitchFamily="18" charset="0"/>
+                            </a:rPr>
+                            <m:t>𝜃</m:t>
+                          </m:r>
+                        </m:e>
+                      </m:d>
+                      <m:sSup>
+                        <m:sSupPr>
+                          <m:ctrlPr>
+                            <a:rPr lang="en-US" b="0" i="1" dirty="0" smtClean="0">
+                              <a:latin typeface="Cambria Math" panose="02040503050406030204" pitchFamily="18" charset="0"/>
+                            </a:rPr>
+                          </m:ctrlPr>
+                        </m:sSupPr>
+                        <m:e>
+                          <m:acc>
+                            <m:accPr>
+                              <m:chr m:val="̂"/>
+                              <m:ctrlPr>
+                                <a:rPr lang="en-US" b="0" i="1" smtClean="0">
+                                  <a:latin typeface="Cambria Math" panose="02040503050406030204" pitchFamily="18" charset="0"/>
+                                </a:rPr>
+                              </m:ctrlPr>
+                            </m:accPr>
+                            <m:e>
+                              <m:r>
+                                <a:rPr lang="en-US" b="0" i="1" smtClean="0">
+                                  <a:latin typeface="Cambria Math" panose="02040503050406030204" pitchFamily="18" charset="0"/>
+                                </a:rPr>
+                                <m:t>𝑥</m:t>
+                              </m:r>
+                            </m:e>
+                          </m:acc>
+                        </m:e>
+                        <m:sup>
+                          <m:r>
+                            <a:rPr lang="en-US" b="0" i="1" dirty="0" smtClean="0">
+                              <a:latin typeface="Cambria Math" panose="02040503050406030204" pitchFamily="18" charset="0"/>
+                            </a:rPr>
+                            <m:t>′</m:t>
+                          </m:r>
+                        </m:sup>
+                      </m:sSup>
+                      <m:r>
+                        <a:rPr lang="en-US" b="0" i="1" dirty="0" smtClean="0">
+                          <a:latin typeface="Cambria Math" panose="02040503050406030204" pitchFamily="18" charset="0"/>
+                        </a:rPr>
+                        <m:t>+</m:t>
+                      </m:r>
+                      <m:sSub>
+                        <m:sSubPr>
+                          <m:ctrlPr>
+                            <a:rPr lang="en-US" i="1">
+                              <a:latin typeface="Cambria Math" panose="02040503050406030204" pitchFamily="18" charset="0"/>
+                            </a:rPr>
+                          </m:ctrlPr>
+                        </m:sSubPr>
+                        <m:e>
+                          <m:r>
+                            <a:rPr lang="en-US" i="1">
+                              <a:latin typeface="Cambria Math" panose="02040503050406030204" pitchFamily="18" charset="0"/>
+                            </a:rPr>
+                            <m:t>𝑅</m:t>
+                          </m:r>
+                        </m:e>
+                        <m:sub>
+                          <m:r>
+                            <a:rPr lang="en-US">
+                              <a:latin typeface="Cambria Math" panose="02040503050406030204" pitchFamily="18" charset="0"/>
+                            </a:rPr>
+                            <m:t>0</m:t>
+                          </m:r>
+                        </m:sub>
+                      </m:sSub>
+                      <m:r>
+                        <m:rPr>
+                          <m:sty m:val="p"/>
+                        </m:rPr>
+                        <a:rPr lang="en-US" b="0" i="1" dirty="0" smtClean="0">
+                          <a:latin typeface="Cambria Math" panose="02040503050406030204" pitchFamily="18" charset="0"/>
+                        </a:rPr>
+                        <m:t>sin</m:t>
+                      </m:r>
+                      <m:d>
+                        <m:dPr>
+                          <m:ctrlPr>
+                            <a:rPr lang="en-US" b="0" i="1" dirty="0" smtClean="0">
+                              <a:latin typeface="Cambria Math" panose="02040503050406030204" pitchFamily="18" charset="0"/>
+                            </a:rPr>
+                          </m:ctrlPr>
+                        </m:dPr>
+                        <m:e>
+                          <m:r>
+                            <a:rPr lang="en-US" b="0" i="1" dirty="0" smtClean="0">
+                              <a:latin typeface="Cambria Math" panose="02040503050406030204" pitchFamily="18" charset="0"/>
+                            </a:rPr>
+                            <m:t>𝜃</m:t>
+                          </m:r>
+                        </m:e>
+                      </m:d>
+                      <m:sSup>
+                        <m:sSupPr>
+                          <m:ctrlPr>
+                            <a:rPr lang="en-US" b="0" i="1" dirty="0" smtClean="0">
+                              <a:latin typeface="Cambria Math" panose="02040503050406030204" pitchFamily="18" charset="0"/>
+                            </a:rPr>
+                          </m:ctrlPr>
+                        </m:sSupPr>
+                        <m:e>
+                          <m:acc>
+                            <m:accPr>
+                              <m:chr m:val="̂"/>
+                              <m:ctrlPr>
+                                <a:rPr lang="en-US" b="0" i="1" dirty="0" smtClean="0">
+                                  <a:latin typeface="Cambria Math" panose="02040503050406030204" pitchFamily="18" charset="0"/>
+                                </a:rPr>
+                              </m:ctrlPr>
+                            </m:accPr>
+                            <m:e>
+                              <m:r>
+                                <a:rPr lang="en-US" b="0" i="1" dirty="0" smtClean="0">
+                                  <a:latin typeface="Cambria Math" panose="02040503050406030204" pitchFamily="18" charset="0"/>
+                                </a:rPr>
+                                <m:t>𝑦</m:t>
+                              </m:r>
+                            </m:e>
+                          </m:acc>
+                        </m:e>
+                        <m:sup>
+                          <m:r>
+                            <a:rPr lang="en-US" b="0" i="1" dirty="0" smtClean="0">
+                              <a:latin typeface="Cambria Math" panose="02040503050406030204" pitchFamily="18" charset="0"/>
+                            </a:rPr>
+                            <m:t>′</m:t>
+                          </m:r>
+                        </m:sup>
+                      </m:sSup>
+                    </m:oMath>
+                  </a14:m>
+                  <a:endParaRPr lang="en-US" b="0" dirty="0"/>
+                </a:p>
+                <a:p>
+                  <a:endParaRPr lang="en-US" b="0" dirty="0"/>
+                </a:p>
+                <a:p>
+                  <a:r>
+                    <a:rPr lang="en-US" dirty="0"/>
+                    <a:t>Top disk: </a:t>
+                  </a:r>
+                  <a14:m>
+                    <m:oMath xmlns:m="http://schemas.openxmlformats.org/officeDocument/2006/math">
+                      <m:acc>
+                        <m:accPr>
+                          <m:chr m:val="⃗"/>
+                          <m:ctrlPr>
+                            <a:rPr lang="en-US" b="0" i="1" smtClean="0">
+                              <a:latin typeface="Cambria Math" panose="02040503050406030204" pitchFamily="18" charset="0"/>
+                            </a:rPr>
+                          </m:ctrlPr>
+                        </m:accPr>
+                        <m:e>
+                          <m:r>
+                            <m:rPr>
+                              <m:sty m:val="p"/>
+                            </m:rPr>
+                            <a:rPr lang="en-US" b="0" i="0" smtClean="0">
+                              <a:latin typeface="Cambria Math" panose="02040503050406030204" pitchFamily="18" charset="0"/>
+                            </a:rPr>
+                            <m:t>o</m:t>
+                          </m:r>
+                        </m:e>
+                      </m:acc>
+                      <m:r>
+                        <a:rPr lang="en-US" b="0" i="1" smtClean="0">
+                          <a:latin typeface="Cambria Math" panose="02040503050406030204" pitchFamily="18" charset="0"/>
+                        </a:rPr>
+                        <m:t>+</m:t>
+                      </m:r>
+                      <m:sSub>
+                        <m:sSubPr>
+                          <m:ctrlPr>
+                            <a:rPr lang="en-US" b="0" i="1" smtClean="0">
+                              <a:latin typeface="Cambria Math" panose="02040503050406030204" pitchFamily="18" charset="0"/>
+                            </a:rPr>
+                          </m:ctrlPr>
+                        </m:sSubPr>
+                        <m:e>
+                          <m:r>
+                            <a:rPr lang="en-US" b="0" i="1" smtClean="0">
+                              <a:latin typeface="Cambria Math" panose="02040503050406030204" pitchFamily="18" charset="0"/>
+                            </a:rPr>
+                            <m:t>h</m:t>
+                          </m:r>
+                        </m:e>
+                        <m:sub>
+                          <m:r>
+                            <a:rPr lang="en-US" b="0" i="1" smtClean="0">
+                              <a:latin typeface="Cambria Math" panose="02040503050406030204" pitchFamily="18" charset="0"/>
+                            </a:rPr>
+                            <m:t>0</m:t>
+                          </m:r>
+                        </m:sub>
+                      </m:sSub>
+                      <m:acc>
+                        <m:accPr>
+                          <m:chr m:val="̂"/>
+                          <m:ctrlPr>
+                            <a:rPr lang="en-US" i="1">
+                              <a:latin typeface="Cambria Math" panose="02040503050406030204" pitchFamily="18" charset="0"/>
+                            </a:rPr>
+                          </m:ctrlPr>
+                        </m:accPr>
+                        <m:e>
+                          <m:r>
+                            <a:rPr lang="en-US" i="1">
+                              <a:latin typeface="Cambria Math" panose="02040503050406030204" pitchFamily="18" charset="0"/>
+                            </a:rPr>
+                            <m:t>𝑧</m:t>
+                          </m:r>
+                        </m:e>
+                      </m:acc>
+                      <m:r>
+                        <a:rPr lang="en-US" i="1" dirty="0">
+                          <a:latin typeface="Cambria Math" panose="02040503050406030204" pitchFamily="18" charset="0"/>
+                        </a:rPr>
+                        <m:t>′</m:t>
+                      </m:r>
+                      <m:r>
+                        <a:rPr lang="en-US" b="0" i="1" smtClean="0">
+                          <a:latin typeface="Cambria Math" panose="02040503050406030204" pitchFamily="18" charset="0"/>
+                        </a:rPr>
+                        <m:t>+</m:t>
+                      </m:r>
+                      <m:sSub>
+                        <m:sSubPr>
+                          <m:ctrlPr>
+                            <a:rPr lang="en-US" b="0" i="1" smtClean="0">
+                              <a:latin typeface="Cambria Math" panose="02040503050406030204" pitchFamily="18" charset="0"/>
+                            </a:rPr>
+                          </m:ctrlPr>
+                        </m:sSubPr>
+                        <m:e>
+                          <m:r>
+                            <a:rPr lang="en-US" b="0" i="1" smtClean="0">
+                              <a:latin typeface="Cambria Math" panose="02040503050406030204" pitchFamily="18" charset="0"/>
+                            </a:rPr>
+                            <m:t>𝑅</m:t>
+                          </m:r>
+                        </m:e>
+                        <m:sub>
+                          <m:r>
+                            <a:rPr lang="en-US" b="0" i="0" smtClean="0">
+                              <a:latin typeface="Cambria Math" panose="02040503050406030204" pitchFamily="18" charset="0"/>
+                            </a:rPr>
+                            <m:t>0</m:t>
+                          </m:r>
+                        </m:sub>
+                      </m:sSub>
+                      <m:r>
+                        <m:rPr>
+                          <m:sty m:val="p"/>
+                        </m:rPr>
+                        <a:rPr lang="en-US" b="0" i="0" smtClean="0">
+                          <a:latin typeface="Cambria Math" panose="02040503050406030204" pitchFamily="18" charset="0"/>
+                        </a:rPr>
+                        <m:t>cos</m:t>
+                      </m:r>
+                      <m:d>
+                        <m:dPr>
+                          <m:ctrlPr>
+                            <a:rPr lang="en-US" b="0" i="1" smtClean="0">
+                              <a:latin typeface="Cambria Math" panose="02040503050406030204" pitchFamily="18" charset="0"/>
+                            </a:rPr>
+                          </m:ctrlPr>
+                        </m:dPr>
+                        <m:e>
+                          <m:r>
+                            <a:rPr lang="en-US" b="0" i="1" smtClean="0">
+                              <a:latin typeface="Cambria Math" panose="02040503050406030204" pitchFamily="18" charset="0"/>
+                            </a:rPr>
+                            <m:t>𝜃</m:t>
+                          </m:r>
+                        </m:e>
+                      </m:d>
+                      <m:sSup>
+                        <m:sSupPr>
+                          <m:ctrlPr>
+                            <a:rPr lang="en-US" b="0" i="1" dirty="0" smtClean="0">
+                              <a:latin typeface="Cambria Math" panose="02040503050406030204" pitchFamily="18" charset="0"/>
+                            </a:rPr>
+                          </m:ctrlPr>
+                        </m:sSupPr>
+                        <m:e>
+                          <m:acc>
+                            <m:accPr>
+                              <m:chr m:val="̂"/>
+                              <m:ctrlPr>
+                                <a:rPr lang="en-US" b="0" i="1" smtClean="0">
+                                  <a:latin typeface="Cambria Math" panose="02040503050406030204" pitchFamily="18" charset="0"/>
+                                </a:rPr>
+                              </m:ctrlPr>
+                            </m:accPr>
+                            <m:e>
+                              <m:r>
+                                <a:rPr lang="en-US" b="0" i="1" smtClean="0">
+                                  <a:latin typeface="Cambria Math" panose="02040503050406030204" pitchFamily="18" charset="0"/>
+                                </a:rPr>
+                                <m:t>𝑥</m:t>
+                              </m:r>
+                            </m:e>
+                          </m:acc>
+                        </m:e>
+                        <m:sup>
+                          <m:r>
+                            <a:rPr lang="en-US" b="0" i="1" dirty="0" smtClean="0">
+                              <a:latin typeface="Cambria Math" panose="02040503050406030204" pitchFamily="18" charset="0"/>
+                            </a:rPr>
+                            <m:t>′</m:t>
+                          </m:r>
+                        </m:sup>
+                      </m:sSup>
+                      <m:r>
+                        <a:rPr lang="en-US" b="0" i="1" dirty="0" smtClean="0">
+                          <a:latin typeface="Cambria Math" panose="02040503050406030204" pitchFamily="18" charset="0"/>
+                        </a:rPr>
+                        <m:t>+</m:t>
+                      </m:r>
+                      <m:sSub>
+                        <m:sSubPr>
+                          <m:ctrlPr>
+                            <a:rPr lang="en-US" i="1">
+                              <a:latin typeface="Cambria Math" panose="02040503050406030204" pitchFamily="18" charset="0"/>
+                            </a:rPr>
+                          </m:ctrlPr>
+                        </m:sSubPr>
+                        <m:e>
+                          <m:r>
+                            <a:rPr lang="en-US" i="1">
+                              <a:latin typeface="Cambria Math" panose="02040503050406030204" pitchFamily="18" charset="0"/>
+                            </a:rPr>
+                            <m:t>𝑅</m:t>
+                          </m:r>
+                        </m:e>
+                        <m:sub>
+                          <m:r>
+                            <a:rPr lang="en-US">
+                              <a:latin typeface="Cambria Math" panose="02040503050406030204" pitchFamily="18" charset="0"/>
+                            </a:rPr>
+                            <m:t>0</m:t>
+                          </m:r>
+                        </m:sub>
+                      </m:sSub>
+                      <m:r>
+                        <m:rPr>
+                          <m:sty m:val="p"/>
+                        </m:rPr>
+                        <a:rPr lang="en-US" b="0" i="1" dirty="0" smtClean="0">
+                          <a:latin typeface="Cambria Math" panose="02040503050406030204" pitchFamily="18" charset="0"/>
+                        </a:rPr>
+                        <m:t>sin</m:t>
+                      </m:r>
+                      <m:d>
+                        <m:dPr>
+                          <m:ctrlPr>
+                            <a:rPr lang="en-US" b="0" i="1" dirty="0" smtClean="0">
+                              <a:latin typeface="Cambria Math" panose="02040503050406030204" pitchFamily="18" charset="0"/>
+                            </a:rPr>
+                          </m:ctrlPr>
+                        </m:dPr>
+                        <m:e>
+                          <m:r>
+                            <a:rPr lang="en-US" b="0" i="1" dirty="0" smtClean="0">
+                              <a:latin typeface="Cambria Math" panose="02040503050406030204" pitchFamily="18" charset="0"/>
+                            </a:rPr>
+                            <m:t>𝜃</m:t>
+                          </m:r>
+                        </m:e>
+                      </m:d>
+                      <m:sSup>
+                        <m:sSupPr>
+                          <m:ctrlPr>
+                            <a:rPr lang="en-US" b="0" i="1" dirty="0" smtClean="0">
+                              <a:latin typeface="Cambria Math" panose="02040503050406030204" pitchFamily="18" charset="0"/>
+                            </a:rPr>
+                          </m:ctrlPr>
+                        </m:sSupPr>
+                        <m:e>
+                          <m:acc>
+                            <m:accPr>
+                              <m:chr m:val="̂"/>
+                              <m:ctrlPr>
+                                <a:rPr lang="en-US" b="0" i="1" dirty="0" smtClean="0">
+                                  <a:latin typeface="Cambria Math" panose="02040503050406030204" pitchFamily="18" charset="0"/>
+                                </a:rPr>
+                              </m:ctrlPr>
+                            </m:accPr>
+                            <m:e>
+                              <m:r>
+                                <a:rPr lang="en-US" b="0" i="1" dirty="0" smtClean="0">
+                                  <a:latin typeface="Cambria Math" panose="02040503050406030204" pitchFamily="18" charset="0"/>
+                                </a:rPr>
+                                <m:t>𝑦</m:t>
+                              </m:r>
+                            </m:e>
+                          </m:acc>
+                        </m:e>
+                        <m:sup>
+                          <m:r>
+                            <a:rPr lang="en-US" b="0" i="1" dirty="0" smtClean="0">
+                              <a:latin typeface="Cambria Math" panose="02040503050406030204" pitchFamily="18" charset="0"/>
+                            </a:rPr>
+                            <m:t>′</m:t>
+                          </m:r>
+                        </m:sup>
+                      </m:sSup>
+                    </m:oMath>
+                  </a14:m>
+                  <a:endParaRPr lang="en-US" dirty="0"/>
+                </a:p>
+                <a:p>
+                  <a:endParaRPr lang="en-US" dirty="0"/>
+                </a:p>
+                <a:p>
+                  <a:r>
+                    <a:rPr lang="en-US" dirty="0"/>
+                    <a:t>Cone bottom: </a:t>
+                  </a:r>
+                  <a14:m>
+                    <m:oMath xmlns:m="http://schemas.openxmlformats.org/officeDocument/2006/math">
+                      <m:acc>
+                        <m:accPr>
+                          <m:chr m:val="⃗"/>
+                          <m:ctrlPr>
+                            <a:rPr lang="en-US" b="0" i="1" smtClean="0">
+                              <a:latin typeface="Cambria Math" panose="02040503050406030204" pitchFamily="18" charset="0"/>
+                            </a:rPr>
+                          </m:ctrlPr>
+                        </m:accPr>
+                        <m:e>
+                          <m:r>
+                            <m:rPr>
+                              <m:sty m:val="p"/>
+                            </m:rPr>
+                            <a:rPr lang="en-US" b="0" i="0" smtClean="0">
+                              <a:latin typeface="Cambria Math" panose="02040503050406030204" pitchFamily="18" charset="0"/>
+                            </a:rPr>
+                            <m:t>o</m:t>
+                          </m:r>
+                        </m:e>
+                      </m:acc>
+                      <m:r>
+                        <a:rPr lang="en-US" b="0" i="1" smtClean="0">
+                          <a:latin typeface="Cambria Math" panose="02040503050406030204" pitchFamily="18" charset="0"/>
+                        </a:rPr>
+                        <m:t>+</m:t>
+                      </m:r>
+                      <m:sSub>
+                        <m:sSubPr>
+                          <m:ctrlPr>
+                            <a:rPr lang="en-US" b="0" i="1" smtClean="0">
+                              <a:latin typeface="Cambria Math" panose="02040503050406030204" pitchFamily="18" charset="0"/>
+                            </a:rPr>
+                          </m:ctrlPr>
+                        </m:sSubPr>
+                        <m:e>
+                          <m:r>
+                            <a:rPr lang="en-US" b="0" i="1" smtClean="0">
+                              <a:latin typeface="Cambria Math" panose="02040503050406030204" pitchFamily="18" charset="0"/>
+                            </a:rPr>
+                            <m:t>h</m:t>
+                          </m:r>
+                        </m:e>
+                        <m:sub>
+                          <m:r>
+                            <a:rPr lang="en-US" b="0" i="1" smtClean="0">
+                              <a:latin typeface="Cambria Math" panose="02040503050406030204" pitchFamily="18" charset="0"/>
+                            </a:rPr>
+                            <m:t>0</m:t>
+                          </m:r>
+                        </m:sub>
+                      </m:sSub>
+                      <m:acc>
+                        <m:accPr>
+                          <m:chr m:val="̂"/>
+                          <m:ctrlPr>
+                            <a:rPr lang="en-US" i="1">
+                              <a:latin typeface="Cambria Math" panose="02040503050406030204" pitchFamily="18" charset="0"/>
+                            </a:rPr>
+                          </m:ctrlPr>
+                        </m:accPr>
+                        <m:e>
+                          <m:r>
+                            <a:rPr lang="en-US" i="1">
+                              <a:latin typeface="Cambria Math" panose="02040503050406030204" pitchFamily="18" charset="0"/>
+                            </a:rPr>
+                            <m:t>𝑧</m:t>
+                          </m:r>
+                        </m:e>
+                      </m:acc>
+                      <m:r>
+                        <a:rPr lang="en-US" i="1" dirty="0">
+                          <a:latin typeface="Cambria Math" panose="02040503050406030204" pitchFamily="18" charset="0"/>
+                        </a:rPr>
+                        <m:t>′</m:t>
+                      </m:r>
+                      <m:r>
+                        <a:rPr lang="en-US" b="0" i="1" smtClean="0">
+                          <a:latin typeface="Cambria Math" panose="02040503050406030204" pitchFamily="18" charset="0"/>
+                        </a:rPr>
+                        <m:t>+</m:t>
+                      </m:r>
+                      <m:sSub>
+                        <m:sSubPr>
+                          <m:ctrlPr>
+                            <a:rPr lang="en-US" b="0" i="1" smtClean="0">
+                              <a:latin typeface="Cambria Math" panose="02040503050406030204" pitchFamily="18" charset="0"/>
+                            </a:rPr>
+                          </m:ctrlPr>
+                        </m:sSubPr>
+                        <m:e>
+                          <m:r>
+                            <a:rPr lang="en-US" b="0" i="1" smtClean="0">
+                              <a:latin typeface="Cambria Math" panose="02040503050406030204" pitchFamily="18" charset="0"/>
+                            </a:rPr>
+                            <m:t>𝑅</m:t>
+                          </m:r>
+                        </m:e>
+                        <m:sub>
+                          <m:r>
+                            <a:rPr lang="en-US" b="0" i="1" smtClean="0">
+                              <a:latin typeface="Cambria Math" panose="02040503050406030204" pitchFamily="18" charset="0"/>
+                            </a:rPr>
+                            <m:t>1</m:t>
+                          </m:r>
+                        </m:sub>
+                      </m:sSub>
+                      <m:r>
+                        <m:rPr>
+                          <m:sty m:val="p"/>
+                        </m:rPr>
+                        <a:rPr lang="en-US" b="0" i="0" smtClean="0">
+                          <a:latin typeface="Cambria Math" panose="02040503050406030204" pitchFamily="18" charset="0"/>
+                        </a:rPr>
+                        <m:t>cos</m:t>
+                      </m:r>
+                      <m:d>
+                        <m:dPr>
+                          <m:ctrlPr>
+                            <a:rPr lang="en-US" b="0" i="1" smtClean="0">
+                              <a:latin typeface="Cambria Math" panose="02040503050406030204" pitchFamily="18" charset="0"/>
+                            </a:rPr>
+                          </m:ctrlPr>
+                        </m:dPr>
+                        <m:e>
+                          <m:r>
+                            <a:rPr lang="en-US" b="0" i="1" smtClean="0">
+                              <a:latin typeface="Cambria Math" panose="02040503050406030204" pitchFamily="18" charset="0"/>
+                            </a:rPr>
+                            <m:t>𝜃</m:t>
+                          </m:r>
+                        </m:e>
+                      </m:d>
+                      <m:sSup>
+                        <m:sSupPr>
+                          <m:ctrlPr>
+                            <a:rPr lang="en-US" b="0" i="1" dirty="0" smtClean="0">
+                              <a:latin typeface="Cambria Math" panose="02040503050406030204" pitchFamily="18" charset="0"/>
+                            </a:rPr>
+                          </m:ctrlPr>
+                        </m:sSupPr>
+                        <m:e>
+                          <m:acc>
+                            <m:accPr>
+                              <m:chr m:val="̂"/>
+                              <m:ctrlPr>
+                                <a:rPr lang="en-US" b="0" i="1" smtClean="0">
+                                  <a:latin typeface="Cambria Math" panose="02040503050406030204" pitchFamily="18" charset="0"/>
+                                </a:rPr>
+                              </m:ctrlPr>
+                            </m:accPr>
+                            <m:e>
+                              <m:r>
+                                <a:rPr lang="en-US" b="0" i="1" smtClean="0">
+                                  <a:latin typeface="Cambria Math" panose="02040503050406030204" pitchFamily="18" charset="0"/>
+                                </a:rPr>
+                                <m:t>𝑥</m:t>
+                              </m:r>
+                            </m:e>
+                          </m:acc>
+                        </m:e>
+                        <m:sup>
+                          <m:r>
+                            <a:rPr lang="en-US" b="0" i="1" dirty="0" smtClean="0">
+                              <a:latin typeface="Cambria Math" panose="02040503050406030204" pitchFamily="18" charset="0"/>
+                            </a:rPr>
+                            <m:t>′</m:t>
+                          </m:r>
+                        </m:sup>
+                      </m:sSup>
+                      <m:r>
+                        <a:rPr lang="en-US" b="0" i="1" dirty="0" smtClean="0">
+                          <a:latin typeface="Cambria Math" panose="02040503050406030204" pitchFamily="18" charset="0"/>
+                        </a:rPr>
+                        <m:t>+</m:t>
+                      </m:r>
+                      <m:sSub>
+                        <m:sSubPr>
+                          <m:ctrlPr>
+                            <a:rPr lang="en-US" i="1">
+                              <a:latin typeface="Cambria Math" panose="02040503050406030204" pitchFamily="18" charset="0"/>
+                            </a:rPr>
+                          </m:ctrlPr>
+                        </m:sSubPr>
+                        <m:e>
+                          <m:r>
+                            <a:rPr lang="en-US" i="1">
+                              <a:latin typeface="Cambria Math" panose="02040503050406030204" pitchFamily="18" charset="0"/>
+                            </a:rPr>
+                            <m:t>𝑅</m:t>
+                          </m:r>
+                        </m:e>
+                        <m:sub>
+                          <m:r>
+                            <a:rPr lang="en-US" i="1">
+                              <a:latin typeface="Cambria Math" panose="02040503050406030204" pitchFamily="18" charset="0"/>
+                            </a:rPr>
+                            <m:t>1</m:t>
+                          </m:r>
+                        </m:sub>
+                      </m:sSub>
+                      <m:r>
+                        <m:rPr>
+                          <m:sty m:val="p"/>
+                        </m:rPr>
+                        <a:rPr lang="en-US" b="0" i="1" dirty="0" smtClean="0">
+                          <a:latin typeface="Cambria Math" panose="02040503050406030204" pitchFamily="18" charset="0"/>
+                        </a:rPr>
+                        <m:t>sin</m:t>
+                      </m:r>
+                      <m:d>
+                        <m:dPr>
+                          <m:ctrlPr>
+                            <a:rPr lang="en-US" b="0" i="1" dirty="0" smtClean="0">
+                              <a:latin typeface="Cambria Math" panose="02040503050406030204" pitchFamily="18" charset="0"/>
+                            </a:rPr>
+                          </m:ctrlPr>
+                        </m:dPr>
+                        <m:e>
+                          <m:r>
+                            <a:rPr lang="en-US" b="0" i="1" dirty="0" smtClean="0">
+                              <a:latin typeface="Cambria Math" panose="02040503050406030204" pitchFamily="18" charset="0"/>
+                            </a:rPr>
+                            <m:t>𝜃</m:t>
+                          </m:r>
+                        </m:e>
+                      </m:d>
+                      <m:sSup>
+                        <m:sSupPr>
+                          <m:ctrlPr>
+                            <a:rPr lang="en-US" b="0" i="1" dirty="0" smtClean="0">
+                              <a:latin typeface="Cambria Math" panose="02040503050406030204" pitchFamily="18" charset="0"/>
+                            </a:rPr>
+                          </m:ctrlPr>
+                        </m:sSupPr>
+                        <m:e>
+                          <m:acc>
+                            <m:accPr>
+                              <m:chr m:val="̂"/>
+                              <m:ctrlPr>
+                                <a:rPr lang="en-US" b="0" i="1" dirty="0" smtClean="0">
+                                  <a:latin typeface="Cambria Math" panose="02040503050406030204" pitchFamily="18" charset="0"/>
+                                </a:rPr>
+                              </m:ctrlPr>
+                            </m:accPr>
+                            <m:e>
+                              <m:r>
+                                <a:rPr lang="en-US" b="0" i="1" dirty="0" smtClean="0">
+                                  <a:latin typeface="Cambria Math" panose="02040503050406030204" pitchFamily="18" charset="0"/>
+                                </a:rPr>
+                                <m:t>𝑦</m:t>
+                              </m:r>
+                            </m:e>
+                          </m:acc>
+                        </m:e>
+                        <m:sup>
+                          <m:r>
+                            <a:rPr lang="en-US" b="0" i="1" dirty="0" smtClean="0">
+                              <a:latin typeface="Cambria Math" panose="02040503050406030204" pitchFamily="18" charset="0"/>
+                            </a:rPr>
+                            <m:t>′</m:t>
+                          </m:r>
+                        </m:sup>
+                      </m:sSup>
+                    </m:oMath>
+                  </a14:m>
+                  <a:endParaRPr lang="en-US" dirty="0"/>
+                </a:p>
+                <a:p>
+                  <a:endParaRPr lang="en-US" dirty="0"/>
+                </a:p>
+                <a:p>
+                  <a:r>
+                    <a:rPr lang="en-US" dirty="0"/>
+                    <a:t>Cone sides: </a:t>
+                  </a:r>
+                  <a14:m>
+                    <m:oMath xmlns:m="http://schemas.openxmlformats.org/officeDocument/2006/math">
+                      <m:acc>
+                        <m:accPr>
+                          <m:chr m:val="⃗"/>
+                          <m:ctrlPr>
+                            <a:rPr lang="en-US" b="0" i="1" smtClean="0">
+                              <a:latin typeface="Cambria Math" panose="02040503050406030204" pitchFamily="18" charset="0"/>
+                            </a:rPr>
+                          </m:ctrlPr>
+                        </m:accPr>
+                        <m:e>
+                          <m:r>
+                            <m:rPr>
+                              <m:sty m:val="p"/>
+                            </m:rPr>
+                            <a:rPr lang="en-US" b="0" i="0" smtClean="0">
+                              <a:latin typeface="Cambria Math" panose="02040503050406030204" pitchFamily="18" charset="0"/>
+                            </a:rPr>
+                            <m:t>o</m:t>
+                          </m:r>
+                        </m:e>
+                      </m:acc>
+                      <m:r>
+                        <a:rPr lang="en-US" b="0" i="1" smtClean="0">
+                          <a:latin typeface="Cambria Math" panose="02040503050406030204" pitchFamily="18" charset="0"/>
+                        </a:rPr>
+                        <m:t>+</m:t>
+                      </m:r>
+                      <m:sSub>
+                        <m:sSubPr>
+                          <m:ctrlPr>
+                            <a:rPr lang="en-US" b="0" i="1" smtClean="0">
+                              <a:latin typeface="Cambria Math" panose="02040503050406030204" pitchFamily="18" charset="0"/>
+                            </a:rPr>
+                          </m:ctrlPr>
+                        </m:sSubPr>
+                        <m:e>
+                          <m:r>
+                            <a:rPr lang="en-US" b="0" i="1" smtClean="0">
+                              <a:latin typeface="Cambria Math" panose="02040503050406030204" pitchFamily="18" charset="0"/>
+                            </a:rPr>
+                            <m:t>h</m:t>
+                          </m:r>
+                        </m:e>
+                        <m:sub>
+                          <m:r>
+                            <a:rPr lang="en-US" b="0" i="1" smtClean="0">
+                              <a:latin typeface="Cambria Math" panose="02040503050406030204" pitchFamily="18" charset="0"/>
+                            </a:rPr>
+                            <m:t>0</m:t>
+                          </m:r>
+                        </m:sub>
+                      </m:sSub>
+                      <m:acc>
+                        <m:accPr>
+                          <m:chr m:val="̂"/>
+                          <m:ctrlPr>
+                            <a:rPr lang="en-US" i="1">
+                              <a:latin typeface="Cambria Math" panose="02040503050406030204" pitchFamily="18" charset="0"/>
+                            </a:rPr>
+                          </m:ctrlPr>
+                        </m:accPr>
+                        <m:e>
+                          <m:r>
+                            <a:rPr lang="en-US" i="1">
+                              <a:latin typeface="Cambria Math" panose="02040503050406030204" pitchFamily="18" charset="0"/>
+                            </a:rPr>
+                            <m:t>𝑧</m:t>
+                          </m:r>
+                        </m:e>
+                      </m:acc>
+                      <m:r>
+                        <a:rPr lang="en-US" i="1" dirty="0">
+                          <a:latin typeface="Cambria Math" panose="02040503050406030204" pitchFamily="18" charset="0"/>
+                        </a:rPr>
+                        <m:t>′</m:t>
+                      </m:r>
+                      <m:r>
+                        <a:rPr lang="en-US" b="0" i="1" smtClean="0">
+                          <a:latin typeface="Cambria Math" panose="02040503050406030204" pitchFamily="18" charset="0"/>
+                        </a:rPr>
+                        <m:t>+</m:t>
+                      </m:r>
+                      <m:sSub>
+                        <m:sSubPr>
+                          <m:ctrlPr>
+                            <a:rPr lang="en-US" b="0" i="1" smtClean="0">
+                              <a:latin typeface="Cambria Math" panose="02040503050406030204" pitchFamily="18" charset="0"/>
+                            </a:rPr>
+                          </m:ctrlPr>
+                        </m:sSubPr>
+                        <m:e>
+                          <m:r>
+                            <a:rPr lang="en-US" b="0" i="1" smtClean="0">
+                              <a:latin typeface="Cambria Math" panose="02040503050406030204" pitchFamily="18" charset="0"/>
+                            </a:rPr>
+                            <m:t>h</m:t>
+                          </m:r>
+                        </m:e>
+                        <m:sub>
+                          <m:r>
+                            <a:rPr lang="en-US" b="0" i="1" smtClean="0">
+                              <a:latin typeface="Cambria Math" panose="02040503050406030204" pitchFamily="18" charset="0"/>
+                            </a:rPr>
+                            <m:t>1</m:t>
+                          </m:r>
+                        </m:sub>
+                      </m:sSub>
+                      <m:sSup>
+                        <m:sSupPr>
+                          <m:ctrlPr>
+                            <a:rPr lang="en-US" b="0" i="1" dirty="0" smtClean="0">
+                              <a:latin typeface="Cambria Math" panose="02040503050406030204" pitchFamily="18" charset="0"/>
+                            </a:rPr>
+                          </m:ctrlPr>
+                        </m:sSupPr>
+                        <m:e>
+                          <m:acc>
+                            <m:accPr>
+                              <m:chr m:val="̂"/>
+                              <m:ctrlPr>
+                                <a:rPr lang="en-US" b="0" i="1" smtClean="0">
+                                  <a:latin typeface="Cambria Math" panose="02040503050406030204" pitchFamily="18" charset="0"/>
+                                </a:rPr>
+                              </m:ctrlPr>
+                            </m:accPr>
+                            <m:e>
+                              <m:r>
+                                <a:rPr lang="en-US" b="0" i="1" smtClean="0">
+                                  <a:latin typeface="Cambria Math" panose="02040503050406030204" pitchFamily="18" charset="0"/>
+                                </a:rPr>
+                                <m:t>𝑧</m:t>
+                              </m:r>
+                            </m:e>
+                          </m:acc>
+                        </m:e>
+                        <m:sup>
+                          <m:r>
+                            <a:rPr lang="en-US" b="0" i="1" dirty="0" smtClean="0">
+                              <a:latin typeface="Cambria Math" panose="02040503050406030204" pitchFamily="18" charset="0"/>
+                            </a:rPr>
+                            <m:t>′</m:t>
+                          </m:r>
+                        </m:sup>
+                      </m:sSup>
+                      <m:r>
+                        <a:rPr lang="en-US" b="0" i="1" dirty="0" smtClean="0">
+                          <a:latin typeface="Cambria Math" panose="02040503050406030204" pitchFamily="18" charset="0"/>
+                        </a:rPr>
+                        <m:t>𝑡</m:t>
+                      </m:r>
+                      <m:r>
+                        <a:rPr lang="en-US" b="0" i="1" smtClean="0">
+                          <a:latin typeface="Cambria Math" panose="02040503050406030204" pitchFamily="18" charset="0"/>
+                        </a:rPr>
+                        <m:t>+</m:t>
+                      </m:r>
+                      <m:sSub>
+                        <m:sSubPr>
+                          <m:ctrlPr>
+                            <a:rPr lang="en-US" i="1">
+                              <a:latin typeface="Cambria Math" panose="02040503050406030204" pitchFamily="18" charset="0"/>
+                            </a:rPr>
+                          </m:ctrlPr>
+                        </m:sSubPr>
+                        <m:e>
+                          <m:r>
+                            <a:rPr lang="en-US" i="1">
+                              <a:latin typeface="Cambria Math" panose="02040503050406030204" pitchFamily="18" charset="0"/>
+                            </a:rPr>
+                            <m:t>𝑅</m:t>
+                          </m:r>
+                        </m:e>
+                        <m:sub>
+                          <m:r>
+                            <a:rPr lang="en-US" i="1">
+                              <a:latin typeface="Cambria Math" panose="02040503050406030204" pitchFamily="18" charset="0"/>
+                            </a:rPr>
+                            <m:t>1</m:t>
+                          </m:r>
+                        </m:sub>
+                      </m:sSub>
+                      <m:r>
+                        <a:rPr lang="en-US" b="0" i="1" smtClean="0">
+                          <a:latin typeface="Cambria Math" panose="02040503050406030204" pitchFamily="18" charset="0"/>
+                        </a:rPr>
+                        <m:t>(1−</m:t>
+                      </m:r>
+                      <m:r>
+                        <m:rPr>
+                          <m:sty m:val="p"/>
+                        </m:rPr>
+                        <a:rPr lang="en-US" b="0" i="0" smtClean="0">
+                          <a:latin typeface="Cambria Math" panose="02040503050406030204" pitchFamily="18" charset="0"/>
+                        </a:rPr>
+                        <m:t>t</m:t>
+                      </m:r>
+                      <m:r>
+                        <a:rPr lang="en-US" b="0" i="0" smtClean="0">
+                          <a:latin typeface="Cambria Math" panose="02040503050406030204" pitchFamily="18" charset="0"/>
+                        </a:rPr>
+                        <m:t>)(</m:t>
+                      </m:r>
+                      <m:r>
+                        <m:rPr>
+                          <m:sty m:val="p"/>
+                        </m:rPr>
+                        <a:rPr lang="en-US" b="0" i="0" smtClean="0">
+                          <a:latin typeface="Cambria Math" panose="02040503050406030204" pitchFamily="18" charset="0"/>
+                        </a:rPr>
+                        <m:t>cos</m:t>
+                      </m:r>
+                      <m:d>
+                        <m:dPr>
+                          <m:ctrlPr>
+                            <a:rPr lang="en-US" b="0" i="1" smtClean="0">
+                              <a:latin typeface="Cambria Math" panose="02040503050406030204" pitchFamily="18" charset="0"/>
+                            </a:rPr>
+                          </m:ctrlPr>
+                        </m:dPr>
+                        <m:e>
+                          <m:r>
+                            <a:rPr lang="en-US" b="0" i="1" smtClean="0">
+                              <a:latin typeface="Cambria Math" panose="02040503050406030204" pitchFamily="18" charset="0"/>
+                            </a:rPr>
+                            <m:t>𝜃</m:t>
+                          </m:r>
+                        </m:e>
+                      </m:d>
+                      <m:sSup>
+                        <m:sSupPr>
+                          <m:ctrlPr>
+                            <a:rPr lang="en-US" b="0" i="1" dirty="0" smtClean="0">
+                              <a:latin typeface="Cambria Math" panose="02040503050406030204" pitchFamily="18" charset="0"/>
+                            </a:rPr>
+                          </m:ctrlPr>
+                        </m:sSupPr>
+                        <m:e>
+                          <m:acc>
+                            <m:accPr>
+                              <m:chr m:val="̂"/>
+                              <m:ctrlPr>
+                                <a:rPr lang="en-US" b="0" i="1" smtClean="0">
+                                  <a:latin typeface="Cambria Math" panose="02040503050406030204" pitchFamily="18" charset="0"/>
+                                </a:rPr>
+                              </m:ctrlPr>
+                            </m:accPr>
+                            <m:e>
+                              <m:r>
+                                <a:rPr lang="en-US" b="0" i="1" smtClean="0">
+                                  <a:latin typeface="Cambria Math" panose="02040503050406030204" pitchFamily="18" charset="0"/>
+                                </a:rPr>
+                                <m:t>𝑥</m:t>
+                              </m:r>
+                            </m:e>
+                          </m:acc>
+                        </m:e>
+                        <m:sup>
+                          <m:r>
+                            <a:rPr lang="en-US" b="0" i="1" dirty="0" smtClean="0">
+                              <a:latin typeface="Cambria Math" panose="02040503050406030204" pitchFamily="18" charset="0"/>
+                            </a:rPr>
+                            <m:t>′</m:t>
+                          </m:r>
+                        </m:sup>
+                      </m:sSup>
+                      <m:r>
+                        <a:rPr lang="en-US" b="0" i="1" dirty="0" smtClean="0">
+                          <a:latin typeface="Cambria Math" panose="02040503050406030204" pitchFamily="18" charset="0"/>
+                        </a:rPr>
+                        <m:t>+</m:t>
+                      </m:r>
+                      <m:r>
+                        <m:rPr>
+                          <m:sty m:val="p"/>
+                        </m:rPr>
+                        <a:rPr lang="en-US" b="0" i="1" dirty="0" smtClean="0">
+                          <a:latin typeface="Cambria Math" panose="02040503050406030204" pitchFamily="18" charset="0"/>
+                        </a:rPr>
+                        <m:t>sin</m:t>
+                      </m:r>
+                      <m:d>
+                        <m:dPr>
+                          <m:ctrlPr>
+                            <a:rPr lang="en-US" b="0" i="1" dirty="0" smtClean="0">
+                              <a:latin typeface="Cambria Math" panose="02040503050406030204" pitchFamily="18" charset="0"/>
+                            </a:rPr>
+                          </m:ctrlPr>
+                        </m:dPr>
+                        <m:e>
+                          <m:r>
+                            <a:rPr lang="en-US" b="0" i="1" dirty="0" smtClean="0">
+                              <a:latin typeface="Cambria Math" panose="02040503050406030204" pitchFamily="18" charset="0"/>
+                            </a:rPr>
+                            <m:t>𝜃</m:t>
+                          </m:r>
+                        </m:e>
+                      </m:d>
+                      <m:sSup>
+                        <m:sSupPr>
+                          <m:ctrlPr>
+                            <a:rPr lang="en-US" b="0" i="1" dirty="0" smtClean="0">
+                              <a:latin typeface="Cambria Math" panose="02040503050406030204" pitchFamily="18" charset="0"/>
+                            </a:rPr>
+                          </m:ctrlPr>
+                        </m:sSupPr>
+                        <m:e>
+                          <m:acc>
+                            <m:accPr>
+                              <m:chr m:val="̂"/>
+                              <m:ctrlPr>
+                                <a:rPr lang="en-US" b="0" i="1" dirty="0" smtClean="0">
+                                  <a:latin typeface="Cambria Math" panose="02040503050406030204" pitchFamily="18" charset="0"/>
+                                </a:rPr>
+                              </m:ctrlPr>
+                            </m:accPr>
+                            <m:e>
+                              <m:r>
+                                <a:rPr lang="en-US" b="0" i="1" dirty="0" smtClean="0">
+                                  <a:latin typeface="Cambria Math" panose="02040503050406030204" pitchFamily="18" charset="0"/>
+                                </a:rPr>
+                                <m:t>𝑦</m:t>
+                              </m:r>
+                            </m:e>
+                          </m:acc>
+                        </m:e>
+                        <m:sup>
+                          <m:r>
+                            <a:rPr lang="en-US" b="0" i="1" dirty="0" smtClean="0">
+                              <a:latin typeface="Cambria Math" panose="02040503050406030204" pitchFamily="18" charset="0"/>
+                            </a:rPr>
+                            <m:t>′</m:t>
+                          </m:r>
+                        </m:sup>
+                      </m:sSup>
+                      <m:r>
+                        <a:rPr lang="en-US" b="0" i="1" dirty="0" smtClean="0">
+                          <a:latin typeface="Cambria Math" panose="02040503050406030204" pitchFamily="18" charset="0"/>
+                        </a:rPr>
+                        <m:t>)</m:t>
+                      </m:r>
+                    </m:oMath>
+                  </a14:m>
+                  <a:endParaRPr lang="en-US" dirty="0"/>
+                </a:p>
+                <a:p>
+                  <a:endParaRPr lang="en-US" dirty="0"/>
+                </a:p>
+                <a:p>
+                  <a:r>
+                    <a:rPr lang="en-US" dirty="0"/>
+                    <a:t>Cone tip: </a:t>
+                  </a:r>
+                  <a14:m>
+                    <m:oMath xmlns:m="http://schemas.openxmlformats.org/officeDocument/2006/math">
+                      <m:acc>
+                        <m:accPr>
+                          <m:chr m:val="⃗"/>
+                          <m:ctrlPr>
+                            <a:rPr lang="en-US" b="0" i="1" smtClean="0">
+                              <a:latin typeface="Cambria Math" panose="02040503050406030204" pitchFamily="18" charset="0"/>
+                            </a:rPr>
+                          </m:ctrlPr>
+                        </m:accPr>
+                        <m:e>
+                          <m:r>
+                            <m:rPr>
+                              <m:sty m:val="p"/>
+                            </m:rPr>
+                            <a:rPr lang="en-US" b="0" i="0" smtClean="0">
+                              <a:latin typeface="Cambria Math" panose="02040503050406030204" pitchFamily="18" charset="0"/>
+                            </a:rPr>
+                            <m:t>o</m:t>
+                          </m:r>
+                        </m:e>
+                      </m:acc>
+                      <m:r>
+                        <a:rPr lang="en-US" b="0" i="1" smtClean="0">
+                          <a:latin typeface="Cambria Math" panose="02040503050406030204" pitchFamily="18" charset="0"/>
+                        </a:rPr>
+                        <m:t>+</m:t>
+                      </m:r>
+                      <m:sSub>
+                        <m:sSubPr>
+                          <m:ctrlPr>
+                            <a:rPr lang="en-US" b="0" i="1" smtClean="0">
+                              <a:latin typeface="Cambria Math" panose="02040503050406030204" pitchFamily="18" charset="0"/>
+                            </a:rPr>
+                          </m:ctrlPr>
+                        </m:sSubPr>
+                        <m:e>
+                          <m:r>
+                            <a:rPr lang="en-US" b="0" i="1" smtClean="0">
+                              <a:latin typeface="Cambria Math" panose="02040503050406030204" pitchFamily="18" charset="0"/>
+                            </a:rPr>
+                            <m:t>h</m:t>
+                          </m:r>
+                        </m:e>
+                        <m:sub>
+                          <m:r>
+                            <a:rPr lang="en-US" b="0" i="1" smtClean="0">
+                              <a:latin typeface="Cambria Math" panose="02040503050406030204" pitchFamily="18" charset="0"/>
+                            </a:rPr>
+                            <m:t>0</m:t>
+                          </m:r>
+                        </m:sub>
+                      </m:sSub>
+                      <m:acc>
+                        <m:accPr>
+                          <m:chr m:val="̂"/>
+                          <m:ctrlPr>
+                            <a:rPr lang="en-US" i="1">
+                              <a:latin typeface="Cambria Math" panose="02040503050406030204" pitchFamily="18" charset="0"/>
+                            </a:rPr>
+                          </m:ctrlPr>
+                        </m:accPr>
+                        <m:e>
+                          <m:r>
+                            <a:rPr lang="en-US" i="1">
+                              <a:latin typeface="Cambria Math" panose="02040503050406030204" pitchFamily="18" charset="0"/>
+                            </a:rPr>
+                            <m:t>𝑧</m:t>
+                          </m:r>
+                        </m:e>
+                      </m:acc>
+                      <m:r>
+                        <a:rPr lang="en-US" i="1" dirty="0">
+                          <a:latin typeface="Cambria Math" panose="02040503050406030204" pitchFamily="18" charset="0"/>
+                        </a:rPr>
+                        <m:t>′</m:t>
+                      </m:r>
+                      <m:r>
+                        <a:rPr lang="en-US" b="0" i="1" smtClean="0">
+                          <a:latin typeface="Cambria Math" panose="02040503050406030204" pitchFamily="18" charset="0"/>
+                        </a:rPr>
+                        <m:t>+</m:t>
+                      </m:r>
+                      <m:sSub>
+                        <m:sSubPr>
+                          <m:ctrlPr>
+                            <a:rPr lang="en-US" b="0" i="1" smtClean="0">
+                              <a:latin typeface="Cambria Math" panose="02040503050406030204" pitchFamily="18" charset="0"/>
+                            </a:rPr>
+                          </m:ctrlPr>
+                        </m:sSubPr>
+                        <m:e>
+                          <m:r>
+                            <a:rPr lang="en-US" b="0" i="1" smtClean="0">
+                              <a:latin typeface="Cambria Math" panose="02040503050406030204" pitchFamily="18" charset="0"/>
+                            </a:rPr>
+                            <m:t>h</m:t>
+                          </m:r>
+                        </m:e>
+                        <m:sub>
+                          <m:r>
+                            <a:rPr lang="en-US" b="0" i="1" smtClean="0">
+                              <a:latin typeface="Cambria Math" panose="02040503050406030204" pitchFamily="18" charset="0"/>
+                            </a:rPr>
+                            <m:t>1</m:t>
+                          </m:r>
+                        </m:sub>
+                      </m:sSub>
+                      <m:sSup>
+                        <m:sSupPr>
+                          <m:ctrlPr>
+                            <a:rPr lang="en-US" b="0" i="1" dirty="0" smtClean="0">
+                              <a:latin typeface="Cambria Math" panose="02040503050406030204" pitchFamily="18" charset="0"/>
+                            </a:rPr>
+                          </m:ctrlPr>
+                        </m:sSupPr>
+                        <m:e>
+                          <m:acc>
+                            <m:accPr>
+                              <m:chr m:val="̂"/>
+                              <m:ctrlPr>
+                                <a:rPr lang="en-US" b="0" i="1" smtClean="0">
+                                  <a:latin typeface="Cambria Math" panose="02040503050406030204" pitchFamily="18" charset="0"/>
+                                </a:rPr>
+                              </m:ctrlPr>
+                            </m:accPr>
+                            <m:e>
+                              <m:r>
+                                <a:rPr lang="en-US" b="0" i="1" smtClean="0">
+                                  <a:latin typeface="Cambria Math" panose="02040503050406030204" pitchFamily="18" charset="0"/>
+                                </a:rPr>
+                                <m:t>𝑧</m:t>
+                              </m:r>
+                            </m:e>
+                          </m:acc>
+                        </m:e>
+                        <m:sup>
+                          <m:r>
+                            <a:rPr lang="en-US" b="0" i="1" dirty="0" smtClean="0">
+                              <a:latin typeface="Cambria Math" panose="02040503050406030204" pitchFamily="18" charset="0"/>
+                            </a:rPr>
+                            <m:t>′</m:t>
+                          </m:r>
+                        </m:sup>
+                      </m:sSup>
+                    </m:oMath>
+                  </a14:m>
+                  <a:endParaRPr lang="en-US" dirty="0"/>
+                </a:p>
+              </p:txBody>
+            </p:sp>
+          </mc:Choice>
+          <mc:Fallback xmlns="">
+            <p:sp>
+              <p:nvSpPr>
+                <p:cNvPr id="2" name="TextBox 1">
+                  <a:extLst>
+                    <a:ext uri="{FF2B5EF4-FFF2-40B4-BE49-F238E27FC236}">
+                      <a16:creationId xmlns:a16="http://schemas.microsoft.com/office/drawing/2014/main" id="{34A7CA5A-7A35-068D-7251-62B614A2AD7D}"/>
+                    </a:ext>
+                  </a:extLst>
+                </p:cNvPr>
+                <p:cNvSpPr txBox="1">
+                  <a:spLocks noRot="1" noChangeAspect="1" noMove="1" noResize="1" noEditPoints="1" noAdjustHandles="1" noChangeArrowheads="1" noChangeShapeType="1" noTextEdit="1"/>
+                </p:cNvSpPr>
+                <p:nvPr/>
+              </p:nvSpPr>
+              <p:spPr>
+                <a:xfrm>
+                  <a:off x="1491914" y="1809550"/>
+                  <a:ext cx="6718435" cy="2585323"/>
+                </a:xfrm>
+                <a:prstGeom prst="rect">
+                  <a:avLst/>
+                </a:prstGeom>
+                <a:blipFill>
+                  <a:blip r:embed="rId2"/>
+                  <a:stretch>
+                    <a:fillRect l="-817" t="-1415" b="-2830"/>
+                  </a:stretch>
+                </a:blipFill>
+              </p:spPr>
+              <p:txBody>
+                <a:bodyPr/>
+                <a:lstStyle/>
+                <a:p>
+                  <a:r>
+                    <a:rPr lang="en-US">
+                      <a:noFill/>
+                    </a:rPr>
+                    <a:t> </a:t>
+                  </a:r>
+                </a:p>
+              </p:txBody>
+            </p:sp>
+          </mc:Fallback>
+        </mc:AlternateContent>
+        <p:sp>
+          <p:nvSpPr>
+            <p:cNvPr id="3" name="Arrow: Down 2">
+              <a:extLst>
+                <a:ext uri="{FF2B5EF4-FFF2-40B4-BE49-F238E27FC236}">
+                  <a16:creationId xmlns:a16="http://schemas.microsoft.com/office/drawing/2014/main" id="{57968B76-24EF-23D0-1B49-0A0B143B8654}"/>
+                </a:ext>
+              </a:extLst>
+            </p:cNvPr>
+            <p:cNvSpPr/>
+            <p:nvPr/>
+          </p:nvSpPr>
+          <p:spPr>
+            <a:xfrm rot="10800000">
+              <a:off x="8046720" y="1340788"/>
+              <a:ext cx="1482290" cy="3522846"/>
+            </a:xfrm>
+            <a:prstGeom prst="downArrow">
+              <a:avLst/>
+            </a:prstGeom>
+            <a:solidFill>
+              <a:schemeClr val="accent4"/>
+            </a:solidFill>
+            <a:ln w="38100">
+              <a:solidFill>
+                <a:schemeClr val="accent4">
+                  <a:lumMod val="60000"/>
+                  <a:lumOff val="40000"/>
+                </a:schemeClr>
+              </a:solidFill>
+            </a:ln>
+          </p:spPr>
+          <p:style>
+            <a:lnRef idx="2">
+              <a:schemeClr val="accent1">
+                <a:shade val="50000"/>
+              </a:schemeClr>
+            </a:lnRef>
+            <a:fillRef idx="1">
+              <a:schemeClr val="accent1"/>
+            </a:fillRef>
+            <a:effectRef idx="0">
+              <a:schemeClr val="accent1"/>
+            </a:effectRef>
+            <a:fontRef idx="minor">
+              <a:schemeClr val="lt1"/>
+            </a:fontRef>
+          </p:style>
+          <p:txBody>
+            <a:bodyPr rtlCol="0" anchor="ctr"/>
+            <a:lstStyle/>
+            <a:p>
+              <a:pPr algn="ctr"/>
+              <a:endParaRPr lang="en-US" dirty="0"/>
+            </a:p>
+          </p:txBody>
+        </p:sp>
+        <p:sp>
+          <p:nvSpPr>
+            <p:cNvPr id="4" name="Right Brace 3">
+              <a:extLst>
+                <a:ext uri="{FF2B5EF4-FFF2-40B4-BE49-F238E27FC236}">
+                  <a16:creationId xmlns:a16="http://schemas.microsoft.com/office/drawing/2014/main" id="{D1CE8387-0B12-6182-7B15-F8E579F921F6}"/>
+                </a:ext>
+              </a:extLst>
+            </p:cNvPr>
+            <p:cNvSpPr/>
+            <p:nvPr/>
+          </p:nvSpPr>
+          <p:spPr>
+            <a:xfrm>
+              <a:off x="9509760" y="2121280"/>
+              <a:ext cx="385010" cy="2723950"/>
+            </a:xfrm>
+            <a:prstGeom prst="rightBrace">
+              <a:avLst>
+                <a:gd name="adj1" fmla="val 68333"/>
+                <a:gd name="adj2" fmla="val 50000"/>
+              </a:avLst>
+            </a:prstGeom>
+          </p:spPr>
+          <p:style>
+            <a:lnRef idx="1">
+              <a:schemeClr val="accent1"/>
+            </a:lnRef>
+            <a:fillRef idx="0">
+              <a:schemeClr val="accent1"/>
+            </a:fillRef>
+            <a:effectRef idx="0">
+              <a:schemeClr val="accent1"/>
+            </a:effectRef>
+            <a:fontRef idx="minor">
+              <a:schemeClr val="tx1"/>
+            </a:fontRef>
+          </p:style>
+          <p:txBody>
+            <a:bodyPr rtlCol="0" anchor="ctr"/>
+            <a:lstStyle/>
+            <a:p>
+              <a:pPr algn="ctr"/>
+              <a:endParaRPr lang="en-US"/>
+            </a:p>
+          </p:txBody>
+        </p:sp>
+        <mc:AlternateContent xmlns:mc="http://schemas.openxmlformats.org/markup-compatibility/2006" xmlns:a14="http://schemas.microsoft.com/office/drawing/2010/main">
+          <mc:Choice Requires="a14">
+            <p:sp>
+              <p:nvSpPr>
+                <p:cNvPr id="5" name="TextBox 4">
+                  <a:extLst>
+                    <a:ext uri="{FF2B5EF4-FFF2-40B4-BE49-F238E27FC236}">
+                      <a16:creationId xmlns:a16="http://schemas.microsoft.com/office/drawing/2014/main" id="{6F6840EA-DA06-EDE4-48C8-F139FC8BED3E}"/>
+                    </a:ext>
+                  </a:extLst>
+                </p:cNvPr>
+                <p:cNvSpPr txBox="1"/>
+                <p:nvPr/>
+              </p:nvSpPr>
+              <p:spPr>
+                <a:xfrm>
+                  <a:off x="9673389" y="3291840"/>
+                  <a:ext cx="760396" cy="376081"/>
+                </a:xfrm>
+                <a:prstGeom prst="rect">
+                  <a:avLst/>
+                </a:prstGeom>
+                <a:noFill/>
+              </p:spPr>
+              <p:txBody>
+                <a:bodyPr wrap="square" rtlCol="0">
+                  <a:spAutoFit/>
+                </a:bodyPr>
+                <a:lstStyle/>
+                <a:p>
+                  <a:pPr/>
+                  <a14:m>
+                    <m:oMathPara xmlns:m="http://schemas.openxmlformats.org/officeDocument/2006/math">
+                      <m:oMathParaPr>
+                        <m:jc m:val="centerGroup"/>
+                      </m:oMathParaPr>
+                      <m:oMath xmlns:m="http://schemas.openxmlformats.org/officeDocument/2006/math">
+                        <m:sSub>
+                          <m:sSubPr>
+                            <m:ctrlPr>
+                              <a:rPr lang="en-US" b="0" i="1" smtClean="0">
+                                <a:latin typeface="Cambria Math" panose="02040503050406030204" pitchFamily="18" charset="0"/>
+                              </a:rPr>
+                            </m:ctrlPr>
+                          </m:sSubPr>
+                          <m:e>
+                            <m:r>
+                              <a:rPr lang="en-US" b="0" i="1" smtClean="0">
+                                <a:latin typeface="Cambria Math" panose="02040503050406030204" pitchFamily="18" charset="0"/>
+                              </a:rPr>
+                              <m:t>h</m:t>
+                            </m:r>
+                          </m:e>
+                          <m:sub>
+                            <m:r>
+                              <a:rPr lang="en-US" b="0" i="1" smtClean="0">
+                                <a:latin typeface="Cambria Math" panose="02040503050406030204" pitchFamily="18" charset="0"/>
+                              </a:rPr>
+                              <m:t>0</m:t>
+                            </m:r>
+                          </m:sub>
+                        </m:sSub>
+                      </m:oMath>
+                    </m:oMathPara>
+                  </a14:m>
+                  <a:endParaRPr lang="en-US" dirty="0"/>
+                </a:p>
+              </p:txBody>
+            </p:sp>
+          </mc:Choice>
+          <mc:Fallback xmlns="">
+            <p:sp>
+              <p:nvSpPr>
+                <p:cNvPr id="5" name="TextBox 4">
+                  <a:extLst>
+                    <a:ext uri="{FF2B5EF4-FFF2-40B4-BE49-F238E27FC236}">
+                      <a16:creationId xmlns:a16="http://schemas.microsoft.com/office/drawing/2014/main" id="{6F6840EA-DA06-EDE4-48C8-F139FC8BED3E}"/>
+                    </a:ext>
+                  </a:extLst>
+                </p:cNvPr>
+                <p:cNvSpPr txBox="1">
+                  <a:spLocks noRot="1" noChangeAspect="1" noMove="1" noResize="1" noEditPoints="1" noAdjustHandles="1" noChangeArrowheads="1" noChangeShapeType="1" noTextEdit="1"/>
+                </p:cNvSpPr>
+                <p:nvPr/>
+              </p:nvSpPr>
+              <p:spPr>
+                <a:xfrm>
+                  <a:off x="9673389" y="3291840"/>
+                  <a:ext cx="760396" cy="376081"/>
+                </a:xfrm>
+                <a:prstGeom prst="rect">
+                  <a:avLst/>
+                </a:prstGeom>
+                <a:blipFill>
+                  <a:blip r:embed="rId3"/>
+                  <a:stretch>
+                    <a:fillRect/>
+                  </a:stretch>
+                </a:blipFill>
+              </p:spPr>
+              <p:txBody>
+                <a:bodyPr/>
+                <a:lstStyle/>
+                <a:p>
+                  <a:r>
+                    <a:rPr lang="en-US">
+                      <a:noFill/>
+                    </a:rPr>
+                    <a:t> </a:t>
+                  </a:r>
+                </a:p>
+              </p:txBody>
+            </p:sp>
+          </mc:Fallback>
+        </mc:AlternateContent>
+        <mc:AlternateContent xmlns:mc="http://schemas.openxmlformats.org/markup-compatibility/2006" xmlns:a14="http://schemas.microsoft.com/office/drawing/2010/main">
+          <mc:Choice Requires="a14">
+            <p:sp>
+              <p:nvSpPr>
+                <p:cNvPr id="6" name="TextBox 5">
+                  <a:extLst>
+                    <a:ext uri="{FF2B5EF4-FFF2-40B4-BE49-F238E27FC236}">
+                      <a16:creationId xmlns:a16="http://schemas.microsoft.com/office/drawing/2014/main" id="{1C4C05E4-02E8-E651-0458-002675FDC7DF}"/>
+                    </a:ext>
+                  </a:extLst>
+                </p:cNvPr>
+                <p:cNvSpPr txBox="1"/>
+                <p:nvPr/>
+              </p:nvSpPr>
+              <p:spPr>
+                <a:xfrm>
+                  <a:off x="9654139" y="1488347"/>
+                  <a:ext cx="731520" cy="369332"/>
+                </a:xfrm>
+                <a:prstGeom prst="rect">
+                  <a:avLst/>
+                </a:prstGeom>
+                <a:noFill/>
+              </p:spPr>
+              <p:txBody>
+                <a:bodyPr wrap="square" rtlCol="0">
+                  <a:spAutoFit/>
+                </a:bodyPr>
+                <a:lstStyle/>
+                <a:p>
+                  <a:pPr/>
+                  <a14:m>
+                    <m:oMathPara xmlns:m="http://schemas.openxmlformats.org/officeDocument/2006/math">
+                      <m:oMathParaPr>
+                        <m:jc m:val="centerGroup"/>
+                      </m:oMathParaPr>
+                      <m:oMath xmlns:m="http://schemas.openxmlformats.org/officeDocument/2006/math">
+                        <m:sSub>
+                          <m:sSubPr>
+                            <m:ctrlPr>
+                              <a:rPr lang="en-US" b="0" i="1" smtClean="0">
+                                <a:latin typeface="Cambria Math" panose="02040503050406030204" pitchFamily="18" charset="0"/>
+                              </a:rPr>
+                            </m:ctrlPr>
+                          </m:sSubPr>
+                          <m:e>
+                            <m:r>
+                              <a:rPr lang="en-US" b="0" i="1" smtClean="0">
+                                <a:latin typeface="Cambria Math" panose="02040503050406030204" pitchFamily="18" charset="0"/>
+                              </a:rPr>
+                              <m:t>h</m:t>
+                            </m:r>
+                          </m:e>
+                          <m:sub>
+                            <m:r>
+                              <a:rPr lang="en-US" b="0" i="1" smtClean="0">
+                                <a:latin typeface="Cambria Math" panose="02040503050406030204" pitchFamily="18" charset="0"/>
+                              </a:rPr>
+                              <m:t>1</m:t>
+                            </m:r>
+                          </m:sub>
+                        </m:sSub>
+                      </m:oMath>
+                    </m:oMathPara>
+                  </a14:m>
+                  <a:endParaRPr lang="en-US" dirty="0"/>
+                </a:p>
+              </p:txBody>
+            </p:sp>
+          </mc:Choice>
+          <mc:Fallback xmlns="">
+            <p:sp>
+              <p:nvSpPr>
+                <p:cNvPr id="6" name="TextBox 5">
+                  <a:extLst>
+                    <a:ext uri="{FF2B5EF4-FFF2-40B4-BE49-F238E27FC236}">
+                      <a16:creationId xmlns:a16="http://schemas.microsoft.com/office/drawing/2014/main" id="{1C4C05E4-02E8-E651-0458-002675FDC7DF}"/>
+                    </a:ext>
+                  </a:extLst>
+                </p:cNvPr>
+                <p:cNvSpPr txBox="1">
+                  <a:spLocks noRot="1" noChangeAspect="1" noMove="1" noResize="1" noEditPoints="1" noAdjustHandles="1" noChangeArrowheads="1" noChangeShapeType="1" noTextEdit="1"/>
+                </p:cNvSpPr>
+                <p:nvPr/>
+              </p:nvSpPr>
+              <p:spPr>
+                <a:xfrm>
+                  <a:off x="9654139" y="1488347"/>
+                  <a:ext cx="731520" cy="369332"/>
+                </a:xfrm>
+                <a:prstGeom prst="rect">
+                  <a:avLst/>
+                </a:prstGeom>
+                <a:blipFill>
+                  <a:blip r:embed="rId4"/>
+                  <a:stretch>
+                    <a:fillRect/>
+                  </a:stretch>
+                </a:blipFill>
+              </p:spPr>
+              <p:txBody>
+                <a:bodyPr/>
+                <a:lstStyle/>
+                <a:p>
+                  <a:r>
+                    <a:rPr lang="en-US">
+                      <a:noFill/>
+                    </a:rPr>
+                    <a:t> </a:t>
+                  </a:r>
+                </a:p>
+              </p:txBody>
+            </p:sp>
+          </mc:Fallback>
+        </mc:AlternateContent>
+        <p:sp>
+          <p:nvSpPr>
+            <p:cNvPr id="7" name="Right Brace 6">
+              <a:extLst>
+                <a:ext uri="{FF2B5EF4-FFF2-40B4-BE49-F238E27FC236}">
+                  <a16:creationId xmlns:a16="http://schemas.microsoft.com/office/drawing/2014/main" id="{BEAB417E-400F-BCD9-5D86-9A04E0F3D0D6}"/>
+                </a:ext>
+              </a:extLst>
+            </p:cNvPr>
+            <p:cNvSpPr/>
+            <p:nvPr/>
+          </p:nvSpPr>
+          <p:spPr>
+            <a:xfrm>
+              <a:off x="9577135" y="1292663"/>
+              <a:ext cx="221383" cy="780492"/>
+            </a:xfrm>
+            <a:prstGeom prst="rightBrace">
+              <a:avLst>
+                <a:gd name="adj1" fmla="val 68333"/>
+                <a:gd name="adj2" fmla="val 50000"/>
+              </a:avLst>
+            </a:prstGeom>
+          </p:spPr>
+          <p:style>
+            <a:lnRef idx="1">
+              <a:schemeClr val="accent1"/>
+            </a:lnRef>
+            <a:fillRef idx="0">
+              <a:schemeClr val="accent1"/>
+            </a:fillRef>
+            <a:effectRef idx="0">
+              <a:schemeClr val="accent1"/>
+            </a:effectRef>
+            <a:fontRef idx="minor">
+              <a:schemeClr val="tx1"/>
+            </a:fontRef>
+          </p:style>
+          <p:txBody>
+            <a:bodyPr rtlCol="0" anchor="ctr"/>
+            <a:lstStyle/>
+            <a:p>
+              <a:pPr algn="ctr"/>
+              <a:endParaRPr lang="en-US"/>
+            </a:p>
+          </p:txBody>
+        </p:sp>
+        <p:sp>
+          <p:nvSpPr>
+            <p:cNvPr id="9" name="Left Brace 8">
+              <a:extLst>
+                <a:ext uri="{FF2B5EF4-FFF2-40B4-BE49-F238E27FC236}">
+                  <a16:creationId xmlns:a16="http://schemas.microsoft.com/office/drawing/2014/main" id="{4B527C64-B383-9BC3-3DF3-34ED32C81721}"/>
+                </a:ext>
+              </a:extLst>
+            </p:cNvPr>
+            <p:cNvSpPr/>
+            <p:nvPr/>
+          </p:nvSpPr>
+          <p:spPr>
+            <a:xfrm rot="16200000">
+              <a:off x="8500697" y="4756466"/>
+              <a:ext cx="180004" cy="394340"/>
+            </a:xfrm>
+            <a:prstGeom prst="leftBrace">
+              <a:avLst>
+                <a:gd name="adj1" fmla="val 38993"/>
+                <a:gd name="adj2" fmla="val 50000"/>
+              </a:avLst>
+            </a:prstGeom>
+          </p:spPr>
+          <p:style>
+            <a:lnRef idx="2">
+              <a:schemeClr val="dk1"/>
+            </a:lnRef>
+            <a:fillRef idx="0">
+              <a:schemeClr val="dk1"/>
+            </a:fillRef>
+            <a:effectRef idx="1">
+              <a:schemeClr val="dk1"/>
+            </a:effectRef>
+            <a:fontRef idx="minor">
+              <a:schemeClr val="tx1"/>
+            </a:fontRef>
+          </p:style>
+          <p:txBody>
+            <a:bodyPr rtlCol="0" anchor="ctr"/>
+            <a:lstStyle/>
+            <a:p>
+              <a:pPr algn="ctr"/>
+              <a:endParaRPr lang="en-US"/>
+            </a:p>
+          </p:txBody>
+        </p:sp>
+        <mc:AlternateContent xmlns:mc="http://schemas.openxmlformats.org/markup-compatibility/2006" xmlns:a14="http://schemas.microsoft.com/office/drawing/2010/main">
+          <mc:Choice Requires="a14">
+            <p:sp>
+              <p:nvSpPr>
+                <p:cNvPr id="10" name="TextBox 9">
+                  <a:extLst>
+                    <a:ext uri="{FF2B5EF4-FFF2-40B4-BE49-F238E27FC236}">
+                      <a16:creationId xmlns:a16="http://schemas.microsoft.com/office/drawing/2014/main" id="{3C9417CA-BAF7-CA30-6997-019F74FFC965}"/>
+                    </a:ext>
+                  </a:extLst>
+                </p:cNvPr>
+                <p:cNvSpPr txBox="1"/>
+                <p:nvPr/>
+              </p:nvSpPr>
+              <p:spPr>
+                <a:xfrm>
+                  <a:off x="8295372" y="5043638"/>
+                  <a:ext cx="760396" cy="376081"/>
+                </a:xfrm>
+                <a:prstGeom prst="rect">
+                  <a:avLst/>
+                </a:prstGeom>
+                <a:noFill/>
+              </p:spPr>
+              <p:txBody>
+                <a:bodyPr wrap="square" rtlCol="0">
+                  <a:spAutoFit/>
+                </a:bodyPr>
+                <a:lstStyle/>
+                <a:p>
+                  <a:pPr/>
+                  <a14:m>
+                    <m:oMathPara xmlns:m="http://schemas.openxmlformats.org/officeDocument/2006/math">
+                      <m:oMathParaPr>
+                        <m:jc m:val="centerGroup"/>
+                      </m:oMathParaPr>
+                      <m:oMath xmlns:m="http://schemas.openxmlformats.org/officeDocument/2006/math">
+                        <m:sSub>
+                          <m:sSubPr>
+                            <m:ctrlPr>
+                              <a:rPr lang="en-US" b="0" i="1" smtClean="0">
+                                <a:latin typeface="Cambria Math" panose="02040503050406030204" pitchFamily="18" charset="0"/>
+                              </a:rPr>
+                            </m:ctrlPr>
+                          </m:sSubPr>
+                          <m:e>
+                            <m:r>
+                              <a:rPr lang="en-US" b="0" i="1" smtClean="0">
+                                <a:latin typeface="Cambria Math" panose="02040503050406030204" pitchFamily="18" charset="0"/>
+                              </a:rPr>
+                              <m:t>𝑅</m:t>
+                            </m:r>
+                          </m:e>
+                          <m:sub>
+                            <m:r>
+                              <a:rPr lang="en-US" b="0" i="1" smtClean="0">
+                                <a:latin typeface="Cambria Math" panose="02040503050406030204" pitchFamily="18" charset="0"/>
+                              </a:rPr>
+                              <m:t>0</m:t>
+                            </m:r>
+                          </m:sub>
+                        </m:sSub>
+                      </m:oMath>
+                    </m:oMathPara>
+                  </a14:m>
+                  <a:endParaRPr lang="en-US" dirty="0"/>
+                </a:p>
+              </p:txBody>
+            </p:sp>
+          </mc:Choice>
+          <mc:Fallback xmlns="">
+            <p:sp>
+              <p:nvSpPr>
+                <p:cNvPr id="10" name="TextBox 9">
+                  <a:extLst>
+                    <a:ext uri="{FF2B5EF4-FFF2-40B4-BE49-F238E27FC236}">
+                      <a16:creationId xmlns:a16="http://schemas.microsoft.com/office/drawing/2014/main" id="{3C9417CA-BAF7-CA30-6997-019F74FFC965}"/>
+                    </a:ext>
+                  </a:extLst>
+                </p:cNvPr>
+                <p:cNvSpPr txBox="1">
+                  <a:spLocks noRot="1" noChangeAspect="1" noMove="1" noResize="1" noEditPoints="1" noAdjustHandles="1" noChangeArrowheads="1" noChangeShapeType="1" noTextEdit="1"/>
+                </p:cNvSpPr>
+                <p:nvPr/>
+              </p:nvSpPr>
+              <p:spPr>
+                <a:xfrm>
+                  <a:off x="8295372" y="5043638"/>
+                  <a:ext cx="760396" cy="376081"/>
+                </a:xfrm>
+                <a:prstGeom prst="rect">
+                  <a:avLst/>
+                </a:prstGeom>
+                <a:blipFill>
+                  <a:blip r:embed="rId5"/>
+                  <a:stretch>
+                    <a:fillRect/>
+                  </a:stretch>
+                </a:blipFill>
+              </p:spPr>
+              <p:txBody>
+                <a:bodyPr/>
+                <a:lstStyle/>
+                <a:p>
+                  <a:r>
+                    <a:rPr lang="en-US">
+                      <a:noFill/>
+                    </a:rPr>
+                    <a:t> </a:t>
+                  </a:r>
+                </a:p>
+              </p:txBody>
+            </p:sp>
+          </mc:Fallback>
+        </mc:AlternateContent>
+        <p:sp>
+          <p:nvSpPr>
+            <p:cNvPr id="11" name="Left Brace 10">
+              <a:extLst>
+                <a:ext uri="{FF2B5EF4-FFF2-40B4-BE49-F238E27FC236}">
+                  <a16:creationId xmlns:a16="http://schemas.microsoft.com/office/drawing/2014/main" id="{9C250271-A7A6-1F13-E64C-F85F55970FC2}"/>
+                </a:ext>
+              </a:extLst>
+            </p:cNvPr>
+            <p:cNvSpPr/>
+            <p:nvPr/>
+          </p:nvSpPr>
+          <p:spPr>
+            <a:xfrm rot="16200000">
+              <a:off x="8334339" y="1833663"/>
+              <a:ext cx="165913" cy="741145"/>
+            </a:xfrm>
+            <a:prstGeom prst="leftBrace">
+              <a:avLst>
+                <a:gd name="adj1" fmla="val 58271"/>
+                <a:gd name="adj2" fmla="val 50000"/>
+              </a:avLst>
+            </a:prstGeom>
+          </p:spPr>
+          <p:style>
+            <a:lnRef idx="2">
+              <a:schemeClr val="dk1"/>
+            </a:lnRef>
+            <a:fillRef idx="0">
+              <a:schemeClr val="dk1"/>
+            </a:fillRef>
+            <a:effectRef idx="1">
+              <a:schemeClr val="dk1"/>
+            </a:effectRef>
+            <a:fontRef idx="minor">
+              <a:schemeClr val="tx1"/>
+            </a:fontRef>
+          </p:style>
+          <p:txBody>
+            <a:bodyPr rtlCol="0" anchor="ctr"/>
+            <a:lstStyle/>
+            <a:p>
+              <a:pPr algn="ctr"/>
+              <a:endParaRPr lang="en-US"/>
+            </a:p>
+          </p:txBody>
+        </p:sp>
+        <mc:AlternateContent xmlns:mc="http://schemas.openxmlformats.org/markup-compatibility/2006" xmlns:a14="http://schemas.microsoft.com/office/drawing/2010/main">
+          <mc:Choice Requires="a14">
+            <p:sp>
+              <p:nvSpPr>
+                <p:cNvPr id="12" name="TextBox 11">
+                  <a:extLst>
+                    <a:ext uri="{FF2B5EF4-FFF2-40B4-BE49-F238E27FC236}">
+                      <a16:creationId xmlns:a16="http://schemas.microsoft.com/office/drawing/2014/main" id="{DF54454F-48FD-1D29-4443-07029C2F3F02}"/>
+                    </a:ext>
+                  </a:extLst>
+                </p:cNvPr>
+                <p:cNvSpPr txBox="1"/>
+                <p:nvPr/>
+              </p:nvSpPr>
+              <p:spPr>
+                <a:xfrm>
+                  <a:off x="8109283" y="2287193"/>
+                  <a:ext cx="760396" cy="376081"/>
+                </a:xfrm>
+                <a:prstGeom prst="rect">
+                  <a:avLst/>
+                </a:prstGeom>
+                <a:noFill/>
+              </p:spPr>
+              <p:txBody>
+                <a:bodyPr wrap="square" rtlCol="0">
+                  <a:spAutoFit/>
+                </a:bodyPr>
+                <a:lstStyle/>
+                <a:p>
+                  <a:pPr/>
+                  <a14:m>
+                    <m:oMathPara xmlns:m="http://schemas.openxmlformats.org/officeDocument/2006/math">
+                      <m:oMathParaPr>
+                        <m:jc m:val="centerGroup"/>
+                      </m:oMathParaPr>
+                      <m:oMath xmlns:m="http://schemas.openxmlformats.org/officeDocument/2006/math">
+                        <m:sSub>
+                          <m:sSubPr>
+                            <m:ctrlPr>
+                              <a:rPr lang="en-US" b="0" i="1" smtClean="0">
+                                <a:latin typeface="Cambria Math" panose="02040503050406030204" pitchFamily="18" charset="0"/>
+                              </a:rPr>
+                            </m:ctrlPr>
+                          </m:sSubPr>
+                          <m:e>
+                            <m:r>
+                              <a:rPr lang="en-US" b="0" i="1" smtClean="0">
+                                <a:latin typeface="Cambria Math" panose="02040503050406030204" pitchFamily="18" charset="0"/>
+                              </a:rPr>
+                              <m:t>𝑅</m:t>
+                            </m:r>
+                          </m:e>
+                          <m:sub>
+                            <m:r>
+                              <a:rPr lang="en-US" b="0" i="1" smtClean="0">
+                                <a:latin typeface="Cambria Math" panose="02040503050406030204" pitchFamily="18" charset="0"/>
+                              </a:rPr>
+                              <m:t>1</m:t>
+                            </m:r>
+                          </m:sub>
+                        </m:sSub>
+                      </m:oMath>
+                    </m:oMathPara>
+                  </a14:m>
+                  <a:endParaRPr lang="en-US" dirty="0"/>
+                </a:p>
+              </p:txBody>
+            </p:sp>
+          </mc:Choice>
+          <mc:Fallback xmlns="">
+            <p:sp>
+              <p:nvSpPr>
+                <p:cNvPr id="12" name="TextBox 11">
+                  <a:extLst>
+                    <a:ext uri="{FF2B5EF4-FFF2-40B4-BE49-F238E27FC236}">
+                      <a16:creationId xmlns:a16="http://schemas.microsoft.com/office/drawing/2014/main" id="{DF54454F-48FD-1D29-4443-07029C2F3F02}"/>
+                    </a:ext>
+                  </a:extLst>
+                </p:cNvPr>
+                <p:cNvSpPr txBox="1">
+                  <a:spLocks noRot="1" noChangeAspect="1" noMove="1" noResize="1" noEditPoints="1" noAdjustHandles="1" noChangeArrowheads="1" noChangeShapeType="1" noTextEdit="1"/>
+                </p:cNvSpPr>
+                <p:nvPr/>
+              </p:nvSpPr>
+              <p:spPr>
+                <a:xfrm>
+                  <a:off x="8109283" y="2287193"/>
+                  <a:ext cx="760396" cy="376081"/>
+                </a:xfrm>
+                <a:prstGeom prst="rect">
+                  <a:avLst/>
+                </a:prstGeom>
+                <a:blipFill>
+                  <a:blip r:embed="rId6"/>
+                  <a:stretch>
+                    <a:fillRect/>
+                  </a:stretch>
+                </a:blipFill>
+              </p:spPr>
+              <p:txBody>
+                <a:bodyPr/>
+                <a:lstStyle/>
+                <a:p>
+                  <a:r>
+                    <a:rPr lang="en-US">
+                      <a:noFill/>
+                    </a:rPr>
+                    <a:t> </a:t>
+                  </a:r>
+                </a:p>
+              </p:txBody>
+            </p:sp>
+          </mc:Fallback>
+        </mc:AlternateContent>
+      </p:grpSp>
+    </p:spTree>
+    <p:extLst>
+      <p:ext uri="{BB962C8B-B14F-4D97-AF65-F5344CB8AC3E}">
+        <p14:creationId xmlns:p14="http://schemas.microsoft.com/office/powerpoint/2010/main" val="2043714517"/>
       </p:ext>
     </p:extLst>
   </p:cSld>

</xml_diff>

<commit_message>
implement core quantity recycling
</commit_message>
<xml_diff>
--- a/doc/illustrations.pptx
+++ b/doc/illustrations.pptx
@@ -25,6 +25,10 @@
     <p:sldId id="273" r:id="rId19"/>
     <p:sldId id="274" r:id="rId20"/>
     <p:sldId id="275" r:id="rId21"/>
+    <p:sldId id="276" r:id="rId22"/>
+    <p:sldId id="277" r:id="rId23"/>
+    <p:sldId id="278" r:id="rId24"/>
+    <p:sldId id="279" r:id="rId25"/>
   </p:sldIdLst>
   <p:sldSz cx="12192000" cy="6858000"/>
   <p:notesSz cx="6858000" cy="9144000"/>
@@ -6864,7 +6868,7 @@
           <a:p>
             <a:fld id="{82BB0895-06E8-4B53-88C8-0F0562CFD945}" type="datetimeFigureOut">
               <a:rPr lang="en-US" smtClean="0"/>
-              <a:t>5/15/2022</a:t>
+              <a:t>5/27/2022</a:t>
             </a:fld>
             <a:endParaRPr lang="en-US"/>
           </a:p>
@@ -7034,7 +7038,7 @@
           <a:p>
             <a:fld id="{82BB0895-06E8-4B53-88C8-0F0562CFD945}" type="datetimeFigureOut">
               <a:rPr lang="en-US" smtClean="0"/>
-              <a:t>5/15/2022</a:t>
+              <a:t>5/27/2022</a:t>
             </a:fld>
             <a:endParaRPr lang="en-US"/>
           </a:p>
@@ -7214,7 +7218,7 @@
           <a:p>
             <a:fld id="{82BB0895-06E8-4B53-88C8-0F0562CFD945}" type="datetimeFigureOut">
               <a:rPr lang="en-US" smtClean="0"/>
-              <a:t>5/15/2022</a:t>
+              <a:t>5/27/2022</a:t>
             </a:fld>
             <a:endParaRPr lang="en-US"/>
           </a:p>
@@ -7384,7 +7388,7 @@
           <a:p>
             <a:fld id="{82BB0895-06E8-4B53-88C8-0F0562CFD945}" type="datetimeFigureOut">
               <a:rPr lang="en-US" smtClean="0"/>
-              <a:t>5/15/2022</a:t>
+              <a:t>5/27/2022</a:t>
             </a:fld>
             <a:endParaRPr lang="en-US"/>
           </a:p>
@@ -7630,7 +7634,7 @@
           <a:p>
             <a:fld id="{82BB0895-06E8-4B53-88C8-0F0562CFD945}" type="datetimeFigureOut">
               <a:rPr lang="en-US" smtClean="0"/>
-              <a:t>5/15/2022</a:t>
+              <a:t>5/27/2022</a:t>
             </a:fld>
             <a:endParaRPr lang="en-US"/>
           </a:p>
@@ -7862,7 +7866,7 @@
           <a:p>
             <a:fld id="{82BB0895-06E8-4B53-88C8-0F0562CFD945}" type="datetimeFigureOut">
               <a:rPr lang="en-US" smtClean="0"/>
-              <a:t>5/15/2022</a:t>
+              <a:t>5/27/2022</a:t>
             </a:fld>
             <a:endParaRPr lang="en-US"/>
           </a:p>
@@ -8229,7 +8233,7 @@
           <a:p>
             <a:fld id="{82BB0895-06E8-4B53-88C8-0F0562CFD945}" type="datetimeFigureOut">
               <a:rPr lang="en-US" smtClean="0"/>
-              <a:t>5/15/2022</a:t>
+              <a:t>5/27/2022</a:t>
             </a:fld>
             <a:endParaRPr lang="en-US"/>
           </a:p>
@@ -8347,7 +8351,7 @@
           <a:p>
             <a:fld id="{82BB0895-06E8-4B53-88C8-0F0562CFD945}" type="datetimeFigureOut">
               <a:rPr lang="en-US" smtClean="0"/>
-              <a:t>5/15/2022</a:t>
+              <a:t>5/27/2022</a:t>
             </a:fld>
             <a:endParaRPr lang="en-US"/>
           </a:p>
@@ -8442,7 +8446,7 @@
           <a:p>
             <a:fld id="{82BB0895-06E8-4B53-88C8-0F0562CFD945}" type="datetimeFigureOut">
               <a:rPr lang="en-US" smtClean="0"/>
-              <a:t>5/15/2022</a:t>
+              <a:t>5/27/2022</a:t>
             </a:fld>
             <a:endParaRPr lang="en-US"/>
           </a:p>
@@ -8719,7 +8723,7 @@
           <a:p>
             <a:fld id="{82BB0895-06E8-4B53-88C8-0F0562CFD945}" type="datetimeFigureOut">
               <a:rPr lang="en-US" smtClean="0"/>
-              <a:t>5/15/2022</a:t>
+              <a:t>5/27/2022</a:t>
             </a:fld>
             <a:endParaRPr lang="en-US"/>
           </a:p>
@@ -8976,7 +8980,7 @@
           <a:p>
             <a:fld id="{82BB0895-06E8-4B53-88C8-0F0562CFD945}" type="datetimeFigureOut">
               <a:rPr lang="en-US" smtClean="0"/>
-              <a:t>5/15/2022</a:t>
+              <a:t>5/27/2022</a:t>
             </a:fld>
             <a:endParaRPr lang="en-US"/>
           </a:p>
@@ -9189,7 +9193,7 @@
           <a:p>
             <a:fld id="{82BB0895-06E8-4B53-88C8-0F0562CFD945}" type="datetimeFigureOut">
               <a:rPr lang="en-US" smtClean="0"/>
-              <a:t>5/15/2022</a:t>
+              <a:t>5/27/2022</a:t>
             </a:fld>
             <a:endParaRPr lang="en-US"/>
           </a:p>
@@ -16931,822 +16935,12 @@
           <a:chExt cx="0" cy="0"/>
         </a:xfrm>
       </p:grpSpPr>
-      <mc:AlternateContent xmlns:mc="http://schemas.openxmlformats.org/markup-compatibility/2006" xmlns:a14="http://schemas.microsoft.com/office/drawing/2010/main">
-        <mc:Choice Requires="a14">
-          <p:sp>
-            <p:nvSpPr>
-              <p:cNvPr id="2" name="TextBox 1">
-                <a:extLst>
-                  <a:ext uri="{FF2B5EF4-FFF2-40B4-BE49-F238E27FC236}">
-                    <a16:creationId xmlns:a16="http://schemas.microsoft.com/office/drawing/2014/main" id="{5AD1CE97-ADDC-00B1-344A-51AD917AAC14}"/>
-                  </a:ext>
-                </a:extLst>
-              </p:cNvPr>
-              <p:cNvSpPr txBox="1"/>
-              <p:nvPr/>
-            </p:nvSpPr>
-            <p:spPr>
-              <a:xfrm>
-                <a:off x="855901" y="709863"/>
-                <a:ext cx="7494815" cy="1060483"/>
-              </a:xfrm>
-              <a:prstGeom prst="rect">
-                <a:avLst/>
-              </a:prstGeom>
-              <a:noFill/>
-            </p:spPr>
-            <p:txBody>
-              <a:bodyPr wrap="square" rtlCol="0">
-                <a:spAutoFit/>
-              </a:bodyPr>
-              <a:lstStyle/>
-              <a:p>
-                <a:pPr/>
-                <a14:m>
-                  <m:oMathPara xmlns:m="http://schemas.openxmlformats.org/officeDocument/2006/math">
-                    <m:oMathParaPr>
-                      <m:jc m:val="left"/>
-                    </m:oMathParaPr>
-                    <m:oMath xmlns:m="http://schemas.openxmlformats.org/officeDocument/2006/math">
-                      <m:r>
-                        <a:rPr lang="en-US" sz="2800" b="0" i="1" smtClean="0">
-                          <a:latin typeface="Cambria Math" panose="02040503050406030204" pitchFamily="18" charset="0"/>
-                        </a:rPr>
-                        <m:t>𝑟</m:t>
-                      </m:r>
-                      <m:r>
-                        <a:rPr lang="en-US" sz="2800" b="0" i="1" smtClean="0">
-                          <a:latin typeface="Cambria Math" panose="02040503050406030204" pitchFamily="18" charset="0"/>
-                        </a:rPr>
-                        <m:t>=</m:t>
-                      </m:r>
-                      <m:d>
-                        <m:dPr>
-                          <m:begChr m:val="|"/>
-                          <m:endChr m:val="|"/>
-                          <m:ctrlPr>
-                            <a:rPr lang="en-US" sz="2800" b="0" i="1" smtClean="0">
-                              <a:latin typeface="Cambria Math" panose="02040503050406030204" pitchFamily="18" charset="0"/>
-                            </a:rPr>
-                          </m:ctrlPr>
-                        </m:dPr>
-                        <m:e>
-                          <m:acc>
-                            <m:accPr>
-                              <m:chr m:val="⃗"/>
-                              <m:ctrlPr>
-                                <a:rPr lang="en-US" sz="2800" b="0" i="1" smtClean="0">
-                                  <a:latin typeface="Cambria Math" panose="02040503050406030204" pitchFamily="18" charset="0"/>
-                                </a:rPr>
-                              </m:ctrlPr>
-                            </m:accPr>
-                            <m:e>
-                              <m:r>
-                                <a:rPr lang="en-US" sz="2800" b="0" i="1" smtClean="0">
-                                  <a:latin typeface="Cambria Math" panose="02040503050406030204" pitchFamily="18" charset="0"/>
-                                </a:rPr>
-                                <m:t>𝑟</m:t>
-                              </m:r>
-                            </m:e>
-                          </m:acc>
-                        </m:e>
-                      </m:d>
-                      <m:r>
-                        <a:rPr lang="en-US" sz="2800" b="0" i="1" smtClean="0">
-                          <a:latin typeface="Cambria Math" panose="02040503050406030204" pitchFamily="18" charset="0"/>
-                        </a:rPr>
-                        <m:t>, </m:t>
-                      </m:r>
-                      <m:r>
-                        <a:rPr lang="en-US" sz="2800" b="0" i="1" smtClean="0">
-                          <a:latin typeface="Cambria Math" panose="02040503050406030204" pitchFamily="18" charset="0"/>
-                        </a:rPr>
-                        <m:t>𝜃</m:t>
-                      </m:r>
-                      <m:r>
-                        <a:rPr lang="en-US" sz="2800" b="0" i="1" smtClean="0">
-                          <a:latin typeface="Cambria Math" panose="02040503050406030204" pitchFamily="18" charset="0"/>
-                        </a:rPr>
-                        <m:t>=</m:t>
-                      </m:r>
-                      <m:sSup>
-                        <m:sSupPr>
-                          <m:ctrlPr>
-                            <a:rPr lang="en-US" sz="2800" b="0" i="1" smtClean="0">
-                              <a:latin typeface="Cambria Math" panose="02040503050406030204" pitchFamily="18" charset="0"/>
-                            </a:rPr>
-                          </m:ctrlPr>
-                        </m:sSupPr>
-                        <m:e>
-                          <m:r>
-                            <m:rPr>
-                              <m:sty m:val="p"/>
-                            </m:rPr>
-                            <a:rPr lang="en-US" sz="2800" b="0" i="0" smtClean="0">
-                              <a:latin typeface="Cambria Math" panose="02040503050406030204" pitchFamily="18" charset="0"/>
-                            </a:rPr>
-                            <m:t>tan</m:t>
-                          </m:r>
-                        </m:e>
-                        <m:sup>
-                          <m:r>
-                            <a:rPr lang="en-US" sz="2800" b="0" i="1" smtClean="0">
-                              <a:latin typeface="Cambria Math" panose="02040503050406030204" pitchFamily="18" charset="0"/>
-                            </a:rPr>
-                            <m:t>−1</m:t>
-                          </m:r>
-                        </m:sup>
-                      </m:sSup>
-                      <m:d>
-                        <m:dPr>
-                          <m:ctrlPr>
-                            <a:rPr lang="en-US" sz="2800" b="0" i="1" smtClean="0">
-                              <a:latin typeface="Cambria Math" panose="02040503050406030204" pitchFamily="18" charset="0"/>
-                            </a:rPr>
-                          </m:ctrlPr>
-                        </m:dPr>
-                        <m:e>
-                          <m:f>
-                            <m:fPr>
-                              <m:ctrlPr>
-                                <a:rPr lang="en-US" sz="2800" b="0" i="1" smtClean="0">
-                                  <a:latin typeface="Cambria Math" panose="02040503050406030204" pitchFamily="18" charset="0"/>
-                                </a:rPr>
-                              </m:ctrlPr>
-                            </m:fPr>
-                            <m:num>
-                              <m:sSub>
-                                <m:sSubPr>
-                                  <m:ctrlPr>
-                                    <a:rPr lang="en-US" sz="2800" b="0" i="1" smtClean="0">
-                                      <a:latin typeface="Cambria Math" panose="02040503050406030204" pitchFamily="18" charset="0"/>
-                                    </a:rPr>
-                                  </m:ctrlPr>
-                                </m:sSubPr>
-                                <m:e>
-                                  <m:r>
-                                    <a:rPr lang="en-US" sz="2800" b="0" i="1" smtClean="0">
-                                      <a:latin typeface="Cambria Math" panose="02040503050406030204" pitchFamily="18" charset="0"/>
-                                    </a:rPr>
-                                    <m:t>𝑟</m:t>
-                                  </m:r>
-                                </m:e>
-                                <m:sub>
-                                  <m:r>
-                                    <a:rPr lang="en-US" sz="2800" b="0" i="1" smtClean="0">
-                                      <a:latin typeface="Cambria Math" panose="02040503050406030204" pitchFamily="18" charset="0"/>
-                                    </a:rPr>
-                                    <m:t>𝑦</m:t>
-                                  </m:r>
-                                </m:sub>
-                              </m:sSub>
-                            </m:num>
-                            <m:den>
-                              <m:sSub>
-                                <m:sSubPr>
-                                  <m:ctrlPr>
-                                    <a:rPr lang="en-US" sz="2800" b="0" i="1" smtClean="0">
-                                      <a:latin typeface="Cambria Math" panose="02040503050406030204" pitchFamily="18" charset="0"/>
-                                    </a:rPr>
-                                  </m:ctrlPr>
-                                </m:sSubPr>
-                                <m:e>
-                                  <m:r>
-                                    <a:rPr lang="en-US" sz="2800" b="0" i="1" smtClean="0">
-                                      <a:latin typeface="Cambria Math" panose="02040503050406030204" pitchFamily="18" charset="0"/>
-                                    </a:rPr>
-                                    <m:t>𝑟</m:t>
-                                  </m:r>
-                                </m:e>
-                                <m:sub>
-                                  <m:r>
-                                    <a:rPr lang="en-US" sz="2800" b="0" i="1" smtClean="0">
-                                      <a:latin typeface="Cambria Math" panose="02040503050406030204" pitchFamily="18" charset="0"/>
-                                    </a:rPr>
-                                    <m:t>𝑥</m:t>
-                                  </m:r>
-                                </m:sub>
-                              </m:sSub>
-                            </m:den>
-                          </m:f>
-                        </m:e>
-                      </m:d>
-                      <m:r>
-                        <a:rPr lang="en-US" sz="2800" b="0" i="1" smtClean="0">
-                          <a:latin typeface="Cambria Math" panose="02040503050406030204" pitchFamily="18" charset="0"/>
-                        </a:rPr>
-                        <m:t>, </m:t>
-                      </m:r>
-                      <m:r>
-                        <a:rPr lang="en-US" sz="2800" b="0" i="1" smtClean="0">
-                          <a:latin typeface="Cambria Math" panose="02040503050406030204" pitchFamily="18" charset="0"/>
-                        </a:rPr>
-                        <m:t>𝜙</m:t>
-                      </m:r>
-                      <m:r>
-                        <a:rPr lang="en-US" sz="2800" b="0" i="1" smtClean="0">
-                          <a:latin typeface="Cambria Math" panose="02040503050406030204" pitchFamily="18" charset="0"/>
-                        </a:rPr>
-                        <m:t>=</m:t>
-                      </m:r>
-                      <m:func>
-                        <m:funcPr>
-                          <m:ctrlPr>
-                            <a:rPr lang="en-US" sz="2800" b="0" i="1" smtClean="0">
-                              <a:latin typeface="Cambria Math" panose="02040503050406030204" pitchFamily="18" charset="0"/>
-                            </a:rPr>
-                          </m:ctrlPr>
-                        </m:funcPr>
-                        <m:fName>
-                          <m:sSup>
-                            <m:sSupPr>
-                              <m:ctrlPr>
-                                <a:rPr lang="en-US" sz="2800" b="0" i="1" smtClean="0">
-                                  <a:latin typeface="Cambria Math" panose="02040503050406030204" pitchFamily="18" charset="0"/>
-                                </a:rPr>
-                              </m:ctrlPr>
-                            </m:sSupPr>
-                            <m:e>
-                              <m:r>
-                                <m:rPr>
-                                  <m:sty m:val="p"/>
-                                </m:rPr>
-                                <a:rPr lang="en-US" sz="2800" b="0" i="0" smtClean="0">
-                                  <a:latin typeface="Cambria Math" panose="02040503050406030204" pitchFamily="18" charset="0"/>
-                                </a:rPr>
-                                <m:t>cos</m:t>
-                              </m:r>
-                            </m:e>
-                            <m:sup>
-                              <m:r>
-                                <a:rPr lang="en-US" sz="2800" b="0" i="1" smtClean="0">
-                                  <a:latin typeface="Cambria Math" panose="02040503050406030204" pitchFamily="18" charset="0"/>
-                                </a:rPr>
-                                <m:t>−1</m:t>
-                              </m:r>
-                            </m:sup>
-                          </m:sSup>
-                        </m:fName>
-                        <m:e>
-                          <m:f>
-                            <m:fPr>
-                              <m:ctrlPr>
-                                <a:rPr lang="en-US" sz="2800" b="0" i="1" smtClean="0">
-                                  <a:latin typeface="Cambria Math" panose="02040503050406030204" pitchFamily="18" charset="0"/>
-                                </a:rPr>
-                              </m:ctrlPr>
-                            </m:fPr>
-                            <m:num>
-                              <m:sSub>
-                                <m:sSubPr>
-                                  <m:ctrlPr>
-                                    <a:rPr lang="en-US" sz="2800" b="0" i="1" smtClean="0">
-                                      <a:latin typeface="Cambria Math" panose="02040503050406030204" pitchFamily="18" charset="0"/>
-                                    </a:rPr>
-                                  </m:ctrlPr>
-                                </m:sSubPr>
-                                <m:e>
-                                  <m:r>
-                                    <a:rPr lang="en-US" sz="2800" b="0" i="1" smtClean="0">
-                                      <a:latin typeface="Cambria Math" panose="02040503050406030204" pitchFamily="18" charset="0"/>
-                                    </a:rPr>
-                                    <m:t>𝑟</m:t>
-                                  </m:r>
-                                </m:e>
-                                <m:sub>
-                                  <m:r>
-                                    <a:rPr lang="en-US" sz="2800" b="0" i="1" smtClean="0">
-                                      <a:latin typeface="Cambria Math" panose="02040503050406030204" pitchFamily="18" charset="0"/>
-                                    </a:rPr>
-                                    <m:t>𝑧</m:t>
-                                  </m:r>
-                                </m:sub>
-                              </m:sSub>
-                            </m:num>
-                            <m:den>
-                              <m:r>
-                                <a:rPr lang="en-US" sz="2800" b="0" i="1" smtClean="0">
-                                  <a:latin typeface="Cambria Math" panose="02040503050406030204" pitchFamily="18" charset="0"/>
-                                </a:rPr>
-                                <m:t>𝑟</m:t>
-                              </m:r>
-                            </m:den>
-                          </m:f>
-                        </m:e>
-                      </m:func>
-                    </m:oMath>
-                  </m:oMathPara>
-                </a14:m>
-                <a:endParaRPr lang="en-US" sz="2800" b="0" dirty="0"/>
-              </a:p>
-            </p:txBody>
-          </p:sp>
-        </mc:Choice>
-        <mc:Fallback xmlns="">
-          <p:sp>
-            <p:nvSpPr>
-              <p:cNvPr id="2" name="TextBox 1">
-                <a:extLst>
-                  <a:ext uri="{FF2B5EF4-FFF2-40B4-BE49-F238E27FC236}">
-                    <a16:creationId xmlns:a16="http://schemas.microsoft.com/office/drawing/2014/main" id="{5AD1CE97-ADDC-00B1-344A-51AD917AAC14}"/>
-                  </a:ext>
-                </a:extLst>
-              </p:cNvPr>
-              <p:cNvSpPr txBox="1">
-                <a:spLocks noRot="1" noChangeAspect="1" noMove="1" noResize="1" noEditPoints="1" noAdjustHandles="1" noChangeArrowheads="1" noChangeShapeType="1" noTextEdit="1"/>
-              </p:cNvSpPr>
-              <p:nvPr/>
-            </p:nvSpPr>
-            <p:spPr>
-              <a:xfrm>
-                <a:off x="855901" y="709863"/>
-                <a:ext cx="7494815" cy="1060483"/>
-              </a:xfrm>
-              <a:prstGeom prst="rect">
-                <a:avLst/>
-              </a:prstGeom>
-              <a:blipFill>
-                <a:blip r:embed="rId2"/>
-                <a:stretch>
-                  <a:fillRect/>
-                </a:stretch>
-              </a:blipFill>
-            </p:spPr>
-            <p:txBody>
-              <a:bodyPr/>
-              <a:lstStyle/>
-              <a:p>
-                <a:r>
-                  <a:rPr lang="en-US">
-                    <a:noFill/>
-                  </a:rPr>
-                  <a:t> </a:t>
-                </a:r>
-              </a:p>
-            </p:txBody>
-          </p:sp>
-        </mc:Fallback>
-      </mc:AlternateContent>
-      <mc:AlternateContent xmlns:mc="http://schemas.openxmlformats.org/markup-compatibility/2006" xmlns:a14="http://schemas.microsoft.com/office/drawing/2010/main">
-        <mc:Choice Requires="a14">
-          <p:sp>
-            <p:nvSpPr>
-              <p:cNvPr id="3" name="TextBox 2">
-                <a:extLst>
-                  <a:ext uri="{FF2B5EF4-FFF2-40B4-BE49-F238E27FC236}">
-                    <a16:creationId xmlns:a16="http://schemas.microsoft.com/office/drawing/2014/main" id="{E9AC7E2A-F8D0-70A0-FC7E-375C3DC4B50B}"/>
-                  </a:ext>
-                </a:extLst>
-              </p:cNvPr>
-              <p:cNvSpPr txBox="1"/>
-              <p:nvPr/>
-            </p:nvSpPr>
-            <p:spPr>
-              <a:xfrm>
-                <a:off x="855900" y="1770346"/>
-                <a:ext cx="7494815" cy="1422954"/>
-              </a:xfrm>
-              <a:prstGeom prst="rect">
-                <a:avLst/>
-              </a:prstGeom>
-              <a:noFill/>
-            </p:spPr>
-            <p:txBody>
-              <a:bodyPr wrap="square" rtlCol="0">
-                <a:spAutoFit/>
-              </a:bodyPr>
-              <a:lstStyle/>
-              <a:p>
-                <a:pPr/>
-                <a14:m>
-                  <m:oMathPara xmlns:m="http://schemas.openxmlformats.org/officeDocument/2006/math">
-                    <m:oMathParaPr>
-                      <m:jc m:val="left"/>
-                    </m:oMathParaPr>
-                    <m:oMath xmlns:m="http://schemas.openxmlformats.org/officeDocument/2006/math">
-                      <m:acc>
-                        <m:accPr>
-                          <m:chr m:val="̂"/>
-                          <m:ctrlPr>
-                            <a:rPr lang="en-US" sz="2800" b="0" i="1" smtClean="0">
-                              <a:latin typeface="Cambria Math" panose="02040503050406030204" pitchFamily="18" charset="0"/>
-                            </a:rPr>
-                          </m:ctrlPr>
-                        </m:accPr>
-                        <m:e>
-                          <m:r>
-                            <a:rPr lang="en-US" sz="2800" b="0" i="1" smtClean="0">
-                              <a:latin typeface="Cambria Math" panose="02040503050406030204" pitchFamily="18" charset="0"/>
-                            </a:rPr>
-                            <m:t>𝑟</m:t>
-                          </m:r>
-                        </m:e>
-                      </m:acc>
-                      <m:r>
-                        <a:rPr lang="en-US" sz="2800" b="0" i="1" smtClean="0">
-                          <a:latin typeface="Cambria Math" panose="02040503050406030204" pitchFamily="18" charset="0"/>
-                        </a:rPr>
-                        <m:t>=</m:t>
-                      </m:r>
-                      <m:f>
-                        <m:fPr>
-                          <m:ctrlPr>
-                            <a:rPr lang="en-US" sz="2800" b="0" i="1" smtClean="0">
-                              <a:latin typeface="Cambria Math" panose="02040503050406030204" pitchFamily="18" charset="0"/>
-                            </a:rPr>
-                          </m:ctrlPr>
-                        </m:fPr>
-                        <m:num>
-                          <m:acc>
-                            <m:accPr>
-                              <m:chr m:val="⃗"/>
-                              <m:ctrlPr>
-                                <a:rPr lang="en-US" sz="2800" b="0" i="1" smtClean="0">
-                                  <a:latin typeface="Cambria Math" panose="02040503050406030204" pitchFamily="18" charset="0"/>
-                                </a:rPr>
-                              </m:ctrlPr>
-                            </m:accPr>
-                            <m:e>
-                              <m:r>
-                                <a:rPr lang="en-US" sz="2800" b="0" i="1" smtClean="0">
-                                  <a:latin typeface="Cambria Math" panose="02040503050406030204" pitchFamily="18" charset="0"/>
-                                </a:rPr>
-                                <m:t>𝑟</m:t>
-                              </m:r>
-                            </m:e>
-                          </m:acc>
-                        </m:num>
-                        <m:den>
-                          <m:r>
-                            <a:rPr lang="en-US" sz="2800" b="0" i="1" smtClean="0">
-                              <a:latin typeface="Cambria Math" panose="02040503050406030204" pitchFamily="18" charset="0"/>
-                            </a:rPr>
-                            <m:t>𝑟</m:t>
-                          </m:r>
-                        </m:den>
-                      </m:f>
-                      <m:r>
-                        <a:rPr lang="en-US" sz="2800" b="0" i="1" smtClean="0">
-                          <a:latin typeface="Cambria Math" panose="02040503050406030204" pitchFamily="18" charset="0"/>
-                        </a:rPr>
-                        <m:t>, </m:t>
-                      </m:r>
-                      <m:acc>
-                        <m:accPr>
-                          <m:chr m:val="̂"/>
-                          <m:ctrlPr>
-                            <a:rPr lang="en-US" sz="2800" b="0" i="1" smtClean="0">
-                              <a:latin typeface="Cambria Math" panose="02040503050406030204" pitchFamily="18" charset="0"/>
-                            </a:rPr>
-                          </m:ctrlPr>
-                        </m:accPr>
-                        <m:e>
-                          <m:r>
-                            <a:rPr lang="en-US" sz="2800" b="0" i="1" smtClean="0">
-                              <a:latin typeface="Cambria Math" panose="02040503050406030204" pitchFamily="18" charset="0"/>
-                            </a:rPr>
-                            <m:t>𝜃</m:t>
-                          </m:r>
-                        </m:e>
-                      </m:acc>
-                      <m:r>
-                        <a:rPr lang="en-US" sz="2800" b="0" i="1" smtClean="0">
-                          <a:latin typeface="Cambria Math" panose="02040503050406030204" pitchFamily="18" charset="0"/>
-                        </a:rPr>
-                        <m:t>=−</m:t>
-                      </m:r>
-                      <m:r>
-                        <m:rPr>
-                          <m:sty m:val="p"/>
-                        </m:rPr>
-                        <a:rPr lang="en-US" sz="2800" b="0" i="1" smtClean="0">
-                          <a:latin typeface="Cambria Math" panose="02040503050406030204" pitchFamily="18" charset="0"/>
-                        </a:rPr>
-                        <m:t>sin</m:t>
-                      </m:r>
-                      <m:r>
-                        <a:rPr lang="en-US" sz="2800" b="0" i="1" smtClean="0">
-                          <a:latin typeface="Cambria Math" panose="02040503050406030204" pitchFamily="18" charset="0"/>
-                        </a:rPr>
-                        <m:t>𝜃</m:t>
-                      </m:r>
-                      <m:acc>
-                        <m:accPr>
-                          <m:chr m:val="̂"/>
-                          <m:ctrlPr>
-                            <a:rPr lang="en-US" sz="2800" b="0" i="1" smtClean="0">
-                              <a:latin typeface="Cambria Math" panose="02040503050406030204" pitchFamily="18" charset="0"/>
-                            </a:rPr>
-                          </m:ctrlPr>
-                        </m:accPr>
-                        <m:e>
-                          <m:r>
-                            <a:rPr lang="en-US" sz="2800" b="0" i="1" smtClean="0">
-                              <a:latin typeface="Cambria Math" panose="02040503050406030204" pitchFamily="18" charset="0"/>
-                            </a:rPr>
-                            <m:t>𝑥</m:t>
-                          </m:r>
-                        </m:e>
-                      </m:acc>
-                      <m:r>
-                        <a:rPr lang="en-US" sz="2800" b="0" i="1" smtClean="0">
-                          <a:latin typeface="Cambria Math" panose="02040503050406030204" pitchFamily="18" charset="0"/>
-                        </a:rPr>
-                        <m:t>+</m:t>
-                      </m:r>
-                      <m:r>
-                        <m:rPr>
-                          <m:sty m:val="p"/>
-                        </m:rPr>
-                        <a:rPr lang="en-US" sz="2800" b="0" i="1" smtClean="0">
-                          <a:latin typeface="Cambria Math" panose="02040503050406030204" pitchFamily="18" charset="0"/>
-                        </a:rPr>
-                        <m:t>cos</m:t>
-                      </m:r>
-                      <m:r>
-                        <a:rPr lang="en-US" sz="2800" b="0" i="1" smtClean="0">
-                          <a:latin typeface="Cambria Math" panose="02040503050406030204" pitchFamily="18" charset="0"/>
-                        </a:rPr>
-                        <m:t>𝜃</m:t>
-                      </m:r>
-                      <m:acc>
-                        <m:accPr>
-                          <m:chr m:val="̂"/>
-                          <m:ctrlPr>
-                            <a:rPr lang="en-US" sz="2800" b="0" i="1" smtClean="0">
-                              <a:latin typeface="Cambria Math" panose="02040503050406030204" pitchFamily="18" charset="0"/>
-                            </a:rPr>
-                          </m:ctrlPr>
-                        </m:accPr>
-                        <m:e>
-                          <m:r>
-                            <a:rPr lang="en-US" sz="2800" b="0" i="1" smtClean="0">
-                              <a:latin typeface="Cambria Math" panose="02040503050406030204" pitchFamily="18" charset="0"/>
-                            </a:rPr>
-                            <m:t>𝑦</m:t>
-                          </m:r>
-                        </m:e>
-                      </m:acc>
-                      <m:r>
-                        <a:rPr lang="en-US" sz="2800" b="0" i="1" smtClean="0">
-                          <a:latin typeface="Cambria Math" panose="02040503050406030204" pitchFamily="18" charset="0"/>
-                        </a:rPr>
-                        <m:t>, </m:t>
-                      </m:r>
-                    </m:oMath>
-                  </m:oMathPara>
-                </a14:m>
-                <a:endParaRPr lang="en-US" sz="2800" b="0" i="1" dirty="0">
-                  <a:latin typeface="Cambria Math" panose="02040503050406030204" pitchFamily="18" charset="0"/>
-                </a:endParaRPr>
-              </a:p>
-              <a:p>
-                <a:pPr/>
-                <a14:m>
-                  <m:oMathPara xmlns:m="http://schemas.openxmlformats.org/officeDocument/2006/math">
-                    <m:oMathParaPr>
-                      <m:jc m:val="left"/>
-                    </m:oMathParaPr>
-                    <m:oMath xmlns:m="http://schemas.openxmlformats.org/officeDocument/2006/math">
-                      <m:acc>
-                        <m:accPr>
-                          <m:chr m:val="̂"/>
-                          <m:ctrlPr>
-                            <a:rPr lang="en-US" sz="2800" b="0" i="1" smtClean="0">
-                              <a:latin typeface="Cambria Math" panose="02040503050406030204" pitchFamily="18" charset="0"/>
-                            </a:rPr>
-                          </m:ctrlPr>
-                        </m:accPr>
-                        <m:e>
-                          <m:r>
-                            <a:rPr lang="en-US" sz="2800" b="0" i="1" smtClean="0">
-                              <a:latin typeface="Cambria Math" panose="02040503050406030204" pitchFamily="18" charset="0"/>
-                            </a:rPr>
-                            <m:t>𝜙</m:t>
-                          </m:r>
-                        </m:e>
-                      </m:acc>
-                      <m:r>
-                        <a:rPr lang="en-US" sz="2800" b="0" i="1" smtClean="0">
-                          <a:latin typeface="Cambria Math" panose="02040503050406030204" pitchFamily="18" charset="0"/>
-                        </a:rPr>
-                        <m:t>=</m:t>
-                      </m:r>
-                      <m:r>
-                        <m:rPr>
-                          <m:sty m:val="p"/>
-                        </m:rPr>
-                        <a:rPr lang="en-US" sz="2800" b="0" i="1" smtClean="0">
-                          <a:latin typeface="Cambria Math" panose="02040503050406030204" pitchFamily="18" charset="0"/>
-                        </a:rPr>
-                        <m:t>cos</m:t>
-                      </m:r>
-                      <m:r>
-                        <a:rPr lang="en-US" sz="2800" b="0" i="1" smtClean="0">
-                          <a:latin typeface="Cambria Math" panose="02040503050406030204" pitchFamily="18" charset="0"/>
-                        </a:rPr>
-                        <m:t> </m:t>
-                      </m:r>
-                      <m:r>
-                        <a:rPr lang="en-US" sz="2800" b="0" i="1" smtClean="0">
-                          <a:latin typeface="Cambria Math" panose="02040503050406030204" pitchFamily="18" charset="0"/>
-                        </a:rPr>
-                        <m:t>𝜙</m:t>
-                      </m:r>
-                      <m:d>
-                        <m:dPr>
-                          <m:ctrlPr>
-                            <a:rPr lang="en-US" sz="2800" b="0" i="1" smtClean="0">
-                              <a:latin typeface="Cambria Math" panose="02040503050406030204" pitchFamily="18" charset="0"/>
-                            </a:rPr>
-                          </m:ctrlPr>
-                        </m:dPr>
-                        <m:e>
-                          <m:r>
-                            <m:rPr>
-                              <m:sty m:val="p"/>
-                            </m:rPr>
-                            <a:rPr lang="en-US" sz="2800" b="0" i="1" smtClean="0">
-                              <a:latin typeface="Cambria Math" panose="02040503050406030204" pitchFamily="18" charset="0"/>
-                            </a:rPr>
-                            <m:t>cos</m:t>
-                          </m:r>
-                          <m:r>
-                            <a:rPr lang="en-US" sz="2800" b="0" i="1" smtClean="0">
-                              <a:latin typeface="Cambria Math" panose="02040503050406030204" pitchFamily="18" charset="0"/>
-                            </a:rPr>
-                            <m:t>𝜃</m:t>
-                          </m:r>
-                          <m:acc>
-                            <m:accPr>
-                              <m:chr m:val="̂"/>
-                              <m:ctrlPr>
-                                <a:rPr lang="en-US" sz="2800" b="0" i="1" smtClean="0">
-                                  <a:latin typeface="Cambria Math" panose="02040503050406030204" pitchFamily="18" charset="0"/>
-                                </a:rPr>
-                              </m:ctrlPr>
-                            </m:accPr>
-                            <m:e>
-                              <m:r>
-                                <a:rPr lang="en-US" sz="2800" b="0" i="1" smtClean="0">
-                                  <a:latin typeface="Cambria Math" panose="02040503050406030204" pitchFamily="18" charset="0"/>
-                                </a:rPr>
-                                <m:t>𝑥</m:t>
-                              </m:r>
-                            </m:e>
-                          </m:acc>
-                          <m:r>
-                            <m:rPr>
-                              <m:nor/>
-                            </m:rPr>
-                            <a:rPr lang="en-US" sz="2800" b="0" dirty="0"/>
-                            <m:t>+ </m:t>
-                          </m:r>
-                          <m:r>
-                            <m:rPr>
-                              <m:sty m:val="p"/>
-                            </m:rPr>
-                            <a:rPr lang="en-US" sz="2800" b="0" i="1" smtClean="0">
-                              <a:latin typeface="Cambria Math" panose="02040503050406030204" pitchFamily="18" charset="0"/>
-                            </a:rPr>
-                            <m:t>sin</m:t>
-                          </m:r>
-                          <m:r>
-                            <a:rPr lang="en-US" sz="2800" b="0" i="1" smtClean="0">
-                              <a:latin typeface="Cambria Math" panose="02040503050406030204" pitchFamily="18" charset="0"/>
-                            </a:rPr>
-                            <m:t>𝜃</m:t>
-                          </m:r>
-                          <m:acc>
-                            <m:accPr>
-                              <m:chr m:val="̂"/>
-                              <m:ctrlPr>
-                                <a:rPr lang="en-US" sz="2800" b="0" i="1" smtClean="0">
-                                  <a:latin typeface="Cambria Math" panose="02040503050406030204" pitchFamily="18" charset="0"/>
-                                </a:rPr>
-                              </m:ctrlPr>
-                            </m:accPr>
-                            <m:e>
-                              <m:r>
-                                <a:rPr lang="en-US" sz="2800" b="0" i="1" smtClean="0">
-                                  <a:latin typeface="Cambria Math" panose="02040503050406030204" pitchFamily="18" charset="0"/>
-                                </a:rPr>
-                                <m:t>𝑦</m:t>
-                              </m:r>
-                            </m:e>
-                          </m:acc>
-                        </m:e>
-                      </m:d>
-                      <m:r>
-                        <a:rPr lang="en-US" sz="2800" b="0" i="1" smtClean="0">
-                          <a:latin typeface="Cambria Math" panose="02040503050406030204" pitchFamily="18" charset="0"/>
-                        </a:rPr>
-                        <m:t>−</m:t>
-                      </m:r>
-                      <m:r>
-                        <m:rPr>
-                          <m:sty m:val="p"/>
-                        </m:rPr>
-                        <a:rPr lang="en-US" sz="2800" b="0" i="1" smtClean="0">
-                          <a:latin typeface="Cambria Math" panose="02040503050406030204" pitchFamily="18" charset="0"/>
-                        </a:rPr>
-                        <m:t>sin</m:t>
-                      </m:r>
-                      <m:r>
-                        <a:rPr lang="en-US" sz="2800" b="0" i="1" smtClean="0">
-                          <a:latin typeface="Cambria Math" panose="02040503050406030204" pitchFamily="18" charset="0"/>
-                        </a:rPr>
-                        <m:t> </m:t>
-                      </m:r>
-                      <m:r>
-                        <a:rPr lang="en-US" sz="2800" b="0" i="1" smtClean="0">
-                          <a:latin typeface="Cambria Math" panose="02040503050406030204" pitchFamily="18" charset="0"/>
-                        </a:rPr>
-                        <m:t>𝜙</m:t>
-                      </m:r>
-                      <m:r>
-                        <a:rPr lang="en-US" sz="2800" b="0" i="1" smtClean="0">
-                          <a:latin typeface="Cambria Math" panose="02040503050406030204" pitchFamily="18" charset="0"/>
-                        </a:rPr>
-                        <m:t> </m:t>
-                      </m:r>
-                      <m:acc>
-                        <m:accPr>
-                          <m:chr m:val="̂"/>
-                          <m:ctrlPr>
-                            <a:rPr lang="en-US" sz="2800" b="0" i="1" smtClean="0">
-                              <a:latin typeface="Cambria Math" panose="02040503050406030204" pitchFamily="18" charset="0"/>
-                            </a:rPr>
-                          </m:ctrlPr>
-                        </m:accPr>
-                        <m:e>
-                          <m:r>
-                            <a:rPr lang="en-US" sz="2800" b="0" i="1" smtClean="0">
-                              <a:latin typeface="Cambria Math" panose="02040503050406030204" pitchFamily="18" charset="0"/>
-                            </a:rPr>
-                            <m:t>𝑧</m:t>
-                          </m:r>
-                        </m:e>
-                      </m:acc>
-                    </m:oMath>
-                  </m:oMathPara>
-                </a14:m>
-                <a:endParaRPr lang="en-US" sz="2800" b="0" dirty="0"/>
-              </a:p>
-            </p:txBody>
-          </p:sp>
-        </mc:Choice>
-        <mc:Fallback xmlns="">
-          <p:sp>
-            <p:nvSpPr>
-              <p:cNvPr id="3" name="TextBox 2">
-                <a:extLst>
-                  <a:ext uri="{FF2B5EF4-FFF2-40B4-BE49-F238E27FC236}">
-                    <a16:creationId xmlns:a16="http://schemas.microsoft.com/office/drawing/2014/main" id="{E9AC7E2A-F8D0-70A0-FC7E-375C3DC4B50B}"/>
-                  </a:ext>
-                </a:extLst>
-              </p:cNvPr>
-              <p:cNvSpPr txBox="1">
-                <a:spLocks noRot="1" noChangeAspect="1" noMove="1" noResize="1" noEditPoints="1" noAdjustHandles="1" noChangeArrowheads="1" noChangeShapeType="1" noTextEdit="1"/>
-              </p:cNvSpPr>
-              <p:nvPr/>
-            </p:nvSpPr>
-            <p:spPr>
-              <a:xfrm>
-                <a:off x="855900" y="1770346"/>
-                <a:ext cx="7494815" cy="1422954"/>
-              </a:xfrm>
-              <a:prstGeom prst="rect">
-                <a:avLst/>
-              </a:prstGeom>
-              <a:blipFill>
-                <a:blip r:embed="rId3"/>
-                <a:stretch>
-                  <a:fillRect/>
-                </a:stretch>
-              </a:blipFill>
-            </p:spPr>
-            <p:txBody>
-              <a:bodyPr/>
-              <a:lstStyle/>
-              <a:p>
-                <a:r>
-                  <a:rPr lang="en-US">
-                    <a:noFill/>
-                  </a:rPr>
-                  <a:t> </a:t>
-                </a:r>
-              </a:p>
-            </p:txBody>
-          </p:sp>
-        </mc:Fallback>
-      </mc:AlternateContent>
       <p:grpSp>
         <p:nvGrpSpPr>
-          <p:cNvPr id="4" name="Group 3">
+          <p:cNvPr id="20" name="Group 19">
             <a:extLst>
               <a:ext uri="{FF2B5EF4-FFF2-40B4-BE49-F238E27FC236}">
-                <a16:creationId xmlns:a16="http://schemas.microsoft.com/office/drawing/2014/main" id="{474CE678-4D3E-F117-67EC-4AD72CA0BDD7}"/>
+                <a16:creationId xmlns:a16="http://schemas.microsoft.com/office/drawing/2014/main" id="{642DDF18-0F62-099F-D483-C6597DF06DF5}"/>
               </a:ext>
             </a:extLst>
           </p:cNvPr>
@@ -17755,223 +16949,20 @@
         </p:nvGrpSpPr>
         <p:grpSpPr>
           <a:xfrm>
-            <a:off x="7575079" y="844715"/>
-            <a:ext cx="1575344" cy="2040527"/>
-            <a:chOff x="9155225" y="1201103"/>
-            <a:chExt cx="1575344" cy="2040527"/>
+            <a:off x="855900" y="709863"/>
+            <a:ext cx="11117929" cy="2501844"/>
+            <a:chOff x="855900" y="709863"/>
+            <a:chExt cx="11117929" cy="2501844"/>
           </a:xfrm>
         </p:grpSpPr>
-        <p:cxnSp>
-          <p:nvCxnSpPr>
-            <p:cNvPr id="5" name="Straight Arrow Connector 4">
-              <a:extLst>
-                <a:ext uri="{FF2B5EF4-FFF2-40B4-BE49-F238E27FC236}">
-                  <a16:creationId xmlns:a16="http://schemas.microsoft.com/office/drawing/2014/main" id="{6A224DAC-7903-8F6A-1943-9060D5ADC959}"/>
-                </a:ext>
-              </a:extLst>
-            </p:cNvPr>
-            <p:cNvCxnSpPr/>
-            <p:nvPr/>
-          </p:nvCxnSpPr>
-          <p:spPr>
-            <a:xfrm>
-              <a:off x="9221002" y="2709834"/>
-              <a:ext cx="1443790" cy="531796"/>
-            </a:xfrm>
-            <a:prstGeom prst="straightConnector1">
-              <a:avLst/>
-            </a:prstGeom>
-            <a:ln>
-              <a:tailEnd type="triangle"/>
-            </a:ln>
-          </p:spPr>
-          <p:style>
-            <a:lnRef idx="1">
-              <a:schemeClr val="accent1"/>
-            </a:lnRef>
-            <a:fillRef idx="0">
-              <a:schemeClr val="accent1"/>
-            </a:fillRef>
-            <a:effectRef idx="0">
-              <a:schemeClr val="accent1"/>
-            </a:effectRef>
-            <a:fontRef idx="minor">
-              <a:schemeClr val="tx1"/>
-            </a:fontRef>
-          </p:style>
-        </p:cxnSp>
-        <p:cxnSp>
-          <p:nvCxnSpPr>
-            <p:cNvPr id="6" name="Straight Arrow Connector 5">
-              <a:extLst>
-                <a:ext uri="{FF2B5EF4-FFF2-40B4-BE49-F238E27FC236}">
-                  <a16:creationId xmlns:a16="http://schemas.microsoft.com/office/drawing/2014/main" id="{EE80AED7-3E96-ADDD-BA90-2C0C24FB551B}"/>
-                </a:ext>
-              </a:extLst>
-            </p:cNvPr>
-            <p:cNvCxnSpPr>
-              <a:cxnSpLocks/>
-            </p:cNvCxnSpPr>
-            <p:nvPr/>
-          </p:nvCxnSpPr>
-          <p:spPr>
-            <a:xfrm flipV="1">
-              <a:off x="9221002" y="1757061"/>
-              <a:ext cx="1021882" cy="966057"/>
-            </a:xfrm>
-            <a:prstGeom prst="straightConnector1">
-              <a:avLst/>
-            </a:prstGeom>
-            <a:ln>
-              <a:tailEnd type="triangle"/>
-            </a:ln>
-          </p:spPr>
-          <p:style>
-            <a:lnRef idx="1">
-              <a:schemeClr val="accent1"/>
-            </a:lnRef>
-            <a:fillRef idx="0">
-              <a:schemeClr val="accent1"/>
-            </a:fillRef>
-            <a:effectRef idx="0">
-              <a:schemeClr val="accent1"/>
-            </a:effectRef>
-            <a:fontRef idx="minor">
-              <a:schemeClr val="tx1"/>
-            </a:fontRef>
-          </p:style>
-        </p:cxnSp>
-        <p:cxnSp>
-          <p:nvCxnSpPr>
-            <p:cNvPr id="7" name="Straight Arrow Connector 6">
-              <a:extLst>
-                <a:ext uri="{FF2B5EF4-FFF2-40B4-BE49-F238E27FC236}">
-                  <a16:creationId xmlns:a16="http://schemas.microsoft.com/office/drawing/2014/main" id="{771A9657-0995-7AF7-F7DB-FF3B83ED7635}"/>
-                </a:ext>
-              </a:extLst>
-            </p:cNvPr>
-            <p:cNvCxnSpPr>
-              <a:cxnSpLocks/>
-            </p:cNvCxnSpPr>
-            <p:nvPr/>
-          </p:nvCxnSpPr>
-          <p:spPr>
-            <a:xfrm flipV="1">
-              <a:off x="9221002" y="1201103"/>
-              <a:ext cx="0" cy="1508731"/>
-            </a:xfrm>
-            <a:prstGeom prst="straightConnector1">
-              <a:avLst/>
-            </a:prstGeom>
-            <a:ln>
-              <a:tailEnd type="triangle"/>
-            </a:ln>
-          </p:spPr>
-          <p:style>
-            <a:lnRef idx="1">
-              <a:schemeClr val="accent1"/>
-            </a:lnRef>
-            <a:fillRef idx="0">
-              <a:schemeClr val="accent1"/>
-            </a:fillRef>
-            <a:effectRef idx="0">
-              <a:schemeClr val="accent1"/>
-            </a:effectRef>
-            <a:fontRef idx="minor">
-              <a:schemeClr val="tx1"/>
-            </a:fontRef>
-          </p:style>
-        </p:cxnSp>
-        <p:cxnSp>
-          <p:nvCxnSpPr>
-            <p:cNvPr id="8" name="Straight Arrow Connector 7">
-              <a:extLst>
-                <a:ext uri="{FF2B5EF4-FFF2-40B4-BE49-F238E27FC236}">
-                  <a16:creationId xmlns:a16="http://schemas.microsoft.com/office/drawing/2014/main" id="{138060BF-5C0A-36E2-983A-46C81FD7256D}"/>
-                </a:ext>
-              </a:extLst>
-            </p:cNvPr>
-            <p:cNvCxnSpPr>
-              <a:cxnSpLocks/>
-            </p:cNvCxnSpPr>
-            <p:nvPr/>
-          </p:nvCxnSpPr>
-          <p:spPr>
-            <a:xfrm flipV="1">
-              <a:off x="9221002" y="1607419"/>
-              <a:ext cx="598371" cy="1115699"/>
-            </a:xfrm>
-            <a:prstGeom prst="straightConnector1">
-              <a:avLst/>
-            </a:prstGeom>
-            <a:ln>
-              <a:tailEnd type="triangle"/>
-            </a:ln>
-          </p:spPr>
-          <p:style>
-            <a:lnRef idx="1">
-              <a:schemeClr val="accent2"/>
-            </a:lnRef>
-            <a:fillRef idx="0">
-              <a:schemeClr val="accent2"/>
-            </a:fillRef>
-            <a:effectRef idx="0">
-              <a:schemeClr val="accent2"/>
-            </a:effectRef>
-            <a:fontRef idx="minor">
-              <a:schemeClr val="tx1"/>
-            </a:fontRef>
-          </p:style>
-        </p:cxnSp>
-        <p:cxnSp>
-          <p:nvCxnSpPr>
-            <p:cNvPr id="9" name="Straight Arrow Connector 8">
-              <a:extLst>
-                <a:ext uri="{FF2B5EF4-FFF2-40B4-BE49-F238E27FC236}">
-                  <a16:creationId xmlns:a16="http://schemas.microsoft.com/office/drawing/2014/main" id="{145CBAC4-B815-A563-8AD1-627BCC227585}"/>
-                </a:ext>
-              </a:extLst>
-            </p:cNvPr>
-            <p:cNvCxnSpPr>
-              <a:cxnSpLocks/>
-            </p:cNvCxnSpPr>
-            <p:nvPr/>
-          </p:nvCxnSpPr>
-          <p:spPr>
-            <a:xfrm flipV="1">
-              <a:off x="9221002" y="1607419"/>
-              <a:ext cx="598371" cy="77002"/>
-            </a:xfrm>
-            <a:prstGeom prst="straightConnector1">
-              <a:avLst/>
-            </a:prstGeom>
-            <a:ln>
-              <a:tailEnd type="triangle"/>
-            </a:ln>
-          </p:spPr>
-          <p:style>
-            <a:lnRef idx="1">
-              <a:schemeClr val="accent1"/>
-            </a:lnRef>
-            <a:fillRef idx="0">
-              <a:schemeClr val="accent1"/>
-            </a:fillRef>
-            <a:effectRef idx="0">
-              <a:schemeClr val="accent1"/>
-            </a:effectRef>
-            <a:fontRef idx="minor">
-              <a:schemeClr val="tx1"/>
-            </a:fontRef>
-          </p:style>
-        </p:cxnSp>
-        <mc:AlternateContent xmlns:mc="http://schemas.openxmlformats.org/markup-compatibility/2006" xmlns:a14="http://schemas.microsoft.com/office/drawing/2010/main">
-          <mc:Choice Requires="a14">
+        <mc:AlternateContent xmlns:mc="http://schemas.openxmlformats.org/markup-compatibility/2006">
+          <mc:Choice xmlns:a14="http://schemas.microsoft.com/office/drawing/2010/main" Requires="a14">
             <p:sp>
               <p:nvSpPr>
-                <p:cNvPr id="10" name="TextBox 9">
+                <p:cNvPr id="2" name="TextBox 1">
                   <a:extLst>
                     <a:ext uri="{FF2B5EF4-FFF2-40B4-BE49-F238E27FC236}">
-                      <a16:creationId xmlns:a16="http://schemas.microsoft.com/office/drawing/2014/main" id="{8FD8700A-1887-1D1B-D335-E1C53C06F9A4}"/>
+                      <a16:creationId xmlns:a16="http://schemas.microsoft.com/office/drawing/2014/main" id="{5AD1CE97-ADDC-00B1-344A-51AD917AAC14}"/>
                     </a:ext>
                   </a:extLst>
                 </p:cNvPr>
@@ -17979,9 +16970,9 @@
                 <p:nvPr/>
               </p:nvSpPr>
               <p:spPr>
-                <a:xfrm flipH="1">
-                  <a:off x="9155225" y="1975790"/>
-                  <a:ext cx="442766" cy="378956"/>
+                <a:xfrm>
+                  <a:off x="855901" y="709863"/>
+                  <a:ext cx="7494815" cy="1060483"/>
                 </a:xfrm>
                 <a:prstGeom prst="rect">
                   <a:avLst/>
@@ -17998,126 +16989,290 @@
                   <a14:m>
                     <m:oMathPara xmlns:m="http://schemas.openxmlformats.org/officeDocument/2006/math">
                       <m:oMathParaPr>
-                        <m:jc m:val="centerGroup"/>
+                        <m:jc m:val="left"/>
                       </m:oMathParaPr>
                       <m:oMath xmlns:m="http://schemas.openxmlformats.org/officeDocument/2006/math">
                         <m:r>
-                          <a:rPr lang="en-US" b="0" i="1" smtClean="0">
+                          <a:rPr lang="en-US" sz="2800" b="0" i="1" smtClean="0">
+                            <a:latin typeface="Cambria Math" panose="02040503050406030204" pitchFamily="18" charset="0"/>
+                          </a:rPr>
+                          <m:t>𝑟</m:t>
+                        </m:r>
+                        <m:r>
+                          <a:rPr lang="en-US" sz="2800" b="0" i="1" smtClean="0">
+                            <a:latin typeface="Cambria Math" panose="02040503050406030204" pitchFamily="18" charset="0"/>
+                          </a:rPr>
+                          <m:t>=</m:t>
+                        </m:r>
+                        <m:d>
+                          <m:dPr>
+                            <m:begChr m:val="|"/>
+                            <m:endChr m:val="|"/>
+                            <m:ctrlPr>
+                              <a:rPr lang="en-US" sz="2800" b="0" i="1" smtClean="0">
+                                <a:latin typeface="Cambria Math" panose="02040503050406030204" pitchFamily="18" charset="0"/>
+                              </a:rPr>
+                            </m:ctrlPr>
+                          </m:dPr>
+                          <m:e>
+                            <m:acc>
+                              <m:accPr>
+                                <m:chr m:val="⃗"/>
+                                <m:ctrlPr>
+                                  <a:rPr lang="en-US" sz="2800" b="0" i="1" smtClean="0">
+                                    <a:latin typeface="Cambria Math" panose="02040503050406030204" pitchFamily="18" charset="0"/>
+                                  </a:rPr>
+                                </m:ctrlPr>
+                              </m:accPr>
+                              <m:e>
+                                <m:r>
+                                  <a:rPr lang="en-US" sz="2800" b="0" i="1" smtClean="0">
+                                    <a:latin typeface="Cambria Math" panose="02040503050406030204" pitchFamily="18" charset="0"/>
+                                  </a:rPr>
+                                  <m:t>𝑟</m:t>
+                                </m:r>
+                              </m:e>
+                            </m:acc>
+                          </m:e>
+                        </m:d>
+                        <m:r>
+                          <a:rPr lang="en-US" sz="2800" b="0" i="1" smtClean="0">
+                            <a:latin typeface="Cambria Math" panose="02040503050406030204" pitchFamily="18" charset="0"/>
+                          </a:rPr>
+                          <m:t>, </m:t>
+                        </m:r>
+                        <m:r>
+                          <a:rPr lang="en-US" sz="2800" b="0" i="1" smtClean="0">
+                            <a:latin typeface="Cambria Math" panose="02040503050406030204" pitchFamily="18" charset="0"/>
+                          </a:rPr>
+                          <m:t>𝜃</m:t>
+                        </m:r>
+                        <m:r>
+                          <a:rPr lang="en-US" sz="2800" b="0" i="1" smtClean="0">
+                            <a:latin typeface="Cambria Math" panose="02040503050406030204" pitchFamily="18" charset="0"/>
+                          </a:rPr>
+                          <m:t>=</m:t>
+                        </m:r>
+                        <m:sSup>
+                          <m:sSupPr>
+                            <m:ctrlPr>
+                              <a:rPr lang="en-US" sz="2800" b="0" i="1" smtClean="0">
+                                <a:latin typeface="Cambria Math" panose="02040503050406030204" pitchFamily="18" charset="0"/>
+                              </a:rPr>
+                            </m:ctrlPr>
+                          </m:sSupPr>
+                          <m:e>
+                            <m:r>
+                              <m:rPr>
+                                <m:sty m:val="p"/>
+                              </m:rPr>
+                              <a:rPr lang="en-US" sz="2800" b="0" i="0" smtClean="0">
+                                <a:latin typeface="Cambria Math" panose="02040503050406030204" pitchFamily="18" charset="0"/>
+                              </a:rPr>
+                              <m:t>tan</m:t>
+                            </m:r>
+                          </m:e>
+                          <m:sup>
+                            <m:r>
+                              <a:rPr lang="en-US" sz="2800" b="0" i="1" smtClean="0">
+                                <a:latin typeface="Cambria Math" panose="02040503050406030204" pitchFamily="18" charset="0"/>
+                              </a:rPr>
+                              <m:t>−1</m:t>
+                            </m:r>
+                          </m:sup>
+                        </m:sSup>
+                        <m:d>
+                          <m:dPr>
+                            <m:ctrlPr>
+                              <a:rPr lang="en-US" sz="2800" b="0" i="1" smtClean="0">
+                                <a:latin typeface="Cambria Math" panose="02040503050406030204" pitchFamily="18" charset="0"/>
+                              </a:rPr>
+                            </m:ctrlPr>
+                          </m:dPr>
+                          <m:e>
+                            <m:f>
+                              <m:fPr>
+                                <m:ctrlPr>
+                                  <a:rPr lang="en-US" sz="2800" b="0" i="1" smtClean="0">
+                                    <a:latin typeface="Cambria Math" panose="02040503050406030204" pitchFamily="18" charset="0"/>
+                                  </a:rPr>
+                                </m:ctrlPr>
+                              </m:fPr>
+                              <m:num>
+                                <m:sSub>
+                                  <m:sSubPr>
+                                    <m:ctrlPr>
+                                      <a:rPr lang="en-US" sz="2800" b="0" i="1" smtClean="0">
+                                        <a:latin typeface="Cambria Math" panose="02040503050406030204" pitchFamily="18" charset="0"/>
+                                      </a:rPr>
+                                    </m:ctrlPr>
+                                  </m:sSubPr>
+                                  <m:e>
+                                    <m:r>
+                                      <a:rPr lang="en-US" sz="2800" b="0" i="1" smtClean="0">
+                                        <a:latin typeface="Cambria Math" panose="02040503050406030204" pitchFamily="18" charset="0"/>
+                                      </a:rPr>
+                                      <m:t>𝑟</m:t>
+                                    </m:r>
+                                  </m:e>
+                                  <m:sub>
+                                    <m:r>
+                                      <a:rPr lang="en-US" sz="2800" b="0" i="1" smtClean="0">
+                                        <a:latin typeface="Cambria Math" panose="02040503050406030204" pitchFamily="18" charset="0"/>
+                                      </a:rPr>
+                                      <m:t>𝑦</m:t>
+                                    </m:r>
+                                  </m:sub>
+                                </m:sSub>
+                              </m:num>
+                              <m:den>
+                                <m:sSub>
+                                  <m:sSubPr>
+                                    <m:ctrlPr>
+                                      <a:rPr lang="en-US" sz="2800" b="0" i="1" smtClean="0">
+                                        <a:latin typeface="Cambria Math" panose="02040503050406030204" pitchFamily="18" charset="0"/>
+                                      </a:rPr>
+                                    </m:ctrlPr>
+                                  </m:sSubPr>
+                                  <m:e>
+                                    <m:r>
+                                      <a:rPr lang="en-US" sz="2800" b="0" i="1" smtClean="0">
+                                        <a:latin typeface="Cambria Math" panose="02040503050406030204" pitchFamily="18" charset="0"/>
+                                      </a:rPr>
+                                      <m:t>𝑟</m:t>
+                                    </m:r>
+                                  </m:e>
+                                  <m:sub>
+                                    <m:r>
+                                      <a:rPr lang="en-US" sz="2800" b="0" i="1" smtClean="0">
+                                        <a:latin typeface="Cambria Math" panose="02040503050406030204" pitchFamily="18" charset="0"/>
+                                      </a:rPr>
+                                      <m:t>𝑥</m:t>
+                                    </m:r>
+                                  </m:sub>
+                                </m:sSub>
+                              </m:den>
+                            </m:f>
+                          </m:e>
+                        </m:d>
+                        <m:r>
+                          <a:rPr lang="en-US" sz="2800" b="0" i="1" smtClean="0">
+                            <a:latin typeface="Cambria Math" panose="02040503050406030204" pitchFamily="18" charset="0"/>
+                          </a:rPr>
+                          <m:t>, </m:t>
+                        </m:r>
+                        <m:r>
+                          <a:rPr lang="en-US" sz="2800" b="0" i="1" smtClean="0">
                             <a:latin typeface="Cambria Math" panose="02040503050406030204" pitchFamily="18" charset="0"/>
                           </a:rPr>
                           <m:t>𝜙</m:t>
                         </m:r>
+                        <m:r>
+                          <a:rPr lang="en-US" sz="2800" b="0" i="1" smtClean="0">
+                            <a:latin typeface="Cambria Math" panose="02040503050406030204" pitchFamily="18" charset="0"/>
+                          </a:rPr>
+                          <m:t>=</m:t>
+                        </m:r>
+                        <m:func>
+                          <m:funcPr>
+                            <m:ctrlPr>
+                              <a:rPr lang="en-US" sz="2800" b="0" i="1" smtClean="0">
+                                <a:latin typeface="Cambria Math" panose="02040503050406030204" pitchFamily="18" charset="0"/>
+                              </a:rPr>
+                            </m:ctrlPr>
+                          </m:funcPr>
+                          <m:fName>
+                            <m:sSup>
+                              <m:sSupPr>
+                                <m:ctrlPr>
+                                  <a:rPr lang="en-US" sz="2800" b="0" i="1" smtClean="0">
+                                    <a:latin typeface="Cambria Math" panose="02040503050406030204" pitchFamily="18" charset="0"/>
+                                  </a:rPr>
+                                </m:ctrlPr>
+                              </m:sSupPr>
+                              <m:e>
+                                <m:r>
+                                  <m:rPr>
+                                    <m:sty m:val="p"/>
+                                  </m:rPr>
+                                  <a:rPr lang="en-US" sz="2800" b="0" i="0" smtClean="0">
+                                    <a:latin typeface="Cambria Math" panose="02040503050406030204" pitchFamily="18" charset="0"/>
+                                  </a:rPr>
+                                  <m:t>cos</m:t>
+                                </m:r>
+                              </m:e>
+                              <m:sup>
+                                <m:r>
+                                  <a:rPr lang="en-US" sz="2800" b="0" i="1" smtClean="0">
+                                    <a:latin typeface="Cambria Math" panose="02040503050406030204" pitchFamily="18" charset="0"/>
+                                  </a:rPr>
+                                  <m:t>−1</m:t>
+                                </m:r>
+                              </m:sup>
+                            </m:sSup>
+                          </m:fName>
+                          <m:e>
+                            <m:f>
+                              <m:fPr>
+                                <m:ctrlPr>
+                                  <a:rPr lang="en-US" sz="2800" b="0" i="1" smtClean="0">
+                                    <a:latin typeface="Cambria Math" panose="02040503050406030204" pitchFamily="18" charset="0"/>
+                                  </a:rPr>
+                                </m:ctrlPr>
+                              </m:fPr>
+                              <m:num>
+                                <m:sSub>
+                                  <m:sSubPr>
+                                    <m:ctrlPr>
+                                      <a:rPr lang="en-US" sz="2800" b="0" i="1" smtClean="0">
+                                        <a:latin typeface="Cambria Math" panose="02040503050406030204" pitchFamily="18" charset="0"/>
+                                      </a:rPr>
+                                    </m:ctrlPr>
+                                  </m:sSubPr>
+                                  <m:e>
+                                    <m:r>
+                                      <a:rPr lang="en-US" sz="2800" b="0" i="1" smtClean="0">
+                                        <a:latin typeface="Cambria Math" panose="02040503050406030204" pitchFamily="18" charset="0"/>
+                                      </a:rPr>
+                                      <m:t>𝑟</m:t>
+                                    </m:r>
+                                  </m:e>
+                                  <m:sub>
+                                    <m:r>
+                                      <a:rPr lang="en-US" sz="2800" b="0" i="1" smtClean="0">
+                                        <a:latin typeface="Cambria Math" panose="02040503050406030204" pitchFamily="18" charset="0"/>
+                                      </a:rPr>
+                                      <m:t>𝑧</m:t>
+                                    </m:r>
+                                  </m:sub>
+                                </m:sSub>
+                              </m:num>
+                              <m:den>
+                                <m:r>
+                                  <a:rPr lang="en-US" sz="2800" b="0" i="1" smtClean="0">
+                                    <a:latin typeface="Cambria Math" panose="02040503050406030204" pitchFamily="18" charset="0"/>
+                                  </a:rPr>
+                                  <m:t>𝑟</m:t>
+                                </m:r>
+                              </m:den>
+                            </m:f>
+                          </m:e>
+                        </m:func>
                       </m:oMath>
                     </m:oMathPara>
                   </a14:m>
-                  <a:endParaRPr lang="en-US" dirty="0"/>
+                  <a:endParaRPr lang="en-US" sz="2800" b="0" dirty="0"/>
                 </a:p>
               </p:txBody>
             </p:sp>
           </mc:Choice>
-          <mc:Fallback xmlns="">
+          <mc:Fallback>
             <p:sp>
               <p:nvSpPr>
-                <p:cNvPr id="10" name="TextBox 9">
+                <p:cNvPr id="2" name="TextBox 1">
                   <a:extLst>
                     <a:ext uri="{FF2B5EF4-FFF2-40B4-BE49-F238E27FC236}">
-                      <a16:creationId xmlns:a16="http://schemas.microsoft.com/office/drawing/2014/main" id="{8FD8700A-1887-1D1B-D335-E1C53C06F9A4}"/>
-                    </a:ext>
-                  </a:extLst>
-                </p:cNvPr>
-                <p:cNvSpPr txBox="1">
-                  <a:spLocks noRot="1" noChangeAspect="1" noMove="1" noResize="1" noEditPoints="1" noAdjustHandles="1" noChangeArrowheads="1" noChangeShapeType="1" noTextEdit="1"/>
-                </p:cNvSpPr>
-                <p:nvPr/>
-              </p:nvSpPr>
-              <p:spPr>
-                <a:xfrm flipH="1">
-                  <a:off x="9155225" y="1975790"/>
-                  <a:ext cx="442766" cy="378956"/>
-                </a:xfrm>
-                <a:prstGeom prst="rect">
-                  <a:avLst/>
-                </a:prstGeom>
-                <a:blipFill>
-                  <a:blip r:embed="rId4"/>
-                  <a:stretch>
-                    <a:fillRect b="-9677"/>
-                  </a:stretch>
-                </a:blipFill>
-              </p:spPr>
-              <p:txBody>
-                <a:bodyPr/>
-                <a:lstStyle/>
-                <a:p>
-                  <a:r>
-                    <a:rPr lang="en-US">
-                      <a:noFill/>
-                    </a:rPr>
-                    <a:t> </a:t>
-                  </a:r>
-                </a:p>
-              </p:txBody>
-            </p:sp>
-          </mc:Fallback>
-        </mc:AlternateContent>
-        <mc:AlternateContent xmlns:mc="http://schemas.openxmlformats.org/markup-compatibility/2006" xmlns:a14="http://schemas.microsoft.com/office/drawing/2010/main">
-          <mc:Choice Requires="a14">
-            <p:sp>
-              <p:nvSpPr>
-                <p:cNvPr id="11" name="TextBox 10">
-                  <a:extLst>
-                    <a:ext uri="{FF2B5EF4-FFF2-40B4-BE49-F238E27FC236}">
-                      <a16:creationId xmlns:a16="http://schemas.microsoft.com/office/drawing/2014/main" id="{0BA6EE28-443E-C85C-D253-1769971899B8}"/>
-                    </a:ext>
-                  </a:extLst>
-                </p:cNvPr>
-                <p:cNvSpPr txBox="1"/>
-                <p:nvPr/>
-              </p:nvSpPr>
-              <p:spPr>
-                <a:xfrm>
-                  <a:off x="9454418" y="1572395"/>
-                  <a:ext cx="405865" cy="369332"/>
-                </a:xfrm>
-                <a:prstGeom prst="rect">
-                  <a:avLst/>
-                </a:prstGeom>
-                <a:noFill/>
-              </p:spPr>
-              <p:txBody>
-                <a:bodyPr wrap="square" rtlCol="0">
-                  <a:spAutoFit/>
-                </a:bodyPr>
-                <a:lstStyle/>
-                <a:p>
-                  <a:pPr/>
-                  <a14:m>
-                    <m:oMathPara xmlns:m="http://schemas.openxmlformats.org/officeDocument/2006/math">
-                      <m:oMathParaPr>
-                        <m:jc m:val="centerGroup"/>
-                      </m:oMathParaPr>
-                      <m:oMath xmlns:m="http://schemas.openxmlformats.org/officeDocument/2006/math">
-                        <m:r>
-                          <a:rPr lang="en-US" b="0" i="1" smtClean="0">
-                            <a:latin typeface="Cambria Math" panose="02040503050406030204" pitchFamily="18" charset="0"/>
-                          </a:rPr>
-                          <m:t>𝜃</m:t>
-                        </m:r>
-                      </m:oMath>
-                    </m:oMathPara>
-                  </a14:m>
-                  <a:endParaRPr lang="en-US" dirty="0"/>
-                </a:p>
-              </p:txBody>
-            </p:sp>
-          </mc:Choice>
-          <mc:Fallback xmlns="">
-            <p:sp>
-              <p:nvSpPr>
-                <p:cNvPr id="11" name="TextBox 10">
-                  <a:extLst>
-                    <a:ext uri="{FF2B5EF4-FFF2-40B4-BE49-F238E27FC236}">
-                      <a16:creationId xmlns:a16="http://schemas.microsoft.com/office/drawing/2014/main" id="{0BA6EE28-443E-C85C-D253-1769971899B8}"/>
+                      <a16:creationId xmlns:a16="http://schemas.microsoft.com/office/drawing/2014/main" id="{5AD1CE97-ADDC-00B1-344A-51AD917AAC14}"/>
                     </a:ext>
                   </a:extLst>
                 </p:cNvPr>
@@ -18128,14 +17283,14 @@
               </p:nvSpPr>
               <p:spPr>
                 <a:xfrm>
-                  <a:off x="9454418" y="1572395"/>
-                  <a:ext cx="405865" cy="369332"/>
+                  <a:off x="855901" y="709863"/>
+                  <a:ext cx="7494815" cy="1060483"/>
                 </a:xfrm>
                 <a:prstGeom prst="rect">
                   <a:avLst/>
                 </a:prstGeom>
                 <a:blipFill>
-                  <a:blip r:embed="rId5"/>
+                  <a:blip r:embed="rId2"/>
                   <a:stretch>
                     <a:fillRect/>
                   </a:stretch>
@@ -18156,233 +17311,14 @@
             </p:sp>
           </mc:Fallback>
         </mc:AlternateContent>
-        <p:cxnSp>
-          <p:nvCxnSpPr>
-            <p:cNvPr id="12" name="Straight Connector 11">
-              <a:extLst>
-                <a:ext uri="{FF2B5EF4-FFF2-40B4-BE49-F238E27FC236}">
-                  <a16:creationId xmlns:a16="http://schemas.microsoft.com/office/drawing/2014/main" id="{6C2F3F47-2CD0-37A7-3142-CF3E670C7A10}"/>
-                </a:ext>
-              </a:extLst>
-            </p:cNvPr>
-            <p:cNvCxnSpPr/>
-            <p:nvPr/>
-          </p:nvCxnSpPr>
-          <p:spPr>
-            <a:xfrm>
-              <a:off x="9221001" y="1718629"/>
-              <a:ext cx="1509568" cy="446639"/>
-            </a:xfrm>
-            <a:prstGeom prst="line">
-              <a:avLst/>
-            </a:prstGeom>
-          </p:spPr>
-          <p:style>
-            <a:lnRef idx="1">
-              <a:schemeClr val="accent1"/>
-            </a:lnRef>
-            <a:fillRef idx="0">
-              <a:schemeClr val="accent1"/>
-            </a:fillRef>
-            <a:effectRef idx="0">
-              <a:schemeClr val="accent1"/>
-            </a:effectRef>
-            <a:fontRef idx="minor">
-              <a:schemeClr val="tx1"/>
-            </a:fontRef>
-          </p:style>
-        </p:cxnSp>
-      </p:grpSp>
-      <p:grpSp>
-        <p:nvGrpSpPr>
-          <p:cNvPr id="13" name="Group 12">
-            <a:extLst>
-              <a:ext uri="{FF2B5EF4-FFF2-40B4-BE49-F238E27FC236}">
-                <a16:creationId xmlns:a16="http://schemas.microsoft.com/office/drawing/2014/main" id="{6BF7524A-F666-DD9F-765E-1A356B9C38CB}"/>
-              </a:ext>
-            </a:extLst>
-          </p:cNvPr>
-          <p:cNvGrpSpPr/>
-          <p:nvPr/>
-        </p:nvGrpSpPr>
-        <p:grpSpPr>
-          <a:xfrm>
-            <a:off x="9847455" y="748923"/>
-            <a:ext cx="2126374" cy="2462784"/>
-            <a:chOff x="1318661" y="3850105"/>
-            <a:chExt cx="2598821" cy="2633751"/>
-          </a:xfrm>
-        </p:grpSpPr>
-        <p:cxnSp>
-          <p:nvCxnSpPr>
-            <p:cNvPr id="14" name="Straight Arrow Connector 13">
-              <a:extLst>
-                <a:ext uri="{FF2B5EF4-FFF2-40B4-BE49-F238E27FC236}">
-                  <a16:creationId xmlns:a16="http://schemas.microsoft.com/office/drawing/2014/main" id="{A06E11EF-AC66-B204-289C-A533C97E7DC3}"/>
-                </a:ext>
-              </a:extLst>
-            </p:cNvPr>
-            <p:cNvCxnSpPr/>
-            <p:nvPr/>
-          </p:nvCxnSpPr>
-          <p:spPr>
-            <a:xfrm flipV="1">
-              <a:off x="1318661" y="3850105"/>
-              <a:ext cx="0" cy="2098308"/>
-            </a:xfrm>
-            <a:prstGeom prst="straightConnector1">
-              <a:avLst/>
-            </a:prstGeom>
-            <a:ln>
-              <a:tailEnd type="triangle"/>
-            </a:ln>
-          </p:spPr>
-          <p:style>
-            <a:lnRef idx="1">
-              <a:schemeClr val="accent1"/>
-            </a:lnRef>
-            <a:fillRef idx="0">
-              <a:schemeClr val="accent1"/>
-            </a:fillRef>
-            <a:effectRef idx="0">
-              <a:schemeClr val="accent1"/>
-            </a:effectRef>
-            <a:fontRef idx="minor">
-              <a:schemeClr val="tx1"/>
-            </a:fontRef>
-          </p:style>
-        </p:cxnSp>
-        <p:cxnSp>
-          <p:nvCxnSpPr>
-            <p:cNvPr id="15" name="Straight Arrow Connector 14">
-              <a:extLst>
-                <a:ext uri="{FF2B5EF4-FFF2-40B4-BE49-F238E27FC236}">
-                  <a16:creationId xmlns:a16="http://schemas.microsoft.com/office/drawing/2014/main" id="{589C8773-AF40-E8BF-9CBC-58F7817D0D5C}"/>
-                </a:ext>
-              </a:extLst>
-            </p:cNvPr>
-            <p:cNvCxnSpPr>
-              <a:cxnSpLocks/>
-            </p:cNvCxnSpPr>
-            <p:nvPr/>
-          </p:nvCxnSpPr>
-          <p:spPr>
-            <a:xfrm>
-              <a:off x="1318661" y="5948413"/>
-              <a:ext cx="2396691" cy="0"/>
-            </a:xfrm>
-            <a:prstGeom prst="straightConnector1">
-              <a:avLst/>
-            </a:prstGeom>
-            <a:ln>
-              <a:tailEnd type="triangle"/>
-            </a:ln>
-          </p:spPr>
-          <p:style>
-            <a:lnRef idx="1">
-              <a:schemeClr val="accent1"/>
-            </a:lnRef>
-            <a:fillRef idx="0">
-              <a:schemeClr val="accent1"/>
-            </a:fillRef>
-            <a:effectRef idx="0">
-              <a:schemeClr val="accent1"/>
-            </a:effectRef>
-            <a:fontRef idx="minor">
-              <a:schemeClr val="tx1"/>
-            </a:fontRef>
-          </p:style>
-        </p:cxnSp>
-        <p:cxnSp>
-          <p:nvCxnSpPr>
-            <p:cNvPr id="16" name="Straight Arrow Connector 15">
-              <a:extLst>
-                <a:ext uri="{FF2B5EF4-FFF2-40B4-BE49-F238E27FC236}">
-                  <a16:creationId xmlns:a16="http://schemas.microsoft.com/office/drawing/2014/main" id="{BE739CCF-DB8F-DD2F-9420-6A73209E84D6}"/>
-                </a:ext>
-              </a:extLst>
-            </p:cNvPr>
-            <p:cNvCxnSpPr>
-              <a:cxnSpLocks/>
-            </p:cNvCxnSpPr>
-            <p:nvPr/>
-          </p:nvCxnSpPr>
-          <p:spPr>
-            <a:xfrm flipV="1">
-              <a:off x="1330694" y="4899259"/>
-              <a:ext cx="676174" cy="1049154"/>
-            </a:xfrm>
-            <a:prstGeom prst="straightConnector1">
-              <a:avLst/>
-            </a:prstGeom>
-            <a:ln>
-              <a:tailEnd type="triangle"/>
-            </a:ln>
-          </p:spPr>
-          <p:style>
-            <a:lnRef idx="1">
-              <a:schemeClr val="accent1"/>
-            </a:lnRef>
-            <a:fillRef idx="0">
-              <a:schemeClr val="accent1"/>
-            </a:fillRef>
-            <a:effectRef idx="0">
-              <a:schemeClr val="accent1"/>
-            </a:effectRef>
-            <a:fontRef idx="minor">
-              <a:schemeClr val="tx1"/>
-            </a:fontRef>
-          </p:style>
-        </p:cxnSp>
-        <p:cxnSp>
-          <p:nvCxnSpPr>
-            <p:cNvPr id="17" name="Straight Arrow Connector 16">
-              <a:extLst>
-                <a:ext uri="{FF2B5EF4-FFF2-40B4-BE49-F238E27FC236}">
-                  <a16:creationId xmlns:a16="http://schemas.microsoft.com/office/drawing/2014/main" id="{0B54A651-776C-C80B-14F6-4505FD3228F5}"/>
-                </a:ext>
-              </a:extLst>
-            </p:cNvPr>
-            <p:cNvCxnSpPr>
-              <a:cxnSpLocks/>
-            </p:cNvCxnSpPr>
-            <p:nvPr/>
-          </p:nvCxnSpPr>
-          <p:spPr>
-            <a:xfrm>
-              <a:off x="1323473" y="5948413"/>
-              <a:ext cx="947651" cy="535443"/>
-            </a:xfrm>
-            <a:prstGeom prst="straightConnector1">
-              <a:avLst/>
-            </a:prstGeom>
-            <a:ln>
-              <a:tailEnd type="triangle"/>
-            </a:ln>
-          </p:spPr>
-          <p:style>
-            <a:lnRef idx="1">
-              <a:schemeClr val="accent1"/>
-            </a:lnRef>
-            <a:fillRef idx="0">
-              <a:schemeClr val="accent1"/>
-            </a:fillRef>
-            <a:effectRef idx="0">
-              <a:schemeClr val="accent1"/>
-            </a:effectRef>
-            <a:fontRef idx="minor">
-              <a:schemeClr val="tx1"/>
-            </a:fontRef>
-          </p:style>
-        </p:cxnSp>
-        <mc:AlternateContent xmlns:mc="http://schemas.openxmlformats.org/markup-compatibility/2006" xmlns:a14="http://schemas.microsoft.com/office/drawing/2010/main">
-          <mc:Choice Requires="a14">
+        <mc:AlternateContent xmlns:mc="http://schemas.openxmlformats.org/markup-compatibility/2006">
+          <mc:Choice xmlns:a14="http://schemas.microsoft.com/office/drawing/2010/main" Requires="a14">
             <p:sp>
               <p:nvSpPr>
-                <p:cNvPr id="18" name="TextBox 17">
+                <p:cNvPr id="3" name="TextBox 2">
                   <a:extLst>
                     <a:ext uri="{FF2B5EF4-FFF2-40B4-BE49-F238E27FC236}">
-                      <a16:creationId xmlns:a16="http://schemas.microsoft.com/office/drawing/2014/main" id="{CF3333BF-4DA8-513B-E2CB-75395D6757B9}"/>
+                      <a16:creationId xmlns:a16="http://schemas.microsoft.com/office/drawing/2014/main" id="{E9AC7E2A-F8D0-70A0-FC7E-375C3DC4B50B}"/>
                     </a:ext>
                   </a:extLst>
                 </p:cNvPr>
@@ -18391,8 +17327,8 @@
               </p:nvSpPr>
               <p:spPr>
                 <a:xfrm>
-                  <a:off x="1330694" y="5043638"/>
-                  <a:ext cx="267097" cy="369332"/>
+                  <a:off x="855900" y="1770346"/>
+                  <a:ext cx="7494815" cy="1422954"/>
                 </a:xfrm>
                 <a:prstGeom prst="rect">
                   <a:avLst/>
@@ -18409,30 +17345,388 @@
                   <a14:m>
                     <m:oMathPara xmlns:m="http://schemas.openxmlformats.org/officeDocument/2006/math">
                       <m:oMathParaPr>
-                        <m:jc m:val="centerGroup"/>
+                        <m:jc m:val="left"/>
                       </m:oMathParaPr>
                       <m:oMath xmlns:m="http://schemas.openxmlformats.org/officeDocument/2006/math">
+                        <m:acc>
+                          <m:accPr>
+                            <m:chr m:val="̂"/>
+                            <m:ctrlPr>
+                              <a:rPr lang="en-US" sz="2800" b="0" i="1" smtClean="0">
+                                <a:latin typeface="Cambria Math" panose="02040503050406030204" pitchFamily="18" charset="0"/>
+                              </a:rPr>
+                            </m:ctrlPr>
+                          </m:accPr>
+                          <m:e>
+                            <m:r>
+                              <a:rPr lang="en-US" sz="2800" b="0" i="1" smtClean="0">
+                                <a:latin typeface="Cambria Math" panose="02040503050406030204" pitchFamily="18" charset="0"/>
+                              </a:rPr>
+                              <m:t>𝑟</m:t>
+                            </m:r>
+                          </m:e>
+                        </m:acc>
                         <m:r>
-                          <a:rPr lang="en-US" b="0" i="1" smtClean="0">
+                          <a:rPr lang="en-US" sz="2800" b="0" i="1" smtClean="0">
+                            <a:latin typeface="Cambria Math" panose="02040503050406030204" pitchFamily="18" charset="0"/>
+                          </a:rPr>
+                          <m:t>=</m:t>
+                        </m:r>
+                        <m:f>
+                          <m:fPr>
+                            <m:ctrlPr>
+                              <a:rPr lang="en-US" sz="2800" b="0" i="1" smtClean="0">
+                                <a:latin typeface="Cambria Math" panose="02040503050406030204" pitchFamily="18" charset="0"/>
+                              </a:rPr>
+                            </m:ctrlPr>
+                          </m:fPr>
+                          <m:num>
+                            <m:acc>
+                              <m:accPr>
+                                <m:chr m:val="⃗"/>
+                                <m:ctrlPr>
+                                  <a:rPr lang="en-US" sz="2800" b="0" i="1" smtClean="0">
+                                    <a:latin typeface="Cambria Math" panose="02040503050406030204" pitchFamily="18" charset="0"/>
+                                  </a:rPr>
+                                </m:ctrlPr>
+                              </m:accPr>
+                              <m:e>
+                                <m:r>
+                                  <a:rPr lang="en-US" sz="2800" b="0" i="1" smtClean="0">
+                                    <a:latin typeface="Cambria Math" panose="02040503050406030204" pitchFamily="18" charset="0"/>
+                                  </a:rPr>
+                                  <m:t>𝑟</m:t>
+                                </m:r>
+                              </m:e>
+                            </m:acc>
+                          </m:num>
+                          <m:den>
+                            <m:r>
+                              <a:rPr lang="en-US" sz="2800" b="0" i="1" smtClean="0">
+                                <a:latin typeface="Cambria Math" panose="02040503050406030204" pitchFamily="18" charset="0"/>
+                              </a:rPr>
+                              <m:t>𝑟</m:t>
+                            </m:r>
+                          </m:den>
+                        </m:f>
+                        <m:r>
+                          <a:rPr lang="en-US" sz="2800" b="0" i="1" smtClean="0">
+                            <a:latin typeface="Cambria Math" panose="02040503050406030204" pitchFamily="18" charset="0"/>
+                          </a:rPr>
+                          <m:t>, </m:t>
+                        </m:r>
+                        <m:acc>
+                          <m:accPr>
+                            <m:chr m:val="̂"/>
+                            <m:ctrlPr>
+                              <a:rPr lang="en-US" sz="2800" b="0" i="1" smtClean="0">
+                                <a:latin typeface="Cambria Math" panose="02040503050406030204" pitchFamily="18" charset="0"/>
+                              </a:rPr>
+                            </m:ctrlPr>
+                          </m:accPr>
+                          <m:e>
+                            <m:r>
+                              <a:rPr lang="en-US" sz="2800" b="0" i="1" smtClean="0">
+                                <a:latin typeface="Cambria Math" panose="02040503050406030204" pitchFamily="18" charset="0"/>
+                              </a:rPr>
+                              <m:t>𝜃</m:t>
+                            </m:r>
+                          </m:e>
+                        </m:acc>
+                        <m:r>
+                          <a:rPr lang="en-US" sz="2800" b="0" i="1" smtClean="0">
+                            <a:latin typeface="Cambria Math" panose="02040503050406030204" pitchFamily="18" charset="0"/>
+                          </a:rPr>
+                          <m:t>=−</m:t>
+                        </m:r>
+                        <m:r>
+                          <m:rPr>
+                            <m:sty m:val="p"/>
+                          </m:rPr>
+                          <a:rPr lang="en-US" sz="2800" b="0" i="1" smtClean="0">
+                            <a:latin typeface="Cambria Math" panose="02040503050406030204" pitchFamily="18" charset="0"/>
+                          </a:rPr>
+                          <m:t>sin</m:t>
+                        </m:r>
+                        <m:r>
+                          <a:rPr lang="en-US" sz="2800" b="0" i="1" smtClean="0">
+                            <a:latin typeface="Cambria Math" panose="02040503050406030204" pitchFamily="18" charset="0"/>
+                          </a:rPr>
+                          <m:t>𝜃</m:t>
+                        </m:r>
+                        <m:acc>
+                          <m:accPr>
+                            <m:chr m:val="̂"/>
+                            <m:ctrlPr>
+                              <a:rPr lang="en-US" sz="2800" b="0" i="1" smtClean="0">
+                                <a:latin typeface="Cambria Math" panose="02040503050406030204" pitchFamily="18" charset="0"/>
+                              </a:rPr>
+                            </m:ctrlPr>
+                          </m:accPr>
+                          <m:e>
+                            <m:r>
+                              <a:rPr lang="en-US" sz="2800" b="0" i="1" smtClean="0">
+                                <a:latin typeface="Cambria Math" panose="02040503050406030204" pitchFamily="18" charset="0"/>
+                              </a:rPr>
+                              <m:t>𝑥</m:t>
+                            </m:r>
+                          </m:e>
+                        </m:acc>
+                        <m:r>
+                          <a:rPr lang="en-US" sz="2800" b="0" i="1" smtClean="0">
+                            <a:latin typeface="Cambria Math" panose="02040503050406030204" pitchFamily="18" charset="0"/>
+                          </a:rPr>
+                          <m:t>+</m:t>
+                        </m:r>
+                        <m:r>
+                          <m:rPr>
+                            <m:sty m:val="p"/>
+                          </m:rPr>
+                          <a:rPr lang="en-US" sz="2800" b="0" i="1" smtClean="0">
+                            <a:latin typeface="Cambria Math" panose="02040503050406030204" pitchFamily="18" charset="0"/>
+                          </a:rPr>
+                          <m:t>cos</m:t>
+                        </m:r>
+                        <m:r>
+                          <a:rPr lang="en-US" sz="2800" b="0" i="1" smtClean="0">
+                            <a:latin typeface="Cambria Math" panose="02040503050406030204" pitchFamily="18" charset="0"/>
+                          </a:rPr>
+                          <m:t>𝜃</m:t>
+                        </m:r>
+                        <m:acc>
+                          <m:accPr>
+                            <m:chr m:val="̂"/>
+                            <m:ctrlPr>
+                              <a:rPr lang="en-US" sz="2800" b="0" i="1" smtClean="0">
+                                <a:latin typeface="Cambria Math" panose="02040503050406030204" pitchFamily="18" charset="0"/>
+                              </a:rPr>
+                            </m:ctrlPr>
+                          </m:accPr>
+                          <m:e>
+                            <m:r>
+                              <a:rPr lang="en-US" sz="2800" b="0" i="1" smtClean="0">
+                                <a:latin typeface="Cambria Math" panose="02040503050406030204" pitchFamily="18" charset="0"/>
+                              </a:rPr>
+                              <m:t>𝑦</m:t>
+                            </m:r>
+                          </m:e>
+                        </m:acc>
+                        <m:r>
+                          <a:rPr lang="en-US" sz="2800" b="0" i="1" smtClean="0">
+                            <a:latin typeface="Cambria Math" panose="02040503050406030204" pitchFamily="18" charset="0"/>
+                          </a:rPr>
+                          <m:t>, </m:t>
+                        </m:r>
+                      </m:oMath>
+                    </m:oMathPara>
+                  </a14:m>
+                  <a:endParaRPr lang="en-US" sz="2800" b="0" i="1" dirty="0">
+                    <a:latin typeface="Cambria Math" panose="02040503050406030204" pitchFamily="18" charset="0"/>
+                  </a:endParaRPr>
+                </a:p>
+                <a:p>
+                  <a:pPr/>
+                  <a14:m>
+                    <m:oMathPara xmlns:m="http://schemas.openxmlformats.org/officeDocument/2006/math">
+                      <m:oMathParaPr>
+                        <m:jc m:val="left"/>
+                      </m:oMathParaPr>
+                      <m:oMath xmlns:m="http://schemas.openxmlformats.org/officeDocument/2006/math">
+                        <m:acc>
+                          <m:accPr>
+                            <m:chr m:val="̂"/>
+                            <m:ctrlPr>
+                              <a:rPr lang="en-US" sz="2800" b="0" i="1" smtClean="0">
+                                <a:latin typeface="Cambria Math" panose="02040503050406030204" pitchFamily="18" charset="0"/>
+                              </a:rPr>
+                            </m:ctrlPr>
+                          </m:accPr>
+                          <m:e>
+                            <m:r>
+                              <a:rPr lang="en-US" sz="2800" b="0" i="1" smtClean="0">
+                                <a:latin typeface="Cambria Math" panose="02040503050406030204" pitchFamily="18" charset="0"/>
+                              </a:rPr>
+                              <m:t>𝜙</m:t>
+                            </m:r>
+                          </m:e>
+                        </m:acc>
+                        <m:r>
+                          <a:rPr lang="en-US" sz="2800" b="0" i="1" smtClean="0">
+                            <a:latin typeface="Cambria Math" panose="02040503050406030204" pitchFamily="18" charset="0"/>
+                          </a:rPr>
+                          <m:t>=</m:t>
+                        </m:r>
+                        <m:r>
+                          <m:rPr>
+                            <m:sty m:val="p"/>
+                          </m:rPr>
+                          <a:rPr lang="en-US" sz="2800" b="0" i="1" smtClean="0">
+                            <a:latin typeface="Cambria Math" panose="02040503050406030204" pitchFamily="18" charset="0"/>
+                          </a:rPr>
+                          <m:t>cos</m:t>
+                        </m:r>
+                        <m:r>
+                          <a:rPr lang="en-US" sz="2800" b="0" i="1" smtClean="0">
+                            <a:latin typeface="Cambria Math" panose="02040503050406030204" pitchFamily="18" charset="0"/>
+                          </a:rPr>
+                          <m:t> </m:t>
+                        </m:r>
+                        <m:r>
+                          <a:rPr lang="en-US" sz="2800" b="0" i="1" smtClean="0">
                             <a:latin typeface="Cambria Math" panose="02040503050406030204" pitchFamily="18" charset="0"/>
                           </a:rPr>
                           <m:t>𝜙</m:t>
                         </m:r>
+                        <m:d>
+                          <m:dPr>
+                            <m:ctrlPr>
+                              <a:rPr lang="en-US" sz="2800" b="0" i="1" smtClean="0">
+                                <a:latin typeface="Cambria Math" panose="02040503050406030204" pitchFamily="18" charset="0"/>
+                              </a:rPr>
+                            </m:ctrlPr>
+                          </m:dPr>
+                          <m:e>
+                            <m:r>
+                              <m:rPr>
+                                <m:sty m:val="p"/>
+                              </m:rPr>
+                              <a:rPr lang="en-US" sz="2800" b="0" i="1" smtClean="0">
+                                <a:latin typeface="Cambria Math" panose="02040503050406030204" pitchFamily="18" charset="0"/>
+                              </a:rPr>
+                              <m:t>cos</m:t>
+                            </m:r>
+                            <m:r>
+                              <a:rPr lang="en-US" sz="2800" b="0" i="1" smtClean="0">
+                                <a:latin typeface="Cambria Math" panose="02040503050406030204" pitchFamily="18" charset="0"/>
+                              </a:rPr>
+                              <m:t>𝜃</m:t>
+                            </m:r>
+                            <m:acc>
+                              <m:accPr>
+                                <m:chr m:val="̂"/>
+                                <m:ctrlPr>
+                                  <a:rPr lang="en-US" sz="2800" b="0" i="1" smtClean="0">
+                                    <a:latin typeface="Cambria Math" panose="02040503050406030204" pitchFamily="18" charset="0"/>
+                                  </a:rPr>
+                                </m:ctrlPr>
+                              </m:accPr>
+                              <m:e>
+                                <m:r>
+                                  <a:rPr lang="en-US" sz="2800" b="0" i="1" smtClean="0">
+                                    <a:latin typeface="Cambria Math" panose="02040503050406030204" pitchFamily="18" charset="0"/>
+                                  </a:rPr>
+                                  <m:t>𝑥</m:t>
+                                </m:r>
+                              </m:e>
+                            </m:acc>
+                            <m:r>
+                              <m:rPr>
+                                <m:nor/>
+                              </m:rPr>
+                              <a:rPr lang="en-US" sz="2800" b="0" dirty="0"/>
+                              <m:t>+ </m:t>
+                            </m:r>
+                            <m:r>
+                              <m:rPr>
+                                <m:sty m:val="p"/>
+                              </m:rPr>
+                              <a:rPr lang="en-US" sz="2800" b="0" i="1" smtClean="0">
+                                <a:latin typeface="Cambria Math" panose="02040503050406030204" pitchFamily="18" charset="0"/>
+                              </a:rPr>
+                              <m:t>sin</m:t>
+                            </m:r>
+                            <m:r>
+                              <a:rPr lang="en-US" sz="2800" b="0" i="1" smtClean="0">
+                                <a:latin typeface="Cambria Math" panose="02040503050406030204" pitchFamily="18" charset="0"/>
+                              </a:rPr>
+                              <m:t>𝜃</m:t>
+                            </m:r>
+                            <m:acc>
+                              <m:accPr>
+                                <m:chr m:val="̂"/>
+                                <m:ctrlPr>
+                                  <a:rPr lang="en-US" sz="2800" b="0" i="1" smtClean="0">
+                                    <a:latin typeface="Cambria Math" panose="02040503050406030204" pitchFamily="18" charset="0"/>
+                                  </a:rPr>
+                                </m:ctrlPr>
+                              </m:accPr>
+                              <m:e>
+                                <m:r>
+                                  <a:rPr lang="en-US" sz="2800" b="0" i="1" smtClean="0">
+                                    <a:latin typeface="Cambria Math" panose="02040503050406030204" pitchFamily="18" charset="0"/>
+                                  </a:rPr>
+                                  <m:t>𝑦</m:t>
+                                </m:r>
+                              </m:e>
+                            </m:acc>
+                          </m:e>
+                        </m:d>
+                        <m:r>
+                          <a:rPr lang="en-US" sz="2800" b="0" i="1" smtClean="0">
+                            <a:latin typeface="Cambria Math" panose="02040503050406030204" pitchFamily="18" charset="0"/>
+                          </a:rPr>
+                          <m:t>−</m:t>
+                        </m:r>
+                        <m:r>
+                          <m:rPr>
+                            <m:sty m:val="p"/>
+                          </m:rPr>
+                          <a:rPr lang="en-US" sz="2800" b="0" i="1" smtClean="0">
+                            <a:latin typeface="Cambria Math" panose="02040503050406030204" pitchFamily="18" charset="0"/>
+                          </a:rPr>
+                          <m:t>sin</m:t>
+                        </m:r>
+                        <m:r>
+                          <a:rPr lang="en-US" sz="2800" b="0" i="1" smtClean="0">
+                            <a:latin typeface="Cambria Math" panose="02040503050406030204" pitchFamily="18" charset="0"/>
+                          </a:rPr>
+                          <m:t> </m:t>
+                        </m:r>
+                        <m:r>
+                          <a:rPr lang="en-US" sz="2800" b="0" i="1" smtClean="0">
+                            <a:latin typeface="Cambria Math" panose="02040503050406030204" pitchFamily="18" charset="0"/>
+                          </a:rPr>
+                          <m:t>𝜙</m:t>
+                        </m:r>
+                        <m:r>
+                          <a:rPr lang="en-US" sz="2800" b="0" i="1" smtClean="0">
+                            <a:latin typeface="Cambria Math" panose="02040503050406030204" pitchFamily="18" charset="0"/>
+                          </a:rPr>
+                          <m:t> </m:t>
+                        </m:r>
+                        <m:acc>
+                          <m:accPr>
+                            <m:chr m:val="̂"/>
+                            <m:ctrlPr>
+                              <a:rPr lang="en-US" sz="2800" b="0" i="1" smtClean="0">
+                                <a:latin typeface="Cambria Math" panose="02040503050406030204" pitchFamily="18" charset="0"/>
+                              </a:rPr>
+                            </m:ctrlPr>
+                          </m:accPr>
+                          <m:e>
+                            <m:r>
+                              <a:rPr lang="en-US" sz="2800" b="0" i="1" smtClean="0">
+                                <a:latin typeface="Cambria Math" panose="02040503050406030204" pitchFamily="18" charset="0"/>
+                              </a:rPr>
+                              <m:t>𝑧</m:t>
+                            </m:r>
+                          </m:e>
+                        </m:acc>
                       </m:oMath>
                     </m:oMathPara>
                   </a14:m>
-                  <a:endParaRPr lang="en-US" dirty="0"/>
+                  <a:endParaRPr lang="en-US" sz="2800" b="0" dirty="0"/>
                 </a:p>
               </p:txBody>
             </p:sp>
           </mc:Choice>
-          <mc:Fallback xmlns="">
+          <mc:Fallback>
             <p:sp>
               <p:nvSpPr>
-                <p:cNvPr id="18" name="TextBox 17">
+                <p:cNvPr id="3" name="TextBox 2">
                   <a:extLst>
                     <a:ext uri="{FF2B5EF4-FFF2-40B4-BE49-F238E27FC236}">
-                      <a16:creationId xmlns:a16="http://schemas.microsoft.com/office/drawing/2014/main" id="{CF3333BF-4DA8-513B-E2CB-75395D6757B9}"/>
+                      <a16:creationId xmlns:a16="http://schemas.microsoft.com/office/drawing/2014/main" id="{E9AC7E2A-F8D0-70A0-FC7E-375C3DC4B50B}"/>
                     </a:ext>
                   </a:extLst>
                 </p:cNvPr>
@@ -18443,16 +17737,16 @@
               </p:nvSpPr>
               <p:spPr>
                 <a:xfrm>
-                  <a:off x="1330694" y="5043638"/>
-                  <a:ext cx="267097" cy="369332"/>
+                  <a:off x="855900" y="1770346"/>
+                  <a:ext cx="7494815" cy="1422954"/>
                 </a:xfrm>
                 <a:prstGeom prst="rect">
                   <a:avLst/>
                 </a:prstGeom>
                 <a:blipFill>
-                  <a:blip r:embed="rId6"/>
+                  <a:blip r:embed="rId3"/>
                   <a:stretch>
-                    <a:fillRect l="-5556" r="-63889" b="-19298"/>
+                    <a:fillRect/>
                   </a:stretch>
                 </a:blipFill>
               </p:spPr>
@@ -18471,114 +17765,845 @@
             </p:sp>
           </mc:Fallback>
         </mc:AlternateContent>
-        <mc:AlternateContent xmlns:mc="http://schemas.openxmlformats.org/markup-compatibility/2006" xmlns:a14="http://schemas.microsoft.com/office/drawing/2010/main">
-          <mc:Choice Requires="a14">
-            <p:sp>
-              <p:nvSpPr>
-                <p:cNvPr id="19" name="TextBox 18">
-                  <a:extLst>
-                    <a:ext uri="{FF2B5EF4-FFF2-40B4-BE49-F238E27FC236}">
-                      <a16:creationId xmlns:a16="http://schemas.microsoft.com/office/drawing/2014/main" id="{3D23C814-E423-2CD8-B9D0-A97BF856C003}"/>
-                    </a:ext>
-                  </a:extLst>
-                </p:cNvPr>
-                <p:cNvSpPr txBox="1"/>
-                <p:nvPr/>
-              </p:nvSpPr>
-              <p:spPr>
-                <a:xfrm>
-                  <a:off x="3407343" y="5601904"/>
-                  <a:ext cx="510139" cy="369332"/>
-                </a:xfrm>
-                <a:prstGeom prst="rect">
-                  <a:avLst/>
-                </a:prstGeom>
-                <a:noFill/>
-              </p:spPr>
-              <p:txBody>
-                <a:bodyPr wrap="square" rtlCol="0">
-                  <a:spAutoFit/>
-                </a:bodyPr>
-                <a:lstStyle/>
-                <a:p>
-                  <a:pPr/>
-                  <a14:m>
-                    <m:oMathPara xmlns:m="http://schemas.openxmlformats.org/officeDocument/2006/math">
-                      <m:oMathParaPr>
-                        <m:jc m:val="centerGroup"/>
-                      </m:oMathParaPr>
-                      <m:oMath xmlns:m="http://schemas.openxmlformats.org/officeDocument/2006/math">
-                        <m:acc>
-                          <m:accPr>
-                            <m:chr m:val="⃗"/>
-                            <m:ctrlPr>
-                              <a:rPr lang="en-US" b="0" i="1" smtClean="0">
-                                <a:latin typeface="Cambria Math" panose="02040503050406030204" pitchFamily="18" charset="0"/>
-                              </a:rPr>
-                            </m:ctrlPr>
-                          </m:accPr>
-                          <m:e>
-                            <m:r>
-                              <a:rPr lang="en-US" b="0" i="1" smtClean="0">
-                                <a:latin typeface="Cambria Math" panose="02040503050406030204" pitchFamily="18" charset="0"/>
-                              </a:rPr>
-                              <m:t>𝜌</m:t>
-                            </m:r>
-                          </m:e>
-                        </m:acc>
-                      </m:oMath>
-                    </m:oMathPara>
-                  </a14:m>
-                  <a:endParaRPr lang="en-US" dirty="0"/>
-                </a:p>
-              </p:txBody>
-            </p:sp>
-          </mc:Choice>
-          <mc:Fallback xmlns="">
-            <p:sp>
-              <p:nvSpPr>
-                <p:cNvPr id="19" name="TextBox 18">
-                  <a:extLst>
-                    <a:ext uri="{FF2B5EF4-FFF2-40B4-BE49-F238E27FC236}">
-                      <a16:creationId xmlns:a16="http://schemas.microsoft.com/office/drawing/2014/main" id="{3D23C814-E423-2CD8-B9D0-A97BF856C003}"/>
-                    </a:ext>
-                  </a:extLst>
-                </p:cNvPr>
-                <p:cNvSpPr txBox="1">
-                  <a:spLocks noRot="1" noChangeAspect="1" noMove="1" noResize="1" noEditPoints="1" noAdjustHandles="1" noChangeArrowheads="1" noChangeShapeType="1" noTextEdit="1"/>
-                </p:cNvSpPr>
-                <p:nvPr/>
-              </p:nvSpPr>
-              <p:spPr>
-                <a:xfrm>
-                  <a:off x="3407343" y="5601904"/>
-                  <a:ext cx="510139" cy="369332"/>
-                </a:xfrm>
-                <a:prstGeom prst="rect">
-                  <a:avLst/>
-                </a:prstGeom>
-                <a:blipFill>
-                  <a:blip r:embed="rId7"/>
-                  <a:stretch>
-                    <a:fillRect t="-25000" r="-29412" b="-14286"/>
-                  </a:stretch>
-                </a:blipFill>
-              </p:spPr>
-              <p:txBody>
-                <a:bodyPr/>
-                <a:lstStyle/>
-                <a:p>
-                  <a:r>
-                    <a:rPr lang="en-US">
-                      <a:noFill/>
-                    </a:rPr>
-                    <a:t> </a:t>
-                  </a:r>
-                </a:p>
-              </p:txBody>
-            </p:sp>
-          </mc:Fallback>
-        </mc:AlternateContent>
+        <p:grpSp>
+          <p:nvGrpSpPr>
+            <p:cNvPr id="4" name="Group 3">
+              <a:extLst>
+                <a:ext uri="{FF2B5EF4-FFF2-40B4-BE49-F238E27FC236}">
+                  <a16:creationId xmlns:a16="http://schemas.microsoft.com/office/drawing/2014/main" id="{474CE678-4D3E-F117-67EC-4AD72CA0BDD7}"/>
+                </a:ext>
+              </a:extLst>
+            </p:cNvPr>
+            <p:cNvGrpSpPr/>
+            <p:nvPr/>
+          </p:nvGrpSpPr>
+          <p:grpSpPr>
+            <a:xfrm>
+              <a:off x="7575079" y="844715"/>
+              <a:ext cx="1575344" cy="2040527"/>
+              <a:chOff x="9155225" y="1201103"/>
+              <a:chExt cx="1575344" cy="2040527"/>
+            </a:xfrm>
+          </p:grpSpPr>
+          <p:cxnSp>
+            <p:nvCxnSpPr>
+              <p:cNvPr id="5" name="Straight Arrow Connector 4">
+                <a:extLst>
+                  <a:ext uri="{FF2B5EF4-FFF2-40B4-BE49-F238E27FC236}">
+                    <a16:creationId xmlns:a16="http://schemas.microsoft.com/office/drawing/2014/main" id="{6A224DAC-7903-8F6A-1943-9060D5ADC959}"/>
+                  </a:ext>
+                </a:extLst>
+              </p:cNvPr>
+              <p:cNvCxnSpPr/>
+              <p:nvPr/>
+            </p:nvCxnSpPr>
+            <p:spPr>
+              <a:xfrm>
+                <a:off x="9221002" y="2709834"/>
+                <a:ext cx="1443790" cy="531796"/>
+              </a:xfrm>
+              <a:prstGeom prst="straightConnector1">
+                <a:avLst/>
+              </a:prstGeom>
+              <a:ln>
+                <a:tailEnd type="triangle"/>
+              </a:ln>
+            </p:spPr>
+            <p:style>
+              <a:lnRef idx="1">
+                <a:schemeClr val="accent1"/>
+              </a:lnRef>
+              <a:fillRef idx="0">
+                <a:schemeClr val="accent1"/>
+              </a:fillRef>
+              <a:effectRef idx="0">
+                <a:schemeClr val="accent1"/>
+              </a:effectRef>
+              <a:fontRef idx="minor">
+                <a:schemeClr val="tx1"/>
+              </a:fontRef>
+            </p:style>
+          </p:cxnSp>
+          <p:cxnSp>
+            <p:nvCxnSpPr>
+              <p:cNvPr id="6" name="Straight Arrow Connector 5">
+                <a:extLst>
+                  <a:ext uri="{FF2B5EF4-FFF2-40B4-BE49-F238E27FC236}">
+                    <a16:creationId xmlns:a16="http://schemas.microsoft.com/office/drawing/2014/main" id="{EE80AED7-3E96-ADDD-BA90-2C0C24FB551B}"/>
+                  </a:ext>
+                </a:extLst>
+              </p:cNvPr>
+              <p:cNvCxnSpPr>
+                <a:cxnSpLocks/>
+              </p:cNvCxnSpPr>
+              <p:nvPr/>
+            </p:nvCxnSpPr>
+            <p:spPr>
+              <a:xfrm flipV="1">
+                <a:off x="9221002" y="1757061"/>
+                <a:ext cx="1021882" cy="966057"/>
+              </a:xfrm>
+              <a:prstGeom prst="straightConnector1">
+                <a:avLst/>
+              </a:prstGeom>
+              <a:ln>
+                <a:tailEnd type="triangle"/>
+              </a:ln>
+            </p:spPr>
+            <p:style>
+              <a:lnRef idx="1">
+                <a:schemeClr val="accent1"/>
+              </a:lnRef>
+              <a:fillRef idx="0">
+                <a:schemeClr val="accent1"/>
+              </a:fillRef>
+              <a:effectRef idx="0">
+                <a:schemeClr val="accent1"/>
+              </a:effectRef>
+              <a:fontRef idx="minor">
+                <a:schemeClr val="tx1"/>
+              </a:fontRef>
+            </p:style>
+          </p:cxnSp>
+          <p:cxnSp>
+            <p:nvCxnSpPr>
+              <p:cNvPr id="7" name="Straight Arrow Connector 6">
+                <a:extLst>
+                  <a:ext uri="{FF2B5EF4-FFF2-40B4-BE49-F238E27FC236}">
+                    <a16:creationId xmlns:a16="http://schemas.microsoft.com/office/drawing/2014/main" id="{771A9657-0995-7AF7-F7DB-FF3B83ED7635}"/>
+                  </a:ext>
+                </a:extLst>
+              </p:cNvPr>
+              <p:cNvCxnSpPr>
+                <a:cxnSpLocks/>
+              </p:cNvCxnSpPr>
+              <p:nvPr/>
+            </p:nvCxnSpPr>
+            <p:spPr>
+              <a:xfrm flipV="1">
+                <a:off x="9221002" y="1201103"/>
+                <a:ext cx="0" cy="1508731"/>
+              </a:xfrm>
+              <a:prstGeom prst="straightConnector1">
+                <a:avLst/>
+              </a:prstGeom>
+              <a:ln>
+                <a:tailEnd type="triangle"/>
+              </a:ln>
+            </p:spPr>
+            <p:style>
+              <a:lnRef idx="1">
+                <a:schemeClr val="accent1"/>
+              </a:lnRef>
+              <a:fillRef idx="0">
+                <a:schemeClr val="accent1"/>
+              </a:fillRef>
+              <a:effectRef idx="0">
+                <a:schemeClr val="accent1"/>
+              </a:effectRef>
+              <a:fontRef idx="minor">
+                <a:schemeClr val="tx1"/>
+              </a:fontRef>
+            </p:style>
+          </p:cxnSp>
+          <p:cxnSp>
+            <p:nvCxnSpPr>
+              <p:cNvPr id="8" name="Straight Arrow Connector 7">
+                <a:extLst>
+                  <a:ext uri="{FF2B5EF4-FFF2-40B4-BE49-F238E27FC236}">
+                    <a16:creationId xmlns:a16="http://schemas.microsoft.com/office/drawing/2014/main" id="{138060BF-5C0A-36E2-983A-46C81FD7256D}"/>
+                  </a:ext>
+                </a:extLst>
+              </p:cNvPr>
+              <p:cNvCxnSpPr>
+                <a:cxnSpLocks/>
+              </p:cNvCxnSpPr>
+              <p:nvPr/>
+            </p:nvCxnSpPr>
+            <p:spPr>
+              <a:xfrm flipV="1">
+                <a:off x="9221002" y="1607419"/>
+                <a:ext cx="598371" cy="1115699"/>
+              </a:xfrm>
+              <a:prstGeom prst="straightConnector1">
+                <a:avLst/>
+              </a:prstGeom>
+              <a:ln>
+                <a:tailEnd type="triangle"/>
+              </a:ln>
+            </p:spPr>
+            <p:style>
+              <a:lnRef idx="1">
+                <a:schemeClr val="accent2"/>
+              </a:lnRef>
+              <a:fillRef idx="0">
+                <a:schemeClr val="accent2"/>
+              </a:fillRef>
+              <a:effectRef idx="0">
+                <a:schemeClr val="accent2"/>
+              </a:effectRef>
+              <a:fontRef idx="minor">
+                <a:schemeClr val="tx1"/>
+              </a:fontRef>
+            </p:style>
+          </p:cxnSp>
+          <p:cxnSp>
+            <p:nvCxnSpPr>
+              <p:cNvPr id="9" name="Straight Arrow Connector 8">
+                <a:extLst>
+                  <a:ext uri="{FF2B5EF4-FFF2-40B4-BE49-F238E27FC236}">
+                    <a16:creationId xmlns:a16="http://schemas.microsoft.com/office/drawing/2014/main" id="{145CBAC4-B815-A563-8AD1-627BCC227585}"/>
+                  </a:ext>
+                </a:extLst>
+              </p:cNvPr>
+              <p:cNvCxnSpPr>
+                <a:cxnSpLocks/>
+              </p:cNvCxnSpPr>
+              <p:nvPr/>
+            </p:nvCxnSpPr>
+            <p:spPr>
+              <a:xfrm flipV="1">
+                <a:off x="9221002" y="1607419"/>
+                <a:ext cx="598371" cy="77002"/>
+              </a:xfrm>
+              <a:prstGeom prst="straightConnector1">
+                <a:avLst/>
+              </a:prstGeom>
+              <a:ln>
+                <a:tailEnd type="triangle"/>
+              </a:ln>
+            </p:spPr>
+            <p:style>
+              <a:lnRef idx="1">
+                <a:schemeClr val="accent1"/>
+              </a:lnRef>
+              <a:fillRef idx="0">
+                <a:schemeClr val="accent1"/>
+              </a:fillRef>
+              <a:effectRef idx="0">
+                <a:schemeClr val="accent1"/>
+              </a:effectRef>
+              <a:fontRef idx="minor">
+                <a:schemeClr val="tx1"/>
+              </a:fontRef>
+            </p:style>
+          </p:cxnSp>
+          <mc:AlternateContent xmlns:mc="http://schemas.openxmlformats.org/markup-compatibility/2006" xmlns:a14="http://schemas.microsoft.com/office/drawing/2010/main">
+            <mc:Choice Requires="a14">
+              <p:sp>
+                <p:nvSpPr>
+                  <p:cNvPr id="10" name="TextBox 9">
+                    <a:extLst>
+                      <a:ext uri="{FF2B5EF4-FFF2-40B4-BE49-F238E27FC236}">
+                        <a16:creationId xmlns:a16="http://schemas.microsoft.com/office/drawing/2014/main" id="{8FD8700A-1887-1D1B-D335-E1C53C06F9A4}"/>
+                      </a:ext>
+                    </a:extLst>
+                  </p:cNvPr>
+                  <p:cNvSpPr txBox="1"/>
+                  <p:nvPr/>
+                </p:nvSpPr>
+                <p:spPr>
+                  <a:xfrm flipH="1">
+                    <a:off x="9155225" y="1975790"/>
+                    <a:ext cx="442766" cy="378956"/>
+                  </a:xfrm>
+                  <a:prstGeom prst="rect">
+                    <a:avLst/>
+                  </a:prstGeom>
+                  <a:noFill/>
+                </p:spPr>
+                <p:txBody>
+                  <a:bodyPr wrap="square" rtlCol="0">
+                    <a:spAutoFit/>
+                  </a:bodyPr>
+                  <a:lstStyle/>
+                  <a:p>
+                    <a:pPr/>
+                    <a14:m>
+                      <m:oMathPara xmlns:m="http://schemas.openxmlformats.org/officeDocument/2006/math">
+                        <m:oMathParaPr>
+                          <m:jc m:val="centerGroup"/>
+                        </m:oMathParaPr>
+                        <m:oMath xmlns:m="http://schemas.openxmlformats.org/officeDocument/2006/math">
+                          <m:r>
+                            <a:rPr lang="en-US" b="0" i="1" smtClean="0">
+                              <a:latin typeface="Cambria Math" panose="02040503050406030204" pitchFamily="18" charset="0"/>
+                            </a:rPr>
+                            <m:t>𝜙</m:t>
+                          </m:r>
+                        </m:oMath>
+                      </m:oMathPara>
+                    </a14:m>
+                    <a:endParaRPr lang="en-US" dirty="0"/>
+                  </a:p>
+                </p:txBody>
+              </p:sp>
+            </mc:Choice>
+            <mc:Fallback xmlns="">
+              <p:sp>
+                <p:nvSpPr>
+                  <p:cNvPr id="10" name="TextBox 9">
+                    <a:extLst>
+                      <a:ext uri="{FF2B5EF4-FFF2-40B4-BE49-F238E27FC236}">
+                        <a16:creationId xmlns:a16="http://schemas.microsoft.com/office/drawing/2014/main" id="{8FD8700A-1887-1D1B-D335-E1C53C06F9A4}"/>
+                      </a:ext>
+                    </a:extLst>
+                  </p:cNvPr>
+                  <p:cNvSpPr txBox="1">
+                    <a:spLocks noRot="1" noChangeAspect="1" noMove="1" noResize="1" noEditPoints="1" noAdjustHandles="1" noChangeArrowheads="1" noChangeShapeType="1" noTextEdit="1"/>
+                  </p:cNvSpPr>
+                  <p:nvPr/>
+                </p:nvSpPr>
+                <p:spPr>
+                  <a:xfrm flipH="1">
+                    <a:off x="9155225" y="1975790"/>
+                    <a:ext cx="442766" cy="378956"/>
+                  </a:xfrm>
+                  <a:prstGeom prst="rect">
+                    <a:avLst/>
+                  </a:prstGeom>
+                  <a:blipFill>
+                    <a:blip r:embed="rId4"/>
+                    <a:stretch>
+                      <a:fillRect b="-9677"/>
+                    </a:stretch>
+                  </a:blipFill>
+                </p:spPr>
+                <p:txBody>
+                  <a:bodyPr/>
+                  <a:lstStyle/>
+                  <a:p>
+                    <a:r>
+                      <a:rPr lang="en-US">
+                        <a:noFill/>
+                      </a:rPr>
+                      <a:t> </a:t>
+                    </a:r>
+                  </a:p>
+                </p:txBody>
+              </p:sp>
+            </mc:Fallback>
+          </mc:AlternateContent>
+          <mc:AlternateContent xmlns:mc="http://schemas.openxmlformats.org/markup-compatibility/2006" xmlns:a14="http://schemas.microsoft.com/office/drawing/2010/main">
+            <mc:Choice Requires="a14">
+              <p:sp>
+                <p:nvSpPr>
+                  <p:cNvPr id="11" name="TextBox 10">
+                    <a:extLst>
+                      <a:ext uri="{FF2B5EF4-FFF2-40B4-BE49-F238E27FC236}">
+                        <a16:creationId xmlns:a16="http://schemas.microsoft.com/office/drawing/2014/main" id="{0BA6EE28-443E-C85C-D253-1769971899B8}"/>
+                      </a:ext>
+                    </a:extLst>
+                  </p:cNvPr>
+                  <p:cNvSpPr txBox="1"/>
+                  <p:nvPr/>
+                </p:nvSpPr>
+                <p:spPr>
+                  <a:xfrm>
+                    <a:off x="9454418" y="1572395"/>
+                    <a:ext cx="405865" cy="369332"/>
+                  </a:xfrm>
+                  <a:prstGeom prst="rect">
+                    <a:avLst/>
+                  </a:prstGeom>
+                  <a:noFill/>
+                </p:spPr>
+                <p:txBody>
+                  <a:bodyPr wrap="square" rtlCol="0">
+                    <a:spAutoFit/>
+                  </a:bodyPr>
+                  <a:lstStyle/>
+                  <a:p>
+                    <a:pPr/>
+                    <a14:m>
+                      <m:oMathPara xmlns:m="http://schemas.openxmlformats.org/officeDocument/2006/math">
+                        <m:oMathParaPr>
+                          <m:jc m:val="centerGroup"/>
+                        </m:oMathParaPr>
+                        <m:oMath xmlns:m="http://schemas.openxmlformats.org/officeDocument/2006/math">
+                          <m:r>
+                            <a:rPr lang="en-US" b="0" i="1" smtClean="0">
+                              <a:latin typeface="Cambria Math" panose="02040503050406030204" pitchFamily="18" charset="0"/>
+                            </a:rPr>
+                            <m:t>𝜃</m:t>
+                          </m:r>
+                        </m:oMath>
+                      </m:oMathPara>
+                    </a14:m>
+                    <a:endParaRPr lang="en-US" dirty="0"/>
+                  </a:p>
+                </p:txBody>
+              </p:sp>
+            </mc:Choice>
+            <mc:Fallback xmlns="">
+              <p:sp>
+                <p:nvSpPr>
+                  <p:cNvPr id="11" name="TextBox 10">
+                    <a:extLst>
+                      <a:ext uri="{FF2B5EF4-FFF2-40B4-BE49-F238E27FC236}">
+                        <a16:creationId xmlns:a16="http://schemas.microsoft.com/office/drawing/2014/main" id="{0BA6EE28-443E-C85C-D253-1769971899B8}"/>
+                      </a:ext>
+                    </a:extLst>
+                  </p:cNvPr>
+                  <p:cNvSpPr txBox="1">
+                    <a:spLocks noRot="1" noChangeAspect="1" noMove="1" noResize="1" noEditPoints="1" noAdjustHandles="1" noChangeArrowheads="1" noChangeShapeType="1" noTextEdit="1"/>
+                  </p:cNvSpPr>
+                  <p:nvPr/>
+                </p:nvSpPr>
+                <p:spPr>
+                  <a:xfrm>
+                    <a:off x="9454418" y="1572395"/>
+                    <a:ext cx="405865" cy="369332"/>
+                  </a:xfrm>
+                  <a:prstGeom prst="rect">
+                    <a:avLst/>
+                  </a:prstGeom>
+                  <a:blipFill>
+                    <a:blip r:embed="rId5"/>
+                    <a:stretch>
+                      <a:fillRect/>
+                    </a:stretch>
+                  </a:blipFill>
+                </p:spPr>
+                <p:txBody>
+                  <a:bodyPr/>
+                  <a:lstStyle/>
+                  <a:p>
+                    <a:r>
+                      <a:rPr lang="en-US">
+                        <a:noFill/>
+                      </a:rPr>
+                      <a:t> </a:t>
+                    </a:r>
+                  </a:p>
+                </p:txBody>
+              </p:sp>
+            </mc:Fallback>
+          </mc:AlternateContent>
+          <p:cxnSp>
+            <p:nvCxnSpPr>
+              <p:cNvPr id="12" name="Straight Connector 11">
+                <a:extLst>
+                  <a:ext uri="{FF2B5EF4-FFF2-40B4-BE49-F238E27FC236}">
+                    <a16:creationId xmlns:a16="http://schemas.microsoft.com/office/drawing/2014/main" id="{6C2F3F47-2CD0-37A7-3142-CF3E670C7A10}"/>
+                  </a:ext>
+                </a:extLst>
+              </p:cNvPr>
+              <p:cNvCxnSpPr/>
+              <p:nvPr/>
+            </p:nvCxnSpPr>
+            <p:spPr>
+              <a:xfrm>
+                <a:off x="9221001" y="1718629"/>
+                <a:ext cx="1509568" cy="446639"/>
+              </a:xfrm>
+              <a:prstGeom prst="line">
+                <a:avLst/>
+              </a:prstGeom>
+            </p:spPr>
+            <p:style>
+              <a:lnRef idx="1">
+                <a:schemeClr val="accent1"/>
+              </a:lnRef>
+              <a:fillRef idx="0">
+                <a:schemeClr val="accent1"/>
+              </a:fillRef>
+              <a:effectRef idx="0">
+                <a:schemeClr val="accent1"/>
+              </a:effectRef>
+              <a:fontRef idx="minor">
+                <a:schemeClr val="tx1"/>
+              </a:fontRef>
+            </p:style>
+          </p:cxnSp>
+        </p:grpSp>
+        <p:grpSp>
+          <p:nvGrpSpPr>
+            <p:cNvPr id="13" name="Group 12">
+              <a:extLst>
+                <a:ext uri="{FF2B5EF4-FFF2-40B4-BE49-F238E27FC236}">
+                  <a16:creationId xmlns:a16="http://schemas.microsoft.com/office/drawing/2014/main" id="{6BF7524A-F666-DD9F-765E-1A356B9C38CB}"/>
+                </a:ext>
+              </a:extLst>
+            </p:cNvPr>
+            <p:cNvGrpSpPr/>
+            <p:nvPr/>
+          </p:nvGrpSpPr>
+          <p:grpSpPr>
+            <a:xfrm>
+              <a:off x="9847455" y="748923"/>
+              <a:ext cx="2126374" cy="2462784"/>
+              <a:chOff x="1318661" y="3850105"/>
+              <a:chExt cx="2598821" cy="2633751"/>
+            </a:xfrm>
+          </p:grpSpPr>
+          <p:cxnSp>
+            <p:nvCxnSpPr>
+              <p:cNvPr id="14" name="Straight Arrow Connector 13">
+                <a:extLst>
+                  <a:ext uri="{FF2B5EF4-FFF2-40B4-BE49-F238E27FC236}">
+                    <a16:creationId xmlns:a16="http://schemas.microsoft.com/office/drawing/2014/main" id="{A06E11EF-AC66-B204-289C-A533C97E7DC3}"/>
+                  </a:ext>
+                </a:extLst>
+              </p:cNvPr>
+              <p:cNvCxnSpPr/>
+              <p:nvPr/>
+            </p:nvCxnSpPr>
+            <p:spPr>
+              <a:xfrm flipV="1">
+                <a:off x="1318661" y="3850105"/>
+                <a:ext cx="0" cy="2098308"/>
+              </a:xfrm>
+              <a:prstGeom prst="straightConnector1">
+                <a:avLst/>
+              </a:prstGeom>
+              <a:ln>
+                <a:tailEnd type="triangle"/>
+              </a:ln>
+            </p:spPr>
+            <p:style>
+              <a:lnRef idx="1">
+                <a:schemeClr val="accent1"/>
+              </a:lnRef>
+              <a:fillRef idx="0">
+                <a:schemeClr val="accent1"/>
+              </a:fillRef>
+              <a:effectRef idx="0">
+                <a:schemeClr val="accent1"/>
+              </a:effectRef>
+              <a:fontRef idx="minor">
+                <a:schemeClr val="tx1"/>
+              </a:fontRef>
+            </p:style>
+          </p:cxnSp>
+          <p:cxnSp>
+            <p:nvCxnSpPr>
+              <p:cNvPr id="15" name="Straight Arrow Connector 14">
+                <a:extLst>
+                  <a:ext uri="{FF2B5EF4-FFF2-40B4-BE49-F238E27FC236}">
+                    <a16:creationId xmlns:a16="http://schemas.microsoft.com/office/drawing/2014/main" id="{589C8773-AF40-E8BF-9CBC-58F7817D0D5C}"/>
+                  </a:ext>
+                </a:extLst>
+              </p:cNvPr>
+              <p:cNvCxnSpPr>
+                <a:cxnSpLocks/>
+              </p:cNvCxnSpPr>
+              <p:nvPr/>
+            </p:nvCxnSpPr>
+            <p:spPr>
+              <a:xfrm>
+                <a:off x="1318661" y="5948413"/>
+                <a:ext cx="2396691" cy="0"/>
+              </a:xfrm>
+              <a:prstGeom prst="straightConnector1">
+                <a:avLst/>
+              </a:prstGeom>
+              <a:ln>
+                <a:tailEnd type="triangle"/>
+              </a:ln>
+            </p:spPr>
+            <p:style>
+              <a:lnRef idx="1">
+                <a:schemeClr val="accent1"/>
+              </a:lnRef>
+              <a:fillRef idx="0">
+                <a:schemeClr val="accent1"/>
+              </a:fillRef>
+              <a:effectRef idx="0">
+                <a:schemeClr val="accent1"/>
+              </a:effectRef>
+              <a:fontRef idx="minor">
+                <a:schemeClr val="tx1"/>
+              </a:fontRef>
+            </p:style>
+          </p:cxnSp>
+          <p:cxnSp>
+            <p:nvCxnSpPr>
+              <p:cNvPr id="16" name="Straight Arrow Connector 15">
+                <a:extLst>
+                  <a:ext uri="{FF2B5EF4-FFF2-40B4-BE49-F238E27FC236}">
+                    <a16:creationId xmlns:a16="http://schemas.microsoft.com/office/drawing/2014/main" id="{BE739CCF-DB8F-DD2F-9420-6A73209E84D6}"/>
+                  </a:ext>
+                </a:extLst>
+              </p:cNvPr>
+              <p:cNvCxnSpPr>
+                <a:cxnSpLocks/>
+              </p:cNvCxnSpPr>
+              <p:nvPr/>
+            </p:nvCxnSpPr>
+            <p:spPr>
+              <a:xfrm flipV="1">
+                <a:off x="1330694" y="4899259"/>
+                <a:ext cx="676174" cy="1049154"/>
+              </a:xfrm>
+              <a:prstGeom prst="straightConnector1">
+                <a:avLst/>
+              </a:prstGeom>
+              <a:ln>
+                <a:tailEnd type="triangle"/>
+              </a:ln>
+            </p:spPr>
+            <p:style>
+              <a:lnRef idx="1">
+                <a:schemeClr val="accent1"/>
+              </a:lnRef>
+              <a:fillRef idx="0">
+                <a:schemeClr val="accent1"/>
+              </a:fillRef>
+              <a:effectRef idx="0">
+                <a:schemeClr val="accent1"/>
+              </a:effectRef>
+              <a:fontRef idx="minor">
+                <a:schemeClr val="tx1"/>
+              </a:fontRef>
+            </p:style>
+          </p:cxnSp>
+          <p:cxnSp>
+            <p:nvCxnSpPr>
+              <p:cNvPr id="17" name="Straight Arrow Connector 16">
+                <a:extLst>
+                  <a:ext uri="{FF2B5EF4-FFF2-40B4-BE49-F238E27FC236}">
+                    <a16:creationId xmlns:a16="http://schemas.microsoft.com/office/drawing/2014/main" id="{0B54A651-776C-C80B-14F6-4505FD3228F5}"/>
+                  </a:ext>
+                </a:extLst>
+              </p:cNvPr>
+              <p:cNvCxnSpPr>
+                <a:cxnSpLocks/>
+              </p:cNvCxnSpPr>
+              <p:nvPr/>
+            </p:nvCxnSpPr>
+            <p:spPr>
+              <a:xfrm>
+                <a:off x="1323473" y="5948413"/>
+                <a:ext cx="947651" cy="535443"/>
+              </a:xfrm>
+              <a:prstGeom prst="straightConnector1">
+                <a:avLst/>
+              </a:prstGeom>
+              <a:ln>
+                <a:tailEnd type="triangle"/>
+              </a:ln>
+            </p:spPr>
+            <p:style>
+              <a:lnRef idx="1">
+                <a:schemeClr val="accent1"/>
+              </a:lnRef>
+              <a:fillRef idx="0">
+                <a:schemeClr val="accent1"/>
+              </a:fillRef>
+              <a:effectRef idx="0">
+                <a:schemeClr val="accent1"/>
+              </a:effectRef>
+              <a:fontRef idx="minor">
+                <a:schemeClr val="tx1"/>
+              </a:fontRef>
+            </p:style>
+          </p:cxnSp>
+          <mc:AlternateContent xmlns:mc="http://schemas.openxmlformats.org/markup-compatibility/2006" xmlns:a14="http://schemas.microsoft.com/office/drawing/2010/main">
+            <mc:Choice Requires="a14">
+              <p:sp>
+                <p:nvSpPr>
+                  <p:cNvPr id="18" name="TextBox 17">
+                    <a:extLst>
+                      <a:ext uri="{FF2B5EF4-FFF2-40B4-BE49-F238E27FC236}">
+                        <a16:creationId xmlns:a16="http://schemas.microsoft.com/office/drawing/2014/main" id="{CF3333BF-4DA8-513B-E2CB-75395D6757B9}"/>
+                      </a:ext>
+                    </a:extLst>
+                  </p:cNvPr>
+                  <p:cNvSpPr txBox="1"/>
+                  <p:nvPr/>
+                </p:nvSpPr>
+                <p:spPr>
+                  <a:xfrm>
+                    <a:off x="1330694" y="5043638"/>
+                    <a:ext cx="267097" cy="369332"/>
+                  </a:xfrm>
+                  <a:prstGeom prst="rect">
+                    <a:avLst/>
+                  </a:prstGeom>
+                  <a:noFill/>
+                </p:spPr>
+                <p:txBody>
+                  <a:bodyPr wrap="square" rtlCol="0">
+                    <a:spAutoFit/>
+                  </a:bodyPr>
+                  <a:lstStyle/>
+                  <a:p>
+                    <a:pPr/>
+                    <a14:m>
+                      <m:oMathPara xmlns:m="http://schemas.openxmlformats.org/officeDocument/2006/math">
+                        <m:oMathParaPr>
+                          <m:jc m:val="centerGroup"/>
+                        </m:oMathParaPr>
+                        <m:oMath xmlns:m="http://schemas.openxmlformats.org/officeDocument/2006/math">
+                          <m:r>
+                            <a:rPr lang="en-US" b="0" i="1" smtClean="0">
+                              <a:latin typeface="Cambria Math" panose="02040503050406030204" pitchFamily="18" charset="0"/>
+                            </a:rPr>
+                            <m:t>𝜙</m:t>
+                          </m:r>
+                        </m:oMath>
+                      </m:oMathPara>
+                    </a14:m>
+                    <a:endParaRPr lang="en-US" dirty="0"/>
+                  </a:p>
+                </p:txBody>
+              </p:sp>
+            </mc:Choice>
+            <mc:Fallback xmlns="">
+              <p:sp>
+                <p:nvSpPr>
+                  <p:cNvPr id="18" name="TextBox 17">
+                    <a:extLst>
+                      <a:ext uri="{FF2B5EF4-FFF2-40B4-BE49-F238E27FC236}">
+                        <a16:creationId xmlns:a16="http://schemas.microsoft.com/office/drawing/2014/main" id="{CF3333BF-4DA8-513B-E2CB-75395D6757B9}"/>
+                      </a:ext>
+                    </a:extLst>
+                  </p:cNvPr>
+                  <p:cNvSpPr txBox="1">
+                    <a:spLocks noRot="1" noChangeAspect="1" noMove="1" noResize="1" noEditPoints="1" noAdjustHandles="1" noChangeArrowheads="1" noChangeShapeType="1" noTextEdit="1"/>
+                  </p:cNvSpPr>
+                  <p:nvPr/>
+                </p:nvSpPr>
+                <p:spPr>
+                  <a:xfrm>
+                    <a:off x="1330694" y="5043638"/>
+                    <a:ext cx="267097" cy="369332"/>
+                  </a:xfrm>
+                  <a:prstGeom prst="rect">
+                    <a:avLst/>
+                  </a:prstGeom>
+                  <a:blipFill>
+                    <a:blip r:embed="rId6"/>
+                    <a:stretch>
+                      <a:fillRect l="-5556" r="-63889" b="-19298"/>
+                    </a:stretch>
+                  </a:blipFill>
+                </p:spPr>
+                <p:txBody>
+                  <a:bodyPr/>
+                  <a:lstStyle/>
+                  <a:p>
+                    <a:r>
+                      <a:rPr lang="en-US">
+                        <a:noFill/>
+                      </a:rPr>
+                      <a:t> </a:t>
+                    </a:r>
+                  </a:p>
+                </p:txBody>
+              </p:sp>
+            </mc:Fallback>
+          </mc:AlternateContent>
+          <mc:AlternateContent xmlns:mc="http://schemas.openxmlformats.org/markup-compatibility/2006" xmlns:a14="http://schemas.microsoft.com/office/drawing/2010/main">
+            <mc:Choice Requires="a14">
+              <p:sp>
+                <p:nvSpPr>
+                  <p:cNvPr id="19" name="TextBox 18">
+                    <a:extLst>
+                      <a:ext uri="{FF2B5EF4-FFF2-40B4-BE49-F238E27FC236}">
+                        <a16:creationId xmlns:a16="http://schemas.microsoft.com/office/drawing/2014/main" id="{3D23C814-E423-2CD8-B9D0-A97BF856C003}"/>
+                      </a:ext>
+                    </a:extLst>
+                  </p:cNvPr>
+                  <p:cNvSpPr txBox="1"/>
+                  <p:nvPr/>
+                </p:nvSpPr>
+                <p:spPr>
+                  <a:xfrm>
+                    <a:off x="3407343" y="5601904"/>
+                    <a:ext cx="510139" cy="369332"/>
+                  </a:xfrm>
+                  <a:prstGeom prst="rect">
+                    <a:avLst/>
+                  </a:prstGeom>
+                  <a:noFill/>
+                </p:spPr>
+                <p:txBody>
+                  <a:bodyPr wrap="square" rtlCol="0">
+                    <a:spAutoFit/>
+                  </a:bodyPr>
+                  <a:lstStyle/>
+                  <a:p>
+                    <a:pPr/>
+                    <a14:m>
+                      <m:oMathPara xmlns:m="http://schemas.openxmlformats.org/officeDocument/2006/math">
+                        <m:oMathParaPr>
+                          <m:jc m:val="centerGroup"/>
+                        </m:oMathParaPr>
+                        <m:oMath xmlns:m="http://schemas.openxmlformats.org/officeDocument/2006/math">
+                          <m:acc>
+                            <m:accPr>
+                              <m:chr m:val="⃗"/>
+                              <m:ctrlPr>
+                                <a:rPr lang="en-US" b="0" i="1" smtClean="0">
+                                  <a:latin typeface="Cambria Math" panose="02040503050406030204" pitchFamily="18" charset="0"/>
+                                </a:rPr>
+                              </m:ctrlPr>
+                            </m:accPr>
+                            <m:e>
+                              <m:r>
+                                <a:rPr lang="en-US" b="0" i="1" smtClean="0">
+                                  <a:latin typeface="Cambria Math" panose="02040503050406030204" pitchFamily="18" charset="0"/>
+                                </a:rPr>
+                                <m:t>𝜌</m:t>
+                              </m:r>
+                            </m:e>
+                          </m:acc>
+                        </m:oMath>
+                      </m:oMathPara>
+                    </a14:m>
+                    <a:endParaRPr lang="en-US" dirty="0"/>
+                  </a:p>
+                </p:txBody>
+              </p:sp>
+            </mc:Choice>
+            <mc:Fallback xmlns="">
+              <p:sp>
+                <p:nvSpPr>
+                  <p:cNvPr id="19" name="TextBox 18">
+                    <a:extLst>
+                      <a:ext uri="{FF2B5EF4-FFF2-40B4-BE49-F238E27FC236}">
+                        <a16:creationId xmlns:a16="http://schemas.microsoft.com/office/drawing/2014/main" id="{3D23C814-E423-2CD8-B9D0-A97BF856C003}"/>
+                      </a:ext>
+                    </a:extLst>
+                  </p:cNvPr>
+                  <p:cNvSpPr txBox="1">
+                    <a:spLocks noRot="1" noChangeAspect="1" noMove="1" noResize="1" noEditPoints="1" noAdjustHandles="1" noChangeArrowheads="1" noChangeShapeType="1" noTextEdit="1"/>
+                  </p:cNvSpPr>
+                  <p:nvPr/>
+                </p:nvSpPr>
+                <p:spPr>
+                  <a:xfrm>
+                    <a:off x="3407343" y="5601904"/>
+                    <a:ext cx="510139" cy="369332"/>
+                  </a:xfrm>
+                  <a:prstGeom prst="rect">
+                    <a:avLst/>
+                  </a:prstGeom>
+                  <a:blipFill>
+                    <a:blip r:embed="rId7"/>
+                    <a:stretch>
+                      <a:fillRect t="-25000" r="-29412" b="-14286"/>
+                    </a:stretch>
+                  </a:blipFill>
+                </p:spPr>
+                <p:txBody>
+                  <a:bodyPr/>
+                  <a:lstStyle/>
+                  <a:p>
+                    <a:r>
+                      <a:rPr lang="en-US">
+                        <a:noFill/>
+                      </a:rPr>
+                      <a:t> </a:t>
+                    </a:r>
+                  </a:p>
+                </p:txBody>
+              </p:sp>
+            </mc:Fallback>
+          </mc:AlternateContent>
+        </p:grpSp>
       </p:grpSp>
     </p:spTree>
     <p:extLst>
@@ -24045,6 +24070,1504 @@
     <p:extLst>
       <p:ext uri="{BB962C8B-B14F-4D97-AF65-F5344CB8AC3E}">
         <p14:creationId xmlns:p14="http://schemas.microsoft.com/office/powerpoint/2010/main" val="2043714517"/>
+      </p:ext>
+    </p:extLst>
+  </p:cSld>
+  <p:clrMapOvr>
+    <a:masterClrMapping/>
+  </p:clrMapOvr>
+</p:sld>
+</file>
+
+<file path=ppt/slides/slide21.xml><?xml version="1.0" encoding="utf-8"?>
+<p:sld xmlns:a="http://schemas.openxmlformats.org/drawingml/2006/main" xmlns:r="http://schemas.openxmlformats.org/officeDocument/2006/relationships" xmlns:p="http://schemas.openxmlformats.org/presentationml/2006/main">
+  <p:cSld>
+    <p:spTree>
+      <p:nvGrpSpPr>
+        <p:cNvPr id="1" name=""/>
+        <p:cNvGrpSpPr/>
+        <p:nvPr/>
+      </p:nvGrpSpPr>
+      <p:grpSpPr>
+        <a:xfrm>
+          <a:off x="0" y="0"/>
+          <a:ext cx="0" cy="0"/>
+          <a:chOff x="0" y="0"/>
+          <a:chExt cx="0" cy="0"/>
+        </a:xfrm>
+      </p:grpSpPr>
+      <p:sp>
+        <p:nvSpPr>
+          <p:cNvPr id="4" name="TextBox 3">
+            <a:extLst>
+              <a:ext uri="{FF2B5EF4-FFF2-40B4-BE49-F238E27FC236}">
+                <a16:creationId xmlns:a16="http://schemas.microsoft.com/office/drawing/2014/main" id="{7F3E0A8A-75E0-CB7F-2770-2D4B539235D0}"/>
+              </a:ext>
+            </a:extLst>
+          </p:cNvPr>
+          <p:cNvSpPr txBox="1"/>
+          <p:nvPr/>
+        </p:nvSpPr>
+        <p:spPr>
+          <a:xfrm>
+            <a:off x="2008414" y="1338943"/>
+            <a:ext cx="979715" cy="369332"/>
+          </a:xfrm>
+          <a:prstGeom prst="rect">
+            <a:avLst/>
+          </a:prstGeom>
+        </p:spPr>
+        <p:style>
+          <a:lnRef idx="2">
+            <a:schemeClr val="dk1"/>
+          </a:lnRef>
+          <a:fillRef idx="1">
+            <a:schemeClr val="lt1"/>
+          </a:fillRef>
+          <a:effectRef idx="0">
+            <a:schemeClr val="dk1"/>
+          </a:effectRef>
+          <a:fontRef idx="minor">
+            <a:schemeClr val="dk1"/>
+          </a:fontRef>
+        </p:style>
+        <p:txBody>
+          <a:bodyPr wrap="square" rtlCol="0">
+            <a:spAutoFit/>
+          </a:bodyPr>
+          <a:lstStyle/>
+          <a:p>
+            <a:r>
+              <a:rPr lang="en-US" dirty="0" err="1"/>
+              <a:t>PiScript</a:t>
+            </a:r>
+            <a:endParaRPr lang="en-US" dirty="0"/>
+          </a:p>
+        </p:txBody>
+      </p:sp>
+      <p:cxnSp>
+        <p:nvCxnSpPr>
+          <p:cNvPr id="7" name="Connector: Elbow 6">
+            <a:extLst>
+              <a:ext uri="{FF2B5EF4-FFF2-40B4-BE49-F238E27FC236}">
+                <a16:creationId xmlns:a16="http://schemas.microsoft.com/office/drawing/2014/main" id="{6D8745A9-D1BE-837D-AD2F-AFAB0FD8675A}"/>
+              </a:ext>
+            </a:extLst>
+          </p:cNvPr>
+          <p:cNvCxnSpPr>
+            <a:cxnSpLocks/>
+            <a:stCxn id="4" idx="3"/>
+          </p:cNvCxnSpPr>
+          <p:nvPr/>
+        </p:nvCxnSpPr>
+        <p:spPr>
+          <a:xfrm>
+            <a:off x="2988129" y="1523609"/>
+            <a:ext cx="1976775" cy="365741"/>
+          </a:xfrm>
+          <a:prstGeom prst="bentConnector3">
+            <a:avLst/>
+          </a:prstGeom>
+          <a:ln>
+            <a:tailEnd type="triangle"/>
+          </a:ln>
+        </p:spPr>
+        <p:style>
+          <a:lnRef idx="1">
+            <a:schemeClr val="dk1"/>
+          </a:lnRef>
+          <a:fillRef idx="0">
+            <a:schemeClr val="dk1"/>
+          </a:fillRef>
+          <a:effectRef idx="0">
+            <a:schemeClr val="dk1"/>
+          </a:effectRef>
+          <a:fontRef idx="minor">
+            <a:schemeClr val="tx1"/>
+          </a:fontRef>
+        </p:style>
+      </p:cxnSp>
+      <p:sp>
+        <p:nvSpPr>
+          <p:cNvPr id="9" name="TextBox 8">
+            <a:extLst>
+              <a:ext uri="{FF2B5EF4-FFF2-40B4-BE49-F238E27FC236}">
+                <a16:creationId xmlns:a16="http://schemas.microsoft.com/office/drawing/2014/main" id="{990742E0-BF27-7839-9001-B1B1AF88395C}"/>
+              </a:ext>
+            </a:extLst>
+          </p:cNvPr>
+          <p:cNvSpPr txBox="1"/>
+          <p:nvPr/>
+        </p:nvSpPr>
+        <p:spPr>
+          <a:xfrm>
+            <a:off x="4964904" y="1687762"/>
+            <a:ext cx="4622006" cy="3693319"/>
+          </a:xfrm>
+          <a:prstGeom prst="rect">
+            <a:avLst/>
+          </a:prstGeom>
+        </p:spPr>
+        <p:style>
+          <a:lnRef idx="2">
+            <a:schemeClr val="dk1"/>
+          </a:lnRef>
+          <a:fillRef idx="1">
+            <a:schemeClr val="lt1"/>
+          </a:fillRef>
+          <a:effectRef idx="0">
+            <a:schemeClr val="dk1"/>
+          </a:effectRef>
+          <a:fontRef idx="minor">
+            <a:schemeClr val="dk1"/>
+          </a:fontRef>
+        </p:style>
+        <p:txBody>
+          <a:bodyPr wrap="square" rtlCol="0">
+            <a:spAutoFit/>
+          </a:bodyPr>
+          <a:lstStyle/>
+          <a:p>
+            <a:r>
+              <a:rPr lang="en-US" dirty="0" err="1"/>
+              <a:t>Arithmetics.func</a:t>
+            </a:r>
+            <a:r>
+              <a:rPr lang="en-US" dirty="0"/>
+              <a:t>(a: Number, b:Number){</a:t>
+            </a:r>
+          </a:p>
+          <a:p>
+            <a:pPr lvl="1"/>
+            <a:r>
+              <a:rPr lang="en-US" dirty="0"/>
+              <a:t>If(a &amp; b </a:t>
+            </a:r>
+            <a:r>
+              <a:rPr lang="en-US" dirty="0" err="1"/>
+              <a:t>typeof</a:t>
+            </a:r>
+            <a:r>
+              <a:rPr lang="en-US" dirty="0"/>
+              <a:t> vector){</a:t>
+            </a:r>
+          </a:p>
+          <a:p>
+            <a:pPr lvl="1"/>
+            <a:r>
+              <a:rPr lang="en-US" dirty="0"/>
+              <a:t>	holder = </a:t>
+            </a:r>
+            <a:r>
+              <a:rPr lang="en-US" dirty="0" err="1">
+                <a:solidFill>
+                  <a:schemeClr val="accent5"/>
+                </a:solidFill>
+              </a:rPr>
+              <a:t>RC</a:t>
+            </a:r>
+            <a:r>
+              <a:rPr lang="en-US" dirty="0" err="1"/>
+              <a:t>.getVector</a:t>
+            </a:r>
+            <a:r>
+              <a:rPr lang="en-US" dirty="0"/>
+              <a:t>(3);</a:t>
+            </a:r>
+          </a:p>
+          <a:p>
+            <a:pPr lvl="1"/>
+            <a:r>
+              <a:rPr lang="en-US" dirty="0"/>
+              <a:t>	</a:t>
+            </a:r>
+            <a:r>
+              <a:rPr lang="en-US" dirty="0" err="1"/>
+              <a:t>holder.data</a:t>
+            </a:r>
+            <a:r>
+              <a:rPr lang="en-US" dirty="0"/>
+              <a:t>[0] = …</a:t>
+            </a:r>
+          </a:p>
+          <a:p>
+            <a:pPr lvl="1"/>
+            <a:r>
+              <a:rPr lang="en-US" dirty="0"/>
+              <a:t>	…</a:t>
+            </a:r>
+          </a:p>
+          <a:p>
+            <a:pPr lvl="1"/>
+            <a:r>
+              <a:rPr lang="en-US" dirty="0"/>
+              <a:t>	</a:t>
+            </a:r>
+            <a:r>
+              <a:rPr lang="en-US" dirty="0" err="1"/>
+              <a:t>holder.data</a:t>
+            </a:r>
+            <a:r>
+              <a:rPr lang="en-US" dirty="0"/>
+              <a:t>[2] = …</a:t>
+            </a:r>
+          </a:p>
+          <a:p>
+            <a:pPr lvl="1"/>
+            <a:r>
+              <a:rPr lang="en-US" dirty="0">
+                <a:ln>
+                  <a:solidFill>
+                    <a:schemeClr val="accent6"/>
+                  </a:solidFill>
+                </a:ln>
+              </a:rPr>
+              <a:t>	</a:t>
+            </a:r>
+            <a:r>
+              <a:rPr lang="en-US" dirty="0" err="1">
+                <a:ln>
+                  <a:solidFill>
+                    <a:schemeClr val="accent6"/>
+                  </a:solidFill>
+                </a:ln>
+              </a:rPr>
+              <a:t>a.recycle</a:t>
+            </a:r>
+            <a:r>
+              <a:rPr lang="en-US" dirty="0">
+                <a:ln>
+                  <a:solidFill>
+                    <a:schemeClr val="accent6"/>
+                  </a:solidFill>
+                </a:ln>
+              </a:rPr>
+              <a:t>();</a:t>
+            </a:r>
+          </a:p>
+          <a:p>
+            <a:pPr lvl="1"/>
+            <a:r>
+              <a:rPr lang="en-US" dirty="0">
+                <a:ln>
+                  <a:solidFill>
+                    <a:schemeClr val="accent6"/>
+                  </a:solidFill>
+                </a:ln>
+              </a:rPr>
+              <a:t>	</a:t>
+            </a:r>
+            <a:r>
+              <a:rPr lang="en-US" dirty="0" err="1">
+                <a:ln>
+                  <a:solidFill>
+                    <a:schemeClr val="accent6"/>
+                  </a:solidFill>
+                </a:ln>
+              </a:rPr>
+              <a:t>b.recycle</a:t>
+            </a:r>
+            <a:r>
+              <a:rPr lang="en-US" dirty="0">
+                <a:ln>
+                  <a:solidFill>
+                    <a:schemeClr val="accent6"/>
+                  </a:solidFill>
+                </a:ln>
+              </a:rPr>
+              <a:t>();</a:t>
+            </a:r>
+          </a:p>
+          <a:p>
+            <a:pPr lvl="1"/>
+            <a:r>
+              <a:rPr lang="en-US" b="1" dirty="0"/>
+              <a:t>	</a:t>
+            </a:r>
+            <a:r>
+              <a:rPr lang="en-US" dirty="0"/>
+              <a:t>return holder;</a:t>
+            </a:r>
+          </a:p>
+          <a:p>
+            <a:pPr lvl="1"/>
+            <a:r>
+              <a:rPr lang="en-US" dirty="0"/>
+              <a:t>}</a:t>
+            </a:r>
+          </a:p>
+          <a:p>
+            <a:pPr lvl="1"/>
+            <a:r>
+              <a:rPr lang="en-US" dirty="0"/>
+              <a:t>…</a:t>
+            </a:r>
+          </a:p>
+          <a:p>
+            <a:r>
+              <a:rPr lang="en-US" dirty="0"/>
+              <a:t>}</a:t>
+            </a:r>
+          </a:p>
+          <a:p>
+            <a:endParaRPr lang="en-US" dirty="0"/>
+          </a:p>
+        </p:txBody>
+      </p:sp>
+      <p:sp>
+        <p:nvSpPr>
+          <p:cNvPr id="11" name="TextBox 10">
+            <a:extLst>
+              <a:ext uri="{FF2B5EF4-FFF2-40B4-BE49-F238E27FC236}">
+                <a16:creationId xmlns:a16="http://schemas.microsoft.com/office/drawing/2014/main" id="{9436F2B5-7F4E-78DB-4B33-2FA7FFD1D58B}"/>
+              </a:ext>
+            </a:extLst>
+          </p:cNvPr>
+          <p:cNvSpPr txBox="1"/>
+          <p:nvPr/>
+        </p:nvSpPr>
+        <p:spPr>
+          <a:xfrm>
+            <a:off x="1278732" y="2077607"/>
+            <a:ext cx="3036093" cy="1477328"/>
+          </a:xfrm>
+          <a:prstGeom prst="rect">
+            <a:avLst/>
+          </a:prstGeom>
+        </p:spPr>
+        <p:style>
+          <a:lnRef idx="2">
+            <a:schemeClr val="dk1"/>
+          </a:lnRef>
+          <a:fillRef idx="1">
+            <a:schemeClr val="lt1"/>
+          </a:fillRef>
+          <a:effectRef idx="0">
+            <a:schemeClr val="dk1"/>
+          </a:effectRef>
+          <a:fontRef idx="minor">
+            <a:schemeClr val="dk1"/>
+          </a:fontRef>
+        </p:style>
+        <p:txBody>
+          <a:bodyPr wrap="square" rtlCol="0">
+            <a:spAutoFit/>
+          </a:bodyPr>
+          <a:lstStyle/>
+          <a:p>
+            <a:pPr algn="ctr"/>
+            <a:r>
+              <a:rPr lang="en-US" dirty="0"/>
+              <a:t>Recycle Center</a:t>
+            </a:r>
+          </a:p>
+          <a:p>
+            <a:pPr algn="ctr"/>
+            <a:r>
+              <a:rPr lang="en-US" dirty="0"/>
+              <a:t>[v0, v1, …, </a:t>
+            </a:r>
+            <a:r>
+              <a:rPr lang="en-US" dirty="0" err="1"/>
+              <a:t>vn</a:t>
+            </a:r>
+            <a:r>
+              <a:rPr lang="en-US" dirty="0"/>
+              <a:t>]</a:t>
+            </a:r>
+          </a:p>
+          <a:p>
+            <a:r>
+              <a:rPr lang="en-US" dirty="0"/>
+              <a:t>.</a:t>
+            </a:r>
+            <a:r>
+              <a:rPr lang="en-US" dirty="0" err="1"/>
+              <a:t>getVector</a:t>
+            </a:r>
+            <a:r>
+              <a:rPr lang="en-US" dirty="0"/>
+              <a:t>(dim: number)</a:t>
+            </a:r>
+          </a:p>
+          <a:p>
+            <a:r>
+              <a:rPr lang="en-US" dirty="0"/>
+              <a:t>.</a:t>
+            </a:r>
+            <a:r>
+              <a:rPr lang="en-US" dirty="0" err="1"/>
+              <a:t>getArray</a:t>
+            </a:r>
+            <a:r>
+              <a:rPr lang="en-US" dirty="0"/>
+              <a:t>(size: number)</a:t>
+            </a:r>
+          </a:p>
+          <a:p>
+            <a:r>
+              <a:rPr lang="en-US" dirty="0"/>
+              <a:t>.</a:t>
+            </a:r>
+            <a:r>
+              <a:rPr lang="en-US" dirty="0" err="1"/>
+              <a:t>getComplex</a:t>
+            </a:r>
+            <a:endParaRPr lang="en-US" dirty="0"/>
+          </a:p>
+        </p:txBody>
+      </p:sp>
+      <p:sp>
+        <p:nvSpPr>
+          <p:cNvPr id="12" name="TextBox 11">
+            <a:extLst>
+              <a:ext uri="{FF2B5EF4-FFF2-40B4-BE49-F238E27FC236}">
+                <a16:creationId xmlns:a16="http://schemas.microsoft.com/office/drawing/2014/main" id="{0620A50B-DF14-9EB4-A3A7-BCFCA5F4AE3A}"/>
+              </a:ext>
+            </a:extLst>
+          </p:cNvPr>
+          <p:cNvSpPr txBox="1"/>
+          <p:nvPr/>
+        </p:nvSpPr>
+        <p:spPr>
+          <a:xfrm>
+            <a:off x="1371600" y="3864769"/>
+            <a:ext cx="3036093" cy="2031325"/>
+          </a:xfrm>
+          <a:prstGeom prst="rect">
+            <a:avLst/>
+          </a:prstGeom>
+        </p:spPr>
+        <p:style>
+          <a:lnRef idx="2">
+            <a:schemeClr val="dk1"/>
+          </a:lnRef>
+          <a:fillRef idx="1">
+            <a:schemeClr val="lt1"/>
+          </a:fillRef>
+          <a:effectRef idx="0">
+            <a:schemeClr val="dk1"/>
+          </a:effectRef>
+          <a:fontRef idx="minor">
+            <a:schemeClr val="dk1"/>
+          </a:fontRef>
+        </p:style>
+        <p:txBody>
+          <a:bodyPr wrap="square" rtlCol="0">
+            <a:spAutoFit/>
+          </a:bodyPr>
+          <a:lstStyle/>
+          <a:p>
+            <a:pPr algn="ctr"/>
+            <a:r>
+              <a:rPr lang="en-US" dirty="0"/>
+              <a:t>Quantity</a:t>
+            </a:r>
+          </a:p>
+          <a:p>
+            <a:r>
+              <a:rPr lang="en-US" dirty="0"/>
+              <a:t>.locked//</a:t>
+            </a:r>
+            <a:r>
+              <a:rPr lang="en-US" dirty="0" err="1"/>
+              <a:t>boolean</a:t>
+            </a:r>
+            <a:endParaRPr lang="en-US" dirty="0"/>
+          </a:p>
+          <a:p>
+            <a:r>
+              <a:rPr lang="en-US" dirty="0"/>
+              <a:t>.recycle() //Releases memory and passes this into recycle center, bypass if locked is true</a:t>
+            </a:r>
+          </a:p>
+          <a:p>
+            <a:r>
+              <a:rPr lang="en-US" dirty="0"/>
+              <a:t>.lock()</a:t>
+            </a:r>
+          </a:p>
+          <a:p>
+            <a:r>
+              <a:rPr lang="en-US" dirty="0"/>
+              <a:t>.release()</a:t>
+            </a:r>
+          </a:p>
+        </p:txBody>
+      </p:sp>
+      <p:cxnSp>
+        <p:nvCxnSpPr>
+          <p:cNvPr id="14" name="Straight Arrow Connector 13">
+            <a:extLst>
+              <a:ext uri="{FF2B5EF4-FFF2-40B4-BE49-F238E27FC236}">
+                <a16:creationId xmlns:a16="http://schemas.microsoft.com/office/drawing/2014/main" id="{5D9E3060-3D57-216B-7075-B62EDF1F6795}"/>
+              </a:ext>
+            </a:extLst>
+          </p:cNvPr>
+          <p:cNvCxnSpPr>
+            <a:stCxn id="11" idx="2"/>
+          </p:cNvCxnSpPr>
+          <p:nvPr/>
+        </p:nvCxnSpPr>
+        <p:spPr>
+          <a:xfrm flipH="1">
+            <a:off x="2793206" y="3554935"/>
+            <a:ext cx="3573" cy="309834"/>
+          </a:xfrm>
+          <a:prstGeom prst="straightConnector1">
+            <a:avLst/>
+          </a:prstGeom>
+          <a:ln>
+            <a:tailEnd type="triangle"/>
+          </a:ln>
+        </p:spPr>
+        <p:style>
+          <a:lnRef idx="1">
+            <a:schemeClr val="accent1"/>
+          </a:lnRef>
+          <a:fillRef idx="0">
+            <a:schemeClr val="accent1"/>
+          </a:fillRef>
+          <a:effectRef idx="0">
+            <a:schemeClr val="accent1"/>
+          </a:effectRef>
+          <a:fontRef idx="minor">
+            <a:schemeClr val="tx1"/>
+          </a:fontRef>
+        </p:style>
+      </p:cxnSp>
+      <p:cxnSp>
+        <p:nvCxnSpPr>
+          <p:cNvPr id="16" name="Straight Arrow Connector 15">
+            <a:extLst>
+              <a:ext uri="{FF2B5EF4-FFF2-40B4-BE49-F238E27FC236}">
+                <a16:creationId xmlns:a16="http://schemas.microsoft.com/office/drawing/2014/main" id="{1DBE947E-F7C7-622E-8B00-4B37CA180B29}"/>
+              </a:ext>
+            </a:extLst>
+          </p:cNvPr>
+          <p:cNvCxnSpPr>
+            <a:cxnSpLocks/>
+            <a:stCxn id="12" idx="0"/>
+          </p:cNvCxnSpPr>
+          <p:nvPr/>
+        </p:nvCxnSpPr>
+        <p:spPr>
+          <a:xfrm flipH="1" flipV="1">
+            <a:off x="2878931" y="3554935"/>
+            <a:ext cx="10716" cy="309834"/>
+          </a:xfrm>
+          <a:prstGeom prst="straightConnector1">
+            <a:avLst/>
+          </a:prstGeom>
+          <a:ln>
+            <a:tailEnd type="triangle"/>
+          </a:ln>
+        </p:spPr>
+        <p:style>
+          <a:lnRef idx="1">
+            <a:schemeClr val="accent1"/>
+          </a:lnRef>
+          <a:fillRef idx="0">
+            <a:schemeClr val="accent1"/>
+          </a:fillRef>
+          <a:effectRef idx="0">
+            <a:schemeClr val="accent1"/>
+          </a:effectRef>
+          <a:fontRef idx="minor">
+            <a:schemeClr val="tx1"/>
+          </a:fontRef>
+        </p:style>
+      </p:cxnSp>
+      <p:cxnSp>
+        <p:nvCxnSpPr>
+          <p:cNvPr id="18" name="Straight Arrow Connector 17">
+            <a:extLst>
+              <a:ext uri="{FF2B5EF4-FFF2-40B4-BE49-F238E27FC236}">
+                <a16:creationId xmlns:a16="http://schemas.microsoft.com/office/drawing/2014/main" id="{86EBE3EF-6154-62EB-4BB8-45B1065FCB3C}"/>
+              </a:ext>
+            </a:extLst>
+          </p:cNvPr>
+          <p:cNvCxnSpPr>
+            <a:cxnSpLocks/>
+            <a:stCxn id="11" idx="3"/>
+          </p:cNvCxnSpPr>
+          <p:nvPr/>
+        </p:nvCxnSpPr>
+        <p:spPr>
+          <a:xfrm>
+            <a:off x="4314825" y="2816271"/>
+            <a:ext cx="650079" cy="0"/>
+          </a:xfrm>
+          <a:prstGeom prst="straightConnector1">
+            <a:avLst/>
+          </a:prstGeom>
+          <a:ln>
+            <a:tailEnd type="triangle"/>
+          </a:ln>
+        </p:spPr>
+        <p:style>
+          <a:lnRef idx="1">
+            <a:schemeClr val="dk1"/>
+          </a:lnRef>
+          <a:fillRef idx="0">
+            <a:schemeClr val="dk1"/>
+          </a:fillRef>
+          <a:effectRef idx="0">
+            <a:schemeClr val="dk1"/>
+          </a:effectRef>
+          <a:fontRef idx="minor">
+            <a:schemeClr val="tx1"/>
+          </a:fontRef>
+        </p:style>
+      </p:cxnSp>
+      <p:sp>
+        <p:nvSpPr>
+          <p:cNvPr id="19" name="TextBox 18">
+            <a:extLst>
+              <a:ext uri="{FF2B5EF4-FFF2-40B4-BE49-F238E27FC236}">
+                <a16:creationId xmlns:a16="http://schemas.microsoft.com/office/drawing/2014/main" id="{54F556C1-4F72-D4D4-DEFA-4E883EA5A9BF}"/>
+              </a:ext>
+            </a:extLst>
+          </p:cNvPr>
+          <p:cNvSpPr txBox="1"/>
+          <p:nvPr/>
+        </p:nvSpPr>
+        <p:spPr>
+          <a:xfrm>
+            <a:off x="4414836" y="2512359"/>
+            <a:ext cx="571501" cy="369332"/>
+          </a:xfrm>
+          <a:prstGeom prst="rect">
+            <a:avLst/>
+          </a:prstGeom>
+          <a:noFill/>
+        </p:spPr>
+        <p:txBody>
+          <a:bodyPr wrap="square" rtlCol="0">
+            <a:spAutoFit/>
+          </a:bodyPr>
+          <a:lstStyle/>
+          <a:p>
+            <a:r>
+              <a:rPr lang="en-US" dirty="0">
+                <a:solidFill>
+                  <a:schemeClr val="accent5"/>
+                </a:solidFill>
+              </a:rPr>
+              <a:t>RC</a:t>
+            </a:r>
+          </a:p>
+        </p:txBody>
+      </p:sp>
+      <p:sp>
+        <p:nvSpPr>
+          <p:cNvPr id="22" name="TextBox 21">
+            <a:extLst>
+              <a:ext uri="{FF2B5EF4-FFF2-40B4-BE49-F238E27FC236}">
+                <a16:creationId xmlns:a16="http://schemas.microsoft.com/office/drawing/2014/main" id="{16681CE7-3B72-F9B7-A040-C43F2940CA9A}"/>
+              </a:ext>
+            </a:extLst>
+          </p:cNvPr>
+          <p:cNvSpPr txBox="1"/>
+          <p:nvPr/>
+        </p:nvSpPr>
+        <p:spPr>
+          <a:xfrm>
+            <a:off x="3764754" y="1503096"/>
+            <a:ext cx="528638" cy="369332"/>
+          </a:xfrm>
+          <a:prstGeom prst="rect">
+            <a:avLst/>
+          </a:prstGeom>
+          <a:noFill/>
+        </p:spPr>
+        <p:txBody>
+          <a:bodyPr wrap="square" rtlCol="0">
+            <a:spAutoFit/>
+          </a:bodyPr>
+          <a:lstStyle/>
+          <a:p>
+            <a:r>
+              <a:rPr lang="en-US" dirty="0"/>
+              <a:t>call</a:t>
+            </a:r>
+          </a:p>
+        </p:txBody>
+      </p:sp>
+    </p:spTree>
+    <p:extLst>
+      <p:ext uri="{BB962C8B-B14F-4D97-AF65-F5344CB8AC3E}">
+        <p14:creationId xmlns:p14="http://schemas.microsoft.com/office/powerpoint/2010/main" val="2266870620"/>
+      </p:ext>
+    </p:extLst>
+  </p:cSld>
+  <p:clrMapOvr>
+    <a:masterClrMapping/>
+  </p:clrMapOvr>
+</p:sld>
+</file>
+
+<file path=ppt/slides/slide22.xml><?xml version="1.0" encoding="utf-8"?>
+<p:sld xmlns:a="http://schemas.openxmlformats.org/drawingml/2006/main" xmlns:r="http://schemas.openxmlformats.org/officeDocument/2006/relationships" xmlns:p="http://schemas.openxmlformats.org/presentationml/2006/main">
+  <p:cSld>
+    <p:spTree>
+      <p:nvGrpSpPr>
+        <p:cNvPr id="1" name=""/>
+        <p:cNvGrpSpPr/>
+        <p:nvPr/>
+      </p:nvGrpSpPr>
+      <p:grpSpPr>
+        <a:xfrm>
+          <a:off x="0" y="0"/>
+          <a:ext cx="0" cy="0"/>
+          <a:chOff x="0" y="0"/>
+          <a:chExt cx="0" cy="0"/>
+        </a:xfrm>
+      </p:grpSpPr>
+      <p:pic>
+        <p:nvPicPr>
+          <p:cNvPr id="5" name="Picture 4">
+            <a:extLst>
+              <a:ext uri="{FF2B5EF4-FFF2-40B4-BE49-F238E27FC236}">
+                <a16:creationId xmlns:a16="http://schemas.microsoft.com/office/drawing/2014/main" id="{8CE2E158-6103-810C-F013-AB660FF916FC}"/>
+              </a:ext>
+            </a:extLst>
+          </p:cNvPr>
+          <p:cNvPicPr>
+            <a:picLocks noChangeAspect="1"/>
+          </p:cNvPicPr>
+          <p:nvPr/>
+        </p:nvPicPr>
+        <p:blipFill rotWithShape="1">
+          <a:blip r:embed="rId2"/>
+          <a:srcRect t="14035" b="15087"/>
+          <a:stretch/>
+        </p:blipFill>
+        <p:spPr>
+          <a:xfrm>
+            <a:off x="0" y="962525"/>
+            <a:ext cx="12192000" cy="4860759"/>
+          </a:xfrm>
+          <a:prstGeom prst="rect">
+            <a:avLst/>
+          </a:prstGeom>
+        </p:spPr>
+      </p:pic>
+    </p:spTree>
+    <p:extLst>
+      <p:ext uri="{BB962C8B-B14F-4D97-AF65-F5344CB8AC3E}">
+        <p14:creationId xmlns:p14="http://schemas.microsoft.com/office/powerpoint/2010/main" val="2213779568"/>
+      </p:ext>
+    </p:extLst>
+  </p:cSld>
+  <p:clrMapOvr>
+    <a:masterClrMapping/>
+  </p:clrMapOvr>
+</p:sld>
+</file>
+
+<file path=ppt/slides/slide23.xml><?xml version="1.0" encoding="utf-8"?>
+<p:sld xmlns:a="http://schemas.openxmlformats.org/drawingml/2006/main" xmlns:r="http://schemas.openxmlformats.org/officeDocument/2006/relationships" xmlns:p="http://schemas.openxmlformats.org/presentationml/2006/main">
+  <p:cSld>
+    <p:spTree>
+      <p:nvGrpSpPr>
+        <p:cNvPr id="1" name=""/>
+        <p:cNvGrpSpPr/>
+        <p:nvPr/>
+      </p:nvGrpSpPr>
+      <p:grpSpPr>
+        <a:xfrm>
+          <a:off x="0" y="0"/>
+          <a:ext cx="0" cy="0"/>
+          <a:chOff x="0" y="0"/>
+          <a:chExt cx="0" cy="0"/>
+        </a:xfrm>
+      </p:grpSpPr>
+      <p:pic>
+        <p:nvPicPr>
+          <p:cNvPr id="3" name="Picture 2">
+            <a:extLst>
+              <a:ext uri="{FF2B5EF4-FFF2-40B4-BE49-F238E27FC236}">
+                <a16:creationId xmlns:a16="http://schemas.microsoft.com/office/drawing/2014/main" id="{E7AF44A4-8DC2-E8A1-62BF-395D6A85F67E}"/>
+              </a:ext>
+            </a:extLst>
+          </p:cNvPr>
+          <p:cNvPicPr>
+            <a:picLocks noChangeAspect="1"/>
+          </p:cNvPicPr>
+          <p:nvPr/>
+        </p:nvPicPr>
+        <p:blipFill rotWithShape="1">
+          <a:blip r:embed="rId2"/>
+          <a:srcRect t="11930" b="8070"/>
+          <a:stretch/>
+        </p:blipFill>
+        <p:spPr>
+          <a:xfrm>
+            <a:off x="0" y="818146"/>
+            <a:ext cx="12192000" cy="5486401"/>
+          </a:xfrm>
+          <a:prstGeom prst="rect">
+            <a:avLst/>
+          </a:prstGeom>
+        </p:spPr>
+      </p:pic>
+    </p:spTree>
+    <p:extLst>
+      <p:ext uri="{BB962C8B-B14F-4D97-AF65-F5344CB8AC3E}">
+        <p14:creationId xmlns:p14="http://schemas.microsoft.com/office/powerpoint/2010/main" val="890891409"/>
+      </p:ext>
+    </p:extLst>
+  </p:cSld>
+  <p:clrMapOvr>
+    <a:masterClrMapping/>
+  </p:clrMapOvr>
+</p:sld>
+</file>
+
+<file path=ppt/slides/slide24.xml><?xml version="1.0" encoding="utf-8"?>
+<p:sld xmlns:a="http://schemas.openxmlformats.org/drawingml/2006/main" xmlns:r="http://schemas.openxmlformats.org/officeDocument/2006/relationships" xmlns:p="http://schemas.openxmlformats.org/presentationml/2006/main">
+  <p:cSld>
+    <p:spTree>
+      <p:nvGrpSpPr>
+        <p:cNvPr id="1" name=""/>
+        <p:cNvGrpSpPr/>
+        <p:nvPr/>
+      </p:nvGrpSpPr>
+      <p:grpSpPr>
+        <a:xfrm>
+          <a:off x="0" y="0"/>
+          <a:ext cx="0" cy="0"/>
+          <a:chOff x="0" y="0"/>
+          <a:chExt cx="0" cy="0"/>
+        </a:xfrm>
+      </p:grpSpPr>
+      <p:grpSp>
+        <p:nvGrpSpPr>
+          <p:cNvPr id="34" name="Group 33">
+            <a:extLst>
+              <a:ext uri="{FF2B5EF4-FFF2-40B4-BE49-F238E27FC236}">
+                <a16:creationId xmlns:a16="http://schemas.microsoft.com/office/drawing/2014/main" id="{9DFAAAE0-F7B4-322D-08D8-3EC7FDC1F568}"/>
+              </a:ext>
+            </a:extLst>
+          </p:cNvPr>
+          <p:cNvGrpSpPr/>
+          <p:nvPr/>
+        </p:nvGrpSpPr>
+        <p:grpSpPr>
+          <a:xfrm>
+            <a:off x="286441" y="1127723"/>
+            <a:ext cx="11041604" cy="4801314"/>
+            <a:chOff x="286441" y="1127723"/>
+            <a:chExt cx="11041604" cy="4801314"/>
+          </a:xfrm>
+        </p:grpSpPr>
+        <p:sp>
+          <p:nvSpPr>
+            <p:cNvPr id="7" name="TextBox 6">
+              <a:extLst>
+                <a:ext uri="{FF2B5EF4-FFF2-40B4-BE49-F238E27FC236}">
+                  <a16:creationId xmlns:a16="http://schemas.microsoft.com/office/drawing/2014/main" id="{A455283E-8132-66E5-2B1F-CC1DB491D285}"/>
+                </a:ext>
+              </a:extLst>
+            </p:cNvPr>
+            <p:cNvSpPr txBox="1"/>
+            <p:nvPr/>
+          </p:nvSpPr>
+          <p:spPr>
+            <a:xfrm>
+              <a:off x="286441" y="1127723"/>
+              <a:ext cx="11041604" cy="4801314"/>
+            </a:xfrm>
+            <a:prstGeom prst="rect">
+              <a:avLst/>
+            </a:prstGeom>
+          </p:spPr>
+          <p:style>
+            <a:lnRef idx="2">
+              <a:schemeClr val="dk1"/>
+            </a:lnRef>
+            <a:fillRef idx="1">
+              <a:schemeClr val="lt1"/>
+            </a:fillRef>
+            <a:effectRef idx="0">
+              <a:schemeClr val="dk1"/>
+            </a:effectRef>
+            <a:fontRef idx="minor">
+              <a:schemeClr val="dk1"/>
+            </a:fontRef>
+          </p:style>
+          <p:txBody>
+            <a:bodyPr wrap="square" rtlCol="0">
+              <a:spAutoFit/>
+            </a:bodyPr>
+            <a:lstStyle/>
+            <a:p>
+              <a:pPr algn="ctr"/>
+              <a:r>
+                <a:rPr lang="en-US" dirty="0"/>
+                <a:t>Recycle Center</a:t>
+              </a:r>
+            </a:p>
+            <a:p>
+              <a:endParaRPr lang="en-US" dirty="0"/>
+            </a:p>
+            <a:p>
+              <a:endParaRPr lang="en-US" dirty="0"/>
+            </a:p>
+            <a:p>
+              <a:endParaRPr lang="en-US" dirty="0"/>
+            </a:p>
+            <a:p>
+              <a:endParaRPr lang="en-US" dirty="0"/>
+            </a:p>
+            <a:p>
+              <a:endParaRPr lang="en-US" dirty="0"/>
+            </a:p>
+            <a:p>
+              <a:endParaRPr lang="en-US" dirty="0"/>
+            </a:p>
+            <a:p>
+              <a:endParaRPr lang="en-US" dirty="0"/>
+            </a:p>
+            <a:p>
+              <a:endParaRPr lang="en-US" dirty="0"/>
+            </a:p>
+            <a:p>
+              <a:endParaRPr lang="en-US" dirty="0"/>
+            </a:p>
+            <a:p>
+              <a:endParaRPr lang="en-US" dirty="0"/>
+            </a:p>
+            <a:p>
+              <a:endParaRPr lang="en-US" dirty="0"/>
+            </a:p>
+            <a:p>
+              <a:r>
+                <a:rPr lang="en-US" dirty="0"/>
+                <a:t>.</a:t>
+              </a:r>
+              <a:r>
+                <a:rPr lang="en-US" dirty="0" err="1"/>
+                <a:t>getVector</a:t>
+              </a:r>
+              <a:r>
+                <a:rPr lang="en-US" dirty="0"/>
+                <a:t>(dim: number)</a:t>
+              </a:r>
+            </a:p>
+            <a:p>
+              <a:r>
+                <a:rPr lang="en-US" dirty="0"/>
+                <a:t>.</a:t>
+              </a:r>
+              <a:r>
+                <a:rPr lang="en-US" dirty="0" err="1"/>
+                <a:t>getArray</a:t>
+              </a:r>
+              <a:r>
+                <a:rPr lang="en-US" dirty="0"/>
+                <a:t>(size: number)</a:t>
+              </a:r>
+            </a:p>
+            <a:p>
+              <a:r>
+                <a:rPr lang="en-US" dirty="0"/>
+                <a:t>.</a:t>
+              </a:r>
+              <a:r>
+                <a:rPr lang="en-US" dirty="0" err="1"/>
+                <a:t>getComplex</a:t>
+              </a:r>
+              <a:r>
+                <a:rPr lang="en-US" dirty="0"/>
+                <a:t>()</a:t>
+              </a:r>
+            </a:p>
+            <a:p>
+              <a:endParaRPr lang="en-US" dirty="0"/>
+            </a:p>
+            <a:p>
+              <a:endParaRPr lang="en-US" dirty="0"/>
+            </a:p>
+          </p:txBody>
+        </p:sp>
+        <p:sp>
+          <p:nvSpPr>
+            <p:cNvPr id="2" name="TextBox 1">
+              <a:extLst>
+                <a:ext uri="{FF2B5EF4-FFF2-40B4-BE49-F238E27FC236}">
+                  <a16:creationId xmlns:a16="http://schemas.microsoft.com/office/drawing/2014/main" id="{FB5259B8-1DA6-CB9E-327B-284CA40C6E85}"/>
+                </a:ext>
+              </a:extLst>
+            </p:cNvPr>
+            <p:cNvSpPr txBox="1"/>
+            <p:nvPr/>
+          </p:nvSpPr>
+          <p:spPr>
+            <a:xfrm>
+              <a:off x="1078029" y="2836501"/>
+              <a:ext cx="4796590" cy="1200329"/>
+            </a:xfrm>
+            <a:prstGeom prst="rect">
+              <a:avLst/>
+            </a:prstGeom>
+          </p:spPr>
+          <p:style>
+            <a:lnRef idx="2">
+              <a:schemeClr val="dk1"/>
+            </a:lnRef>
+            <a:fillRef idx="1">
+              <a:schemeClr val="lt1"/>
+            </a:fillRef>
+            <a:effectRef idx="0">
+              <a:schemeClr val="dk1"/>
+            </a:effectRef>
+            <a:fontRef idx="minor">
+              <a:schemeClr val="dk1"/>
+            </a:fontRef>
+          </p:style>
+          <p:txBody>
+            <a:bodyPr wrap="square" rtlCol="0">
+              <a:spAutoFit/>
+            </a:bodyPr>
+            <a:lstStyle/>
+            <a:p>
+              <a:r>
+                <a:rPr lang="en-US" dirty="0"/>
+                <a:t>Stack 1…n: dynamically allocated</a:t>
+              </a:r>
+            </a:p>
+            <a:p>
+              <a:r>
+                <a:rPr lang="en-US" dirty="0"/>
+                <a:t>[S1,</a:t>
+              </a:r>
+            </a:p>
+            <a:p>
+              <a:r>
+                <a:rPr lang="en-US" dirty="0"/>
+                <a:t>S2,</a:t>
+              </a:r>
+            </a:p>
+            <a:p>
+              <a:r>
+                <a:rPr lang="en-US" dirty="0"/>
+                <a:t>S3…]</a:t>
+              </a:r>
+            </a:p>
+          </p:txBody>
+        </p:sp>
+        <p:sp>
+          <p:nvSpPr>
+            <p:cNvPr id="3" name="TextBox 2">
+              <a:extLst>
+                <a:ext uri="{FF2B5EF4-FFF2-40B4-BE49-F238E27FC236}">
+                  <a16:creationId xmlns:a16="http://schemas.microsoft.com/office/drawing/2014/main" id="{9D57CE0D-364F-F433-B24D-76F0421E9D1E}"/>
+                </a:ext>
+              </a:extLst>
+            </p:cNvPr>
+            <p:cNvSpPr txBox="1"/>
+            <p:nvPr/>
+          </p:nvSpPr>
+          <p:spPr>
+            <a:xfrm>
+              <a:off x="1078029" y="2190170"/>
+              <a:ext cx="4796590" cy="646331"/>
+            </a:xfrm>
+            <a:prstGeom prst="rect">
+              <a:avLst/>
+            </a:prstGeom>
+          </p:spPr>
+          <p:style>
+            <a:lnRef idx="2">
+              <a:schemeClr val="dk1"/>
+            </a:lnRef>
+            <a:fillRef idx="1">
+              <a:schemeClr val="lt1"/>
+            </a:fillRef>
+            <a:effectRef idx="0">
+              <a:schemeClr val="dk1"/>
+            </a:effectRef>
+            <a:fontRef idx="minor">
+              <a:schemeClr val="dk1"/>
+            </a:fontRef>
+          </p:style>
+          <p:txBody>
+            <a:bodyPr wrap="square" rtlCol="0">
+              <a:spAutoFit/>
+            </a:bodyPr>
+            <a:lstStyle/>
+            <a:p>
+              <a:r>
+                <a:rPr lang="en-US" dirty="0"/>
+                <a:t>Stack 0:</a:t>
+              </a:r>
+            </a:p>
+            <a:p>
+              <a:r>
+                <a:rPr lang="en-US" dirty="0"/>
+                <a:t>S0 = [Q(1,2,3), Q(2,3),…]</a:t>
+              </a:r>
+            </a:p>
+          </p:txBody>
+        </p:sp>
+        <p:sp>
+          <p:nvSpPr>
+            <p:cNvPr id="4" name="TextBox 3">
+              <a:extLst>
+                <a:ext uri="{FF2B5EF4-FFF2-40B4-BE49-F238E27FC236}">
+                  <a16:creationId xmlns:a16="http://schemas.microsoft.com/office/drawing/2014/main" id="{0C4BC702-73D8-BAA8-F6BE-245B4B67EE1E}"/>
+                </a:ext>
+              </a:extLst>
+            </p:cNvPr>
+            <p:cNvSpPr txBox="1"/>
+            <p:nvPr/>
+          </p:nvSpPr>
+          <p:spPr>
+            <a:xfrm>
+              <a:off x="1078029" y="1835698"/>
+              <a:ext cx="4796590" cy="369332"/>
+            </a:xfrm>
+            <a:prstGeom prst="rect">
+              <a:avLst/>
+            </a:prstGeom>
+          </p:spPr>
+          <p:style>
+            <a:lnRef idx="2">
+              <a:schemeClr val="dk1"/>
+            </a:lnRef>
+            <a:fillRef idx="1">
+              <a:schemeClr val="lt1"/>
+            </a:fillRef>
+            <a:effectRef idx="0">
+              <a:schemeClr val="dk1"/>
+            </a:effectRef>
+            <a:fontRef idx="minor">
+              <a:schemeClr val="dk1"/>
+            </a:fontRef>
+          </p:style>
+          <p:txBody>
+            <a:bodyPr wrap="square" rtlCol="0">
+              <a:spAutoFit/>
+            </a:bodyPr>
+            <a:lstStyle/>
+            <a:p>
+              <a:r>
+                <a:rPr lang="en-US" dirty="0"/>
+                <a:t>Array/Vector stacks</a:t>
+              </a:r>
+            </a:p>
+          </p:txBody>
+        </p:sp>
+        <p:sp>
+          <p:nvSpPr>
+            <p:cNvPr id="5" name="TextBox 4">
+              <a:extLst>
+                <a:ext uri="{FF2B5EF4-FFF2-40B4-BE49-F238E27FC236}">
+                  <a16:creationId xmlns:a16="http://schemas.microsoft.com/office/drawing/2014/main" id="{6E6547C6-A7D6-C25A-C017-70A41D2A6ED6}"/>
+                </a:ext>
+              </a:extLst>
+            </p:cNvPr>
+            <p:cNvSpPr txBox="1"/>
+            <p:nvPr/>
+          </p:nvSpPr>
+          <p:spPr>
+            <a:xfrm>
+              <a:off x="6317383" y="1820838"/>
+              <a:ext cx="4215866" cy="369332"/>
+            </a:xfrm>
+            <a:prstGeom prst="rect">
+              <a:avLst/>
+            </a:prstGeom>
+          </p:spPr>
+          <p:style>
+            <a:lnRef idx="2">
+              <a:schemeClr val="dk1"/>
+            </a:lnRef>
+            <a:fillRef idx="1">
+              <a:schemeClr val="lt1"/>
+            </a:fillRef>
+            <a:effectRef idx="0">
+              <a:schemeClr val="dk1"/>
+            </a:effectRef>
+            <a:fontRef idx="minor">
+              <a:schemeClr val="dk1"/>
+            </a:fontRef>
+          </p:style>
+          <p:txBody>
+            <a:bodyPr wrap="square" rtlCol="0">
+              <a:spAutoFit/>
+            </a:bodyPr>
+            <a:lstStyle/>
+            <a:p>
+              <a:r>
+                <a:rPr lang="en-US" dirty="0"/>
+                <a:t>Complex Stacks</a:t>
+              </a:r>
+            </a:p>
+          </p:txBody>
+        </p:sp>
+        <p:sp>
+          <p:nvSpPr>
+            <p:cNvPr id="6" name="TextBox 5">
+              <a:extLst>
+                <a:ext uri="{FF2B5EF4-FFF2-40B4-BE49-F238E27FC236}">
+                  <a16:creationId xmlns:a16="http://schemas.microsoft.com/office/drawing/2014/main" id="{24461D4F-3C46-2E6A-78E2-8BCE2531A685}"/>
+                </a:ext>
+              </a:extLst>
+            </p:cNvPr>
+            <p:cNvSpPr txBox="1"/>
+            <p:nvPr/>
+          </p:nvSpPr>
+          <p:spPr>
+            <a:xfrm>
+              <a:off x="6317383" y="2205030"/>
+              <a:ext cx="4215866" cy="646331"/>
+            </a:xfrm>
+            <a:prstGeom prst="rect">
+              <a:avLst/>
+            </a:prstGeom>
+          </p:spPr>
+          <p:style>
+            <a:lnRef idx="2">
+              <a:schemeClr val="dk1"/>
+            </a:lnRef>
+            <a:fillRef idx="1">
+              <a:schemeClr val="lt1"/>
+            </a:fillRef>
+            <a:effectRef idx="0">
+              <a:schemeClr val="dk1"/>
+            </a:effectRef>
+            <a:fontRef idx="minor">
+              <a:schemeClr val="dk1"/>
+            </a:fontRef>
+          </p:style>
+          <p:txBody>
+            <a:bodyPr wrap="square" rtlCol="0">
+              <a:spAutoFit/>
+            </a:bodyPr>
+            <a:lstStyle/>
+            <a:p>
+              <a:r>
+                <a:rPr lang="en-US" dirty="0"/>
+                <a:t>Complex Stack:</a:t>
+              </a:r>
+            </a:p>
+            <a:p>
+              <a:r>
+                <a:rPr lang="en-US" dirty="0"/>
+                <a:t>SC = [Q(1,2), Q(2,3),…]</a:t>
+              </a:r>
+            </a:p>
+          </p:txBody>
+        </p:sp>
+        <p:cxnSp>
+          <p:nvCxnSpPr>
+            <p:cNvPr id="9" name="Connector: Elbow 8">
+              <a:extLst>
+                <a:ext uri="{FF2B5EF4-FFF2-40B4-BE49-F238E27FC236}">
+                  <a16:creationId xmlns:a16="http://schemas.microsoft.com/office/drawing/2014/main" id="{F384BAA0-0D08-FF66-797F-F865349AC5BB}"/>
+                </a:ext>
+              </a:extLst>
+            </p:cNvPr>
+            <p:cNvCxnSpPr>
+              <a:cxnSpLocks/>
+              <a:endCxn id="4" idx="3"/>
+            </p:cNvCxnSpPr>
+            <p:nvPr/>
+          </p:nvCxnSpPr>
+          <p:spPr>
+            <a:xfrm flipV="1">
+              <a:off x="2810577" y="2020364"/>
+              <a:ext cx="3064042" cy="2561261"/>
+            </a:xfrm>
+            <a:prstGeom prst="bentConnector3">
+              <a:avLst>
+                <a:gd name="adj1" fmla="val 107461"/>
+              </a:avLst>
+            </a:prstGeom>
+            <a:ln>
+              <a:tailEnd type="triangle"/>
+            </a:ln>
+          </p:spPr>
+          <p:style>
+            <a:lnRef idx="1">
+              <a:schemeClr val="accent1"/>
+            </a:lnRef>
+            <a:fillRef idx="0">
+              <a:schemeClr val="accent1"/>
+            </a:fillRef>
+            <a:effectRef idx="0">
+              <a:schemeClr val="accent1"/>
+            </a:effectRef>
+            <a:fontRef idx="minor">
+              <a:schemeClr val="tx1"/>
+            </a:fontRef>
+          </p:style>
+        </p:cxnSp>
+        <p:sp>
+          <p:nvSpPr>
+            <p:cNvPr id="20" name="TextBox 19">
+              <a:extLst>
+                <a:ext uri="{FF2B5EF4-FFF2-40B4-BE49-F238E27FC236}">
+                  <a16:creationId xmlns:a16="http://schemas.microsoft.com/office/drawing/2014/main" id="{E01EE521-EFCE-8535-C30B-0CBB496F47BD}"/>
+                </a:ext>
+              </a:extLst>
+            </p:cNvPr>
+            <p:cNvSpPr txBox="1"/>
+            <p:nvPr/>
+          </p:nvSpPr>
+          <p:spPr>
+            <a:xfrm>
+              <a:off x="3583807" y="4212293"/>
+              <a:ext cx="1674796" cy="369332"/>
+            </a:xfrm>
+            <a:prstGeom prst="rect">
+              <a:avLst/>
+            </a:prstGeom>
+            <a:noFill/>
+          </p:spPr>
+          <p:txBody>
+            <a:bodyPr wrap="square" rtlCol="0">
+              <a:spAutoFit/>
+            </a:bodyPr>
+            <a:lstStyle/>
+            <a:p>
+              <a:r>
+                <a:rPr lang="en-US" dirty="0"/>
+                <a:t>Access, pop</a:t>
+              </a:r>
+            </a:p>
+          </p:txBody>
+        </p:sp>
+        <p:cxnSp>
+          <p:nvCxnSpPr>
+            <p:cNvPr id="22" name="Connector: Elbow 21">
+              <a:extLst>
+                <a:ext uri="{FF2B5EF4-FFF2-40B4-BE49-F238E27FC236}">
+                  <a16:creationId xmlns:a16="http://schemas.microsoft.com/office/drawing/2014/main" id="{79E7136C-726E-1817-4786-09303CD74CDE}"/>
+                </a:ext>
+              </a:extLst>
+            </p:cNvPr>
+            <p:cNvCxnSpPr>
+              <a:cxnSpLocks/>
+              <a:endCxn id="4" idx="3"/>
+            </p:cNvCxnSpPr>
+            <p:nvPr/>
+          </p:nvCxnSpPr>
+          <p:spPr>
+            <a:xfrm flipV="1">
+              <a:off x="2723949" y="2020364"/>
+              <a:ext cx="3150670" cy="2862029"/>
+            </a:xfrm>
+            <a:prstGeom prst="bentConnector3">
+              <a:avLst>
+                <a:gd name="adj1" fmla="val 107256"/>
+              </a:avLst>
+            </a:prstGeom>
+            <a:ln>
+              <a:tailEnd type="triangle"/>
+            </a:ln>
+          </p:spPr>
+          <p:style>
+            <a:lnRef idx="1">
+              <a:schemeClr val="accent1"/>
+            </a:lnRef>
+            <a:fillRef idx="0">
+              <a:schemeClr val="accent1"/>
+            </a:fillRef>
+            <a:effectRef idx="0">
+              <a:schemeClr val="accent1"/>
+            </a:effectRef>
+            <a:fontRef idx="minor">
+              <a:schemeClr val="tx1"/>
+            </a:fontRef>
+          </p:style>
+        </p:cxnSp>
+        <p:cxnSp>
+          <p:nvCxnSpPr>
+            <p:cNvPr id="24" name="Connector: Elbow 23">
+              <a:extLst>
+                <a:ext uri="{FF2B5EF4-FFF2-40B4-BE49-F238E27FC236}">
+                  <a16:creationId xmlns:a16="http://schemas.microsoft.com/office/drawing/2014/main" id="{10F2960E-3EF2-D764-333A-FBD2BEC83F45}"/>
+                </a:ext>
+              </a:extLst>
+            </p:cNvPr>
+            <p:cNvCxnSpPr>
+              <a:cxnSpLocks/>
+            </p:cNvCxnSpPr>
+            <p:nvPr/>
+          </p:nvCxnSpPr>
+          <p:spPr>
+            <a:xfrm flipV="1">
+              <a:off x="1732547" y="2020364"/>
+              <a:ext cx="8800702" cy="3167653"/>
+            </a:xfrm>
+            <a:prstGeom prst="bentConnector3">
+              <a:avLst>
+                <a:gd name="adj1" fmla="val 103700"/>
+              </a:avLst>
+            </a:prstGeom>
+            <a:ln>
+              <a:tailEnd type="triangle"/>
+            </a:ln>
+          </p:spPr>
+          <p:style>
+            <a:lnRef idx="1">
+              <a:schemeClr val="accent1"/>
+            </a:lnRef>
+            <a:fillRef idx="0">
+              <a:schemeClr val="accent1"/>
+            </a:fillRef>
+            <a:effectRef idx="0">
+              <a:schemeClr val="accent1"/>
+            </a:effectRef>
+            <a:fontRef idx="minor">
+              <a:schemeClr val="tx1"/>
+            </a:fontRef>
+          </p:style>
+        </p:cxnSp>
+        <p:sp>
+          <p:nvSpPr>
+            <p:cNvPr id="32" name="TextBox 31">
+              <a:extLst>
+                <a:ext uri="{FF2B5EF4-FFF2-40B4-BE49-F238E27FC236}">
+                  <a16:creationId xmlns:a16="http://schemas.microsoft.com/office/drawing/2014/main" id="{27583932-6340-BE5C-D0F8-0D3DC41138D3}"/>
+                </a:ext>
+              </a:extLst>
+            </p:cNvPr>
+            <p:cNvSpPr txBox="1"/>
+            <p:nvPr/>
+          </p:nvSpPr>
+          <p:spPr>
+            <a:xfrm>
+              <a:off x="3583807" y="4848111"/>
+              <a:ext cx="1674796" cy="369332"/>
+            </a:xfrm>
+            <a:prstGeom prst="rect">
+              <a:avLst/>
+            </a:prstGeom>
+            <a:noFill/>
+          </p:spPr>
+          <p:txBody>
+            <a:bodyPr wrap="square" rtlCol="0">
+              <a:spAutoFit/>
+            </a:bodyPr>
+            <a:lstStyle/>
+            <a:p>
+              <a:r>
+                <a:rPr lang="en-US" dirty="0"/>
+                <a:t>Access, pop</a:t>
+              </a:r>
+            </a:p>
+          </p:txBody>
+        </p:sp>
+      </p:grpSp>
+    </p:spTree>
+    <p:extLst>
+      <p:ext uri="{BB962C8B-B14F-4D97-AF65-F5344CB8AC3E}">
+        <p14:creationId xmlns:p14="http://schemas.microsoft.com/office/powerpoint/2010/main" val="182164404"/>
       </p:ext>
     </p:extLst>
   </p:cSld>

</xml_diff>

<commit_message>
implement parameterized variable and time variable t
</commit_message>
<xml_diff>
--- a/doc/illustrations.pptx
+++ b/doc/illustrations.pptx
@@ -29,6 +29,7 @@
     <p:sldId id="277" r:id="rId23"/>
     <p:sldId id="278" r:id="rId24"/>
     <p:sldId id="279" r:id="rId25"/>
+    <p:sldId id="280" r:id="rId26"/>
   </p:sldIdLst>
   <p:sldSz cx="12192000" cy="6858000"/>
   <p:notesSz cx="6858000" cy="9144000"/>
@@ -6868,7 +6869,7 @@
           <a:p>
             <a:fld id="{82BB0895-06E8-4B53-88C8-0F0562CFD945}" type="datetimeFigureOut">
               <a:rPr lang="en-US" smtClean="0"/>
-              <a:t>5/27/2022</a:t>
+              <a:t>5/31/2022</a:t>
             </a:fld>
             <a:endParaRPr lang="en-US"/>
           </a:p>
@@ -7038,7 +7039,7 @@
           <a:p>
             <a:fld id="{82BB0895-06E8-4B53-88C8-0F0562CFD945}" type="datetimeFigureOut">
               <a:rPr lang="en-US" smtClean="0"/>
-              <a:t>5/27/2022</a:t>
+              <a:t>5/31/2022</a:t>
             </a:fld>
             <a:endParaRPr lang="en-US"/>
           </a:p>
@@ -7218,7 +7219,7 @@
           <a:p>
             <a:fld id="{82BB0895-06E8-4B53-88C8-0F0562CFD945}" type="datetimeFigureOut">
               <a:rPr lang="en-US" smtClean="0"/>
-              <a:t>5/27/2022</a:t>
+              <a:t>5/31/2022</a:t>
             </a:fld>
             <a:endParaRPr lang="en-US"/>
           </a:p>
@@ -7388,7 +7389,7 @@
           <a:p>
             <a:fld id="{82BB0895-06E8-4B53-88C8-0F0562CFD945}" type="datetimeFigureOut">
               <a:rPr lang="en-US" smtClean="0"/>
-              <a:t>5/27/2022</a:t>
+              <a:t>5/31/2022</a:t>
             </a:fld>
             <a:endParaRPr lang="en-US"/>
           </a:p>
@@ -7634,7 +7635,7 @@
           <a:p>
             <a:fld id="{82BB0895-06E8-4B53-88C8-0F0562CFD945}" type="datetimeFigureOut">
               <a:rPr lang="en-US" smtClean="0"/>
-              <a:t>5/27/2022</a:t>
+              <a:t>5/31/2022</a:t>
             </a:fld>
             <a:endParaRPr lang="en-US"/>
           </a:p>
@@ -7866,7 +7867,7 @@
           <a:p>
             <a:fld id="{82BB0895-06E8-4B53-88C8-0F0562CFD945}" type="datetimeFigureOut">
               <a:rPr lang="en-US" smtClean="0"/>
-              <a:t>5/27/2022</a:t>
+              <a:t>5/31/2022</a:t>
             </a:fld>
             <a:endParaRPr lang="en-US"/>
           </a:p>
@@ -8233,7 +8234,7 @@
           <a:p>
             <a:fld id="{82BB0895-06E8-4B53-88C8-0F0562CFD945}" type="datetimeFigureOut">
               <a:rPr lang="en-US" smtClean="0"/>
-              <a:t>5/27/2022</a:t>
+              <a:t>5/31/2022</a:t>
             </a:fld>
             <a:endParaRPr lang="en-US"/>
           </a:p>
@@ -8351,7 +8352,7 @@
           <a:p>
             <a:fld id="{82BB0895-06E8-4B53-88C8-0F0562CFD945}" type="datetimeFigureOut">
               <a:rPr lang="en-US" smtClean="0"/>
-              <a:t>5/27/2022</a:t>
+              <a:t>5/31/2022</a:t>
             </a:fld>
             <a:endParaRPr lang="en-US"/>
           </a:p>
@@ -8446,7 +8447,7 @@
           <a:p>
             <a:fld id="{82BB0895-06E8-4B53-88C8-0F0562CFD945}" type="datetimeFigureOut">
               <a:rPr lang="en-US" smtClean="0"/>
-              <a:t>5/27/2022</a:t>
+              <a:t>5/31/2022</a:t>
             </a:fld>
             <a:endParaRPr lang="en-US"/>
           </a:p>
@@ -8723,7 +8724,7 @@
           <a:p>
             <a:fld id="{82BB0895-06E8-4B53-88C8-0F0562CFD945}" type="datetimeFigureOut">
               <a:rPr lang="en-US" smtClean="0"/>
-              <a:t>5/27/2022</a:t>
+              <a:t>5/31/2022</a:t>
             </a:fld>
             <a:endParaRPr lang="en-US"/>
           </a:p>
@@ -8980,7 +8981,7 @@
           <a:p>
             <a:fld id="{82BB0895-06E8-4B53-88C8-0F0562CFD945}" type="datetimeFigureOut">
               <a:rPr lang="en-US" smtClean="0"/>
-              <a:t>5/27/2022</a:t>
+              <a:t>5/31/2022</a:t>
             </a:fld>
             <a:endParaRPr lang="en-US"/>
           </a:p>
@@ -9193,7 +9194,7 @@
           <a:p>
             <a:fld id="{82BB0895-06E8-4B53-88C8-0F0562CFD945}" type="datetimeFigureOut">
               <a:rPr lang="en-US" smtClean="0"/>
-              <a:t>5/27/2022</a:t>
+              <a:t>5/31/2022</a:t>
             </a:fld>
             <a:endParaRPr lang="en-US"/>
           </a:p>
@@ -16955,8 +16956,8 @@
             <a:chExt cx="11117929" cy="2501844"/>
           </a:xfrm>
         </p:grpSpPr>
-        <mc:AlternateContent xmlns:mc="http://schemas.openxmlformats.org/markup-compatibility/2006">
-          <mc:Choice xmlns:a14="http://schemas.microsoft.com/office/drawing/2010/main" Requires="a14">
+        <mc:AlternateContent xmlns:mc="http://schemas.openxmlformats.org/markup-compatibility/2006" xmlns:a14="http://schemas.microsoft.com/office/drawing/2010/main">
+          <mc:Choice Requires="a14">
             <p:sp>
               <p:nvSpPr>
                 <p:cNvPr id="2" name="TextBox 1">
@@ -17266,7 +17267,7 @@
               </p:txBody>
             </p:sp>
           </mc:Choice>
-          <mc:Fallback>
+          <mc:Fallback xmlns="">
             <p:sp>
               <p:nvSpPr>
                 <p:cNvPr id="2" name="TextBox 1">
@@ -17311,8 +17312,8 @@
             </p:sp>
           </mc:Fallback>
         </mc:AlternateContent>
-        <mc:AlternateContent xmlns:mc="http://schemas.openxmlformats.org/markup-compatibility/2006">
-          <mc:Choice xmlns:a14="http://schemas.microsoft.com/office/drawing/2010/main" Requires="a14">
+        <mc:AlternateContent xmlns:mc="http://schemas.openxmlformats.org/markup-compatibility/2006" xmlns:a14="http://schemas.microsoft.com/office/drawing/2010/main">
+          <mc:Choice Requires="a14">
             <p:sp>
               <p:nvSpPr>
                 <p:cNvPr id="3" name="TextBox 2">
@@ -17720,7 +17721,7 @@
               </p:txBody>
             </p:sp>
           </mc:Choice>
-          <mc:Fallback>
+          <mc:Fallback xmlns="">
             <p:sp>
               <p:nvSpPr>
                 <p:cNvPr id="3" name="TextBox 2">
@@ -25577,6 +25578,2279 @@
 </p:sld>
 </file>
 
+<file path=ppt/slides/slide25.xml><?xml version="1.0" encoding="utf-8"?>
+<p:sld xmlns:a="http://schemas.openxmlformats.org/drawingml/2006/main" xmlns:r="http://schemas.openxmlformats.org/officeDocument/2006/relationships" xmlns:p="http://schemas.openxmlformats.org/presentationml/2006/main">
+  <p:cSld>
+    <p:spTree>
+      <p:nvGrpSpPr>
+        <p:cNvPr id="1" name=""/>
+        <p:cNvGrpSpPr/>
+        <p:nvPr/>
+      </p:nvGrpSpPr>
+      <p:grpSpPr>
+        <a:xfrm>
+          <a:off x="0" y="0"/>
+          <a:ext cx="0" cy="0"/>
+          <a:chOff x="0" y="0"/>
+          <a:chExt cx="0" cy="0"/>
+        </a:xfrm>
+      </p:grpSpPr>
+      <p:grpSp>
+        <p:nvGrpSpPr>
+          <p:cNvPr id="32" name="Group 31">
+            <a:extLst>
+              <a:ext uri="{FF2B5EF4-FFF2-40B4-BE49-F238E27FC236}">
+                <a16:creationId xmlns:a16="http://schemas.microsoft.com/office/drawing/2014/main" id="{B6257D56-F4FC-D277-AC48-64AB4D821E6F}"/>
+              </a:ext>
+            </a:extLst>
+          </p:cNvPr>
+          <p:cNvGrpSpPr/>
+          <p:nvPr/>
+        </p:nvGrpSpPr>
+        <p:grpSpPr>
+          <a:xfrm>
+            <a:off x="1270534" y="894956"/>
+            <a:ext cx="10100711" cy="4473954"/>
+            <a:chOff x="1270534" y="894956"/>
+            <a:chExt cx="10100711" cy="4473954"/>
+          </a:xfrm>
+        </p:grpSpPr>
+        <p:sp>
+          <p:nvSpPr>
+            <p:cNvPr id="22" name="Rectangle 2">
+              <a:extLst>
+                <a:ext uri="{FF2B5EF4-FFF2-40B4-BE49-F238E27FC236}">
+                  <a16:creationId xmlns:a16="http://schemas.microsoft.com/office/drawing/2014/main" id="{51E75F23-DFD0-8836-A99B-566E10D69851}"/>
+                </a:ext>
+              </a:extLst>
+            </p:cNvPr>
+            <p:cNvSpPr>
+              <a:spLocks noChangeArrowheads="1"/>
+            </p:cNvSpPr>
+            <p:nvPr/>
+          </p:nvSpPr>
+          <p:spPr bwMode="auto">
+            <a:xfrm>
+              <a:off x="5743476" y="894956"/>
+              <a:ext cx="5627769" cy="707886"/>
+            </a:xfrm>
+            <a:prstGeom prst="rect">
+              <a:avLst/>
+            </a:prstGeom>
+            <a:solidFill>
+              <a:srgbClr val="FFFFFF"/>
+            </a:solidFill>
+            <a:ln>
+              <a:noFill/>
+            </a:ln>
+            <a:effectLst/>
+            <a:extLst>
+              <a:ext uri="{91240B29-F687-4F45-9708-019B960494DF}">
+                <a14:hiddenLine xmlns:a14="http://schemas.microsoft.com/office/drawing/2010/main" w="9525">
+                  <a:solidFill>
+                    <a:schemeClr val="tx1"/>
+                  </a:solidFill>
+                  <a:miter lim="800000"/>
+                  <a:headEnd/>
+                  <a:tailEnd/>
+                </a14:hiddenLine>
+              </a:ext>
+              <a:ext uri="{AF507438-7753-43E0-B8FC-AC1667EBCBE1}">
+                <a14:hiddenEffects xmlns:a14="http://schemas.microsoft.com/office/drawing/2010/main">
+                  <a:effectLst>
+                    <a:outerShdw dist="35921" dir="2700000" algn="ctr" rotWithShape="0">
+                      <a:schemeClr val="bg2"/>
+                    </a:outerShdw>
+                  </a:effectLst>
+                </a14:hiddenEffects>
+              </a:ext>
+            </a:extLst>
+          </p:spPr>
+          <p:txBody>
+            <a:bodyPr vert="horz" wrap="square" lIns="91440" tIns="45720" rIns="91440" bIns="45720" numCol="1" anchor="ctr" anchorCtr="0" compatLnSpc="1">
+              <a:prstTxWarp prst="textNoShape">
+                <a:avLst/>
+              </a:prstTxWarp>
+              <a:spAutoFit/>
+            </a:bodyPr>
+            <a:lstStyle/>
+            <a:p>
+              <a:pPr marL="0" marR="0" lvl="0" indent="0" algn="l" defTabSz="914400" rtl="0" eaLnBrk="0" fontAlgn="base" latinLnBrk="0" hangingPunct="0">
+                <a:lnSpc>
+                  <a:spcPct val="100000"/>
+                </a:lnSpc>
+                <a:spcBef>
+                  <a:spcPct val="0"/>
+                </a:spcBef>
+                <a:spcAft>
+                  <a:spcPct val="0"/>
+                </a:spcAft>
+                <a:buClrTx/>
+                <a:buSzTx/>
+                <a:buFontTx/>
+                <a:buNone/>
+                <a:tabLst/>
+              </a:pPr>
+              <a:r>
+                <a:rPr lang="en-US" altLang="en-US" sz="2000" dirty="0">
+                  <a:latin typeface="Arial Unicode MS"/>
+                </a:rPr>
+                <a:t>return </a:t>
+              </a:r>
+              <a:r>
+                <a:rPr kumimoji="0" lang="en-US" altLang="en-US" sz="2000" b="0" i="0" u="none" strike="noStrike" cap="none" normalizeH="0" baseline="0" dirty="0" err="1">
+                  <a:ln>
+                    <a:noFill/>
+                  </a:ln>
+                  <a:effectLst/>
+                  <a:latin typeface="Arial Unicode MS"/>
+                </a:rPr>
+                <a:t>a.</a:t>
+              </a:r>
+              <a:r>
+                <a:rPr kumimoji="0" lang="en-US" altLang="en-US" sz="2000" b="0" i="0" u="none" strike="noStrike" cap="none" normalizeH="0" baseline="0" dirty="0" err="1">
+                  <a:ln>
+                    <a:noFill/>
+                  </a:ln>
+                  <a:solidFill>
+                    <a:schemeClr val="accent5"/>
+                  </a:solidFill>
+                  <a:effectLst/>
+                  <a:latin typeface="Arial Unicode MS"/>
+                </a:rPr>
+                <a:t>add</a:t>
+              </a:r>
+              <a:r>
+                <a:rPr kumimoji="0" lang="en-US" altLang="en-US" sz="2000" b="0" i="0" u="none" strike="noStrike" cap="none" normalizeH="0" baseline="0" dirty="0">
+                  <a:ln>
+                    <a:noFill/>
+                  </a:ln>
+                  <a:effectLst/>
+                  <a:latin typeface="Arial Unicode MS"/>
+                </a:rPr>
+                <a:t>(get(1, c)(c, [</a:t>
+              </a:r>
+              <a:r>
+                <a:rPr kumimoji="0" lang="en-US" altLang="en-US" sz="2000" b="0" i="0" u="none" strike="noStrike" cap="none" normalizeH="0" baseline="0" dirty="0" err="1">
+                  <a:ln>
+                    <a:noFill/>
+                  </a:ln>
+                  <a:effectLst/>
+                  <a:latin typeface="Arial Unicode MS"/>
+                </a:rPr>
+                <a:t>a.pow</a:t>
+              </a:r>
+              <a:r>
+                <a:rPr kumimoji="0" lang="en-US" altLang="en-US" sz="2000" b="0" i="0" u="none" strike="noStrike" cap="none" normalizeH="0" baseline="0" dirty="0">
+                  <a:ln>
+                    <a:noFill/>
+                  </a:ln>
+                  <a:effectLst/>
+                  <a:latin typeface="Arial Unicode MS"/>
+                </a:rPr>
+                <a:t>(get(0, c), 2)], [24]), get(0, c))</a:t>
+              </a:r>
+              <a:endParaRPr kumimoji="0" lang="en-US" altLang="en-US" sz="2000" b="0" i="0" u="none" strike="noStrike" cap="none" normalizeH="0" baseline="0" dirty="0">
+                <a:ln>
+                  <a:noFill/>
+                </a:ln>
+                <a:effectLst/>
+                <a:latin typeface="Arial" panose="020B0604020202020204" pitchFamily="34" charset="0"/>
+              </a:endParaRPr>
+            </a:p>
+          </p:txBody>
+        </p:sp>
+        <p:grpSp>
+          <p:nvGrpSpPr>
+            <p:cNvPr id="31" name="Group 30">
+              <a:extLst>
+                <a:ext uri="{FF2B5EF4-FFF2-40B4-BE49-F238E27FC236}">
+                  <a16:creationId xmlns:a16="http://schemas.microsoft.com/office/drawing/2014/main" id="{D2F42ED1-560F-6B54-2146-ECADEF876E28}"/>
+                </a:ext>
+              </a:extLst>
+            </p:cNvPr>
+            <p:cNvGrpSpPr/>
+            <p:nvPr/>
+          </p:nvGrpSpPr>
+          <p:grpSpPr>
+            <a:xfrm>
+              <a:off x="1270534" y="1031026"/>
+              <a:ext cx="9714899" cy="4337884"/>
+              <a:chOff x="1270534" y="1031026"/>
+              <a:chExt cx="9714899" cy="4337884"/>
+            </a:xfrm>
+          </p:grpSpPr>
+          <mc:AlternateContent xmlns:mc="http://schemas.openxmlformats.org/markup-compatibility/2006">
+            <mc:Choice xmlns:a14="http://schemas.microsoft.com/office/drawing/2010/main" Requires="a14">
+              <p:sp>
+                <p:nvSpPr>
+                  <p:cNvPr id="6" name="TextBox 5">
+                    <a:extLst>
+                      <a:ext uri="{FF2B5EF4-FFF2-40B4-BE49-F238E27FC236}">
+                        <a16:creationId xmlns:a16="http://schemas.microsoft.com/office/drawing/2014/main" id="{3035B20A-1972-B2A6-0862-9E2F571B7889}"/>
+                      </a:ext>
+                    </a:extLst>
+                  </p:cNvPr>
+                  <p:cNvSpPr txBox="1"/>
+                  <p:nvPr/>
+                </p:nvSpPr>
+                <p:spPr>
+                  <a:xfrm>
+                    <a:off x="2021707" y="3451977"/>
+                    <a:ext cx="2951748" cy="369332"/>
+                  </a:xfrm>
+                  <a:prstGeom prst="rect">
+                    <a:avLst/>
+                  </a:prstGeom>
+                </p:spPr>
+                <p:style>
+                  <a:lnRef idx="2">
+                    <a:schemeClr val="dk1"/>
+                  </a:lnRef>
+                  <a:fillRef idx="1">
+                    <a:schemeClr val="lt1"/>
+                  </a:fillRef>
+                  <a:effectRef idx="0">
+                    <a:schemeClr val="dk1"/>
+                  </a:effectRef>
+                  <a:fontRef idx="minor">
+                    <a:schemeClr val="dk1"/>
+                  </a:fontRef>
+                </p:style>
+                <p:txBody>
+                  <a:bodyPr wrap="square" rtlCol="0">
+                    <a:spAutoFit/>
+                  </a:bodyPr>
+                  <a:lstStyle/>
+                  <a:p>
+                    <a14:m>
+                      <m:oMathPara xmlns:m="http://schemas.openxmlformats.org/officeDocument/2006/math">
+                        <m:oMathParaPr>
+                          <m:jc m:val="centerGroup"/>
+                        </m:oMathParaPr>
+                        <m:oMath xmlns:m="http://schemas.openxmlformats.org/officeDocument/2006/math">
+                          <m:r>
+                            <a:rPr lang="en-US" b="0" i="1" smtClean="0">
+                              <a:latin typeface="Cambria Math" panose="02040503050406030204" pitchFamily="18" charset="0"/>
+                            </a:rPr>
+                            <m:t>𝑓</m:t>
+                          </m:r>
+                          <m:d>
+                            <m:dPr>
+                              <m:ctrlPr>
+                                <a:rPr lang="en-US" b="0" i="1" smtClean="0">
+                                  <a:latin typeface="Cambria Math" panose="02040503050406030204" pitchFamily="18" charset="0"/>
+                                </a:rPr>
+                              </m:ctrlPr>
+                            </m:dPr>
+                            <m:e>
+                              <m:r>
+                                <a:rPr lang="en-US" b="0" i="1" smtClean="0">
+                                  <a:latin typeface="Cambria Math" panose="02040503050406030204" pitchFamily="18" charset="0"/>
+                                </a:rPr>
+                                <m:t>𝑥</m:t>
+                              </m:r>
+                            </m:e>
+                          </m:d>
+                          <m:r>
+                            <a:rPr lang="en-US" b="0" i="1" smtClean="0">
+                              <a:latin typeface="Cambria Math" panose="02040503050406030204" pitchFamily="18" charset="0"/>
+                            </a:rPr>
+                            <m:t>=</m:t>
+                          </m:r>
+                          <m:func>
+                            <m:funcPr>
+                              <m:ctrlPr>
+                                <a:rPr lang="en-US" b="0" i="1" smtClean="0">
+                                  <a:latin typeface="Cambria Math" panose="02040503050406030204" pitchFamily="18" charset="0"/>
+                                </a:rPr>
+                              </m:ctrlPr>
+                            </m:funcPr>
+                            <m:fName>
+                              <m:r>
+                                <m:rPr>
+                                  <m:sty m:val="p"/>
+                                </m:rPr>
+                                <a:rPr lang="en-US" b="0" i="0" smtClean="0">
+                                  <a:latin typeface="Cambria Math" panose="02040503050406030204" pitchFamily="18" charset="0"/>
+                                </a:rPr>
+                                <m:t>sin</m:t>
+                              </m:r>
+                            </m:fName>
+                            <m:e>
+                              <m:d>
+                                <m:dPr>
+                                  <m:ctrlPr>
+                                    <a:rPr lang="en-US" b="0" i="1" smtClean="0">
+                                      <a:latin typeface="Cambria Math" panose="02040503050406030204" pitchFamily="18" charset="0"/>
+                                    </a:rPr>
+                                  </m:ctrlPr>
+                                </m:dPr>
+                                <m:e>
+                                  <m:r>
+                                    <a:rPr lang="en-US" b="0" i="1" smtClean="0">
+                                      <a:latin typeface="Cambria Math" panose="02040503050406030204" pitchFamily="18" charset="0"/>
+                                    </a:rPr>
+                                    <m:t>𝑥</m:t>
+                                  </m:r>
+                                </m:e>
+                              </m:d>
+                              <m:r>
+                                <a:rPr lang="en-US" b="0" i="1" smtClean="0">
+                                  <a:latin typeface="Cambria Math" panose="02040503050406030204" pitchFamily="18" charset="0"/>
+                                </a:rPr>
+                                <m:t>+</m:t>
+                              </m:r>
+                              <m:r>
+                                <a:rPr lang="en-US" b="0" i="1" smtClean="0">
+                                  <a:latin typeface="Cambria Math" panose="02040503050406030204" pitchFamily="18" charset="0"/>
+                                </a:rPr>
+                                <m:t>𝑥</m:t>
+                              </m:r>
+                            </m:e>
+                          </m:func>
+                        </m:oMath>
+                      </m:oMathPara>
+                    </a14:m>
+                    <a:endParaRPr lang="en-US" dirty="0"/>
+                  </a:p>
+                </p:txBody>
+              </p:sp>
+            </mc:Choice>
+            <mc:Fallback>
+              <p:sp>
+                <p:nvSpPr>
+                  <p:cNvPr id="6" name="TextBox 5">
+                    <a:extLst>
+                      <a:ext uri="{FF2B5EF4-FFF2-40B4-BE49-F238E27FC236}">
+                        <a16:creationId xmlns:a16="http://schemas.microsoft.com/office/drawing/2014/main" id="{3035B20A-1972-B2A6-0862-9E2F571B7889}"/>
+                      </a:ext>
+                    </a:extLst>
+                  </p:cNvPr>
+                  <p:cNvSpPr txBox="1">
+                    <a:spLocks noRot="1" noChangeAspect="1" noMove="1" noResize="1" noEditPoints="1" noAdjustHandles="1" noChangeArrowheads="1" noChangeShapeType="1" noTextEdit="1"/>
+                  </p:cNvSpPr>
+                  <p:nvPr/>
+                </p:nvSpPr>
+                <p:spPr>
+                  <a:xfrm>
+                    <a:off x="2021707" y="3451977"/>
+                    <a:ext cx="2951748" cy="369332"/>
+                  </a:xfrm>
+                  <a:prstGeom prst="rect">
+                    <a:avLst/>
+                  </a:prstGeom>
+                  <a:blipFill>
+                    <a:blip r:embed="rId2"/>
+                    <a:stretch>
+                      <a:fillRect b="-11111"/>
+                    </a:stretch>
+                  </a:blipFill>
+                </p:spPr>
+                <p:txBody>
+                  <a:bodyPr/>
+                  <a:lstStyle/>
+                  <a:p>
+                    <a:r>
+                      <a:rPr lang="en-US">
+                        <a:noFill/>
+                      </a:rPr>
+                      <a:t> </a:t>
+                    </a:r>
+                  </a:p>
+                </p:txBody>
+              </p:sp>
+            </mc:Fallback>
+          </mc:AlternateContent>
+          <mc:AlternateContent xmlns:mc="http://schemas.openxmlformats.org/markup-compatibility/2006">
+            <mc:Choice xmlns:a14="http://schemas.microsoft.com/office/drawing/2010/main" Requires="a14">
+              <p:sp>
+                <p:nvSpPr>
+                  <p:cNvPr id="2" name="TextBox 1">
+                    <a:extLst>
+                      <a:ext uri="{FF2B5EF4-FFF2-40B4-BE49-F238E27FC236}">
+                        <a16:creationId xmlns:a16="http://schemas.microsoft.com/office/drawing/2014/main" id="{97787B97-BD45-06FC-F56E-78D3ED3F01F0}"/>
+                      </a:ext>
+                    </a:extLst>
+                  </p:cNvPr>
+                  <p:cNvSpPr txBox="1"/>
+                  <p:nvPr/>
+                </p:nvSpPr>
+                <p:spPr>
+                  <a:xfrm>
+                    <a:off x="1270534" y="1031026"/>
+                    <a:ext cx="2951748" cy="369332"/>
+                  </a:xfrm>
+                  <a:prstGeom prst="rect">
+                    <a:avLst/>
+                  </a:prstGeom>
+                </p:spPr>
+                <p:style>
+                  <a:lnRef idx="2">
+                    <a:schemeClr val="dk1"/>
+                  </a:lnRef>
+                  <a:fillRef idx="1">
+                    <a:schemeClr val="lt1"/>
+                  </a:fillRef>
+                  <a:effectRef idx="0">
+                    <a:schemeClr val="dk1"/>
+                  </a:effectRef>
+                  <a:fontRef idx="minor">
+                    <a:schemeClr val="dk1"/>
+                  </a:fontRef>
+                </p:style>
+                <p:txBody>
+                  <a:bodyPr wrap="square" rtlCol="0">
+                    <a:spAutoFit/>
+                  </a:bodyPr>
+                  <a:lstStyle/>
+                  <a:p>
+                    <a14:m>
+                      <m:oMathPara xmlns:m="http://schemas.openxmlformats.org/officeDocument/2006/math">
+                        <m:oMathParaPr>
+                          <m:jc m:val="centerGroup"/>
+                        </m:oMathParaPr>
+                        <m:oMath xmlns:m="http://schemas.openxmlformats.org/officeDocument/2006/math">
+                          <m:r>
+                            <a:rPr lang="en-US" b="0" i="1" smtClean="0">
+                              <a:latin typeface="Cambria Math" panose="02040503050406030204" pitchFamily="18" charset="0"/>
+                            </a:rPr>
+                            <m:t>𝑧</m:t>
+                          </m:r>
+                          <m:r>
+                            <a:rPr lang="en-US" b="0" i="1" smtClean="0">
+                              <a:latin typeface="Cambria Math" panose="02040503050406030204" pitchFamily="18" charset="0"/>
+                            </a:rPr>
+                            <m:t>=</m:t>
+                          </m:r>
+                          <m:r>
+                            <a:rPr lang="en-US" b="0" i="1" smtClean="0">
+                              <a:latin typeface="Cambria Math" panose="02040503050406030204" pitchFamily="18" charset="0"/>
+                            </a:rPr>
+                            <m:t>𝑓</m:t>
+                          </m:r>
+                          <m:d>
+                            <m:dPr>
+                              <m:ctrlPr>
+                                <a:rPr lang="en-US" b="0" i="1" smtClean="0">
+                                  <a:latin typeface="Cambria Math" panose="02040503050406030204" pitchFamily="18" charset="0"/>
+                                </a:rPr>
+                              </m:ctrlPr>
+                            </m:dPr>
+                            <m:e>
+                              <m:sSup>
+                                <m:sSupPr>
+                                  <m:ctrlPr>
+                                    <a:rPr lang="en-US" b="0" i="1" smtClean="0">
+                                      <a:latin typeface="Cambria Math" panose="02040503050406030204" pitchFamily="18" charset="0"/>
+                                    </a:rPr>
+                                  </m:ctrlPr>
+                                </m:sSupPr>
+                                <m:e>
+                                  <m:r>
+                                    <a:rPr lang="en-US" b="0" i="1" smtClean="0">
+                                      <a:latin typeface="Cambria Math" panose="02040503050406030204" pitchFamily="18" charset="0"/>
+                                    </a:rPr>
+                                    <m:t>𝑥</m:t>
+                                  </m:r>
+                                </m:e>
+                                <m:sup>
+                                  <m:r>
+                                    <a:rPr lang="en-US" b="0" i="1" smtClean="0">
+                                      <a:latin typeface="Cambria Math" panose="02040503050406030204" pitchFamily="18" charset="0"/>
+                                    </a:rPr>
+                                    <m:t>2</m:t>
+                                  </m:r>
+                                </m:sup>
+                              </m:sSup>
+                            </m:e>
+                          </m:d>
+                          <m:r>
+                            <a:rPr lang="en-US" b="0" i="1" smtClean="0">
+                              <a:latin typeface="Cambria Math" panose="02040503050406030204" pitchFamily="18" charset="0"/>
+                            </a:rPr>
+                            <m:t>+</m:t>
+                          </m:r>
+                          <m:r>
+                            <a:rPr lang="en-US" b="0" i="1" smtClean="0">
+                              <a:latin typeface="Cambria Math" panose="02040503050406030204" pitchFamily="18" charset="0"/>
+                            </a:rPr>
+                            <m:t>𝑥</m:t>
+                          </m:r>
+                        </m:oMath>
+                      </m:oMathPara>
+                    </a14:m>
+                    <a:endParaRPr lang="en-US" dirty="0"/>
+                  </a:p>
+                </p:txBody>
+              </p:sp>
+            </mc:Choice>
+            <mc:Fallback>
+              <p:sp>
+                <p:nvSpPr>
+                  <p:cNvPr id="2" name="TextBox 1">
+                    <a:extLst>
+                      <a:ext uri="{FF2B5EF4-FFF2-40B4-BE49-F238E27FC236}">
+                        <a16:creationId xmlns:a16="http://schemas.microsoft.com/office/drawing/2014/main" id="{97787B97-BD45-06FC-F56E-78D3ED3F01F0}"/>
+                      </a:ext>
+                    </a:extLst>
+                  </p:cNvPr>
+                  <p:cNvSpPr txBox="1">
+                    <a:spLocks noRot="1" noChangeAspect="1" noMove="1" noResize="1" noEditPoints="1" noAdjustHandles="1" noChangeArrowheads="1" noChangeShapeType="1" noTextEdit="1"/>
+                  </p:cNvSpPr>
+                  <p:nvPr/>
+                </p:nvSpPr>
+                <p:spPr>
+                  <a:xfrm>
+                    <a:off x="1270534" y="1031026"/>
+                    <a:ext cx="2951748" cy="369332"/>
+                  </a:xfrm>
+                  <a:prstGeom prst="rect">
+                    <a:avLst/>
+                  </a:prstGeom>
+                  <a:blipFill>
+                    <a:blip r:embed="rId3"/>
+                    <a:stretch>
+                      <a:fillRect b="-11111"/>
+                    </a:stretch>
+                  </a:blipFill>
+                </p:spPr>
+                <p:txBody>
+                  <a:bodyPr/>
+                  <a:lstStyle/>
+                  <a:p>
+                    <a:r>
+                      <a:rPr lang="en-US">
+                        <a:noFill/>
+                      </a:rPr>
+                      <a:t> </a:t>
+                    </a:r>
+                  </a:p>
+                </p:txBody>
+              </p:sp>
+            </mc:Fallback>
+          </mc:AlternateContent>
+          <p:cxnSp>
+            <p:nvCxnSpPr>
+              <p:cNvPr id="4" name="Straight Arrow Connector 3">
+                <a:extLst>
+                  <a:ext uri="{FF2B5EF4-FFF2-40B4-BE49-F238E27FC236}">
+                    <a16:creationId xmlns:a16="http://schemas.microsoft.com/office/drawing/2014/main" id="{F364E7E6-9FD3-AD73-8638-FBB2EF726132}"/>
+                  </a:ext>
+                </a:extLst>
+              </p:cNvPr>
+              <p:cNvCxnSpPr>
+                <a:cxnSpLocks/>
+              </p:cNvCxnSpPr>
+              <p:nvPr/>
+            </p:nvCxnSpPr>
+            <p:spPr>
+              <a:xfrm>
+                <a:off x="2727157" y="1336442"/>
+                <a:ext cx="0" cy="2092558"/>
+              </a:xfrm>
+              <a:prstGeom prst="straightConnector1">
+                <a:avLst/>
+              </a:prstGeom>
+              <a:ln>
+                <a:tailEnd type="triangle"/>
+              </a:ln>
+            </p:spPr>
+            <p:style>
+              <a:lnRef idx="1">
+                <a:schemeClr val="accent1"/>
+              </a:lnRef>
+              <a:fillRef idx="0">
+                <a:schemeClr val="accent1"/>
+              </a:fillRef>
+              <a:effectRef idx="0">
+                <a:schemeClr val="accent1"/>
+              </a:effectRef>
+              <a:fontRef idx="minor">
+                <a:schemeClr val="tx1"/>
+              </a:fontRef>
+            </p:style>
+          </p:cxnSp>
+          <mc:AlternateContent xmlns:mc="http://schemas.openxmlformats.org/markup-compatibility/2006">
+            <mc:Choice xmlns:a14="http://schemas.microsoft.com/office/drawing/2010/main" Requires="a14">
+              <p:sp>
+                <p:nvSpPr>
+                  <p:cNvPr id="5" name="TextBox 4">
+                    <a:extLst>
+                      <a:ext uri="{FF2B5EF4-FFF2-40B4-BE49-F238E27FC236}">
+                        <a16:creationId xmlns:a16="http://schemas.microsoft.com/office/drawing/2014/main" id="{D687606D-F9B1-D54D-8203-2861B8D889EC}"/>
+                      </a:ext>
+                    </a:extLst>
+                  </p:cNvPr>
+                  <p:cNvSpPr txBox="1"/>
+                  <p:nvPr/>
+                </p:nvSpPr>
+                <p:spPr>
+                  <a:xfrm>
+                    <a:off x="1588970" y="2016668"/>
+                    <a:ext cx="3064041" cy="369332"/>
+                  </a:xfrm>
+                  <a:prstGeom prst="rect">
+                    <a:avLst/>
+                  </a:prstGeom>
+                  <a:noFill/>
+                </p:spPr>
+                <p:txBody>
+                  <a:bodyPr wrap="square" rtlCol="0">
+                    <a:spAutoFit/>
+                  </a:bodyPr>
+                  <a:lstStyle/>
+                  <a:p>
+                    <a:r>
+                      <a:rPr lang="en-US" dirty="0"/>
+                      <a:t>.evaluate(c, p=[</a:t>
+                    </a:r>
+                    <a14:m>
+                      <m:oMath xmlns:m="http://schemas.openxmlformats.org/officeDocument/2006/math">
+                        <m:sSup>
+                          <m:sSupPr>
+                            <m:ctrlPr>
+                              <a:rPr lang="en-US" b="0" i="1" smtClean="0">
+                                <a:latin typeface="Cambria Math" panose="02040503050406030204" pitchFamily="18" charset="0"/>
+                              </a:rPr>
+                            </m:ctrlPr>
+                          </m:sSupPr>
+                          <m:e>
+                            <m:r>
+                              <a:rPr lang="en-US" b="0" i="1" smtClean="0">
+                                <a:latin typeface="Cambria Math" panose="02040503050406030204" pitchFamily="18" charset="0"/>
+                              </a:rPr>
+                              <m:t>𝑥</m:t>
+                            </m:r>
+                          </m:e>
+                          <m:sup>
+                            <m:r>
+                              <a:rPr lang="en-US" b="0" i="1" smtClean="0">
+                                <a:latin typeface="Cambria Math" panose="02040503050406030204" pitchFamily="18" charset="0"/>
+                              </a:rPr>
+                              <m:t>2</m:t>
+                            </m:r>
+                          </m:sup>
+                        </m:sSup>
+                      </m:oMath>
+                    </a14:m>
+                    <a:r>
+                      <a:rPr lang="en-US" dirty="0"/>
+                      <a:t>], pm=[24])</a:t>
+                    </a:r>
+                  </a:p>
+                </p:txBody>
+              </p:sp>
+            </mc:Choice>
+            <mc:Fallback>
+              <p:sp>
+                <p:nvSpPr>
+                  <p:cNvPr id="5" name="TextBox 4">
+                    <a:extLst>
+                      <a:ext uri="{FF2B5EF4-FFF2-40B4-BE49-F238E27FC236}">
+                        <a16:creationId xmlns:a16="http://schemas.microsoft.com/office/drawing/2014/main" id="{D687606D-F9B1-D54D-8203-2861B8D889EC}"/>
+                      </a:ext>
+                    </a:extLst>
+                  </p:cNvPr>
+                  <p:cNvSpPr txBox="1">
+                    <a:spLocks noRot="1" noChangeAspect="1" noMove="1" noResize="1" noEditPoints="1" noAdjustHandles="1" noChangeArrowheads="1" noChangeShapeType="1" noTextEdit="1"/>
+                  </p:cNvSpPr>
+                  <p:nvPr/>
+                </p:nvSpPr>
+                <p:spPr>
+                  <a:xfrm>
+                    <a:off x="1588970" y="2016668"/>
+                    <a:ext cx="3064041" cy="369332"/>
+                  </a:xfrm>
+                  <a:prstGeom prst="rect">
+                    <a:avLst/>
+                  </a:prstGeom>
+                  <a:blipFill>
+                    <a:blip r:embed="rId4"/>
+                    <a:stretch>
+                      <a:fillRect l="-1793" t="-10000" b="-26667"/>
+                    </a:stretch>
+                  </a:blipFill>
+                </p:spPr>
+                <p:txBody>
+                  <a:bodyPr/>
+                  <a:lstStyle/>
+                  <a:p>
+                    <a:r>
+                      <a:rPr lang="en-US">
+                        <a:noFill/>
+                      </a:rPr>
+                      <a:t> </a:t>
+                    </a:r>
+                  </a:p>
+                </p:txBody>
+              </p:sp>
+            </mc:Fallback>
+          </mc:AlternateContent>
+          <p:sp>
+            <p:nvSpPr>
+              <p:cNvPr id="7" name="Left Brace 6">
+                <a:extLst>
+                  <a:ext uri="{FF2B5EF4-FFF2-40B4-BE49-F238E27FC236}">
+                    <a16:creationId xmlns:a16="http://schemas.microsoft.com/office/drawing/2014/main" id="{5E59909B-7100-2C54-D472-5FD01F34449F}"/>
+                  </a:ext>
+                </a:extLst>
+              </p:cNvPr>
+              <p:cNvSpPr/>
+              <p:nvPr/>
+            </p:nvSpPr>
+            <p:spPr>
+              <a:xfrm>
+                <a:off x="5081940" y="2413337"/>
+                <a:ext cx="705851" cy="2955573"/>
+              </a:xfrm>
+              <a:prstGeom prst="leftBrace">
+                <a:avLst>
+                  <a:gd name="adj1" fmla="val 46380"/>
+                  <a:gd name="adj2" fmla="val 41791"/>
+                </a:avLst>
+              </a:prstGeom>
+            </p:spPr>
+            <p:style>
+              <a:lnRef idx="1">
+                <a:schemeClr val="dk1"/>
+              </a:lnRef>
+              <a:fillRef idx="0">
+                <a:schemeClr val="dk1"/>
+              </a:fillRef>
+              <a:effectRef idx="0">
+                <a:schemeClr val="dk1"/>
+              </a:effectRef>
+              <a:fontRef idx="minor">
+                <a:schemeClr val="tx1"/>
+              </a:fontRef>
+            </p:style>
+            <p:txBody>
+              <a:bodyPr rtlCol="0" anchor="ctr"/>
+              <a:lstStyle/>
+              <a:p>
+                <a:pPr algn="ctr"/>
+                <a:endParaRPr lang="en-US"/>
+              </a:p>
+            </p:txBody>
+          </p:sp>
+          <p:sp>
+            <p:nvSpPr>
+              <p:cNvPr id="10" name="Rectangle 2">
+                <a:extLst>
+                  <a:ext uri="{FF2B5EF4-FFF2-40B4-BE49-F238E27FC236}">
+                    <a16:creationId xmlns:a16="http://schemas.microsoft.com/office/drawing/2014/main" id="{E8B8F020-F105-45F9-C750-9791DDC0013F}"/>
+                  </a:ext>
+                </a:extLst>
+              </p:cNvPr>
+              <p:cNvSpPr>
+                <a:spLocks noChangeArrowheads="1"/>
+              </p:cNvSpPr>
+              <p:nvPr/>
+            </p:nvSpPr>
+            <p:spPr bwMode="auto">
+              <a:xfrm>
+                <a:off x="5787791" y="2413337"/>
+                <a:ext cx="5197642" cy="1015663"/>
+              </a:xfrm>
+              <a:prstGeom prst="rect">
+                <a:avLst/>
+              </a:prstGeom>
+              <a:solidFill>
+                <a:srgbClr val="FFFFFF"/>
+              </a:solidFill>
+              <a:ln>
+                <a:noFill/>
+              </a:ln>
+              <a:effectLst/>
+              <a:extLst>
+                <a:ext uri="{91240B29-F687-4F45-9708-019B960494DF}">
+                  <a14:hiddenLine xmlns:a14="http://schemas.microsoft.com/office/drawing/2010/main" w="9525">
+                    <a:solidFill>
+                      <a:schemeClr val="tx1"/>
+                    </a:solidFill>
+                    <a:miter lim="800000"/>
+                    <a:headEnd/>
+                    <a:tailEnd/>
+                  </a14:hiddenLine>
+                </a:ext>
+                <a:ext uri="{AF507438-7753-43E0-B8FC-AC1667EBCBE1}">
+                  <a14:hiddenEffects xmlns:a14="http://schemas.microsoft.com/office/drawing/2010/main">
+                    <a:effectLst>
+                      <a:outerShdw dist="35921" dir="2700000" algn="ctr" rotWithShape="0">
+                        <a:schemeClr val="bg2"/>
+                      </a:outerShdw>
+                    </a:effectLst>
+                  </a14:hiddenEffects>
+                </a:ext>
+              </a:extLst>
+            </p:spPr>
+            <p:txBody>
+              <a:bodyPr vert="horz" wrap="square" lIns="91440" tIns="45720" rIns="91440" bIns="45720" numCol="1" anchor="ctr" anchorCtr="0" compatLnSpc="1">
+                <a:prstTxWarp prst="textNoShape">
+                  <a:avLst/>
+                </a:prstTxWarp>
+                <a:spAutoFit/>
+              </a:bodyPr>
+              <a:lstStyle/>
+              <a:p>
+                <a:pPr marL="0" marR="0" lvl="0" indent="0" algn="l" defTabSz="914400" rtl="0" eaLnBrk="0" fontAlgn="base" latinLnBrk="0" hangingPunct="0">
+                  <a:lnSpc>
+                    <a:spcPct val="100000"/>
+                  </a:lnSpc>
+                  <a:spcBef>
+                    <a:spcPct val="0"/>
+                  </a:spcBef>
+                  <a:spcAft>
+                    <a:spcPct val="0"/>
+                  </a:spcAft>
+                  <a:buClrTx/>
+                  <a:buSzTx/>
+                  <a:buFontTx/>
+                  <a:buNone/>
+                  <a:tabLst/>
+                </a:pPr>
+                <a:r>
+                  <a:rPr kumimoji="0" lang="en-US" altLang="en-US" sz="2000" b="0" i="0" u="none" strike="noStrike" cap="none" normalizeH="0" baseline="0" dirty="0">
+                    <a:ln>
+                      <a:noFill/>
+                    </a:ln>
+                    <a:effectLst/>
+                    <a:latin typeface="Arial Unicode MS"/>
+                    <a:ea typeface="JetBrains Mono"/>
+                  </a:rPr>
+                  <a:t>for(let </a:t>
+                </a:r>
+                <a:r>
+                  <a:rPr kumimoji="0" lang="en-US" altLang="en-US" sz="2000" b="0" i="0" u="none" strike="noStrike" cap="none" normalizeH="0" baseline="0" dirty="0">
+                    <a:ln>
+                      <a:noFill/>
+                    </a:ln>
+                    <a:solidFill>
+                      <a:schemeClr val="accent1"/>
+                    </a:solidFill>
+                    <a:effectLst/>
+                    <a:latin typeface="Arial Unicode MS"/>
+                    <a:ea typeface="JetBrains Mono"/>
+                  </a:rPr>
+                  <a:t>index</a:t>
+                </a:r>
+                <a:r>
+                  <a:rPr kumimoji="0" lang="en-US" altLang="en-US" sz="2000" b="0" i="0" u="none" strike="noStrike" cap="none" normalizeH="0" baseline="0" dirty="0">
+                    <a:ln>
+                      <a:noFill/>
+                    </a:ln>
+                    <a:effectLst/>
+                    <a:latin typeface="Arial Unicode MS"/>
+                    <a:ea typeface="JetBrains Mono"/>
+                  </a:rPr>
+                  <a:t> in </a:t>
+                </a:r>
+                <a:r>
+                  <a:rPr kumimoji="0" lang="en-US" altLang="en-US" sz="2000" b="0" i="0" u="none" strike="noStrike" cap="none" normalizeH="0" baseline="0" dirty="0">
+                    <a:ln>
+                      <a:noFill/>
+                    </a:ln>
+                    <a:solidFill>
+                      <a:schemeClr val="tx2"/>
+                    </a:solidFill>
+                    <a:effectLst/>
+                    <a:latin typeface="Arial Unicode MS"/>
+                    <a:ea typeface="JetBrains Mono"/>
+                  </a:rPr>
+                  <a:t>pm</a:t>
+                </a:r>
+                <a:r>
+                  <a:rPr kumimoji="0" lang="en-US" altLang="en-US" sz="2000" b="0" i="0" u="none" strike="noStrike" cap="none" normalizeH="0" baseline="0" dirty="0">
+                    <a:ln>
+                      <a:noFill/>
+                    </a:ln>
+                    <a:effectLst/>
+                    <a:latin typeface="Arial Unicode MS"/>
+                    <a:ea typeface="JetBrains Mono"/>
+                  </a:rPr>
+                  <a:t>) {</a:t>
+                </a:r>
+                <a:br>
+                  <a:rPr kumimoji="0" lang="en-US" altLang="en-US" sz="2000" b="0" i="0" u="none" strike="noStrike" cap="none" normalizeH="0" baseline="0" dirty="0">
+                    <a:ln>
+                      <a:noFill/>
+                    </a:ln>
+                    <a:effectLst/>
+                    <a:latin typeface="Arial Unicode MS"/>
+                    <a:ea typeface="JetBrains Mono"/>
+                  </a:rPr>
+                </a:br>
+                <a:r>
+                  <a:rPr lang="en-US" altLang="en-US" sz="2000" dirty="0">
+                    <a:latin typeface="Arial Unicode MS"/>
+                    <a:ea typeface="JetBrains Mono"/>
+                  </a:rPr>
+                  <a:t>     </a:t>
+                </a:r>
+                <a:r>
+                  <a:rPr kumimoji="0" lang="en-US" altLang="en-US" sz="2000" b="0" i="0" u="none" strike="noStrike" cap="none" normalizeH="0" baseline="0" dirty="0">
+                    <a:ln>
+                      <a:noFill/>
+                    </a:ln>
+                    <a:effectLst/>
+                    <a:latin typeface="Arial Unicode MS"/>
+                    <a:ea typeface="JetBrains Mono"/>
+                  </a:rPr>
+                  <a:t> </a:t>
+                </a:r>
+                <a:r>
+                  <a:rPr kumimoji="0" lang="en-US" altLang="en-US" sz="2000" b="0" i="0" u="none" strike="noStrike" cap="none" normalizeH="0" baseline="0" dirty="0">
+                    <a:ln>
+                      <a:noFill/>
+                    </a:ln>
+                    <a:solidFill>
+                      <a:schemeClr val="tx2"/>
+                    </a:solidFill>
+                    <a:effectLst/>
+                    <a:latin typeface="Arial Unicode MS"/>
+                    <a:ea typeface="JetBrains Mono"/>
+                  </a:rPr>
+                  <a:t>c</a:t>
+                </a:r>
+                <a:r>
+                  <a:rPr kumimoji="0" lang="en-US" altLang="en-US" sz="2000" b="0" i="0" u="none" strike="noStrike" cap="none" normalizeH="0" baseline="0" dirty="0">
+                    <a:ln>
+                      <a:noFill/>
+                    </a:ln>
+                    <a:effectLst/>
+                    <a:latin typeface="Arial Unicode MS"/>
+                    <a:ea typeface="JetBrains Mono"/>
+                  </a:rPr>
+                  <a:t>[</a:t>
+                </a:r>
+                <a:r>
+                  <a:rPr kumimoji="0" lang="en-US" altLang="en-US" sz="2000" b="0" i="0" u="none" strike="noStrike" cap="none" normalizeH="0" baseline="0" dirty="0">
+                    <a:ln>
+                      <a:noFill/>
+                    </a:ln>
+                    <a:solidFill>
+                      <a:schemeClr val="tx2"/>
+                    </a:solidFill>
+                    <a:effectLst/>
+                    <a:latin typeface="Arial Unicode MS"/>
+                    <a:ea typeface="JetBrains Mono"/>
+                  </a:rPr>
+                  <a:t>pm</a:t>
+                </a:r>
+                <a:r>
+                  <a:rPr kumimoji="0" lang="en-US" altLang="en-US" sz="2000" b="0" i="0" u="none" strike="noStrike" cap="none" normalizeH="0" baseline="0" dirty="0">
+                    <a:ln>
+                      <a:noFill/>
+                    </a:ln>
+                    <a:effectLst/>
+                    <a:latin typeface="Arial Unicode MS"/>
+                    <a:ea typeface="JetBrains Mono"/>
+                  </a:rPr>
+                  <a:t>[</a:t>
+                </a:r>
+                <a:r>
+                  <a:rPr kumimoji="0" lang="en-US" altLang="en-US" sz="2000" b="0" i="0" u="none" strike="noStrike" cap="none" normalizeH="0" baseline="0" dirty="0">
+                    <a:ln>
+                      <a:noFill/>
+                    </a:ln>
+                    <a:solidFill>
+                      <a:schemeClr val="accent1"/>
+                    </a:solidFill>
+                    <a:effectLst/>
+                    <a:latin typeface="Arial Unicode MS"/>
+                    <a:ea typeface="JetBrains Mono"/>
+                  </a:rPr>
+                  <a:t>index</a:t>
+                </a:r>
+                <a:r>
+                  <a:rPr kumimoji="0" lang="en-US" altLang="en-US" sz="2000" b="0" i="0" u="none" strike="noStrike" cap="none" normalizeH="0" baseline="0" dirty="0">
+                    <a:ln>
+                      <a:noFill/>
+                    </a:ln>
+                    <a:effectLst/>
+                    <a:latin typeface="Arial Unicode MS"/>
+                    <a:ea typeface="JetBrains Mono"/>
+                  </a:rPr>
+                  <a:t>]][0].</a:t>
+                </a:r>
+                <a:r>
+                  <a:rPr kumimoji="0" lang="en-US" altLang="en-US" sz="2000" b="0" i="0" u="none" strike="noStrike" cap="none" normalizeH="0" baseline="0" dirty="0">
+                    <a:ln>
+                      <a:noFill/>
+                    </a:ln>
+                    <a:solidFill>
+                      <a:schemeClr val="accent5"/>
+                    </a:solidFill>
+                    <a:effectLst/>
+                    <a:latin typeface="Arial Unicode MS"/>
+                    <a:ea typeface="JetBrains Mono"/>
+                  </a:rPr>
+                  <a:t>push</a:t>
+                </a:r>
+                <a:r>
+                  <a:rPr kumimoji="0" lang="en-US" altLang="en-US" sz="2000" b="0" i="0" u="none" strike="noStrike" cap="none" normalizeH="0" baseline="0" dirty="0">
+                    <a:ln>
+                      <a:noFill/>
+                    </a:ln>
+                    <a:effectLst/>
+                    <a:latin typeface="Arial Unicode MS"/>
+                    <a:ea typeface="JetBrains Mono"/>
+                  </a:rPr>
+                  <a:t>(</a:t>
+                </a:r>
+                <a:r>
+                  <a:rPr kumimoji="0" lang="en-US" altLang="en-US" sz="2000" b="0" i="0" u="none" strike="noStrike" cap="none" normalizeH="0" baseline="0" dirty="0">
+                    <a:ln>
+                      <a:noFill/>
+                    </a:ln>
+                    <a:solidFill>
+                      <a:schemeClr val="tx2"/>
+                    </a:solidFill>
+                    <a:effectLst/>
+                    <a:latin typeface="Arial Unicode MS"/>
+                    <a:ea typeface="JetBrains Mono"/>
+                  </a:rPr>
+                  <a:t>p</a:t>
+                </a:r>
+                <a:r>
+                  <a:rPr kumimoji="0" lang="en-US" altLang="en-US" sz="2000" b="0" i="0" u="none" strike="noStrike" cap="none" normalizeH="0" baseline="0" dirty="0">
+                    <a:ln>
+                      <a:noFill/>
+                    </a:ln>
+                    <a:effectLst/>
+                    <a:latin typeface="Arial Unicode MS"/>
+                    <a:ea typeface="JetBrains Mono"/>
+                  </a:rPr>
+                  <a:t>[</a:t>
+                </a:r>
+                <a:r>
+                  <a:rPr kumimoji="0" lang="en-US" altLang="en-US" sz="2000" b="0" i="0" u="none" strike="noStrike" cap="none" normalizeH="0" baseline="0" dirty="0">
+                    <a:ln>
+                      <a:noFill/>
+                    </a:ln>
+                    <a:solidFill>
+                      <a:schemeClr val="accent1"/>
+                    </a:solidFill>
+                    <a:effectLst/>
+                    <a:latin typeface="Arial Unicode MS"/>
+                    <a:ea typeface="JetBrains Mono"/>
+                  </a:rPr>
+                  <a:t>index</a:t>
+                </a:r>
+                <a:r>
+                  <a:rPr kumimoji="0" lang="en-US" altLang="en-US" sz="2000" b="0" i="0" u="none" strike="noStrike" cap="none" normalizeH="0" baseline="0" dirty="0">
+                    <a:ln>
+                      <a:noFill/>
+                    </a:ln>
+                    <a:effectLst/>
+                    <a:latin typeface="Arial Unicode MS"/>
+                    <a:ea typeface="JetBrains Mono"/>
+                  </a:rPr>
+                  <a:t>]);</a:t>
+                </a:r>
+                <a:br>
+                  <a:rPr kumimoji="0" lang="en-US" altLang="en-US" sz="2000" b="0" i="0" u="none" strike="noStrike" cap="none" normalizeH="0" baseline="0" dirty="0">
+                    <a:ln>
+                      <a:noFill/>
+                    </a:ln>
+                    <a:effectLst/>
+                    <a:latin typeface="Arial Unicode MS"/>
+                    <a:ea typeface="JetBrains Mono"/>
+                  </a:rPr>
+                </a:br>
+                <a:r>
+                  <a:rPr kumimoji="0" lang="en-US" altLang="en-US" sz="2000" b="0" i="0" u="none" strike="noStrike" cap="none" normalizeH="0" baseline="0" dirty="0">
+                    <a:ln>
+                      <a:noFill/>
+                    </a:ln>
+                    <a:effectLst/>
+                    <a:latin typeface="Arial Unicode MS"/>
+                    <a:ea typeface="JetBrains Mono"/>
+                  </a:rPr>
+                  <a:t>}</a:t>
+                </a:r>
+                <a:endParaRPr kumimoji="0" lang="en-US" altLang="en-US" sz="2000" b="0" i="0" u="none" strike="noStrike" cap="none" normalizeH="0" baseline="0" dirty="0">
+                  <a:ln>
+                    <a:noFill/>
+                  </a:ln>
+                  <a:effectLst/>
+                  <a:latin typeface="Arial" panose="020B0604020202020204" pitchFamily="34" charset="0"/>
+                </a:endParaRPr>
+              </a:p>
+            </p:txBody>
+          </p:sp>
+          <p:sp>
+            <p:nvSpPr>
+              <p:cNvPr id="11" name="Rectangle 2">
+                <a:extLst>
+                  <a:ext uri="{FF2B5EF4-FFF2-40B4-BE49-F238E27FC236}">
+                    <a16:creationId xmlns:a16="http://schemas.microsoft.com/office/drawing/2014/main" id="{0D7F0B95-A1F8-4D76-E9AA-C037A30F93F8}"/>
+                  </a:ext>
+                </a:extLst>
+              </p:cNvPr>
+              <p:cNvSpPr>
+                <a:spLocks noChangeArrowheads="1"/>
+              </p:cNvSpPr>
+              <p:nvPr/>
+            </p:nvSpPr>
+            <p:spPr bwMode="auto">
+              <a:xfrm>
+                <a:off x="5787791" y="3530133"/>
+                <a:ext cx="5197642" cy="400110"/>
+              </a:xfrm>
+              <a:prstGeom prst="rect">
+                <a:avLst/>
+              </a:prstGeom>
+              <a:solidFill>
+                <a:srgbClr val="FFFFFF"/>
+              </a:solidFill>
+              <a:ln>
+                <a:noFill/>
+              </a:ln>
+              <a:effectLst/>
+              <a:extLst>
+                <a:ext uri="{91240B29-F687-4F45-9708-019B960494DF}">
+                  <a14:hiddenLine xmlns:a14="http://schemas.microsoft.com/office/drawing/2010/main" w="9525">
+                    <a:solidFill>
+                      <a:schemeClr val="tx1"/>
+                    </a:solidFill>
+                    <a:miter lim="800000"/>
+                    <a:headEnd/>
+                    <a:tailEnd/>
+                  </a14:hiddenLine>
+                </a:ext>
+                <a:ext uri="{AF507438-7753-43E0-B8FC-AC1667EBCBE1}">
+                  <a14:hiddenEffects xmlns:a14="http://schemas.microsoft.com/office/drawing/2010/main">
+                    <a:effectLst>
+                      <a:outerShdw dist="35921" dir="2700000" algn="ctr" rotWithShape="0">
+                        <a:schemeClr val="bg2"/>
+                      </a:outerShdw>
+                    </a:effectLst>
+                  </a14:hiddenEffects>
+                </a:ext>
+              </a:extLst>
+            </p:spPr>
+            <p:txBody>
+              <a:bodyPr vert="horz" wrap="square" lIns="91440" tIns="45720" rIns="91440" bIns="45720" numCol="1" anchor="ctr" anchorCtr="0" compatLnSpc="1">
+                <a:prstTxWarp prst="textNoShape">
+                  <a:avLst/>
+                </a:prstTxWarp>
+                <a:spAutoFit/>
+              </a:bodyPr>
+              <a:lstStyle/>
+              <a:p>
+                <a:pPr marL="0" marR="0" lvl="0" indent="0" algn="l" defTabSz="914400" rtl="0" eaLnBrk="0" fontAlgn="base" latinLnBrk="0" hangingPunct="0">
+                  <a:lnSpc>
+                    <a:spcPct val="100000"/>
+                  </a:lnSpc>
+                  <a:spcBef>
+                    <a:spcPct val="0"/>
+                  </a:spcBef>
+                  <a:spcAft>
+                    <a:spcPct val="0"/>
+                  </a:spcAft>
+                  <a:buClrTx/>
+                  <a:buSzTx/>
+                  <a:buFontTx/>
+                  <a:buNone/>
+                  <a:tabLst/>
+                </a:pPr>
+                <a:r>
+                  <a:rPr kumimoji="0" lang="en-US" altLang="en-US" sz="2000" b="0" i="0" u="none" strike="noStrike" cap="none" normalizeH="0" baseline="0" dirty="0">
+                    <a:ln>
+                      <a:noFill/>
+                    </a:ln>
+                    <a:effectLst/>
+                    <a:latin typeface="Arial Unicode MS"/>
+                  </a:rPr>
+                  <a:t>let </a:t>
+                </a:r>
+                <a:r>
+                  <a:rPr kumimoji="0" lang="en-US" altLang="en-US" sz="2000" b="0" i="0" u="none" strike="noStrike" cap="none" normalizeH="0" baseline="0" dirty="0">
+                    <a:ln>
+                      <a:noFill/>
+                    </a:ln>
+                    <a:solidFill>
+                      <a:schemeClr val="accent1"/>
+                    </a:solidFill>
+                    <a:effectLst/>
+                    <a:latin typeface="Arial Unicode MS"/>
+                  </a:rPr>
+                  <a:t>r</a:t>
+                </a:r>
+                <a:r>
+                  <a:rPr kumimoji="0" lang="en-US" altLang="en-US" sz="2000" b="0" i="0" u="none" strike="noStrike" cap="none" normalizeH="0" baseline="0" dirty="0">
+                    <a:ln>
+                      <a:noFill/>
+                    </a:ln>
+                    <a:effectLst/>
+                    <a:latin typeface="Arial Unicode MS"/>
+                  </a:rPr>
+                  <a:t> = </a:t>
+                </a:r>
+                <a:r>
+                  <a:rPr kumimoji="0" lang="en-US" altLang="en-US" sz="2000" b="0" i="0" u="none" strike="noStrike" cap="none" normalizeH="0" baseline="0" dirty="0" err="1">
+                    <a:ln>
+                      <a:noFill/>
+                    </a:ln>
+                    <a:effectLst/>
+                    <a:latin typeface="Arial Unicode MS"/>
+                  </a:rPr>
+                  <a:t>a.</a:t>
+                </a:r>
+                <a:r>
+                  <a:rPr kumimoji="0" lang="en-US" altLang="en-US" sz="2000" b="0" i="0" u="none" strike="noStrike" cap="none" normalizeH="0" baseline="0" dirty="0" err="1">
+                    <a:ln>
+                      <a:noFill/>
+                    </a:ln>
+                    <a:solidFill>
+                      <a:schemeClr val="accent5"/>
+                    </a:solidFill>
+                    <a:effectLst/>
+                    <a:latin typeface="Arial Unicode MS"/>
+                  </a:rPr>
+                  <a:t>add</a:t>
+                </a:r>
+                <a:r>
+                  <a:rPr kumimoji="0" lang="en-US" altLang="en-US" sz="2000" b="0" i="0" u="none" strike="noStrike" cap="none" normalizeH="0" baseline="0" dirty="0">
+                    <a:ln>
+                      <a:noFill/>
+                    </a:ln>
+                    <a:effectLst/>
+                    <a:latin typeface="Arial Unicode MS"/>
+                  </a:rPr>
+                  <a:t>(</a:t>
+                </a:r>
+                <a:r>
+                  <a:rPr kumimoji="0" lang="en-US" altLang="en-US" sz="2000" b="0" i="0" u="none" strike="noStrike" cap="none" normalizeH="0" baseline="0" dirty="0" err="1">
+                    <a:ln>
+                      <a:noFill/>
+                    </a:ln>
+                    <a:effectLst/>
+                    <a:latin typeface="Arial Unicode MS"/>
+                  </a:rPr>
+                  <a:t>a.</a:t>
+                </a:r>
+                <a:r>
+                  <a:rPr kumimoji="0" lang="en-US" altLang="en-US" sz="2000" b="0" i="0" u="none" strike="noStrike" cap="none" normalizeH="0" baseline="0" dirty="0" err="1">
+                    <a:ln>
+                      <a:noFill/>
+                    </a:ln>
+                    <a:solidFill>
+                      <a:schemeClr val="accent5"/>
+                    </a:solidFill>
+                    <a:effectLst/>
+                    <a:latin typeface="Arial Unicode MS"/>
+                  </a:rPr>
+                  <a:t>sin</a:t>
+                </a:r>
+                <a:r>
+                  <a:rPr kumimoji="0" lang="en-US" altLang="en-US" sz="2000" b="0" i="0" u="none" strike="noStrike" cap="none" normalizeH="0" baseline="0" dirty="0">
+                    <a:ln>
+                      <a:noFill/>
+                    </a:ln>
+                    <a:effectLst/>
+                    <a:latin typeface="Arial Unicode MS"/>
+                  </a:rPr>
+                  <a:t>(get(0, c)), get(0, c))</a:t>
+                </a:r>
+                <a:endParaRPr kumimoji="0" lang="en-US" altLang="en-US" sz="2000" b="0" i="0" u="none" strike="noStrike" cap="none" normalizeH="0" baseline="0" dirty="0">
+                  <a:ln>
+                    <a:noFill/>
+                  </a:ln>
+                  <a:effectLst/>
+                  <a:latin typeface="Arial" panose="020B0604020202020204" pitchFamily="34" charset="0"/>
+                </a:endParaRPr>
+              </a:p>
+            </p:txBody>
+          </p:sp>
+          <p:sp>
+            <p:nvSpPr>
+              <p:cNvPr id="12" name="Rectangle 2">
+                <a:extLst>
+                  <a:ext uri="{FF2B5EF4-FFF2-40B4-BE49-F238E27FC236}">
+                    <a16:creationId xmlns:a16="http://schemas.microsoft.com/office/drawing/2014/main" id="{B66301A0-16C9-AECF-F5F8-AF4E9308D405}"/>
+                  </a:ext>
+                </a:extLst>
+              </p:cNvPr>
+              <p:cNvSpPr>
+                <a:spLocks noChangeArrowheads="1"/>
+              </p:cNvSpPr>
+              <p:nvPr/>
+            </p:nvSpPr>
+            <p:spPr bwMode="auto">
+              <a:xfrm>
+                <a:off x="5787791" y="3968315"/>
+                <a:ext cx="5197642" cy="1015663"/>
+              </a:xfrm>
+              <a:prstGeom prst="rect">
+                <a:avLst/>
+              </a:prstGeom>
+              <a:solidFill>
+                <a:srgbClr val="FFFFFF"/>
+              </a:solidFill>
+              <a:ln>
+                <a:noFill/>
+              </a:ln>
+              <a:effectLst/>
+              <a:extLst>
+                <a:ext uri="{91240B29-F687-4F45-9708-019B960494DF}">
+                  <a14:hiddenLine xmlns:a14="http://schemas.microsoft.com/office/drawing/2010/main" w="9525">
+                    <a:solidFill>
+                      <a:schemeClr val="tx1"/>
+                    </a:solidFill>
+                    <a:miter lim="800000"/>
+                    <a:headEnd/>
+                    <a:tailEnd/>
+                  </a14:hiddenLine>
+                </a:ext>
+                <a:ext uri="{AF507438-7753-43E0-B8FC-AC1667EBCBE1}">
+                  <a14:hiddenEffects xmlns:a14="http://schemas.microsoft.com/office/drawing/2010/main">
+                    <a:effectLst>
+                      <a:outerShdw dist="35921" dir="2700000" algn="ctr" rotWithShape="0">
+                        <a:schemeClr val="bg2"/>
+                      </a:outerShdw>
+                    </a:effectLst>
+                  </a14:hiddenEffects>
+                </a:ext>
+              </a:extLst>
+            </p:spPr>
+            <p:txBody>
+              <a:bodyPr vert="horz" wrap="square" lIns="91440" tIns="45720" rIns="91440" bIns="45720" numCol="1" anchor="ctr" anchorCtr="0" compatLnSpc="1">
+                <a:prstTxWarp prst="textNoShape">
+                  <a:avLst/>
+                </a:prstTxWarp>
+                <a:spAutoFit/>
+              </a:bodyPr>
+              <a:lstStyle/>
+              <a:p>
+                <a:pPr marL="0" marR="0" lvl="0" indent="0" algn="l" defTabSz="914400" rtl="0" eaLnBrk="0" fontAlgn="base" latinLnBrk="0" hangingPunct="0">
+                  <a:lnSpc>
+                    <a:spcPct val="100000"/>
+                  </a:lnSpc>
+                  <a:spcBef>
+                    <a:spcPct val="0"/>
+                  </a:spcBef>
+                  <a:spcAft>
+                    <a:spcPct val="0"/>
+                  </a:spcAft>
+                  <a:buClrTx/>
+                  <a:buSzTx/>
+                  <a:buFontTx/>
+                  <a:buNone/>
+                  <a:tabLst/>
+                </a:pPr>
+                <a:r>
+                  <a:rPr kumimoji="0" lang="en-US" altLang="en-US" sz="2000" b="0" i="0" u="none" strike="noStrike" cap="none" normalizeH="0" baseline="0" dirty="0">
+                    <a:ln>
+                      <a:noFill/>
+                    </a:ln>
+                    <a:effectLst/>
+                    <a:latin typeface="Arial Unicode MS"/>
+                    <a:ea typeface="JetBrains Mono"/>
+                  </a:rPr>
+                  <a:t>for(let </a:t>
+                </a:r>
+                <a:r>
+                  <a:rPr kumimoji="0" lang="en-US" altLang="en-US" sz="2000" b="0" i="0" u="none" strike="noStrike" cap="none" normalizeH="0" baseline="0" dirty="0">
+                    <a:ln>
+                      <a:noFill/>
+                    </a:ln>
+                    <a:solidFill>
+                      <a:schemeClr val="accent1"/>
+                    </a:solidFill>
+                    <a:effectLst/>
+                    <a:latin typeface="Arial Unicode MS"/>
+                    <a:ea typeface="JetBrains Mono"/>
+                  </a:rPr>
+                  <a:t>index</a:t>
+                </a:r>
+                <a:r>
+                  <a:rPr kumimoji="0" lang="en-US" altLang="en-US" sz="2000" b="0" i="0" u="none" strike="noStrike" cap="none" normalizeH="0" baseline="0" dirty="0">
+                    <a:ln>
+                      <a:noFill/>
+                    </a:ln>
+                    <a:effectLst/>
+                    <a:latin typeface="Arial Unicode MS"/>
+                    <a:ea typeface="JetBrains Mono"/>
+                  </a:rPr>
+                  <a:t> in </a:t>
+                </a:r>
+                <a:r>
+                  <a:rPr kumimoji="0" lang="en-US" altLang="en-US" sz="2000" b="0" i="0" u="none" strike="noStrike" cap="none" normalizeH="0" baseline="0" dirty="0">
+                    <a:ln>
+                      <a:noFill/>
+                    </a:ln>
+                    <a:solidFill>
+                      <a:schemeClr val="tx2"/>
+                    </a:solidFill>
+                    <a:effectLst/>
+                    <a:latin typeface="Arial Unicode MS"/>
+                    <a:ea typeface="JetBrains Mono"/>
+                  </a:rPr>
+                  <a:t>pm</a:t>
+                </a:r>
+                <a:r>
+                  <a:rPr kumimoji="0" lang="en-US" altLang="en-US" sz="2000" b="0" i="0" u="none" strike="noStrike" cap="none" normalizeH="0" baseline="0" dirty="0">
+                    <a:ln>
+                      <a:noFill/>
+                    </a:ln>
+                    <a:effectLst/>
+                    <a:latin typeface="Arial Unicode MS"/>
+                    <a:ea typeface="JetBrains Mono"/>
+                  </a:rPr>
+                  <a:t>) {</a:t>
+                </a:r>
+                <a:br>
+                  <a:rPr kumimoji="0" lang="en-US" altLang="en-US" sz="2000" b="0" i="0" u="none" strike="noStrike" cap="none" normalizeH="0" baseline="0" dirty="0">
+                    <a:ln>
+                      <a:noFill/>
+                    </a:ln>
+                    <a:effectLst/>
+                    <a:latin typeface="Arial Unicode MS"/>
+                    <a:ea typeface="JetBrains Mono"/>
+                  </a:rPr>
+                </a:br>
+                <a:r>
+                  <a:rPr lang="en-US" altLang="en-US" sz="2000" dirty="0">
+                    <a:latin typeface="Arial Unicode MS"/>
+                    <a:ea typeface="JetBrains Mono"/>
+                  </a:rPr>
+                  <a:t>     </a:t>
+                </a:r>
+                <a:r>
+                  <a:rPr kumimoji="0" lang="en-US" altLang="en-US" sz="2000" b="0" i="0" u="none" strike="noStrike" cap="none" normalizeH="0" baseline="0" dirty="0">
+                    <a:ln>
+                      <a:noFill/>
+                    </a:ln>
+                    <a:effectLst/>
+                    <a:latin typeface="Arial Unicode MS"/>
+                    <a:ea typeface="JetBrains Mono"/>
+                  </a:rPr>
+                  <a:t> </a:t>
+                </a:r>
+                <a:r>
+                  <a:rPr kumimoji="0" lang="en-US" altLang="en-US" sz="2000" b="0" i="0" u="none" strike="noStrike" cap="none" normalizeH="0" baseline="0" dirty="0">
+                    <a:ln>
+                      <a:noFill/>
+                    </a:ln>
+                    <a:solidFill>
+                      <a:schemeClr val="tx2"/>
+                    </a:solidFill>
+                    <a:effectLst/>
+                    <a:latin typeface="Arial Unicode MS"/>
+                    <a:ea typeface="JetBrains Mono"/>
+                  </a:rPr>
+                  <a:t>c</a:t>
+                </a:r>
+                <a:r>
+                  <a:rPr kumimoji="0" lang="en-US" altLang="en-US" sz="2000" b="0" i="0" u="none" strike="noStrike" cap="none" normalizeH="0" baseline="0" dirty="0">
+                    <a:ln>
+                      <a:noFill/>
+                    </a:ln>
+                    <a:effectLst/>
+                    <a:latin typeface="Arial Unicode MS"/>
+                    <a:ea typeface="JetBrains Mono"/>
+                  </a:rPr>
+                  <a:t>[</a:t>
+                </a:r>
+                <a:r>
+                  <a:rPr kumimoji="0" lang="en-US" altLang="en-US" sz="2000" b="0" i="0" u="none" strike="noStrike" cap="none" normalizeH="0" baseline="0" dirty="0">
+                    <a:ln>
+                      <a:noFill/>
+                    </a:ln>
+                    <a:solidFill>
+                      <a:schemeClr val="tx2"/>
+                    </a:solidFill>
+                    <a:effectLst/>
+                    <a:latin typeface="Arial Unicode MS"/>
+                    <a:ea typeface="JetBrains Mono"/>
+                  </a:rPr>
+                  <a:t>pm</a:t>
+                </a:r>
+                <a:r>
+                  <a:rPr kumimoji="0" lang="en-US" altLang="en-US" sz="2000" b="0" i="0" u="none" strike="noStrike" cap="none" normalizeH="0" baseline="0" dirty="0">
+                    <a:ln>
+                      <a:noFill/>
+                    </a:ln>
+                    <a:effectLst/>
+                    <a:latin typeface="Arial Unicode MS"/>
+                    <a:ea typeface="JetBrains Mono"/>
+                  </a:rPr>
+                  <a:t>[</a:t>
+                </a:r>
+                <a:r>
+                  <a:rPr kumimoji="0" lang="en-US" altLang="en-US" sz="2000" b="0" i="0" u="none" strike="noStrike" cap="none" normalizeH="0" baseline="0" dirty="0">
+                    <a:ln>
+                      <a:noFill/>
+                    </a:ln>
+                    <a:solidFill>
+                      <a:schemeClr val="accent1"/>
+                    </a:solidFill>
+                    <a:effectLst/>
+                    <a:latin typeface="Arial Unicode MS"/>
+                    <a:ea typeface="JetBrains Mono"/>
+                  </a:rPr>
+                  <a:t>index</a:t>
+                </a:r>
+                <a:r>
+                  <a:rPr kumimoji="0" lang="en-US" altLang="en-US" sz="2000" b="0" i="0" u="none" strike="noStrike" cap="none" normalizeH="0" baseline="0" dirty="0">
+                    <a:ln>
+                      <a:noFill/>
+                    </a:ln>
+                    <a:effectLst/>
+                    <a:latin typeface="Arial Unicode MS"/>
+                    <a:ea typeface="JetBrains Mono"/>
+                  </a:rPr>
+                  <a:t>]][0].</a:t>
+                </a:r>
+                <a:r>
+                  <a:rPr kumimoji="0" lang="en-US" altLang="en-US" sz="2000" b="0" i="0" u="none" strike="noStrike" cap="none" normalizeH="0" baseline="0" dirty="0">
+                    <a:ln>
+                      <a:noFill/>
+                    </a:ln>
+                    <a:solidFill>
+                      <a:schemeClr val="accent5"/>
+                    </a:solidFill>
+                    <a:effectLst/>
+                    <a:latin typeface="Arial Unicode MS"/>
+                    <a:ea typeface="JetBrains Mono"/>
+                  </a:rPr>
+                  <a:t>pop</a:t>
+                </a:r>
+                <a:r>
+                  <a:rPr kumimoji="0" lang="en-US" altLang="en-US" sz="2000" b="0" i="0" u="none" strike="noStrike" cap="none" normalizeH="0" baseline="0" dirty="0">
+                    <a:ln>
+                      <a:noFill/>
+                    </a:ln>
+                    <a:effectLst/>
+                    <a:latin typeface="Arial Unicode MS"/>
+                    <a:ea typeface="JetBrains Mono"/>
+                  </a:rPr>
+                  <a:t>();</a:t>
+                </a:r>
+                <a:br>
+                  <a:rPr kumimoji="0" lang="en-US" altLang="en-US" sz="2000" b="0" i="0" u="none" strike="noStrike" cap="none" normalizeH="0" baseline="0" dirty="0">
+                    <a:ln>
+                      <a:noFill/>
+                    </a:ln>
+                    <a:effectLst/>
+                    <a:latin typeface="Arial Unicode MS"/>
+                    <a:ea typeface="JetBrains Mono"/>
+                  </a:rPr>
+                </a:br>
+                <a:r>
+                  <a:rPr kumimoji="0" lang="en-US" altLang="en-US" sz="2000" b="0" i="0" u="none" strike="noStrike" cap="none" normalizeH="0" baseline="0" dirty="0">
+                    <a:ln>
+                      <a:noFill/>
+                    </a:ln>
+                    <a:effectLst/>
+                    <a:latin typeface="Arial Unicode MS"/>
+                    <a:ea typeface="JetBrains Mono"/>
+                  </a:rPr>
+                  <a:t>}</a:t>
+                </a:r>
+              </a:p>
+            </p:txBody>
+          </p:sp>
+          <p:sp>
+            <p:nvSpPr>
+              <p:cNvPr id="13" name="Rectangle 2">
+                <a:extLst>
+                  <a:ext uri="{FF2B5EF4-FFF2-40B4-BE49-F238E27FC236}">
+                    <a16:creationId xmlns:a16="http://schemas.microsoft.com/office/drawing/2014/main" id="{C8E0B33B-CF8C-5815-4131-FF1811EC41A0}"/>
+                  </a:ext>
+                </a:extLst>
+              </p:cNvPr>
+              <p:cNvSpPr>
+                <a:spLocks noChangeArrowheads="1"/>
+              </p:cNvSpPr>
+              <p:nvPr/>
+            </p:nvSpPr>
+            <p:spPr bwMode="auto">
+              <a:xfrm>
+                <a:off x="5787791" y="4961211"/>
+                <a:ext cx="5197642" cy="400110"/>
+              </a:xfrm>
+              <a:prstGeom prst="rect">
+                <a:avLst/>
+              </a:prstGeom>
+              <a:solidFill>
+                <a:srgbClr val="FFFFFF"/>
+              </a:solidFill>
+              <a:ln>
+                <a:noFill/>
+              </a:ln>
+              <a:effectLst/>
+              <a:extLst>
+                <a:ext uri="{91240B29-F687-4F45-9708-019B960494DF}">
+                  <a14:hiddenLine xmlns:a14="http://schemas.microsoft.com/office/drawing/2010/main" w="9525">
+                    <a:solidFill>
+                      <a:schemeClr val="tx1"/>
+                    </a:solidFill>
+                    <a:miter lim="800000"/>
+                    <a:headEnd/>
+                    <a:tailEnd/>
+                  </a14:hiddenLine>
+                </a:ext>
+                <a:ext uri="{AF507438-7753-43E0-B8FC-AC1667EBCBE1}">
+                  <a14:hiddenEffects xmlns:a14="http://schemas.microsoft.com/office/drawing/2010/main">
+                    <a:effectLst>
+                      <a:outerShdw dist="35921" dir="2700000" algn="ctr" rotWithShape="0">
+                        <a:schemeClr val="bg2"/>
+                      </a:outerShdw>
+                    </a:effectLst>
+                  </a14:hiddenEffects>
+                </a:ext>
+              </a:extLst>
+            </p:spPr>
+            <p:txBody>
+              <a:bodyPr vert="horz" wrap="square" lIns="91440" tIns="45720" rIns="91440" bIns="45720" numCol="1" anchor="ctr" anchorCtr="0" compatLnSpc="1">
+                <a:prstTxWarp prst="textNoShape">
+                  <a:avLst/>
+                </a:prstTxWarp>
+                <a:spAutoFit/>
+              </a:bodyPr>
+              <a:lstStyle/>
+              <a:p>
+                <a:pPr marL="0" marR="0" lvl="0" indent="0" algn="l" defTabSz="914400" rtl="0" eaLnBrk="0" fontAlgn="base" latinLnBrk="0" hangingPunct="0">
+                  <a:lnSpc>
+                    <a:spcPct val="100000"/>
+                  </a:lnSpc>
+                  <a:spcBef>
+                    <a:spcPct val="0"/>
+                  </a:spcBef>
+                  <a:spcAft>
+                    <a:spcPct val="0"/>
+                  </a:spcAft>
+                  <a:buClrTx/>
+                  <a:buSzTx/>
+                  <a:buFontTx/>
+                  <a:buNone/>
+                  <a:tabLst/>
+                </a:pPr>
+                <a:r>
+                  <a:rPr kumimoji="0" lang="en-US" altLang="en-US" sz="2000" b="0" i="0" u="none" strike="noStrike" cap="none" normalizeH="0" baseline="0" dirty="0">
+                    <a:ln>
+                      <a:noFill/>
+                    </a:ln>
+                    <a:effectLst/>
+                    <a:latin typeface="Arial Unicode MS"/>
+                  </a:rPr>
+                  <a:t>return </a:t>
+                </a:r>
+                <a:r>
+                  <a:rPr kumimoji="0" lang="en-US" altLang="en-US" sz="2000" b="0" i="0" u="none" strike="noStrike" cap="none" normalizeH="0" baseline="0" dirty="0">
+                    <a:ln>
+                      <a:noFill/>
+                    </a:ln>
+                    <a:solidFill>
+                      <a:schemeClr val="accent1"/>
+                    </a:solidFill>
+                    <a:effectLst/>
+                    <a:latin typeface="Arial Unicode MS"/>
+                  </a:rPr>
+                  <a:t>r</a:t>
+                </a:r>
+                <a:r>
+                  <a:rPr kumimoji="0" lang="en-US" altLang="en-US" sz="2000" b="0" i="0" u="none" strike="noStrike" cap="none" normalizeH="0" baseline="0" dirty="0">
+                    <a:ln>
+                      <a:noFill/>
+                    </a:ln>
+                    <a:effectLst/>
+                    <a:latin typeface="Arial Unicode MS"/>
+                  </a:rPr>
+                  <a:t>;</a:t>
+                </a:r>
+                <a:endParaRPr kumimoji="0" lang="en-US" altLang="en-US" sz="2000" b="0" i="0" u="none" strike="noStrike" cap="none" normalizeH="0" baseline="0" dirty="0">
+                  <a:ln>
+                    <a:noFill/>
+                  </a:ln>
+                  <a:effectLst/>
+                  <a:latin typeface="Arial" panose="020B0604020202020204" pitchFamily="34" charset="0"/>
+                </a:endParaRPr>
+              </a:p>
+            </p:txBody>
+          </p:sp>
+          <mc:AlternateContent xmlns:mc="http://schemas.openxmlformats.org/markup-compatibility/2006">
+            <mc:Choice xmlns:a14="http://schemas.microsoft.com/office/drawing/2010/main" Requires="a14">
+              <p:sp>
+                <p:nvSpPr>
+                  <p:cNvPr id="15" name="TextBox 14">
+                    <a:extLst>
+                      <a:ext uri="{FF2B5EF4-FFF2-40B4-BE49-F238E27FC236}">
+                        <a16:creationId xmlns:a16="http://schemas.microsoft.com/office/drawing/2014/main" id="{5105FC29-DFCD-9062-D9B4-8BF3CA87B404}"/>
+                      </a:ext>
+                    </a:extLst>
+                  </p:cNvPr>
+                  <p:cNvSpPr txBox="1"/>
+                  <p:nvPr/>
+                </p:nvSpPr>
+                <p:spPr>
+                  <a:xfrm>
+                    <a:off x="3955783" y="4362389"/>
+                    <a:ext cx="2168893" cy="369332"/>
+                  </a:xfrm>
+                  <a:prstGeom prst="rect">
+                    <a:avLst/>
+                  </a:prstGeom>
+                  <a:noFill/>
+                </p:spPr>
+                <p:txBody>
+                  <a:bodyPr wrap="square" rtlCol="0">
+                    <a:spAutoFit/>
+                  </a:bodyPr>
+                  <a:lstStyle/>
+                  <a:p>
+                    <a14:m>
+                      <m:oMath xmlns:m="http://schemas.openxmlformats.org/officeDocument/2006/math">
+                        <m:r>
+                          <a:rPr lang="en-US" b="0" i="1" smtClean="0">
+                            <a:latin typeface="Cambria Math" panose="02040503050406030204" pitchFamily="18" charset="0"/>
+                          </a:rPr>
+                          <m:t>𝑐</m:t>
+                        </m:r>
+                        <m:r>
+                          <a:rPr lang="en-US" b="0" i="0" smtClean="0">
+                            <a:latin typeface="Cambria Math" panose="02040503050406030204" pitchFamily="18" charset="0"/>
+                          </a:rPr>
+                          <m:t>=[…</m:t>
+                        </m:r>
+                      </m:oMath>
+                    </a14:m>
+                    <a:r>
+                      <a:rPr lang="en-US" b="0" i="0" dirty="0">
+                        <a:latin typeface="+mj-lt"/>
+                      </a:rPr>
+                      <a:t>[</a:t>
+                    </a:r>
+                    <a14:m>
+                      <m:oMath xmlns:m="http://schemas.openxmlformats.org/officeDocument/2006/math">
+                        <m:r>
+                          <a:rPr lang="en-US" b="0" i="1" dirty="0" smtClean="0">
+                            <a:latin typeface="Cambria Math" panose="02040503050406030204" pitchFamily="18" charset="0"/>
+                          </a:rPr>
+                          <m:t>𝑥</m:t>
+                        </m:r>
+                      </m:oMath>
+                    </a14:m>
+                    <a:r>
+                      <a:rPr lang="en-US" b="0" i="0" dirty="0">
+                        <a:latin typeface="+mj-lt"/>
+                      </a:rPr>
+                      <a:t>=4]</a:t>
+                    </a:r>
+                    <a14:m>
+                      <m:oMath xmlns:m="http://schemas.openxmlformats.org/officeDocument/2006/math">
+                        <m:r>
+                          <a:rPr lang="en-US" b="0" i="0" smtClean="0">
+                            <a:latin typeface="Cambria Math" panose="02040503050406030204" pitchFamily="18" charset="0"/>
+                          </a:rPr>
+                          <m:t>]</m:t>
+                        </m:r>
+                      </m:oMath>
+                    </a14:m>
+                    <a:endParaRPr lang="en-US" dirty="0"/>
+                  </a:p>
+                </p:txBody>
+              </p:sp>
+            </mc:Choice>
+            <mc:Fallback>
+              <p:sp>
+                <p:nvSpPr>
+                  <p:cNvPr id="15" name="TextBox 14">
+                    <a:extLst>
+                      <a:ext uri="{FF2B5EF4-FFF2-40B4-BE49-F238E27FC236}">
+                        <a16:creationId xmlns:a16="http://schemas.microsoft.com/office/drawing/2014/main" id="{5105FC29-DFCD-9062-D9B4-8BF3CA87B404}"/>
+                      </a:ext>
+                    </a:extLst>
+                  </p:cNvPr>
+                  <p:cNvSpPr txBox="1">
+                    <a:spLocks noRot="1" noChangeAspect="1" noMove="1" noResize="1" noEditPoints="1" noAdjustHandles="1" noChangeArrowheads="1" noChangeShapeType="1" noTextEdit="1"/>
+                  </p:cNvSpPr>
+                  <p:nvPr/>
+                </p:nvSpPr>
+                <p:spPr>
+                  <a:xfrm>
+                    <a:off x="3955783" y="4362389"/>
+                    <a:ext cx="2168893" cy="369332"/>
+                  </a:xfrm>
+                  <a:prstGeom prst="rect">
+                    <a:avLst/>
+                  </a:prstGeom>
+                  <a:blipFill>
+                    <a:blip r:embed="rId5"/>
+                    <a:stretch>
+                      <a:fillRect t="-10000" b="-26667"/>
+                    </a:stretch>
+                  </a:blipFill>
+                </p:spPr>
+                <p:txBody>
+                  <a:bodyPr/>
+                  <a:lstStyle/>
+                  <a:p>
+                    <a:r>
+                      <a:rPr lang="en-US">
+                        <a:noFill/>
+                      </a:rPr>
+                      <a:t> </a:t>
+                    </a:r>
+                  </a:p>
+                </p:txBody>
+              </p:sp>
+            </mc:Fallback>
+          </mc:AlternateContent>
+          <p:cxnSp>
+            <p:nvCxnSpPr>
+              <p:cNvPr id="20" name="Straight Connector 19">
+                <a:extLst>
+                  <a:ext uri="{FF2B5EF4-FFF2-40B4-BE49-F238E27FC236}">
+                    <a16:creationId xmlns:a16="http://schemas.microsoft.com/office/drawing/2014/main" id="{B15D8304-2AC9-0983-3213-8983CD6A97D2}"/>
+                  </a:ext>
+                </a:extLst>
+              </p:cNvPr>
+              <p:cNvCxnSpPr/>
+              <p:nvPr/>
+            </p:nvCxnSpPr>
+            <p:spPr>
+              <a:xfrm>
+                <a:off x="4653011" y="1215692"/>
+                <a:ext cx="1004035" cy="0"/>
+              </a:xfrm>
+              <a:prstGeom prst="line">
+                <a:avLst/>
+              </a:prstGeom>
+              <a:ln>
+                <a:headEnd type="arrow" w="med" len="med"/>
+                <a:tailEnd type="none" w="med" len="med"/>
+              </a:ln>
+            </p:spPr>
+            <p:style>
+              <a:lnRef idx="1">
+                <a:schemeClr val="dk1"/>
+              </a:lnRef>
+              <a:fillRef idx="0">
+                <a:schemeClr val="dk1"/>
+              </a:fillRef>
+              <a:effectRef idx="0">
+                <a:schemeClr val="dk1"/>
+              </a:effectRef>
+              <a:fontRef idx="minor">
+                <a:schemeClr val="tx1"/>
+              </a:fontRef>
+            </p:style>
+          </p:cxnSp>
+          <p:sp>
+            <p:nvSpPr>
+              <p:cNvPr id="25" name="Freeform: Shape 24">
+                <a:extLst>
+                  <a:ext uri="{FF2B5EF4-FFF2-40B4-BE49-F238E27FC236}">
+                    <a16:creationId xmlns:a16="http://schemas.microsoft.com/office/drawing/2014/main" id="{65F19686-139A-F11B-F004-A44F4D653A1B}"/>
+                  </a:ext>
+                </a:extLst>
+              </p:cNvPr>
+              <p:cNvSpPr/>
+              <p:nvPr/>
+            </p:nvSpPr>
+            <p:spPr>
+              <a:xfrm>
+                <a:off x="5127458" y="3783067"/>
+                <a:ext cx="683393" cy="579322"/>
+              </a:xfrm>
+              <a:custGeom>
+                <a:avLst/>
+                <a:gdLst>
+                  <a:gd name="connsiteX0" fmla="*/ 0 w 683393"/>
+                  <a:gd name="connsiteY0" fmla="*/ 579322 h 579322"/>
+                  <a:gd name="connsiteX1" fmla="*/ 288757 w 683393"/>
+                  <a:gd name="connsiteY1" fmla="*/ 59558 h 579322"/>
+                  <a:gd name="connsiteX2" fmla="*/ 683393 w 683393"/>
+                  <a:gd name="connsiteY2" fmla="*/ 11432 h 579322"/>
+                </a:gdLst>
+                <a:ahLst/>
+                <a:cxnLst>
+                  <a:cxn ang="0">
+                    <a:pos x="connsiteX0" y="connsiteY0"/>
+                  </a:cxn>
+                  <a:cxn ang="0">
+                    <a:pos x="connsiteX1" y="connsiteY1"/>
+                  </a:cxn>
+                  <a:cxn ang="0">
+                    <a:pos x="connsiteX2" y="connsiteY2"/>
+                  </a:cxn>
+                </a:cxnLst>
+                <a:rect l="l" t="t" r="r" b="b"/>
+                <a:pathLst>
+                  <a:path w="683393" h="579322">
+                    <a:moveTo>
+                      <a:pt x="0" y="579322"/>
+                    </a:moveTo>
+                    <a:cubicBezTo>
+                      <a:pt x="87429" y="366764"/>
+                      <a:pt x="174858" y="154206"/>
+                      <a:pt x="288757" y="59558"/>
+                    </a:cubicBezTo>
+                    <a:cubicBezTo>
+                      <a:pt x="402656" y="-35090"/>
+                      <a:pt x="683393" y="11432"/>
+                      <a:pt x="683393" y="11432"/>
+                    </a:cubicBezTo>
+                  </a:path>
+                </a:pathLst>
+              </a:custGeom>
+              <a:noFill/>
+              <a:ln>
+                <a:headEnd type="none" w="med" len="med"/>
+                <a:tailEnd type="arrow" w="med" len="med"/>
+              </a:ln>
+            </p:spPr>
+            <p:style>
+              <a:lnRef idx="2">
+                <a:schemeClr val="accent1">
+                  <a:shade val="50000"/>
+                </a:schemeClr>
+              </a:lnRef>
+              <a:fillRef idx="1">
+                <a:schemeClr val="accent1"/>
+              </a:fillRef>
+              <a:effectRef idx="0">
+                <a:schemeClr val="accent1"/>
+              </a:effectRef>
+              <a:fontRef idx="minor">
+                <a:schemeClr val="lt1"/>
+              </a:fontRef>
+            </p:style>
+            <p:txBody>
+              <a:bodyPr rtlCol="0" anchor="ctr"/>
+              <a:lstStyle/>
+              <a:p>
+                <a:pPr algn="ctr"/>
+                <a:endParaRPr lang="en-US"/>
+              </a:p>
+            </p:txBody>
+          </p:sp>
+          <p:sp>
+            <p:nvSpPr>
+              <p:cNvPr id="26" name="Freeform: Shape 25">
+                <a:extLst>
+                  <a:ext uri="{FF2B5EF4-FFF2-40B4-BE49-F238E27FC236}">
+                    <a16:creationId xmlns:a16="http://schemas.microsoft.com/office/drawing/2014/main" id="{BE41B39F-384D-2FAF-E404-2E957C9E34AC}"/>
+                  </a:ext>
+                </a:extLst>
+              </p:cNvPr>
+              <p:cNvSpPr/>
+              <p:nvPr/>
+            </p:nvSpPr>
+            <p:spPr>
+              <a:xfrm rot="21202575">
+                <a:off x="4260531" y="1469001"/>
+                <a:ext cx="1453415" cy="1229063"/>
+              </a:xfrm>
+              <a:custGeom>
+                <a:avLst/>
+                <a:gdLst>
+                  <a:gd name="connsiteX0" fmla="*/ 1453415 w 1453415"/>
+                  <a:gd name="connsiteY0" fmla="*/ 23940 h 1535107"/>
+                  <a:gd name="connsiteX1" fmla="*/ 837398 w 1453415"/>
+                  <a:gd name="connsiteY1" fmla="*/ 206820 h 1535107"/>
+                  <a:gd name="connsiteX2" fmla="*/ 0 w 1453415"/>
+                  <a:gd name="connsiteY2" fmla="*/ 1535107 h 1535107"/>
+                </a:gdLst>
+                <a:ahLst/>
+                <a:cxnLst>
+                  <a:cxn ang="0">
+                    <a:pos x="connsiteX0" y="connsiteY0"/>
+                  </a:cxn>
+                  <a:cxn ang="0">
+                    <a:pos x="connsiteX1" y="connsiteY1"/>
+                  </a:cxn>
+                  <a:cxn ang="0">
+                    <a:pos x="connsiteX2" y="connsiteY2"/>
+                  </a:cxn>
+                </a:cxnLst>
+                <a:rect l="l" t="t" r="r" b="b"/>
+                <a:pathLst>
+                  <a:path w="1453415" h="1535107">
+                    <a:moveTo>
+                      <a:pt x="1453415" y="23940"/>
+                    </a:moveTo>
+                    <a:cubicBezTo>
+                      <a:pt x="1266524" y="-10551"/>
+                      <a:pt x="1079634" y="-45041"/>
+                      <a:pt x="837398" y="206820"/>
+                    </a:cubicBezTo>
+                    <a:cubicBezTo>
+                      <a:pt x="595162" y="458681"/>
+                      <a:pt x="297581" y="996894"/>
+                      <a:pt x="0" y="1535107"/>
+                    </a:cubicBezTo>
+                  </a:path>
+                </a:pathLst>
+              </a:custGeom>
+              <a:noFill/>
+              <a:ln>
+                <a:headEnd type="arrow" w="med" len="med"/>
+                <a:tailEnd type="none" w="med" len="med"/>
+              </a:ln>
+            </p:spPr>
+            <p:style>
+              <a:lnRef idx="2">
+                <a:schemeClr val="accent1">
+                  <a:shade val="50000"/>
+                </a:schemeClr>
+              </a:lnRef>
+              <a:fillRef idx="1">
+                <a:schemeClr val="accent1"/>
+              </a:fillRef>
+              <a:effectRef idx="0">
+                <a:schemeClr val="accent1"/>
+              </a:effectRef>
+              <a:fontRef idx="minor">
+                <a:schemeClr val="lt1"/>
+              </a:fontRef>
+            </p:style>
+            <p:txBody>
+              <a:bodyPr rtlCol="0" anchor="ctr"/>
+              <a:lstStyle/>
+              <a:p>
+                <a:pPr algn="ctr"/>
+                <a:endParaRPr lang="en-US"/>
+              </a:p>
+            </p:txBody>
+          </p:sp>
+          <mc:AlternateContent xmlns:mc="http://schemas.openxmlformats.org/markup-compatibility/2006">
+            <mc:Choice xmlns:a14="http://schemas.microsoft.com/office/drawing/2010/main" Requires="a14">
+              <p:sp>
+                <p:nvSpPr>
+                  <p:cNvPr id="27" name="TextBox 26">
+                    <a:extLst>
+                      <a:ext uri="{FF2B5EF4-FFF2-40B4-BE49-F238E27FC236}">
+                        <a16:creationId xmlns:a16="http://schemas.microsoft.com/office/drawing/2014/main" id="{0875EE7C-DCE3-F75A-E8F9-158FD2D95D0F}"/>
+                      </a:ext>
+                    </a:extLst>
+                  </p:cNvPr>
+                  <p:cNvSpPr txBox="1"/>
+                  <p:nvPr/>
+                </p:nvSpPr>
+                <p:spPr>
+                  <a:xfrm>
+                    <a:off x="3265972" y="2780656"/>
+                    <a:ext cx="2168893" cy="369332"/>
+                  </a:xfrm>
+                  <a:prstGeom prst="rect">
+                    <a:avLst/>
+                  </a:prstGeom>
+                  <a:noFill/>
+                </p:spPr>
+                <p:txBody>
+                  <a:bodyPr wrap="square" rtlCol="0">
+                    <a:spAutoFit/>
+                  </a:bodyPr>
+                  <a:lstStyle/>
+                  <a:p>
+                    <a14:m>
+                      <m:oMath xmlns:m="http://schemas.openxmlformats.org/officeDocument/2006/math">
+                        <m:r>
+                          <a:rPr lang="en-US" b="0" i="1" smtClean="0">
+                            <a:latin typeface="Cambria Math" panose="02040503050406030204" pitchFamily="18" charset="0"/>
+                          </a:rPr>
+                          <m:t>𝑐</m:t>
+                        </m:r>
+                        <m:r>
+                          <a:rPr lang="en-US" b="0" i="0" smtClean="0">
+                            <a:latin typeface="Cambria Math" panose="02040503050406030204" pitchFamily="18" charset="0"/>
+                          </a:rPr>
+                          <m:t>=[…</m:t>
+                        </m:r>
+                      </m:oMath>
+                    </a14:m>
+                    <a:r>
+                      <a:rPr lang="en-US" b="0" i="0" dirty="0">
+                        <a:latin typeface="+mj-lt"/>
+                      </a:rPr>
+                      <a:t>[</a:t>
+                    </a:r>
+                    <a14:m>
+                      <m:oMath xmlns:m="http://schemas.openxmlformats.org/officeDocument/2006/math">
+                        <m:r>
+                          <a:rPr lang="en-US" b="0" i="1" dirty="0" smtClean="0">
+                            <a:latin typeface="Cambria Math" panose="02040503050406030204" pitchFamily="18" charset="0"/>
+                          </a:rPr>
+                          <m:t>𝑥</m:t>
+                        </m:r>
+                      </m:oMath>
+                    </a14:m>
+                    <a:r>
+                      <a:rPr lang="en-US" b="0" i="0" dirty="0">
+                        <a:latin typeface="+mj-lt"/>
+                      </a:rPr>
+                      <a:t>=2]</a:t>
+                    </a:r>
+                    <a14:m>
+                      <m:oMath xmlns:m="http://schemas.openxmlformats.org/officeDocument/2006/math">
+                        <m:r>
+                          <a:rPr lang="en-US" b="0" i="0" smtClean="0">
+                            <a:latin typeface="Cambria Math" panose="02040503050406030204" pitchFamily="18" charset="0"/>
+                          </a:rPr>
+                          <m:t>]</m:t>
+                        </m:r>
+                      </m:oMath>
+                    </a14:m>
+                    <a:endParaRPr lang="en-US" dirty="0"/>
+                  </a:p>
+                </p:txBody>
+              </p:sp>
+            </mc:Choice>
+            <mc:Fallback>
+              <p:sp>
+                <p:nvSpPr>
+                  <p:cNvPr id="27" name="TextBox 26">
+                    <a:extLst>
+                      <a:ext uri="{FF2B5EF4-FFF2-40B4-BE49-F238E27FC236}">
+                        <a16:creationId xmlns:a16="http://schemas.microsoft.com/office/drawing/2014/main" id="{0875EE7C-DCE3-F75A-E8F9-158FD2D95D0F}"/>
+                      </a:ext>
+                    </a:extLst>
+                  </p:cNvPr>
+                  <p:cNvSpPr txBox="1">
+                    <a:spLocks noRot="1" noChangeAspect="1" noMove="1" noResize="1" noEditPoints="1" noAdjustHandles="1" noChangeArrowheads="1" noChangeShapeType="1" noTextEdit="1"/>
+                  </p:cNvSpPr>
+                  <p:nvPr/>
+                </p:nvSpPr>
+                <p:spPr>
+                  <a:xfrm>
+                    <a:off x="3265972" y="2780656"/>
+                    <a:ext cx="2168893" cy="369332"/>
+                  </a:xfrm>
+                  <a:prstGeom prst="rect">
+                    <a:avLst/>
+                  </a:prstGeom>
+                  <a:blipFill>
+                    <a:blip r:embed="rId6"/>
+                    <a:stretch>
+                      <a:fillRect t="-8197" b="-24590"/>
+                    </a:stretch>
+                  </a:blipFill>
+                </p:spPr>
+                <p:txBody>
+                  <a:bodyPr/>
+                  <a:lstStyle/>
+                  <a:p>
+                    <a:r>
+                      <a:rPr lang="en-US">
+                        <a:noFill/>
+                      </a:rPr>
+                      <a:t> </a:t>
+                    </a:r>
+                  </a:p>
+                </p:txBody>
+              </p:sp>
+            </mc:Fallback>
+          </mc:AlternateContent>
+          <p:sp>
+            <p:nvSpPr>
+              <p:cNvPr id="28" name="Freeform: Shape 27">
+                <a:extLst>
+                  <a:ext uri="{FF2B5EF4-FFF2-40B4-BE49-F238E27FC236}">
+                    <a16:creationId xmlns:a16="http://schemas.microsoft.com/office/drawing/2014/main" id="{E122B5FF-966E-EA17-93CF-803FFC21DE0C}"/>
+                  </a:ext>
+                </a:extLst>
+              </p:cNvPr>
+              <p:cNvSpPr/>
+              <p:nvPr/>
+            </p:nvSpPr>
+            <p:spPr>
+              <a:xfrm rot="208992">
+                <a:off x="4298437" y="3271235"/>
+                <a:ext cx="1848049" cy="1855873"/>
+              </a:xfrm>
+              <a:custGeom>
+                <a:avLst/>
+                <a:gdLst>
+                  <a:gd name="connsiteX0" fmla="*/ 0 w 1876926"/>
+                  <a:gd name="connsiteY0" fmla="*/ 0 h 1989396"/>
+                  <a:gd name="connsiteX1" fmla="*/ 875899 w 1876926"/>
+                  <a:gd name="connsiteY1" fmla="*/ 1828800 h 1989396"/>
+                  <a:gd name="connsiteX2" fmla="*/ 1876926 w 1876926"/>
+                  <a:gd name="connsiteY2" fmla="*/ 1799924 h 1989396"/>
+                </a:gdLst>
+                <a:ahLst/>
+                <a:cxnLst>
+                  <a:cxn ang="0">
+                    <a:pos x="connsiteX0" y="connsiteY0"/>
+                  </a:cxn>
+                  <a:cxn ang="0">
+                    <a:pos x="connsiteX1" y="connsiteY1"/>
+                  </a:cxn>
+                  <a:cxn ang="0">
+                    <a:pos x="connsiteX2" y="connsiteY2"/>
+                  </a:cxn>
+                </a:cxnLst>
+                <a:rect l="l" t="t" r="r" b="b"/>
+                <a:pathLst>
+                  <a:path w="1876926" h="1989396">
+                    <a:moveTo>
+                      <a:pt x="0" y="0"/>
+                    </a:moveTo>
+                    <a:cubicBezTo>
+                      <a:pt x="281539" y="764406"/>
+                      <a:pt x="563078" y="1528813"/>
+                      <a:pt x="875899" y="1828800"/>
+                    </a:cubicBezTo>
+                    <a:cubicBezTo>
+                      <a:pt x="1188720" y="2128787"/>
+                      <a:pt x="1620252" y="1942699"/>
+                      <a:pt x="1876926" y="1799924"/>
+                    </a:cubicBezTo>
+                  </a:path>
+                </a:pathLst>
+              </a:custGeom>
+              <a:noFill/>
+              <a:ln>
+                <a:headEnd type="none" w="med" len="med"/>
+                <a:tailEnd type="arrow" w="med" len="med"/>
+              </a:ln>
+            </p:spPr>
+            <p:style>
+              <a:lnRef idx="2">
+                <a:schemeClr val="accent1">
+                  <a:shade val="50000"/>
+                </a:schemeClr>
+              </a:lnRef>
+              <a:fillRef idx="1">
+                <a:schemeClr val="accent1"/>
+              </a:fillRef>
+              <a:effectRef idx="0">
+                <a:schemeClr val="accent1"/>
+              </a:effectRef>
+              <a:fontRef idx="minor">
+                <a:schemeClr val="lt1"/>
+              </a:fontRef>
+            </p:style>
+            <p:txBody>
+              <a:bodyPr rtlCol="0" anchor="ctr"/>
+              <a:lstStyle/>
+              <a:p>
+                <a:pPr algn="ctr"/>
+                <a:endParaRPr lang="en-US"/>
+              </a:p>
+            </p:txBody>
+          </p:sp>
+        </p:grpSp>
+      </p:grpSp>
+    </p:spTree>
+    <p:extLst>
+      <p:ext uri="{BB962C8B-B14F-4D97-AF65-F5344CB8AC3E}">
+        <p14:creationId xmlns:p14="http://schemas.microsoft.com/office/powerpoint/2010/main" val="2784885018"/>
+      </p:ext>
+    </p:extLst>
+  </p:cSld>
+  <p:clrMapOvr>
+    <a:masterClrMapping/>
+  </p:clrMapOvr>
+</p:sld>
+</file>
+
 <file path=ppt/slides/slide3.xml><?xml version="1.0" encoding="utf-8"?>
 <p:sld xmlns:a="http://schemas.openxmlformats.org/drawingml/2006/main" xmlns:r="http://schemas.openxmlformats.org/officeDocument/2006/relationships" xmlns:p="http://schemas.openxmlformats.org/presentationml/2006/main">
   <p:cSld>

</xml_diff>